<commit_message>
Get PXT Summary value and convert markup to HTML
</commit_message>
<xml_diff>
--- a/src/main/resources/Template.pptx
+++ b/src/main/resources/Template.pptx
@@ -389,6 +389,42 @@
             <a:r>
               <a:rPr lang="en-US" smtClean="0"/>
               <a:t>Phase</a:t>
+            </a:r>
+          </a:p>
+        </p:txBody>
+      </p:sp>
+      <p:sp>
+        <p:nvSpPr>
+          <p:cNvPr id="3" name="Text Placeholder 2"/>
+          <p:cNvSpPr>
+            <a:spLocks noGrp="1"/>
+          </p:cNvSpPr>
+          <p:nvPr>
+            <p:ph type="body" sz="quarter" idx="15" hasCustomPrompt="1"/>
+          </p:nvPr>
+        </p:nvSpPr>
+        <p:spPr>
+          <a:xfrm>
+            <a:off x="285075" y="1079264"/>
+            <a:ext cx="7192253" cy="2565366"/>
+          </a:xfrm>
+          <a:prstGeom prst="rect">
+            <a:avLst/>
+          </a:prstGeom>
+        </p:spPr>
+        <p:txBody>
+          <a:bodyPr/>
+          <a:lstStyle>
+            <a:lvl1pPr marL="0" indent="0">
+              <a:buNone/>
+              <a:defRPr sz="1600"/>
+            </a:lvl1pPr>
+          </a:lstStyle>
+          <a:p>
+            <a:pPr lvl="0"/>
+            <a:r>
+              <a:rPr lang="en-US" smtClean="0"/>
+              <a:t>PXT Summary</a:t>
             </a:r>
           </a:p>
         </p:txBody>
@@ -600,6 +636,198 @@
           </a:graphicData>
         </a:graphic>
       </p:graphicFrame>
+      <p:sp>
+        <p:nvSpPr>
+          <p:cNvPr id="2" name="Rectangle 1"/>
+          <p:cNvSpPr/>
+          <p:nvPr userDrawn="1"/>
+        </p:nvSpPr>
+        <p:spPr>
+          <a:xfrm>
+            <a:off x="272372" y="1063558"/>
+            <a:ext cx="7204956" cy="2600527"/>
+          </a:xfrm>
+          <a:prstGeom prst="rect">
+            <a:avLst/>
+          </a:prstGeom>
+          <a:solidFill>
+            <a:schemeClr val="bg1">
+              <a:lumMod val="95000"/>
+            </a:schemeClr>
+          </a:solidFill>
+          <a:ln>
+            <a:noFill/>
+          </a:ln>
+        </p:spPr>
+        <p:style>
+          <a:lnRef idx="2">
+            <a:schemeClr val="accent1">
+              <a:shade val="50000"/>
+            </a:schemeClr>
+          </a:lnRef>
+          <a:fillRef idx="1">
+            <a:schemeClr val="accent1"/>
+          </a:fillRef>
+          <a:effectRef idx="0">
+            <a:schemeClr val="accent1"/>
+          </a:effectRef>
+          <a:fontRef idx="minor">
+            <a:schemeClr val="lt1"/>
+          </a:fontRef>
+        </p:style>
+        <p:txBody>
+          <a:bodyPr rtlCol="0" anchor="ctr"/>
+          <a:lstStyle/>
+          <a:p>
+            <a:pPr algn="ctr"/>
+            <a:endParaRPr lang="en-US"/>
+          </a:p>
+        </p:txBody>
+      </p:sp>
+      <p:sp>
+        <p:nvSpPr>
+          <p:cNvPr id="4" name="Rectangle 3"/>
+          <p:cNvSpPr/>
+          <p:nvPr userDrawn="1"/>
+        </p:nvSpPr>
+        <p:spPr>
+          <a:xfrm>
+            <a:off x="272372" y="3696511"/>
+            <a:ext cx="7204956" cy="1141379"/>
+          </a:xfrm>
+          <a:prstGeom prst="rect">
+            <a:avLst/>
+          </a:prstGeom>
+          <a:solidFill>
+            <a:schemeClr val="bg1">
+              <a:lumMod val="95000"/>
+            </a:schemeClr>
+          </a:solidFill>
+          <a:ln>
+            <a:noFill/>
+          </a:ln>
+        </p:spPr>
+        <p:style>
+          <a:lnRef idx="2">
+            <a:schemeClr val="accent1">
+              <a:shade val="50000"/>
+            </a:schemeClr>
+          </a:lnRef>
+          <a:fillRef idx="1">
+            <a:schemeClr val="accent1"/>
+          </a:fillRef>
+          <a:effectRef idx="0">
+            <a:schemeClr val="accent1"/>
+          </a:effectRef>
+          <a:fontRef idx="minor">
+            <a:schemeClr val="lt1"/>
+          </a:fontRef>
+        </p:style>
+        <p:txBody>
+          <a:bodyPr rtlCol="0" anchor="ctr"/>
+          <a:lstStyle/>
+          <a:p>
+            <a:pPr algn="ctr"/>
+            <a:endParaRPr lang="en-US"/>
+          </a:p>
+        </p:txBody>
+      </p:sp>
+      <p:sp>
+        <p:nvSpPr>
+          <p:cNvPr id="5" name="Rectangle 4"/>
+          <p:cNvSpPr/>
+          <p:nvPr userDrawn="1"/>
+        </p:nvSpPr>
+        <p:spPr>
+          <a:xfrm>
+            <a:off x="272372" y="4870316"/>
+            <a:ext cx="7204956" cy="1880680"/>
+          </a:xfrm>
+          <a:prstGeom prst="rect">
+            <a:avLst/>
+          </a:prstGeom>
+          <a:solidFill>
+            <a:schemeClr val="bg1">
+              <a:lumMod val="95000"/>
+            </a:schemeClr>
+          </a:solidFill>
+          <a:ln>
+            <a:noFill/>
+          </a:ln>
+        </p:spPr>
+        <p:style>
+          <a:lnRef idx="2">
+            <a:schemeClr val="accent1">
+              <a:shade val="50000"/>
+            </a:schemeClr>
+          </a:lnRef>
+          <a:fillRef idx="1">
+            <a:schemeClr val="accent1"/>
+          </a:fillRef>
+          <a:effectRef idx="0">
+            <a:schemeClr val="accent1"/>
+          </a:effectRef>
+          <a:fontRef idx="minor">
+            <a:schemeClr val="lt1"/>
+          </a:fontRef>
+        </p:style>
+        <p:txBody>
+          <a:bodyPr rtlCol="0" anchor="ctr"/>
+          <a:lstStyle/>
+          <a:p>
+            <a:pPr algn="ctr"/>
+            <a:endParaRPr lang="en-US"/>
+          </a:p>
+        </p:txBody>
+      </p:sp>
+      <p:sp>
+        <p:nvSpPr>
+          <p:cNvPr id="6" name="Rectangle 5"/>
+          <p:cNvSpPr/>
+          <p:nvPr userDrawn="1"/>
+        </p:nvSpPr>
+        <p:spPr>
+          <a:xfrm>
+            <a:off x="7503269" y="1063557"/>
+            <a:ext cx="4429327" cy="5687439"/>
+          </a:xfrm>
+          <a:prstGeom prst="rect">
+            <a:avLst/>
+          </a:prstGeom>
+          <a:solidFill>
+            <a:schemeClr val="bg1">
+              <a:lumMod val="95000"/>
+            </a:schemeClr>
+          </a:solidFill>
+          <a:ln>
+            <a:noFill/>
+          </a:ln>
+        </p:spPr>
+        <p:style>
+          <a:lnRef idx="2">
+            <a:schemeClr val="accent1">
+              <a:shade val="50000"/>
+            </a:schemeClr>
+          </a:lnRef>
+          <a:fillRef idx="1">
+            <a:schemeClr val="accent1"/>
+          </a:fillRef>
+          <a:effectRef idx="0">
+            <a:schemeClr val="accent1"/>
+          </a:effectRef>
+          <a:fontRef idx="minor">
+            <a:schemeClr val="lt1"/>
+          </a:fontRef>
+        </p:style>
+        <p:txBody>
+          <a:bodyPr rtlCol="0" anchor="ctr"/>
+          <a:lstStyle/>
+          <a:p>
+            <a:pPr algn="ctr"/>
+            <a:endParaRPr lang="en-US"/>
+          </a:p>
+        </p:txBody>
+      </p:sp>
     </p:spTree>
     <p:extLst>
       <p:ext uri="{BB962C8B-B14F-4D97-AF65-F5344CB8AC3E}">
@@ -998,6 +1226,30 @@
           </p:nvPr>
         </p:nvSpPr>
         <p:spPr/>
+        <p:txBody>
+          <a:bodyPr/>
+          <a:lstStyle/>
+          <a:p>
+            <a:endParaRPr lang="en-US"/>
+          </a:p>
+        </p:txBody>
+      </p:sp>
+      <p:sp>
+        <p:nvSpPr>
+          <p:cNvPr id="13" name="PXT Summary Placeholder"/>
+          <p:cNvSpPr>
+            <a:spLocks noGrp="1"/>
+          </p:cNvSpPr>
+          <p:nvPr>
+            <p:ph type="body" sz="quarter" idx="15"/>
+          </p:nvPr>
+        </p:nvSpPr>
+        <p:spPr>
+          <a:xfrm>
+            <a:off x="285075" y="1079264"/>
+            <a:ext cx="7192253" cy="2565366"/>
+          </a:xfrm>
+        </p:spPr>
         <p:txBody>
           <a:bodyPr/>
           <a:lstStyle/>

</xml_diff>

<commit_message>
Finish the Internal/External block with duplicate code. Need refactor.
</commit_message>
<xml_diff>
--- a/src/main/resources/Template.pptx
+++ b/src/main/resources/Template.pptx
@@ -405,8 +405,8 @@
         </p:nvSpPr>
         <p:spPr>
           <a:xfrm>
-            <a:off x="285075" y="1079264"/>
-            <a:ext cx="7192253" cy="2565366"/>
+            <a:off x="285075" y="1079263"/>
+            <a:ext cx="7192253" cy="2993383"/>
           </a:xfrm>
           <a:prstGeom prst="rect">
             <a:avLst/>
@@ -426,6 +426,80 @@
               <a:rPr lang="en-US" smtClean="0"/>
               <a:t>PXT Summary</a:t>
             </a:r>
+          </a:p>
+        </p:txBody>
+      </p:sp>
+      <p:sp>
+        <p:nvSpPr>
+          <p:cNvPr id="8" name="Text Placeholder 2"/>
+          <p:cNvSpPr>
+            <a:spLocks noGrp="1"/>
+          </p:cNvSpPr>
+          <p:nvPr>
+            <p:ph type="body" sz="quarter" idx="16" hasCustomPrompt="1"/>
+          </p:nvPr>
+        </p:nvSpPr>
+        <p:spPr>
+          <a:xfrm>
+            <a:off x="285074" y="4412608"/>
+            <a:ext cx="3573563" cy="233052"/>
+          </a:xfrm>
+          <a:prstGeom prst="rect">
+            <a:avLst/>
+          </a:prstGeom>
+        </p:spPr>
+        <p:txBody>
+          <a:bodyPr/>
+          <a:lstStyle>
+            <a:lvl1pPr marL="0" indent="0">
+              <a:buNone/>
+              <a:defRPr sz="1200" baseline="0"/>
+            </a:lvl1pPr>
+          </a:lstStyle>
+          <a:p>
+            <a:pPr lvl="0"/>
+            <a:r>
+              <a:rPr lang="en-US" smtClean="0"/>
+              <a:t>Insert External Owner</a:t>
+            </a:r>
+            <a:endParaRPr lang="en-US" smtClean="0"/>
+          </a:p>
+        </p:txBody>
+      </p:sp>
+      <p:sp>
+        <p:nvSpPr>
+          <p:cNvPr id="9" name="Text Placeholder 2"/>
+          <p:cNvSpPr>
+            <a:spLocks noGrp="1"/>
+          </p:cNvSpPr>
+          <p:nvPr>
+            <p:ph type="body" sz="quarter" idx="17" hasCustomPrompt="1"/>
+          </p:nvPr>
+        </p:nvSpPr>
+        <p:spPr>
+          <a:xfrm>
+            <a:off x="3881201" y="4412608"/>
+            <a:ext cx="3573563" cy="233052"/>
+          </a:xfrm>
+          <a:prstGeom prst="rect">
+            <a:avLst/>
+          </a:prstGeom>
+        </p:spPr>
+        <p:txBody>
+          <a:bodyPr/>
+          <a:lstStyle>
+            <a:lvl1pPr marL="0" indent="0">
+              <a:buNone/>
+              <a:defRPr sz="1200" baseline="0"/>
+            </a:lvl1pPr>
+          </a:lstStyle>
+          <a:p>
+            <a:pPr lvl="0"/>
+            <a:r>
+              <a:rPr lang="en-US" smtClean="0"/>
+              <a:t>Insert Internal Owner</a:t>
+            </a:r>
+            <a:endParaRPr lang="en-US" smtClean="0"/>
           </a:p>
         </p:txBody>
       </p:sp>
@@ -645,7 +719,7 @@
         <p:spPr>
           <a:xfrm>
             <a:off x="272372" y="1063558"/>
-            <a:ext cx="7204956" cy="2600527"/>
+            <a:ext cx="7204956" cy="3016441"/>
           </a:xfrm>
           <a:prstGeom prst="rect">
             <a:avLst/>
@@ -686,14 +760,14 @@
       </p:sp>
       <p:sp>
         <p:nvSpPr>
-          <p:cNvPr id="4" name="Rectangle 3"/>
+          <p:cNvPr id="5" name="Rectangle 4"/>
           <p:cNvSpPr/>
           <p:nvPr userDrawn="1"/>
         </p:nvSpPr>
         <p:spPr>
           <a:xfrm>
-            <a:off x="272372" y="3696511"/>
-            <a:ext cx="7204956" cy="1141379"/>
+            <a:off x="272372" y="4693492"/>
+            <a:ext cx="7204956" cy="2057504"/>
           </a:xfrm>
           <a:prstGeom prst="rect">
             <a:avLst/>
@@ -734,14 +808,14 @@
       </p:sp>
       <p:sp>
         <p:nvSpPr>
-          <p:cNvPr id="5" name="Rectangle 4"/>
+          <p:cNvPr id="6" name="Rectangle 5"/>
           <p:cNvSpPr/>
           <p:nvPr userDrawn="1"/>
         </p:nvSpPr>
         <p:spPr>
           <a:xfrm>
-            <a:off x="272372" y="4870316"/>
-            <a:ext cx="7204956" cy="1880680"/>
+            <a:off x="7503269" y="1063557"/>
+            <a:ext cx="4429327" cy="5687439"/>
           </a:xfrm>
           <a:prstGeom prst="rect">
             <a:avLst/>
@@ -780,54 +854,112 @@
           </a:p>
         </p:txBody>
       </p:sp>
-      <p:sp>
-        <p:nvSpPr>
-          <p:cNvPr id="6" name="Rectangle 5"/>
-          <p:cNvSpPr/>
-          <p:nvPr userDrawn="1"/>
-        </p:nvSpPr>
-        <p:spPr>
-          <a:xfrm>
-            <a:off x="7503269" y="1063557"/>
-            <a:ext cx="4429327" cy="5687439"/>
-          </a:xfrm>
-          <a:prstGeom prst="rect">
-            <a:avLst/>
-          </a:prstGeom>
-          <a:solidFill>
-            <a:schemeClr val="bg1">
-              <a:lumMod val="95000"/>
-            </a:schemeClr>
-          </a:solidFill>
-          <a:ln>
-            <a:noFill/>
-          </a:ln>
-        </p:spPr>
-        <p:style>
-          <a:lnRef idx="2">
-            <a:schemeClr val="accent1">
-              <a:shade val="50000"/>
-            </a:schemeClr>
-          </a:lnRef>
-          <a:fillRef idx="1">
-            <a:schemeClr val="accent1"/>
-          </a:fillRef>
-          <a:effectRef idx="0">
-            <a:schemeClr val="accent1"/>
-          </a:effectRef>
-          <a:fontRef idx="minor">
-            <a:schemeClr val="lt1"/>
-          </a:fontRef>
-        </p:style>
-        <p:txBody>
-          <a:bodyPr rtlCol="0" anchor="ctr"/>
-          <a:lstStyle/>
-          <a:p>
-            <a:pPr algn="ctr"/>
-            <a:endParaRPr lang="en-US"/>
-          </a:p>
-        </p:txBody>
-      </p:sp>
+      <p:graphicFrame>
+        <p:nvGraphicFramePr>
+          <p:cNvPr id="3" name="Table 2"/>
+          <p:cNvGraphicFramePr>
+            <a:graphicFrameLocks noGrp="1"/>
+          </p:cNvGraphicFramePr>
+          <p:nvPr userDrawn="1">
+            <p:extLst>
+              <p:ext uri="{D42A27DB-BD31-4B8C-83A1-F6EECF244321}">
+                <p14:modId xmlns:p14="http://schemas.microsoft.com/office/powerpoint/2010/main" val="191684247"/>
+              </p:ext>
+            </p:extLst>
+          </p:nvPr>
+        </p:nvGraphicFramePr>
+        <p:xfrm>
+          <a:off x="272372" y="4112425"/>
+          <a:ext cx="7204956" cy="548640"/>
+        </p:xfrm>
+        <a:graphic>
+          <a:graphicData uri="http://schemas.openxmlformats.org/drawingml/2006/table">
+            <a:tbl>
+              <a:tblPr firstRow="1" bandRow="1">
+                <a:tableStyleId>{5C22544A-7EE6-4342-B048-85BDC9FD1C3A}</a:tableStyleId>
+              </a:tblPr>
+              <a:tblGrid>
+                <a:gridCol w="3602478">
+                  <a:extLst>
+                    <a:ext uri="{9D8B030D-6E8A-4147-A177-3AD203B41FA5}">
+                      <a16:colId xmlns:a16="http://schemas.microsoft.com/office/drawing/2014/main" val="2680228674"/>
+                    </a:ext>
+                  </a:extLst>
+                </a:gridCol>
+                <a:gridCol w="3602478">
+                  <a:extLst>
+                    <a:ext uri="{9D8B030D-6E8A-4147-A177-3AD203B41FA5}">
+                      <a16:colId xmlns:a16="http://schemas.microsoft.com/office/drawing/2014/main" val="532983857"/>
+                    </a:ext>
+                  </a:extLst>
+                </a:gridCol>
+              </a:tblGrid>
+              <a:tr h="273997">
+                <a:tc>
+                  <a:txBody>
+                    <a:bodyPr/>
+                    <a:lstStyle/>
+                    <a:p>
+                      <a:r>
+                        <a:rPr lang="en-US" sz="1200" smtClean="0"/>
+                        <a:t>External Owner</a:t>
+                      </a:r>
+                      <a:endParaRPr lang="en-US" sz="1200"/>
+                    </a:p>
+                  </a:txBody>
+                  <a:tcPr/>
+                </a:tc>
+                <a:tc>
+                  <a:txBody>
+                    <a:bodyPr/>
+                    <a:lstStyle/>
+                    <a:p>
+                      <a:r>
+                        <a:rPr lang="en-US" sz="1200" smtClean="0"/>
+                        <a:t>Internal Owner</a:t>
+                      </a:r>
+                      <a:endParaRPr lang="en-US" sz="1200"/>
+                    </a:p>
+                  </a:txBody>
+                  <a:tcPr/>
+                </a:tc>
+                <a:extLst>
+                  <a:ext uri="{0D108BD9-81ED-4DB2-BD59-A6C34878D82A}">
+                    <a16:rowId xmlns:a16="http://schemas.microsoft.com/office/drawing/2014/main" val="3696612356"/>
+                  </a:ext>
+                </a:extLst>
+              </a:tr>
+              <a:tr h="273997">
+                <a:tc>
+                  <a:txBody>
+                    <a:bodyPr/>
+                    <a:lstStyle/>
+                    <a:p>
+                      <a:endParaRPr lang="en-US" sz="1200"/>
+                    </a:p>
+                  </a:txBody>
+                  <a:tcPr/>
+                </a:tc>
+                <a:tc>
+                  <a:txBody>
+                    <a:bodyPr/>
+                    <a:lstStyle/>
+                    <a:p>
+                      <a:endParaRPr lang="en-US" sz="1200"/>
+                    </a:p>
+                  </a:txBody>
+                  <a:tcPr/>
+                </a:tc>
+                <a:extLst>
+                  <a:ext uri="{0D108BD9-81ED-4DB2-BD59-A6C34878D82A}">
+                    <a16:rowId xmlns:a16="http://schemas.microsoft.com/office/drawing/2014/main" val="3288675933"/>
+                  </a:ext>
+                </a:extLst>
+              </a:tr>
+            </a:tbl>
+          </a:graphicData>
+        </a:graphic>
+      </p:graphicFrame>
     </p:spTree>
     <p:extLst>
       <p:ext uri="{BB962C8B-B14F-4D97-AF65-F5344CB8AC3E}">
@@ -1247,7 +1379,55 @@
         <p:spPr>
           <a:xfrm>
             <a:off x="285075" y="1079264"/>
-            <a:ext cx="7192253" cy="2565366"/>
+            <a:ext cx="7192253" cy="2998960"/>
+          </a:xfrm>
+        </p:spPr>
+        <p:txBody>
+          <a:bodyPr/>
+          <a:lstStyle/>
+          <a:p>
+            <a:endParaRPr lang="en-US"/>
+          </a:p>
+        </p:txBody>
+      </p:sp>
+      <p:sp>
+        <p:nvSpPr>
+          <p:cNvPr id="8" name="External Owner Placeholder"/>
+          <p:cNvSpPr>
+            <a:spLocks noGrp="1"/>
+          </p:cNvSpPr>
+          <p:nvPr>
+            <p:ph type="body" sz="quarter" idx="16"/>
+          </p:nvPr>
+        </p:nvSpPr>
+        <p:spPr>
+          <a:xfrm>
+            <a:off x="285074" y="4412608"/>
+            <a:ext cx="3573563" cy="233052"/>
+          </a:xfrm>
+        </p:spPr>
+        <p:txBody>
+          <a:bodyPr/>
+          <a:lstStyle/>
+          <a:p>
+            <a:endParaRPr lang="en-US"/>
+          </a:p>
+        </p:txBody>
+      </p:sp>
+      <p:sp>
+        <p:nvSpPr>
+          <p:cNvPr id="9" name="Internal Owner Placeholder"/>
+          <p:cNvSpPr>
+            <a:spLocks noGrp="1"/>
+          </p:cNvSpPr>
+          <p:nvPr>
+            <p:ph type="body" sz="quarter" idx="17"/>
+          </p:nvPr>
+        </p:nvSpPr>
+        <p:spPr>
+          <a:xfrm>
+            <a:off x="3881201" y="4412608"/>
+            <a:ext cx="3573563" cy="233052"/>
           </a:xfrm>
         </p:spPr>
         <p:txBody>

</xml_diff>

<commit_message>
Milestone: Comment Block and improve HTML writing
</commit_message>
<xml_diff>
--- a/src/main/resources/Template.pptx
+++ b/src/main/resources/Template.pptx
@@ -462,7 +462,6 @@
               <a:rPr lang="en-US" smtClean="0"/>
               <a:t>Insert External Owner</a:t>
             </a:r>
-            <a:endParaRPr lang="en-US" smtClean="0"/>
           </a:p>
         </p:txBody>
       </p:sp>
@@ -499,7 +498,42 @@
               <a:rPr lang="en-US" smtClean="0"/>
               <a:t>Insert Internal Owner</a:t>
             </a:r>
-            <a:endParaRPr lang="en-US" smtClean="0"/>
+          </a:p>
+        </p:txBody>
+      </p:sp>
+      <p:sp>
+        <p:nvSpPr>
+          <p:cNvPr id="10" name="Text Placeholder 2"/>
+          <p:cNvSpPr>
+            <a:spLocks noGrp="1"/>
+          </p:cNvSpPr>
+          <p:nvPr>
+            <p:ph type="body" sz="quarter" idx="18" hasCustomPrompt="1"/>
+          </p:nvPr>
+        </p:nvSpPr>
+        <p:spPr>
+          <a:xfrm>
+            <a:off x="285073" y="4999510"/>
+            <a:ext cx="7169691" cy="1751486"/>
+          </a:xfrm>
+          <a:prstGeom prst="rect">
+            <a:avLst/>
+          </a:prstGeom>
+        </p:spPr>
+        <p:txBody>
+          <a:bodyPr/>
+          <a:lstStyle>
+            <a:lvl1pPr marL="0" indent="0">
+              <a:buNone/>
+              <a:defRPr sz="1200" baseline="0"/>
+            </a:lvl1pPr>
+          </a:lstStyle>
+          <a:p>
+            <a:pPr lvl="0"/>
+            <a:r>
+              <a:rPr lang="en-US" smtClean="0"/>
+              <a:t>Insert Status Update</a:t>
+            </a:r>
           </a:p>
         </p:txBody>
       </p:sp>
@@ -760,54 +794,6 @@
       </p:sp>
       <p:sp>
         <p:nvSpPr>
-          <p:cNvPr id="5" name="Rectangle 4"/>
-          <p:cNvSpPr/>
-          <p:nvPr userDrawn="1"/>
-        </p:nvSpPr>
-        <p:spPr>
-          <a:xfrm>
-            <a:off x="272372" y="4693492"/>
-            <a:ext cx="7204956" cy="2057504"/>
-          </a:xfrm>
-          <a:prstGeom prst="rect">
-            <a:avLst/>
-          </a:prstGeom>
-          <a:solidFill>
-            <a:schemeClr val="bg1">
-              <a:lumMod val="95000"/>
-            </a:schemeClr>
-          </a:solidFill>
-          <a:ln>
-            <a:noFill/>
-          </a:ln>
-        </p:spPr>
-        <p:style>
-          <a:lnRef idx="2">
-            <a:schemeClr val="accent1">
-              <a:shade val="50000"/>
-            </a:schemeClr>
-          </a:lnRef>
-          <a:fillRef idx="1">
-            <a:schemeClr val="accent1"/>
-          </a:fillRef>
-          <a:effectRef idx="0">
-            <a:schemeClr val="accent1"/>
-          </a:effectRef>
-          <a:fontRef idx="minor">
-            <a:schemeClr val="lt1"/>
-          </a:fontRef>
-        </p:style>
-        <p:txBody>
-          <a:bodyPr rtlCol="0" anchor="ctr"/>
-          <a:lstStyle/>
-          <a:p>
-            <a:pPr algn="ctr"/>
-            <a:endParaRPr lang="en-US"/>
-          </a:p>
-        </p:txBody>
-      </p:sp>
-      <p:sp>
-        <p:nvSpPr>
           <p:cNvPr id="6" name="Rectangle 5"/>
           <p:cNvSpPr/>
           <p:nvPr userDrawn="1"/>
@@ -960,6 +946,81 @@
           </a:graphicData>
         </a:graphic>
       </p:graphicFrame>
+      <p:graphicFrame>
+        <p:nvGraphicFramePr>
+          <p:cNvPr id="4" name="Table 3"/>
+          <p:cNvGraphicFramePr>
+            <a:graphicFrameLocks noGrp="1"/>
+          </p:cNvGraphicFramePr>
+          <p:nvPr userDrawn="1">
+            <p:extLst>
+              <p:ext uri="{D42A27DB-BD31-4B8C-83A1-F6EECF244321}">
+                <p14:modId xmlns:p14="http://schemas.microsoft.com/office/powerpoint/2010/main" val="1926570856"/>
+              </p:ext>
+            </p:extLst>
+          </p:nvPr>
+        </p:nvGraphicFramePr>
+        <p:xfrm>
+          <a:off x="272372" y="4693490"/>
+          <a:ext cx="7204956" cy="2057506"/>
+        </p:xfrm>
+        <a:graphic>
+          <a:graphicData uri="http://schemas.openxmlformats.org/drawingml/2006/table">
+            <a:tbl>
+              <a:tblPr firstRow="1" bandRow="1">
+                <a:tableStyleId>{5C22544A-7EE6-4342-B048-85BDC9FD1C3A}</a:tableStyleId>
+              </a:tblPr>
+              <a:tblGrid>
+                <a:gridCol w="7204956">
+                  <a:extLst>
+                    <a:ext uri="{9D8B030D-6E8A-4147-A177-3AD203B41FA5}">
+                      <a16:colId xmlns:a16="http://schemas.microsoft.com/office/drawing/2014/main" val="1920437649"/>
+                    </a:ext>
+                  </a:extLst>
+                </a:gridCol>
+              </a:tblGrid>
+              <a:tr h="322806">
+                <a:tc>
+                  <a:txBody>
+                    <a:bodyPr/>
+                    <a:lstStyle/>
+                    <a:p>
+                      <a:r>
+                        <a:rPr lang="en-US" sz="1200" smtClean="0"/>
+                        <a:t>Status Update and Issues/Risks</a:t>
+                      </a:r>
+                      <a:endParaRPr lang="en-US" sz="1200"/>
+                    </a:p>
+                  </a:txBody>
+                  <a:tcPr/>
+                </a:tc>
+                <a:extLst>
+                  <a:ext uri="{0D108BD9-81ED-4DB2-BD59-A6C34878D82A}">
+                    <a16:rowId xmlns:a16="http://schemas.microsoft.com/office/drawing/2014/main" val="3728663817"/>
+                  </a:ext>
+                </a:extLst>
+              </a:tr>
+              <a:tr h="1734700">
+                <a:tc>
+                  <a:txBody>
+                    <a:bodyPr/>
+                    <a:lstStyle/>
+                    <a:p>
+                      <a:endParaRPr lang="en-US" sz="1200"/>
+                    </a:p>
+                  </a:txBody>
+                  <a:tcPr/>
+                </a:tc>
+                <a:extLst>
+                  <a:ext uri="{0D108BD9-81ED-4DB2-BD59-A6C34878D82A}">
+                    <a16:rowId xmlns:a16="http://schemas.microsoft.com/office/drawing/2014/main" val="3913924507"/>
+                  </a:ext>
+                </a:extLst>
+              </a:tr>
+            </a:tbl>
+          </a:graphicData>
+        </a:graphic>
+      </p:graphicFrame>
     </p:spTree>
     <p:extLst>
       <p:ext uri="{BB962C8B-B14F-4D97-AF65-F5344CB8AC3E}">
@@ -1428,6 +1489,30 @@
           <a:xfrm>
             <a:off x="3881201" y="4412608"/>
             <a:ext cx="3573563" cy="233052"/>
+          </a:xfrm>
+        </p:spPr>
+        <p:txBody>
+          <a:bodyPr/>
+          <a:lstStyle/>
+          <a:p>
+            <a:endParaRPr lang="en-US"/>
+          </a:p>
+        </p:txBody>
+      </p:sp>
+      <p:sp>
+        <p:nvSpPr>
+          <p:cNvPr id="10" name="Status Update Placeholder"/>
+          <p:cNvSpPr>
+            <a:spLocks noGrp="1"/>
+          </p:cNvSpPr>
+          <p:nvPr>
+            <p:ph type="body" sz="quarter" idx="18"/>
+          </p:nvPr>
+        </p:nvSpPr>
+        <p:spPr>
+          <a:xfrm>
+            <a:off x="285073" y="4999510"/>
+            <a:ext cx="7169691" cy="1751486"/>
           </a:xfrm>
         </p:spPr>
         <p:txBody>

</xml_diff>

<commit_message>
Save first part of milestones table
</commit_message>
<xml_diff>
--- a/src/main/resources/Template.pptx
+++ b/src/main/resources/Template.pptx
@@ -534,6 +534,37 @@
               <a:rPr lang="en-US" smtClean="0"/>
               <a:t>Insert Status Update</a:t>
             </a:r>
+          </a:p>
+        </p:txBody>
+      </p:sp>
+      <p:sp>
+        <p:nvSpPr>
+          <p:cNvPr id="4" name="Table Placeholder 3"/>
+          <p:cNvSpPr>
+            <a:spLocks noGrp="1"/>
+          </p:cNvSpPr>
+          <p:nvPr>
+            <p:ph type="tbl" sz="quarter" idx="19"/>
+          </p:nvPr>
+        </p:nvSpPr>
+        <p:spPr>
+          <a:xfrm>
+            <a:off x="7505700" y="1079500"/>
+            <a:ext cx="4406900" cy="5672138"/>
+          </a:xfrm>
+          <a:prstGeom prst="rect">
+            <a:avLst/>
+          </a:prstGeom>
+        </p:spPr>
+        <p:txBody>
+          <a:bodyPr/>
+          <a:lstStyle>
+            <a:lvl1pPr>
+              <a:defRPr sz="1200"/>
+            </a:lvl1pPr>
+          </a:lstStyle>
+          <a:p>
+            <a:endParaRPr lang="en-US"/>
           </a:p>
         </p:txBody>
       </p:sp>
@@ -1523,6 +1554,113 @@
           </a:p>
         </p:txBody>
       </p:sp>
+      <p:graphicFrame>
+        <p:nvGraphicFramePr>
+          <p:cNvPr id="18" name="Milestones Placeholder"/>
+          <p:cNvGraphicFramePr>
+            <a:graphicFrameLocks noGrp="1"/>
+          </p:cNvGraphicFramePr>
+          <p:nvPr>
+            <p:ph type="tbl" sz="quarter" idx="19"/>
+            <p:extLst>
+              <p:ext uri="{D42A27DB-BD31-4B8C-83A1-F6EECF244321}">
+                <p14:modId xmlns:p14="http://schemas.microsoft.com/office/powerpoint/2010/main" val="2991602180"/>
+              </p:ext>
+            </p:extLst>
+          </p:nvPr>
+        </p:nvGraphicFramePr>
+        <p:xfrm>
+          <a:off x="7505700" y="1079500"/>
+          <a:ext cx="4406900" cy="618672"/>
+        </p:xfrm>
+        <a:graphic>
+          <a:graphicData uri="http://schemas.openxmlformats.org/drawingml/2006/table">
+            <a:tbl>
+              <a:tblPr firstRow="1" bandRow="1">
+                <a:tableStyleId>{5C22544A-7EE6-4342-B048-85BDC9FD1C3A}</a:tableStyleId>
+              </a:tblPr>
+              <a:tblGrid>
+                <a:gridCol w="2203450">
+                  <a:extLst>
+                    <a:ext uri="{9D8B030D-6E8A-4147-A177-3AD203B41FA5}">
+                      <a16:colId xmlns:a16="http://schemas.microsoft.com/office/drawing/2014/main" val="187971460"/>
+                    </a:ext>
+                  </a:extLst>
+                </a:gridCol>
+                <a:gridCol w="2203450">
+                  <a:extLst>
+                    <a:ext uri="{9D8B030D-6E8A-4147-A177-3AD203B41FA5}">
+                      <a16:colId xmlns:a16="http://schemas.microsoft.com/office/drawing/2014/main" val="4294546326"/>
+                    </a:ext>
+                  </a:extLst>
+                </a:gridCol>
+              </a:tblGrid>
+              <a:tr h="309336">
+                <a:tc gridSpan="2">
+                  <a:txBody>
+                    <a:bodyPr/>
+                    <a:lstStyle/>
+                    <a:p>
+                      <a:r>
+                        <a:rPr lang="en-US" sz="1400" smtClean="0"/>
+                        <a:t>Timeline /</a:t>
+                      </a:r>
+                      <a:r>
+                        <a:rPr lang="en-US" sz="1400" baseline="0" smtClean="0"/>
+                        <a:t> Milestones</a:t>
+                      </a:r>
+                      <a:endParaRPr lang="en-US" sz="1400"/>
+                    </a:p>
+                  </a:txBody>
+                  <a:tcPr/>
+                </a:tc>
+                <a:tc hMerge="1">
+                  <a:txBody>
+                    <a:bodyPr/>
+                    <a:lstStyle/>
+                    <a:p>
+                      <a:endParaRPr lang="en-US"/>
+                    </a:p>
+                  </a:txBody>
+                  <a:tcPr/>
+                </a:tc>
+                <a:extLst>
+                  <a:ext uri="{0D108BD9-81ED-4DB2-BD59-A6C34878D82A}">
+                    <a16:rowId xmlns:a16="http://schemas.microsoft.com/office/drawing/2014/main" val="3121850774"/>
+                  </a:ext>
+                </a:extLst>
+              </a:tr>
+              <a:tr h="309336">
+                <a:tc>
+                  <a:txBody>
+                    <a:bodyPr/>
+                    <a:lstStyle/>
+                    <a:p>
+                      <a:endParaRPr lang="en-US" sz="1400"/>
+                    </a:p>
+                  </a:txBody>
+                  <a:tcPr/>
+                </a:tc>
+                <a:tc>
+                  <a:txBody>
+                    <a:bodyPr/>
+                    <a:lstStyle/>
+                    <a:p>
+                      <a:endParaRPr lang="en-US" sz="1400"/>
+                    </a:p>
+                  </a:txBody>
+                  <a:tcPr/>
+                </a:tc>
+                <a:extLst>
+                  <a:ext uri="{0D108BD9-81ED-4DB2-BD59-A6C34878D82A}">
+                    <a16:rowId xmlns:a16="http://schemas.microsoft.com/office/drawing/2014/main" val="3613208614"/>
+                  </a:ext>
+                </a:extLst>
+              </a:tr>
+            </a:tbl>
+          </a:graphicData>
+        </a:graphic>
+      </p:graphicFrame>
     </p:spTree>
     <p:extLst>
       <p:ext uri="{BB962C8B-B14F-4D97-AF65-F5344CB8AC3E}">

</xml_diff>

<commit_message>
Migrated PXT Summary to the new PPTX Template
</commit_message>
<xml_diff>
--- a/src/main/resources/Template.pptx
+++ b/src/main/resources/Template.pptx
@@ -3767,7 +3767,316 @@
       </p:grpSpPr>
       <p:graphicFrame>
         <p:nvGraphicFramePr>
-          <p:cNvPr id="6" name="Right Table">
+          <p:cNvPr id="2" name="Right Table">
+            <a:extLst>
+              <a:ext uri="{FF2B5EF4-FFF2-40B4-BE49-F238E27FC236}">
+                <a16:creationId xmlns:a16="http://schemas.microsoft.com/office/drawing/2014/main" id="{69440B3B-5C3D-6C45-8742-50E0812E415A}"/>
+              </a:ext>
+            </a:extLst>
+          </p:cNvPr>
+          <p:cNvGraphicFramePr>
+            <a:graphicFrameLocks noGrp="1"/>
+          </p:cNvGraphicFramePr>
+          <p:nvPr>
+            <p:extLst>
+              <p:ext uri="{D42A27DB-BD31-4B8C-83A1-F6EECF244321}">
+                <p14:modId xmlns:p14="http://schemas.microsoft.com/office/powerpoint/2010/main" val="1146539260"/>
+              </p:ext>
+            </p:extLst>
+          </p:nvPr>
+        </p:nvGraphicFramePr>
+        <p:xfrm>
+          <a:off x="6939915" y="956637"/>
+          <a:ext cx="5147310" cy="560245"/>
+        </p:xfrm>
+        <a:graphic>
+          <a:graphicData uri="http://schemas.openxmlformats.org/drawingml/2006/table">
+            <a:tbl>
+              <a:tblPr/>
+              <a:tblGrid>
+                <a:gridCol w="925492">
+                  <a:extLst>
+                    <a:ext uri="{9D8B030D-6E8A-4147-A177-3AD203B41FA5}">
+                      <a16:colId xmlns:a16="http://schemas.microsoft.com/office/drawing/2014/main" val="731854768"/>
+                    </a:ext>
+                  </a:extLst>
+                </a:gridCol>
+                <a:gridCol w="4221818">
+                  <a:extLst>
+                    <a:ext uri="{9D8B030D-6E8A-4147-A177-3AD203B41FA5}">
+                      <a16:colId xmlns:a16="http://schemas.microsoft.com/office/drawing/2014/main" val="134440545"/>
+                    </a:ext>
+                  </a:extLst>
+                </a:gridCol>
+              </a:tblGrid>
+              <a:tr h="234895">
+                <a:tc gridSpan="2">
+                  <a:txBody>
+                    <a:bodyPr/>
+                    <a:lstStyle/>
+                    <a:p>
+                      <a:pPr marL="0" algn="l" defTabSz="606541" rtl="0" eaLnBrk="1" fontAlgn="b" latinLnBrk="0" hangingPunct="1"/>
+                      <a:r>
+                        <a:rPr lang="en-US" sz="1200" b="1" u="none" strike="noStrike" kern="1200" dirty="0">
+                          <a:solidFill>
+                            <a:schemeClr val="bg1"/>
+                          </a:solidFill>
+                          <a:effectLst/>
+                          <a:latin typeface="+mn-lt"/>
+                          <a:ea typeface="+mn-ea"/>
+                          <a:cs typeface="+mn-cs"/>
+                        </a:rPr>
+                        <a:t> Timeline /Milestones</a:t>
+                      </a:r>
+                    </a:p>
+                  </a:txBody>
+                  <a:tcPr marL="6717" marR="6717" marT="6717" marB="0" anchor="ctr">
+                    <a:lnL w="19050" cap="flat" cmpd="sng" algn="ctr">
+                      <a:solidFill>
+                        <a:srgbClr val="002060"/>
+                      </a:solidFill>
+                      <a:prstDash val="solid"/>
+                      <a:round/>
+                      <a:headEnd type="none" w="med" len="med"/>
+                      <a:tailEnd type="none" w="med" len="med"/>
+                    </a:lnL>
+                    <a:lnR w="19050" cap="flat" cmpd="sng" algn="ctr">
+                      <a:solidFill>
+                        <a:srgbClr val="002060"/>
+                      </a:solidFill>
+                      <a:prstDash val="solid"/>
+                      <a:round/>
+                      <a:headEnd type="none" w="med" len="med"/>
+                      <a:tailEnd type="none" w="med" len="med"/>
+                    </a:lnR>
+                    <a:lnT w="19050" cap="flat" cmpd="sng" algn="ctr">
+                      <a:solidFill>
+                        <a:srgbClr val="002060"/>
+                      </a:solidFill>
+                      <a:prstDash val="solid"/>
+                      <a:round/>
+                      <a:headEnd type="none" w="med" len="med"/>
+                      <a:tailEnd type="none" w="med" len="med"/>
+                    </a:lnT>
+                    <a:lnB w="19050" cap="flat" cmpd="sng" algn="ctr">
+                      <a:solidFill>
+                        <a:srgbClr val="002060"/>
+                      </a:solidFill>
+                      <a:prstDash val="solid"/>
+                      <a:round/>
+                      <a:headEnd type="none" w="med" len="med"/>
+                      <a:tailEnd type="none" w="med" len="med"/>
+                    </a:lnB>
+                    <a:solidFill>
+                      <a:srgbClr val="3B5989"/>
+                    </a:solidFill>
+                  </a:tcPr>
+                </a:tc>
+                <a:tc hMerge="1">
+                  <a:txBody>
+                    <a:bodyPr/>
+                    <a:lstStyle/>
+                    <a:p>
+                      <a:pPr algn="l" fontAlgn="t"/>
+                      <a:endParaRPr lang="en-US" sz="900" b="0" i="0" u="none" strike="noStrike">
+                        <a:solidFill>
+                          <a:srgbClr val="000000"/>
+                        </a:solidFill>
+                        <a:effectLst/>
+                        <a:latin typeface="Arial" panose="020B0604020202020204" pitchFamily="34" charset="0"/>
+                      </a:endParaRPr>
+                    </a:p>
+                  </a:txBody>
+                  <a:tcPr marL="6717" marR="6717" marT="6717" marB="0">
+                    <a:lnL w="6350" cap="flat" cmpd="sng" algn="ctr">
+                      <a:solidFill>
+                        <a:srgbClr val="000000"/>
+                      </a:solidFill>
+                      <a:prstDash val="solid"/>
+                      <a:round/>
+                      <a:headEnd type="none" w="med" len="med"/>
+                      <a:tailEnd type="none" w="med" len="med"/>
+                    </a:lnL>
+                    <a:lnR w="6350" cap="flat" cmpd="sng" algn="ctr">
+                      <a:solidFill>
+                        <a:srgbClr val="000000"/>
+                      </a:solidFill>
+                      <a:prstDash val="solid"/>
+                      <a:round/>
+                      <a:headEnd type="none" w="med" len="med"/>
+                      <a:tailEnd type="none" w="med" len="med"/>
+                    </a:lnR>
+                    <a:lnT w="6350" cap="flat" cmpd="sng" algn="ctr">
+                      <a:solidFill>
+                        <a:srgbClr val="000000"/>
+                      </a:solidFill>
+                      <a:prstDash val="solid"/>
+                      <a:round/>
+                      <a:headEnd type="none" w="med" len="med"/>
+                      <a:tailEnd type="none" w="med" len="med"/>
+                    </a:lnT>
+                    <a:lnB w="6350" cap="flat" cmpd="sng" algn="ctr">
+                      <a:solidFill>
+                        <a:srgbClr val="000000"/>
+                      </a:solidFill>
+                      <a:prstDash val="solid"/>
+                      <a:round/>
+                      <a:headEnd type="none" w="med" len="med"/>
+                      <a:tailEnd type="none" w="med" len="med"/>
+                    </a:lnB>
+                    <a:solidFill>
+                      <a:schemeClr val="bg1">
+                        <a:lumMod val="75000"/>
+                      </a:schemeClr>
+                    </a:solidFill>
+                  </a:tcPr>
+                </a:tc>
+                <a:extLst>
+                  <a:ext uri="{0D108BD9-81ED-4DB2-BD59-A6C34878D82A}">
+                    <a16:rowId xmlns:a16="http://schemas.microsoft.com/office/drawing/2014/main" val="1787595644"/>
+                  </a:ext>
+                </a:extLst>
+              </a:tr>
+              <a:tr h="325350">
+                <a:tc>
+                  <a:txBody>
+                    <a:bodyPr/>
+                    <a:lstStyle/>
+                    <a:p>
+                      <a:pPr algn="ctr" fontAlgn="t"/>
+                      <a:r>
+                        <a:rPr lang="en-US" sz="1200" b="0" i="0" u="none" strike="noStrike" dirty="0">
+                          <a:solidFill>
+                            <a:srgbClr val="002060"/>
+                          </a:solidFill>
+                          <a:effectLst/>
+                          <a:latin typeface="Intel Clear" panose="020B0604020203020204" pitchFamily="34" charset="0"/>
+                          <a:ea typeface="Intel Clear" panose="020B0604020203020204" pitchFamily="34" charset="0"/>
+                          <a:cs typeface="Intel Clear" panose="020B0604020203020204" pitchFamily="34" charset="0"/>
+                        </a:rPr>
+                        <a:t>WW27 ’20</a:t>
+                      </a:r>
+                    </a:p>
+                  </a:txBody>
+                  <a:tcPr marL="45720" marR="45720" marT="27432" marB="27432" anchor="ctr">
+                    <a:lnL w="19050" cap="flat" cmpd="sng" algn="ctr">
+                      <a:solidFill>
+                        <a:srgbClr val="002060"/>
+                      </a:solidFill>
+                      <a:prstDash val="solid"/>
+                      <a:round/>
+                      <a:headEnd type="none" w="med" len="med"/>
+                      <a:tailEnd type="none" w="med" len="med"/>
+                    </a:lnL>
+                    <a:lnR w="19050" cap="flat" cmpd="sng" algn="ctr">
+                      <a:solidFill>
+                        <a:srgbClr val="002060"/>
+                      </a:solidFill>
+                      <a:prstDash val="solid"/>
+                      <a:round/>
+                      <a:headEnd type="none" w="med" len="med"/>
+                      <a:tailEnd type="none" w="med" len="med"/>
+                    </a:lnR>
+                    <a:lnT w="19050" cap="flat" cmpd="sng" algn="ctr">
+                      <a:solidFill>
+                        <a:srgbClr val="002060"/>
+                      </a:solidFill>
+                      <a:prstDash val="solid"/>
+                      <a:round/>
+                      <a:headEnd type="none" w="med" len="med"/>
+                      <a:tailEnd type="none" w="med" len="med"/>
+                    </a:lnT>
+                    <a:lnB w="19050" cap="flat" cmpd="sng" algn="ctr">
+                      <a:solidFill>
+                        <a:srgbClr val="002060"/>
+                      </a:solidFill>
+                      <a:prstDash val="solid"/>
+                      <a:round/>
+                      <a:headEnd type="none" w="med" len="med"/>
+                      <a:tailEnd type="none" w="med" len="med"/>
+                    </a:lnB>
+                    <a:solidFill>
+                      <a:srgbClr val="00C800"/>
+                    </a:solidFill>
+                  </a:tcPr>
+                </a:tc>
+                <a:tc>
+                  <a:txBody>
+                    <a:bodyPr/>
+                    <a:lstStyle/>
+                    <a:p>
+                      <a:pPr algn="l" fontAlgn="t"/>
+                      <a:r>
+                        <a:rPr lang="en-US" sz="1200" b="0" i="0" u="none" strike="noStrike" dirty="0">
+                          <a:solidFill>
+                            <a:srgbClr val="002060"/>
+                          </a:solidFill>
+                          <a:effectLst/>
+                          <a:latin typeface="Intel Clear" panose="020B0604020203020204" pitchFamily="34" charset="0"/>
+                          <a:ea typeface="Intel Clear" panose="020B0604020203020204" pitchFamily="34" charset="0"/>
+                          <a:cs typeface="Intel Clear" panose="020B0604020203020204" pitchFamily="34" charset="0"/>
+                        </a:rPr>
+                        <a:t>Eng. Workstream Kick-Off</a:t>
+                      </a:r>
+                    </a:p>
+                  </a:txBody>
+                  <a:tcPr marL="45720" marR="45720" marT="27432" marB="27432" anchor="ctr">
+                    <a:lnL w="19050" cap="flat" cmpd="sng" algn="ctr">
+                      <a:solidFill>
+                        <a:srgbClr val="002060"/>
+                      </a:solidFill>
+                      <a:prstDash val="solid"/>
+                      <a:round/>
+                      <a:headEnd type="none" w="med" len="med"/>
+                      <a:tailEnd type="none" w="med" len="med"/>
+                    </a:lnL>
+                    <a:lnR w="19050" cap="flat" cmpd="sng" algn="ctr">
+                      <a:solidFill>
+                        <a:srgbClr val="002060"/>
+                      </a:solidFill>
+                      <a:prstDash val="solid"/>
+                      <a:round/>
+                      <a:headEnd type="none" w="med" len="med"/>
+                      <a:tailEnd type="none" w="med" len="med"/>
+                    </a:lnR>
+                    <a:lnT w="19050" cap="flat" cmpd="sng" algn="ctr">
+                      <a:solidFill>
+                        <a:srgbClr val="002060"/>
+                      </a:solidFill>
+                      <a:prstDash val="solid"/>
+                      <a:round/>
+                      <a:headEnd type="none" w="med" len="med"/>
+                      <a:tailEnd type="none" w="med" len="med"/>
+                    </a:lnT>
+                    <a:lnB w="19050" cap="flat" cmpd="sng" algn="ctr">
+                      <a:solidFill>
+                        <a:srgbClr val="002060"/>
+                      </a:solidFill>
+                      <a:prstDash val="solid"/>
+                      <a:round/>
+                      <a:headEnd type="none" w="med" len="med"/>
+                      <a:tailEnd type="none" w="med" len="med"/>
+                    </a:lnB>
+                    <a:solidFill>
+                      <a:schemeClr val="bg1">
+                        <a:lumMod val="75000"/>
+                      </a:schemeClr>
+                    </a:solidFill>
+                  </a:tcPr>
+                </a:tc>
+                <a:extLst>
+                  <a:ext uri="{0D108BD9-81ED-4DB2-BD59-A6C34878D82A}">
+                    <a16:rowId xmlns:a16="http://schemas.microsoft.com/office/drawing/2014/main" val="3712375731"/>
+                  </a:ext>
+                </a:extLst>
+              </a:tr>
+            </a:tbl>
+          </a:graphicData>
+        </a:graphic>
+      </p:graphicFrame>
+      <p:graphicFrame>
+        <p:nvGraphicFramePr>
+          <p:cNvPr id="6" name="Left Table">
             <a:extLst>
               <a:ext uri="{FF2B5EF4-FFF2-40B4-BE49-F238E27FC236}">
                 <a16:creationId xmlns:a16="http://schemas.microsoft.com/office/drawing/2014/main" id="{0CCEF8A4-99D3-E646-A9EF-77BD3BD16D39}"/>
@@ -3780,7 +4089,7 @@
           <p:nvPr>
             <p:extLst>
               <p:ext uri="{D42A27DB-BD31-4B8C-83A1-F6EECF244321}">
-                <p14:modId xmlns:p14="http://schemas.microsoft.com/office/powerpoint/2010/main" val="1353169887"/>
+                <p14:modId xmlns:p14="http://schemas.microsoft.com/office/powerpoint/2010/main" val="1985514071"/>
               </p:ext>
             </p:extLst>
           </p:nvPr>
@@ -3887,7 +4196,7 @@
                         <a:defRPr/>
                       </a:pPr>
                       <a:r>
-                        <a:rPr lang="en-US" sz="1100" u="none" strike="noStrike" kern="1200" dirty="0">
+                        <a:rPr lang="en-US" sz="1100" u="none" strike="noStrike" kern="1200" smtClean="0">
                           <a:solidFill>
                             <a:srgbClr val="002060"/>
                           </a:solidFill>
@@ -3896,166 +4205,7 @@
                           <a:ea typeface="+mn-ea"/>
                           <a:cs typeface="+mn-cs"/>
                         </a:rPr>
-                        <a:t>Lorem </a:t>
-                      </a:r>
-                      <a:r>
-                        <a:rPr lang="en-US" sz="1100" u="none" strike="noStrike" kern="1200" dirty="0" err="1">
-                          <a:solidFill>
-                            <a:srgbClr val="002060"/>
-                          </a:solidFill>
-                          <a:effectLst/>
-                          <a:latin typeface="+mn-lt"/>
-                          <a:ea typeface="+mn-ea"/>
-                          <a:cs typeface="+mn-cs"/>
-                        </a:rPr>
-                        <a:t>Opsum</a:t>
-                      </a:r>
-                      <a:endParaRPr lang="en-US" sz="1100" u="none" strike="noStrike" kern="1200" dirty="0">
-                        <a:solidFill>
-                          <a:srgbClr val="002060"/>
-                        </a:solidFill>
-                        <a:effectLst/>
-                        <a:latin typeface="+mn-lt"/>
-                        <a:ea typeface="+mn-ea"/>
-                        <a:cs typeface="+mn-cs"/>
-                      </a:endParaRPr>
-                    </a:p>
-                    <a:p>
-                      <a:pPr marL="171450" marR="0" lvl="0" indent="-171450" algn="l" defTabSz="606541" rtl="0" eaLnBrk="1" fontAlgn="b" latinLnBrk="0" hangingPunct="1">
-                        <a:lnSpc>
-                          <a:spcPct val="100000"/>
-                        </a:lnSpc>
-                        <a:spcBef>
-                          <a:spcPts val="0"/>
-                        </a:spcBef>
-                        <a:spcAft>
-                          <a:spcPts val="0"/>
-                        </a:spcAft>
-                        <a:buClrTx/>
-                        <a:buSzTx/>
-                        <a:buFont typeface="Wingdings" panose="05000000000000000000" pitchFamily="2" charset="2"/>
-                        <a:buChar char="§"/>
-                        <a:tabLst/>
-                        <a:defRPr/>
-                      </a:pPr>
-                      <a:r>
-                        <a:rPr lang="en-US" sz="1100" u="none" strike="noStrike" kern="1200" dirty="0" err="1">
-                          <a:solidFill>
-                            <a:srgbClr val="002060"/>
-                          </a:solidFill>
-                          <a:effectLst/>
-                          <a:latin typeface="+mn-lt"/>
-                          <a:ea typeface="+mn-ea"/>
-                          <a:cs typeface="+mn-cs"/>
-                        </a:rPr>
-                        <a:t>Loewaum</a:t>
-                      </a:r>
-                      <a:r>
-                        <a:rPr lang="en-US" sz="1100" u="none" strike="noStrike" kern="1200" dirty="0">
-                          <a:solidFill>
-                            <a:srgbClr val="002060"/>
-                          </a:solidFill>
-                          <a:effectLst/>
-                          <a:latin typeface="+mn-lt"/>
-                          <a:ea typeface="+mn-ea"/>
-                          <a:cs typeface="+mn-cs"/>
-                        </a:rPr>
-                        <a:t> </a:t>
-                      </a:r>
-                    </a:p>
-                    <a:p>
-                      <a:pPr marL="781035" marR="0" lvl="1" indent="-171450" algn="l" defTabSz="606541" rtl="0" eaLnBrk="1" fontAlgn="b" latinLnBrk="0" hangingPunct="1">
-                        <a:lnSpc>
-                          <a:spcPct val="100000"/>
-                        </a:lnSpc>
-                        <a:spcBef>
-                          <a:spcPts val="0"/>
-                        </a:spcBef>
-                        <a:spcAft>
-                          <a:spcPts val="0"/>
-                        </a:spcAft>
-                        <a:buClrTx/>
-                        <a:buSzTx/>
-                        <a:buFont typeface="Wingdings" panose="05000000000000000000" pitchFamily="2" charset="2"/>
-                        <a:buChar char="§"/>
-                        <a:tabLst/>
-                        <a:defRPr/>
-                      </a:pPr>
-                      <a:r>
-                        <a:rPr lang="en-US" sz="1100" u="none" strike="noStrike" kern="1200" dirty="0">
-                          <a:solidFill>
-                            <a:srgbClr val="002060"/>
-                          </a:solidFill>
-                          <a:effectLst/>
-                          <a:latin typeface="+mn-lt"/>
-                          <a:ea typeface="+mn-ea"/>
-                          <a:cs typeface="+mn-cs"/>
-                        </a:rPr>
-                        <a:t>Workstream A: </a:t>
-                      </a:r>
-                      <a:r>
-                        <a:rPr lang="en-US" sz="1100" u="none" strike="noStrike" kern="1200" dirty="0" err="1">
-                          <a:solidFill>
-                            <a:srgbClr val="002060"/>
-                          </a:solidFill>
-                          <a:effectLst/>
-                          <a:latin typeface="+mn-lt"/>
-                          <a:ea typeface="+mn-ea"/>
-                          <a:cs typeface="+mn-cs"/>
-                        </a:rPr>
-                        <a:t>abcd</a:t>
-                      </a:r>
-                      <a:endParaRPr lang="en-US" sz="1100" u="none" strike="noStrike" kern="1200" dirty="0">
-                        <a:solidFill>
-                          <a:srgbClr val="002060"/>
-                        </a:solidFill>
-                        <a:effectLst/>
-                        <a:latin typeface="+mn-lt"/>
-                        <a:ea typeface="+mn-ea"/>
-                        <a:cs typeface="+mn-cs"/>
-                      </a:endParaRPr>
-                    </a:p>
-                    <a:p>
-                      <a:pPr marL="781035" marR="0" lvl="1" indent="-171450" algn="l" defTabSz="606541" rtl="0" eaLnBrk="1" fontAlgn="b" latinLnBrk="0" hangingPunct="1">
-                        <a:lnSpc>
-                          <a:spcPct val="100000"/>
-                        </a:lnSpc>
-                        <a:spcBef>
-                          <a:spcPts val="0"/>
-                        </a:spcBef>
-                        <a:spcAft>
-                          <a:spcPts val="0"/>
-                        </a:spcAft>
-                        <a:buClrTx/>
-                        <a:buSzTx/>
-                        <a:buFont typeface="Wingdings" panose="05000000000000000000" pitchFamily="2" charset="2"/>
-                        <a:buChar char="§"/>
-                        <a:tabLst/>
-                        <a:defRPr/>
-                      </a:pPr>
-                      <a:r>
-                        <a:rPr lang="en-US" sz="1100" u="none" strike="noStrike" kern="1200" dirty="0">
-                          <a:solidFill>
-                            <a:srgbClr val="002060"/>
-                          </a:solidFill>
-                          <a:effectLst/>
-                          <a:latin typeface="+mn-lt"/>
-                          <a:ea typeface="+mn-ea"/>
-                          <a:cs typeface="+mn-cs"/>
-                        </a:rPr>
-                        <a:t>Workstream B: </a:t>
-                      </a:r>
-                      <a:r>
-                        <a:rPr lang="en-US" sz="1100" u="none" strike="noStrike" kern="1200" dirty="0" err="1">
-                          <a:solidFill>
-                            <a:srgbClr val="002060"/>
-                          </a:solidFill>
-                          <a:effectLst/>
-                          <a:latin typeface="+mn-lt"/>
-                          <a:ea typeface="+mn-ea"/>
-                          <a:cs typeface="+mn-cs"/>
-                        </a:rPr>
-                        <a:t>abcde</a:t>
+                        <a:t>At vero eos et accusamus</a:t>
                       </a:r>
                       <a:endParaRPr lang="en-US" sz="1100" u="none" strike="noStrike" kern="1200" dirty="0">
                         <a:solidFill>
@@ -4247,7 +4397,7 @@
                         <a:defRPr/>
                       </a:pPr>
                       <a:r>
-                        <a:rPr lang="en-US" sz="1100" u="none" strike="noStrike" kern="1200" dirty="0">
+                        <a:rPr lang="en-US" sz="1100" u="none" strike="noStrike" kern="1200" smtClean="0">
                           <a:solidFill>
                             <a:srgbClr val="002060"/>
                           </a:solidFill>
@@ -4256,8 +4406,17 @@
                           <a:ea typeface="+mn-ea"/>
                           <a:cs typeface="+mn-cs"/>
                         </a:rPr>
-                        <a:t>If the POC is successful, CY23</a:t>
+                        <a:t>At vero eos et accusamus</a:t>
                       </a:r>
+                      <a:endParaRPr lang="en-US" sz="1100" u="none" strike="noStrike" kern="1200" dirty="0">
+                        <a:solidFill>
+                          <a:srgbClr val="002060"/>
+                        </a:solidFill>
+                        <a:effectLst/>
+                        <a:latin typeface="+mn-lt"/>
+                        <a:ea typeface="+mn-ea"/>
+                        <a:cs typeface="+mn-cs"/>
+                      </a:endParaRPr>
                     </a:p>
                   </a:txBody>
                   <a:tcPr marL="45720" marR="45720" marT="27432" marB="27432">
@@ -4432,7 +4591,7 @@
                         <a:defRPr/>
                       </a:pPr>
                       <a:r>
-                        <a:rPr lang="en-US" sz="1100" u="none" strike="noStrike" kern="1200" dirty="0">
+                        <a:rPr lang="en-US" sz="1100" u="none" strike="noStrike" kern="1200" smtClean="0">
                           <a:solidFill>
                             <a:srgbClr val="002060"/>
                           </a:solidFill>
@@ -4441,70 +4600,17 @@
                           <a:ea typeface="+mn-ea"/>
                           <a:cs typeface="+mn-cs"/>
                         </a:rPr>
-                        <a:t>Workstream A &amp; B: Demonstrate the 1M, 1.4u</a:t>
+                        <a:t>At vero eos et accusamus</a:t>
                       </a:r>
-                    </a:p>
-                    <a:p>
-                      <a:pPr marL="171450" marR="0" lvl="0" indent="-171450" algn="l" defTabSz="606541" rtl="0" eaLnBrk="1" fontAlgn="b" latinLnBrk="0" hangingPunct="1">
-                        <a:lnSpc>
-                          <a:spcPct val="100000"/>
-                        </a:lnSpc>
-                        <a:spcBef>
-                          <a:spcPts val="0"/>
-                        </a:spcBef>
-                        <a:spcAft>
-                          <a:spcPts val="0"/>
-                        </a:spcAft>
-                        <a:buClrTx/>
-                        <a:buSzTx/>
-                        <a:buFont typeface="Wingdings" panose="05000000000000000000" pitchFamily="2" charset="2"/>
-                        <a:buChar char="§"/>
-                        <a:tabLst/>
-                        <a:defRPr/>
-                      </a:pPr>
-                      <a:r>
-                        <a:rPr lang="en-US" sz="1100" u="none" strike="noStrike" kern="1200" dirty="0">
-                          <a:solidFill>
-                            <a:srgbClr val="002060"/>
-                          </a:solidFill>
-                          <a:effectLst/>
-                          <a:latin typeface="+mn-lt"/>
-                          <a:ea typeface="+mn-ea"/>
-                          <a:cs typeface="+mn-cs"/>
-                        </a:rPr>
-                        <a:t>Short term POC demo</a:t>
-                      </a:r>
-                    </a:p>
-                    <a:p>
-                      <a:pPr marL="171450" marR="0" lvl="0" indent="-171450" algn="l" defTabSz="606541" rtl="0" eaLnBrk="1" fontAlgn="b" latinLnBrk="0" hangingPunct="1">
-                        <a:lnSpc>
-                          <a:spcPct val="100000"/>
-                        </a:lnSpc>
-                        <a:spcBef>
-                          <a:spcPts val="0"/>
-                        </a:spcBef>
-                        <a:spcAft>
-                          <a:spcPts val="0"/>
-                        </a:spcAft>
-                        <a:buClrTx/>
-                        <a:buSzTx/>
-                        <a:buFont typeface="Wingdings" panose="05000000000000000000" pitchFamily="2" charset="2"/>
-                        <a:buChar char="§"/>
-                        <a:tabLst/>
-                        <a:defRPr/>
-                      </a:pPr>
-                      <a:r>
-                        <a:rPr lang="en-US" sz="1100" u="none" strike="noStrike" kern="1200" dirty="0">
-                          <a:solidFill>
-                            <a:srgbClr val="002060"/>
-                          </a:solidFill>
-                          <a:effectLst/>
-                          <a:latin typeface="+mn-lt"/>
-                          <a:ea typeface="+mn-ea"/>
-                          <a:cs typeface="+mn-cs"/>
-                        </a:rPr>
-                        <a:t>Demo on 14” POLED or 11” micro LED display as a POC purpose</a:t>
-                      </a:r>
+                      <a:endParaRPr lang="en-US" sz="1100" u="none" strike="noStrike" kern="1200" dirty="0">
+                        <a:solidFill>
+                          <a:srgbClr val="002060"/>
+                        </a:solidFill>
+                        <a:effectLst/>
+                        <a:latin typeface="+mn-lt"/>
+                        <a:ea typeface="+mn-ea"/>
+                        <a:cs typeface="+mn-cs"/>
+                      </a:endParaRPr>
                     </a:p>
                   </a:txBody>
                   <a:tcPr marL="45720" marR="45720" marT="27432" marB="27432">
@@ -4657,7 +4763,7 @@
                         <a:buChar char="§"/>
                       </a:pPr>
                       <a:r>
-                        <a:rPr lang="en-US" sz="1100" u="none" strike="noStrike" kern="1200" dirty="0">
+                        <a:rPr lang="en-US" sz="1100" u="none" strike="noStrike" kern="1200" smtClean="0">
                           <a:solidFill>
                             <a:srgbClr val="002060"/>
                           </a:solidFill>
@@ -4666,19 +4772,7 @@
                           <a:ea typeface="+mn-ea"/>
                           <a:cs typeface="+mn-cs"/>
                         </a:rPr>
-                        <a:t>Lorem </a:t>
-                      </a:r>
-                      <a:r>
-                        <a:rPr lang="en-US" sz="1100" u="none" strike="noStrike" kern="1200" dirty="0" err="1">
-                          <a:solidFill>
-                            <a:srgbClr val="002060"/>
-                          </a:solidFill>
-                          <a:effectLst/>
-                          <a:latin typeface="+mn-lt"/>
-                          <a:ea typeface="+mn-ea"/>
-                          <a:cs typeface="+mn-cs"/>
-                        </a:rPr>
-                        <a:t>iPsum</a:t>
+                        <a:t>At vero eos et accusamus</a:t>
                       </a:r>
                       <a:endParaRPr lang="en-US" sz="1100" u="none" strike="noStrike" kern="1200" dirty="0">
                         <a:solidFill>
@@ -4689,24 +4783,6 @@
                         <a:ea typeface="+mn-ea"/>
                         <a:cs typeface="+mn-cs"/>
                       </a:endParaRPr>
-                    </a:p>
-                    <a:p>
-                      <a:pPr marL="171450" indent="-171450" fontAlgn="b">
-                        <a:buFont typeface="Wingdings" panose="05000000000000000000" pitchFamily="2" charset="2"/>
-                        <a:buChar char="§"/>
-                      </a:pPr>
-                      <a:r>
-                        <a:rPr lang="en-US" sz="1100" u="none" strike="noStrike" kern="1200" dirty="0">
-                          <a:solidFill>
-                            <a:srgbClr val="002060"/>
-                          </a:solidFill>
-                          <a:effectLst/>
-                          <a:latin typeface="+mn-lt"/>
-                          <a:ea typeface="+mn-ea"/>
-                          <a:cs typeface="+mn-cs"/>
-                        </a:rPr>
-                        <a:t>Lorem Ipsum</a:t>
-                      </a:r>
                     </a:p>
                   </a:txBody>
                   <a:tcPr marL="45720" marR="45720" marT="27432" marB="27432">
@@ -4908,15 +4984,32 @@
                     <a:p>
                       <a:pPr algn="l" fontAlgn="t"/>
                       <a:r>
-                        <a:rPr lang="en-US" sz="1100" b="0" i="0" u="none" strike="noStrike" dirty="0">
+                        <a:rPr lang="en-US" sz="1100" b="0" i="0" u="none" strike="noStrike" smtClean="0">
                           <a:solidFill>
                             <a:srgbClr val="002060"/>
                           </a:solidFill>
                           <a:effectLst/>
                           <a:latin typeface="+mn-lt"/>
                         </a:rPr>
-                        <a:t>MXYZ</a:t>
+                        <a:t>Vero</a:t>
                       </a:r>
+                      <a:r>
+                        <a:rPr lang="en-US" sz="1100" b="0" i="0" u="none" strike="noStrike" baseline="0" smtClean="0">
+                          <a:solidFill>
+                            <a:srgbClr val="002060"/>
+                          </a:solidFill>
+                          <a:effectLst/>
+                          <a:latin typeface="+mn-lt"/>
+                        </a:rPr>
+                        <a:t> Eos</a:t>
+                      </a:r>
+                      <a:endParaRPr lang="en-US" sz="1100" b="0" i="0" u="none" strike="noStrike" dirty="0">
+                        <a:solidFill>
+                          <a:srgbClr val="002060"/>
+                        </a:solidFill>
+                        <a:effectLst/>
+                        <a:latin typeface="+mn-lt"/>
+                      </a:endParaRPr>
                     </a:p>
                   </a:txBody>
                   <a:tcPr marL="45720" marR="45720" marT="27432" marB="27432">
@@ -4968,7 +5061,7 @@
                     <a:p>
                       <a:pPr algn="l" fontAlgn="t"/>
                       <a:r>
-                        <a:rPr lang="en-US" sz="1050" b="0" i="0" u="none" strike="noStrike" kern="1200" dirty="0">
+                        <a:rPr lang="en-US" sz="1050" b="0" i="0" u="none" strike="noStrike" kern="1200" smtClean="0">
                           <a:solidFill>
                             <a:srgbClr val="002060"/>
                           </a:solidFill>
@@ -4977,7 +5070,19 @@
                           <a:ea typeface="+mn-ea"/>
                           <a:cs typeface="+mn-cs"/>
                         </a:rPr>
-                        <a:t>DXYZ</a:t>
+                        <a:t>Vero</a:t>
+                      </a:r>
+                      <a:r>
+                        <a:rPr lang="en-US" sz="1050" b="0" i="0" u="none" strike="noStrike" kern="1200" baseline="0" smtClean="0">
+                          <a:solidFill>
+                            <a:srgbClr val="002060"/>
+                          </a:solidFill>
+                          <a:effectLst/>
+                          <a:latin typeface="+mn-lt"/>
+                          <a:ea typeface="+mn-ea"/>
+                          <a:cs typeface="+mn-cs"/>
+                        </a:rPr>
+                        <a:t> Eos</a:t>
                       </a:r>
                       <a:endParaRPr lang="en-US" sz="1100" u="none" strike="noStrike" kern="1200" dirty="0">
                         <a:solidFill>
@@ -5166,7 +5271,7 @@
                         <a:defRPr/>
                       </a:pPr>
                       <a:r>
-                        <a:rPr lang="en-US" sz="1050" u="none" strike="noStrike" kern="1200" dirty="0">
+                        <a:rPr lang="en-US" sz="1050" u="none" strike="noStrike" kern="1200" smtClean="0">
                           <a:solidFill>
                             <a:srgbClr val="002060"/>
                           </a:solidFill>
@@ -5175,132 +5280,17 @@
                           <a:ea typeface="+mn-ea"/>
                           <a:cs typeface="+mn-cs"/>
                         </a:rPr>
-                        <a:t>Currently defining module.  Module has ~10W min procurement timeline once design is finalized.</a:t>
+                        <a:t>At vero eos et accusamus</a:t>
                       </a:r>
-                    </a:p>
-                    <a:p>
-                      <a:pPr marL="171450" marR="0" lvl="0" indent="-171450" algn="l" defTabSz="606541" rtl="0" eaLnBrk="1" fontAlgn="b" latinLnBrk="0" hangingPunct="1">
-                        <a:lnSpc>
-                          <a:spcPct val="100000"/>
-                        </a:lnSpc>
-                        <a:spcBef>
-                          <a:spcPts val="0"/>
-                        </a:spcBef>
-                        <a:spcAft>
-                          <a:spcPts val="0"/>
-                        </a:spcAft>
-                        <a:buClrTx/>
-                        <a:buSzTx/>
-                        <a:buFont typeface="Wingdings" panose="05000000000000000000" pitchFamily="2" charset="2"/>
-                        <a:buChar char="§"/>
-                        <a:tabLst/>
-                        <a:defRPr/>
-                      </a:pPr>
-                      <a:r>
-                        <a:rPr lang="en-US" sz="1050" u="none" strike="noStrike" kern="1200" dirty="0">
-                          <a:solidFill>
-                            <a:srgbClr val="002060"/>
-                          </a:solidFill>
-                          <a:effectLst/>
-                          <a:latin typeface="+mn-lt"/>
-                          <a:ea typeface="+mn-ea"/>
-                          <a:cs typeface="+mn-cs"/>
-                        </a:rPr>
-                        <a:t>Risk:  UHD OLED may not be available</a:t>
-                      </a:r>
-                    </a:p>
-                    <a:p>
-                      <a:pPr marL="171450" marR="0" lvl="0" indent="-171450" algn="l" defTabSz="606541" rtl="0" eaLnBrk="1" fontAlgn="b" latinLnBrk="0" hangingPunct="1">
-                        <a:lnSpc>
-                          <a:spcPct val="100000"/>
-                        </a:lnSpc>
-                        <a:spcBef>
-                          <a:spcPts val="0"/>
-                        </a:spcBef>
-                        <a:spcAft>
-                          <a:spcPts val="0"/>
-                        </a:spcAft>
-                        <a:buClrTx/>
-                        <a:buSzTx/>
-                        <a:buFont typeface="Wingdings" panose="05000000000000000000" pitchFamily="2" charset="2"/>
-                        <a:buChar char="§"/>
-                        <a:tabLst/>
-                        <a:defRPr/>
-                      </a:pPr>
-                      <a:r>
-                        <a:rPr lang="en-US" sz="1050" u="none" strike="noStrike" kern="1200" dirty="0">
-                          <a:solidFill>
-                            <a:srgbClr val="002060"/>
-                          </a:solidFill>
-                          <a:effectLst/>
-                          <a:latin typeface="+mn-lt"/>
-                          <a:ea typeface="+mn-ea"/>
-                          <a:cs typeface="+mn-cs"/>
-                        </a:rPr>
-                        <a:t>Windows Hello functionality</a:t>
-                      </a:r>
-                    </a:p>
-                    <a:p>
-                      <a:pPr marL="171450" marR="0" lvl="0" indent="-171450" algn="l" defTabSz="606541" rtl="0" eaLnBrk="1" fontAlgn="b" latinLnBrk="0" hangingPunct="1">
-                        <a:lnSpc>
-                          <a:spcPct val="100000"/>
-                        </a:lnSpc>
-                        <a:spcBef>
-                          <a:spcPts val="0"/>
-                        </a:spcBef>
-                        <a:spcAft>
-                          <a:spcPts val="0"/>
-                        </a:spcAft>
-                        <a:buClrTx/>
-                        <a:buSzTx/>
-                        <a:buFont typeface="Wingdings" panose="05000000000000000000" pitchFamily="2" charset="2"/>
-                        <a:buChar char="§"/>
-                        <a:tabLst/>
-                        <a:defRPr/>
-                      </a:pPr>
-                      <a:r>
-                        <a:rPr lang="en-US" sz="1050" u="none" strike="noStrike" kern="1200" dirty="0">
-                          <a:solidFill>
-                            <a:srgbClr val="002060"/>
-                          </a:solidFill>
-                          <a:effectLst/>
-                          <a:latin typeface="+mn-lt"/>
-                          <a:ea typeface="+mn-ea"/>
-                          <a:cs typeface="+mn-cs"/>
-                        </a:rPr>
-                        <a:t>Multiple camera modules are evaluated</a:t>
-                      </a:r>
-                    </a:p>
-                    <a:p>
-                      <a:pPr marL="171450" marR="0" lvl="0" indent="-171450" algn="l" defTabSz="606541" rtl="0" eaLnBrk="1" fontAlgn="b" latinLnBrk="0" hangingPunct="1">
-                        <a:lnSpc>
-                          <a:spcPct val="100000"/>
-                        </a:lnSpc>
-                        <a:spcBef>
-                          <a:spcPts val="0"/>
-                        </a:spcBef>
-                        <a:spcAft>
-                          <a:spcPts val="0"/>
-                        </a:spcAft>
-                        <a:buClrTx/>
-                        <a:buSzTx/>
-                        <a:buFont typeface="Wingdings" panose="05000000000000000000" pitchFamily="2" charset="2"/>
-                        <a:buChar char="§"/>
-                        <a:tabLst/>
-                        <a:defRPr/>
-                      </a:pPr>
-                      <a:r>
-                        <a:rPr lang="en-US" sz="1050" u="none" strike="noStrike" kern="1200" dirty="0">
-                          <a:solidFill>
-                            <a:srgbClr val="002060"/>
-                          </a:solidFill>
-                          <a:effectLst/>
-                          <a:latin typeface="+mn-lt"/>
-                          <a:ea typeface="+mn-ea"/>
-                          <a:cs typeface="+mn-cs"/>
-                        </a:rPr>
-                        <a:t>A BIOS update may be needed</a:t>
-                      </a:r>
+                      <a:endParaRPr lang="en-US" sz="1050" u="none" strike="noStrike" kern="1200" dirty="0">
+                        <a:solidFill>
+                          <a:srgbClr val="002060"/>
+                        </a:solidFill>
+                        <a:effectLst/>
+                        <a:latin typeface="+mn-lt"/>
+                        <a:ea typeface="+mn-ea"/>
+                        <a:cs typeface="+mn-cs"/>
+                      </a:endParaRPr>
                     </a:p>
                   </a:txBody>
                   <a:tcPr marL="45720" marR="45720" marT="27432" marB="27432">
@@ -5360,2479 +5350,6 @@
                 <a:extLst>
                   <a:ext uri="{0D108BD9-81ED-4DB2-BD59-A6C34878D82A}">
                     <a16:rowId xmlns:a16="http://schemas.microsoft.com/office/drawing/2014/main" val="398348294"/>
-                  </a:ext>
-                </a:extLst>
-              </a:tr>
-            </a:tbl>
-          </a:graphicData>
-        </a:graphic>
-      </p:graphicFrame>
-      <p:graphicFrame>
-        <p:nvGraphicFramePr>
-          <p:cNvPr id="2" name="Left Table">
-            <a:extLst>
-              <a:ext uri="{FF2B5EF4-FFF2-40B4-BE49-F238E27FC236}">
-                <a16:creationId xmlns:a16="http://schemas.microsoft.com/office/drawing/2014/main" id="{69440B3B-5C3D-6C45-8742-50E0812E415A}"/>
-              </a:ext>
-            </a:extLst>
-          </p:cNvPr>
-          <p:cNvGraphicFramePr>
-            <a:graphicFrameLocks noGrp="1"/>
-          </p:cNvGraphicFramePr>
-          <p:nvPr>
-            <p:extLst>
-              <p:ext uri="{D42A27DB-BD31-4B8C-83A1-F6EECF244321}">
-                <p14:modId xmlns:p14="http://schemas.microsoft.com/office/powerpoint/2010/main" val="3931155587"/>
-              </p:ext>
-            </p:extLst>
-          </p:nvPr>
-        </p:nvGraphicFramePr>
-        <p:xfrm>
-          <a:off x="6939915" y="956637"/>
-          <a:ext cx="5147310" cy="5078409"/>
-        </p:xfrm>
-        <a:graphic>
-          <a:graphicData uri="http://schemas.openxmlformats.org/drawingml/2006/table">
-            <a:tbl>
-              <a:tblPr/>
-              <a:tblGrid>
-                <a:gridCol w="925492">
-                  <a:extLst>
-                    <a:ext uri="{9D8B030D-6E8A-4147-A177-3AD203B41FA5}">
-                      <a16:colId xmlns:a16="http://schemas.microsoft.com/office/drawing/2014/main" val="731854768"/>
-                    </a:ext>
-                  </a:extLst>
-                </a:gridCol>
-                <a:gridCol w="4221818">
-                  <a:extLst>
-                    <a:ext uri="{9D8B030D-6E8A-4147-A177-3AD203B41FA5}">
-                      <a16:colId xmlns:a16="http://schemas.microsoft.com/office/drawing/2014/main" val="134440545"/>
-                    </a:ext>
-                  </a:extLst>
-                </a:gridCol>
-              </a:tblGrid>
-              <a:tr h="234895">
-                <a:tc gridSpan="2">
-                  <a:txBody>
-                    <a:bodyPr/>
-                    <a:lstStyle/>
-                    <a:p>
-                      <a:pPr marL="0" algn="l" defTabSz="606541" rtl="0" eaLnBrk="1" fontAlgn="b" latinLnBrk="0" hangingPunct="1"/>
-                      <a:r>
-                        <a:rPr lang="en-US" sz="1200" b="1" u="none" strike="noStrike" kern="1200" dirty="0">
-                          <a:solidFill>
-                            <a:schemeClr val="bg1"/>
-                          </a:solidFill>
-                          <a:effectLst/>
-                          <a:latin typeface="+mn-lt"/>
-                          <a:ea typeface="+mn-ea"/>
-                          <a:cs typeface="+mn-cs"/>
-                        </a:rPr>
-                        <a:t> Timeline /Milestones</a:t>
-                      </a:r>
-                    </a:p>
-                  </a:txBody>
-                  <a:tcPr marL="6717" marR="6717" marT="6717" marB="0" anchor="ctr">
-                    <a:lnL w="19050" cap="flat" cmpd="sng" algn="ctr">
-                      <a:solidFill>
-                        <a:srgbClr val="002060"/>
-                      </a:solidFill>
-                      <a:prstDash val="solid"/>
-                      <a:round/>
-                      <a:headEnd type="none" w="med" len="med"/>
-                      <a:tailEnd type="none" w="med" len="med"/>
-                    </a:lnL>
-                    <a:lnR w="19050" cap="flat" cmpd="sng" algn="ctr">
-                      <a:solidFill>
-                        <a:srgbClr val="002060"/>
-                      </a:solidFill>
-                      <a:prstDash val="solid"/>
-                      <a:round/>
-                      <a:headEnd type="none" w="med" len="med"/>
-                      <a:tailEnd type="none" w="med" len="med"/>
-                    </a:lnR>
-                    <a:lnT w="19050" cap="flat" cmpd="sng" algn="ctr">
-                      <a:solidFill>
-                        <a:srgbClr val="002060"/>
-                      </a:solidFill>
-                      <a:prstDash val="solid"/>
-                      <a:round/>
-                      <a:headEnd type="none" w="med" len="med"/>
-                      <a:tailEnd type="none" w="med" len="med"/>
-                    </a:lnT>
-                    <a:lnB w="19050" cap="flat" cmpd="sng" algn="ctr">
-                      <a:solidFill>
-                        <a:srgbClr val="002060"/>
-                      </a:solidFill>
-                      <a:prstDash val="solid"/>
-                      <a:round/>
-                      <a:headEnd type="none" w="med" len="med"/>
-                      <a:tailEnd type="none" w="med" len="med"/>
-                    </a:lnB>
-                    <a:solidFill>
-                      <a:srgbClr val="3B5989"/>
-                    </a:solidFill>
-                  </a:tcPr>
-                </a:tc>
-                <a:tc hMerge="1">
-                  <a:txBody>
-                    <a:bodyPr/>
-                    <a:lstStyle/>
-                    <a:p>
-                      <a:pPr algn="l" fontAlgn="t"/>
-                      <a:endParaRPr lang="en-US" sz="900" b="0" i="0" u="none" strike="noStrike">
-                        <a:solidFill>
-                          <a:srgbClr val="000000"/>
-                        </a:solidFill>
-                        <a:effectLst/>
-                        <a:latin typeface="Arial" panose="020B0604020202020204" pitchFamily="34" charset="0"/>
-                      </a:endParaRPr>
-                    </a:p>
-                  </a:txBody>
-                  <a:tcPr marL="6717" marR="6717" marT="6717" marB="0">
-                    <a:lnL w="6350" cap="flat" cmpd="sng" algn="ctr">
-                      <a:solidFill>
-                        <a:srgbClr val="000000"/>
-                      </a:solidFill>
-                      <a:prstDash val="solid"/>
-                      <a:round/>
-                      <a:headEnd type="none" w="med" len="med"/>
-                      <a:tailEnd type="none" w="med" len="med"/>
-                    </a:lnL>
-                    <a:lnR w="6350" cap="flat" cmpd="sng" algn="ctr">
-                      <a:solidFill>
-                        <a:srgbClr val="000000"/>
-                      </a:solidFill>
-                      <a:prstDash val="solid"/>
-                      <a:round/>
-                      <a:headEnd type="none" w="med" len="med"/>
-                      <a:tailEnd type="none" w="med" len="med"/>
-                    </a:lnR>
-                    <a:lnT w="6350" cap="flat" cmpd="sng" algn="ctr">
-                      <a:solidFill>
-                        <a:srgbClr val="000000"/>
-                      </a:solidFill>
-                      <a:prstDash val="solid"/>
-                      <a:round/>
-                      <a:headEnd type="none" w="med" len="med"/>
-                      <a:tailEnd type="none" w="med" len="med"/>
-                    </a:lnT>
-                    <a:lnB w="6350" cap="flat" cmpd="sng" algn="ctr">
-                      <a:solidFill>
-                        <a:srgbClr val="000000"/>
-                      </a:solidFill>
-                      <a:prstDash val="solid"/>
-                      <a:round/>
-                      <a:headEnd type="none" w="med" len="med"/>
-                      <a:tailEnd type="none" w="med" len="med"/>
-                    </a:lnB>
-                    <a:solidFill>
-                      <a:schemeClr val="bg1">
-                        <a:lumMod val="75000"/>
-                      </a:schemeClr>
-                    </a:solidFill>
-                  </a:tcPr>
-                </a:tc>
-                <a:extLst>
-                  <a:ext uri="{0D108BD9-81ED-4DB2-BD59-A6C34878D82A}">
-                    <a16:rowId xmlns:a16="http://schemas.microsoft.com/office/drawing/2014/main" val="1787595644"/>
-                  </a:ext>
-                </a:extLst>
-              </a:tr>
-              <a:tr h="325350">
-                <a:tc>
-                  <a:txBody>
-                    <a:bodyPr/>
-                    <a:lstStyle/>
-                    <a:p>
-                      <a:pPr algn="ctr" fontAlgn="t"/>
-                      <a:r>
-                        <a:rPr lang="en-US" sz="1200" b="0" i="0" u="none" strike="noStrike" dirty="0">
-                          <a:solidFill>
-                            <a:srgbClr val="002060"/>
-                          </a:solidFill>
-                          <a:effectLst/>
-                          <a:latin typeface="Intel Clear" panose="020B0604020203020204" pitchFamily="34" charset="0"/>
-                          <a:ea typeface="Intel Clear" panose="020B0604020203020204" pitchFamily="34" charset="0"/>
-                          <a:cs typeface="Intel Clear" panose="020B0604020203020204" pitchFamily="34" charset="0"/>
-                        </a:rPr>
-                        <a:t>WW27 ’20</a:t>
-                      </a:r>
-                    </a:p>
-                  </a:txBody>
-                  <a:tcPr marL="45720" marR="45720" marT="27432" marB="27432" anchor="ctr">
-                    <a:lnL w="19050" cap="flat" cmpd="sng" algn="ctr">
-                      <a:solidFill>
-                        <a:srgbClr val="002060"/>
-                      </a:solidFill>
-                      <a:prstDash val="solid"/>
-                      <a:round/>
-                      <a:headEnd type="none" w="med" len="med"/>
-                      <a:tailEnd type="none" w="med" len="med"/>
-                    </a:lnL>
-                    <a:lnR w="19050" cap="flat" cmpd="sng" algn="ctr">
-                      <a:solidFill>
-                        <a:srgbClr val="002060"/>
-                      </a:solidFill>
-                      <a:prstDash val="solid"/>
-                      <a:round/>
-                      <a:headEnd type="none" w="med" len="med"/>
-                      <a:tailEnd type="none" w="med" len="med"/>
-                    </a:lnR>
-                    <a:lnT w="19050" cap="flat" cmpd="sng" algn="ctr">
-                      <a:solidFill>
-                        <a:srgbClr val="002060"/>
-                      </a:solidFill>
-                      <a:prstDash val="solid"/>
-                      <a:round/>
-                      <a:headEnd type="none" w="med" len="med"/>
-                      <a:tailEnd type="none" w="med" len="med"/>
-                    </a:lnT>
-                    <a:lnB w="19050" cap="flat" cmpd="sng" algn="ctr">
-                      <a:solidFill>
-                        <a:srgbClr val="002060"/>
-                      </a:solidFill>
-                      <a:prstDash val="solid"/>
-                      <a:round/>
-                      <a:headEnd type="none" w="med" len="med"/>
-                      <a:tailEnd type="none" w="med" len="med"/>
-                    </a:lnB>
-                    <a:solidFill>
-                      <a:srgbClr val="00C800"/>
-                    </a:solidFill>
-                  </a:tcPr>
-                </a:tc>
-                <a:tc>
-                  <a:txBody>
-                    <a:bodyPr/>
-                    <a:lstStyle/>
-                    <a:p>
-                      <a:pPr algn="l" fontAlgn="t"/>
-                      <a:r>
-                        <a:rPr lang="en-US" sz="1200" b="0" i="0" u="none" strike="noStrike" dirty="0">
-                          <a:solidFill>
-                            <a:srgbClr val="002060"/>
-                          </a:solidFill>
-                          <a:effectLst/>
-                          <a:latin typeface="Intel Clear" panose="020B0604020203020204" pitchFamily="34" charset="0"/>
-                          <a:ea typeface="Intel Clear" panose="020B0604020203020204" pitchFamily="34" charset="0"/>
-                          <a:cs typeface="Intel Clear" panose="020B0604020203020204" pitchFamily="34" charset="0"/>
-                        </a:rPr>
-                        <a:t>Eng. Workstream Kick-Off</a:t>
-                      </a:r>
-                    </a:p>
-                  </a:txBody>
-                  <a:tcPr marL="45720" marR="45720" marT="27432" marB="27432" anchor="ctr">
-                    <a:lnL w="19050" cap="flat" cmpd="sng" algn="ctr">
-                      <a:solidFill>
-                        <a:srgbClr val="002060"/>
-                      </a:solidFill>
-                      <a:prstDash val="solid"/>
-                      <a:round/>
-                      <a:headEnd type="none" w="med" len="med"/>
-                      <a:tailEnd type="none" w="med" len="med"/>
-                    </a:lnL>
-                    <a:lnR w="19050" cap="flat" cmpd="sng" algn="ctr">
-                      <a:solidFill>
-                        <a:srgbClr val="002060"/>
-                      </a:solidFill>
-                      <a:prstDash val="solid"/>
-                      <a:round/>
-                      <a:headEnd type="none" w="med" len="med"/>
-                      <a:tailEnd type="none" w="med" len="med"/>
-                    </a:lnR>
-                    <a:lnT w="19050" cap="flat" cmpd="sng" algn="ctr">
-                      <a:solidFill>
-                        <a:srgbClr val="002060"/>
-                      </a:solidFill>
-                      <a:prstDash val="solid"/>
-                      <a:round/>
-                      <a:headEnd type="none" w="med" len="med"/>
-                      <a:tailEnd type="none" w="med" len="med"/>
-                    </a:lnT>
-                    <a:lnB w="19050" cap="flat" cmpd="sng" algn="ctr">
-                      <a:solidFill>
-                        <a:srgbClr val="002060"/>
-                      </a:solidFill>
-                      <a:prstDash val="solid"/>
-                      <a:round/>
-                      <a:headEnd type="none" w="med" len="med"/>
-                      <a:tailEnd type="none" w="med" len="med"/>
-                    </a:lnB>
-                    <a:solidFill>
-                      <a:schemeClr val="bg1">
-                        <a:lumMod val="75000"/>
-                      </a:schemeClr>
-                    </a:solidFill>
-                  </a:tcPr>
-                </a:tc>
-                <a:extLst>
-                  <a:ext uri="{0D108BD9-81ED-4DB2-BD59-A6C34878D82A}">
-                    <a16:rowId xmlns:a16="http://schemas.microsoft.com/office/drawing/2014/main" val="3712375731"/>
-                  </a:ext>
-                </a:extLst>
-              </a:tr>
-              <a:tr h="384258">
-                <a:tc>
-                  <a:txBody>
-                    <a:bodyPr/>
-                    <a:lstStyle/>
-                    <a:p>
-                      <a:pPr algn="ctr" fontAlgn="t"/>
-                      <a:r>
-                        <a:rPr lang="en-US" sz="1200" b="0" i="0" u="none" strike="noStrike" kern="1200">
-                          <a:solidFill>
-                            <a:srgbClr val="002060"/>
-                          </a:solidFill>
-                          <a:effectLst/>
-                          <a:latin typeface="Intel Clear" panose="020B0604020203020204" pitchFamily="34" charset="0"/>
-                          <a:ea typeface="Intel Clear" panose="020B0604020203020204" pitchFamily="34" charset="0"/>
-                          <a:cs typeface="Intel Clear" panose="020B0604020203020204" pitchFamily="34" charset="0"/>
-                        </a:rPr>
-                        <a:t>WW31 ’20</a:t>
-                      </a:r>
-                    </a:p>
-                  </a:txBody>
-                  <a:tcPr marL="45720" marR="45720" marT="27432" marB="27432" anchor="ctr">
-                    <a:lnL w="19050" cap="flat" cmpd="sng" algn="ctr">
-                      <a:solidFill>
-                        <a:srgbClr val="002060"/>
-                      </a:solidFill>
-                      <a:prstDash val="solid"/>
-                      <a:round/>
-                      <a:headEnd type="none" w="med" len="med"/>
-                      <a:tailEnd type="none" w="med" len="med"/>
-                    </a:lnL>
-                    <a:lnR w="19050" cap="flat" cmpd="sng" algn="ctr">
-                      <a:solidFill>
-                        <a:srgbClr val="002060"/>
-                      </a:solidFill>
-                      <a:prstDash val="solid"/>
-                      <a:round/>
-                      <a:headEnd type="none" w="med" len="med"/>
-                      <a:tailEnd type="none" w="med" len="med"/>
-                    </a:lnR>
-                    <a:lnT w="19050" cap="flat" cmpd="sng" algn="ctr">
-                      <a:solidFill>
-                        <a:srgbClr val="002060"/>
-                      </a:solidFill>
-                      <a:prstDash val="solid"/>
-                      <a:round/>
-                      <a:headEnd type="none" w="med" len="med"/>
-                      <a:tailEnd type="none" w="med" len="med"/>
-                    </a:lnT>
-                    <a:lnB w="19050" cap="flat" cmpd="sng" algn="ctr">
-                      <a:solidFill>
-                        <a:srgbClr val="002060"/>
-                      </a:solidFill>
-                      <a:prstDash val="solid"/>
-                      <a:round/>
-                      <a:headEnd type="none" w="med" len="med"/>
-                      <a:tailEnd type="none" w="med" len="med"/>
-                    </a:lnB>
-                    <a:solidFill>
-                      <a:srgbClr val="00C800"/>
-                    </a:solidFill>
-                  </a:tcPr>
-                </a:tc>
-                <a:tc>
-                  <a:txBody>
-                    <a:bodyPr/>
-                    <a:lstStyle/>
-                    <a:p>
-                      <a:pPr algn="l" fontAlgn="t"/>
-                      <a:r>
-                        <a:rPr lang="en-US" sz="1200" b="0" i="0" u="none" strike="noStrike" dirty="0">
-                          <a:solidFill>
-                            <a:srgbClr val="002060"/>
-                          </a:solidFill>
-                          <a:effectLst/>
-                          <a:latin typeface="Intel Clear" panose="020B0604020203020204" pitchFamily="34" charset="0"/>
-                          <a:ea typeface="Intel Clear" panose="020B0604020203020204" pitchFamily="34" charset="0"/>
-                          <a:cs typeface="Intel Clear" panose="020B0604020203020204" pitchFamily="34" charset="0"/>
-                        </a:rPr>
-                        <a:t>Solution Definition/Target</a:t>
-                      </a:r>
-                    </a:p>
-                  </a:txBody>
-                  <a:tcPr marL="45720" marR="45720" marT="27432" marB="27432" anchor="ctr">
-                    <a:lnL w="19050" cap="flat" cmpd="sng" algn="ctr">
-                      <a:solidFill>
-                        <a:srgbClr val="002060"/>
-                      </a:solidFill>
-                      <a:prstDash val="solid"/>
-                      <a:round/>
-                      <a:headEnd type="none" w="med" len="med"/>
-                      <a:tailEnd type="none" w="med" len="med"/>
-                    </a:lnL>
-                    <a:lnR w="19050" cap="flat" cmpd="sng" algn="ctr">
-                      <a:solidFill>
-                        <a:srgbClr val="002060"/>
-                      </a:solidFill>
-                      <a:prstDash val="solid"/>
-                      <a:round/>
-                      <a:headEnd type="none" w="med" len="med"/>
-                      <a:tailEnd type="none" w="med" len="med"/>
-                    </a:lnR>
-                    <a:lnT w="19050" cap="flat" cmpd="sng" algn="ctr">
-                      <a:solidFill>
-                        <a:srgbClr val="002060"/>
-                      </a:solidFill>
-                      <a:prstDash val="solid"/>
-                      <a:round/>
-                      <a:headEnd type="none" w="med" len="med"/>
-                      <a:tailEnd type="none" w="med" len="med"/>
-                    </a:lnT>
-                    <a:lnB w="19050" cap="flat" cmpd="sng" algn="ctr">
-                      <a:solidFill>
-                        <a:srgbClr val="002060"/>
-                      </a:solidFill>
-                      <a:prstDash val="solid"/>
-                      <a:round/>
-                      <a:headEnd type="none" w="med" len="med"/>
-                      <a:tailEnd type="none" w="med" len="med"/>
-                    </a:lnB>
-                    <a:solidFill>
-                      <a:schemeClr val="bg1">
-                        <a:lumMod val="75000"/>
-                      </a:schemeClr>
-                    </a:solidFill>
-                  </a:tcPr>
-                </a:tc>
-                <a:extLst>
-                  <a:ext uri="{0D108BD9-81ED-4DB2-BD59-A6C34878D82A}">
-                    <a16:rowId xmlns:a16="http://schemas.microsoft.com/office/drawing/2014/main" val="2934354221"/>
-                  </a:ext>
-                </a:extLst>
-              </a:tr>
-              <a:tr h="384258">
-                <a:tc>
-                  <a:txBody>
-                    <a:bodyPr/>
-                    <a:lstStyle/>
-                    <a:p>
-                      <a:pPr algn="ctr" fontAlgn="t"/>
-                      <a:r>
-                        <a:rPr lang="en-US" sz="1200" b="0" i="0" u="none" strike="noStrike" kern="1200">
-                          <a:solidFill>
-                            <a:srgbClr val="002060"/>
-                          </a:solidFill>
-                          <a:effectLst/>
-                          <a:latin typeface="Intel Clear" panose="020B0604020203020204" pitchFamily="34" charset="0"/>
-                          <a:ea typeface="Intel Clear" panose="020B0604020203020204" pitchFamily="34" charset="0"/>
-                          <a:cs typeface="Intel Clear" panose="020B0604020203020204" pitchFamily="34" charset="0"/>
-                        </a:rPr>
-                        <a:t>WW50’20</a:t>
-                      </a:r>
-                    </a:p>
-                  </a:txBody>
-                  <a:tcPr marL="45720" marR="45720" marT="27432" marB="27432" anchor="ctr">
-                    <a:lnL w="19050" cap="flat" cmpd="sng" algn="ctr">
-                      <a:solidFill>
-                        <a:srgbClr val="002060"/>
-                      </a:solidFill>
-                      <a:prstDash val="solid"/>
-                      <a:round/>
-                      <a:headEnd type="none" w="med" len="med"/>
-                      <a:tailEnd type="none" w="med" len="med"/>
-                    </a:lnL>
-                    <a:lnR w="19050" cap="flat" cmpd="sng" algn="ctr">
-                      <a:solidFill>
-                        <a:srgbClr val="002060"/>
-                      </a:solidFill>
-                      <a:prstDash val="solid"/>
-                      <a:round/>
-                      <a:headEnd type="none" w="med" len="med"/>
-                      <a:tailEnd type="none" w="med" len="med"/>
-                    </a:lnR>
-                    <a:lnT w="19050" cap="flat" cmpd="sng" algn="ctr">
-                      <a:solidFill>
-                        <a:srgbClr val="002060"/>
-                      </a:solidFill>
-                      <a:prstDash val="solid"/>
-                      <a:round/>
-                      <a:headEnd type="none" w="med" len="med"/>
-                      <a:tailEnd type="none" w="med" len="med"/>
-                    </a:lnT>
-                    <a:lnB w="19050" cap="flat" cmpd="sng" algn="ctr">
-                      <a:solidFill>
-                        <a:srgbClr val="002060"/>
-                      </a:solidFill>
-                      <a:prstDash val="solid"/>
-                      <a:round/>
-                      <a:headEnd type="none" w="med" len="med"/>
-                      <a:tailEnd type="none" w="med" len="med"/>
-                    </a:lnB>
-                    <a:solidFill>
-                      <a:schemeClr val="accent6">
-                        <a:lumMod val="50000"/>
-                      </a:schemeClr>
-                    </a:solidFill>
-                  </a:tcPr>
-                </a:tc>
-                <a:tc>
-                  <a:txBody>
-                    <a:bodyPr/>
-                    <a:lstStyle/>
-                    <a:p>
-                      <a:pPr marL="0" marR="0" lvl="0" indent="0" algn="l" defTabSz="914400" rtl="0" eaLnBrk="1" fontAlgn="t" latinLnBrk="0" hangingPunct="1">
-                        <a:lnSpc>
-                          <a:spcPct val="100000"/>
-                        </a:lnSpc>
-                        <a:spcBef>
-                          <a:spcPts val="0"/>
-                        </a:spcBef>
-                        <a:spcAft>
-                          <a:spcPts val="0"/>
-                        </a:spcAft>
-                        <a:buClrTx/>
-                        <a:buSzTx/>
-                        <a:buFontTx/>
-                        <a:buNone/>
-                        <a:tabLst/>
-                        <a:defRPr/>
-                      </a:pPr>
-                      <a:r>
-                        <a:rPr lang="en-US" sz="1200" b="0" i="0" u="none" strike="noStrike">
-                          <a:solidFill>
-                            <a:srgbClr val="002060"/>
-                          </a:solidFill>
-                          <a:effectLst/>
-                          <a:latin typeface="Intel Clear" panose="020B0604020203020204" pitchFamily="34" charset="0"/>
-                          <a:ea typeface="Intel Clear" panose="020B0604020203020204" pitchFamily="34" charset="0"/>
-                          <a:cs typeface="Intel Clear" panose="020B0604020203020204" pitchFamily="34" charset="0"/>
-                        </a:rPr>
-                        <a:t>Solution </a:t>
-                      </a:r>
-                      <a:r>
-                        <a:rPr lang="en-US" sz="1200" b="0" i="0" u="none" strike="noStrike" smtClean="0">
-                          <a:solidFill>
-                            <a:srgbClr val="002060"/>
-                          </a:solidFill>
-                          <a:effectLst/>
-                          <a:latin typeface="Intel Clear" panose="020B0604020203020204" pitchFamily="34" charset="0"/>
-                          <a:ea typeface="Intel Clear" panose="020B0604020203020204" pitchFamily="34" charset="0"/>
-                          <a:cs typeface="Intel Clear" panose="020B0604020203020204" pitchFamily="34" charset="0"/>
-                        </a:rPr>
-                        <a:t>Definition/Target</a:t>
-                      </a:r>
-                      <a:endParaRPr lang="en-US" sz="1200" b="0" i="0" u="none" strike="noStrike" dirty="0">
-                        <a:solidFill>
-                          <a:srgbClr val="002060"/>
-                        </a:solidFill>
-                        <a:effectLst/>
-                        <a:latin typeface="Intel Clear" panose="020B0604020203020204" pitchFamily="34" charset="0"/>
-                        <a:ea typeface="Intel Clear" panose="020B0604020203020204" pitchFamily="34" charset="0"/>
-                        <a:cs typeface="Intel Clear" panose="020B0604020203020204" pitchFamily="34" charset="0"/>
-                      </a:endParaRPr>
-                    </a:p>
-                  </a:txBody>
-                  <a:tcPr marL="45720" marR="45720" marT="27432" marB="27432" anchor="ctr">
-                    <a:lnL w="19050" cap="flat" cmpd="sng" algn="ctr">
-                      <a:solidFill>
-                        <a:srgbClr val="002060"/>
-                      </a:solidFill>
-                      <a:prstDash val="solid"/>
-                      <a:round/>
-                      <a:headEnd type="none" w="med" len="med"/>
-                      <a:tailEnd type="none" w="med" len="med"/>
-                    </a:lnL>
-                    <a:lnR w="19050" cap="flat" cmpd="sng" algn="ctr">
-                      <a:solidFill>
-                        <a:srgbClr val="002060"/>
-                      </a:solidFill>
-                      <a:prstDash val="solid"/>
-                      <a:round/>
-                      <a:headEnd type="none" w="med" len="med"/>
-                      <a:tailEnd type="none" w="med" len="med"/>
-                    </a:lnR>
-                    <a:lnT w="19050" cap="flat" cmpd="sng" algn="ctr">
-                      <a:solidFill>
-                        <a:srgbClr val="002060"/>
-                      </a:solidFill>
-                      <a:prstDash val="solid"/>
-                      <a:round/>
-                      <a:headEnd type="none" w="med" len="med"/>
-                      <a:tailEnd type="none" w="med" len="med"/>
-                    </a:lnT>
-                    <a:lnB w="19050" cap="flat" cmpd="sng" algn="ctr">
-                      <a:solidFill>
-                        <a:srgbClr val="002060"/>
-                      </a:solidFill>
-                      <a:prstDash val="solid"/>
-                      <a:round/>
-                      <a:headEnd type="none" w="med" len="med"/>
-                      <a:tailEnd type="none" w="med" len="med"/>
-                    </a:lnB>
-                    <a:solidFill>
-                      <a:schemeClr val="bg1">
-                        <a:lumMod val="75000"/>
-                      </a:schemeClr>
-                    </a:solidFill>
-                  </a:tcPr>
-                </a:tc>
-                <a:extLst>
-                  <a:ext uri="{0D108BD9-81ED-4DB2-BD59-A6C34878D82A}">
-                    <a16:rowId xmlns:a16="http://schemas.microsoft.com/office/drawing/2014/main" val="1616430755"/>
-                  </a:ext>
-                </a:extLst>
-              </a:tr>
-              <a:tr h="384258">
-                <a:tc>
-                  <a:txBody>
-                    <a:bodyPr/>
-                    <a:lstStyle/>
-                    <a:p>
-                      <a:pPr algn="ctr" fontAlgn="t"/>
-                      <a:r>
-                        <a:rPr lang="en-US" sz="1200" b="0" i="0" u="none" strike="noStrike" kern="1200">
-                          <a:solidFill>
-                            <a:srgbClr val="002060"/>
-                          </a:solidFill>
-                          <a:effectLst/>
-                          <a:latin typeface="Intel Clear" panose="020B0604020203020204" pitchFamily="34" charset="0"/>
-                          <a:ea typeface="Intel Clear" panose="020B0604020203020204" pitchFamily="34" charset="0"/>
-                          <a:cs typeface="Intel Clear" panose="020B0604020203020204" pitchFamily="34" charset="0"/>
-                        </a:rPr>
-                        <a:t>WW04’21</a:t>
-                      </a:r>
-                    </a:p>
-                  </a:txBody>
-                  <a:tcPr marL="45720" marR="45720" marT="27432" marB="27432" anchor="ctr">
-                    <a:lnL w="19050" cap="flat" cmpd="sng" algn="ctr">
-                      <a:solidFill>
-                        <a:srgbClr val="002060"/>
-                      </a:solidFill>
-                      <a:prstDash val="solid"/>
-                      <a:round/>
-                      <a:headEnd type="none" w="med" len="med"/>
-                      <a:tailEnd type="none" w="med" len="med"/>
-                    </a:lnL>
-                    <a:lnR w="19050" cap="flat" cmpd="sng" algn="ctr">
-                      <a:solidFill>
-                        <a:srgbClr val="002060"/>
-                      </a:solidFill>
-                      <a:prstDash val="solid"/>
-                      <a:round/>
-                      <a:headEnd type="none" w="med" len="med"/>
-                      <a:tailEnd type="none" w="med" len="med"/>
-                    </a:lnR>
-                    <a:lnT w="19050" cap="flat" cmpd="sng" algn="ctr">
-                      <a:solidFill>
-                        <a:srgbClr val="002060"/>
-                      </a:solidFill>
-                      <a:prstDash val="solid"/>
-                      <a:round/>
-                      <a:headEnd type="none" w="med" len="med"/>
-                      <a:tailEnd type="none" w="med" len="med"/>
-                    </a:lnT>
-                    <a:lnB w="19050" cap="flat" cmpd="sng" algn="ctr">
-                      <a:solidFill>
-                        <a:srgbClr val="002060"/>
-                      </a:solidFill>
-                      <a:prstDash val="solid"/>
-                      <a:round/>
-                      <a:headEnd type="none" w="med" len="med"/>
-                      <a:tailEnd type="none" w="med" len="med"/>
-                    </a:lnB>
-                    <a:solidFill>
-                      <a:srgbClr val="00B050"/>
-                    </a:solidFill>
-                  </a:tcPr>
-                </a:tc>
-                <a:tc>
-                  <a:txBody>
-                    <a:bodyPr/>
-                    <a:lstStyle/>
-                    <a:p>
-                      <a:pPr algn="l" fontAlgn="t"/>
-                      <a:r>
-                        <a:rPr lang="en-US" sz="1200" b="0" i="0" u="none" strike="noStrike" dirty="0">
-                          <a:solidFill>
-                            <a:srgbClr val="002060"/>
-                          </a:solidFill>
-                          <a:effectLst/>
-                          <a:latin typeface="Intel Clear" panose="020B0604020203020204" pitchFamily="34" charset="0"/>
-                          <a:ea typeface="Intel Clear" panose="020B0604020203020204" pitchFamily="34" charset="0"/>
-                          <a:cs typeface="Intel Clear" panose="020B0604020203020204" pitchFamily="34" charset="0"/>
-                        </a:rPr>
-                        <a:t>Solution Definition/Target</a:t>
-                      </a:r>
-                    </a:p>
-                  </a:txBody>
-                  <a:tcPr marL="45720" marR="45720" marT="27432" marB="27432" anchor="ctr">
-                    <a:lnL w="19050" cap="flat" cmpd="sng" algn="ctr">
-                      <a:solidFill>
-                        <a:srgbClr val="002060"/>
-                      </a:solidFill>
-                      <a:prstDash val="solid"/>
-                      <a:round/>
-                      <a:headEnd type="none" w="med" len="med"/>
-                      <a:tailEnd type="none" w="med" len="med"/>
-                    </a:lnL>
-                    <a:lnR w="19050" cap="flat" cmpd="sng" algn="ctr">
-                      <a:solidFill>
-                        <a:srgbClr val="002060"/>
-                      </a:solidFill>
-                      <a:prstDash val="solid"/>
-                      <a:round/>
-                      <a:headEnd type="none" w="med" len="med"/>
-                      <a:tailEnd type="none" w="med" len="med"/>
-                    </a:lnR>
-                    <a:lnT w="19050" cap="flat" cmpd="sng" algn="ctr">
-                      <a:solidFill>
-                        <a:srgbClr val="002060"/>
-                      </a:solidFill>
-                      <a:prstDash val="solid"/>
-                      <a:round/>
-                      <a:headEnd type="none" w="med" len="med"/>
-                      <a:tailEnd type="none" w="med" len="med"/>
-                    </a:lnT>
-                    <a:lnB w="19050" cap="flat" cmpd="sng" algn="ctr">
-                      <a:solidFill>
-                        <a:srgbClr val="002060"/>
-                      </a:solidFill>
-                      <a:prstDash val="solid"/>
-                      <a:round/>
-                      <a:headEnd type="none" w="med" len="med"/>
-                      <a:tailEnd type="none" w="med" len="med"/>
-                    </a:lnB>
-                    <a:solidFill>
-                      <a:schemeClr val="bg1">
-                        <a:lumMod val="75000"/>
-                      </a:schemeClr>
-                    </a:solidFill>
-                  </a:tcPr>
-                </a:tc>
-                <a:extLst>
-                  <a:ext uri="{0D108BD9-81ED-4DB2-BD59-A6C34878D82A}">
-                    <a16:rowId xmlns:a16="http://schemas.microsoft.com/office/drawing/2014/main" val="3441804620"/>
-                  </a:ext>
-                </a:extLst>
-              </a:tr>
-              <a:tr h="384258">
-                <a:tc>
-                  <a:txBody>
-                    <a:bodyPr/>
-                    <a:lstStyle/>
-                    <a:p>
-                      <a:pPr algn="ctr" fontAlgn="t"/>
-                      <a:r>
-                        <a:rPr lang="en-US" sz="1200" b="0" i="0" u="none" strike="noStrike" kern="1200">
-                          <a:solidFill>
-                            <a:srgbClr val="002060"/>
-                          </a:solidFill>
-                          <a:effectLst/>
-                          <a:latin typeface="Intel Clear" panose="020B0604020203020204" pitchFamily="34" charset="0"/>
-                          <a:ea typeface="Intel Clear" panose="020B0604020203020204" pitchFamily="34" charset="0"/>
-                          <a:cs typeface="Intel Clear" panose="020B0604020203020204" pitchFamily="34" charset="0"/>
-                        </a:rPr>
-                        <a:t>WW18’21</a:t>
-                      </a:r>
-                    </a:p>
-                  </a:txBody>
-                  <a:tcPr marL="45720" marR="45720" marT="27432" marB="27432" anchor="ctr">
-                    <a:lnL w="19050" cap="flat" cmpd="sng" algn="ctr">
-                      <a:solidFill>
-                        <a:srgbClr val="002060"/>
-                      </a:solidFill>
-                      <a:prstDash val="solid"/>
-                      <a:round/>
-                      <a:headEnd type="none" w="med" len="med"/>
-                      <a:tailEnd type="none" w="med" len="med"/>
-                    </a:lnL>
-                    <a:lnR w="19050" cap="flat" cmpd="sng" algn="ctr">
-                      <a:solidFill>
-                        <a:srgbClr val="002060"/>
-                      </a:solidFill>
-                      <a:prstDash val="solid"/>
-                      <a:round/>
-                      <a:headEnd type="none" w="med" len="med"/>
-                      <a:tailEnd type="none" w="med" len="med"/>
-                    </a:lnR>
-                    <a:lnT w="19050" cap="flat" cmpd="sng" algn="ctr">
-                      <a:solidFill>
-                        <a:srgbClr val="002060"/>
-                      </a:solidFill>
-                      <a:prstDash val="solid"/>
-                      <a:round/>
-                      <a:headEnd type="none" w="med" len="med"/>
-                      <a:tailEnd type="none" w="med" len="med"/>
-                    </a:lnT>
-                    <a:lnB w="19050" cap="flat" cmpd="sng" algn="ctr">
-                      <a:solidFill>
-                        <a:srgbClr val="002060"/>
-                      </a:solidFill>
-                      <a:prstDash val="solid"/>
-                      <a:round/>
-                      <a:headEnd type="none" w="med" len="med"/>
-                      <a:tailEnd type="none" w="med" len="med"/>
-                    </a:lnB>
-                    <a:solidFill>
-                      <a:srgbClr val="00B050"/>
-                    </a:solidFill>
-                  </a:tcPr>
-                </a:tc>
-                <a:tc>
-                  <a:txBody>
-                    <a:bodyPr/>
-                    <a:lstStyle/>
-                    <a:p>
-                      <a:pPr algn="l" fontAlgn="t"/>
-                      <a:r>
-                        <a:rPr lang="en-US" sz="1200" b="0" i="0" u="none" strike="noStrike" dirty="0">
-                          <a:solidFill>
-                            <a:srgbClr val="002060"/>
-                          </a:solidFill>
-                          <a:effectLst/>
-                          <a:latin typeface="Intel Clear" panose="020B0604020203020204" pitchFamily="34" charset="0"/>
-                          <a:ea typeface="Intel Clear" panose="020B0604020203020204" pitchFamily="34" charset="0"/>
-                          <a:cs typeface="Intel Clear" panose="020B0604020203020204" pitchFamily="34" charset="0"/>
-                        </a:rPr>
-                        <a:t>Solution Definition/Target</a:t>
-                      </a:r>
-                    </a:p>
-                  </a:txBody>
-                  <a:tcPr marL="45720" marR="45720" marT="27432" marB="27432" anchor="ctr">
-                    <a:lnL w="19050" cap="flat" cmpd="sng" algn="ctr">
-                      <a:solidFill>
-                        <a:srgbClr val="002060"/>
-                      </a:solidFill>
-                      <a:prstDash val="solid"/>
-                      <a:round/>
-                      <a:headEnd type="none" w="med" len="med"/>
-                      <a:tailEnd type="none" w="med" len="med"/>
-                    </a:lnL>
-                    <a:lnR w="19050" cap="flat" cmpd="sng" algn="ctr">
-                      <a:solidFill>
-                        <a:srgbClr val="002060"/>
-                      </a:solidFill>
-                      <a:prstDash val="solid"/>
-                      <a:round/>
-                      <a:headEnd type="none" w="med" len="med"/>
-                      <a:tailEnd type="none" w="med" len="med"/>
-                    </a:lnR>
-                    <a:lnT w="19050" cap="flat" cmpd="sng" algn="ctr">
-                      <a:solidFill>
-                        <a:srgbClr val="002060"/>
-                      </a:solidFill>
-                      <a:prstDash val="solid"/>
-                      <a:round/>
-                      <a:headEnd type="none" w="med" len="med"/>
-                      <a:tailEnd type="none" w="med" len="med"/>
-                    </a:lnT>
-                    <a:lnB w="19050" cap="flat" cmpd="sng" algn="ctr">
-                      <a:solidFill>
-                        <a:srgbClr val="002060"/>
-                      </a:solidFill>
-                      <a:prstDash val="solid"/>
-                      <a:round/>
-                      <a:headEnd type="none" w="med" len="med"/>
-                      <a:tailEnd type="none" w="med" len="med"/>
-                    </a:lnB>
-                    <a:solidFill>
-                      <a:schemeClr val="bg1">
-                        <a:lumMod val="75000"/>
-                      </a:schemeClr>
-                    </a:solidFill>
-                  </a:tcPr>
-                </a:tc>
-                <a:extLst>
-                  <a:ext uri="{0D108BD9-81ED-4DB2-BD59-A6C34878D82A}">
-                    <a16:rowId xmlns:a16="http://schemas.microsoft.com/office/drawing/2014/main" val="3739074493"/>
-                  </a:ext>
-                </a:extLst>
-              </a:tr>
-              <a:tr h="384258">
-                <a:tc>
-                  <a:txBody>
-                    <a:bodyPr/>
-                    <a:lstStyle/>
-                    <a:p>
-                      <a:pPr algn="ctr" fontAlgn="t"/>
-                      <a:r>
-                        <a:rPr lang="en-US" sz="1200" b="0" i="0" u="none" strike="noStrike" kern="1200">
-                          <a:solidFill>
-                            <a:srgbClr val="002060"/>
-                          </a:solidFill>
-                          <a:effectLst/>
-                          <a:latin typeface="Intel Clear" panose="020B0604020203020204" pitchFamily="34" charset="0"/>
-                          <a:ea typeface="Intel Clear" panose="020B0604020203020204" pitchFamily="34" charset="0"/>
-                          <a:cs typeface="Intel Clear" panose="020B0604020203020204" pitchFamily="34" charset="0"/>
-                        </a:rPr>
-                        <a:t>WW20’21</a:t>
-                      </a:r>
-                    </a:p>
-                  </a:txBody>
-                  <a:tcPr marL="45720" marR="45720" marT="27432" marB="27432" anchor="ctr">
-                    <a:lnL w="19050" cap="flat" cmpd="sng" algn="ctr">
-                      <a:solidFill>
-                        <a:srgbClr val="002060"/>
-                      </a:solidFill>
-                      <a:prstDash val="solid"/>
-                      <a:round/>
-                      <a:headEnd type="none" w="med" len="med"/>
-                      <a:tailEnd type="none" w="med" len="med"/>
-                    </a:lnL>
-                    <a:lnR w="19050" cap="flat" cmpd="sng" algn="ctr">
-                      <a:solidFill>
-                        <a:srgbClr val="002060"/>
-                      </a:solidFill>
-                      <a:prstDash val="solid"/>
-                      <a:round/>
-                      <a:headEnd type="none" w="med" len="med"/>
-                      <a:tailEnd type="none" w="med" len="med"/>
-                    </a:lnR>
-                    <a:lnT w="19050" cap="flat" cmpd="sng" algn="ctr">
-                      <a:solidFill>
-                        <a:srgbClr val="002060"/>
-                      </a:solidFill>
-                      <a:prstDash val="solid"/>
-                      <a:round/>
-                      <a:headEnd type="none" w="med" len="med"/>
-                      <a:tailEnd type="none" w="med" len="med"/>
-                    </a:lnT>
-                    <a:lnB w="19050" cap="flat" cmpd="sng" algn="ctr">
-                      <a:solidFill>
-                        <a:srgbClr val="002060"/>
-                      </a:solidFill>
-                      <a:prstDash val="solid"/>
-                      <a:round/>
-                      <a:headEnd type="none" w="med" len="med"/>
-                      <a:tailEnd type="none" w="med" len="med"/>
-                    </a:lnB>
-                    <a:solidFill>
-                      <a:srgbClr val="FFFF00"/>
-                    </a:solidFill>
-                  </a:tcPr>
-                </a:tc>
-                <a:tc>
-                  <a:txBody>
-                    <a:bodyPr/>
-                    <a:lstStyle/>
-                    <a:p>
-                      <a:pPr marL="0" marR="0" lvl="0" indent="0" algn="l" defTabSz="609585" rtl="0" eaLnBrk="1" fontAlgn="t" latinLnBrk="0" hangingPunct="1">
-                        <a:lnSpc>
-                          <a:spcPct val="100000"/>
-                        </a:lnSpc>
-                        <a:spcBef>
-                          <a:spcPts val="0"/>
-                        </a:spcBef>
-                        <a:spcAft>
-                          <a:spcPts val="0"/>
-                        </a:spcAft>
-                        <a:buClrTx/>
-                        <a:buSzTx/>
-                        <a:buFontTx/>
-                        <a:buNone/>
-                        <a:tabLst/>
-                        <a:defRPr/>
-                      </a:pPr>
-                      <a:r>
-                        <a:rPr lang="en-US" sz="1200" b="0" i="0" u="none" strike="noStrike" dirty="0">
-                          <a:solidFill>
-                            <a:srgbClr val="002060"/>
-                          </a:solidFill>
-                          <a:effectLst/>
-                          <a:latin typeface="Intel Clear" panose="020B0604020203020204" pitchFamily="34" charset="0"/>
-                          <a:ea typeface="Intel Clear" panose="020B0604020203020204" pitchFamily="34" charset="0"/>
-                          <a:cs typeface="Intel Clear" panose="020B0604020203020204" pitchFamily="34" charset="0"/>
-                        </a:rPr>
-                        <a:t>Solution Definition/Target</a:t>
-                      </a:r>
-                    </a:p>
-                  </a:txBody>
-                  <a:tcPr marL="45720" marR="45720" marT="27432" marB="27432" anchor="ctr">
-                    <a:lnL w="19050" cap="flat" cmpd="sng" algn="ctr">
-                      <a:solidFill>
-                        <a:srgbClr val="002060"/>
-                      </a:solidFill>
-                      <a:prstDash val="solid"/>
-                      <a:round/>
-                      <a:headEnd type="none" w="med" len="med"/>
-                      <a:tailEnd type="none" w="med" len="med"/>
-                    </a:lnL>
-                    <a:lnR w="19050" cap="flat" cmpd="sng" algn="ctr">
-                      <a:solidFill>
-                        <a:srgbClr val="002060"/>
-                      </a:solidFill>
-                      <a:prstDash val="solid"/>
-                      <a:round/>
-                      <a:headEnd type="none" w="med" len="med"/>
-                      <a:tailEnd type="none" w="med" len="med"/>
-                    </a:lnR>
-                    <a:lnT w="19050" cap="flat" cmpd="sng" algn="ctr">
-                      <a:solidFill>
-                        <a:srgbClr val="002060"/>
-                      </a:solidFill>
-                      <a:prstDash val="solid"/>
-                      <a:round/>
-                      <a:headEnd type="none" w="med" len="med"/>
-                      <a:tailEnd type="none" w="med" len="med"/>
-                    </a:lnT>
-                    <a:lnB w="19050" cap="flat" cmpd="sng" algn="ctr">
-                      <a:solidFill>
-                        <a:srgbClr val="002060"/>
-                      </a:solidFill>
-                      <a:prstDash val="solid"/>
-                      <a:round/>
-                      <a:headEnd type="none" w="med" len="med"/>
-                      <a:tailEnd type="none" w="med" len="med"/>
-                    </a:lnB>
-                    <a:solidFill>
-                      <a:schemeClr val="bg1">
-                        <a:lumMod val="75000"/>
-                      </a:schemeClr>
-                    </a:solidFill>
-                  </a:tcPr>
-                </a:tc>
-                <a:extLst>
-                  <a:ext uri="{0D108BD9-81ED-4DB2-BD59-A6C34878D82A}">
-                    <a16:rowId xmlns:a16="http://schemas.microsoft.com/office/drawing/2014/main" val="957427569"/>
-                  </a:ext>
-                </a:extLst>
-              </a:tr>
-              <a:tr h="279532">
-                <a:tc>
-                  <a:txBody>
-                    <a:bodyPr/>
-                    <a:lstStyle/>
-                    <a:p>
-                      <a:pPr algn="ctr" fontAlgn="t"/>
-                      <a:r>
-                        <a:rPr lang="en-US" sz="1200" b="0" i="0" u="none" strike="noStrike" kern="1200">
-                          <a:solidFill>
-                            <a:srgbClr val="002060"/>
-                          </a:solidFill>
-                          <a:effectLst/>
-                          <a:latin typeface="Intel Clear" panose="020B0604020203020204" pitchFamily="34" charset="0"/>
-                          <a:ea typeface="Intel Clear" panose="020B0604020203020204" pitchFamily="34" charset="0"/>
-                          <a:cs typeface="Intel Clear" panose="020B0604020203020204" pitchFamily="34" charset="0"/>
-                        </a:rPr>
-                        <a:t>WW21’21</a:t>
-                      </a:r>
-                    </a:p>
-                  </a:txBody>
-                  <a:tcPr marL="45720" marR="45720" marT="27432" marB="27432" anchor="ctr">
-                    <a:lnL w="19050" cap="flat" cmpd="sng" algn="ctr">
-                      <a:solidFill>
-                        <a:srgbClr val="002060"/>
-                      </a:solidFill>
-                      <a:prstDash val="solid"/>
-                      <a:round/>
-                      <a:headEnd type="none" w="med" len="med"/>
-                      <a:tailEnd type="none" w="med" len="med"/>
-                    </a:lnL>
-                    <a:lnR w="19050" cap="flat" cmpd="sng" algn="ctr">
-                      <a:solidFill>
-                        <a:srgbClr val="002060"/>
-                      </a:solidFill>
-                      <a:prstDash val="solid"/>
-                      <a:round/>
-                      <a:headEnd type="none" w="med" len="med"/>
-                      <a:tailEnd type="none" w="med" len="med"/>
-                    </a:lnR>
-                    <a:lnT w="19050" cap="flat" cmpd="sng" algn="ctr">
-                      <a:solidFill>
-                        <a:srgbClr val="002060"/>
-                      </a:solidFill>
-                      <a:prstDash val="solid"/>
-                      <a:round/>
-                      <a:headEnd type="none" w="med" len="med"/>
-                      <a:tailEnd type="none" w="med" len="med"/>
-                    </a:lnT>
-                    <a:lnB w="19050" cap="flat" cmpd="sng" algn="ctr">
-                      <a:solidFill>
-                        <a:srgbClr val="002060"/>
-                      </a:solidFill>
-                      <a:prstDash val="solid"/>
-                      <a:round/>
-                      <a:headEnd type="none" w="med" len="med"/>
-                      <a:tailEnd type="none" w="med" len="med"/>
-                    </a:lnB>
-                    <a:solidFill>
-                      <a:srgbClr val="FFFF00"/>
-                    </a:solidFill>
-                  </a:tcPr>
-                </a:tc>
-                <a:tc>
-                  <a:txBody>
-                    <a:bodyPr/>
-                    <a:lstStyle/>
-                    <a:p>
-                      <a:pPr algn="l" fontAlgn="t"/>
-                      <a:r>
-                        <a:rPr lang="en-US" sz="1200" b="0" i="0" u="none" strike="noStrike" dirty="0">
-                          <a:solidFill>
-                            <a:srgbClr val="002060"/>
-                          </a:solidFill>
-                          <a:effectLst/>
-                          <a:latin typeface="Intel Clear" panose="020B0604020203020204" pitchFamily="34" charset="0"/>
-                          <a:ea typeface="Intel Clear" panose="020B0604020203020204" pitchFamily="34" charset="0"/>
-                          <a:cs typeface="Intel Clear" panose="020B0604020203020204" pitchFamily="34" charset="0"/>
-                        </a:rPr>
-                        <a:t>Solution Definition/Target</a:t>
-                      </a:r>
-                    </a:p>
-                  </a:txBody>
-                  <a:tcPr marL="45720" marR="45720" marT="27432" marB="27432" anchor="ctr">
-                    <a:lnL w="19050" cap="flat" cmpd="sng" algn="ctr">
-                      <a:solidFill>
-                        <a:srgbClr val="002060"/>
-                      </a:solidFill>
-                      <a:prstDash val="solid"/>
-                      <a:round/>
-                      <a:headEnd type="none" w="med" len="med"/>
-                      <a:tailEnd type="none" w="med" len="med"/>
-                    </a:lnL>
-                    <a:lnR w="19050" cap="flat" cmpd="sng" algn="ctr">
-                      <a:solidFill>
-                        <a:srgbClr val="002060"/>
-                      </a:solidFill>
-                      <a:prstDash val="solid"/>
-                      <a:round/>
-                      <a:headEnd type="none" w="med" len="med"/>
-                      <a:tailEnd type="none" w="med" len="med"/>
-                    </a:lnR>
-                    <a:lnT w="19050" cap="flat" cmpd="sng" algn="ctr">
-                      <a:solidFill>
-                        <a:srgbClr val="002060"/>
-                      </a:solidFill>
-                      <a:prstDash val="solid"/>
-                      <a:round/>
-                      <a:headEnd type="none" w="med" len="med"/>
-                      <a:tailEnd type="none" w="med" len="med"/>
-                    </a:lnT>
-                    <a:lnB w="19050" cap="flat" cmpd="sng" algn="ctr">
-                      <a:solidFill>
-                        <a:srgbClr val="002060"/>
-                      </a:solidFill>
-                      <a:prstDash val="solid"/>
-                      <a:round/>
-                      <a:headEnd type="none" w="med" len="med"/>
-                      <a:tailEnd type="none" w="med" len="med"/>
-                    </a:lnB>
-                    <a:solidFill>
-                      <a:schemeClr val="bg1">
-                        <a:lumMod val="75000"/>
-                      </a:schemeClr>
-                    </a:solidFill>
-                  </a:tcPr>
-                </a:tc>
-                <a:extLst>
-                  <a:ext uri="{0D108BD9-81ED-4DB2-BD59-A6C34878D82A}">
-                    <a16:rowId xmlns:a16="http://schemas.microsoft.com/office/drawing/2014/main" val="3720747807"/>
-                  </a:ext>
-                </a:extLst>
-              </a:tr>
-              <a:tr h="279532">
-                <a:tc>
-                  <a:txBody>
-                    <a:bodyPr/>
-                    <a:lstStyle/>
-                    <a:p>
-                      <a:pPr algn="ctr" fontAlgn="t"/>
-                      <a:r>
-                        <a:rPr lang="en-US" sz="1200" b="0" i="0" u="none" strike="noStrike" kern="1200">
-                          <a:solidFill>
-                            <a:srgbClr val="002060"/>
-                          </a:solidFill>
-                          <a:effectLst/>
-                          <a:latin typeface="Intel Clear" panose="020B0604020203020204" pitchFamily="34" charset="0"/>
-                          <a:ea typeface="Intel Clear" panose="020B0604020203020204" pitchFamily="34" charset="0"/>
-                          <a:cs typeface="Intel Clear" panose="020B0604020203020204" pitchFamily="34" charset="0"/>
-                        </a:rPr>
-                        <a:t>WW23’21</a:t>
-                      </a:r>
-                    </a:p>
-                  </a:txBody>
-                  <a:tcPr marL="45720" marR="45720" marT="27432" marB="27432" anchor="ctr">
-                    <a:lnL w="19050" cap="flat" cmpd="sng" algn="ctr">
-                      <a:solidFill>
-                        <a:srgbClr val="002060"/>
-                      </a:solidFill>
-                      <a:prstDash val="solid"/>
-                      <a:round/>
-                      <a:headEnd type="none" w="med" len="med"/>
-                      <a:tailEnd type="none" w="med" len="med"/>
-                    </a:lnL>
-                    <a:lnR w="19050" cap="flat" cmpd="sng" algn="ctr">
-                      <a:solidFill>
-                        <a:srgbClr val="002060"/>
-                      </a:solidFill>
-                      <a:prstDash val="solid"/>
-                      <a:round/>
-                      <a:headEnd type="none" w="med" len="med"/>
-                      <a:tailEnd type="none" w="med" len="med"/>
-                    </a:lnR>
-                    <a:lnT w="19050" cap="flat" cmpd="sng" algn="ctr">
-                      <a:solidFill>
-                        <a:srgbClr val="002060"/>
-                      </a:solidFill>
-                      <a:prstDash val="solid"/>
-                      <a:round/>
-                      <a:headEnd type="none" w="med" len="med"/>
-                      <a:tailEnd type="none" w="med" len="med"/>
-                    </a:lnT>
-                    <a:lnB w="19050" cap="flat" cmpd="sng" algn="ctr">
-                      <a:solidFill>
-                        <a:srgbClr val="002060"/>
-                      </a:solidFill>
-                      <a:prstDash val="solid"/>
-                      <a:round/>
-                      <a:headEnd type="none" w="med" len="med"/>
-                      <a:tailEnd type="none" w="med" len="med"/>
-                    </a:lnB>
-                    <a:solidFill>
-                      <a:schemeClr val="bg1">
-                        <a:lumMod val="75000"/>
-                      </a:schemeClr>
-                    </a:solidFill>
-                  </a:tcPr>
-                </a:tc>
-                <a:tc>
-                  <a:txBody>
-                    <a:bodyPr/>
-                    <a:lstStyle/>
-                    <a:p>
-                      <a:pPr algn="l" fontAlgn="t"/>
-                      <a:r>
-                        <a:rPr lang="en-US" sz="1200" b="0" i="0" u="none" strike="noStrike" dirty="0">
-                          <a:solidFill>
-                            <a:srgbClr val="002060"/>
-                          </a:solidFill>
-                          <a:effectLst/>
-                          <a:latin typeface="Intel Clear" panose="020B0604020203020204" pitchFamily="34" charset="0"/>
-                          <a:ea typeface="Intel Clear" panose="020B0604020203020204" pitchFamily="34" charset="0"/>
-                          <a:cs typeface="Intel Clear" panose="020B0604020203020204" pitchFamily="34" charset="0"/>
-                        </a:rPr>
-                        <a:t>Solution Definition/Target</a:t>
-                      </a:r>
-                    </a:p>
-                  </a:txBody>
-                  <a:tcPr marL="45720" marR="45720" marT="27432" marB="27432" anchor="ctr">
-                    <a:lnL w="19050" cap="flat" cmpd="sng" algn="ctr">
-                      <a:solidFill>
-                        <a:srgbClr val="002060"/>
-                      </a:solidFill>
-                      <a:prstDash val="solid"/>
-                      <a:round/>
-                      <a:headEnd type="none" w="med" len="med"/>
-                      <a:tailEnd type="none" w="med" len="med"/>
-                    </a:lnL>
-                    <a:lnR w="19050" cap="flat" cmpd="sng" algn="ctr">
-                      <a:solidFill>
-                        <a:srgbClr val="002060"/>
-                      </a:solidFill>
-                      <a:prstDash val="solid"/>
-                      <a:round/>
-                      <a:headEnd type="none" w="med" len="med"/>
-                      <a:tailEnd type="none" w="med" len="med"/>
-                    </a:lnR>
-                    <a:lnT w="19050" cap="flat" cmpd="sng" algn="ctr">
-                      <a:solidFill>
-                        <a:srgbClr val="002060"/>
-                      </a:solidFill>
-                      <a:prstDash val="solid"/>
-                      <a:round/>
-                      <a:headEnd type="none" w="med" len="med"/>
-                      <a:tailEnd type="none" w="med" len="med"/>
-                    </a:lnT>
-                    <a:lnB w="19050" cap="flat" cmpd="sng" algn="ctr">
-                      <a:solidFill>
-                        <a:srgbClr val="002060"/>
-                      </a:solidFill>
-                      <a:prstDash val="solid"/>
-                      <a:round/>
-                      <a:headEnd type="none" w="med" len="med"/>
-                      <a:tailEnd type="none" w="med" len="med"/>
-                    </a:lnB>
-                    <a:solidFill>
-                      <a:schemeClr val="bg1">
-                        <a:lumMod val="75000"/>
-                      </a:schemeClr>
-                    </a:solidFill>
-                  </a:tcPr>
-                </a:tc>
-                <a:extLst>
-                  <a:ext uri="{0D108BD9-81ED-4DB2-BD59-A6C34878D82A}">
-                    <a16:rowId xmlns:a16="http://schemas.microsoft.com/office/drawing/2014/main" val="887984837"/>
-                  </a:ext>
-                </a:extLst>
-              </a:tr>
-              <a:tr h="279532">
-                <a:tc>
-                  <a:txBody>
-                    <a:bodyPr/>
-                    <a:lstStyle/>
-                    <a:p>
-                      <a:pPr algn="ctr" fontAlgn="t"/>
-                      <a:r>
-                        <a:rPr lang="en-US" sz="1200" b="0" i="0" u="none" strike="noStrike" kern="1200">
-                          <a:solidFill>
-                            <a:srgbClr val="002060"/>
-                          </a:solidFill>
-                          <a:effectLst/>
-                          <a:latin typeface="Intel Clear" panose="020B0604020203020204" pitchFamily="34" charset="0"/>
-                          <a:ea typeface="Intel Clear" panose="020B0604020203020204" pitchFamily="34" charset="0"/>
-                          <a:cs typeface="Intel Clear" panose="020B0604020203020204" pitchFamily="34" charset="0"/>
-                        </a:rPr>
-                        <a:t>WW24’21</a:t>
-                      </a:r>
-                    </a:p>
-                  </a:txBody>
-                  <a:tcPr marL="45720" marR="45720" marT="27432" marB="27432" anchor="ctr">
-                    <a:lnL w="19050" cap="flat" cmpd="sng" algn="ctr">
-                      <a:solidFill>
-                        <a:srgbClr val="002060"/>
-                      </a:solidFill>
-                      <a:prstDash val="solid"/>
-                      <a:round/>
-                      <a:headEnd type="none" w="med" len="med"/>
-                      <a:tailEnd type="none" w="med" len="med"/>
-                    </a:lnL>
-                    <a:lnR w="19050" cap="flat" cmpd="sng" algn="ctr">
-                      <a:solidFill>
-                        <a:srgbClr val="002060"/>
-                      </a:solidFill>
-                      <a:prstDash val="solid"/>
-                      <a:round/>
-                      <a:headEnd type="none" w="med" len="med"/>
-                      <a:tailEnd type="none" w="med" len="med"/>
-                    </a:lnR>
-                    <a:lnT w="19050" cap="flat" cmpd="sng" algn="ctr">
-                      <a:solidFill>
-                        <a:srgbClr val="002060"/>
-                      </a:solidFill>
-                      <a:prstDash val="solid"/>
-                      <a:round/>
-                      <a:headEnd type="none" w="med" len="med"/>
-                      <a:tailEnd type="none" w="med" len="med"/>
-                    </a:lnT>
-                    <a:lnB w="19050" cap="flat" cmpd="sng" algn="ctr">
-                      <a:solidFill>
-                        <a:srgbClr val="002060"/>
-                      </a:solidFill>
-                      <a:prstDash val="solid"/>
-                      <a:round/>
-                      <a:headEnd type="none" w="med" len="med"/>
-                      <a:tailEnd type="none" w="med" len="med"/>
-                    </a:lnB>
-                    <a:solidFill>
-                      <a:schemeClr val="bg1">
-                        <a:lumMod val="75000"/>
-                      </a:schemeClr>
-                    </a:solidFill>
-                  </a:tcPr>
-                </a:tc>
-                <a:tc>
-                  <a:txBody>
-                    <a:bodyPr/>
-                    <a:lstStyle/>
-                    <a:p>
-                      <a:pPr marL="0" marR="0" lvl="0" indent="0" algn="l" defTabSz="914400" rtl="0" eaLnBrk="1" fontAlgn="t" latinLnBrk="0" hangingPunct="1">
-                        <a:lnSpc>
-                          <a:spcPct val="100000"/>
-                        </a:lnSpc>
-                        <a:spcBef>
-                          <a:spcPts val="0"/>
-                        </a:spcBef>
-                        <a:spcAft>
-                          <a:spcPts val="0"/>
-                        </a:spcAft>
-                        <a:buClrTx/>
-                        <a:buSzTx/>
-                        <a:buFontTx/>
-                        <a:buNone/>
-                        <a:tabLst/>
-                        <a:defRPr/>
-                      </a:pPr>
-                      <a:r>
-                        <a:rPr kumimoji="0" lang="en-US" sz="1200" b="0" i="0" u="none" strike="noStrike" kern="1200" cap="none" spc="0" normalizeH="0" baseline="0" noProof="0">
-                          <a:ln>
-                            <a:noFill/>
-                          </a:ln>
-                          <a:solidFill>
-                            <a:srgbClr val="002060"/>
-                          </a:solidFill>
-                          <a:effectLst/>
-                          <a:uLnTx/>
-                          <a:uFillTx/>
-                          <a:latin typeface="Intel Clear" panose="020B0604020203020204" pitchFamily="34" charset="0"/>
-                          <a:ea typeface="Intel Clear" panose="020B0604020203020204" pitchFamily="34" charset="0"/>
-                          <a:cs typeface="Intel Clear" panose="020B0604020203020204" pitchFamily="34" charset="0"/>
-                        </a:rPr>
-                        <a:t>Solution Definition/Target</a:t>
-                      </a:r>
-                      <a:endParaRPr kumimoji="0" lang="en-US" sz="1200" b="0" i="0" u="none" strike="noStrike" kern="1200" cap="none" spc="0" normalizeH="0" baseline="0" noProof="0" dirty="0">
-                        <a:ln>
-                          <a:noFill/>
-                        </a:ln>
-                        <a:solidFill>
-                          <a:srgbClr val="002060"/>
-                        </a:solidFill>
-                        <a:effectLst/>
-                        <a:uLnTx/>
-                        <a:uFillTx/>
-                        <a:latin typeface="Intel Clear" panose="020B0604020203020204" pitchFamily="34" charset="0"/>
-                        <a:ea typeface="Intel Clear" panose="020B0604020203020204" pitchFamily="34" charset="0"/>
-                        <a:cs typeface="Intel Clear" panose="020B0604020203020204" pitchFamily="34" charset="0"/>
-                      </a:endParaRPr>
-                    </a:p>
-                  </a:txBody>
-                  <a:tcPr marL="45720" marR="45720" marT="27432" marB="27432" anchor="ctr">
-                    <a:lnL w="19050" cap="flat" cmpd="sng" algn="ctr">
-                      <a:solidFill>
-                        <a:srgbClr val="002060"/>
-                      </a:solidFill>
-                      <a:prstDash val="solid"/>
-                      <a:round/>
-                      <a:headEnd type="none" w="med" len="med"/>
-                      <a:tailEnd type="none" w="med" len="med"/>
-                    </a:lnL>
-                    <a:lnR w="19050" cap="flat" cmpd="sng" algn="ctr">
-                      <a:solidFill>
-                        <a:srgbClr val="002060"/>
-                      </a:solidFill>
-                      <a:prstDash val="solid"/>
-                      <a:round/>
-                      <a:headEnd type="none" w="med" len="med"/>
-                      <a:tailEnd type="none" w="med" len="med"/>
-                    </a:lnR>
-                    <a:lnT w="19050" cap="flat" cmpd="sng" algn="ctr">
-                      <a:solidFill>
-                        <a:srgbClr val="002060"/>
-                      </a:solidFill>
-                      <a:prstDash val="solid"/>
-                      <a:round/>
-                      <a:headEnd type="none" w="med" len="med"/>
-                      <a:tailEnd type="none" w="med" len="med"/>
-                    </a:lnT>
-                    <a:lnB w="19050" cap="flat" cmpd="sng" algn="ctr">
-                      <a:solidFill>
-                        <a:srgbClr val="002060"/>
-                      </a:solidFill>
-                      <a:prstDash val="solid"/>
-                      <a:round/>
-                      <a:headEnd type="none" w="med" len="med"/>
-                      <a:tailEnd type="none" w="med" len="med"/>
-                    </a:lnB>
-                    <a:solidFill>
-                      <a:schemeClr val="bg1">
-                        <a:lumMod val="75000"/>
-                      </a:schemeClr>
-                    </a:solidFill>
-                  </a:tcPr>
-                </a:tc>
-                <a:extLst>
-                  <a:ext uri="{0D108BD9-81ED-4DB2-BD59-A6C34878D82A}">
-                    <a16:rowId xmlns:a16="http://schemas.microsoft.com/office/drawing/2014/main" val="2686325800"/>
-                  </a:ext>
-                </a:extLst>
-              </a:tr>
-              <a:tr h="279532">
-                <a:tc>
-                  <a:txBody>
-                    <a:bodyPr/>
-                    <a:lstStyle/>
-                    <a:p>
-                      <a:pPr algn="ctr" fontAlgn="t"/>
-                      <a:r>
-                        <a:rPr lang="en-US" sz="1200" b="0" i="0" u="none" strike="noStrike" kern="1200">
-                          <a:solidFill>
-                            <a:srgbClr val="002060"/>
-                          </a:solidFill>
-                          <a:effectLst/>
-                          <a:latin typeface="Intel Clear" panose="020B0604020203020204" pitchFamily="34" charset="0"/>
-                          <a:ea typeface="Intel Clear" panose="020B0604020203020204" pitchFamily="34" charset="0"/>
-                          <a:cs typeface="Intel Clear" panose="020B0604020203020204" pitchFamily="34" charset="0"/>
-                        </a:rPr>
-                        <a:t>WW25’21</a:t>
-                      </a:r>
-                    </a:p>
-                  </a:txBody>
-                  <a:tcPr marL="45720" marR="45720" marT="27432" marB="27432" anchor="ctr">
-                    <a:lnL w="19050" cap="flat" cmpd="sng" algn="ctr">
-                      <a:solidFill>
-                        <a:srgbClr val="002060"/>
-                      </a:solidFill>
-                      <a:prstDash val="solid"/>
-                      <a:round/>
-                      <a:headEnd type="none" w="med" len="med"/>
-                      <a:tailEnd type="none" w="med" len="med"/>
-                    </a:lnL>
-                    <a:lnR w="19050" cap="flat" cmpd="sng" algn="ctr">
-                      <a:solidFill>
-                        <a:srgbClr val="002060"/>
-                      </a:solidFill>
-                      <a:prstDash val="solid"/>
-                      <a:round/>
-                      <a:headEnd type="none" w="med" len="med"/>
-                      <a:tailEnd type="none" w="med" len="med"/>
-                    </a:lnR>
-                    <a:lnT w="19050" cap="flat" cmpd="sng" algn="ctr">
-                      <a:solidFill>
-                        <a:srgbClr val="002060"/>
-                      </a:solidFill>
-                      <a:prstDash val="solid"/>
-                      <a:round/>
-                      <a:headEnd type="none" w="med" len="med"/>
-                      <a:tailEnd type="none" w="med" len="med"/>
-                    </a:lnT>
-                    <a:lnB w="19050" cap="flat" cmpd="sng" algn="ctr">
-                      <a:solidFill>
-                        <a:srgbClr val="002060"/>
-                      </a:solidFill>
-                      <a:prstDash val="solid"/>
-                      <a:round/>
-                      <a:headEnd type="none" w="med" len="med"/>
-                      <a:tailEnd type="none" w="med" len="med"/>
-                    </a:lnB>
-                    <a:solidFill>
-                      <a:schemeClr val="bg1">
-                        <a:lumMod val="75000"/>
-                      </a:schemeClr>
-                    </a:solidFill>
-                  </a:tcPr>
-                </a:tc>
-                <a:tc>
-                  <a:txBody>
-                    <a:bodyPr/>
-                    <a:lstStyle/>
-                    <a:p>
-                      <a:pPr marL="0" marR="0" lvl="0" indent="0" algn="l" defTabSz="914400" rtl="0" eaLnBrk="1" fontAlgn="t" latinLnBrk="0" hangingPunct="1">
-                        <a:lnSpc>
-                          <a:spcPct val="100000"/>
-                        </a:lnSpc>
-                        <a:spcBef>
-                          <a:spcPts val="0"/>
-                        </a:spcBef>
-                        <a:spcAft>
-                          <a:spcPts val="0"/>
-                        </a:spcAft>
-                        <a:buClrTx/>
-                        <a:buSzTx/>
-                        <a:buFontTx/>
-                        <a:buNone/>
-                        <a:tabLst/>
-                        <a:defRPr/>
-                      </a:pPr>
-                      <a:r>
-                        <a:rPr kumimoji="0" lang="en-US" sz="1200" b="0" i="0" u="none" strike="noStrike" kern="1200" cap="none" spc="0" normalizeH="0" baseline="0" noProof="0">
-                          <a:ln>
-                            <a:noFill/>
-                          </a:ln>
-                          <a:solidFill>
-                            <a:srgbClr val="002060"/>
-                          </a:solidFill>
-                          <a:effectLst/>
-                          <a:uLnTx/>
-                          <a:uFillTx/>
-                          <a:latin typeface="Intel Clear" panose="020B0604020203020204" pitchFamily="34" charset="0"/>
-                          <a:ea typeface="Intel Clear" panose="020B0604020203020204" pitchFamily="34" charset="0"/>
-                          <a:cs typeface="Intel Clear" panose="020B0604020203020204" pitchFamily="34" charset="0"/>
-                        </a:rPr>
-                        <a:t>Solution Definition/Target</a:t>
-                      </a:r>
-                      <a:endParaRPr kumimoji="0" lang="en-US" sz="1200" b="0" i="0" u="none" strike="noStrike" kern="1200" cap="none" spc="0" normalizeH="0" baseline="0" noProof="0" dirty="0">
-                        <a:ln>
-                          <a:noFill/>
-                        </a:ln>
-                        <a:solidFill>
-                          <a:srgbClr val="002060"/>
-                        </a:solidFill>
-                        <a:effectLst/>
-                        <a:uLnTx/>
-                        <a:uFillTx/>
-                        <a:latin typeface="Intel Clear" panose="020B0604020203020204" pitchFamily="34" charset="0"/>
-                        <a:ea typeface="Intel Clear" panose="020B0604020203020204" pitchFamily="34" charset="0"/>
-                        <a:cs typeface="Intel Clear" panose="020B0604020203020204" pitchFamily="34" charset="0"/>
-                      </a:endParaRPr>
-                    </a:p>
-                  </a:txBody>
-                  <a:tcPr marL="45720" marR="45720" marT="27432" marB="27432" anchor="ctr">
-                    <a:lnL w="19050" cap="flat" cmpd="sng" algn="ctr">
-                      <a:solidFill>
-                        <a:srgbClr val="002060"/>
-                      </a:solidFill>
-                      <a:prstDash val="solid"/>
-                      <a:round/>
-                      <a:headEnd type="none" w="med" len="med"/>
-                      <a:tailEnd type="none" w="med" len="med"/>
-                    </a:lnL>
-                    <a:lnR w="19050" cap="flat" cmpd="sng" algn="ctr">
-                      <a:solidFill>
-                        <a:srgbClr val="002060"/>
-                      </a:solidFill>
-                      <a:prstDash val="solid"/>
-                      <a:round/>
-                      <a:headEnd type="none" w="med" len="med"/>
-                      <a:tailEnd type="none" w="med" len="med"/>
-                    </a:lnR>
-                    <a:lnT w="19050" cap="flat" cmpd="sng" algn="ctr">
-                      <a:solidFill>
-                        <a:srgbClr val="002060"/>
-                      </a:solidFill>
-                      <a:prstDash val="solid"/>
-                      <a:round/>
-                      <a:headEnd type="none" w="med" len="med"/>
-                      <a:tailEnd type="none" w="med" len="med"/>
-                    </a:lnT>
-                    <a:lnB w="19050" cap="flat" cmpd="sng" algn="ctr">
-                      <a:solidFill>
-                        <a:srgbClr val="002060"/>
-                      </a:solidFill>
-                      <a:prstDash val="solid"/>
-                      <a:round/>
-                      <a:headEnd type="none" w="med" len="med"/>
-                      <a:tailEnd type="none" w="med" len="med"/>
-                    </a:lnB>
-                    <a:solidFill>
-                      <a:schemeClr val="bg1">
-                        <a:lumMod val="75000"/>
-                      </a:schemeClr>
-                    </a:solidFill>
-                  </a:tcPr>
-                </a:tc>
-                <a:extLst>
-                  <a:ext uri="{0D108BD9-81ED-4DB2-BD59-A6C34878D82A}">
-                    <a16:rowId xmlns:a16="http://schemas.microsoft.com/office/drawing/2014/main" val="1557349350"/>
-                  </a:ext>
-                </a:extLst>
-              </a:tr>
-              <a:tr h="279532">
-                <a:tc>
-                  <a:txBody>
-                    <a:bodyPr/>
-                    <a:lstStyle/>
-                    <a:p>
-                      <a:pPr algn="ctr" fontAlgn="t"/>
-                      <a:r>
-                        <a:rPr lang="en-US" sz="1200" b="0" i="0" u="none" strike="noStrike" kern="1200">
-                          <a:solidFill>
-                            <a:srgbClr val="002060"/>
-                          </a:solidFill>
-                          <a:effectLst/>
-                          <a:latin typeface="Intel Clear" panose="020B0604020203020204" pitchFamily="34" charset="0"/>
-                          <a:ea typeface="Intel Clear" panose="020B0604020203020204" pitchFamily="34" charset="0"/>
-                          <a:cs typeface="Intel Clear" panose="020B0604020203020204" pitchFamily="34" charset="0"/>
-                        </a:rPr>
-                        <a:t>WW30’21</a:t>
-                      </a:r>
-                    </a:p>
-                  </a:txBody>
-                  <a:tcPr marL="45720" marR="45720" marT="27432" marB="27432" anchor="ctr">
-                    <a:lnL w="19050" cap="flat" cmpd="sng" algn="ctr">
-                      <a:solidFill>
-                        <a:srgbClr val="002060"/>
-                      </a:solidFill>
-                      <a:prstDash val="solid"/>
-                      <a:round/>
-                      <a:headEnd type="none" w="med" len="med"/>
-                      <a:tailEnd type="none" w="med" len="med"/>
-                    </a:lnL>
-                    <a:lnR w="19050" cap="flat" cmpd="sng" algn="ctr">
-                      <a:solidFill>
-                        <a:srgbClr val="002060"/>
-                      </a:solidFill>
-                      <a:prstDash val="solid"/>
-                      <a:round/>
-                      <a:headEnd type="none" w="med" len="med"/>
-                      <a:tailEnd type="none" w="med" len="med"/>
-                    </a:lnR>
-                    <a:lnT w="19050" cap="flat" cmpd="sng" algn="ctr">
-                      <a:solidFill>
-                        <a:srgbClr val="002060"/>
-                      </a:solidFill>
-                      <a:prstDash val="solid"/>
-                      <a:round/>
-                      <a:headEnd type="none" w="med" len="med"/>
-                      <a:tailEnd type="none" w="med" len="med"/>
-                    </a:lnT>
-                    <a:lnB w="19050" cap="flat" cmpd="sng" algn="ctr">
-                      <a:solidFill>
-                        <a:srgbClr val="002060"/>
-                      </a:solidFill>
-                      <a:prstDash val="solid"/>
-                      <a:round/>
-                      <a:headEnd type="none" w="med" len="med"/>
-                      <a:tailEnd type="none" w="med" len="med"/>
-                    </a:lnB>
-                    <a:solidFill>
-                      <a:schemeClr val="bg1">
-                        <a:lumMod val="75000"/>
-                      </a:schemeClr>
-                    </a:solidFill>
-                  </a:tcPr>
-                </a:tc>
-                <a:tc>
-                  <a:txBody>
-                    <a:bodyPr/>
-                    <a:lstStyle/>
-                    <a:p>
-                      <a:pPr marL="0" marR="0" lvl="0" indent="0" algn="l" defTabSz="914400" rtl="0" eaLnBrk="1" fontAlgn="t" latinLnBrk="0" hangingPunct="1">
-                        <a:lnSpc>
-                          <a:spcPct val="100000"/>
-                        </a:lnSpc>
-                        <a:spcBef>
-                          <a:spcPts val="0"/>
-                        </a:spcBef>
-                        <a:spcAft>
-                          <a:spcPts val="0"/>
-                        </a:spcAft>
-                        <a:buClrTx/>
-                        <a:buSzTx/>
-                        <a:buFontTx/>
-                        <a:buNone/>
-                        <a:tabLst/>
-                        <a:defRPr/>
-                      </a:pPr>
-                      <a:r>
-                        <a:rPr kumimoji="0" lang="en-US" sz="1200" b="0" i="0" u="none" strike="noStrike" kern="1200" cap="none" spc="0" normalizeH="0" baseline="0" noProof="0">
-                          <a:ln>
-                            <a:noFill/>
-                          </a:ln>
-                          <a:solidFill>
-                            <a:srgbClr val="002060"/>
-                          </a:solidFill>
-                          <a:effectLst/>
-                          <a:uLnTx/>
-                          <a:uFillTx/>
-                          <a:latin typeface="Intel Clear" panose="020B0604020203020204" pitchFamily="34" charset="0"/>
-                          <a:ea typeface="Intel Clear" panose="020B0604020203020204" pitchFamily="34" charset="0"/>
-                          <a:cs typeface="Intel Clear" panose="020B0604020203020204" pitchFamily="34" charset="0"/>
-                        </a:rPr>
-                        <a:t>Solution Definition/Target</a:t>
-                      </a:r>
-                      <a:endParaRPr kumimoji="0" lang="en-US" sz="1200" b="0" i="0" u="none" strike="noStrike" kern="1200" cap="none" spc="0" normalizeH="0" baseline="0" noProof="0" dirty="0">
-                        <a:ln>
-                          <a:noFill/>
-                        </a:ln>
-                        <a:solidFill>
-                          <a:srgbClr val="002060"/>
-                        </a:solidFill>
-                        <a:effectLst/>
-                        <a:uLnTx/>
-                        <a:uFillTx/>
-                        <a:latin typeface="Intel Clear" panose="020B0604020203020204" pitchFamily="34" charset="0"/>
-                        <a:ea typeface="Intel Clear" panose="020B0604020203020204" pitchFamily="34" charset="0"/>
-                        <a:cs typeface="Intel Clear" panose="020B0604020203020204" pitchFamily="34" charset="0"/>
-                      </a:endParaRPr>
-                    </a:p>
-                  </a:txBody>
-                  <a:tcPr marL="45720" marR="45720" marT="27432" marB="27432" anchor="ctr">
-                    <a:lnL w="19050" cap="flat" cmpd="sng" algn="ctr">
-                      <a:solidFill>
-                        <a:srgbClr val="002060"/>
-                      </a:solidFill>
-                      <a:prstDash val="solid"/>
-                      <a:round/>
-                      <a:headEnd type="none" w="med" len="med"/>
-                      <a:tailEnd type="none" w="med" len="med"/>
-                    </a:lnL>
-                    <a:lnR w="19050" cap="flat" cmpd="sng" algn="ctr">
-                      <a:solidFill>
-                        <a:srgbClr val="002060"/>
-                      </a:solidFill>
-                      <a:prstDash val="solid"/>
-                      <a:round/>
-                      <a:headEnd type="none" w="med" len="med"/>
-                      <a:tailEnd type="none" w="med" len="med"/>
-                    </a:lnR>
-                    <a:lnT w="19050" cap="flat" cmpd="sng" algn="ctr">
-                      <a:solidFill>
-                        <a:srgbClr val="002060"/>
-                      </a:solidFill>
-                      <a:prstDash val="solid"/>
-                      <a:round/>
-                      <a:headEnd type="none" w="med" len="med"/>
-                      <a:tailEnd type="none" w="med" len="med"/>
-                    </a:lnT>
-                    <a:lnB w="19050" cap="flat" cmpd="sng" algn="ctr">
-                      <a:solidFill>
-                        <a:srgbClr val="002060"/>
-                      </a:solidFill>
-                      <a:prstDash val="solid"/>
-                      <a:round/>
-                      <a:headEnd type="none" w="med" len="med"/>
-                      <a:tailEnd type="none" w="med" len="med"/>
-                    </a:lnB>
-                    <a:solidFill>
-                      <a:schemeClr val="bg1">
-                        <a:lumMod val="75000"/>
-                      </a:schemeClr>
-                    </a:solidFill>
-                  </a:tcPr>
-                </a:tc>
-                <a:extLst>
-                  <a:ext uri="{0D108BD9-81ED-4DB2-BD59-A6C34878D82A}">
-                    <a16:rowId xmlns:a16="http://schemas.microsoft.com/office/drawing/2014/main" val="186855107"/>
-                  </a:ext>
-                </a:extLst>
-              </a:tr>
-              <a:tr h="279532">
-                <a:tc>
-                  <a:txBody>
-                    <a:bodyPr/>
-                    <a:lstStyle/>
-                    <a:p>
-                      <a:pPr algn="ctr" fontAlgn="t"/>
-                      <a:r>
-                        <a:rPr lang="en-US" sz="1200" b="0" i="0" u="none" strike="noStrike" kern="1200">
-                          <a:solidFill>
-                            <a:srgbClr val="002060"/>
-                          </a:solidFill>
-                          <a:effectLst/>
-                          <a:latin typeface="Intel Clear" panose="020B0604020203020204" pitchFamily="34" charset="0"/>
-                          <a:ea typeface="Intel Clear" panose="020B0604020203020204" pitchFamily="34" charset="0"/>
-                          <a:cs typeface="Intel Clear" panose="020B0604020203020204" pitchFamily="34" charset="0"/>
-                        </a:rPr>
-                        <a:t>WW34’21</a:t>
-                      </a:r>
-                    </a:p>
-                  </a:txBody>
-                  <a:tcPr marL="45720" marR="45720" marT="27432" marB="27432" anchor="ctr">
-                    <a:lnL w="19050" cap="flat" cmpd="sng" algn="ctr">
-                      <a:solidFill>
-                        <a:srgbClr val="002060"/>
-                      </a:solidFill>
-                      <a:prstDash val="solid"/>
-                      <a:round/>
-                      <a:headEnd type="none" w="med" len="med"/>
-                      <a:tailEnd type="none" w="med" len="med"/>
-                    </a:lnL>
-                    <a:lnR w="19050" cap="flat" cmpd="sng" algn="ctr">
-                      <a:solidFill>
-                        <a:srgbClr val="002060"/>
-                      </a:solidFill>
-                      <a:prstDash val="solid"/>
-                      <a:round/>
-                      <a:headEnd type="none" w="med" len="med"/>
-                      <a:tailEnd type="none" w="med" len="med"/>
-                    </a:lnR>
-                    <a:lnT w="19050" cap="flat" cmpd="sng" algn="ctr">
-                      <a:solidFill>
-                        <a:srgbClr val="002060"/>
-                      </a:solidFill>
-                      <a:prstDash val="solid"/>
-                      <a:round/>
-                      <a:headEnd type="none" w="med" len="med"/>
-                      <a:tailEnd type="none" w="med" len="med"/>
-                    </a:lnT>
-                    <a:lnB w="19050" cap="flat" cmpd="sng" algn="ctr">
-                      <a:solidFill>
-                        <a:srgbClr val="002060"/>
-                      </a:solidFill>
-                      <a:prstDash val="solid"/>
-                      <a:round/>
-                      <a:headEnd type="none" w="med" len="med"/>
-                      <a:tailEnd type="none" w="med" len="med"/>
-                    </a:lnB>
-                    <a:solidFill>
-                      <a:schemeClr val="bg1">
-                        <a:lumMod val="75000"/>
-                      </a:schemeClr>
-                    </a:solidFill>
-                  </a:tcPr>
-                </a:tc>
-                <a:tc>
-                  <a:txBody>
-                    <a:bodyPr/>
-                    <a:lstStyle/>
-                    <a:p>
-                      <a:pPr marL="0" marR="0" lvl="0" indent="0" algn="l" defTabSz="914400" rtl="0" eaLnBrk="1" fontAlgn="t" latinLnBrk="0" hangingPunct="1">
-                        <a:lnSpc>
-                          <a:spcPct val="100000"/>
-                        </a:lnSpc>
-                        <a:spcBef>
-                          <a:spcPts val="0"/>
-                        </a:spcBef>
-                        <a:spcAft>
-                          <a:spcPts val="0"/>
-                        </a:spcAft>
-                        <a:buClrTx/>
-                        <a:buSzTx/>
-                        <a:buFontTx/>
-                        <a:buNone/>
-                        <a:tabLst/>
-                        <a:defRPr/>
-                      </a:pPr>
-                      <a:r>
-                        <a:rPr kumimoji="0" lang="en-US" sz="1200" b="0" i="0" u="none" strike="noStrike" kern="1200" cap="none" spc="0" normalizeH="0" baseline="0" noProof="0">
-                          <a:ln>
-                            <a:noFill/>
-                          </a:ln>
-                          <a:solidFill>
-                            <a:srgbClr val="002060"/>
-                          </a:solidFill>
-                          <a:effectLst/>
-                          <a:uLnTx/>
-                          <a:uFillTx/>
-                          <a:latin typeface="Intel Clear" panose="020B0604020203020204" pitchFamily="34" charset="0"/>
-                          <a:ea typeface="Intel Clear" panose="020B0604020203020204" pitchFamily="34" charset="0"/>
-                          <a:cs typeface="Intel Clear" panose="020B0604020203020204" pitchFamily="34" charset="0"/>
-                        </a:rPr>
-                        <a:t>Solution Definition/Target</a:t>
-                      </a:r>
-                      <a:endParaRPr kumimoji="0" lang="en-US" sz="1200" b="0" i="0" u="none" strike="noStrike" kern="1200" cap="none" spc="0" normalizeH="0" baseline="0" noProof="0" dirty="0">
-                        <a:ln>
-                          <a:noFill/>
-                        </a:ln>
-                        <a:solidFill>
-                          <a:srgbClr val="002060"/>
-                        </a:solidFill>
-                        <a:effectLst/>
-                        <a:uLnTx/>
-                        <a:uFillTx/>
-                        <a:latin typeface="Intel Clear" panose="020B0604020203020204" pitchFamily="34" charset="0"/>
-                        <a:ea typeface="Intel Clear" panose="020B0604020203020204" pitchFamily="34" charset="0"/>
-                        <a:cs typeface="Intel Clear" panose="020B0604020203020204" pitchFamily="34" charset="0"/>
-                      </a:endParaRPr>
-                    </a:p>
-                  </a:txBody>
-                  <a:tcPr marL="45720" marR="45720" marT="27432" marB="27432" anchor="ctr">
-                    <a:lnL w="19050" cap="flat" cmpd="sng" algn="ctr">
-                      <a:solidFill>
-                        <a:srgbClr val="002060"/>
-                      </a:solidFill>
-                      <a:prstDash val="solid"/>
-                      <a:round/>
-                      <a:headEnd type="none" w="med" len="med"/>
-                      <a:tailEnd type="none" w="med" len="med"/>
-                    </a:lnL>
-                    <a:lnR w="19050" cap="flat" cmpd="sng" algn="ctr">
-                      <a:solidFill>
-                        <a:srgbClr val="002060"/>
-                      </a:solidFill>
-                      <a:prstDash val="solid"/>
-                      <a:round/>
-                      <a:headEnd type="none" w="med" len="med"/>
-                      <a:tailEnd type="none" w="med" len="med"/>
-                    </a:lnR>
-                    <a:lnT w="19050" cap="flat" cmpd="sng" algn="ctr">
-                      <a:solidFill>
-                        <a:srgbClr val="002060"/>
-                      </a:solidFill>
-                      <a:prstDash val="solid"/>
-                      <a:round/>
-                      <a:headEnd type="none" w="med" len="med"/>
-                      <a:tailEnd type="none" w="med" len="med"/>
-                    </a:lnT>
-                    <a:lnB w="19050" cap="flat" cmpd="sng" algn="ctr">
-                      <a:solidFill>
-                        <a:srgbClr val="002060"/>
-                      </a:solidFill>
-                      <a:prstDash val="solid"/>
-                      <a:round/>
-                      <a:headEnd type="none" w="med" len="med"/>
-                      <a:tailEnd type="none" w="med" len="med"/>
-                    </a:lnB>
-                    <a:solidFill>
-                      <a:schemeClr val="bg1">
-                        <a:lumMod val="75000"/>
-                      </a:schemeClr>
-                    </a:solidFill>
-                  </a:tcPr>
-                </a:tc>
-                <a:extLst>
-                  <a:ext uri="{0D108BD9-81ED-4DB2-BD59-A6C34878D82A}">
-                    <a16:rowId xmlns:a16="http://schemas.microsoft.com/office/drawing/2014/main" val="891210144"/>
-                  </a:ext>
-                </a:extLst>
-              </a:tr>
-              <a:tr h="279532">
-                <a:tc>
-                  <a:txBody>
-                    <a:bodyPr/>
-                    <a:lstStyle/>
-                    <a:p>
-                      <a:pPr algn="ctr" fontAlgn="t"/>
-                      <a:r>
-                        <a:rPr lang="en-US" sz="1200" b="0" i="0" u="none" strike="noStrike" kern="1200">
-                          <a:solidFill>
-                            <a:srgbClr val="002060"/>
-                          </a:solidFill>
-                          <a:effectLst/>
-                          <a:latin typeface="Intel Clear" panose="020B0604020203020204" pitchFamily="34" charset="0"/>
-                          <a:ea typeface="Intel Clear" panose="020B0604020203020204" pitchFamily="34" charset="0"/>
-                          <a:cs typeface="Intel Clear" panose="020B0604020203020204" pitchFamily="34" charset="0"/>
-                        </a:rPr>
-                        <a:t>WW38’21</a:t>
-                      </a:r>
-                    </a:p>
-                  </a:txBody>
-                  <a:tcPr marL="45720" marR="45720" marT="27432" marB="27432" anchor="ctr">
-                    <a:lnL w="19050" cap="flat" cmpd="sng" algn="ctr">
-                      <a:solidFill>
-                        <a:srgbClr val="002060"/>
-                      </a:solidFill>
-                      <a:prstDash val="solid"/>
-                      <a:round/>
-                      <a:headEnd type="none" w="med" len="med"/>
-                      <a:tailEnd type="none" w="med" len="med"/>
-                    </a:lnL>
-                    <a:lnR w="19050" cap="flat" cmpd="sng" algn="ctr">
-                      <a:solidFill>
-                        <a:srgbClr val="002060"/>
-                      </a:solidFill>
-                      <a:prstDash val="solid"/>
-                      <a:round/>
-                      <a:headEnd type="none" w="med" len="med"/>
-                      <a:tailEnd type="none" w="med" len="med"/>
-                    </a:lnR>
-                    <a:lnT w="19050" cap="flat" cmpd="sng" algn="ctr">
-                      <a:solidFill>
-                        <a:srgbClr val="002060"/>
-                      </a:solidFill>
-                      <a:prstDash val="solid"/>
-                      <a:round/>
-                      <a:headEnd type="none" w="med" len="med"/>
-                      <a:tailEnd type="none" w="med" len="med"/>
-                    </a:lnT>
-                    <a:lnB w="19050" cap="flat" cmpd="sng" algn="ctr">
-                      <a:solidFill>
-                        <a:srgbClr val="002060"/>
-                      </a:solidFill>
-                      <a:prstDash val="solid"/>
-                      <a:round/>
-                      <a:headEnd type="none" w="med" len="med"/>
-                      <a:tailEnd type="none" w="med" len="med"/>
-                    </a:lnB>
-                    <a:solidFill>
-                      <a:schemeClr val="bg1">
-                        <a:lumMod val="75000"/>
-                      </a:schemeClr>
-                    </a:solidFill>
-                  </a:tcPr>
-                </a:tc>
-                <a:tc>
-                  <a:txBody>
-                    <a:bodyPr/>
-                    <a:lstStyle/>
-                    <a:p>
-                      <a:pPr marL="0" marR="0" lvl="0" indent="0" algn="l" defTabSz="914400" rtl="0" eaLnBrk="1" fontAlgn="t" latinLnBrk="0" hangingPunct="1">
-                        <a:lnSpc>
-                          <a:spcPct val="100000"/>
-                        </a:lnSpc>
-                        <a:spcBef>
-                          <a:spcPts val="0"/>
-                        </a:spcBef>
-                        <a:spcAft>
-                          <a:spcPts val="0"/>
-                        </a:spcAft>
-                        <a:buClrTx/>
-                        <a:buSzTx/>
-                        <a:buFontTx/>
-                        <a:buNone/>
-                        <a:tabLst/>
-                        <a:defRPr/>
-                      </a:pPr>
-                      <a:r>
-                        <a:rPr kumimoji="0" lang="en-US" sz="1200" b="0" i="0" u="none" strike="noStrike" kern="1200" cap="none" spc="0" normalizeH="0" baseline="0" noProof="0">
-                          <a:ln>
-                            <a:noFill/>
-                          </a:ln>
-                          <a:solidFill>
-                            <a:srgbClr val="002060"/>
-                          </a:solidFill>
-                          <a:effectLst/>
-                          <a:uLnTx/>
-                          <a:uFillTx/>
-                          <a:latin typeface="Intel Clear" panose="020B0604020203020204" pitchFamily="34" charset="0"/>
-                          <a:ea typeface="Intel Clear" panose="020B0604020203020204" pitchFamily="34" charset="0"/>
-                          <a:cs typeface="Intel Clear" panose="020B0604020203020204" pitchFamily="34" charset="0"/>
-                        </a:rPr>
-                        <a:t>Solution Definition/Target</a:t>
-                      </a:r>
-                      <a:endParaRPr kumimoji="0" lang="en-US" sz="1200" b="0" i="0" u="none" strike="noStrike" kern="1200" cap="none" spc="0" normalizeH="0" baseline="0" noProof="0" dirty="0">
-                        <a:ln>
-                          <a:noFill/>
-                        </a:ln>
-                        <a:solidFill>
-                          <a:srgbClr val="002060"/>
-                        </a:solidFill>
-                        <a:effectLst/>
-                        <a:uLnTx/>
-                        <a:uFillTx/>
-                        <a:latin typeface="Intel Clear" panose="020B0604020203020204" pitchFamily="34" charset="0"/>
-                        <a:ea typeface="Intel Clear" panose="020B0604020203020204" pitchFamily="34" charset="0"/>
-                        <a:cs typeface="Intel Clear" panose="020B0604020203020204" pitchFamily="34" charset="0"/>
-                      </a:endParaRPr>
-                    </a:p>
-                  </a:txBody>
-                  <a:tcPr marL="45720" marR="45720" marT="27432" marB="27432" anchor="ctr">
-                    <a:lnL w="19050" cap="flat" cmpd="sng" algn="ctr">
-                      <a:solidFill>
-                        <a:srgbClr val="002060"/>
-                      </a:solidFill>
-                      <a:prstDash val="solid"/>
-                      <a:round/>
-                      <a:headEnd type="none" w="med" len="med"/>
-                      <a:tailEnd type="none" w="med" len="med"/>
-                    </a:lnL>
-                    <a:lnR w="19050" cap="flat" cmpd="sng" algn="ctr">
-                      <a:solidFill>
-                        <a:srgbClr val="002060"/>
-                      </a:solidFill>
-                      <a:prstDash val="solid"/>
-                      <a:round/>
-                      <a:headEnd type="none" w="med" len="med"/>
-                      <a:tailEnd type="none" w="med" len="med"/>
-                    </a:lnR>
-                    <a:lnT w="19050" cap="flat" cmpd="sng" algn="ctr">
-                      <a:solidFill>
-                        <a:srgbClr val="002060"/>
-                      </a:solidFill>
-                      <a:prstDash val="solid"/>
-                      <a:round/>
-                      <a:headEnd type="none" w="med" len="med"/>
-                      <a:tailEnd type="none" w="med" len="med"/>
-                    </a:lnT>
-                    <a:lnB w="19050" cap="flat" cmpd="sng" algn="ctr">
-                      <a:solidFill>
-                        <a:srgbClr val="002060"/>
-                      </a:solidFill>
-                      <a:prstDash val="solid"/>
-                      <a:round/>
-                      <a:headEnd type="none" w="med" len="med"/>
-                      <a:tailEnd type="none" w="med" len="med"/>
-                    </a:lnB>
-                    <a:solidFill>
-                      <a:schemeClr val="bg1">
-                        <a:lumMod val="75000"/>
-                      </a:schemeClr>
-                    </a:solidFill>
-                  </a:tcPr>
-                </a:tc>
-                <a:extLst>
-                  <a:ext uri="{0D108BD9-81ED-4DB2-BD59-A6C34878D82A}">
-                    <a16:rowId xmlns:a16="http://schemas.microsoft.com/office/drawing/2014/main" val="46125128"/>
-                  </a:ext>
-                </a:extLst>
-              </a:tr>
-              <a:tr h="279532">
-                <a:tc>
-                  <a:txBody>
-                    <a:bodyPr/>
-                    <a:lstStyle/>
-                    <a:p>
-                      <a:pPr algn="ctr" fontAlgn="t"/>
-                      <a:r>
-                        <a:rPr lang="en-US" sz="1200" b="0" i="0" u="none" strike="noStrike" kern="1200">
-                          <a:solidFill>
-                            <a:srgbClr val="002060"/>
-                          </a:solidFill>
-                          <a:effectLst/>
-                          <a:latin typeface="Intel Clear" panose="020B0604020203020204" pitchFamily="34" charset="0"/>
-                          <a:ea typeface="Intel Clear" panose="020B0604020203020204" pitchFamily="34" charset="0"/>
-                          <a:cs typeface="Intel Clear" panose="020B0604020203020204" pitchFamily="34" charset="0"/>
-                        </a:rPr>
-                        <a:t>WW40’21</a:t>
-                      </a:r>
-                    </a:p>
-                  </a:txBody>
-                  <a:tcPr marL="45720" marR="45720" marT="27432" marB="27432" anchor="ctr">
-                    <a:lnL w="19050" cap="flat" cmpd="sng" algn="ctr">
-                      <a:solidFill>
-                        <a:srgbClr val="002060"/>
-                      </a:solidFill>
-                      <a:prstDash val="solid"/>
-                      <a:round/>
-                      <a:headEnd type="none" w="med" len="med"/>
-                      <a:tailEnd type="none" w="med" len="med"/>
-                    </a:lnL>
-                    <a:lnR w="19050" cap="flat" cmpd="sng" algn="ctr">
-                      <a:solidFill>
-                        <a:srgbClr val="002060"/>
-                      </a:solidFill>
-                      <a:prstDash val="solid"/>
-                      <a:round/>
-                      <a:headEnd type="none" w="med" len="med"/>
-                      <a:tailEnd type="none" w="med" len="med"/>
-                    </a:lnR>
-                    <a:lnT w="19050" cap="flat" cmpd="sng" algn="ctr">
-                      <a:solidFill>
-                        <a:srgbClr val="002060"/>
-                      </a:solidFill>
-                      <a:prstDash val="solid"/>
-                      <a:round/>
-                      <a:headEnd type="none" w="med" len="med"/>
-                      <a:tailEnd type="none" w="med" len="med"/>
-                    </a:lnT>
-                    <a:lnB w="19050" cap="flat" cmpd="sng" algn="ctr">
-                      <a:solidFill>
-                        <a:srgbClr val="002060"/>
-                      </a:solidFill>
-                      <a:prstDash val="solid"/>
-                      <a:round/>
-                      <a:headEnd type="none" w="med" len="med"/>
-                      <a:tailEnd type="none" w="med" len="med"/>
-                    </a:lnB>
-                    <a:solidFill>
-                      <a:schemeClr val="bg1">
-                        <a:lumMod val="75000"/>
-                      </a:schemeClr>
-                    </a:solidFill>
-                  </a:tcPr>
-                </a:tc>
-                <a:tc>
-                  <a:txBody>
-                    <a:bodyPr/>
-                    <a:lstStyle/>
-                    <a:p>
-                      <a:pPr marL="0" marR="0" lvl="0" indent="0" algn="l" defTabSz="914400" rtl="0" eaLnBrk="1" fontAlgn="t" latinLnBrk="0" hangingPunct="1">
-                        <a:lnSpc>
-                          <a:spcPct val="100000"/>
-                        </a:lnSpc>
-                        <a:spcBef>
-                          <a:spcPts val="0"/>
-                        </a:spcBef>
-                        <a:spcAft>
-                          <a:spcPts val="0"/>
-                        </a:spcAft>
-                        <a:buClrTx/>
-                        <a:buSzTx/>
-                        <a:buFontTx/>
-                        <a:buNone/>
-                        <a:tabLst/>
-                        <a:defRPr/>
-                      </a:pPr>
-                      <a:r>
-                        <a:rPr kumimoji="0" lang="en-US" sz="1200" b="0" i="0" u="none" strike="noStrike" kern="1200" cap="none" spc="0" normalizeH="0" baseline="0" noProof="0">
-                          <a:ln>
-                            <a:noFill/>
-                          </a:ln>
-                          <a:solidFill>
-                            <a:srgbClr val="002060"/>
-                          </a:solidFill>
-                          <a:effectLst/>
-                          <a:uLnTx/>
-                          <a:uFillTx/>
-                          <a:latin typeface="Intel Clear" panose="020B0604020203020204" pitchFamily="34" charset="0"/>
-                          <a:ea typeface="Intel Clear" panose="020B0604020203020204" pitchFamily="34" charset="0"/>
-                          <a:cs typeface="Intel Clear" panose="020B0604020203020204" pitchFamily="34" charset="0"/>
-                        </a:rPr>
-                        <a:t>Solution Definition/Target</a:t>
-                      </a:r>
-                      <a:endParaRPr kumimoji="0" lang="en-US" sz="1200" b="0" i="0" u="none" strike="noStrike" kern="1200" cap="none" spc="0" normalizeH="0" baseline="0" noProof="0" dirty="0">
-                        <a:ln>
-                          <a:noFill/>
-                        </a:ln>
-                        <a:solidFill>
-                          <a:srgbClr val="002060"/>
-                        </a:solidFill>
-                        <a:effectLst/>
-                        <a:uLnTx/>
-                        <a:uFillTx/>
-                        <a:latin typeface="Intel Clear" panose="020B0604020203020204" pitchFamily="34" charset="0"/>
-                        <a:ea typeface="Intel Clear" panose="020B0604020203020204" pitchFamily="34" charset="0"/>
-                        <a:cs typeface="Intel Clear" panose="020B0604020203020204" pitchFamily="34" charset="0"/>
-                      </a:endParaRPr>
-                    </a:p>
-                  </a:txBody>
-                  <a:tcPr marL="45720" marR="45720" marT="27432" marB="27432" anchor="ctr">
-                    <a:lnL w="19050" cap="flat" cmpd="sng" algn="ctr">
-                      <a:solidFill>
-                        <a:srgbClr val="002060"/>
-                      </a:solidFill>
-                      <a:prstDash val="solid"/>
-                      <a:round/>
-                      <a:headEnd type="none" w="med" len="med"/>
-                      <a:tailEnd type="none" w="med" len="med"/>
-                    </a:lnL>
-                    <a:lnR w="19050" cap="flat" cmpd="sng" algn="ctr">
-                      <a:solidFill>
-                        <a:srgbClr val="002060"/>
-                      </a:solidFill>
-                      <a:prstDash val="solid"/>
-                      <a:round/>
-                      <a:headEnd type="none" w="med" len="med"/>
-                      <a:tailEnd type="none" w="med" len="med"/>
-                    </a:lnR>
-                    <a:lnT w="19050" cap="flat" cmpd="sng" algn="ctr">
-                      <a:solidFill>
-                        <a:srgbClr val="002060"/>
-                      </a:solidFill>
-                      <a:prstDash val="solid"/>
-                      <a:round/>
-                      <a:headEnd type="none" w="med" len="med"/>
-                      <a:tailEnd type="none" w="med" len="med"/>
-                    </a:lnT>
-                    <a:lnB w="19050" cap="flat" cmpd="sng" algn="ctr">
-                      <a:solidFill>
-                        <a:srgbClr val="002060"/>
-                      </a:solidFill>
-                      <a:prstDash val="solid"/>
-                      <a:round/>
-                      <a:headEnd type="none" w="med" len="med"/>
-                      <a:tailEnd type="none" w="med" len="med"/>
-                    </a:lnB>
-                    <a:solidFill>
-                      <a:schemeClr val="bg1">
-                        <a:lumMod val="75000"/>
-                      </a:schemeClr>
-                    </a:solidFill>
-                  </a:tcPr>
-                </a:tc>
-                <a:extLst>
-                  <a:ext uri="{0D108BD9-81ED-4DB2-BD59-A6C34878D82A}">
-                    <a16:rowId xmlns:a16="http://schemas.microsoft.com/office/drawing/2014/main" val="1825880503"/>
-                  </a:ext>
-                </a:extLst>
-              </a:tr>
-              <a:tr h="360618">
-                <a:tc>
-                  <a:txBody>
-                    <a:bodyPr/>
-                    <a:lstStyle/>
-                    <a:p>
-                      <a:pPr algn="ctr" fontAlgn="t"/>
-                      <a:r>
-                        <a:rPr lang="en-US" sz="1200" b="0" i="0" u="none" strike="noStrike" kern="1200">
-                          <a:solidFill>
-                            <a:srgbClr val="002060"/>
-                          </a:solidFill>
-                          <a:effectLst/>
-                          <a:latin typeface="Intel Clear" panose="020B0604020203020204" pitchFamily="34" charset="0"/>
-                          <a:ea typeface="Intel Clear" panose="020B0604020203020204" pitchFamily="34" charset="0"/>
-                          <a:cs typeface="Intel Clear" panose="020B0604020203020204" pitchFamily="34" charset="0"/>
-                        </a:rPr>
-                        <a:t>WW50’21</a:t>
-                      </a:r>
-                    </a:p>
-                  </a:txBody>
-                  <a:tcPr marL="45720" marR="45720" marT="27432" marB="27432" anchor="ctr">
-                    <a:lnL w="19050" cap="flat" cmpd="sng" algn="ctr">
-                      <a:solidFill>
-                        <a:srgbClr val="002060"/>
-                      </a:solidFill>
-                      <a:prstDash val="solid"/>
-                      <a:round/>
-                      <a:headEnd type="none" w="med" len="med"/>
-                      <a:tailEnd type="none" w="med" len="med"/>
-                    </a:lnL>
-                    <a:lnR w="19050" cap="flat" cmpd="sng" algn="ctr">
-                      <a:solidFill>
-                        <a:srgbClr val="002060"/>
-                      </a:solidFill>
-                      <a:prstDash val="solid"/>
-                      <a:round/>
-                      <a:headEnd type="none" w="med" len="med"/>
-                      <a:tailEnd type="none" w="med" len="med"/>
-                    </a:lnR>
-                    <a:lnT w="19050" cap="flat" cmpd="sng" algn="ctr">
-                      <a:solidFill>
-                        <a:srgbClr val="002060"/>
-                      </a:solidFill>
-                      <a:prstDash val="solid"/>
-                      <a:round/>
-                      <a:headEnd type="none" w="med" len="med"/>
-                      <a:tailEnd type="none" w="med" len="med"/>
-                    </a:lnT>
-                    <a:lnB w="19050" cap="flat" cmpd="sng" algn="ctr">
-                      <a:solidFill>
-                        <a:srgbClr val="002060"/>
-                      </a:solidFill>
-                      <a:prstDash val="solid"/>
-                      <a:round/>
-                      <a:headEnd type="none" w="med" len="med"/>
-                      <a:tailEnd type="none" w="med" len="med"/>
-                    </a:lnB>
-                    <a:solidFill>
-                      <a:schemeClr val="bg1">
-                        <a:lumMod val="75000"/>
-                      </a:schemeClr>
-                    </a:solidFill>
-                  </a:tcPr>
-                </a:tc>
-                <a:tc>
-                  <a:txBody>
-                    <a:bodyPr/>
-                    <a:lstStyle/>
-                    <a:p>
-                      <a:pPr marL="0" marR="0" lvl="0" indent="0" algn="l" defTabSz="914400" rtl="0" eaLnBrk="1" fontAlgn="t" latinLnBrk="0" hangingPunct="1">
-                        <a:lnSpc>
-                          <a:spcPct val="100000"/>
-                        </a:lnSpc>
-                        <a:spcBef>
-                          <a:spcPts val="0"/>
-                        </a:spcBef>
-                        <a:spcAft>
-                          <a:spcPts val="0"/>
-                        </a:spcAft>
-                        <a:buClrTx/>
-                        <a:buSzTx/>
-                        <a:buFontTx/>
-                        <a:buNone/>
-                        <a:tabLst/>
-                        <a:defRPr/>
-                      </a:pPr>
-                      <a:r>
-                        <a:rPr kumimoji="0" lang="en-US" sz="1200" b="0" i="0" u="none" strike="noStrike" kern="1200" cap="none" spc="0" normalizeH="0" baseline="0" noProof="0" dirty="0">
-                          <a:ln>
-                            <a:noFill/>
-                          </a:ln>
-                          <a:solidFill>
-                            <a:srgbClr val="002060"/>
-                          </a:solidFill>
-                          <a:effectLst/>
-                          <a:uLnTx/>
-                          <a:uFillTx/>
-                          <a:latin typeface="Intel Clear" panose="020B0604020203020204" pitchFamily="34" charset="0"/>
-                          <a:ea typeface="Intel Clear" panose="020B0604020203020204" pitchFamily="34" charset="0"/>
-                          <a:cs typeface="Intel Clear" panose="020B0604020203020204" pitchFamily="34" charset="0"/>
-                        </a:rPr>
-                        <a:t>Solution Definition/Target</a:t>
-                      </a:r>
-                    </a:p>
-                  </a:txBody>
-                  <a:tcPr marL="45720" marR="45720" marT="27432" marB="27432" anchor="ctr">
-                    <a:lnL w="19050" cap="flat" cmpd="sng" algn="ctr">
-                      <a:solidFill>
-                        <a:srgbClr val="002060"/>
-                      </a:solidFill>
-                      <a:prstDash val="solid"/>
-                      <a:round/>
-                      <a:headEnd type="none" w="med" len="med"/>
-                      <a:tailEnd type="none" w="med" len="med"/>
-                    </a:lnL>
-                    <a:lnR w="19050" cap="flat" cmpd="sng" algn="ctr">
-                      <a:solidFill>
-                        <a:srgbClr val="002060"/>
-                      </a:solidFill>
-                      <a:prstDash val="solid"/>
-                      <a:round/>
-                      <a:headEnd type="none" w="med" len="med"/>
-                      <a:tailEnd type="none" w="med" len="med"/>
-                    </a:lnR>
-                    <a:lnT w="19050" cap="flat" cmpd="sng" algn="ctr">
-                      <a:solidFill>
-                        <a:srgbClr val="002060"/>
-                      </a:solidFill>
-                      <a:prstDash val="solid"/>
-                      <a:round/>
-                      <a:headEnd type="none" w="med" len="med"/>
-                      <a:tailEnd type="none" w="med" len="med"/>
-                    </a:lnT>
-                    <a:lnB w="19050" cap="flat" cmpd="sng" algn="ctr">
-                      <a:solidFill>
-                        <a:srgbClr val="002060"/>
-                      </a:solidFill>
-                      <a:prstDash val="solid"/>
-                      <a:round/>
-                      <a:headEnd type="none" w="med" len="med"/>
-                      <a:tailEnd type="none" w="med" len="med"/>
-                    </a:lnB>
-                    <a:solidFill>
-                      <a:schemeClr val="bg1">
-                        <a:lumMod val="75000"/>
-                      </a:schemeClr>
-                    </a:solidFill>
-                  </a:tcPr>
-                </a:tc>
-                <a:extLst>
-                  <a:ext uri="{0D108BD9-81ED-4DB2-BD59-A6C34878D82A}">
-                    <a16:rowId xmlns:a16="http://schemas.microsoft.com/office/drawing/2014/main" val="3890959349"/>
                   </a:ext>
                 </a:extLst>
               </a:tr>

</xml_diff>

<commit_message>
MILESTONE LEFT TABLE: Migrated left table to the new PPT Template
</commit_message>
<xml_diff>
--- a/src/main/resources/Template.pptx
+++ b/src/main/resources/Template.pptx
@@ -4089,7 +4089,7 @@
           <p:nvPr>
             <p:extLst>
               <p:ext uri="{D42A27DB-BD31-4B8C-83A1-F6EECF244321}">
-                <p14:modId xmlns:p14="http://schemas.microsoft.com/office/powerpoint/2010/main" val="1985514071"/>
+                <p14:modId xmlns:p14="http://schemas.microsoft.com/office/powerpoint/2010/main" val="4138884055"/>
               </p:ext>
             </p:extLst>
           </p:nvPr>
@@ -4991,17 +4991,7 @@
                           <a:effectLst/>
                           <a:latin typeface="+mn-lt"/>
                         </a:rPr>
-                        <a:t>Vero</a:t>
-                      </a:r>
-                      <a:r>
-                        <a:rPr lang="en-US" sz="1100" b="0" i="0" u="none" strike="noStrike" baseline="0" smtClean="0">
-                          <a:solidFill>
-                            <a:srgbClr val="002060"/>
-                          </a:solidFill>
-                          <a:effectLst/>
-                          <a:latin typeface="+mn-lt"/>
-                        </a:rPr>
-                        <a:t> Eos</a:t>
+                        <a:t>Veronicles</a:t>
                       </a:r>
                       <a:endParaRPr lang="en-US" sz="1100" b="0" i="0" u="none" strike="noStrike" dirty="0">
                         <a:solidFill>
@@ -5070,19 +5060,7 @@
                           <a:ea typeface="+mn-ea"/>
                           <a:cs typeface="+mn-cs"/>
                         </a:rPr>
-                        <a:t>Vero</a:t>
-                      </a:r>
-                      <a:r>
-                        <a:rPr lang="en-US" sz="1050" b="0" i="0" u="none" strike="noStrike" kern="1200" baseline="0" smtClean="0">
-                          <a:solidFill>
-                            <a:srgbClr val="002060"/>
-                          </a:solidFill>
-                          <a:effectLst/>
-                          <a:latin typeface="+mn-lt"/>
-                          <a:ea typeface="+mn-ea"/>
-                          <a:cs typeface="+mn-cs"/>
-                        </a:rPr>
-                        <a:t> Eos</a:t>
+                        <a:t>Atcitasorl</a:t>
                       </a:r>
                       <a:endParaRPr lang="en-US" sz="1100" u="none" strike="noStrike" kern="1200" dirty="0">
                         <a:solidFill>
@@ -5253,7 +5231,7 @@
                     <a:bodyPr/>
                     <a:lstStyle/>
                     <a:p>
-                      <a:pPr marL="171450" marR="0" lvl="0" indent="-171450" algn="l" defTabSz="606541" rtl="0" eaLnBrk="1" fontAlgn="b" latinLnBrk="0" hangingPunct="1">
+                      <a:pPr marL="0" marR="0" lvl="0" indent="0" algn="l" defTabSz="606541" rtl="0" eaLnBrk="1" fontAlgn="b" latinLnBrk="0" hangingPunct="1">
                         <a:lnSpc>
                           <a:spcPct val="100000"/>
                         </a:lnSpc>
@@ -5266,7 +5244,7 @@
                         <a:buClrTx/>
                         <a:buSzTx/>
                         <a:buFont typeface="Wingdings" panose="05000000000000000000" pitchFamily="2" charset="2"/>
-                        <a:buChar char="§"/>
+                        <a:buNone/>
                         <a:tabLst/>
                         <a:defRPr/>
                       </a:pPr>

</xml_diff>

<commit_message>
MILESTONE RIGHT TABLE: Write issue data to Timeline table
</commit_message>
<xml_diff>
--- a/src/main/resources/Template.pptx
+++ b/src/main/resources/Template.pptx
@@ -197,7 +197,7 @@
           <a:p>
             <a:fld id="{159A8166-34DF-470E-9DE3-188AFC0E57D2}" type="datetimeFigureOut">
               <a:rPr lang="en-US" smtClean="0"/>
-              <a:t>03/08/2021</a:t>
+              <a:t>04/08/2021</a:t>
             </a:fld>
             <a:endParaRPr lang="en-US"/>
           </a:p>
@@ -698,7 +698,7 @@
           <a:p>
             <a:fld id="{7B9D1350-BBC3-4784-B299-7C5541BF58C1}" type="datetimeFigureOut">
               <a:rPr lang="en-US" smtClean="0"/>
-              <a:t>03/08/2021</a:t>
+              <a:t>04/08/2021</a:t>
             </a:fld>
             <a:endParaRPr lang="en-US"/>
           </a:p>
@@ -896,7 +896,7 @@
           <a:p>
             <a:fld id="{7B9D1350-BBC3-4784-B299-7C5541BF58C1}" type="datetimeFigureOut">
               <a:rPr lang="en-US" smtClean="0"/>
-              <a:t>03/08/2021</a:t>
+              <a:t>04/08/2021</a:t>
             </a:fld>
             <a:endParaRPr lang="en-US"/>
           </a:p>
@@ -1104,7 +1104,7 @@
           <a:p>
             <a:fld id="{7B9D1350-BBC3-4784-B299-7C5541BF58C1}" type="datetimeFigureOut">
               <a:rPr lang="en-US" smtClean="0"/>
-              <a:t>03/08/2021</a:t>
+              <a:t>04/08/2021</a:t>
             </a:fld>
             <a:endParaRPr lang="en-US"/>
           </a:p>
@@ -1302,7 +1302,7 @@
           <a:p>
             <a:fld id="{7B9D1350-BBC3-4784-B299-7C5541BF58C1}" type="datetimeFigureOut">
               <a:rPr lang="en-US" smtClean="0"/>
-              <a:t>03/08/2021</a:t>
+              <a:t>04/08/2021</a:t>
             </a:fld>
             <a:endParaRPr lang="en-US"/>
           </a:p>
@@ -1577,7 +1577,7 @@
           <a:p>
             <a:fld id="{7B9D1350-BBC3-4784-B299-7C5541BF58C1}" type="datetimeFigureOut">
               <a:rPr lang="en-US" smtClean="0"/>
-              <a:t>03/08/2021</a:t>
+              <a:t>04/08/2021</a:t>
             </a:fld>
             <a:endParaRPr lang="en-US"/>
           </a:p>
@@ -1842,7 +1842,7 @@
           <a:p>
             <a:fld id="{7B9D1350-BBC3-4784-B299-7C5541BF58C1}" type="datetimeFigureOut">
               <a:rPr lang="en-US" smtClean="0"/>
-              <a:t>03/08/2021</a:t>
+              <a:t>04/08/2021</a:t>
             </a:fld>
             <a:endParaRPr lang="en-US"/>
           </a:p>
@@ -2254,7 +2254,7 @@
           <a:p>
             <a:fld id="{7B9D1350-BBC3-4784-B299-7C5541BF58C1}" type="datetimeFigureOut">
               <a:rPr lang="en-US" smtClean="0"/>
-              <a:t>03/08/2021</a:t>
+              <a:t>04/08/2021</a:t>
             </a:fld>
             <a:endParaRPr lang="en-US"/>
           </a:p>
@@ -2395,7 +2395,7 @@
           <a:p>
             <a:fld id="{7B9D1350-BBC3-4784-B299-7C5541BF58C1}" type="datetimeFigureOut">
               <a:rPr lang="en-US" smtClean="0"/>
-              <a:t>03/08/2021</a:t>
+              <a:t>04/08/2021</a:t>
             </a:fld>
             <a:endParaRPr lang="en-US"/>
           </a:p>
@@ -2508,7 +2508,7 @@
           <a:p>
             <a:fld id="{7B9D1350-BBC3-4784-B299-7C5541BF58C1}" type="datetimeFigureOut">
               <a:rPr lang="en-US" smtClean="0"/>
-              <a:t>03/08/2021</a:t>
+              <a:t>04/08/2021</a:t>
             </a:fld>
             <a:endParaRPr lang="en-US"/>
           </a:p>
@@ -2819,7 +2819,7 @@
           <a:p>
             <a:fld id="{7B9D1350-BBC3-4784-B299-7C5541BF58C1}" type="datetimeFigureOut">
               <a:rPr lang="en-US" smtClean="0"/>
-              <a:t>03/08/2021</a:t>
+              <a:t>04/08/2021</a:t>
             </a:fld>
             <a:endParaRPr lang="en-US"/>
           </a:p>
@@ -3107,7 +3107,7 @@
           <a:p>
             <a:fld id="{7B9D1350-BBC3-4784-B299-7C5541BF58C1}" type="datetimeFigureOut">
               <a:rPr lang="en-US" smtClean="0"/>
-              <a:t>03/08/2021</a:t>
+              <a:t>04/08/2021</a:t>
             </a:fld>
             <a:endParaRPr lang="en-US"/>
           </a:p>
@@ -3348,7 +3348,7 @@
           <a:p>
             <a:fld id="{7B9D1350-BBC3-4784-B299-7C5541BF58C1}" type="datetimeFigureOut">
               <a:rPr lang="en-US" smtClean="0"/>
-              <a:t>03/08/2021</a:t>
+              <a:t>04/08/2021</a:t>
             </a:fld>
             <a:endParaRPr lang="en-US"/>
           </a:p>
@@ -3780,14 +3780,14 @@
           <p:nvPr>
             <p:extLst>
               <p:ext uri="{D42A27DB-BD31-4B8C-83A1-F6EECF244321}">
-                <p14:modId xmlns:p14="http://schemas.microsoft.com/office/powerpoint/2010/main" val="1146539260"/>
+                <p14:modId xmlns:p14="http://schemas.microsoft.com/office/powerpoint/2010/main" val="2861896503"/>
               </p:ext>
             </p:extLst>
           </p:nvPr>
         </p:nvGraphicFramePr>
         <p:xfrm>
           <a:off x="6939915" y="956637"/>
-          <a:ext cx="5147310" cy="560245"/>
+          <a:ext cx="5147310" cy="5653165"/>
         </p:xfrm>
         <a:graphic>
           <a:graphicData uri="http://schemas.openxmlformats.org/drawingml/2006/table">
@@ -3809,7 +3809,7 @@
                   </a:extLst>
                 </a:gridCol>
               </a:tblGrid>
-              <a:tr h="234895">
+              <a:tr h="282440">
                 <a:tc gridSpan="2">
                   <a:txBody>
                     <a:bodyPr/>
@@ -3937,7 +3937,7 @@
                   </a:ext>
                 </a:extLst>
               </a:tr>
-              <a:tr h="325350">
+              <a:tr h="315925">
                 <a:tc>
                   <a:txBody>
                     <a:bodyPr/>
@@ -3945,7 +3945,7 @@
                     <a:p>
                       <a:pPr algn="ctr" fontAlgn="t"/>
                       <a:r>
-                        <a:rPr lang="en-US" sz="1200" b="0" i="0" u="none" strike="noStrike" dirty="0">
+                        <a:rPr lang="en-US" sz="1200" b="0" i="0" u="none" strike="noStrike" smtClean="0">
                           <a:solidFill>
                             <a:srgbClr val="002060"/>
                           </a:solidFill>
@@ -3954,8 +3954,17 @@
                           <a:ea typeface="Intel Clear" panose="020B0604020203020204" pitchFamily="34" charset="0"/>
                           <a:cs typeface="Intel Clear" panose="020B0604020203020204" pitchFamily="34" charset="0"/>
                         </a:rPr>
-                        <a:t>WW27 ’20</a:t>
+                        <a:t> </a:t>
                       </a:r>
+                      <a:endParaRPr lang="en-US" sz="1200" b="0" i="0" u="none" strike="noStrike" dirty="0">
+                        <a:solidFill>
+                          <a:srgbClr val="002060"/>
+                        </a:solidFill>
+                        <a:effectLst/>
+                        <a:latin typeface="Intel Clear" panose="020B0604020203020204" pitchFamily="34" charset="0"/>
+                        <a:ea typeface="Intel Clear" panose="020B0604020203020204" pitchFamily="34" charset="0"/>
+                        <a:cs typeface="Intel Clear" panose="020B0604020203020204" pitchFamily="34" charset="0"/>
+                      </a:endParaRPr>
                     </a:p>
                   </a:txBody>
                   <a:tcPr marL="45720" marR="45720" marT="27432" marB="27432" anchor="ctr">
@@ -3996,7 +4005,7 @@
                       <a:tailEnd type="none" w="med" len="med"/>
                     </a:lnB>
                     <a:solidFill>
-                      <a:srgbClr val="00C800"/>
+                      <a:srgbClr val="BFBFBF"/>
                     </a:solidFill>
                   </a:tcPr>
                 </a:tc>
@@ -4007,7 +4016,7 @@
                     <a:p>
                       <a:pPr algn="l" fontAlgn="t"/>
                       <a:r>
-                        <a:rPr lang="en-US" sz="1200" b="0" i="0" u="none" strike="noStrike" dirty="0">
+                        <a:rPr lang="en-US" sz="1200" b="0" i="0" u="none" strike="noStrike" smtClean="0">
                           <a:solidFill>
                             <a:srgbClr val="002060"/>
                           </a:solidFill>
@@ -4016,8 +4025,17 @@
                           <a:ea typeface="Intel Clear" panose="020B0604020203020204" pitchFamily="34" charset="0"/>
                           <a:cs typeface="Intel Clear" panose="020B0604020203020204" pitchFamily="34" charset="0"/>
                         </a:rPr>
-                        <a:t>Eng. Workstream Kick-Off</a:t>
+                        <a:t> </a:t>
                       </a:r>
+                      <a:endParaRPr lang="en-US" sz="1200" b="0" i="0" u="none" strike="noStrike" dirty="0">
+                        <a:solidFill>
+                          <a:srgbClr val="002060"/>
+                        </a:solidFill>
+                        <a:effectLst/>
+                        <a:latin typeface="Intel Clear" panose="020B0604020203020204" pitchFamily="34" charset="0"/>
+                        <a:ea typeface="Intel Clear" panose="020B0604020203020204" pitchFamily="34" charset="0"/>
+                        <a:cs typeface="Intel Clear" panose="020B0604020203020204" pitchFamily="34" charset="0"/>
+                      </a:endParaRPr>
                     </a:p>
                   </a:txBody>
                   <a:tcPr marL="45720" marR="45720" marT="27432" marB="27432" anchor="ctr">
@@ -4067,6 +4085,2422 @@
                 <a:extLst>
                   <a:ext uri="{0D108BD9-81ED-4DB2-BD59-A6C34878D82A}">
                     <a16:rowId xmlns:a16="http://schemas.microsoft.com/office/drawing/2014/main" val="3712375731"/>
+                  </a:ext>
+                </a:extLst>
+              </a:tr>
+              <a:tr h="315925">
+                <a:tc>
+                  <a:txBody>
+                    <a:bodyPr/>
+                    <a:lstStyle/>
+                    <a:p>
+                      <a:pPr algn="ctr" fontAlgn="t"/>
+                      <a:r>
+                        <a:rPr lang="en-US" sz="1200" b="0" i="0" u="none" strike="noStrike" smtClean="0">
+                          <a:solidFill>
+                            <a:srgbClr val="002060"/>
+                          </a:solidFill>
+                          <a:effectLst/>
+                          <a:latin typeface="Intel Clear" panose="020B0604020203020204" pitchFamily="34" charset="0"/>
+                          <a:ea typeface="Intel Clear" panose="020B0604020203020204" pitchFamily="34" charset="0"/>
+                          <a:cs typeface="Intel Clear" panose="020B0604020203020204" pitchFamily="34" charset="0"/>
+                        </a:rPr>
+                        <a:t> </a:t>
+                      </a:r>
+                      <a:endParaRPr lang="en-US" sz="1200" b="0" i="0" u="none" strike="noStrike" dirty="0">
+                        <a:solidFill>
+                          <a:srgbClr val="002060"/>
+                        </a:solidFill>
+                        <a:effectLst/>
+                        <a:latin typeface="Intel Clear" panose="020B0604020203020204" pitchFamily="34" charset="0"/>
+                        <a:ea typeface="Intel Clear" panose="020B0604020203020204" pitchFamily="34" charset="0"/>
+                        <a:cs typeface="Intel Clear" panose="020B0604020203020204" pitchFamily="34" charset="0"/>
+                      </a:endParaRPr>
+                    </a:p>
+                  </a:txBody>
+                  <a:tcPr marL="45720" marR="45720" marT="27432" marB="27432" anchor="ctr">
+                    <a:lnL w="19050" cap="flat" cmpd="sng" algn="ctr">
+                      <a:solidFill>
+                        <a:srgbClr val="002060"/>
+                      </a:solidFill>
+                      <a:prstDash val="solid"/>
+                      <a:round/>
+                      <a:headEnd type="none" w="med" len="med"/>
+                      <a:tailEnd type="none" w="med" len="med"/>
+                    </a:lnL>
+                    <a:lnR w="19050" cap="flat" cmpd="sng" algn="ctr">
+                      <a:solidFill>
+                        <a:srgbClr val="002060"/>
+                      </a:solidFill>
+                      <a:prstDash val="solid"/>
+                      <a:round/>
+                      <a:headEnd type="none" w="med" len="med"/>
+                      <a:tailEnd type="none" w="med" len="med"/>
+                    </a:lnR>
+                    <a:lnT w="19050" cap="flat" cmpd="sng" algn="ctr">
+                      <a:solidFill>
+                        <a:srgbClr val="002060"/>
+                      </a:solidFill>
+                      <a:prstDash val="solid"/>
+                      <a:round/>
+                      <a:headEnd type="none" w="med" len="med"/>
+                      <a:tailEnd type="none" w="med" len="med"/>
+                    </a:lnT>
+                    <a:lnB w="19050" cap="flat" cmpd="sng" algn="ctr">
+                      <a:solidFill>
+                        <a:srgbClr val="002060"/>
+                      </a:solidFill>
+                      <a:prstDash val="solid"/>
+                      <a:round/>
+                      <a:headEnd type="none" w="med" len="med"/>
+                      <a:tailEnd type="none" w="med" len="med"/>
+                    </a:lnB>
+                    <a:solidFill>
+                      <a:srgbClr val="BFBFBF"/>
+                    </a:solidFill>
+                  </a:tcPr>
+                </a:tc>
+                <a:tc>
+                  <a:txBody>
+                    <a:bodyPr/>
+                    <a:lstStyle/>
+                    <a:p>
+                      <a:pPr algn="l" fontAlgn="t"/>
+                      <a:r>
+                        <a:rPr lang="en-US" sz="1200" b="0" i="0" u="none" strike="noStrike" smtClean="0">
+                          <a:solidFill>
+                            <a:srgbClr val="002060"/>
+                          </a:solidFill>
+                          <a:effectLst/>
+                          <a:latin typeface="Intel Clear" panose="020B0604020203020204" pitchFamily="34" charset="0"/>
+                          <a:ea typeface="Intel Clear" panose="020B0604020203020204" pitchFamily="34" charset="0"/>
+                          <a:cs typeface="Intel Clear" panose="020B0604020203020204" pitchFamily="34" charset="0"/>
+                        </a:rPr>
+                        <a:t> </a:t>
+                      </a:r>
+                      <a:endParaRPr lang="en-US" sz="1200" b="0" i="0" u="none" strike="noStrike" dirty="0">
+                        <a:solidFill>
+                          <a:srgbClr val="002060"/>
+                        </a:solidFill>
+                        <a:effectLst/>
+                        <a:latin typeface="Intel Clear" panose="020B0604020203020204" pitchFamily="34" charset="0"/>
+                        <a:ea typeface="Intel Clear" panose="020B0604020203020204" pitchFamily="34" charset="0"/>
+                        <a:cs typeface="Intel Clear" panose="020B0604020203020204" pitchFamily="34" charset="0"/>
+                      </a:endParaRPr>
+                    </a:p>
+                  </a:txBody>
+                  <a:tcPr marL="45720" marR="45720" marT="27432" marB="27432" anchor="ctr">
+                    <a:lnL w="19050" cap="flat" cmpd="sng" algn="ctr">
+                      <a:solidFill>
+                        <a:srgbClr val="002060"/>
+                      </a:solidFill>
+                      <a:prstDash val="solid"/>
+                      <a:round/>
+                      <a:headEnd type="none" w="med" len="med"/>
+                      <a:tailEnd type="none" w="med" len="med"/>
+                    </a:lnL>
+                    <a:lnR w="19050" cap="flat" cmpd="sng" algn="ctr">
+                      <a:solidFill>
+                        <a:srgbClr val="002060"/>
+                      </a:solidFill>
+                      <a:prstDash val="solid"/>
+                      <a:round/>
+                      <a:headEnd type="none" w="med" len="med"/>
+                      <a:tailEnd type="none" w="med" len="med"/>
+                    </a:lnR>
+                    <a:lnT w="19050" cap="flat" cmpd="sng" algn="ctr">
+                      <a:solidFill>
+                        <a:srgbClr val="002060"/>
+                      </a:solidFill>
+                      <a:prstDash val="solid"/>
+                      <a:round/>
+                      <a:headEnd type="none" w="med" len="med"/>
+                      <a:tailEnd type="none" w="med" len="med"/>
+                    </a:lnT>
+                    <a:lnB w="19050" cap="flat" cmpd="sng" algn="ctr">
+                      <a:solidFill>
+                        <a:srgbClr val="002060"/>
+                      </a:solidFill>
+                      <a:prstDash val="solid"/>
+                      <a:round/>
+                      <a:headEnd type="none" w="med" len="med"/>
+                      <a:tailEnd type="none" w="med" len="med"/>
+                    </a:lnB>
+                    <a:solidFill>
+                      <a:schemeClr val="bg1">
+                        <a:lumMod val="75000"/>
+                      </a:schemeClr>
+                    </a:solidFill>
+                  </a:tcPr>
+                </a:tc>
+                <a:extLst>
+                  <a:ext uri="{0D108BD9-81ED-4DB2-BD59-A6C34878D82A}">
+                    <a16:rowId xmlns:a16="http://schemas.microsoft.com/office/drawing/2014/main" val="26492286"/>
+                  </a:ext>
+                </a:extLst>
+              </a:tr>
+              <a:tr h="315925">
+                <a:tc>
+                  <a:txBody>
+                    <a:bodyPr/>
+                    <a:lstStyle/>
+                    <a:p>
+                      <a:pPr algn="ctr" fontAlgn="t"/>
+                      <a:r>
+                        <a:rPr lang="en-US" sz="1200" b="0" i="0" u="none" strike="noStrike" smtClean="0">
+                          <a:solidFill>
+                            <a:srgbClr val="002060"/>
+                          </a:solidFill>
+                          <a:effectLst/>
+                          <a:latin typeface="Intel Clear" panose="020B0604020203020204" pitchFamily="34" charset="0"/>
+                          <a:ea typeface="Intel Clear" panose="020B0604020203020204" pitchFamily="34" charset="0"/>
+                          <a:cs typeface="Intel Clear" panose="020B0604020203020204" pitchFamily="34" charset="0"/>
+                        </a:rPr>
+                        <a:t> </a:t>
+                      </a:r>
+                      <a:endParaRPr lang="en-US" sz="1200" b="0" i="0" u="none" strike="noStrike" dirty="0">
+                        <a:solidFill>
+                          <a:srgbClr val="002060"/>
+                        </a:solidFill>
+                        <a:effectLst/>
+                        <a:latin typeface="Intel Clear" panose="020B0604020203020204" pitchFamily="34" charset="0"/>
+                        <a:ea typeface="Intel Clear" panose="020B0604020203020204" pitchFamily="34" charset="0"/>
+                        <a:cs typeface="Intel Clear" panose="020B0604020203020204" pitchFamily="34" charset="0"/>
+                      </a:endParaRPr>
+                    </a:p>
+                  </a:txBody>
+                  <a:tcPr marL="45720" marR="45720" marT="27432" marB="27432" anchor="ctr">
+                    <a:lnL w="19050" cap="flat" cmpd="sng" algn="ctr">
+                      <a:solidFill>
+                        <a:srgbClr val="002060"/>
+                      </a:solidFill>
+                      <a:prstDash val="solid"/>
+                      <a:round/>
+                      <a:headEnd type="none" w="med" len="med"/>
+                      <a:tailEnd type="none" w="med" len="med"/>
+                    </a:lnL>
+                    <a:lnR w="19050" cap="flat" cmpd="sng" algn="ctr">
+                      <a:solidFill>
+                        <a:srgbClr val="002060"/>
+                      </a:solidFill>
+                      <a:prstDash val="solid"/>
+                      <a:round/>
+                      <a:headEnd type="none" w="med" len="med"/>
+                      <a:tailEnd type="none" w="med" len="med"/>
+                    </a:lnR>
+                    <a:lnT w="19050" cap="flat" cmpd="sng" algn="ctr">
+                      <a:solidFill>
+                        <a:srgbClr val="002060"/>
+                      </a:solidFill>
+                      <a:prstDash val="solid"/>
+                      <a:round/>
+                      <a:headEnd type="none" w="med" len="med"/>
+                      <a:tailEnd type="none" w="med" len="med"/>
+                    </a:lnT>
+                    <a:lnB w="19050" cap="flat" cmpd="sng" algn="ctr">
+                      <a:solidFill>
+                        <a:srgbClr val="002060"/>
+                      </a:solidFill>
+                      <a:prstDash val="solid"/>
+                      <a:round/>
+                      <a:headEnd type="none" w="med" len="med"/>
+                      <a:tailEnd type="none" w="med" len="med"/>
+                    </a:lnB>
+                    <a:solidFill>
+                      <a:srgbClr val="BFBFBF"/>
+                    </a:solidFill>
+                  </a:tcPr>
+                </a:tc>
+                <a:tc>
+                  <a:txBody>
+                    <a:bodyPr/>
+                    <a:lstStyle/>
+                    <a:p>
+                      <a:pPr algn="l" fontAlgn="t"/>
+                      <a:r>
+                        <a:rPr lang="en-US" sz="1200" b="0" i="0" u="none" strike="noStrike" smtClean="0">
+                          <a:solidFill>
+                            <a:srgbClr val="002060"/>
+                          </a:solidFill>
+                          <a:effectLst/>
+                          <a:latin typeface="Intel Clear" panose="020B0604020203020204" pitchFamily="34" charset="0"/>
+                          <a:ea typeface="Intel Clear" panose="020B0604020203020204" pitchFamily="34" charset="0"/>
+                          <a:cs typeface="Intel Clear" panose="020B0604020203020204" pitchFamily="34" charset="0"/>
+                        </a:rPr>
+                        <a:t> </a:t>
+                      </a:r>
+                      <a:endParaRPr lang="en-US" sz="1200" b="0" i="0" u="none" strike="noStrike" dirty="0">
+                        <a:solidFill>
+                          <a:srgbClr val="002060"/>
+                        </a:solidFill>
+                        <a:effectLst/>
+                        <a:latin typeface="Intel Clear" panose="020B0604020203020204" pitchFamily="34" charset="0"/>
+                        <a:ea typeface="Intel Clear" panose="020B0604020203020204" pitchFamily="34" charset="0"/>
+                        <a:cs typeface="Intel Clear" panose="020B0604020203020204" pitchFamily="34" charset="0"/>
+                      </a:endParaRPr>
+                    </a:p>
+                  </a:txBody>
+                  <a:tcPr marL="45720" marR="45720" marT="27432" marB="27432" anchor="ctr">
+                    <a:lnL w="19050" cap="flat" cmpd="sng" algn="ctr">
+                      <a:solidFill>
+                        <a:srgbClr val="002060"/>
+                      </a:solidFill>
+                      <a:prstDash val="solid"/>
+                      <a:round/>
+                      <a:headEnd type="none" w="med" len="med"/>
+                      <a:tailEnd type="none" w="med" len="med"/>
+                    </a:lnL>
+                    <a:lnR w="19050" cap="flat" cmpd="sng" algn="ctr">
+                      <a:solidFill>
+                        <a:srgbClr val="002060"/>
+                      </a:solidFill>
+                      <a:prstDash val="solid"/>
+                      <a:round/>
+                      <a:headEnd type="none" w="med" len="med"/>
+                      <a:tailEnd type="none" w="med" len="med"/>
+                    </a:lnR>
+                    <a:lnT w="19050" cap="flat" cmpd="sng" algn="ctr">
+                      <a:solidFill>
+                        <a:srgbClr val="002060"/>
+                      </a:solidFill>
+                      <a:prstDash val="solid"/>
+                      <a:round/>
+                      <a:headEnd type="none" w="med" len="med"/>
+                      <a:tailEnd type="none" w="med" len="med"/>
+                    </a:lnT>
+                    <a:lnB w="19050" cap="flat" cmpd="sng" algn="ctr">
+                      <a:solidFill>
+                        <a:srgbClr val="002060"/>
+                      </a:solidFill>
+                      <a:prstDash val="solid"/>
+                      <a:round/>
+                      <a:headEnd type="none" w="med" len="med"/>
+                      <a:tailEnd type="none" w="med" len="med"/>
+                    </a:lnB>
+                    <a:solidFill>
+                      <a:schemeClr val="bg1">
+                        <a:lumMod val="75000"/>
+                      </a:schemeClr>
+                    </a:solidFill>
+                  </a:tcPr>
+                </a:tc>
+                <a:extLst>
+                  <a:ext uri="{0D108BD9-81ED-4DB2-BD59-A6C34878D82A}">
+                    <a16:rowId xmlns:a16="http://schemas.microsoft.com/office/drawing/2014/main" val="2775169456"/>
+                  </a:ext>
+                </a:extLst>
+              </a:tr>
+              <a:tr h="315925">
+                <a:tc>
+                  <a:txBody>
+                    <a:bodyPr/>
+                    <a:lstStyle/>
+                    <a:p>
+                      <a:pPr algn="ctr" fontAlgn="t"/>
+                      <a:r>
+                        <a:rPr lang="en-US" sz="1200" b="0" i="0" u="none" strike="noStrike" baseline="0" smtClean="0">
+                          <a:solidFill>
+                            <a:srgbClr val="002060"/>
+                          </a:solidFill>
+                          <a:effectLst/>
+                          <a:latin typeface="Intel Clear" panose="020B0604020203020204" pitchFamily="34" charset="0"/>
+                          <a:ea typeface="Intel Clear" panose="020B0604020203020204" pitchFamily="34" charset="0"/>
+                          <a:cs typeface="Intel Clear" panose="020B0604020203020204" pitchFamily="34" charset="0"/>
+                        </a:rPr>
+                        <a:t> </a:t>
+                      </a:r>
+                      <a:endParaRPr lang="en-US" sz="1200" b="0" i="0" u="none" strike="noStrike" dirty="0">
+                        <a:solidFill>
+                          <a:srgbClr val="002060"/>
+                        </a:solidFill>
+                        <a:effectLst/>
+                        <a:latin typeface="Intel Clear" panose="020B0604020203020204" pitchFamily="34" charset="0"/>
+                        <a:ea typeface="Intel Clear" panose="020B0604020203020204" pitchFamily="34" charset="0"/>
+                        <a:cs typeface="Intel Clear" panose="020B0604020203020204" pitchFamily="34" charset="0"/>
+                      </a:endParaRPr>
+                    </a:p>
+                  </a:txBody>
+                  <a:tcPr marL="45720" marR="45720" marT="27432" marB="27432" anchor="ctr">
+                    <a:lnL w="19050" cap="flat" cmpd="sng" algn="ctr">
+                      <a:solidFill>
+                        <a:srgbClr val="002060"/>
+                      </a:solidFill>
+                      <a:prstDash val="solid"/>
+                      <a:round/>
+                      <a:headEnd type="none" w="med" len="med"/>
+                      <a:tailEnd type="none" w="med" len="med"/>
+                    </a:lnL>
+                    <a:lnR w="19050" cap="flat" cmpd="sng" algn="ctr">
+                      <a:solidFill>
+                        <a:srgbClr val="002060"/>
+                      </a:solidFill>
+                      <a:prstDash val="solid"/>
+                      <a:round/>
+                      <a:headEnd type="none" w="med" len="med"/>
+                      <a:tailEnd type="none" w="med" len="med"/>
+                    </a:lnR>
+                    <a:lnT w="19050" cap="flat" cmpd="sng" algn="ctr">
+                      <a:solidFill>
+                        <a:srgbClr val="002060"/>
+                      </a:solidFill>
+                      <a:prstDash val="solid"/>
+                      <a:round/>
+                      <a:headEnd type="none" w="med" len="med"/>
+                      <a:tailEnd type="none" w="med" len="med"/>
+                    </a:lnT>
+                    <a:lnB w="19050" cap="flat" cmpd="sng" algn="ctr">
+                      <a:solidFill>
+                        <a:srgbClr val="002060"/>
+                      </a:solidFill>
+                      <a:prstDash val="solid"/>
+                      <a:round/>
+                      <a:headEnd type="none" w="med" len="med"/>
+                      <a:tailEnd type="none" w="med" len="med"/>
+                    </a:lnB>
+                    <a:solidFill>
+                      <a:srgbClr val="BFBFBF"/>
+                    </a:solidFill>
+                  </a:tcPr>
+                </a:tc>
+                <a:tc>
+                  <a:txBody>
+                    <a:bodyPr/>
+                    <a:lstStyle/>
+                    <a:p>
+                      <a:pPr algn="l" fontAlgn="t"/>
+                      <a:r>
+                        <a:rPr lang="en-US" sz="1200" b="0" i="0" u="none" strike="noStrike" smtClean="0">
+                          <a:solidFill>
+                            <a:srgbClr val="002060"/>
+                          </a:solidFill>
+                          <a:effectLst/>
+                          <a:latin typeface="Intel Clear" panose="020B0604020203020204" pitchFamily="34" charset="0"/>
+                          <a:ea typeface="Intel Clear" panose="020B0604020203020204" pitchFamily="34" charset="0"/>
+                          <a:cs typeface="Intel Clear" panose="020B0604020203020204" pitchFamily="34" charset="0"/>
+                        </a:rPr>
+                        <a:t> </a:t>
+                      </a:r>
+                      <a:endParaRPr lang="en-US" sz="1200" b="0" i="0" u="none" strike="noStrike" dirty="0">
+                        <a:solidFill>
+                          <a:srgbClr val="002060"/>
+                        </a:solidFill>
+                        <a:effectLst/>
+                        <a:latin typeface="Intel Clear" panose="020B0604020203020204" pitchFamily="34" charset="0"/>
+                        <a:ea typeface="Intel Clear" panose="020B0604020203020204" pitchFamily="34" charset="0"/>
+                        <a:cs typeface="Intel Clear" panose="020B0604020203020204" pitchFamily="34" charset="0"/>
+                      </a:endParaRPr>
+                    </a:p>
+                  </a:txBody>
+                  <a:tcPr marL="45720" marR="45720" marT="27432" marB="27432" anchor="ctr">
+                    <a:lnL w="19050" cap="flat" cmpd="sng" algn="ctr">
+                      <a:solidFill>
+                        <a:srgbClr val="002060"/>
+                      </a:solidFill>
+                      <a:prstDash val="solid"/>
+                      <a:round/>
+                      <a:headEnd type="none" w="med" len="med"/>
+                      <a:tailEnd type="none" w="med" len="med"/>
+                    </a:lnL>
+                    <a:lnR w="19050" cap="flat" cmpd="sng" algn="ctr">
+                      <a:solidFill>
+                        <a:srgbClr val="002060"/>
+                      </a:solidFill>
+                      <a:prstDash val="solid"/>
+                      <a:round/>
+                      <a:headEnd type="none" w="med" len="med"/>
+                      <a:tailEnd type="none" w="med" len="med"/>
+                    </a:lnR>
+                    <a:lnT w="19050" cap="flat" cmpd="sng" algn="ctr">
+                      <a:solidFill>
+                        <a:srgbClr val="002060"/>
+                      </a:solidFill>
+                      <a:prstDash val="solid"/>
+                      <a:round/>
+                      <a:headEnd type="none" w="med" len="med"/>
+                      <a:tailEnd type="none" w="med" len="med"/>
+                    </a:lnT>
+                    <a:lnB w="19050" cap="flat" cmpd="sng" algn="ctr">
+                      <a:solidFill>
+                        <a:srgbClr val="002060"/>
+                      </a:solidFill>
+                      <a:prstDash val="solid"/>
+                      <a:round/>
+                      <a:headEnd type="none" w="med" len="med"/>
+                      <a:tailEnd type="none" w="med" len="med"/>
+                    </a:lnB>
+                    <a:solidFill>
+                      <a:schemeClr val="bg1">
+                        <a:lumMod val="75000"/>
+                      </a:schemeClr>
+                    </a:solidFill>
+                  </a:tcPr>
+                </a:tc>
+                <a:extLst>
+                  <a:ext uri="{0D108BD9-81ED-4DB2-BD59-A6C34878D82A}">
+                    <a16:rowId xmlns:a16="http://schemas.microsoft.com/office/drawing/2014/main" val="1902056831"/>
+                  </a:ext>
+                </a:extLst>
+              </a:tr>
+              <a:tr h="315925">
+                <a:tc>
+                  <a:txBody>
+                    <a:bodyPr/>
+                    <a:lstStyle/>
+                    <a:p>
+                      <a:pPr algn="ctr" fontAlgn="t"/>
+                      <a:r>
+                        <a:rPr lang="en-US" sz="1200" b="0" i="0" u="none" strike="noStrike" smtClean="0">
+                          <a:solidFill>
+                            <a:srgbClr val="002060"/>
+                          </a:solidFill>
+                          <a:effectLst/>
+                          <a:latin typeface="Intel Clear" panose="020B0604020203020204" pitchFamily="34" charset="0"/>
+                          <a:ea typeface="Intel Clear" panose="020B0604020203020204" pitchFamily="34" charset="0"/>
+                          <a:cs typeface="Intel Clear" panose="020B0604020203020204" pitchFamily="34" charset="0"/>
+                        </a:rPr>
+                        <a:t> </a:t>
+                      </a:r>
+                      <a:endParaRPr lang="en-US" sz="1200" b="0" i="0" u="none" strike="noStrike" dirty="0">
+                        <a:solidFill>
+                          <a:srgbClr val="002060"/>
+                        </a:solidFill>
+                        <a:effectLst/>
+                        <a:latin typeface="Intel Clear" panose="020B0604020203020204" pitchFamily="34" charset="0"/>
+                        <a:ea typeface="Intel Clear" panose="020B0604020203020204" pitchFamily="34" charset="0"/>
+                        <a:cs typeface="Intel Clear" panose="020B0604020203020204" pitchFamily="34" charset="0"/>
+                      </a:endParaRPr>
+                    </a:p>
+                  </a:txBody>
+                  <a:tcPr marL="45720" marR="45720" marT="27432" marB="27432" anchor="ctr">
+                    <a:lnL w="19050" cap="flat" cmpd="sng" algn="ctr">
+                      <a:solidFill>
+                        <a:srgbClr val="002060"/>
+                      </a:solidFill>
+                      <a:prstDash val="solid"/>
+                      <a:round/>
+                      <a:headEnd type="none" w="med" len="med"/>
+                      <a:tailEnd type="none" w="med" len="med"/>
+                    </a:lnL>
+                    <a:lnR w="19050" cap="flat" cmpd="sng" algn="ctr">
+                      <a:solidFill>
+                        <a:srgbClr val="002060"/>
+                      </a:solidFill>
+                      <a:prstDash val="solid"/>
+                      <a:round/>
+                      <a:headEnd type="none" w="med" len="med"/>
+                      <a:tailEnd type="none" w="med" len="med"/>
+                    </a:lnR>
+                    <a:lnT w="19050" cap="flat" cmpd="sng" algn="ctr">
+                      <a:solidFill>
+                        <a:srgbClr val="002060"/>
+                      </a:solidFill>
+                      <a:prstDash val="solid"/>
+                      <a:round/>
+                      <a:headEnd type="none" w="med" len="med"/>
+                      <a:tailEnd type="none" w="med" len="med"/>
+                    </a:lnT>
+                    <a:lnB w="19050" cap="flat" cmpd="sng" algn="ctr">
+                      <a:solidFill>
+                        <a:srgbClr val="002060"/>
+                      </a:solidFill>
+                      <a:prstDash val="solid"/>
+                      <a:round/>
+                      <a:headEnd type="none" w="med" len="med"/>
+                      <a:tailEnd type="none" w="med" len="med"/>
+                    </a:lnB>
+                    <a:solidFill>
+                      <a:srgbClr val="BFBFBF"/>
+                    </a:solidFill>
+                  </a:tcPr>
+                </a:tc>
+                <a:tc>
+                  <a:txBody>
+                    <a:bodyPr/>
+                    <a:lstStyle/>
+                    <a:p>
+                      <a:pPr algn="l" fontAlgn="t"/>
+                      <a:r>
+                        <a:rPr lang="en-US" sz="1200" b="0" i="0" u="none" strike="noStrike" smtClean="0">
+                          <a:solidFill>
+                            <a:srgbClr val="002060"/>
+                          </a:solidFill>
+                          <a:effectLst/>
+                          <a:latin typeface="Intel Clear" panose="020B0604020203020204" pitchFamily="34" charset="0"/>
+                          <a:ea typeface="Intel Clear" panose="020B0604020203020204" pitchFamily="34" charset="0"/>
+                          <a:cs typeface="Intel Clear" panose="020B0604020203020204" pitchFamily="34" charset="0"/>
+                        </a:rPr>
+                        <a:t> </a:t>
+                      </a:r>
+                      <a:endParaRPr lang="en-US" sz="1200" b="0" i="0" u="none" strike="noStrike" dirty="0">
+                        <a:solidFill>
+                          <a:srgbClr val="002060"/>
+                        </a:solidFill>
+                        <a:effectLst/>
+                        <a:latin typeface="Intel Clear" panose="020B0604020203020204" pitchFamily="34" charset="0"/>
+                        <a:ea typeface="Intel Clear" panose="020B0604020203020204" pitchFamily="34" charset="0"/>
+                        <a:cs typeface="Intel Clear" panose="020B0604020203020204" pitchFamily="34" charset="0"/>
+                      </a:endParaRPr>
+                    </a:p>
+                  </a:txBody>
+                  <a:tcPr marL="45720" marR="45720" marT="27432" marB="27432" anchor="ctr">
+                    <a:lnL w="19050" cap="flat" cmpd="sng" algn="ctr">
+                      <a:solidFill>
+                        <a:srgbClr val="002060"/>
+                      </a:solidFill>
+                      <a:prstDash val="solid"/>
+                      <a:round/>
+                      <a:headEnd type="none" w="med" len="med"/>
+                      <a:tailEnd type="none" w="med" len="med"/>
+                    </a:lnL>
+                    <a:lnR w="19050" cap="flat" cmpd="sng" algn="ctr">
+                      <a:solidFill>
+                        <a:srgbClr val="002060"/>
+                      </a:solidFill>
+                      <a:prstDash val="solid"/>
+                      <a:round/>
+                      <a:headEnd type="none" w="med" len="med"/>
+                      <a:tailEnd type="none" w="med" len="med"/>
+                    </a:lnR>
+                    <a:lnT w="19050" cap="flat" cmpd="sng" algn="ctr">
+                      <a:solidFill>
+                        <a:srgbClr val="002060"/>
+                      </a:solidFill>
+                      <a:prstDash val="solid"/>
+                      <a:round/>
+                      <a:headEnd type="none" w="med" len="med"/>
+                      <a:tailEnd type="none" w="med" len="med"/>
+                    </a:lnT>
+                    <a:lnB w="19050" cap="flat" cmpd="sng" algn="ctr">
+                      <a:solidFill>
+                        <a:srgbClr val="002060"/>
+                      </a:solidFill>
+                      <a:prstDash val="solid"/>
+                      <a:round/>
+                      <a:headEnd type="none" w="med" len="med"/>
+                      <a:tailEnd type="none" w="med" len="med"/>
+                    </a:lnB>
+                    <a:solidFill>
+                      <a:schemeClr val="bg1">
+                        <a:lumMod val="75000"/>
+                      </a:schemeClr>
+                    </a:solidFill>
+                  </a:tcPr>
+                </a:tc>
+                <a:extLst>
+                  <a:ext uri="{0D108BD9-81ED-4DB2-BD59-A6C34878D82A}">
+                    <a16:rowId xmlns:a16="http://schemas.microsoft.com/office/drawing/2014/main" val="762802707"/>
+                  </a:ext>
+                </a:extLst>
+              </a:tr>
+              <a:tr h="315925">
+                <a:tc>
+                  <a:txBody>
+                    <a:bodyPr/>
+                    <a:lstStyle/>
+                    <a:p>
+                      <a:pPr algn="ctr" fontAlgn="t"/>
+                      <a:r>
+                        <a:rPr lang="en-US" sz="1200" b="0" i="0" u="none" strike="noStrike" smtClean="0">
+                          <a:solidFill>
+                            <a:srgbClr val="002060"/>
+                          </a:solidFill>
+                          <a:effectLst/>
+                          <a:latin typeface="Intel Clear" panose="020B0604020203020204" pitchFamily="34" charset="0"/>
+                          <a:ea typeface="Intel Clear" panose="020B0604020203020204" pitchFamily="34" charset="0"/>
+                          <a:cs typeface="Intel Clear" panose="020B0604020203020204" pitchFamily="34" charset="0"/>
+                        </a:rPr>
+                        <a:t> </a:t>
+                      </a:r>
+                      <a:endParaRPr lang="en-US" sz="1200" b="0" i="0" u="none" strike="noStrike" dirty="0">
+                        <a:solidFill>
+                          <a:srgbClr val="002060"/>
+                        </a:solidFill>
+                        <a:effectLst/>
+                        <a:latin typeface="Intel Clear" panose="020B0604020203020204" pitchFamily="34" charset="0"/>
+                        <a:ea typeface="Intel Clear" panose="020B0604020203020204" pitchFamily="34" charset="0"/>
+                        <a:cs typeface="Intel Clear" panose="020B0604020203020204" pitchFamily="34" charset="0"/>
+                      </a:endParaRPr>
+                    </a:p>
+                  </a:txBody>
+                  <a:tcPr marL="45720" marR="45720" marT="27432" marB="27432" anchor="ctr">
+                    <a:lnL w="19050" cap="flat" cmpd="sng" algn="ctr">
+                      <a:solidFill>
+                        <a:srgbClr val="002060"/>
+                      </a:solidFill>
+                      <a:prstDash val="solid"/>
+                      <a:round/>
+                      <a:headEnd type="none" w="med" len="med"/>
+                      <a:tailEnd type="none" w="med" len="med"/>
+                    </a:lnL>
+                    <a:lnR w="19050" cap="flat" cmpd="sng" algn="ctr">
+                      <a:solidFill>
+                        <a:srgbClr val="002060"/>
+                      </a:solidFill>
+                      <a:prstDash val="solid"/>
+                      <a:round/>
+                      <a:headEnd type="none" w="med" len="med"/>
+                      <a:tailEnd type="none" w="med" len="med"/>
+                    </a:lnR>
+                    <a:lnT w="19050" cap="flat" cmpd="sng" algn="ctr">
+                      <a:solidFill>
+                        <a:srgbClr val="002060"/>
+                      </a:solidFill>
+                      <a:prstDash val="solid"/>
+                      <a:round/>
+                      <a:headEnd type="none" w="med" len="med"/>
+                      <a:tailEnd type="none" w="med" len="med"/>
+                    </a:lnT>
+                    <a:lnB w="19050" cap="flat" cmpd="sng" algn="ctr">
+                      <a:solidFill>
+                        <a:srgbClr val="002060"/>
+                      </a:solidFill>
+                      <a:prstDash val="solid"/>
+                      <a:round/>
+                      <a:headEnd type="none" w="med" len="med"/>
+                      <a:tailEnd type="none" w="med" len="med"/>
+                    </a:lnB>
+                    <a:solidFill>
+                      <a:srgbClr val="BFBFBF"/>
+                    </a:solidFill>
+                  </a:tcPr>
+                </a:tc>
+                <a:tc>
+                  <a:txBody>
+                    <a:bodyPr/>
+                    <a:lstStyle/>
+                    <a:p>
+                      <a:pPr algn="l" fontAlgn="t"/>
+                      <a:r>
+                        <a:rPr lang="en-US" sz="1200" b="0" i="0" u="none" strike="noStrike" smtClean="0">
+                          <a:solidFill>
+                            <a:srgbClr val="002060"/>
+                          </a:solidFill>
+                          <a:effectLst/>
+                          <a:latin typeface="Intel Clear" panose="020B0604020203020204" pitchFamily="34" charset="0"/>
+                          <a:ea typeface="Intel Clear" panose="020B0604020203020204" pitchFamily="34" charset="0"/>
+                          <a:cs typeface="Intel Clear" panose="020B0604020203020204" pitchFamily="34" charset="0"/>
+                        </a:rPr>
+                        <a:t> </a:t>
+                      </a:r>
+                      <a:endParaRPr lang="en-US" sz="1200" b="0" i="0" u="none" strike="noStrike" dirty="0">
+                        <a:solidFill>
+                          <a:srgbClr val="002060"/>
+                        </a:solidFill>
+                        <a:effectLst/>
+                        <a:latin typeface="Intel Clear" panose="020B0604020203020204" pitchFamily="34" charset="0"/>
+                        <a:ea typeface="Intel Clear" panose="020B0604020203020204" pitchFamily="34" charset="0"/>
+                        <a:cs typeface="Intel Clear" panose="020B0604020203020204" pitchFamily="34" charset="0"/>
+                      </a:endParaRPr>
+                    </a:p>
+                  </a:txBody>
+                  <a:tcPr marL="45720" marR="45720" marT="27432" marB="27432" anchor="ctr">
+                    <a:lnL w="19050" cap="flat" cmpd="sng" algn="ctr">
+                      <a:solidFill>
+                        <a:srgbClr val="002060"/>
+                      </a:solidFill>
+                      <a:prstDash val="solid"/>
+                      <a:round/>
+                      <a:headEnd type="none" w="med" len="med"/>
+                      <a:tailEnd type="none" w="med" len="med"/>
+                    </a:lnL>
+                    <a:lnR w="19050" cap="flat" cmpd="sng" algn="ctr">
+                      <a:solidFill>
+                        <a:srgbClr val="002060"/>
+                      </a:solidFill>
+                      <a:prstDash val="solid"/>
+                      <a:round/>
+                      <a:headEnd type="none" w="med" len="med"/>
+                      <a:tailEnd type="none" w="med" len="med"/>
+                    </a:lnR>
+                    <a:lnT w="19050" cap="flat" cmpd="sng" algn="ctr">
+                      <a:solidFill>
+                        <a:srgbClr val="002060"/>
+                      </a:solidFill>
+                      <a:prstDash val="solid"/>
+                      <a:round/>
+                      <a:headEnd type="none" w="med" len="med"/>
+                      <a:tailEnd type="none" w="med" len="med"/>
+                    </a:lnT>
+                    <a:lnB w="19050" cap="flat" cmpd="sng" algn="ctr">
+                      <a:solidFill>
+                        <a:srgbClr val="002060"/>
+                      </a:solidFill>
+                      <a:prstDash val="solid"/>
+                      <a:round/>
+                      <a:headEnd type="none" w="med" len="med"/>
+                      <a:tailEnd type="none" w="med" len="med"/>
+                    </a:lnB>
+                    <a:solidFill>
+                      <a:schemeClr val="bg1">
+                        <a:lumMod val="75000"/>
+                      </a:schemeClr>
+                    </a:solidFill>
+                  </a:tcPr>
+                </a:tc>
+                <a:extLst>
+                  <a:ext uri="{0D108BD9-81ED-4DB2-BD59-A6C34878D82A}">
+                    <a16:rowId xmlns:a16="http://schemas.microsoft.com/office/drawing/2014/main" val="2090210283"/>
+                  </a:ext>
+                </a:extLst>
+              </a:tr>
+              <a:tr h="315925">
+                <a:tc>
+                  <a:txBody>
+                    <a:bodyPr/>
+                    <a:lstStyle/>
+                    <a:p>
+                      <a:pPr algn="ctr" fontAlgn="t"/>
+                      <a:r>
+                        <a:rPr lang="en-US" sz="1200" b="0" i="0" u="none" strike="noStrike" smtClean="0">
+                          <a:solidFill>
+                            <a:srgbClr val="002060"/>
+                          </a:solidFill>
+                          <a:effectLst/>
+                          <a:latin typeface="Intel Clear" panose="020B0604020203020204" pitchFamily="34" charset="0"/>
+                          <a:ea typeface="Intel Clear" panose="020B0604020203020204" pitchFamily="34" charset="0"/>
+                          <a:cs typeface="Intel Clear" panose="020B0604020203020204" pitchFamily="34" charset="0"/>
+                        </a:rPr>
+                        <a:t> </a:t>
+                      </a:r>
+                      <a:endParaRPr lang="en-US" sz="1200" b="0" i="0" u="none" strike="noStrike" dirty="0">
+                        <a:solidFill>
+                          <a:srgbClr val="002060"/>
+                        </a:solidFill>
+                        <a:effectLst/>
+                        <a:latin typeface="Intel Clear" panose="020B0604020203020204" pitchFamily="34" charset="0"/>
+                        <a:ea typeface="Intel Clear" panose="020B0604020203020204" pitchFamily="34" charset="0"/>
+                        <a:cs typeface="Intel Clear" panose="020B0604020203020204" pitchFamily="34" charset="0"/>
+                      </a:endParaRPr>
+                    </a:p>
+                  </a:txBody>
+                  <a:tcPr marL="45720" marR="45720" marT="27432" marB="27432" anchor="ctr">
+                    <a:lnL w="19050" cap="flat" cmpd="sng" algn="ctr">
+                      <a:solidFill>
+                        <a:srgbClr val="002060"/>
+                      </a:solidFill>
+                      <a:prstDash val="solid"/>
+                      <a:round/>
+                      <a:headEnd type="none" w="med" len="med"/>
+                      <a:tailEnd type="none" w="med" len="med"/>
+                    </a:lnL>
+                    <a:lnR w="19050" cap="flat" cmpd="sng" algn="ctr">
+                      <a:solidFill>
+                        <a:srgbClr val="002060"/>
+                      </a:solidFill>
+                      <a:prstDash val="solid"/>
+                      <a:round/>
+                      <a:headEnd type="none" w="med" len="med"/>
+                      <a:tailEnd type="none" w="med" len="med"/>
+                    </a:lnR>
+                    <a:lnT w="19050" cap="flat" cmpd="sng" algn="ctr">
+                      <a:solidFill>
+                        <a:srgbClr val="002060"/>
+                      </a:solidFill>
+                      <a:prstDash val="solid"/>
+                      <a:round/>
+                      <a:headEnd type="none" w="med" len="med"/>
+                      <a:tailEnd type="none" w="med" len="med"/>
+                    </a:lnT>
+                    <a:lnB w="19050" cap="flat" cmpd="sng" algn="ctr">
+                      <a:solidFill>
+                        <a:srgbClr val="002060"/>
+                      </a:solidFill>
+                      <a:prstDash val="solid"/>
+                      <a:round/>
+                      <a:headEnd type="none" w="med" len="med"/>
+                      <a:tailEnd type="none" w="med" len="med"/>
+                    </a:lnB>
+                    <a:solidFill>
+                      <a:srgbClr val="BFBFBF"/>
+                    </a:solidFill>
+                  </a:tcPr>
+                </a:tc>
+                <a:tc>
+                  <a:txBody>
+                    <a:bodyPr/>
+                    <a:lstStyle/>
+                    <a:p>
+                      <a:pPr algn="l" fontAlgn="t"/>
+                      <a:r>
+                        <a:rPr lang="en-US" sz="1200" b="0" i="0" u="none" strike="noStrike" smtClean="0">
+                          <a:solidFill>
+                            <a:srgbClr val="002060"/>
+                          </a:solidFill>
+                          <a:effectLst/>
+                          <a:latin typeface="Intel Clear" panose="020B0604020203020204" pitchFamily="34" charset="0"/>
+                          <a:ea typeface="Intel Clear" panose="020B0604020203020204" pitchFamily="34" charset="0"/>
+                          <a:cs typeface="Intel Clear" panose="020B0604020203020204" pitchFamily="34" charset="0"/>
+                        </a:rPr>
+                        <a:t> </a:t>
+                      </a:r>
+                      <a:endParaRPr lang="en-US" sz="1200" b="0" i="0" u="none" strike="noStrike" dirty="0">
+                        <a:solidFill>
+                          <a:srgbClr val="002060"/>
+                        </a:solidFill>
+                        <a:effectLst/>
+                        <a:latin typeface="Intel Clear" panose="020B0604020203020204" pitchFamily="34" charset="0"/>
+                        <a:ea typeface="Intel Clear" panose="020B0604020203020204" pitchFamily="34" charset="0"/>
+                        <a:cs typeface="Intel Clear" panose="020B0604020203020204" pitchFamily="34" charset="0"/>
+                      </a:endParaRPr>
+                    </a:p>
+                  </a:txBody>
+                  <a:tcPr marL="45720" marR="45720" marT="27432" marB="27432" anchor="ctr">
+                    <a:lnL w="19050" cap="flat" cmpd="sng" algn="ctr">
+                      <a:solidFill>
+                        <a:srgbClr val="002060"/>
+                      </a:solidFill>
+                      <a:prstDash val="solid"/>
+                      <a:round/>
+                      <a:headEnd type="none" w="med" len="med"/>
+                      <a:tailEnd type="none" w="med" len="med"/>
+                    </a:lnL>
+                    <a:lnR w="19050" cap="flat" cmpd="sng" algn="ctr">
+                      <a:solidFill>
+                        <a:srgbClr val="002060"/>
+                      </a:solidFill>
+                      <a:prstDash val="solid"/>
+                      <a:round/>
+                      <a:headEnd type="none" w="med" len="med"/>
+                      <a:tailEnd type="none" w="med" len="med"/>
+                    </a:lnR>
+                    <a:lnT w="19050" cap="flat" cmpd="sng" algn="ctr">
+                      <a:solidFill>
+                        <a:srgbClr val="002060"/>
+                      </a:solidFill>
+                      <a:prstDash val="solid"/>
+                      <a:round/>
+                      <a:headEnd type="none" w="med" len="med"/>
+                      <a:tailEnd type="none" w="med" len="med"/>
+                    </a:lnT>
+                    <a:lnB w="19050" cap="flat" cmpd="sng" algn="ctr">
+                      <a:solidFill>
+                        <a:srgbClr val="002060"/>
+                      </a:solidFill>
+                      <a:prstDash val="solid"/>
+                      <a:round/>
+                      <a:headEnd type="none" w="med" len="med"/>
+                      <a:tailEnd type="none" w="med" len="med"/>
+                    </a:lnB>
+                    <a:solidFill>
+                      <a:schemeClr val="bg1">
+                        <a:lumMod val="75000"/>
+                      </a:schemeClr>
+                    </a:solidFill>
+                  </a:tcPr>
+                </a:tc>
+                <a:extLst>
+                  <a:ext uri="{0D108BD9-81ED-4DB2-BD59-A6C34878D82A}">
+                    <a16:rowId xmlns:a16="http://schemas.microsoft.com/office/drawing/2014/main" val="1611437538"/>
+                  </a:ext>
+                </a:extLst>
+              </a:tr>
+              <a:tr h="315925">
+                <a:tc>
+                  <a:txBody>
+                    <a:bodyPr/>
+                    <a:lstStyle/>
+                    <a:p>
+                      <a:pPr algn="ctr" fontAlgn="t"/>
+                      <a:r>
+                        <a:rPr lang="en-US" sz="1200" b="0" i="0" u="none" strike="noStrike" smtClean="0">
+                          <a:solidFill>
+                            <a:srgbClr val="002060"/>
+                          </a:solidFill>
+                          <a:effectLst/>
+                          <a:latin typeface="Intel Clear" panose="020B0604020203020204" pitchFamily="34" charset="0"/>
+                          <a:ea typeface="Intel Clear" panose="020B0604020203020204" pitchFamily="34" charset="0"/>
+                          <a:cs typeface="Intel Clear" panose="020B0604020203020204" pitchFamily="34" charset="0"/>
+                        </a:rPr>
+                        <a:t> </a:t>
+                      </a:r>
+                      <a:endParaRPr lang="en-US" sz="1200" b="0" i="0" u="none" strike="noStrike" dirty="0">
+                        <a:solidFill>
+                          <a:srgbClr val="002060"/>
+                        </a:solidFill>
+                        <a:effectLst/>
+                        <a:latin typeface="Intel Clear" panose="020B0604020203020204" pitchFamily="34" charset="0"/>
+                        <a:ea typeface="Intel Clear" panose="020B0604020203020204" pitchFamily="34" charset="0"/>
+                        <a:cs typeface="Intel Clear" panose="020B0604020203020204" pitchFamily="34" charset="0"/>
+                      </a:endParaRPr>
+                    </a:p>
+                  </a:txBody>
+                  <a:tcPr marL="45720" marR="45720" marT="27432" marB="27432" anchor="ctr">
+                    <a:lnL w="19050" cap="flat" cmpd="sng" algn="ctr">
+                      <a:solidFill>
+                        <a:srgbClr val="002060"/>
+                      </a:solidFill>
+                      <a:prstDash val="solid"/>
+                      <a:round/>
+                      <a:headEnd type="none" w="med" len="med"/>
+                      <a:tailEnd type="none" w="med" len="med"/>
+                    </a:lnL>
+                    <a:lnR w="19050" cap="flat" cmpd="sng" algn="ctr">
+                      <a:solidFill>
+                        <a:srgbClr val="002060"/>
+                      </a:solidFill>
+                      <a:prstDash val="solid"/>
+                      <a:round/>
+                      <a:headEnd type="none" w="med" len="med"/>
+                      <a:tailEnd type="none" w="med" len="med"/>
+                    </a:lnR>
+                    <a:lnT w="19050" cap="flat" cmpd="sng" algn="ctr">
+                      <a:solidFill>
+                        <a:srgbClr val="002060"/>
+                      </a:solidFill>
+                      <a:prstDash val="solid"/>
+                      <a:round/>
+                      <a:headEnd type="none" w="med" len="med"/>
+                      <a:tailEnd type="none" w="med" len="med"/>
+                    </a:lnT>
+                    <a:lnB w="19050" cap="flat" cmpd="sng" algn="ctr">
+                      <a:solidFill>
+                        <a:srgbClr val="002060"/>
+                      </a:solidFill>
+                      <a:prstDash val="solid"/>
+                      <a:round/>
+                      <a:headEnd type="none" w="med" len="med"/>
+                      <a:tailEnd type="none" w="med" len="med"/>
+                    </a:lnB>
+                    <a:solidFill>
+                      <a:srgbClr val="BFBFBF"/>
+                    </a:solidFill>
+                  </a:tcPr>
+                </a:tc>
+                <a:tc>
+                  <a:txBody>
+                    <a:bodyPr/>
+                    <a:lstStyle/>
+                    <a:p>
+                      <a:pPr algn="l" fontAlgn="t"/>
+                      <a:r>
+                        <a:rPr lang="en-US" sz="1200" b="0" i="0" u="none" strike="noStrike" smtClean="0">
+                          <a:solidFill>
+                            <a:srgbClr val="002060"/>
+                          </a:solidFill>
+                          <a:effectLst/>
+                          <a:latin typeface="Intel Clear" panose="020B0604020203020204" pitchFamily="34" charset="0"/>
+                          <a:ea typeface="Intel Clear" panose="020B0604020203020204" pitchFamily="34" charset="0"/>
+                          <a:cs typeface="Intel Clear" panose="020B0604020203020204" pitchFamily="34" charset="0"/>
+                        </a:rPr>
+                        <a:t> </a:t>
+                      </a:r>
+                      <a:endParaRPr lang="en-US" sz="1200" b="0" i="0" u="none" strike="noStrike" dirty="0">
+                        <a:solidFill>
+                          <a:srgbClr val="002060"/>
+                        </a:solidFill>
+                        <a:effectLst/>
+                        <a:latin typeface="Intel Clear" panose="020B0604020203020204" pitchFamily="34" charset="0"/>
+                        <a:ea typeface="Intel Clear" panose="020B0604020203020204" pitchFamily="34" charset="0"/>
+                        <a:cs typeface="Intel Clear" panose="020B0604020203020204" pitchFamily="34" charset="0"/>
+                      </a:endParaRPr>
+                    </a:p>
+                  </a:txBody>
+                  <a:tcPr marL="45720" marR="45720" marT="27432" marB="27432" anchor="ctr">
+                    <a:lnL w="19050" cap="flat" cmpd="sng" algn="ctr">
+                      <a:solidFill>
+                        <a:srgbClr val="002060"/>
+                      </a:solidFill>
+                      <a:prstDash val="solid"/>
+                      <a:round/>
+                      <a:headEnd type="none" w="med" len="med"/>
+                      <a:tailEnd type="none" w="med" len="med"/>
+                    </a:lnL>
+                    <a:lnR w="19050" cap="flat" cmpd="sng" algn="ctr">
+                      <a:solidFill>
+                        <a:srgbClr val="002060"/>
+                      </a:solidFill>
+                      <a:prstDash val="solid"/>
+                      <a:round/>
+                      <a:headEnd type="none" w="med" len="med"/>
+                      <a:tailEnd type="none" w="med" len="med"/>
+                    </a:lnR>
+                    <a:lnT w="19050" cap="flat" cmpd="sng" algn="ctr">
+                      <a:solidFill>
+                        <a:srgbClr val="002060"/>
+                      </a:solidFill>
+                      <a:prstDash val="solid"/>
+                      <a:round/>
+                      <a:headEnd type="none" w="med" len="med"/>
+                      <a:tailEnd type="none" w="med" len="med"/>
+                    </a:lnT>
+                    <a:lnB w="19050" cap="flat" cmpd="sng" algn="ctr">
+                      <a:solidFill>
+                        <a:srgbClr val="002060"/>
+                      </a:solidFill>
+                      <a:prstDash val="solid"/>
+                      <a:round/>
+                      <a:headEnd type="none" w="med" len="med"/>
+                      <a:tailEnd type="none" w="med" len="med"/>
+                    </a:lnB>
+                    <a:solidFill>
+                      <a:schemeClr val="bg1">
+                        <a:lumMod val="75000"/>
+                      </a:schemeClr>
+                    </a:solidFill>
+                  </a:tcPr>
+                </a:tc>
+                <a:extLst>
+                  <a:ext uri="{0D108BD9-81ED-4DB2-BD59-A6C34878D82A}">
+                    <a16:rowId xmlns:a16="http://schemas.microsoft.com/office/drawing/2014/main" val="1065222353"/>
+                  </a:ext>
+                </a:extLst>
+              </a:tr>
+              <a:tr h="315925">
+                <a:tc>
+                  <a:txBody>
+                    <a:bodyPr/>
+                    <a:lstStyle/>
+                    <a:p>
+                      <a:pPr algn="ctr" fontAlgn="t"/>
+                      <a:r>
+                        <a:rPr lang="en-US" sz="1200" b="0" i="0" u="none" strike="noStrike" smtClean="0">
+                          <a:solidFill>
+                            <a:srgbClr val="002060"/>
+                          </a:solidFill>
+                          <a:effectLst/>
+                          <a:latin typeface="Intel Clear" panose="020B0604020203020204" pitchFamily="34" charset="0"/>
+                          <a:ea typeface="Intel Clear" panose="020B0604020203020204" pitchFamily="34" charset="0"/>
+                          <a:cs typeface="Intel Clear" panose="020B0604020203020204" pitchFamily="34" charset="0"/>
+                        </a:rPr>
+                        <a:t> </a:t>
+                      </a:r>
+                      <a:endParaRPr lang="en-US" sz="1200" b="0" i="0" u="none" strike="noStrike" dirty="0">
+                        <a:solidFill>
+                          <a:srgbClr val="002060"/>
+                        </a:solidFill>
+                        <a:effectLst/>
+                        <a:latin typeface="Intel Clear" panose="020B0604020203020204" pitchFamily="34" charset="0"/>
+                        <a:ea typeface="Intel Clear" panose="020B0604020203020204" pitchFamily="34" charset="0"/>
+                        <a:cs typeface="Intel Clear" panose="020B0604020203020204" pitchFamily="34" charset="0"/>
+                      </a:endParaRPr>
+                    </a:p>
+                  </a:txBody>
+                  <a:tcPr marL="45720" marR="45720" marT="27432" marB="27432" anchor="ctr">
+                    <a:lnL w="19050" cap="flat" cmpd="sng" algn="ctr">
+                      <a:solidFill>
+                        <a:srgbClr val="002060"/>
+                      </a:solidFill>
+                      <a:prstDash val="solid"/>
+                      <a:round/>
+                      <a:headEnd type="none" w="med" len="med"/>
+                      <a:tailEnd type="none" w="med" len="med"/>
+                    </a:lnL>
+                    <a:lnR w="19050" cap="flat" cmpd="sng" algn="ctr">
+                      <a:solidFill>
+                        <a:srgbClr val="002060"/>
+                      </a:solidFill>
+                      <a:prstDash val="solid"/>
+                      <a:round/>
+                      <a:headEnd type="none" w="med" len="med"/>
+                      <a:tailEnd type="none" w="med" len="med"/>
+                    </a:lnR>
+                    <a:lnT w="19050" cap="flat" cmpd="sng" algn="ctr">
+                      <a:solidFill>
+                        <a:srgbClr val="002060"/>
+                      </a:solidFill>
+                      <a:prstDash val="solid"/>
+                      <a:round/>
+                      <a:headEnd type="none" w="med" len="med"/>
+                      <a:tailEnd type="none" w="med" len="med"/>
+                    </a:lnT>
+                    <a:lnB w="19050" cap="flat" cmpd="sng" algn="ctr">
+                      <a:solidFill>
+                        <a:srgbClr val="002060"/>
+                      </a:solidFill>
+                      <a:prstDash val="solid"/>
+                      <a:round/>
+                      <a:headEnd type="none" w="med" len="med"/>
+                      <a:tailEnd type="none" w="med" len="med"/>
+                    </a:lnB>
+                    <a:solidFill>
+                      <a:srgbClr val="BFBFBF"/>
+                    </a:solidFill>
+                  </a:tcPr>
+                </a:tc>
+                <a:tc>
+                  <a:txBody>
+                    <a:bodyPr/>
+                    <a:lstStyle/>
+                    <a:p>
+                      <a:pPr algn="l" fontAlgn="t"/>
+                      <a:r>
+                        <a:rPr lang="en-US" sz="1200" b="0" i="0" u="none" strike="noStrike" smtClean="0">
+                          <a:solidFill>
+                            <a:srgbClr val="002060"/>
+                          </a:solidFill>
+                          <a:effectLst/>
+                          <a:latin typeface="Intel Clear" panose="020B0604020203020204" pitchFamily="34" charset="0"/>
+                          <a:ea typeface="Intel Clear" panose="020B0604020203020204" pitchFamily="34" charset="0"/>
+                          <a:cs typeface="Intel Clear" panose="020B0604020203020204" pitchFamily="34" charset="0"/>
+                        </a:rPr>
+                        <a:t> </a:t>
+                      </a:r>
+                      <a:endParaRPr lang="en-US" sz="1200" b="0" i="0" u="none" strike="noStrike" dirty="0">
+                        <a:solidFill>
+                          <a:srgbClr val="002060"/>
+                        </a:solidFill>
+                        <a:effectLst/>
+                        <a:latin typeface="Intel Clear" panose="020B0604020203020204" pitchFamily="34" charset="0"/>
+                        <a:ea typeface="Intel Clear" panose="020B0604020203020204" pitchFamily="34" charset="0"/>
+                        <a:cs typeface="Intel Clear" panose="020B0604020203020204" pitchFamily="34" charset="0"/>
+                      </a:endParaRPr>
+                    </a:p>
+                  </a:txBody>
+                  <a:tcPr marL="45720" marR="45720" marT="27432" marB="27432" anchor="ctr">
+                    <a:lnL w="19050" cap="flat" cmpd="sng" algn="ctr">
+                      <a:solidFill>
+                        <a:srgbClr val="002060"/>
+                      </a:solidFill>
+                      <a:prstDash val="solid"/>
+                      <a:round/>
+                      <a:headEnd type="none" w="med" len="med"/>
+                      <a:tailEnd type="none" w="med" len="med"/>
+                    </a:lnL>
+                    <a:lnR w="19050" cap="flat" cmpd="sng" algn="ctr">
+                      <a:solidFill>
+                        <a:srgbClr val="002060"/>
+                      </a:solidFill>
+                      <a:prstDash val="solid"/>
+                      <a:round/>
+                      <a:headEnd type="none" w="med" len="med"/>
+                      <a:tailEnd type="none" w="med" len="med"/>
+                    </a:lnR>
+                    <a:lnT w="19050" cap="flat" cmpd="sng" algn="ctr">
+                      <a:solidFill>
+                        <a:srgbClr val="002060"/>
+                      </a:solidFill>
+                      <a:prstDash val="solid"/>
+                      <a:round/>
+                      <a:headEnd type="none" w="med" len="med"/>
+                      <a:tailEnd type="none" w="med" len="med"/>
+                    </a:lnT>
+                    <a:lnB w="19050" cap="flat" cmpd="sng" algn="ctr">
+                      <a:solidFill>
+                        <a:srgbClr val="002060"/>
+                      </a:solidFill>
+                      <a:prstDash val="solid"/>
+                      <a:round/>
+                      <a:headEnd type="none" w="med" len="med"/>
+                      <a:tailEnd type="none" w="med" len="med"/>
+                    </a:lnB>
+                    <a:solidFill>
+                      <a:schemeClr val="bg1">
+                        <a:lumMod val="75000"/>
+                      </a:schemeClr>
+                    </a:solidFill>
+                  </a:tcPr>
+                </a:tc>
+                <a:extLst>
+                  <a:ext uri="{0D108BD9-81ED-4DB2-BD59-A6C34878D82A}">
+                    <a16:rowId xmlns:a16="http://schemas.microsoft.com/office/drawing/2014/main" val="1330056730"/>
+                  </a:ext>
+                </a:extLst>
+              </a:tr>
+              <a:tr h="315925">
+                <a:tc>
+                  <a:txBody>
+                    <a:bodyPr/>
+                    <a:lstStyle/>
+                    <a:p>
+                      <a:pPr algn="ctr" fontAlgn="t"/>
+                      <a:r>
+                        <a:rPr lang="en-US" sz="1200" b="0" i="0" u="none" strike="noStrike" smtClean="0">
+                          <a:solidFill>
+                            <a:srgbClr val="002060"/>
+                          </a:solidFill>
+                          <a:effectLst/>
+                          <a:latin typeface="Intel Clear" panose="020B0604020203020204" pitchFamily="34" charset="0"/>
+                          <a:ea typeface="Intel Clear" panose="020B0604020203020204" pitchFamily="34" charset="0"/>
+                          <a:cs typeface="Intel Clear" panose="020B0604020203020204" pitchFamily="34" charset="0"/>
+                        </a:rPr>
+                        <a:t> </a:t>
+                      </a:r>
+                      <a:endParaRPr lang="en-US" sz="1200" b="0" i="0" u="none" strike="noStrike" dirty="0">
+                        <a:solidFill>
+                          <a:srgbClr val="002060"/>
+                        </a:solidFill>
+                        <a:effectLst/>
+                        <a:latin typeface="Intel Clear" panose="020B0604020203020204" pitchFamily="34" charset="0"/>
+                        <a:ea typeface="Intel Clear" panose="020B0604020203020204" pitchFamily="34" charset="0"/>
+                        <a:cs typeface="Intel Clear" panose="020B0604020203020204" pitchFamily="34" charset="0"/>
+                      </a:endParaRPr>
+                    </a:p>
+                  </a:txBody>
+                  <a:tcPr marL="45720" marR="45720" marT="27432" marB="27432" anchor="ctr">
+                    <a:lnL w="19050" cap="flat" cmpd="sng" algn="ctr">
+                      <a:solidFill>
+                        <a:srgbClr val="002060"/>
+                      </a:solidFill>
+                      <a:prstDash val="solid"/>
+                      <a:round/>
+                      <a:headEnd type="none" w="med" len="med"/>
+                      <a:tailEnd type="none" w="med" len="med"/>
+                    </a:lnL>
+                    <a:lnR w="19050" cap="flat" cmpd="sng" algn="ctr">
+                      <a:solidFill>
+                        <a:srgbClr val="002060"/>
+                      </a:solidFill>
+                      <a:prstDash val="solid"/>
+                      <a:round/>
+                      <a:headEnd type="none" w="med" len="med"/>
+                      <a:tailEnd type="none" w="med" len="med"/>
+                    </a:lnR>
+                    <a:lnT w="19050" cap="flat" cmpd="sng" algn="ctr">
+                      <a:solidFill>
+                        <a:srgbClr val="002060"/>
+                      </a:solidFill>
+                      <a:prstDash val="solid"/>
+                      <a:round/>
+                      <a:headEnd type="none" w="med" len="med"/>
+                      <a:tailEnd type="none" w="med" len="med"/>
+                    </a:lnT>
+                    <a:lnB w="19050" cap="flat" cmpd="sng" algn="ctr">
+                      <a:solidFill>
+                        <a:srgbClr val="002060"/>
+                      </a:solidFill>
+                      <a:prstDash val="solid"/>
+                      <a:round/>
+                      <a:headEnd type="none" w="med" len="med"/>
+                      <a:tailEnd type="none" w="med" len="med"/>
+                    </a:lnB>
+                    <a:solidFill>
+                      <a:srgbClr val="BFBFBF"/>
+                    </a:solidFill>
+                  </a:tcPr>
+                </a:tc>
+                <a:tc>
+                  <a:txBody>
+                    <a:bodyPr/>
+                    <a:lstStyle/>
+                    <a:p>
+                      <a:pPr algn="l" fontAlgn="t"/>
+                      <a:r>
+                        <a:rPr lang="en-US" sz="1200" b="0" i="0" u="none" strike="noStrike" smtClean="0">
+                          <a:solidFill>
+                            <a:srgbClr val="002060"/>
+                          </a:solidFill>
+                          <a:effectLst/>
+                          <a:latin typeface="Intel Clear" panose="020B0604020203020204" pitchFamily="34" charset="0"/>
+                          <a:ea typeface="Intel Clear" panose="020B0604020203020204" pitchFamily="34" charset="0"/>
+                          <a:cs typeface="Intel Clear" panose="020B0604020203020204" pitchFamily="34" charset="0"/>
+                        </a:rPr>
+                        <a:t> </a:t>
+                      </a:r>
+                      <a:endParaRPr lang="en-US" sz="1200" b="0" i="0" u="none" strike="noStrike" dirty="0">
+                        <a:solidFill>
+                          <a:srgbClr val="002060"/>
+                        </a:solidFill>
+                        <a:effectLst/>
+                        <a:latin typeface="Intel Clear" panose="020B0604020203020204" pitchFamily="34" charset="0"/>
+                        <a:ea typeface="Intel Clear" panose="020B0604020203020204" pitchFamily="34" charset="0"/>
+                        <a:cs typeface="Intel Clear" panose="020B0604020203020204" pitchFamily="34" charset="0"/>
+                      </a:endParaRPr>
+                    </a:p>
+                  </a:txBody>
+                  <a:tcPr marL="45720" marR="45720" marT="27432" marB="27432" anchor="ctr">
+                    <a:lnL w="19050" cap="flat" cmpd="sng" algn="ctr">
+                      <a:solidFill>
+                        <a:srgbClr val="002060"/>
+                      </a:solidFill>
+                      <a:prstDash val="solid"/>
+                      <a:round/>
+                      <a:headEnd type="none" w="med" len="med"/>
+                      <a:tailEnd type="none" w="med" len="med"/>
+                    </a:lnL>
+                    <a:lnR w="19050" cap="flat" cmpd="sng" algn="ctr">
+                      <a:solidFill>
+                        <a:srgbClr val="002060"/>
+                      </a:solidFill>
+                      <a:prstDash val="solid"/>
+                      <a:round/>
+                      <a:headEnd type="none" w="med" len="med"/>
+                      <a:tailEnd type="none" w="med" len="med"/>
+                    </a:lnR>
+                    <a:lnT w="19050" cap="flat" cmpd="sng" algn="ctr">
+                      <a:solidFill>
+                        <a:srgbClr val="002060"/>
+                      </a:solidFill>
+                      <a:prstDash val="solid"/>
+                      <a:round/>
+                      <a:headEnd type="none" w="med" len="med"/>
+                      <a:tailEnd type="none" w="med" len="med"/>
+                    </a:lnT>
+                    <a:lnB w="19050" cap="flat" cmpd="sng" algn="ctr">
+                      <a:solidFill>
+                        <a:srgbClr val="002060"/>
+                      </a:solidFill>
+                      <a:prstDash val="solid"/>
+                      <a:round/>
+                      <a:headEnd type="none" w="med" len="med"/>
+                      <a:tailEnd type="none" w="med" len="med"/>
+                    </a:lnB>
+                    <a:solidFill>
+                      <a:schemeClr val="bg1">
+                        <a:lumMod val="75000"/>
+                      </a:schemeClr>
+                    </a:solidFill>
+                  </a:tcPr>
+                </a:tc>
+                <a:extLst>
+                  <a:ext uri="{0D108BD9-81ED-4DB2-BD59-A6C34878D82A}">
+                    <a16:rowId xmlns:a16="http://schemas.microsoft.com/office/drawing/2014/main" val="3510482637"/>
+                  </a:ext>
+                </a:extLst>
+              </a:tr>
+              <a:tr h="315925">
+                <a:tc>
+                  <a:txBody>
+                    <a:bodyPr/>
+                    <a:lstStyle/>
+                    <a:p>
+                      <a:pPr algn="ctr" fontAlgn="t"/>
+                      <a:r>
+                        <a:rPr lang="en-US" sz="1200" b="0" i="0" u="none" strike="noStrike" smtClean="0">
+                          <a:solidFill>
+                            <a:srgbClr val="002060"/>
+                          </a:solidFill>
+                          <a:effectLst/>
+                          <a:latin typeface="Intel Clear" panose="020B0604020203020204" pitchFamily="34" charset="0"/>
+                          <a:ea typeface="Intel Clear" panose="020B0604020203020204" pitchFamily="34" charset="0"/>
+                          <a:cs typeface="Intel Clear" panose="020B0604020203020204" pitchFamily="34" charset="0"/>
+                        </a:rPr>
+                        <a:t> </a:t>
+                      </a:r>
+                      <a:endParaRPr lang="en-US" sz="1200" b="0" i="0" u="none" strike="noStrike" dirty="0">
+                        <a:solidFill>
+                          <a:srgbClr val="002060"/>
+                        </a:solidFill>
+                        <a:effectLst/>
+                        <a:latin typeface="Intel Clear" panose="020B0604020203020204" pitchFamily="34" charset="0"/>
+                        <a:ea typeface="Intel Clear" panose="020B0604020203020204" pitchFamily="34" charset="0"/>
+                        <a:cs typeface="Intel Clear" panose="020B0604020203020204" pitchFamily="34" charset="0"/>
+                      </a:endParaRPr>
+                    </a:p>
+                  </a:txBody>
+                  <a:tcPr marL="45720" marR="45720" marT="27432" marB="27432" anchor="ctr">
+                    <a:lnL w="19050" cap="flat" cmpd="sng" algn="ctr">
+                      <a:solidFill>
+                        <a:srgbClr val="002060"/>
+                      </a:solidFill>
+                      <a:prstDash val="solid"/>
+                      <a:round/>
+                      <a:headEnd type="none" w="med" len="med"/>
+                      <a:tailEnd type="none" w="med" len="med"/>
+                    </a:lnL>
+                    <a:lnR w="19050" cap="flat" cmpd="sng" algn="ctr">
+                      <a:solidFill>
+                        <a:srgbClr val="002060"/>
+                      </a:solidFill>
+                      <a:prstDash val="solid"/>
+                      <a:round/>
+                      <a:headEnd type="none" w="med" len="med"/>
+                      <a:tailEnd type="none" w="med" len="med"/>
+                    </a:lnR>
+                    <a:lnT w="19050" cap="flat" cmpd="sng" algn="ctr">
+                      <a:solidFill>
+                        <a:srgbClr val="002060"/>
+                      </a:solidFill>
+                      <a:prstDash val="solid"/>
+                      <a:round/>
+                      <a:headEnd type="none" w="med" len="med"/>
+                      <a:tailEnd type="none" w="med" len="med"/>
+                    </a:lnT>
+                    <a:lnB w="19050" cap="flat" cmpd="sng" algn="ctr">
+                      <a:solidFill>
+                        <a:srgbClr val="002060"/>
+                      </a:solidFill>
+                      <a:prstDash val="solid"/>
+                      <a:round/>
+                      <a:headEnd type="none" w="med" len="med"/>
+                      <a:tailEnd type="none" w="med" len="med"/>
+                    </a:lnB>
+                    <a:solidFill>
+                      <a:srgbClr val="BFBFBF"/>
+                    </a:solidFill>
+                  </a:tcPr>
+                </a:tc>
+                <a:tc>
+                  <a:txBody>
+                    <a:bodyPr/>
+                    <a:lstStyle/>
+                    <a:p>
+                      <a:pPr algn="l" fontAlgn="t"/>
+                      <a:r>
+                        <a:rPr lang="en-US" sz="1200" b="0" i="0" u="none" strike="noStrike" smtClean="0">
+                          <a:solidFill>
+                            <a:srgbClr val="002060"/>
+                          </a:solidFill>
+                          <a:effectLst/>
+                          <a:latin typeface="Intel Clear" panose="020B0604020203020204" pitchFamily="34" charset="0"/>
+                          <a:ea typeface="Intel Clear" panose="020B0604020203020204" pitchFamily="34" charset="0"/>
+                          <a:cs typeface="Intel Clear" panose="020B0604020203020204" pitchFamily="34" charset="0"/>
+                        </a:rPr>
+                        <a:t> </a:t>
+                      </a:r>
+                      <a:endParaRPr lang="en-US" sz="1200" b="0" i="0" u="none" strike="noStrike" dirty="0">
+                        <a:solidFill>
+                          <a:srgbClr val="002060"/>
+                        </a:solidFill>
+                        <a:effectLst/>
+                        <a:latin typeface="Intel Clear" panose="020B0604020203020204" pitchFamily="34" charset="0"/>
+                        <a:ea typeface="Intel Clear" panose="020B0604020203020204" pitchFamily="34" charset="0"/>
+                        <a:cs typeface="Intel Clear" panose="020B0604020203020204" pitchFamily="34" charset="0"/>
+                      </a:endParaRPr>
+                    </a:p>
+                  </a:txBody>
+                  <a:tcPr marL="45720" marR="45720" marT="27432" marB="27432" anchor="ctr">
+                    <a:lnL w="19050" cap="flat" cmpd="sng" algn="ctr">
+                      <a:solidFill>
+                        <a:srgbClr val="002060"/>
+                      </a:solidFill>
+                      <a:prstDash val="solid"/>
+                      <a:round/>
+                      <a:headEnd type="none" w="med" len="med"/>
+                      <a:tailEnd type="none" w="med" len="med"/>
+                    </a:lnL>
+                    <a:lnR w="19050" cap="flat" cmpd="sng" algn="ctr">
+                      <a:solidFill>
+                        <a:srgbClr val="002060"/>
+                      </a:solidFill>
+                      <a:prstDash val="solid"/>
+                      <a:round/>
+                      <a:headEnd type="none" w="med" len="med"/>
+                      <a:tailEnd type="none" w="med" len="med"/>
+                    </a:lnR>
+                    <a:lnT w="19050" cap="flat" cmpd="sng" algn="ctr">
+                      <a:solidFill>
+                        <a:srgbClr val="002060"/>
+                      </a:solidFill>
+                      <a:prstDash val="solid"/>
+                      <a:round/>
+                      <a:headEnd type="none" w="med" len="med"/>
+                      <a:tailEnd type="none" w="med" len="med"/>
+                    </a:lnT>
+                    <a:lnB w="19050" cap="flat" cmpd="sng" algn="ctr">
+                      <a:solidFill>
+                        <a:srgbClr val="002060"/>
+                      </a:solidFill>
+                      <a:prstDash val="solid"/>
+                      <a:round/>
+                      <a:headEnd type="none" w="med" len="med"/>
+                      <a:tailEnd type="none" w="med" len="med"/>
+                    </a:lnB>
+                    <a:solidFill>
+                      <a:schemeClr val="bg1">
+                        <a:lumMod val="75000"/>
+                      </a:schemeClr>
+                    </a:solidFill>
+                  </a:tcPr>
+                </a:tc>
+                <a:extLst>
+                  <a:ext uri="{0D108BD9-81ED-4DB2-BD59-A6C34878D82A}">
+                    <a16:rowId xmlns:a16="http://schemas.microsoft.com/office/drawing/2014/main" val="566103554"/>
+                  </a:ext>
+                </a:extLst>
+              </a:tr>
+              <a:tr h="315925">
+                <a:tc>
+                  <a:txBody>
+                    <a:bodyPr/>
+                    <a:lstStyle/>
+                    <a:p>
+                      <a:pPr algn="ctr" fontAlgn="t"/>
+                      <a:r>
+                        <a:rPr lang="en-US" sz="1200" b="0" i="0" u="none" strike="noStrike" smtClean="0">
+                          <a:solidFill>
+                            <a:srgbClr val="002060"/>
+                          </a:solidFill>
+                          <a:effectLst/>
+                          <a:latin typeface="Intel Clear" panose="020B0604020203020204" pitchFamily="34" charset="0"/>
+                          <a:ea typeface="Intel Clear" panose="020B0604020203020204" pitchFamily="34" charset="0"/>
+                          <a:cs typeface="Intel Clear" panose="020B0604020203020204" pitchFamily="34" charset="0"/>
+                        </a:rPr>
+                        <a:t> </a:t>
+                      </a:r>
+                      <a:endParaRPr lang="en-US" sz="1200" b="0" i="0" u="none" strike="noStrike" dirty="0">
+                        <a:solidFill>
+                          <a:srgbClr val="002060"/>
+                        </a:solidFill>
+                        <a:effectLst/>
+                        <a:latin typeface="Intel Clear" panose="020B0604020203020204" pitchFamily="34" charset="0"/>
+                        <a:ea typeface="Intel Clear" panose="020B0604020203020204" pitchFamily="34" charset="0"/>
+                        <a:cs typeface="Intel Clear" panose="020B0604020203020204" pitchFamily="34" charset="0"/>
+                      </a:endParaRPr>
+                    </a:p>
+                  </a:txBody>
+                  <a:tcPr marL="45720" marR="45720" marT="27432" marB="27432" anchor="ctr">
+                    <a:lnL w="19050" cap="flat" cmpd="sng" algn="ctr">
+                      <a:solidFill>
+                        <a:srgbClr val="002060"/>
+                      </a:solidFill>
+                      <a:prstDash val="solid"/>
+                      <a:round/>
+                      <a:headEnd type="none" w="med" len="med"/>
+                      <a:tailEnd type="none" w="med" len="med"/>
+                    </a:lnL>
+                    <a:lnR w="19050" cap="flat" cmpd="sng" algn="ctr">
+                      <a:solidFill>
+                        <a:srgbClr val="002060"/>
+                      </a:solidFill>
+                      <a:prstDash val="solid"/>
+                      <a:round/>
+                      <a:headEnd type="none" w="med" len="med"/>
+                      <a:tailEnd type="none" w="med" len="med"/>
+                    </a:lnR>
+                    <a:lnT w="19050" cap="flat" cmpd="sng" algn="ctr">
+                      <a:solidFill>
+                        <a:srgbClr val="002060"/>
+                      </a:solidFill>
+                      <a:prstDash val="solid"/>
+                      <a:round/>
+                      <a:headEnd type="none" w="med" len="med"/>
+                      <a:tailEnd type="none" w="med" len="med"/>
+                    </a:lnT>
+                    <a:lnB w="19050" cap="flat" cmpd="sng" algn="ctr">
+                      <a:solidFill>
+                        <a:srgbClr val="002060"/>
+                      </a:solidFill>
+                      <a:prstDash val="solid"/>
+                      <a:round/>
+                      <a:headEnd type="none" w="med" len="med"/>
+                      <a:tailEnd type="none" w="med" len="med"/>
+                    </a:lnB>
+                    <a:solidFill>
+                      <a:srgbClr val="BFBFBF"/>
+                    </a:solidFill>
+                  </a:tcPr>
+                </a:tc>
+                <a:tc>
+                  <a:txBody>
+                    <a:bodyPr/>
+                    <a:lstStyle/>
+                    <a:p>
+                      <a:pPr algn="l" fontAlgn="t"/>
+                      <a:r>
+                        <a:rPr lang="en-US" sz="1200" b="0" i="0" u="none" strike="noStrike" smtClean="0">
+                          <a:solidFill>
+                            <a:srgbClr val="002060"/>
+                          </a:solidFill>
+                          <a:effectLst/>
+                          <a:latin typeface="Intel Clear" panose="020B0604020203020204" pitchFamily="34" charset="0"/>
+                          <a:ea typeface="Intel Clear" panose="020B0604020203020204" pitchFamily="34" charset="0"/>
+                          <a:cs typeface="Intel Clear" panose="020B0604020203020204" pitchFamily="34" charset="0"/>
+                        </a:rPr>
+                        <a:t> </a:t>
+                      </a:r>
+                      <a:endParaRPr lang="en-US" sz="1200" b="0" i="0" u="none" strike="noStrike" dirty="0">
+                        <a:solidFill>
+                          <a:srgbClr val="002060"/>
+                        </a:solidFill>
+                        <a:effectLst/>
+                        <a:latin typeface="Intel Clear" panose="020B0604020203020204" pitchFamily="34" charset="0"/>
+                        <a:ea typeface="Intel Clear" panose="020B0604020203020204" pitchFamily="34" charset="0"/>
+                        <a:cs typeface="Intel Clear" panose="020B0604020203020204" pitchFamily="34" charset="0"/>
+                      </a:endParaRPr>
+                    </a:p>
+                  </a:txBody>
+                  <a:tcPr marL="45720" marR="45720" marT="27432" marB="27432" anchor="ctr">
+                    <a:lnL w="19050" cap="flat" cmpd="sng" algn="ctr">
+                      <a:solidFill>
+                        <a:srgbClr val="002060"/>
+                      </a:solidFill>
+                      <a:prstDash val="solid"/>
+                      <a:round/>
+                      <a:headEnd type="none" w="med" len="med"/>
+                      <a:tailEnd type="none" w="med" len="med"/>
+                    </a:lnL>
+                    <a:lnR w="19050" cap="flat" cmpd="sng" algn="ctr">
+                      <a:solidFill>
+                        <a:srgbClr val="002060"/>
+                      </a:solidFill>
+                      <a:prstDash val="solid"/>
+                      <a:round/>
+                      <a:headEnd type="none" w="med" len="med"/>
+                      <a:tailEnd type="none" w="med" len="med"/>
+                    </a:lnR>
+                    <a:lnT w="19050" cap="flat" cmpd="sng" algn="ctr">
+                      <a:solidFill>
+                        <a:srgbClr val="002060"/>
+                      </a:solidFill>
+                      <a:prstDash val="solid"/>
+                      <a:round/>
+                      <a:headEnd type="none" w="med" len="med"/>
+                      <a:tailEnd type="none" w="med" len="med"/>
+                    </a:lnT>
+                    <a:lnB w="19050" cap="flat" cmpd="sng" algn="ctr">
+                      <a:solidFill>
+                        <a:srgbClr val="002060"/>
+                      </a:solidFill>
+                      <a:prstDash val="solid"/>
+                      <a:round/>
+                      <a:headEnd type="none" w="med" len="med"/>
+                      <a:tailEnd type="none" w="med" len="med"/>
+                    </a:lnB>
+                    <a:solidFill>
+                      <a:schemeClr val="bg1">
+                        <a:lumMod val="75000"/>
+                      </a:schemeClr>
+                    </a:solidFill>
+                  </a:tcPr>
+                </a:tc>
+                <a:extLst>
+                  <a:ext uri="{0D108BD9-81ED-4DB2-BD59-A6C34878D82A}">
+                    <a16:rowId xmlns:a16="http://schemas.microsoft.com/office/drawing/2014/main" val="4096294230"/>
+                  </a:ext>
+                </a:extLst>
+              </a:tr>
+              <a:tr h="315925">
+                <a:tc>
+                  <a:txBody>
+                    <a:bodyPr/>
+                    <a:lstStyle/>
+                    <a:p>
+                      <a:pPr algn="ctr" fontAlgn="t"/>
+                      <a:r>
+                        <a:rPr lang="en-US" sz="1200" b="0" i="0" u="none" strike="noStrike" smtClean="0">
+                          <a:solidFill>
+                            <a:srgbClr val="002060"/>
+                          </a:solidFill>
+                          <a:effectLst/>
+                          <a:latin typeface="Intel Clear" panose="020B0604020203020204" pitchFamily="34" charset="0"/>
+                          <a:ea typeface="Intel Clear" panose="020B0604020203020204" pitchFamily="34" charset="0"/>
+                          <a:cs typeface="Intel Clear" panose="020B0604020203020204" pitchFamily="34" charset="0"/>
+                        </a:rPr>
+                        <a:t> </a:t>
+                      </a:r>
+                      <a:endParaRPr lang="en-US" sz="1200" b="0" i="0" u="none" strike="noStrike" dirty="0">
+                        <a:solidFill>
+                          <a:srgbClr val="002060"/>
+                        </a:solidFill>
+                        <a:effectLst/>
+                        <a:latin typeface="Intel Clear" panose="020B0604020203020204" pitchFamily="34" charset="0"/>
+                        <a:ea typeface="Intel Clear" panose="020B0604020203020204" pitchFamily="34" charset="0"/>
+                        <a:cs typeface="Intel Clear" panose="020B0604020203020204" pitchFamily="34" charset="0"/>
+                      </a:endParaRPr>
+                    </a:p>
+                  </a:txBody>
+                  <a:tcPr marL="45720" marR="45720" marT="27432" marB="27432" anchor="ctr">
+                    <a:lnL w="19050" cap="flat" cmpd="sng" algn="ctr">
+                      <a:solidFill>
+                        <a:srgbClr val="002060"/>
+                      </a:solidFill>
+                      <a:prstDash val="solid"/>
+                      <a:round/>
+                      <a:headEnd type="none" w="med" len="med"/>
+                      <a:tailEnd type="none" w="med" len="med"/>
+                    </a:lnL>
+                    <a:lnR w="19050" cap="flat" cmpd="sng" algn="ctr">
+                      <a:solidFill>
+                        <a:srgbClr val="002060"/>
+                      </a:solidFill>
+                      <a:prstDash val="solid"/>
+                      <a:round/>
+                      <a:headEnd type="none" w="med" len="med"/>
+                      <a:tailEnd type="none" w="med" len="med"/>
+                    </a:lnR>
+                    <a:lnT w="19050" cap="flat" cmpd="sng" algn="ctr">
+                      <a:solidFill>
+                        <a:srgbClr val="002060"/>
+                      </a:solidFill>
+                      <a:prstDash val="solid"/>
+                      <a:round/>
+                      <a:headEnd type="none" w="med" len="med"/>
+                      <a:tailEnd type="none" w="med" len="med"/>
+                    </a:lnT>
+                    <a:lnB w="19050" cap="flat" cmpd="sng" algn="ctr">
+                      <a:solidFill>
+                        <a:srgbClr val="002060"/>
+                      </a:solidFill>
+                      <a:prstDash val="solid"/>
+                      <a:round/>
+                      <a:headEnd type="none" w="med" len="med"/>
+                      <a:tailEnd type="none" w="med" len="med"/>
+                    </a:lnB>
+                    <a:solidFill>
+                      <a:srgbClr val="BFBFBF"/>
+                    </a:solidFill>
+                  </a:tcPr>
+                </a:tc>
+                <a:tc>
+                  <a:txBody>
+                    <a:bodyPr/>
+                    <a:lstStyle/>
+                    <a:p>
+                      <a:pPr algn="l" fontAlgn="t"/>
+                      <a:r>
+                        <a:rPr lang="en-US" sz="1200" b="0" i="0" u="none" strike="noStrike" smtClean="0">
+                          <a:solidFill>
+                            <a:srgbClr val="002060"/>
+                          </a:solidFill>
+                          <a:effectLst/>
+                          <a:latin typeface="Intel Clear" panose="020B0604020203020204" pitchFamily="34" charset="0"/>
+                          <a:ea typeface="Intel Clear" panose="020B0604020203020204" pitchFamily="34" charset="0"/>
+                          <a:cs typeface="Intel Clear" panose="020B0604020203020204" pitchFamily="34" charset="0"/>
+                        </a:rPr>
+                        <a:t> </a:t>
+                      </a:r>
+                      <a:endParaRPr lang="en-US" sz="1200" b="0" i="0" u="none" strike="noStrike" dirty="0">
+                        <a:solidFill>
+                          <a:srgbClr val="002060"/>
+                        </a:solidFill>
+                        <a:effectLst/>
+                        <a:latin typeface="Intel Clear" panose="020B0604020203020204" pitchFamily="34" charset="0"/>
+                        <a:ea typeface="Intel Clear" panose="020B0604020203020204" pitchFamily="34" charset="0"/>
+                        <a:cs typeface="Intel Clear" panose="020B0604020203020204" pitchFamily="34" charset="0"/>
+                      </a:endParaRPr>
+                    </a:p>
+                  </a:txBody>
+                  <a:tcPr marL="45720" marR="45720" marT="27432" marB="27432" anchor="ctr">
+                    <a:lnL w="19050" cap="flat" cmpd="sng" algn="ctr">
+                      <a:solidFill>
+                        <a:srgbClr val="002060"/>
+                      </a:solidFill>
+                      <a:prstDash val="solid"/>
+                      <a:round/>
+                      <a:headEnd type="none" w="med" len="med"/>
+                      <a:tailEnd type="none" w="med" len="med"/>
+                    </a:lnL>
+                    <a:lnR w="19050" cap="flat" cmpd="sng" algn="ctr">
+                      <a:solidFill>
+                        <a:srgbClr val="002060"/>
+                      </a:solidFill>
+                      <a:prstDash val="solid"/>
+                      <a:round/>
+                      <a:headEnd type="none" w="med" len="med"/>
+                      <a:tailEnd type="none" w="med" len="med"/>
+                    </a:lnR>
+                    <a:lnT w="19050" cap="flat" cmpd="sng" algn="ctr">
+                      <a:solidFill>
+                        <a:srgbClr val="002060"/>
+                      </a:solidFill>
+                      <a:prstDash val="solid"/>
+                      <a:round/>
+                      <a:headEnd type="none" w="med" len="med"/>
+                      <a:tailEnd type="none" w="med" len="med"/>
+                    </a:lnT>
+                    <a:lnB w="19050" cap="flat" cmpd="sng" algn="ctr">
+                      <a:solidFill>
+                        <a:srgbClr val="002060"/>
+                      </a:solidFill>
+                      <a:prstDash val="solid"/>
+                      <a:round/>
+                      <a:headEnd type="none" w="med" len="med"/>
+                      <a:tailEnd type="none" w="med" len="med"/>
+                    </a:lnB>
+                    <a:solidFill>
+                      <a:schemeClr val="bg1">
+                        <a:lumMod val="75000"/>
+                      </a:schemeClr>
+                    </a:solidFill>
+                  </a:tcPr>
+                </a:tc>
+                <a:extLst>
+                  <a:ext uri="{0D108BD9-81ED-4DB2-BD59-A6C34878D82A}">
+                    <a16:rowId xmlns:a16="http://schemas.microsoft.com/office/drawing/2014/main" val="1898297411"/>
+                  </a:ext>
+                </a:extLst>
+              </a:tr>
+              <a:tr h="315925">
+                <a:tc>
+                  <a:txBody>
+                    <a:bodyPr/>
+                    <a:lstStyle/>
+                    <a:p>
+                      <a:pPr algn="ctr" fontAlgn="t"/>
+                      <a:r>
+                        <a:rPr lang="en-US" sz="1200" b="0" i="0" u="none" strike="noStrike" smtClean="0">
+                          <a:solidFill>
+                            <a:srgbClr val="002060"/>
+                          </a:solidFill>
+                          <a:effectLst/>
+                          <a:latin typeface="Intel Clear" panose="020B0604020203020204" pitchFamily="34" charset="0"/>
+                          <a:ea typeface="Intel Clear" panose="020B0604020203020204" pitchFamily="34" charset="0"/>
+                          <a:cs typeface="Intel Clear" panose="020B0604020203020204" pitchFamily="34" charset="0"/>
+                        </a:rPr>
+                        <a:t> </a:t>
+                      </a:r>
+                      <a:endParaRPr lang="en-US" sz="1200" b="0" i="0" u="none" strike="noStrike" dirty="0">
+                        <a:solidFill>
+                          <a:srgbClr val="002060"/>
+                        </a:solidFill>
+                        <a:effectLst/>
+                        <a:latin typeface="Intel Clear" panose="020B0604020203020204" pitchFamily="34" charset="0"/>
+                        <a:ea typeface="Intel Clear" panose="020B0604020203020204" pitchFamily="34" charset="0"/>
+                        <a:cs typeface="Intel Clear" panose="020B0604020203020204" pitchFamily="34" charset="0"/>
+                      </a:endParaRPr>
+                    </a:p>
+                  </a:txBody>
+                  <a:tcPr marL="45720" marR="45720" marT="27432" marB="27432" anchor="ctr">
+                    <a:lnL w="19050" cap="flat" cmpd="sng" algn="ctr">
+                      <a:solidFill>
+                        <a:srgbClr val="002060"/>
+                      </a:solidFill>
+                      <a:prstDash val="solid"/>
+                      <a:round/>
+                      <a:headEnd type="none" w="med" len="med"/>
+                      <a:tailEnd type="none" w="med" len="med"/>
+                    </a:lnL>
+                    <a:lnR w="19050" cap="flat" cmpd="sng" algn="ctr">
+                      <a:solidFill>
+                        <a:srgbClr val="002060"/>
+                      </a:solidFill>
+                      <a:prstDash val="solid"/>
+                      <a:round/>
+                      <a:headEnd type="none" w="med" len="med"/>
+                      <a:tailEnd type="none" w="med" len="med"/>
+                    </a:lnR>
+                    <a:lnT w="19050" cap="flat" cmpd="sng" algn="ctr">
+                      <a:solidFill>
+                        <a:srgbClr val="002060"/>
+                      </a:solidFill>
+                      <a:prstDash val="solid"/>
+                      <a:round/>
+                      <a:headEnd type="none" w="med" len="med"/>
+                      <a:tailEnd type="none" w="med" len="med"/>
+                    </a:lnT>
+                    <a:lnB w="19050" cap="flat" cmpd="sng" algn="ctr">
+                      <a:solidFill>
+                        <a:srgbClr val="002060"/>
+                      </a:solidFill>
+                      <a:prstDash val="solid"/>
+                      <a:round/>
+                      <a:headEnd type="none" w="med" len="med"/>
+                      <a:tailEnd type="none" w="med" len="med"/>
+                    </a:lnB>
+                    <a:solidFill>
+                      <a:srgbClr val="BFBFBF"/>
+                    </a:solidFill>
+                  </a:tcPr>
+                </a:tc>
+                <a:tc>
+                  <a:txBody>
+                    <a:bodyPr/>
+                    <a:lstStyle/>
+                    <a:p>
+                      <a:pPr algn="l" fontAlgn="t"/>
+                      <a:r>
+                        <a:rPr lang="en-US" sz="1200" b="0" i="0" u="none" strike="noStrike" smtClean="0">
+                          <a:solidFill>
+                            <a:srgbClr val="002060"/>
+                          </a:solidFill>
+                          <a:effectLst/>
+                          <a:latin typeface="Intel Clear" panose="020B0604020203020204" pitchFamily="34" charset="0"/>
+                          <a:ea typeface="Intel Clear" panose="020B0604020203020204" pitchFamily="34" charset="0"/>
+                          <a:cs typeface="Intel Clear" panose="020B0604020203020204" pitchFamily="34" charset="0"/>
+                        </a:rPr>
+                        <a:t> </a:t>
+                      </a:r>
+                      <a:endParaRPr lang="en-US" sz="1200" b="0" i="0" u="none" strike="noStrike" dirty="0">
+                        <a:solidFill>
+                          <a:srgbClr val="002060"/>
+                        </a:solidFill>
+                        <a:effectLst/>
+                        <a:latin typeface="Intel Clear" panose="020B0604020203020204" pitchFamily="34" charset="0"/>
+                        <a:ea typeface="Intel Clear" panose="020B0604020203020204" pitchFamily="34" charset="0"/>
+                        <a:cs typeface="Intel Clear" panose="020B0604020203020204" pitchFamily="34" charset="0"/>
+                      </a:endParaRPr>
+                    </a:p>
+                  </a:txBody>
+                  <a:tcPr marL="45720" marR="45720" marT="27432" marB="27432" anchor="ctr">
+                    <a:lnL w="19050" cap="flat" cmpd="sng" algn="ctr">
+                      <a:solidFill>
+                        <a:srgbClr val="002060"/>
+                      </a:solidFill>
+                      <a:prstDash val="solid"/>
+                      <a:round/>
+                      <a:headEnd type="none" w="med" len="med"/>
+                      <a:tailEnd type="none" w="med" len="med"/>
+                    </a:lnL>
+                    <a:lnR w="19050" cap="flat" cmpd="sng" algn="ctr">
+                      <a:solidFill>
+                        <a:srgbClr val="002060"/>
+                      </a:solidFill>
+                      <a:prstDash val="solid"/>
+                      <a:round/>
+                      <a:headEnd type="none" w="med" len="med"/>
+                      <a:tailEnd type="none" w="med" len="med"/>
+                    </a:lnR>
+                    <a:lnT w="19050" cap="flat" cmpd="sng" algn="ctr">
+                      <a:solidFill>
+                        <a:srgbClr val="002060"/>
+                      </a:solidFill>
+                      <a:prstDash val="solid"/>
+                      <a:round/>
+                      <a:headEnd type="none" w="med" len="med"/>
+                      <a:tailEnd type="none" w="med" len="med"/>
+                    </a:lnT>
+                    <a:lnB w="19050" cap="flat" cmpd="sng" algn="ctr">
+                      <a:solidFill>
+                        <a:srgbClr val="002060"/>
+                      </a:solidFill>
+                      <a:prstDash val="solid"/>
+                      <a:round/>
+                      <a:headEnd type="none" w="med" len="med"/>
+                      <a:tailEnd type="none" w="med" len="med"/>
+                    </a:lnB>
+                    <a:solidFill>
+                      <a:schemeClr val="bg1">
+                        <a:lumMod val="75000"/>
+                      </a:schemeClr>
+                    </a:solidFill>
+                  </a:tcPr>
+                </a:tc>
+                <a:extLst>
+                  <a:ext uri="{0D108BD9-81ED-4DB2-BD59-A6C34878D82A}">
+                    <a16:rowId xmlns:a16="http://schemas.microsoft.com/office/drawing/2014/main" val="3232045996"/>
+                  </a:ext>
+                </a:extLst>
+              </a:tr>
+              <a:tr h="315925">
+                <a:tc>
+                  <a:txBody>
+                    <a:bodyPr/>
+                    <a:lstStyle/>
+                    <a:p>
+                      <a:pPr algn="ctr" fontAlgn="t"/>
+                      <a:r>
+                        <a:rPr lang="en-US" sz="1200" b="0" i="0" u="none" strike="noStrike" smtClean="0">
+                          <a:solidFill>
+                            <a:srgbClr val="002060"/>
+                          </a:solidFill>
+                          <a:effectLst/>
+                          <a:latin typeface="Intel Clear" panose="020B0604020203020204" pitchFamily="34" charset="0"/>
+                          <a:ea typeface="Intel Clear" panose="020B0604020203020204" pitchFamily="34" charset="0"/>
+                          <a:cs typeface="Intel Clear" panose="020B0604020203020204" pitchFamily="34" charset="0"/>
+                        </a:rPr>
+                        <a:t> </a:t>
+                      </a:r>
+                      <a:endParaRPr lang="en-US" sz="1200" b="0" i="0" u="none" strike="noStrike" dirty="0">
+                        <a:solidFill>
+                          <a:srgbClr val="002060"/>
+                        </a:solidFill>
+                        <a:effectLst/>
+                        <a:latin typeface="Intel Clear" panose="020B0604020203020204" pitchFamily="34" charset="0"/>
+                        <a:ea typeface="Intel Clear" panose="020B0604020203020204" pitchFamily="34" charset="0"/>
+                        <a:cs typeface="Intel Clear" panose="020B0604020203020204" pitchFamily="34" charset="0"/>
+                      </a:endParaRPr>
+                    </a:p>
+                  </a:txBody>
+                  <a:tcPr marL="45720" marR="45720" marT="27432" marB="27432" anchor="ctr">
+                    <a:lnL w="19050" cap="flat" cmpd="sng" algn="ctr">
+                      <a:solidFill>
+                        <a:srgbClr val="002060"/>
+                      </a:solidFill>
+                      <a:prstDash val="solid"/>
+                      <a:round/>
+                      <a:headEnd type="none" w="med" len="med"/>
+                      <a:tailEnd type="none" w="med" len="med"/>
+                    </a:lnL>
+                    <a:lnR w="19050" cap="flat" cmpd="sng" algn="ctr">
+                      <a:solidFill>
+                        <a:srgbClr val="002060"/>
+                      </a:solidFill>
+                      <a:prstDash val="solid"/>
+                      <a:round/>
+                      <a:headEnd type="none" w="med" len="med"/>
+                      <a:tailEnd type="none" w="med" len="med"/>
+                    </a:lnR>
+                    <a:lnT w="19050" cap="flat" cmpd="sng" algn="ctr">
+                      <a:solidFill>
+                        <a:srgbClr val="002060"/>
+                      </a:solidFill>
+                      <a:prstDash val="solid"/>
+                      <a:round/>
+                      <a:headEnd type="none" w="med" len="med"/>
+                      <a:tailEnd type="none" w="med" len="med"/>
+                    </a:lnT>
+                    <a:lnB w="19050" cap="flat" cmpd="sng" algn="ctr">
+                      <a:solidFill>
+                        <a:srgbClr val="002060"/>
+                      </a:solidFill>
+                      <a:prstDash val="solid"/>
+                      <a:round/>
+                      <a:headEnd type="none" w="med" len="med"/>
+                      <a:tailEnd type="none" w="med" len="med"/>
+                    </a:lnB>
+                    <a:solidFill>
+                      <a:srgbClr val="BFBFBF"/>
+                    </a:solidFill>
+                  </a:tcPr>
+                </a:tc>
+                <a:tc>
+                  <a:txBody>
+                    <a:bodyPr/>
+                    <a:lstStyle/>
+                    <a:p>
+                      <a:pPr algn="l" fontAlgn="t"/>
+                      <a:r>
+                        <a:rPr lang="en-US" sz="1200" b="0" i="0" u="none" strike="noStrike" smtClean="0">
+                          <a:solidFill>
+                            <a:srgbClr val="002060"/>
+                          </a:solidFill>
+                          <a:effectLst/>
+                          <a:latin typeface="Intel Clear" panose="020B0604020203020204" pitchFamily="34" charset="0"/>
+                          <a:ea typeface="Intel Clear" panose="020B0604020203020204" pitchFamily="34" charset="0"/>
+                          <a:cs typeface="Intel Clear" panose="020B0604020203020204" pitchFamily="34" charset="0"/>
+                        </a:rPr>
+                        <a:t> </a:t>
+                      </a:r>
+                      <a:endParaRPr lang="en-US" sz="1200" b="0" i="0" u="none" strike="noStrike" dirty="0">
+                        <a:solidFill>
+                          <a:srgbClr val="002060"/>
+                        </a:solidFill>
+                        <a:effectLst/>
+                        <a:latin typeface="Intel Clear" panose="020B0604020203020204" pitchFamily="34" charset="0"/>
+                        <a:ea typeface="Intel Clear" panose="020B0604020203020204" pitchFamily="34" charset="0"/>
+                        <a:cs typeface="Intel Clear" panose="020B0604020203020204" pitchFamily="34" charset="0"/>
+                      </a:endParaRPr>
+                    </a:p>
+                  </a:txBody>
+                  <a:tcPr marL="45720" marR="45720" marT="27432" marB="27432" anchor="ctr">
+                    <a:lnL w="19050" cap="flat" cmpd="sng" algn="ctr">
+                      <a:solidFill>
+                        <a:srgbClr val="002060"/>
+                      </a:solidFill>
+                      <a:prstDash val="solid"/>
+                      <a:round/>
+                      <a:headEnd type="none" w="med" len="med"/>
+                      <a:tailEnd type="none" w="med" len="med"/>
+                    </a:lnL>
+                    <a:lnR w="19050" cap="flat" cmpd="sng" algn="ctr">
+                      <a:solidFill>
+                        <a:srgbClr val="002060"/>
+                      </a:solidFill>
+                      <a:prstDash val="solid"/>
+                      <a:round/>
+                      <a:headEnd type="none" w="med" len="med"/>
+                      <a:tailEnd type="none" w="med" len="med"/>
+                    </a:lnR>
+                    <a:lnT w="19050" cap="flat" cmpd="sng" algn="ctr">
+                      <a:solidFill>
+                        <a:srgbClr val="002060"/>
+                      </a:solidFill>
+                      <a:prstDash val="solid"/>
+                      <a:round/>
+                      <a:headEnd type="none" w="med" len="med"/>
+                      <a:tailEnd type="none" w="med" len="med"/>
+                    </a:lnT>
+                    <a:lnB w="19050" cap="flat" cmpd="sng" algn="ctr">
+                      <a:solidFill>
+                        <a:srgbClr val="002060"/>
+                      </a:solidFill>
+                      <a:prstDash val="solid"/>
+                      <a:round/>
+                      <a:headEnd type="none" w="med" len="med"/>
+                      <a:tailEnd type="none" w="med" len="med"/>
+                    </a:lnB>
+                    <a:solidFill>
+                      <a:schemeClr val="bg1">
+                        <a:lumMod val="75000"/>
+                      </a:schemeClr>
+                    </a:solidFill>
+                  </a:tcPr>
+                </a:tc>
+                <a:extLst>
+                  <a:ext uri="{0D108BD9-81ED-4DB2-BD59-A6C34878D82A}">
+                    <a16:rowId xmlns:a16="http://schemas.microsoft.com/office/drawing/2014/main" val="1465442826"/>
+                  </a:ext>
+                </a:extLst>
+              </a:tr>
+              <a:tr h="315925">
+                <a:tc>
+                  <a:txBody>
+                    <a:bodyPr/>
+                    <a:lstStyle/>
+                    <a:p>
+                      <a:pPr algn="ctr" fontAlgn="t"/>
+                      <a:r>
+                        <a:rPr lang="en-US" sz="1200" b="0" i="0" u="none" strike="noStrike" smtClean="0">
+                          <a:solidFill>
+                            <a:srgbClr val="002060"/>
+                          </a:solidFill>
+                          <a:effectLst/>
+                          <a:latin typeface="Intel Clear" panose="020B0604020203020204" pitchFamily="34" charset="0"/>
+                          <a:ea typeface="Intel Clear" panose="020B0604020203020204" pitchFamily="34" charset="0"/>
+                          <a:cs typeface="Intel Clear" panose="020B0604020203020204" pitchFamily="34" charset="0"/>
+                        </a:rPr>
+                        <a:t> </a:t>
+                      </a:r>
+                      <a:endParaRPr lang="en-US" sz="1200" b="0" i="0" u="none" strike="noStrike" dirty="0">
+                        <a:solidFill>
+                          <a:srgbClr val="002060"/>
+                        </a:solidFill>
+                        <a:effectLst/>
+                        <a:latin typeface="Intel Clear" panose="020B0604020203020204" pitchFamily="34" charset="0"/>
+                        <a:ea typeface="Intel Clear" panose="020B0604020203020204" pitchFamily="34" charset="0"/>
+                        <a:cs typeface="Intel Clear" panose="020B0604020203020204" pitchFamily="34" charset="0"/>
+                      </a:endParaRPr>
+                    </a:p>
+                  </a:txBody>
+                  <a:tcPr marL="45720" marR="45720" marT="27432" marB="27432" anchor="ctr">
+                    <a:lnL w="19050" cap="flat" cmpd="sng" algn="ctr">
+                      <a:solidFill>
+                        <a:srgbClr val="002060"/>
+                      </a:solidFill>
+                      <a:prstDash val="solid"/>
+                      <a:round/>
+                      <a:headEnd type="none" w="med" len="med"/>
+                      <a:tailEnd type="none" w="med" len="med"/>
+                    </a:lnL>
+                    <a:lnR w="19050" cap="flat" cmpd="sng" algn="ctr">
+                      <a:solidFill>
+                        <a:srgbClr val="002060"/>
+                      </a:solidFill>
+                      <a:prstDash val="solid"/>
+                      <a:round/>
+                      <a:headEnd type="none" w="med" len="med"/>
+                      <a:tailEnd type="none" w="med" len="med"/>
+                    </a:lnR>
+                    <a:lnT w="19050" cap="flat" cmpd="sng" algn="ctr">
+                      <a:solidFill>
+                        <a:srgbClr val="002060"/>
+                      </a:solidFill>
+                      <a:prstDash val="solid"/>
+                      <a:round/>
+                      <a:headEnd type="none" w="med" len="med"/>
+                      <a:tailEnd type="none" w="med" len="med"/>
+                    </a:lnT>
+                    <a:lnB w="19050" cap="flat" cmpd="sng" algn="ctr">
+                      <a:solidFill>
+                        <a:srgbClr val="002060"/>
+                      </a:solidFill>
+                      <a:prstDash val="solid"/>
+                      <a:round/>
+                      <a:headEnd type="none" w="med" len="med"/>
+                      <a:tailEnd type="none" w="med" len="med"/>
+                    </a:lnB>
+                    <a:solidFill>
+                      <a:srgbClr val="BFBFBF"/>
+                    </a:solidFill>
+                  </a:tcPr>
+                </a:tc>
+                <a:tc>
+                  <a:txBody>
+                    <a:bodyPr/>
+                    <a:lstStyle/>
+                    <a:p>
+                      <a:pPr algn="l" fontAlgn="t"/>
+                      <a:r>
+                        <a:rPr lang="en-US" sz="1200" b="0" i="0" u="none" strike="noStrike" smtClean="0">
+                          <a:solidFill>
+                            <a:srgbClr val="002060"/>
+                          </a:solidFill>
+                          <a:effectLst/>
+                          <a:latin typeface="Intel Clear" panose="020B0604020203020204" pitchFamily="34" charset="0"/>
+                          <a:ea typeface="Intel Clear" panose="020B0604020203020204" pitchFamily="34" charset="0"/>
+                          <a:cs typeface="Intel Clear" panose="020B0604020203020204" pitchFamily="34" charset="0"/>
+                        </a:rPr>
+                        <a:t> </a:t>
+                      </a:r>
+                      <a:endParaRPr lang="en-US" sz="1200" b="0" i="0" u="none" strike="noStrike" dirty="0">
+                        <a:solidFill>
+                          <a:srgbClr val="002060"/>
+                        </a:solidFill>
+                        <a:effectLst/>
+                        <a:latin typeface="Intel Clear" panose="020B0604020203020204" pitchFamily="34" charset="0"/>
+                        <a:ea typeface="Intel Clear" panose="020B0604020203020204" pitchFamily="34" charset="0"/>
+                        <a:cs typeface="Intel Clear" panose="020B0604020203020204" pitchFamily="34" charset="0"/>
+                      </a:endParaRPr>
+                    </a:p>
+                  </a:txBody>
+                  <a:tcPr marL="45720" marR="45720" marT="27432" marB="27432" anchor="ctr">
+                    <a:lnL w="19050" cap="flat" cmpd="sng" algn="ctr">
+                      <a:solidFill>
+                        <a:srgbClr val="002060"/>
+                      </a:solidFill>
+                      <a:prstDash val="solid"/>
+                      <a:round/>
+                      <a:headEnd type="none" w="med" len="med"/>
+                      <a:tailEnd type="none" w="med" len="med"/>
+                    </a:lnL>
+                    <a:lnR w="19050" cap="flat" cmpd="sng" algn="ctr">
+                      <a:solidFill>
+                        <a:srgbClr val="002060"/>
+                      </a:solidFill>
+                      <a:prstDash val="solid"/>
+                      <a:round/>
+                      <a:headEnd type="none" w="med" len="med"/>
+                      <a:tailEnd type="none" w="med" len="med"/>
+                    </a:lnR>
+                    <a:lnT w="19050" cap="flat" cmpd="sng" algn="ctr">
+                      <a:solidFill>
+                        <a:srgbClr val="002060"/>
+                      </a:solidFill>
+                      <a:prstDash val="solid"/>
+                      <a:round/>
+                      <a:headEnd type="none" w="med" len="med"/>
+                      <a:tailEnd type="none" w="med" len="med"/>
+                    </a:lnT>
+                    <a:lnB w="19050" cap="flat" cmpd="sng" algn="ctr">
+                      <a:solidFill>
+                        <a:srgbClr val="002060"/>
+                      </a:solidFill>
+                      <a:prstDash val="solid"/>
+                      <a:round/>
+                      <a:headEnd type="none" w="med" len="med"/>
+                      <a:tailEnd type="none" w="med" len="med"/>
+                    </a:lnB>
+                    <a:solidFill>
+                      <a:schemeClr val="bg1">
+                        <a:lumMod val="75000"/>
+                      </a:schemeClr>
+                    </a:solidFill>
+                  </a:tcPr>
+                </a:tc>
+                <a:extLst>
+                  <a:ext uri="{0D108BD9-81ED-4DB2-BD59-A6C34878D82A}">
+                    <a16:rowId xmlns:a16="http://schemas.microsoft.com/office/drawing/2014/main" val="2238057213"/>
+                  </a:ext>
+                </a:extLst>
+              </a:tr>
+              <a:tr h="315925">
+                <a:tc>
+                  <a:txBody>
+                    <a:bodyPr/>
+                    <a:lstStyle/>
+                    <a:p>
+                      <a:pPr algn="ctr" fontAlgn="t"/>
+                      <a:r>
+                        <a:rPr lang="en-US" sz="1200" b="0" i="0" u="none" strike="noStrike" smtClean="0">
+                          <a:solidFill>
+                            <a:srgbClr val="002060"/>
+                          </a:solidFill>
+                          <a:effectLst/>
+                          <a:latin typeface="Intel Clear" panose="020B0604020203020204" pitchFamily="34" charset="0"/>
+                          <a:ea typeface="Intel Clear" panose="020B0604020203020204" pitchFamily="34" charset="0"/>
+                          <a:cs typeface="Intel Clear" panose="020B0604020203020204" pitchFamily="34" charset="0"/>
+                        </a:rPr>
+                        <a:t> </a:t>
+                      </a:r>
+                      <a:endParaRPr lang="en-US" sz="1200" b="0" i="0" u="none" strike="noStrike" dirty="0">
+                        <a:solidFill>
+                          <a:srgbClr val="002060"/>
+                        </a:solidFill>
+                        <a:effectLst/>
+                        <a:latin typeface="Intel Clear" panose="020B0604020203020204" pitchFamily="34" charset="0"/>
+                        <a:ea typeface="Intel Clear" panose="020B0604020203020204" pitchFamily="34" charset="0"/>
+                        <a:cs typeface="Intel Clear" panose="020B0604020203020204" pitchFamily="34" charset="0"/>
+                      </a:endParaRPr>
+                    </a:p>
+                  </a:txBody>
+                  <a:tcPr marL="45720" marR="45720" marT="27432" marB="27432" anchor="ctr">
+                    <a:lnL w="19050" cap="flat" cmpd="sng" algn="ctr">
+                      <a:solidFill>
+                        <a:srgbClr val="002060"/>
+                      </a:solidFill>
+                      <a:prstDash val="solid"/>
+                      <a:round/>
+                      <a:headEnd type="none" w="med" len="med"/>
+                      <a:tailEnd type="none" w="med" len="med"/>
+                    </a:lnL>
+                    <a:lnR w="19050" cap="flat" cmpd="sng" algn="ctr">
+                      <a:solidFill>
+                        <a:srgbClr val="002060"/>
+                      </a:solidFill>
+                      <a:prstDash val="solid"/>
+                      <a:round/>
+                      <a:headEnd type="none" w="med" len="med"/>
+                      <a:tailEnd type="none" w="med" len="med"/>
+                    </a:lnR>
+                    <a:lnT w="19050" cap="flat" cmpd="sng" algn="ctr">
+                      <a:solidFill>
+                        <a:srgbClr val="002060"/>
+                      </a:solidFill>
+                      <a:prstDash val="solid"/>
+                      <a:round/>
+                      <a:headEnd type="none" w="med" len="med"/>
+                      <a:tailEnd type="none" w="med" len="med"/>
+                    </a:lnT>
+                    <a:lnB w="19050" cap="flat" cmpd="sng" algn="ctr">
+                      <a:solidFill>
+                        <a:srgbClr val="002060"/>
+                      </a:solidFill>
+                      <a:prstDash val="solid"/>
+                      <a:round/>
+                      <a:headEnd type="none" w="med" len="med"/>
+                      <a:tailEnd type="none" w="med" len="med"/>
+                    </a:lnB>
+                    <a:solidFill>
+                      <a:srgbClr val="BFBFBF"/>
+                    </a:solidFill>
+                  </a:tcPr>
+                </a:tc>
+                <a:tc>
+                  <a:txBody>
+                    <a:bodyPr/>
+                    <a:lstStyle/>
+                    <a:p>
+                      <a:pPr algn="l" fontAlgn="t"/>
+                      <a:r>
+                        <a:rPr lang="en-US" sz="1200" b="0" i="0" u="none" strike="noStrike" smtClean="0">
+                          <a:solidFill>
+                            <a:srgbClr val="002060"/>
+                          </a:solidFill>
+                          <a:effectLst/>
+                          <a:latin typeface="Intel Clear" panose="020B0604020203020204" pitchFamily="34" charset="0"/>
+                          <a:ea typeface="Intel Clear" panose="020B0604020203020204" pitchFamily="34" charset="0"/>
+                          <a:cs typeface="Intel Clear" panose="020B0604020203020204" pitchFamily="34" charset="0"/>
+                        </a:rPr>
+                        <a:t> </a:t>
+                      </a:r>
+                      <a:endParaRPr lang="en-US" sz="1200" b="0" i="0" u="none" strike="noStrike" dirty="0">
+                        <a:solidFill>
+                          <a:srgbClr val="002060"/>
+                        </a:solidFill>
+                        <a:effectLst/>
+                        <a:latin typeface="Intel Clear" panose="020B0604020203020204" pitchFamily="34" charset="0"/>
+                        <a:ea typeface="Intel Clear" panose="020B0604020203020204" pitchFamily="34" charset="0"/>
+                        <a:cs typeface="Intel Clear" panose="020B0604020203020204" pitchFamily="34" charset="0"/>
+                      </a:endParaRPr>
+                    </a:p>
+                  </a:txBody>
+                  <a:tcPr marL="45720" marR="45720" marT="27432" marB="27432" anchor="ctr">
+                    <a:lnL w="19050" cap="flat" cmpd="sng" algn="ctr">
+                      <a:solidFill>
+                        <a:srgbClr val="002060"/>
+                      </a:solidFill>
+                      <a:prstDash val="solid"/>
+                      <a:round/>
+                      <a:headEnd type="none" w="med" len="med"/>
+                      <a:tailEnd type="none" w="med" len="med"/>
+                    </a:lnL>
+                    <a:lnR w="19050" cap="flat" cmpd="sng" algn="ctr">
+                      <a:solidFill>
+                        <a:srgbClr val="002060"/>
+                      </a:solidFill>
+                      <a:prstDash val="solid"/>
+                      <a:round/>
+                      <a:headEnd type="none" w="med" len="med"/>
+                      <a:tailEnd type="none" w="med" len="med"/>
+                    </a:lnR>
+                    <a:lnT w="19050" cap="flat" cmpd="sng" algn="ctr">
+                      <a:solidFill>
+                        <a:srgbClr val="002060"/>
+                      </a:solidFill>
+                      <a:prstDash val="solid"/>
+                      <a:round/>
+                      <a:headEnd type="none" w="med" len="med"/>
+                      <a:tailEnd type="none" w="med" len="med"/>
+                    </a:lnT>
+                    <a:lnB w="19050" cap="flat" cmpd="sng" algn="ctr">
+                      <a:solidFill>
+                        <a:srgbClr val="002060"/>
+                      </a:solidFill>
+                      <a:prstDash val="solid"/>
+                      <a:round/>
+                      <a:headEnd type="none" w="med" len="med"/>
+                      <a:tailEnd type="none" w="med" len="med"/>
+                    </a:lnB>
+                    <a:solidFill>
+                      <a:schemeClr val="bg1">
+                        <a:lumMod val="75000"/>
+                      </a:schemeClr>
+                    </a:solidFill>
+                  </a:tcPr>
+                </a:tc>
+                <a:extLst>
+                  <a:ext uri="{0D108BD9-81ED-4DB2-BD59-A6C34878D82A}">
+                    <a16:rowId xmlns:a16="http://schemas.microsoft.com/office/drawing/2014/main" val="2994593847"/>
                   </a:ext>
                 </a:extLst>
               </a:tr>
@@ -4089,14 +6523,14 @@
           <p:nvPr>
             <p:extLst>
               <p:ext uri="{D42A27DB-BD31-4B8C-83A1-F6EECF244321}">
-                <p14:modId xmlns:p14="http://schemas.microsoft.com/office/powerpoint/2010/main" val="4138884055"/>
+                <p14:modId xmlns:p14="http://schemas.microsoft.com/office/powerpoint/2010/main" val="559555510"/>
               </p:ext>
             </p:extLst>
           </p:nvPr>
         </p:nvGraphicFramePr>
         <p:xfrm>
           <a:off x="146686" y="956636"/>
-          <a:ext cx="6688320" cy="5078410"/>
+          <a:ext cx="6688320" cy="5653170"/>
         </p:xfrm>
         <a:graphic>
           <a:graphicData uri="http://schemas.openxmlformats.org/drawingml/2006/table">
@@ -4120,7 +6554,7 @@
                   </a:extLst>
                 </a:gridCol>
               </a:tblGrid>
-              <a:tr h="304635">
+              <a:tr h="266351">
                 <a:tc gridSpan="2">
                   <a:txBody>
                     <a:bodyPr/>
@@ -4172,7 +6606,7 @@
                   </a:ext>
                 </a:extLst>
               </a:tr>
-              <a:tr h="787533">
+              <a:tr h="919232">
                 <a:tc gridSpan="2">
                   <a:txBody>
                     <a:bodyPr/>
@@ -4278,7 +6712,7 @@
                   </a:ext>
                 </a:extLst>
               </a:tr>
-              <a:tr h="241554">
+              <a:tr h="255848">
                 <a:tc gridSpan="2">
                   <a:txBody>
                     <a:bodyPr/>
@@ -4373,7 +6807,7 @@
                   </a:ext>
                 </a:extLst>
               </a:tr>
-              <a:tr h="303604">
+              <a:tr h="354376">
                 <a:tc gridSpan="2">
                   <a:txBody>
                     <a:bodyPr/>
@@ -4479,7 +6913,7 @@
                   </a:ext>
                 </a:extLst>
               </a:tr>
-              <a:tr h="241554">
+              <a:tr h="229806">
                 <a:tc gridSpan="2">
                   <a:txBody>
                     <a:bodyPr/>
@@ -4567,7 +7001,7 @@
                   </a:ext>
                 </a:extLst>
               </a:tr>
-              <a:tr h="605540">
+              <a:tr h="706805">
                 <a:tc gridSpan="2">
                   <a:txBody>
                     <a:bodyPr/>
@@ -4673,7 +7107,7 @@
                   </a:ext>
                 </a:extLst>
               </a:tr>
-              <a:tr h="241554">
+              <a:tr h="246688">
                 <a:tc gridSpan="2">
                   <a:txBody>
                     <a:bodyPr/>
@@ -4752,7 +7186,7 @@
                   </a:ext>
                 </a:extLst>
               </a:tr>
-              <a:tr h="699610">
+              <a:tr h="816605">
                 <a:tc gridSpan="2">
                   <a:txBody>
                     <a:bodyPr/>
@@ -4845,7 +7279,7 @@
                   </a:ext>
                 </a:extLst>
               </a:tr>
-              <a:tr h="241554">
+              <a:tr h="242637">
                 <a:tc>
                   <a:txBody>
                     <a:bodyPr/>
@@ -4976,7 +7410,7 @@
                   </a:ext>
                 </a:extLst>
               </a:tr>
-              <a:tr h="241554">
+              <a:tr h="281950">
                 <a:tc>
                   <a:txBody>
                     <a:bodyPr/>
@@ -5121,7 +7555,7 @@
                   </a:ext>
                 </a:extLst>
               </a:tr>
-              <a:tr h="241554">
+              <a:tr h="249492">
                 <a:tc gridSpan="2">
                   <a:txBody>
                     <a:bodyPr/>
@@ -5225,7 +7659,7 @@
                   </a:ext>
                 </a:extLst>
               </a:tr>
-              <a:tr h="928164">
+              <a:tr h="1083380">
                 <a:tc gridSpan="2">
                   <a:txBody>
                     <a:bodyPr/>
@@ -5939,6 +8373,13 @@
       </p:transition>
     </mc:Fallback>
   </mc:AlternateContent>
+  <p:timing>
+    <p:tnLst>
+      <p:par>
+        <p:cTn id="1" dur="indefinite" restart="never" nodeType="tmRoot"/>
+      </p:par>
+    </p:tnLst>
+  </p:timing>
 </p:sld>
 </file>
 

</xml_diff>

<commit_message>
Set status color for Phase
</commit_message>
<xml_diff>
--- a/src/main/resources/Template.pptx
+++ b/src/main/resources/Template.pptx
@@ -197,7 +197,7 @@
           <a:p>
             <a:fld id="{159A8166-34DF-470E-9DE3-188AFC0E57D2}" type="datetimeFigureOut">
               <a:rPr lang="en-US" smtClean="0"/>
-              <a:t>08/08/2021</a:t>
+              <a:t>08/09/2021</a:t>
             </a:fld>
             <a:endParaRPr lang="en-US"/>
           </a:p>
@@ -698,7 +698,7 @@
           <a:p>
             <a:fld id="{7B9D1350-BBC3-4784-B299-7C5541BF58C1}" type="datetimeFigureOut">
               <a:rPr lang="en-US" smtClean="0"/>
-              <a:t>08/08/2021</a:t>
+              <a:t>08/09/2021</a:t>
             </a:fld>
             <a:endParaRPr lang="en-US"/>
           </a:p>
@@ -896,7 +896,7 @@
           <a:p>
             <a:fld id="{7B9D1350-BBC3-4784-B299-7C5541BF58C1}" type="datetimeFigureOut">
               <a:rPr lang="en-US" smtClean="0"/>
-              <a:t>08/08/2021</a:t>
+              <a:t>08/09/2021</a:t>
             </a:fld>
             <a:endParaRPr lang="en-US"/>
           </a:p>
@@ -1104,7 +1104,7 @@
           <a:p>
             <a:fld id="{7B9D1350-BBC3-4784-B299-7C5541BF58C1}" type="datetimeFigureOut">
               <a:rPr lang="en-US" smtClean="0"/>
-              <a:t>08/08/2021</a:t>
+              <a:t>08/09/2021</a:t>
             </a:fld>
             <a:endParaRPr lang="en-US"/>
           </a:p>
@@ -1302,7 +1302,7 @@
           <a:p>
             <a:fld id="{7B9D1350-BBC3-4784-B299-7C5541BF58C1}" type="datetimeFigureOut">
               <a:rPr lang="en-US" smtClean="0"/>
-              <a:t>08/08/2021</a:t>
+              <a:t>08/09/2021</a:t>
             </a:fld>
             <a:endParaRPr lang="en-US"/>
           </a:p>
@@ -1577,7 +1577,7 @@
           <a:p>
             <a:fld id="{7B9D1350-BBC3-4784-B299-7C5541BF58C1}" type="datetimeFigureOut">
               <a:rPr lang="en-US" smtClean="0"/>
-              <a:t>08/08/2021</a:t>
+              <a:t>08/09/2021</a:t>
             </a:fld>
             <a:endParaRPr lang="en-US"/>
           </a:p>
@@ -1842,7 +1842,7 @@
           <a:p>
             <a:fld id="{7B9D1350-BBC3-4784-B299-7C5541BF58C1}" type="datetimeFigureOut">
               <a:rPr lang="en-US" smtClean="0"/>
-              <a:t>08/08/2021</a:t>
+              <a:t>08/09/2021</a:t>
             </a:fld>
             <a:endParaRPr lang="en-US"/>
           </a:p>
@@ -2254,7 +2254,7 @@
           <a:p>
             <a:fld id="{7B9D1350-BBC3-4784-B299-7C5541BF58C1}" type="datetimeFigureOut">
               <a:rPr lang="en-US" smtClean="0"/>
-              <a:t>08/08/2021</a:t>
+              <a:t>08/09/2021</a:t>
             </a:fld>
             <a:endParaRPr lang="en-US"/>
           </a:p>
@@ -2395,7 +2395,7 @@
           <a:p>
             <a:fld id="{7B9D1350-BBC3-4784-B299-7C5541BF58C1}" type="datetimeFigureOut">
               <a:rPr lang="en-US" smtClean="0"/>
-              <a:t>08/08/2021</a:t>
+              <a:t>08/09/2021</a:t>
             </a:fld>
             <a:endParaRPr lang="en-US"/>
           </a:p>
@@ -2508,7 +2508,7 @@
           <a:p>
             <a:fld id="{7B9D1350-BBC3-4784-B299-7C5541BF58C1}" type="datetimeFigureOut">
               <a:rPr lang="en-US" smtClean="0"/>
-              <a:t>08/08/2021</a:t>
+              <a:t>08/09/2021</a:t>
             </a:fld>
             <a:endParaRPr lang="en-US"/>
           </a:p>
@@ -2819,7 +2819,7 @@
           <a:p>
             <a:fld id="{7B9D1350-BBC3-4784-B299-7C5541BF58C1}" type="datetimeFigureOut">
               <a:rPr lang="en-US" smtClean="0"/>
-              <a:t>08/08/2021</a:t>
+              <a:t>08/09/2021</a:t>
             </a:fld>
             <a:endParaRPr lang="en-US"/>
           </a:p>
@@ -3107,7 +3107,7 @@
           <a:p>
             <a:fld id="{7B9D1350-BBC3-4784-B299-7C5541BF58C1}" type="datetimeFigureOut">
               <a:rPr lang="en-US" smtClean="0"/>
-              <a:t>08/08/2021</a:t>
+              <a:t>08/09/2021</a:t>
             </a:fld>
             <a:endParaRPr lang="en-US"/>
           </a:p>
@@ -3348,7 +3348,7 @@
           <a:p>
             <a:fld id="{7B9D1350-BBC3-4784-B299-7C5541BF58C1}" type="datetimeFigureOut">
               <a:rPr lang="en-US" smtClean="0"/>
-              <a:t>08/08/2021</a:t>
+              <a:t>08/09/2021</a:t>
             </a:fld>
             <a:endParaRPr lang="en-US"/>
           </a:p>
@@ -7784,7 +7784,7 @@
           <p:nvPr>
             <p:extLst>
               <p:ext uri="{D42A27DB-BD31-4B8C-83A1-F6EECF244321}">
-                <p14:modId xmlns:p14="http://schemas.microsoft.com/office/powerpoint/2010/main" val="1793278678"/>
+                <p14:modId xmlns:p14="http://schemas.microsoft.com/office/powerpoint/2010/main" val="1489574468"/>
               </p:ext>
             </p:extLst>
           </p:nvPr>
@@ -8229,16 +8229,11 @@
                       <a:r>
                         <a:rPr lang="en-US" sz="1600" b="1">
                           <a:solidFill>
-                            <a:srgbClr val="92D050"/>
+                            <a:schemeClr val="bg1"/>
                           </a:solidFill>
                         </a:rPr>
                         <a:t>COMMITTED</a:t>
                       </a:r>
-                      <a:endParaRPr lang="en-US" sz="1600" b="1">
-                        <a:solidFill>
-                          <a:schemeClr val="tx1"/>
-                        </a:solidFill>
-                      </a:endParaRPr>
                     </a:p>
                   </a:txBody>
                   <a:tcPr>

</xml_diff>

<commit_message>
Add 3 more columns to the Milestones table
</commit_message>
<xml_diff>
--- a/src/main/resources/Template.pptx
+++ b/src/main/resources/Template.pptx
@@ -197,7 +197,7 @@
           <a:p>
             <a:fld id="{159A8166-34DF-470E-9DE3-188AFC0E57D2}" type="datetimeFigureOut">
               <a:rPr lang="en-US" smtClean="0"/>
-              <a:t>08/09/2021</a:t>
+              <a:t>17/09/2021</a:t>
             </a:fld>
             <a:endParaRPr lang="en-US"/>
           </a:p>
@@ -698,7 +698,7 @@
           <a:p>
             <a:fld id="{7B9D1350-BBC3-4784-B299-7C5541BF58C1}" type="datetimeFigureOut">
               <a:rPr lang="en-US" smtClean="0"/>
-              <a:t>08/09/2021</a:t>
+              <a:t>17/09/2021</a:t>
             </a:fld>
             <a:endParaRPr lang="en-US"/>
           </a:p>
@@ -896,7 +896,7 @@
           <a:p>
             <a:fld id="{7B9D1350-BBC3-4784-B299-7C5541BF58C1}" type="datetimeFigureOut">
               <a:rPr lang="en-US" smtClean="0"/>
-              <a:t>08/09/2021</a:t>
+              <a:t>17/09/2021</a:t>
             </a:fld>
             <a:endParaRPr lang="en-US"/>
           </a:p>
@@ -1104,7 +1104,7 @@
           <a:p>
             <a:fld id="{7B9D1350-BBC3-4784-B299-7C5541BF58C1}" type="datetimeFigureOut">
               <a:rPr lang="en-US" smtClean="0"/>
-              <a:t>08/09/2021</a:t>
+              <a:t>17/09/2021</a:t>
             </a:fld>
             <a:endParaRPr lang="en-US"/>
           </a:p>
@@ -1302,7 +1302,7 @@
           <a:p>
             <a:fld id="{7B9D1350-BBC3-4784-B299-7C5541BF58C1}" type="datetimeFigureOut">
               <a:rPr lang="en-US" smtClean="0"/>
-              <a:t>08/09/2021</a:t>
+              <a:t>17/09/2021</a:t>
             </a:fld>
             <a:endParaRPr lang="en-US"/>
           </a:p>
@@ -1577,7 +1577,7 @@
           <a:p>
             <a:fld id="{7B9D1350-BBC3-4784-B299-7C5541BF58C1}" type="datetimeFigureOut">
               <a:rPr lang="en-US" smtClean="0"/>
-              <a:t>08/09/2021</a:t>
+              <a:t>17/09/2021</a:t>
             </a:fld>
             <a:endParaRPr lang="en-US"/>
           </a:p>
@@ -1842,7 +1842,7 @@
           <a:p>
             <a:fld id="{7B9D1350-BBC3-4784-B299-7C5541BF58C1}" type="datetimeFigureOut">
               <a:rPr lang="en-US" smtClean="0"/>
-              <a:t>08/09/2021</a:t>
+              <a:t>17/09/2021</a:t>
             </a:fld>
             <a:endParaRPr lang="en-US"/>
           </a:p>
@@ -2254,7 +2254,7 @@
           <a:p>
             <a:fld id="{7B9D1350-BBC3-4784-B299-7C5541BF58C1}" type="datetimeFigureOut">
               <a:rPr lang="en-US" smtClean="0"/>
-              <a:t>08/09/2021</a:t>
+              <a:t>17/09/2021</a:t>
             </a:fld>
             <a:endParaRPr lang="en-US"/>
           </a:p>
@@ -2395,7 +2395,7 @@
           <a:p>
             <a:fld id="{7B9D1350-BBC3-4784-B299-7C5541BF58C1}" type="datetimeFigureOut">
               <a:rPr lang="en-US" smtClean="0"/>
-              <a:t>08/09/2021</a:t>
+              <a:t>17/09/2021</a:t>
             </a:fld>
             <a:endParaRPr lang="en-US"/>
           </a:p>
@@ -2508,7 +2508,7 @@
           <a:p>
             <a:fld id="{7B9D1350-BBC3-4784-B299-7C5541BF58C1}" type="datetimeFigureOut">
               <a:rPr lang="en-US" smtClean="0"/>
-              <a:t>08/09/2021</a:t>
+              <a:t>17/09/2021</a:t>
             </a:fld>
             <a:endParaRPr lang="en-US"/>
           </a:p>
@@ -2819,7 +2819,7 @@
           <a:p>
             <a:fld id="{7B9D1350-BBC3-4784-B299-7C5541BF58C1}" type="datetimeFigureOut">
               <a:rPr lang="en-US" smtClean="0"/>
-              <a:t>08/09/2021</a:t>
+              <a:t>17/09/2021</a:t>
             </a:fld>
             <a:endParaRPr lang="en-US"/>
           </a:p>
@@ -3107,7 +3107,7 @@
           <a:p>
             <a:fld id="{7B9D1350-BBC3-4784-B299-7C5541BF58C1}" type="datetimeFigureOut">
               <a:rPr lang="en-US" smtClean="0"/>
-              <a:t>08/09/2021</a:t>
+              <a:t>17/09/2021</a:t>
             </a:fld>
             <a:endParaRPr lang="en-US"/>
           </a:p>
@@ -3348,7 +3348,7 @@
           <a:p>
             <a:fld id="{7B9D1350-BBC3-4784-B299-7C5541BF58C1}" type="datetimeFigureOut">
               <a:rPr lang="en-US" smtClean="0"/>
-              <a:t>08/09/2021</a:t>
+              <a:t>17/09/2021</a:t>
             </a:fld>
             <a:endParaRPr lang="en-US"/>
           </a:p>
@@ -3780,37 +3780,58 @@
           <p:nvPr>
             <p:extLst>
               <p:ext uri="{D42A27DB-BD31-4B8C-83A1-F6EECF244321}">
-                <p14:modId xmlns:p14="http://schemas.microsoft.com/office/powerpoint/2010/main" val="2861896503"/>
+                <p14:modId xmlns:p14="http://schemas.microsoft.com/office/powerpoint/2010/main" val="2922337344"/>
               </p:ext>
             </p:extLst>
           </p:nvPr>
         </p:nvGraphicFramePr>
         <p:xfrm>
           <a:off x="6939915" y="956637"/>
-          <a:ext cx="5147310" cy="5653165"/>
+          <a:ext cx="5147315" cy="5653165"/>
         </p:xfrm>
         <a:graphic>
           <a:graphicData uri="http://schemas.openxmlformats.org/drawingml/2006/table">
             <a:tbl>
               <a:tblPr/>
               <a:tblGrid>
-                <a:gridCol w="925492">
+                <a:gridCol w="1029463">
                   <a:extLst>
                     <a:ext uri="{9D8B030D-6E8A-4147-A177-3AD203B41FA5}">
                       <a16:colId xmlns:a16="http://schemas.microsoft.com/office/drawing/2014/main" val="731854768"/>
                     </a:ext>
                   </a:extLst>
                 </a:gridCol>
-                <a:gridCol w="4221818">
+                <a:gridCol w="1029463">
                   <a:extLst>
                     <a:ext uri="{9D8B030D-6E8A-4147-A177-3AD203B41FA5}">
                       <a16:colId xmlns:a16="http://schemas.microsoft.com/office/drawing/2014/main" val="134440545"/>
                     </a:ext>
                   </a:extLst>
                 </a:gridCol>
+                <a:gridCol w="1029463">
+                  <a:extLst>
+                    <a:ext uri="{9D8B030D-6E8A-4147-A177-3AD203B41FA5}">
+                      <a16:colId xmlns:a16="http://schemas.microsoft.com/office/drawing/2014/main" val="2933571810"/>
+                    </a:ext>
+                  </a:extLst>
+                </a:gridCol>
+                <a:gridCol w="1029463">
+                  <a:extLst>
+                    <a:ext uri="{9D8B030D-6E8A-4147-A177-3AD203B41FA5}">
+                      <a16:colId xmlns:a16="http://schemas.microsoft.com/office/drawing/2014/main" val="1046102139"/>
+                    </a:ext>
+                  </a:extLst>
+                </a:gridCol>
+                <a:gridCol w="1029463">
+                  <a:extLst>
+                    <a:ext uri="{9D8B030D-6E8A-4147-A177-3AD203B41FA5}">
+                      <a16:colId xmlns:a16="http://schemas.microsoft.com/office/drawing/2014/main" val="2073939756"/>
+                    </a:ext>
+                  </a:extLst>
+                </a:gridCol>
               </a:tblGrid>
               <a:tr h="282440">
-                <a:tc gridSpan="2">
+                <a:tc gridSpan="5">
                   <a:txBody>
                     <a:bodyPr/>
                     <a:lstStyle/>
@@ -3928,6 +3949,183 @@
                       <a:schemeClr val="bg1">
                         <a:lumMod val="75000"/>
                       </a:schemeClr>
+                    </a:solidFill>
+                  </a:tcPr>
+                </a:tc>
+                <a:tc hMerge="1">
+                  <a:txBody>
+                    <a:bodyPr/>
+                    <a:lstStyle/>
+                    <a:p>
+                      <a:pPr marL="0" algn="l" defTabSz="606541" rtl="0" eaLnBrk="1" fontAlgn="b" latinLnBrk="0" hangingPunct="1"/>
+                      <a:endParaRPr lang="en-US" sz="1200" b="1" u="none" strike="noStrike" kern="1200" dirty="0">
+                        <a:solidFill>
+                          <a:schemeClr val="bg1"/>
+                        </a:solidFill>
+                        <a:effectLst/>
+                        <a:latin typeface="+mn-lt"/>
+                        <a:ea typeface="+mn-ea"/>
+                        <a:cs typeface="+mn-cs"/>
+                      </a:endParaRPr>
+                    </a:p>
+                  </a:txBody>
+                  <a:tcPr marL="6717" marR="6717" marT="6717" marB="0" anchor="ctr">
+                    <a:lnL w="19050" cap="flat" cmpd="sng" algn="ctr">
+                      <a:solidFill>
+                        <a:srgbClr val="002060"/>
+                      </a:solidFill>
+                      <a:prstDash val="solid"/>
+                      <a:round/>
+                      <a:headEnd type="none" w="med" len="med"/>
+                      <a:tailEnd type="none" w="med" len="med"/>
+                    </a:lnL>
+                    <a:lnR w="19050" cap="flat" cmpd="sng" algn="ctr">
+                      <a:solidFill>
+                        <a:srgbClr val="002060"/>
+                      </a:solidFill>
+                      <a:prstDash val="solid"/>
+                      <a:round/>
+                      <a:headEnd type="none" w="med" len="med"/>
+                      <a:tailEnd type="none" w="med" len="med"/>
+                    </a:lnR>
+                    <a:lnT w="19050" cap="flat" cmpd="sng" algn="ctr">
+                      <a:solidFill>
+                        <a:srgbClr val="002060"/>
+                      </a:solidFill>
+                      <a:prstDash val="solid"/>
+                      <a:round/>
+                      <a:headEnd type="none" w="med" len="med"/>
+                      <a:tailEnd type="none" w="med" len="med"/>
+                    </a:lnT>
+                    <a:lnB w="19050" cap="flat" cmpd="sng" algn="ctr">
+                      <a:solidFill>
+                        <a:srgbClr val="002060"/>
+                      </a:solidFill>
+                      <a:prstDash val="solid"/>
+                      <a:round/>
+                      <a:headEnd type="none" w="med" len="med"/>
+                      <a:tailEnd type="none" w="med" len="med"/>
+                    </a:lnB>
+                    <a:solidFill>
+                      <a:srgbClr val="3B5989"/>
+                    </a:solidFill>
+                  </a:tcPr>
+                </a:tc>
+                <a:tc hMerge="1">
+                  <a:txBody>
+                    <a:bodyPr/>
+                    <a:lstStyle/>
+                    <a:p>
+                      <a:pPr marL="0" algn="l" defTabSz="606541" rtl="0" eaLnBrk="1" fontAlgn="b" latinLnBrk="0" hangingPunct="1"/>
+                      <a:endParaRPr lang="en-US" sz="1200" b="1" u="none" strike="noStrike" kern="1200" dirty="0">
+                        <a:solidFill>
+                          <a:schemeClr val="bg1"/>
+                        </a:solidFill>
+                        <a:effectLst/>
+                        <a:latin typeface="+mn-lt"/>
+                        <a:ea typeface="+mn-ea"/>
+                        <a:cs typeface="+mn-cs"/>
+                      </a:endParaRPr>
+                    </a:p>
+                  </a:txBody>
+                  <a:tcPr marL="6717" marR="6717" marT="6717" marB="0" anchor="ctr">
+                    <a:lnL w="19050" cap="flat" cmpd="sng" algn="ctr">
+                      <a:solidFill>
+                        <a:srgbClr val="002060"/>
+                      </a:solidFill>
+                      <a:prstDash val="solid"/>
+                      <a:round/>
+                      <a:headEnd type="none" w="med" len="med"/>
+                      <a:tailEnd type="none" w="med" len="med"/>
+                    </a:lnL>
+                    <a:lnR w="19050" cap="flat" cmpd="sng" algn="ctr">
+                      <a:solidFill>
+                        <a:srgbClr val="002060"/>
+                      </a:solidFill>
+                      <a:prstDash val="solid"/>
+                      <a:round/>
+                      <a:headEnd type="none" w="med" len="med"/>
+                      <a:tailEnd type="none" w="med" len="med"/>
+                    </a:lnR>
+                    <a:lnT w="19050" cap="flat" cmpd="sng" algn="ctr">
+                      <a:solidFill>
+                        <a:srgbClr val="002060"/>
+                      </a:solidFill>
+                      <a:prstDash val="solid"/>
+                      <a:round/>
+                      <a:headEnd type="none" w="med" len="med"/>
+                      <a:tailEnd type="none" w="med" len="med"/>
+                    </a:lnT>
+                    <a:lnB w="19050" cap="flat" cmpd="sng" algn="ctr">
+                      <a:solidFill>
+                        <a:srgbClr val="002060"/>
+                      </a:solidFill>
+                      <a:prstDash val="solid"/>
+                      <a:round/>
+                      <a:headEnd type="none" w="med" len="med"/>
+                      <a:tailEnd type="none" w="med" len="med"/>
+                    </a:lnB>
+                    <a:solidFill>
+                      <a:srgbClr val="3B5989"/>
+                    </a:solidFill>
+                  </a:tcPr>
+                </a:tc>
+                <a:tc hMerge="1">
+                  <a:txBody>
+                    <a:bodyPr/>
+                    <a:lstStyle/>
+                    <a:p>
+                      <a:pPr marL="0" algn="l" defTabSz="606541" rtl="0" eaLnBrk="1" fontAlgn="b" latinLnBrk="0" hangingPunct="1"/>
+                      <a:endParaRPr lang="en-US" sz="1200" b="1" u="none" strike="noStrike" kern="1200" dirty="0">
+                        <a:solidFill>
+                          <a:schemeClr val="bg1"/>
+                        </a:solidFill>
+                        <a:effectLst/>
+                        <a:latin typeface="+mn-lt"/>
+                        <a:ea typeface="+mn-ea"/>
+                        <a:cs typeface="+mn-cs"/>
+                      </a:endParaRPr>
+                    </a:p>
+                  </a:txBody>
+                  <a:tcPr marL="6717" marR="6717" marT="6717" marB="0" anchor="ctr">
+                    <a:lnL w="19050" cap="flat" cmpd="sng" algn="ctr">
+                      <a:solidFill>
+                        <a:srgbClr val="002060"/>
+                      </a:solidFill>
+                      <a:prstDash val="solid"/>
+                      <a:round/>
+                      <a:headEnd type="none" w="med" len="med"/>
+                      <a:tailEnd type="none" w="med" len="med"/>
+                    </a:lnL>
+                    <a:lnR w="19050" cap="flat" cmpd="sng" algn="ctr">
+                      <a:solidFill>
+                        <a:srgbClr val="002060"/>
+                      </a:solidFill>
+                      <a:prstDash val="solid"/>
+                      <a:round/>
+                      <a:headEnd type="none" w="med" len="med"/>
+                      <a:tailEnd type="none" w="med" len="med"/>
+                    </a:lnR>
+                    <a:lnT w="19050" cap="flat" cmpd="sng" algn="ctr">
+                      <a:solidFill>
+                        <a:srgbClr val="002060"/>
+                      </a:solidFill>
+                      <a:prstDash val="solid"/>
+                      <a:round/>
+                      <a:headEnd type="none" w="med" len="med"/>
+                      <a:tailEnd type="none" w="med" len="med"/>
+                    </a:lnT>
+                    <a:lnB w="19050" cap="flat" cmpd="sng" algn="ctr">
+                      <a:solidFill>
+                        <a:srgbClr val="002060"/>
+                      </a:solidFill>
+                      <a:prstDash val="solid"/>
+                      <a:round/>
+                      <a:headEnd type="none" w="med" len="med"/>
+                      <a:tailEnd type="none" w="med" len="med"/>
+                    </a:lnB>
+                    <a:solidFill>
+                      <a:srgbClr val="3B5989"/>
                     </a:solidFill>
                   </a:tcPr>
                 </a:tc>
@@ -4006,6 +4204,225 @@
                     </a:lnB>
                     <a:solidFill>
                       <a:srgbClr val="BFBFBF"/>
+                    </a:solidFill>
+                  </a:tcPr>
+                </a:tc>
+                <a:tc>
+                  <a:txBody>
+                    <a:bodyPr/>
+                    <a:lstStyle/>
+                    <a:p>
+                      <a:pPr algn="l" fontAlgn="t"/>
+                      <a:r>
+                        <a:rPr lang="en-US" sz="1200" b="0" i="0" u="none" strike="noStrike" smtClean="0">
+                          <a:solidFill>
+                            <a:srgbClr val="002060"/>
+                          </a:solidFill>
+                          <a:effectLst/>
+                          <a:latin typeface="Intel Clear" panose="020B0604020203020204" pitchFamily="34" charset="0"/>
+                          <a:ea typeface="Intel Clear" panose="020B0604020203020204" pitchFamily="34" charset="0"/>
+                          <a:cs typeface="Intel Clear" panose="020B0604020203020204" pitchFamily="34" charset="0"/>
+                        </a:rPr>
+                        <a:t> </a:t>
+                      </a:r>
+                      <a:endParaRPr lang="en-US" sz="1200" b="0" i="0" u="none" strike="noStrike" dirty="0">
+                        <a:solidFill>
+                          <a:srgbClr val="002060"/>
+                        </a:solidFill>
+                        <a:effectLst/>
+                        <a:latin typeface="Intel Clear" panose="020B0604020203020204" pitchFamily="34" charset="0"/>
+                        <a:ea typeface="Intel Clear" panose="020B0604020203020204" pitchFamily="34" charset="0"/>
+                        <a:cs typeface="Intel Clear" panose="020B0604020203020204" pitchFamily="34" charset="0"/>
+                      </a:endParaRPr>
+                    </a:p>
+                  </a:txBody>
+                  <a:tcPr marL="45720" marR="45720" marT="27432" marB="27432" anchor="ctr">
+                    <a:lnL w="19050" cap="flat" cmpd="sng" algn="ctr">
+                      <a:solidFill>
+                        <a:srgbClr val="002060"/>
+                      </a:solidFill>
+                      <a:prstDash val="solid"/>
+                      <a:round/>
+                      <a:headEnd type="none" w="med" len="med"/>
+                      <a:tailEnd type="none" w="med" len="med"/>
+                    </a:lnL>
+                    <a:lnR w="19050" cap="flat" cmpd="sng" algn="ctr">
+                      <a:solidFill>
+                        <a:srgbClr val="002060"/>
+                      </a:solidFill>
+                      <a:prstDash val="solid"/>
+                      <a:round/>
+                      <a:headEnd type="none" w="med" len="med"/>
+                      <a:tailEnd type="none" w="med" len="med"/>
+                    </a:lnR>
+                    <a:lnT w="19050" cap="flat" cmpd="sng" algn="ctr">
+                      <a:solidFill>
+                        <a:srgbClr val="002060"/>
+                      </a:solidFill>
+                      <a:prstDash val="solid"/>
+                      <a:round/>
+                      <a:headEnd type="none" w="med" len="med"/>
+                      <a:tailEnd type="none" w="med" len="med"/>
+                    </a:lnT>
+                    <a:lnB w="19050" cap="flat" cmpd="sng" algn="ctr">
+                      <a:solidFill>
+                        <a:srgbClr val="002060"/>
+                      </a:solidFill>
+                      <a:prstDash val="solid"/>
+                      <a:round/>
+                      <a:headEnd type="none" w="med" len="med"/>
+                      <a:tailEnd type="none" w="med" len="med"/>
+                    </a:lnB>
+                    <a:solidFill>
+                      <a:schemeClr val="bg1">
+                        <a:lumMod val="75000"/>
+                      </a:schemeClr>
+                    </a:solidFill>
+                  </a:tcPr>
+                </a:tc>
+                <a:tc>
+                  <a:txBody>
+                    <a:bodyPr/>
+                    <a:lstStyle/>
+                    <a:p>
+                      <a:pPr algn="l" fontAlgn="t"/>
+                      <a:r>
+                        <a:rPr lang="en-US" sz="1200" b="0" i="0" u="none" strike="noStrike" smtClean="0">
+                          <a:solidFill>
+                            <a:srgbClr val="002060"/>
+                          </a:solidFill>
+                          <a:effectLst/>
+                          <a:latin typeface="Intel Clear" panose="020B0604020203020204" pitchFamily="34" charset="0"/>
+                          <a:ea typeface="Intel Clear" panose="020B0604020203020204" pitchFamily="34" charset="0"/>
+                          <a:cs typeface="Intel Clear" panose="020B0604020203020204" pitchFamily="34" charset="0"/>
+                        </a:rPr>
+                        <a:t> </a:t>
+                      </a:r>
+                      <a:endParaRPr lang="en-US" sz="1200" b="0" i="0" u="none" strike="noStrike" dirty="0">
+                        <a:solidFill>
+                          <a:srgbClr val="002060"/>
+                        </a:solidFill>
+                        <a:effectLst/>
+                        <a:latin typeface="Intel Clear" panose="020B0604020203020204" pitchFamily="34" charset="0"/>
+                        <a:ea typeface="Intel Clear" panose="020B0604020203020204" pitchFamily="34" charset="0"/>
+                        <a:cs typeface="Intel Clear" panose="020B0604020203020204" pitchFamily="34" charset="0"/>
+                      </a:endParaRPr>
+                    </a:p>
+                  </a:txBody>
+                  <a:tcPr marL="45720" marR="45720" marT="27432" marB="27432" anchor="ctr">
+                    <a:lnL w="19050" cap="flat" cmpd="sng" algn="ctr">
+                      <a:solidFill>
+                        <a:srgbClr val="002060"/>
+                      </a:solidFill>
+                      <a:prstDash val="solid"/>
+                      <a:round/>
+                      <a:headEnd type="none" w="med" len="med"/>
+                      <a:tailEnd type="none" w="med" len="med"/>
+                    </a:lnL>
+                    <a:lnR w="19050" cap="flat" cmpd="sng" algn="ctr">
+                      <a:solidFill>
+                        <a:srgbClr val="002060"/>
+                      </a:solidFill>
+                      <a:prstDash val="solid"/>
+                      <a:round/>
+                      <a:headEnd type="none" w="med" len="med"/>
+                      <a:tailEnd type="none" w="med" len="med"/>
+                    </a:lnR>
+                    <a:lnT w="19050" cap="flat" cmpd="sng" algn="ctr">
+                      <a:solidFill>
+                        <a:srgbClr val="002060"/>
+                      </a:solidFill>
+                      <a:prstDash val="solid"/>
+                      <a:round/>
+                      <a:headEnd type="none" w="med" len="med"/>
+                      <a:tailEnd type="none" w="med" len="med"/>
+                    </a:lnT>
+                    <a:lnB w="19050" cap="flat" cmpd="sng" algn="ctr">
+                      <a:solidFill>
+                        <a:srgbClr val="002060"/>
+                      </a:solidFill>
+                      <a:prstDash val="solid"/>
+                      <a:round/>
+                      <a:headEnd type="none" w="med" len="med"/>
+                      <a:tailEnd type="none" w="med" len="med"/>
+                    </a:lnB>
+                    <a:solidFill>
+                      <a:schemeClr val="bg1">
+                        <a:lumMod val="75000"/>
+                      </a:schemeClr>
+                    </a:solidFill>
+                  </a:tcPr>
+                </a:tc>
+                <a:tc>
+                  <a:txBody>
+                    <a:bodyPr/>
+                    <a:lstStyle/>
+                    <a:p>
+                      <a:pPr algn="l" fontAlgn="t"/>
+                      <a:r>
+                        <a:rPr lang="en-US" sz="1200" b="0" i="0" u="none" strike="noStrike" smtClean="0">
+                          <a:solidFill>
+                            <a:srgbClr val="002060"/>
+                          </a:solidFill>
+                          <a:effectLst/>
+                          <a:latin typeface="Intel Clear" panose="020B0604020203020204" pitchFamily="34" charset="0"/>
+                          <a:ea typeface="Intel Clear" panose="020B0604020203020204" pitchFamily="34" charset="0"/>
+                          <a:cs typeface="Intel Clear" panose="020B0604020203020204" pitchFamily="34" charset="0"/>
+                        </a:rPr>
+                        <a:t> </a:t>
+                      </a:r>
+                      <a:endParaRPr lang="en-US" sz="1200" b="0" i="0" u="none" strike="noStrike" dirty="0">
+                        <a:solidFill>
+                          <a:srgbClr val="002060"/>
+                        </a:solidFill>
+                        <a:effectLst/>
+                        <a:latin typeface="Intel Clear" panose="020B0604020203020204" pitchFamily="34" charset="0"/>
+                        <a:ea typeface="Intel Clear" panose="020B0604020203020204" pitchFamily="34" charset="0"/>
+                        <a:cs typeface="Intel Clear" panose="020B0604020203020204" pitchFamily="34" charset="0"/>
+                      </a:endParaRPr>
+                    </a:p>
+                  </a:txBody>
+                  <a:tcPr marL="45720" marR="45720" marT="27432" marB="27432" anchor="ctr">
+                    <a:lnL w="19050" cap="flat" cmpd="sng" algn="ctr">
+                      <a:solidFill>
+                        <a:srgbClr val="002060"/>
+                      </a:solidFill>
+                      <a:prstDash val="solid"/>
+                      <a:round/>
+                      <a:headEnd type="none" w="med" len="med"/>
+                      <a:tailEnd type="none" w="med" len="med"/>
+                    </a:lnL>
+                    <a:lnR w="19050" cap="flat" cmpd="sng" algn="ctr">
+                      <a:solidFill>
+                        <a:srgbClr val="002060"/>
+                      </a:solidFill>
+                      <a:prstDash val="solid"/>
+                      <a:round/>
+                      <a:headEnd type="none" w="med" len="med"/>
+                      <a:tailEnd type="none" w="med" len="med"/>
+                    </a:lnR>
+                    <a:lnT w="19050" cap="flat" cmpd="sng" algn="ctr">
+                      <a:solidFill>
+                        <a:srgbClr val="002060"/>
+                      </a:solidFill>
+                      <a:prstDash val="solid"/>
+                      <a:round/>
+                      <a:headEnd type="none" w="med" len="med"/>
+                      <a:tailEnd type="none" w="med" len="med"/>
+                    </a:lnT>
+                    <a:lnB w="19050" cap="flat" cmpd="sng" algn="ctr">
+                      <a:solidFill>
+                        <a:srgbClr val="002060"/>
+                      </a:solidFill>
+                      <a:prstDash val="solid"/>
+                      <a:round/>
+                      <a:headEnd type="none" w="med" len="med"/>
+                      <a:tailEnd type="none" w="med" len="med"/>
+                    </a:lnB>
+                    <a:solidFill>
+                      <a:schemeClr val="bg1">
+                        <a:lumMod val="75000"/>
+                      </a:schemeClr>
                     </a:solidFill>
                   </a:tcPr>
                 </a:tc>
@@ -4233,6 +4650,225 @@
                     </a:solidFill>
                   </a:tcPr>
                 </a:tc>
+                <a:tc>
+                  <a:txBody>
+                    <a:bodyPr/>
+                    <a:lstStyle/>
+                    <a:p>
+                      <a:pPr algn="l" fontAlgn="t"/>
+                      <a:r>
+                        <a:rPr lang="en-US" sz="1200" b="0" i="0" u="none" strike="noStrike" smtClean="0">
+                          <a:solidFill>
+                            <a:srgbClr val="002060"/>
+                          </a:solidFill>
+                          <a:effectLst/>
+                          <a:latin typeface="Intel Clear" panose="020B0604020203020204" pitchFamily="34" charset="0"/>
+                          <a:ea typeface="Intel Clear" panose="020B0604020203020204" pitchFamily="34" charset="0"/>
+                          <a:cs typeface="Intel Clear" panose="020B0604020203020204" pitchFamily="34" charset="0"/>
+                        </a:rPr>
+                        <a:t> </a:t>
+                      </a:r>
+                      <a:endParaRPr lang="en-US" sz="1200" b="0" i="0" u="none" strike="noStrike" dirty="0">
+                        <a:solidFill>
+                          <a:srgbClr val="002060"/>
+                        </a:solidFill>
+                        <a:effectLst/>
+                        <a:latin typeface="Intel Clear" panose="020B0604020203020204" pitchFamily="34" charset="0"/>
+                        <a:ea typeface="Intel Clear" panose="020B0604020203020204" pitchFamily="34" charset="0"/>
+                        <a:cs typeface="Intel Clear" panose="020B0604020203020204" pitchFamily="34" charset="0"/>
+                      </a:endParaRPr>
+                    </a:p>
+                  </a:txBody>
+                  <a:tcPr marL="45720" marR="45720" marT="27432" marB="27432" anchor="ctr">
+                    <a:lnL w="19050" cap="flat" cmpd="sng" algn="ctr">
+                      <a:solidFill>
+                        <a:srgbClr val="002060"/>
+                      </a:solidFill>
+                      <a:prstDash val="solid"/>
+                      <a:round/>
+                      <a:headEnd type="none" w="med" len="med"/>
+                      <a:tailEnd type="none" w="med" len="med"/>
+                    </a:lnL>
+                    <a:lnR w="19050" cap="flat" cmpd="sng" algn="ctr">
+                      <a:solidFill>
+                        <a:srgbClr val="002060"/>
+                      </a:solidFill>
+                      <a:prstDash val="solid"/>
+                      <a:round/>
+                      <a:headEnd type="none" w="med" len="med"/>
+                      <a:tailEnd type="none" w="med" len="med"/>
+                    </a:lnR>
+                    <a:lnT w="19050" cap="flat" cmpd="sng" algn="ctr">
+                      <a:solidFill>
+                        <a:srgbClr val="002060"/>
+                      </a:solidFill>
+                      <a:prstDash val="solid"/>
+                      <a:round/>
+                      <a:headEnd type="none" w="med" len="med"/>
+                      <a:tailEnd type="none" w="med" len="med"/>
+                    </a:lnT>
+                    <a:lnB w="19050" cap="flat" cmpd="sng" algn="ctr">
+                      <a:solidFill>
+                        <a:srgbClr val="002060"/>
+                      </a:solidFill>
+                      <a:prstDash val="solid"/>
+                      <a:round/>
+                      <a:headEnd type="none" w="med" len="med"/>
+                      <a:tailEnd type="none" w="med" len="med"/>
+                    </a:lnB>
+                    <a:solidFill>
+                      <a:schemeClr val="bg1">
+                        <a:lumMod val="75000"/>
+                      </a:schemeClr>
+                    </a:solidFill>
+                  </a:tcPr>
+                </a:tc>
+                <a:tc>
+                  <a:txBody>
+                    <a:bodyPr/>
+                    <a:lstStyle/>
+                    <a:p>
+                      <a:pPr algn="l" fontAlgn="t"/>
+                      <a:r>
+                        <a:rPr lang="en-US" sz="1200" b="0" i="0" u="none" strike="noStrike" smtClean="0">
+                          <a:solidFill>
+                            <a:srgbClr val="002060"/>
+                          </a:solidFill>
+                          <a:effectLst/>
+                          <a:latin typeface="Intel Clear" panose="020B0604020203020204" pitchFamily="34" charset="0"/>
+                          <a:ea typeface="Intel Clear" panose="020B0604020203020204" pitchFamily="34" charset="0"/>
+                          <a:cs typeface="Intel Clear" panose="020B0604020203020204" pitchFamily="34" charset="0"/>
+                        </a:rPr>
+                        <a:t> </a:t>
+                      </a:r>
+                      <a:endParaRPr lang="en-US" sz="1200" b="0" i="0" u="none" strike="noStrike" dirty="0">
+                        <a:solidFill>
+                          <a:srgbClr val="002060"/>
+                        </a:solidFill>
+                        <a:effectLst/>
+                        <a:latin typeface="Intel Clear" panose="020B0604020203020204" pitchFamily="34" charset="0"/>
+                        <a:ea typeface="Intel Clear" panose="020B0604020203020204" pitchFamily="34" charset="0"/>
+                        <a:cs typeface="Intel Clear" panose="020B0604020203020204" pitchFamily="34" charset="0"/>
+                      </a:endParaRPr>
+                    </a:p>
+                  </a:txBody>
+                  <a:tcPr marL="45720" marR="45720" marT="27432" marB="27432" anchor="ctr">
+                    <a:lnL w="19050" cap="flat" cmpd="sng" algn="ctr">
+                      <a:solidFill>
+                        <a:srgbClr val="002060"/>
+                      </a:solidFill>
+                      <a:prstDash val="solid"/>
+                      <a:round/>
+                      <a:headEnd type="none" w="med" len="med"/>
+                      <a:tailEnd type="none" w="med" len="med"/>
+                    </a:lnL>
+                    <a:lnR w="19050" cap="flat" cmpd="sng" algn="ctr">
+                      <a:solidFill>
+                        <a:srgbClr val="002060"/>
+                      </a:solidFill>
+                      <a:prstDash val="solid"/>
+                      <a:round/>
+                      <a:headEnd type="none" w="med" len="med"/>
+                      <a:tailEnd type="none" w="med" len="med"/>
+                    </a:lnR>
+                    <a:lnT w="19050" cap="flat" cmpd="sng" algn="ctr">
+                      <a:solidFill>
+                        <a:srgbClr val="002060"/>
+                      </a:solidFill>
+                      <a:prstDash val="solid"/>
+                      <a:round/>
+                      <a:headEnd type="none" w="med" len="med"/>
+                      <a:tailEnd type="none" w="med" len="med"/>
+                    </a:lnT>
+                    <a:lnB w="19050" cap="flat" cmpd="sng" algn="ctr">
+                      <a:solidFill>
+                        <a:srgbClr val="002060"/>
+                      </a:solidFill>
+                      <a:prstDash val="solid"/>
+                      <a:round/>
+                      <a:headEnd type="none" w="med" len="med"/>
+                      <a:tailEnd type="none" w="med" len="med"/>
+                    </a:lnB>
+                    <a:solidFill>
+                      <a:schemeClr val="bg1">
+                        <a:lumMod val="75000"/>
+                      </a:schemeClr>
+                    </a:solidFill>
+                  </a:tcPr>
+                </a:tc>
+                <a:tc>
+                  <a:txBody>
+                    <a:bodyPr/>
+                    <a:lstStyle/>
+                    <a:p>
+                      <a:pPr algn="l" fontAlgn="t"/>
+                      <a:r>
+                        <a:rPr lang="en-US" sz="1200" b="0" i="0" u="none" strike="noStrike" smtClean="0">
+                          <a:solidFill>
+                            <a:srgbClr val="002060"/>
+                          </a:solidFill>
+                          <a:effectLst/>
+                          <a:latin typeface="Intel Clear" panose="020B0604020203020204" pitchFamily="34" charset="0"/>
+                          <a:ea typeface="Intel Clear" panose="020B0604020203020204" pitchFamily="34" charset="0"/>
+                          <a:cs typeface="Intel Clear" panose="020B0604020203020204" pitchFamily="34" charset="0"/>
+                        </a:rPr>
+                        <a:t> </a:t>
+                      </a:r>
+                      <a:endParaRPr lang="en-US" sz="1200" b="0" i="0" u="none" strike="noStrike" dirty="0">
+                        <a:solidFill>
+                          <a:srgbClr val="002060"/>
+                        </a:solidFill>
+                        <a:effectLst/>
+                        <a:latin typeface="Intel Clear" panose="020B0604020203020204" pitchFamily="34" charset="0"/>
+                        <a:ea typeface="Intel Clear" panose="020B0604020203020204" pitchFamily="34" charset="0"/>
+                        <a:cs typeface="Intel Clear" panose="020B0604020203020204" pitchFamily="34" charset="0"/>
+                      </a:endParaRPr>
+                    </a:p>
+                  </a:txBody>
+                  <a:tcPr marL="45720" marR="45720" marT="27432" marB="27432" anchor="ctr">
+                    <a:lnL w="19050" cap="flat" cmpd="sng" algn="ctr">
+                      <a:solidFill>
+                        <a:srgbClr val="002060"/>
+                      </a:solidFill>
+                      <a:prstDash val="solid"/>
+                      <a:round/>
+                      <a:headEnd type="none" w="med" len="med"/>
+                      <a:tailEnd type="none" w="med" len="med"/>
+                    </a:lnL>
+                    <a:lnR w="19050" cap="flat" cmpd="sng" algn="ctr">
+                      <a:solidFill>
+                        <a:srgbClr val="002060"/>
+                      </a:solidFill>
+                      <a:prstDash val="solid"/>
+                      <a:round/>
+                      <a:headEnd type="none" w="med" len="med"/>
+                      <a:tailEnd type="none" w="med" len="med"/>
+                    </a:lnR>
+                    <a:lnT w="19050" cap="flat" cmpd="sng" algn="ctr">
+                      <a:solidFill>
+                        <a:srgbClr val="002060"/>
+                      </a:solidFill>
+                      <a:prstDash val="solid"/>
+                      <a:round/>
+                      <a:headEnd type="none" w="med" len="med"/>
+                      <a:tailEnd type="none" w="med" len="med"/>
+                    </a:lnT>
+                    <a:lnB w="19050" cap="flat" cmpd="sng" algn="ctr">
+                      <a:solidFill>
+                        <a:srgbClr val="002060"/>
+                      </a:solidFill>
+                      <a:prstDash val="solid"/>
+                      <a:round/>
+                      <a:headEnd type="none" w="med" len="med"/>
+                      <a:tailEnd type="none" w="med" len="med"/>
+                    </a:lnB>
+                    <a:solidFill>
+                      <a:schemeClr val="bg1">
+                        <a:lumMod val="75000"/>
+                      </a:schemeClr>
+                    </a:solidFill>
+                  </a:tcPr>
+                </a:tc>
                 <a:extLst>
                   <a:ext uri="{0D108BD9-81ED-4DB2-BD59-A6C34878D82A}">
                     <a16:rowId xmlns:a16="http://schemas.microsoft.com/office/drawing/2014/main" val="26492286"/>
@@ -4308,6 +4944,225 @@
                     </a:lnB>
                     <a:solidFill>
                       <a:srgbClr val="BFBFBF"/>
+                    </a:solidFill>
+                  </a:tcPr>
+                </a:tc>
+                <a:tc>
+                  <a:txBody>
+                    <a:bodyPr/>
+                    <a:lstStyle/>
+                    <a:p>
+                      <a:pPr algn="l" fontAlgn="t"/>
+                      <a:r>
+                        <a:rPr lang="en-US" sz="1200" b="0" i="0" u="none" strike="noStrike" smtClean="0">
+                          <a:solidFill>
+                            <a:srgbClr val="002060"/>
+                          </a:solidFill>
+                          <a:effectLst/>
+                          <a:latin typeface="Intel Clear" panose="020B0604020203020204" pitchFamily="34" charset="0"/>
+                          <a:ea typeface="Intel Clear" panose="020B0604020203020204" pitchFamily="34" charset="0"/>
+                          <a:cs typeface="Intel Clear" panose="020B0604020203020204" pitchFamily="34" charset="0"/>
+                        </a:rPr>
+                        <a:t> </a:t>
+                      </a:r>
+                      <a:endParaRPr lang="en-US" sz="1200" b="0" i="0" u="none" strike="noStrike" dirty="0">
+                        <a:solidFill>
+                          <a:srgbClr val="002060"/>
+                        </a:solidFill>
+                        <a:effectLst/>
+                        <a:latin typeface="Intel Clear" panose="020B0604020203020204" pitchFamily="34" charset="0"/>
+                        <a:ea typeface="Intel Clear" panose="020B0604020203020204" pitchFamily="34" charset="0"/>
+                        <a:cs typeface="Intel Clear" panose="020B0604020203020204" pitchFamily="34" charset="0"/>
+                      </a:endParaRPr>
+                    </a:p>
+                  </a:txBody>
+                  <a:tcPr marL="45720" marR="45720" marT="27432" marB="27432" anchor="ctr">
+                    <a:lnL w="19050" cap="flat" cmpd="sng" algn="ctr">
+                      <a:solidFill>
+                        <a:srgbClr val="002060"/>
+                      </a:solidFill>
+                      <a:prstDash val="solid"/>
+                      <a:round/>
+                      <a:headEnd type="none" w="med" len="med"/>
+                      <a:tailEnd type="none" w="med" len="med"/>
+                    </a:lnL>
+                    <a:lnR w="19050" cap="flat" cmpd="sng" algn="ctr">
+                      <a:solidFill>
+                        <a:srgbClr val="002060"/>
+                      </a:solidFill>
+                      <a:prstDash val="solid"/>
+                      <a:round/>
+                      <a:headEnd type="none" w="med" len="med"/>
+                      <a:tailEnd type="none" w="med" len="med"/>
+                    </a:lnR>
+                    <a:lnT w="19050" cap="flat" cmpd="sng" algn="ctr">
+                      <a:solidFill>
+                        <a:srgbClr val="002060"/>
+                      </a:solidFill>
+                      <a:prstDash val="solid"/>
+                      <a:round/>
+                      <a:headEnd type="none" w="med" len="med"/>
+                      <a:tailEnd type="none" w="med" len="med"/>
+                    </a:lnT>
+                    <a:lnB w="19050" cap="flat" cmpd="sng" algn="ctr">
+                      <a:solidFill>
+                        <a:srgbClr val="002060"/>
+                      </a:solidFill>
+                      <a:prstDash val="solid"/>
+                      <a:round/>
+                      <a:headEnd type="none" w="med" len="med"/>
+                      <a:tailEnd type="none" w="med" len="med"/>
+                    </a:lnB>
+                    <a:solidFill>
+                      <a:schemeClr val="bg1">
+                        <a:lumMod val="75000"/>
+                      </a:schemeClr>
+                    </a:solidFill>
+                  </a:tcPr>
+                </a:tc>
+                <a:tc>
+                  <a:txBody>
+                    <a:bodyPr/>
+                    <a:lstStyle/>
+                    <a:p>
+                      <a:pPr algn="l" fontAlgn="t"/>
+                      <a:r>
+                        <a:rPr lang="en-US" sz="1200" b="0" i="0" u="none" strike="noStrike" smtClean="0">
+                          <a:solidFill>
+                            <a:srgbClr val="002060"/>
+                          </a:solidFill>
+                          <a:effectLst/>
+                          <a:latin typeface="Intel Clear" panose="020B0604020203020204" pitchFamily="34" charset="0"/>
+                          <a:ea typeface="Intel Clear" panose="020B0604020203020204" pitchFamily="34" charset="0"/>
+                          <a:cs typeface="Intel Clear" panose="020B0604020203020204" pitchFamily="34" charset="0"/>
+                        </a:rPr>
+                        <a:t> </a:t>
+                      </a:r>
+                      <a:endParaRPr lang="en-US" sz="1200" b="0" i="0" u="none" strike="noStrike" dirty="0">
+                        <a:solidFill>
+                          <a:srgbClr val="002060"/>
+                        </a:solidFill>
+                        <a:effectLst/>
+                        <a:latin typeface="Intel Clear" panose="020B0604020203020204" pitchFamily="34" charset="0"/>
+                        <a:ea typeface="Intel Clear" panose="020B0604020203020204" pitchFamily="34" charset="0"/>
+                        <a:cs typeface="Intel Clear" panose="020B0604020203020204" pitchFamily="34" charset="0"/>
+                      </a:endParaRPr>
+                    </a:p>
+                  </a:txBody>
+                  <a:tcPr marL="45720" marR="45720" marT="27432" marB="27432" anchor="ctr">
+                    <a:lnL w="19050" cap="flat" cmpd="sng" algn="ctr">
+                      <a:solidFill>
+                        <a:srgbClr val="002060"/>
+                      </a:solidFill>
+                      <a:prstDash val="solid"/>
+                      <a:round/>
+                      <a:headEnd type="none" w="med" len="med"/>
+                      <a:tailEnd type="none" w="med" len="med"/>
+                    </a:lnL>
+                    <a:lnR w="19050" cap="flat" cmpd="sng" algn="ctr">
+                      <a:solidFill>
+                        <a:srgbClr val="002060"/>
+                      </a:solidFill>
+                      <a:prstDash val="solid"/>
+                      <a:round/>
+                      <a:headEnd type="none" w="med" len="med"/>
+                      <a:tailEnd type="none" w="med" len="med"/>
+                    </a:lnR>
+                    <a:lnT w="19050" cap="flat" cmpd="sng" algn="ctr">
+                      <a:solidFill>
+                        <a:srgbClr val="002060"/>
+                      </a:solidFill>
+                      <a:prstDash val="solid"/>
+                      <a:round/>
+                      <a:headEnd type="none" w="med" len="med"/>
+                      <a:tailEnd type="none" w="med" len="med"/>
+                    </a:lnT>
+                    <a:lnB w="19050" cap="flat" cmpd="sng" algn="ctr">
+                      <a:solidFill>
+                        <a:srgbClr val="002060"/>
+                      </a:solidFill>
+                      <a:prstDash val="solid"/>
+                      <a:round/>
+                      <a:headEnd type="none" w="med" len="med"/>
+                      <a:tailEnd type="none" w="med" len="med"/>
+                    </a:lnB>
+                    <a:solidFill>
+                      <a:schemeClr val="bg1">
+                        <a:lumMod val="75000"/>
+                      </a:schemeClr>
+                    </a:solidFill>
+                  </a:tcPr>
+                </a:tc>
+                <a:tc>
+                  <a:txBody>
+                    <a:bodyPr/>
+                    <a:lstStyle/>
+                    <a:p>
+                      <a:pPr algn="l" fontAlgn="t"/>
+                      <a:r>
+                        <a:rPr lang="en-US" sz="1200" b="0" i="0" u="none" strike="noStrike" smtClean="0">
+                          <a:solidFill>
+                            <a:srgbClr val="002060"/>
+                          </a:solidFill>
+                          <a:effectLst/>
+                          <a:latin typeface="Intel Clear" panose="020B0604020203020204" pitchFamily="34" charset="0"/>
+                          <a:ea typeface="Intel Clear" panose="020B0604020203020204" pitchFamily="34" charset="0"/>
+                          <a:cs typeface="Intel Clear" panose="020B0604020203020204" pitchFamily="34" charset="0"/>
+                        </a:rPr>
+                        <a:t> </a:t>
+                      </a:r>
+                      <a:endParaRPr lang="en-US" sz="1200" b="0" i="0" u="none" strike="noStrike" dirty="0">
+                        <a:solidFill>
+                          <a:srgbClr val="002060"/>
+                        </a:solidFill>
+                        <a:effectLst/>
+                        <a:latin typeface="Intel Clear" panose="020B0604020203020204" pitchFamily="34" charset="0"/>
+                        <a:ea typeface="Intel Clear" panose="020B0604020203020204" pitchFamily="34" charset="0"/>
+                        <a:cs typeface="Intel Clear" panose="020B0604020203020204" pitchFamily="34" charset="0"/>
+                      </a:endParaRPr>
+                    </a:p>
+                  </a:txBody>
+                  <a:tcPr marL="45720" marR="45720" marT="27432" marB="27432" anchor="ctr">
+                    <a:lnL w="19050" cap="flat" cmpd="sng" algn="ctr">
+                      <a:solidFill>
+                        <a:srgbClr val="002060"/>
+                      </a:solidFill>
+                      <a:prstDash val="solid"/>
+                      <a:round/>
+                      <a:headEnd type="none" w="med" len="med"/>
+                      <a:tailEnd type="none" w="med" len="med"/>
+                    </a:lnL>
+                    <a:lnR w="19050" cap="flat" cmpd="sng" algn="ctr">
+                      <a:solidFill>
+                        <a:srgbClr val="002060"/>
+                      </a:solidFill>
+                      <a:prstDash val="solid"/>
+                      <a:round/>
+                      <a:headEnd type="none" w="med" len="med"/>
+                      <a:tailEnd type="none" w="med" len="med"/>
+                    </a:lnR>
+                    <a:lnT w="19050" cap="flat" cmpd="sng" algn="ctr">
+                      <a:solidFill>
+                        <a:srgbClr val="002060"/>
+                      </a:solidFill>
+                      <a:prstDash val="solid"/>
+                      <a:round/>
+                      <a:headEnd type="none" w="med" len="med"/>
+                      <a:tailEnd type="none" w="med" len="med"/>
+                    </a:lnT>
+                    <a:lnB w="19050" cap="flat" cmpd="sng" algn="ctr">
+                      <a:solidFill>
+                        <a:srgbClr val="002060"/>
+                      </a:solidFill>
+                      <a:prstDash val="solid"/>
+                      <a:round/>
+                      <a:headEnd type="none" w="med" len="med"/>
+                      <a:tailEnd type="none" w="med" len="med"/>
+                    </a:lnB>
+                    <a:solidFill>
+                      <a:schemeClr val="bg1">
+                        <a:lumMod val="75000"/>
+                      </a:schemeClr>
                     </a:solidFill>
                   </a:tcPr>
                 </a:tc>
@@ -4535,6 +5390,225 @@
                     </a:solidFill>
                   </a:tcPr>
                 </a:tc>
+                <a:tc>
+                  <a:txBody>
+                    <a:bodyPr/>
+                    <a:lstStyle/>
+                    <a:p>
+                      <a:pPr algn="l" fontAlgn="t"/>
+                      <a:r>
+                        <a:rPr lang="en-US" sz="1200" b="0" i="0" u="none" strike="noStrike" smtClean="0">
+                          <a:solidFill>
+                            <a:srgbClr val="002060"/>
+                          </a:solidFill>
+                          <a:effectLst/>
+                          <a:latin typeface="Intel Clear" panose="020B0604020203020204" pitchFamily="34" charset="0"/>
+                          <a:ea typeface="Intel Clear" panose="020B0604020203020204" pitchFamily="34" charset="0"/>
+                          <a:cs typeface="Intel Clear" panose="020B0604020203020204" pitchFamily="34" charset="0"/>
+                        </a:rPr>
+                        <a:t> </a:t>
+                      </a:r>
+                      <a:endParaRPr lang="en-US" sz="1200" b="0" i="0" u="none" strike="noStrike" dirty="0">
+                        <a:solidFill>
+                          <a:srgbClr val="002060"/>
+                        </a:solidFill>
+                        <a:effectLst/>
+                        <a:latin typeface="Intel Clear" panose="020B0604020203020204" pitchFamily="34" charset="0"/>
+                        <a:ea typeface="Intel Clear" panose="020B0604020203020204" pitchFamily="34" charset="0"/>
+                        <a:cs typeface="Intel Clear" panose="020B0604020203020204" pitchFamily="34" charset="0"/>
+                      </a:endParaRPr>
+                    </a:p>
+                  </a:txBody>
+                  <a:tcPr marL="45720" marR="45720" marT="27432" marB="27432" anchor="ctr">
+                    <a:lnL w="19050" cap="flat" cmpd="sng" algn="ctr">
+                      <a:solidFill>
+                        <a:srgbClr val="002060"/>
+                      </a:solidFill>
+                      <a:prstDash val="solid"/>
+                      <a:round/>
+                      <a:headEnd type="none" w="med" len="med"/>
+                      <a:tailEnd type="none" w="med" len="med"/>
+                    </a:lnL>
+                    <a:lnR w="19050" cap="flat" cmpd="sng" algn="ctr">
+                      <a:solidFill>
+                        <a:srgbClr val="002060"/>
+                      </a:solidFill>
+                      <a:prstDash val="solid"/>
+                      <a:round/>
+                      <a:headEnd type="none" w="med" len="med"/>
+                      <a:tailEnd type="none" w="med" len="med"/>
+                    </a:lnR>
+                    <a:lnT w="19050" cap="flat" cmpd="sng" algn="ctr">
+                      <a:solidFill>
+                        <a:srgbClr val="002060"/>
+                      </a:solidFill>
+                      <a:prstDash val="solid"/>
+                      <a:round/>
+                      <a:headEnd type="none" w="med" len="med"/>
+                      <a:tailEnd type="none" w="med" len="med"/>
+                    </a:lnT>
+                    <a:lnB w="19050" cap="flat" cmpd="sng" algn="ctr">
+                      <a:solidFill>
+                        <a:srgbClr val="002060"/>
+                      </a:solidFill>
+                      <a:prstDash val="solid"/>
+                      <a:round/>
+                      <a:headEnd type="none" w="med" len="med"/>
+                      <a:tailEnd type="none" w="med" len="med"/>
+                    </a:lnB>
+                    <a:solidFill>
+                      <a:schemeClr val="bg1">
+                        <a:lumMod val="75000"/>
+                      </a:schemeClr>
+                    </a:solidFill>
+                  </a:tcPr>
+                </a:tc>
+                <a:tc>
+                  <a:txBody>
+                    <a:bodyPr/>
+                    <a:lstStyle/>
+                    <a:p>
+                      <a:pPr algn="l" fontAlgn="t"/>
+                      <a:r>
+                        <a:rPr lang="en-US" sz="1200" b="0" i="0" u="none" strike="noStrike" smtClean="0">
+                          <a:solidFill>
+                            <a:srgbClr val="002060"/>
+                          </a:solidFill>
+                          <a:effectLst/>
+                          <a:latin typeface="Intel Clear" panose="020B0604020203020204" pitchFamily="34" charset="0"/>
+                          <a:ea typeface="Intel Clear" panose="020B0604020203020204" pitchFamily="34" charset="0"/>
+                          <a:cs typeface="Intel Clear" panose="020B0604020203020204" pitchFamily="34" charset="0"/>
+                        </a:rPr>
+                        <a:t> </a:t>
+                      </a:r>
+                      <a:endParaRPr lang="en-US" sz="1200" b="0" i="0" u="none" strike="noStrike" dirty="0">
+                        <a:solidFill>
+                          <a:srgbClr val="002060"/>
+                        </a:solidFill>
+                        <a:effectLst/>
+                        <a:latin typeface="Intel Clear" panose="020B0604020203020204" pitchFamily="34" charset="0"/>
+                        <a:ea typeface="Intel Clear" panose="020B0604020203020204" pitchFamily="34" charset="0"/>
+                        <a:cs typeface="Intel Clear" panose="020B0604020203020204" pitchFamily="34" charset="0"/>
+                      </a:endParaRPr>
+                    </a:p>
+                  </a:txBody>
+                  <a:tcPr marL="45720" marR="45720" marT="27432" marB="27432" anchor="ctr">
+                    <a:lnL w="19050" cap="flat" cmpd="sng" algn="ctr">
+                      <a:solidFill>
+                        <a:srgbClr val="002060"/>
+                      </a:solidFill>
+                      <a:prstDash val="solid"/>
+                      <a:round/>
+                      <a:headEnd type="none" w="med" len="med"/>
+                      <a:tailEnd type="none" w="med" len="med"/>
+                    </a:lnL>
+                    <a:lnR w="19050" cap="flat" cmpd="sng" algn="ctr">
+                      <a:solidFill>
+                        <a:srgbClr val="002060"/>
+                      </a:solidFill>
+                      <a:prstDash val="solid"/>
+                      <a:round/>
+                      <a:headEnd type="none" w="med" len="med"/>
+                      <a:tailEnd type="none" w="med" len="med"/>
+                    </a:lnR>
+                    <a:lnT w="19050" cap="flat" cmpd="sng" algn="ctr">
+                      <a:solidFill>
+                        <a:srgbClr val="002060"/>
+                      </a:solidFill>
+                      <a:prstDash val="solid"/>
+                      <a:round/>
+                      <a:headEnd type="none" w="med" len="med"/>
+                      <a:tailEnd type="none" w="med" len="med"/>
+                    </a:lnT>
+                    <a:lnB w="19050" cap="flat" cmpd="sng" algn="ctr">
+                      <a:solidFill>
+                        <a:srgbClr val="002060"/>
+                      </a:solidFill>
+                      <a:prstDash val="solid"/>
+                      <a:round/>
+                      <a:headEnd type="none" w="med" len="med"/>
+                      <a:tailEnd type="none" w="med" len="med"/>
+                    </a:lnB>
+                    <a:solidFill>
+                      <a:schemeClr val="bg1">
+                        <a:lumMod val="75000"/>
+                      </a:schemeClr>
+                    </a:solidFill>
+                  </a:tcPr>
+                </a:tc>
+                <a:tc>
+                  <a:txBody>
+                    <a:bodyPr/>
+                    <a:lstStyle/>
+                    <a:p>
+                      <a:pPr algn="l" fontAlgn="t"/>
+                      <a:r>
+                        <a:rPr lang="en-US" sz="1200" b="0" i="0" u="none" strike="noStrike" smtClean="0">
+                          <a:solidFill>
+                            <a:srgbClr val="002060"/>
+                          </a:solidFill>
+                          <a:effectLst/>
+                          <a:latin typeface="Intel Clear" panose="020B0604020203020204" pitchFamily="34" charset="0"/>
+                          <a:ea typeface="Intel Clear" panose="020B0604020203020204" pitchFamily="34" charset="0"/>
+                          <a:cs typeface="Intel Clear" panose="020B0604020203020204" pitchFamily="34" charset="0"/>
+                        </a:rPr>
+                        <a:t> </a:t>
+                      </a:r>
+                      <a:endParaRPr lang="en-US" sz="1200" b="0" i="0" u="none" strike="noStrike" dirty="0">
+                        <a:solidFill>
+                          <a:srgbClr val="002060"/>
+                        </a:solidFill>
+                        <a:effectLst/>
+                        <a:latin typeface="Intel Clear" panose="020B0604020203020204" pitchFamily="34" charset="0"/>
+                        <a:ea typeface="Intel Clear" panose="020B0604020203020204" pitchFamily="34" charset="0"/>
+                        <a:cs typeface="Intel Clear" panose="020B0604020203020204" pitchFamily="34" charset="0"/>
+                      </a:endParaRPr>
+                    </a:p>
+                  </a:txBody>
+                  <a:tcPr marL="45720" marR="45720" marT="27432" marB="27432" anchor="ctr">
+                    <a:lnL w="19050" cap="flat" cmpd="sng" algn="ctr">
+                      <a:solidFill>
+                        <a:srgbClr val="002060"/>
+                      </a:solidFill>
+                      <a:prstDash val="solid"/>
+                      <a:round/>
+                      <a:headEnd type="none" w="med" len="med"/>
+                      <a:tailEnd type="none" w="med" len="med"/>
+                    </a:lnL>
+                    <a:lnR w="19050" cap="flat" cmpd="sng" algn="ctr">
+                      <a:solidFill>
+                        <a:srgbClr val="002060"/>
+                      </a:solidFill>
+                      <a:prstDash val="solid"/>
+                      <a:round/>
+                      <a:headEnd type="none" w="med" len="med"/>
+                      <a:tailEnd type="none" w="med" len="med"/>
+                    </a:lnR>
+                    <a:lnT w="19050" cap="flat" cmpd="sng" algn="ctr">
+                      <a:solidFill>
+                        <a:srgbClr val="002060"/>
+                      </a:solidFill>
+                      <a:prstDash val="solid"/>
+                      <a:round/>
+                      <a:headEnd type="none" w="med" len="med"/>
+                      <a:tailEnd type="none" w="med" len="med"/>
+                    </a:lnT>
+                    <a:lnB w="19050" cap="flat" cmpd="sng" algn="ctr">
+                      <a:solidFill>
+                        <a:srgbClr val="002060"/>
+                      </a:solidFill>
+                      <a:prstDash val="solid"/>
+                      <a:round/>
+                      <a:headEnd type="none" w="med" len="med"/>
+                      <a:tailEnd type="none" w="med" len="med"/>
+                    </a:lnB>
+                    <a:solidFill>
+                      <a:schemeClr val="bg1">
+                        <a:lumMod val="75000"/>
+                      </a:schemeClr>
+                    </a:solidFill>
+                  </a:tcPr>
+                </a:tc>
                 <a:extLst>
                   <a:ext uri="{0D108BD9-81ED-4DB2-BD59-A6C34878D82A}">
                     <a16:rowId xmlns:a16="http://schemas.microsoft.com/office/drawing/2014/main" val="1902056831"/>
@@ -4610,6 +5684,225 @@
                     </a:lnB>
                     <a:solidFill>
                       <a:srgbClr val="BFBFBF"/>
+                    </a:solidFill>
+                  </a:tcPr>
+                </a:tc>
+                <a:tc>
+                  <a:txBody>
+                    <a:bodyPr/>
+                    <a:lstStyle/>
+                    <a:p>
+                      <a:pPr algn="l" fontAlgn="t"/>
+                      <a:r>
+                        <a:rPr lang="en-US" sz="1200" b="0" i="0" u="none" strike="noStrike" smtClean="0">
+                          <a:solidFill>
+                            <a:srgbClr val="002060"/>
+                          </a:solidFill>
+                          <a:effectLst/>
+                          <a:latin typeface="Intel Clear" panose="020B0604020203020204" pitchFamily="34" charset="0"/>
+                          <a:ea typeface="Intel Clear" panose="020B0604020203020204" pitchFamily="34" charset="0"/>
+                          <a:cs typeface="Intel Clear" panose="020B0604020203020204" pitchFamily="34" charset="0"/>
+                        </a:rPr>
+                        <a:t> </a:t>
+                      </a:r>
+                      <a:endParaRPr lang="en-US" sz="1200" b="0" i="0" u="none" strike="noStrike" dirty="0">
+                        <a:solidFill>
+                          <a:srgbClr val="002060"/>
+                        </a:solidFill>
+                        <a:effectLst/>
+                        <a:latin typeface="Intel Clear" panose="020B0604020203020204" pitchFamily="34" charset="0"/>
+                        <a:ea typeface="Intel Clear" panose="020B0604020203020204" pitchFamily="34" charset="0"/>
+                        <a:cs typeface="Intel Clear" panose="020B0604020203020204" pitchFamily="34" charset="0"/>
+                      </a:endParaRPr>
+                    </a:p>
+                  </a:txBody>
+                  <a:tcPr marL="45720" marR="45720" marT="27432" marB="27432" anchor="ctr">
+                    <a:lnL w="19050" cap="flat" cmpd="sng" algn="ctr">
+                      <a:solidFill>
+                        <a:srgbClr val="002060"/>
+                      </a:solidFill>
+                      <a:prstDash val="solid"/>
+                      <a:round/>
+                      <a:headEnd type="none" w="med" len="med"/>
+                      <a:tailEnd type="none" w="med" len="med"/>
+                    </a:lnL>
+                    <a:lnR w="19050" cap="flat" cmpd="sng" algn="ctr">
+                      <a:solidFill>
+                        <a:srgbClr val="002060"/>
+                      </a:solidFill>
+                      <a:prstDash val="solid"/>
+                      <a:round/>
+                      <a:headEnd type="none" w="med" len="med"/>
+                      <a:tailEnd type="none" w="med" len="med"/>
+                    </a:lnR>
+                    <a:lnT w="19050" cap="flat" cmpd="sng" algn="ctr">
+                      <a:solidFill>
+                        <a:srgbClr val="002060"/>
+                      </a:solidFill>
+                      <a:prstDash val="solid"/>
+                      <a:round/>
+                      <a:headEnd type="none" w="med" len="med"/>
+                      <a:tailEnd type="none" w="med" len="med"/>
+                    </a:lnT>
+                    <a:lnB w="19050" cap="flat" cmpd="sng" algn="ctr">
+                      <a:solidFill>
+                        <a:srgbClr val="002060"/>
+                      </a:solidFill>
+                      <a:prstDash val="solid"/>
+                      <a:round/>
+                      <a:headEnd type="none" w="med" len="med"/>
+                      <a:tailEnd type="none" w="med" len="med"/>
+                    </a:lnB>
+                    <a:solidFill>
+                      <a:schemeClr val="bg1">
+                        <a:lumMod val="75000"/>
+                      </a:schemeClr>
+                    </a:solidFill>
+                  </a:tcPr>
+                </a:tc>
+                <a:tc>
+                  <a:txBody>
+                    <a:bodyPr/>
+                    <a:lstStyle/>
+                    <a:p>
+                      <a:pPr algn="l" fontAlgn="t"/>
+                      <a:r>
+                        <a:rPr lang="en-US" sz="1200" b="0" i="0" u="none" strike="noStrike" smtClean="0">
+                          <a:solidFill>
+                            <a:srgbClr val="002060"/>
+                          </a:solidFill>
+                          <a:effectLst/>
+                          <a:latin typeface="Intel Clear" panose="020B0604020203020204" pitchFamily="34" charset="0"/>
+                          <a:ea typeface="Intel Clear" panose="020B0604020203020204" pitchFamily="34" charset="0"/>
+                          <a:cs typeface="Intel Clear" panose="020B0604020203020204" pitchFamily="34" charset="0"/>
+                        </a:rPr>
+                        <a:t> </a:t>
+                      </a:r>
+                      <a:endParaRPr lang="en-US" sz="1200" b="0" i="0" u="none" strike="noStrike" dirty="0">
+                        <a:solidFill>
+                          <a:srgbClr val="002060"/>
+                        </a:solidFill>
+                        <a:effectLst/>
+                        <a:latin typeface="Intel Clear" panose="020B0604020203020204" pitchFamily="34" charset="0"/>
+                        <a:ea typeface="Intel Clear" panose="020B0604020203020204" pitchFamily="34" charset="0"/>
+                        <a:cs typeface="Intel Clear" panose="020B0604020203020204" pitchFamily="34" charset="0"/>
+                      </a:endParaRPr>
+                    </a:p>
+                  </a:txBody>
+                  <a:tcPr marL="45720" marR="45720" marT="27432" marB="27432" anchor="ctr">
+                    <a:lnL w="19050" cap="flat" cmpd="sng" algn="ctr">
+                      <a:solidFill>
+                        <a:srgbClr val="002060"/>
+                      </a:solidFill>
+                      <a:prstDash val="solid"/>
+                      <a:round/>
+                      <a:headEnd type="none" w="med" len="med"/>
+                      <a:tailEnd type="none" w="med" len="med"/>
+                    </a:lnL>
+                    <a:lnR w="19050" cap="flat" cmpd="sng" algn="ctr">
+                      <a:solidFill>
+                        <a:srgbClr val="002060"/>
+                      </a:solidFill>
+                      <a:prstDash val="solid"/>
+                      <a:round/>
+                      <a:headEnd type="none" w="med" len="med"/>
+                      <a:tailEnd type="none" w="med" len="med"/>
+                    </a:lnR>
+                    <a:lnT w="19050" cap="flat" cmpd="sng" algn="ctr">
+                      <a:solidFill>
+                        <a:srgbClr val="002060"/>
+                      </a:solidFill>
+                      <a:prstDash val="solid"/>
+                      <a:round/>
+                      <a:headEnd type="none" w="med" len="med"/>
+                      <a:tailEnd type="none" w="med" len="med"/>
+                    </a:lnT>
+                    <a:lnB w="19050" cap="flat" cmpd="sng" algn="ctr">
+                      <a:solidFill>
+                        <a:srgbClr val="002060"/>
+                      </a:solidFill>
+                      <a:prstDash val="solid"/>
+                      <a:round/>
+                      <a:headEnd type="none" w="med" len="med"/>
+                      <a:tailEnd type="none" w="med" len="med"/>
+                    </a:lnB>
+                    <a:solidFill>
+                      <a:schemeClr val="bg1">
+                        <a:lumMod val="75000"/>
+                      </a:schemeClr>
+                    </a:solidFill>
+                  </a:tcPr>
+                </a:tc>
+                <a:tc>
+                  <a:txBody>
+                    <a:bodyPr/>
+                    <a:lstStyle/>
+                    <a:p>
+                      <a:pPr algn="l" fontAlgn="t"/>
+                      <a:r>
+                        <a:rPr lang="en-US" sz="1200" b="0" i="0" u="none" strike="noStrike" smtClean="0">
+                          <a:solidFill>
+                            <a:srgbClr val="002060"/>
+                          </a:solidFill>
+                          <a:effectLst/>
+                          <a:latin typeface="Intel Clear" panose="020B0604020203020204" pitchFamily="34" charset="0"/>
+                          <a:ea typeface="Intel Clear" panose="020B0604020203020204" pitchFamily="34" charset="0"/>
+                          <a:cs typeface="Intel Clear" panose="020B0604020203020204" pitchFamily="34" charset="0"/>
+                        </a:rPr>
+                        <a:t> </a:t>
+                      </a:r>
+                      <a:endParaRPr lang="en-US" sz="1200" b="0" i="0" u="none" strike="noStrike" dirty="0">
+                        <a:solidFill>
+                          <a:srgbClr val="002060"/>
+                        </a:solidFill>
+                        <a:effectLst/>
+                        <a:latin typeface="Intel Clear" panose="020B0604020203020204" pitchFamily="34" charset="0"/>
+                        <a:ea typeface="Intel Clear" panose="020B0604020203020204" pitchFamily="34" charset="0"/>
+                        <a:cs typeface="Intel Clear" panose="020B0604020203020204" pitchFamily="34" charset="0"/>
+                      </a:endParaRPr>
+                    </a:p>
+                  </a:txBody>
+                  <a:tcPr marL="45720" marR="45720" marT="27432" marB="27432" anchor="ctr">
+                    <a:lnL w="19050" cap="flat" cmpd="sng" algn="ctr">
+                      <a:solidFill>
+                        <a:srgbClr val="002060"/>
+                      </a:solidFill>
+                      <a:prstDash val="solid"/>
+                      <a:round/>
+                      <a:headEnd type="none" w="med" len="med"/>
+                      <a:tailEnd type="none" w="med" len="med"/>
+                    </a:lnL>
+                    <a:lnR w="19050" cap="flat" cmpd="sng" algn="ctr">
+                      <a:solidFill>
+                        <a:srgbClr val="002060"/>
+                      </a:solidFill>
+                      <a:prstDash val="solid"/>
+                      <a:round/>
+                      <a:headEnd type="none" w="med" len="med"/>
+                      <a:tailEnd type="none" w="med" len="med"/>
+                    </a:lnR>
+                    <a:lnT w="19050" cap="flat" cmpd="sng" algn="ctr">
+                      <a:solidFill>
+                        <a:srgbClr val="002060"/>
+                      </a:solidFill>
+                      <a:prstDash val="solid"/>
+                      <a:round/>
+                      <a:headEnd type="none" w="med" len="med"/>
+                      <a:tailEnd type="none" w="med" len="med"/>
+                    </a:lnT>
+                    <a:lnB w="19050" cap="flat" cmpd="sng" algn="ctr">
+                      <a:solidFill>
+                        <a:srgbClr val="002060"/>
+                      </a:solidFill>
+                      <a:prstDash val="solid"/>
+                      <a:round/>
+                      <a:headEnd type="none" w="med" len="med"/>
+                      <a:tailEnd type="none" w="med" len="med"/>
+                    </a:lnB>
+                    <a:solidFill>
+                      <a:schemeClr val="bg1">
+                        <a:lumMod val="75000"/>
+                      </a:schemeClr>
                     </a:solidFill>
                   </a:tcPr>
                 </a:tc>
@@ -4837,6 +6130,225 @@
                     </a:solidFill>
                   </a:tcPr>
                 </a:tc>
+                <a:tc>
+                  <a:txBody>
+                    <a:bodyPr/>
+                    <a:lstStyle/>
+                    <a:p>
+                      <a:pPr algn="l" fontAlgn="t"/>
+                      <a:r>
+                        <a:rPr lang="en-US" sz="1200" b="0" i="0" u="none" strike="noStrike" smtClean="0">
+                          <a:solidFill>
+                            <a:srgbClr val="002060"/>
+                          </a:solidFill>
+                          <a:effectLst/>
+                          <a:latin typeface="Intel Clear" panose="020B0604020203020204" pitchFamily="34" charset="0"/>
+                          <a:ea typeface="Intel Clear" panose="020B0604020203020204" pitchFamily="34" charset="0"/>
+                          <a:cs typeface="Intel Clear" panose="020B0604020203020204" pitchFamily="34" charset="0"/>
+                        </a:rPr>
+                        <a:t> </a:t>
+                      </a:r>
+                      <a:endParaRPr lang="en-US" sz="1200" b="0" i="0" u="none" strike="noStrike" dirty="0">
+                        <a:solidFill>
+                          <a:srgbClr val="002060"/>
+                        </a:solidFill>
+                        <a:effectLst/>
+                        <a:latin typeface="Intel Clear" panose="020B0604020203020204" pitchFamily="34" charset="0"/>
+                        <a:ea typeface="Intel Clear" panose="020B0604020203020204" pitchFamily="34" charset="0"/>
+                        <a:cs typeface="Intel Clear" panose="020B0604020203020204" pitchFamily="34" charset="0"/>
+                      </a:endParaRPr>
+                    </a:p>
+                  </a:txBody>
+                  <a:tcPr marL="45720" marR="45720" marT="27432" marB="27432" anchor="ctr">
+                    <a:lnL w="19050" cap="flat" cmpd="sng" algn="ctr">
+                      <a:solidFill>
+                        <a:srgbClr val="002060"/>
+                      </a:solidFill>
+                      <a:prstDash val="solid"/>
+                      <a:round/>
+                      <a:headEnd type="none" w="med" len="med"/>
+                      <a:tailEnd type="none" w="med" len="med"/>
+                    </a:lnL>
+                    <a:lnR w="19050" cap="flat" cmpd="sng" algn="ctr">
+                      <a:solidFill>
+                        <a:srgbClr val="002060"/>
+                      </a:solidFill>
+                      <a:prstDash val="solid"/>
+                      <a:round/>
+                      <a:headEnd type="none" w="med" len="med"/>
+                      <a:tailEnd type="none" w="med" len="med"/>
+                    </a:lnR>
+                    <a:lnT w="19050" cap="flat" cmpd="sng" algn="ctr">
+                      <a:solidFill>
+                        <a:srgbClr val="002060"/>
+                      </a:solidFill>
+                      <a:prstDash val="solid"/>
+                      <a:round/>
+                      <a:headEnd type="none" w="med" len="med"/>
+                      <a:tailEnd type="none" w="med" len="med"/>
+                    </a:lnT>
+                    <a:lnB w="19050" cap="flat" cmpd="sng" algn="ctr">
+                      <a:solidFill>
+                        <a:srgbClr val="002060"/>
+                      </a:solidFill>
+                      <a:prstDash val="solid"/>
+                      <a:round/>
+                      <a:headEnd type="none" w="med" len="med"/>
+                      <a:tailEnd type="none" w="med" len="med"/>
+                    </a:lnB>
+                    <a:solidFill>
+                      <a:schemeClr val="bg1">
+                        <a:lumMod val="75000"/>
+                      </a:schemeClr>
+                    </a:solidFill>
+                  </a:tcPr>
+                </a:tc>
+                <a:tc>
+                  <a:txBody>
+                    <a:bodyPr/>
+                    <a:lstStyle/>
+                    <a:p>
+                      <a:pPr algn="l" fontAlgn="t"/>
+                      <a:r>
+                        <a:rPr lang="en-US" sz="1200" b="0" i="0" u="none" strike="noStrike" smtClean="0">
+                          <a:solidFill>
+                            <a:srgbClr val="002060"/>
+                          </a:solidFill>
+                          <a:effectLst/>
+                          <a:latin typeface="Intel Clear" panose="020B0604020203020204" pitchFamily="34" charset="0"/>
+                          <a:ea typeface="Intel Clear" panose="020B0604020203020204" pitchFamily="34" charset="0"/>
+                          <a:cs typeface="Intel Clear" panose="020B0604020203020204" pitchFamily="34" charset="0"/>
+                        </a:rPr>
+                        <a:t> </a:t>
+                      </a:r>
+                      <a:endParaRPr lang="en-US" sz="1200" b="0" i="0" u="none" strike="noStrike" dirty="0">
+                        <a:solidFill>
+                          <a:srgbClr val="002060"/>
+                        </a:solidFill>
+                        <a:effectLst/>
+                        <a:latin typeface="Intel Clear" panose="020B0604020203020204" pitchFamily="34" charset="0"/>
+                        <a:ea typeface="Intel Clear" panose="020B0604020203020204" pitchFamily="34" charset="0"/>
+                        <a:cs typeface="Intel Clear" panose="020B0604020203020204" pitchFamily="34" charset="0"/>
+                      </a:endParaRPr>
+                    </a:p>
+                  </a:txBody>
+                  <a:tcPr marL="45720" marR="45720" marT="27432" marB="27432" anchor="ctr">
+                    <a:lnL w="19050" cap="flat" cmpd="sng" algn="ctr">
+                      <a:solidFill>
+                        <a:srgbClr val="002060"/>
+                      </a:solidFill>
+                      <a:prstDash val="solid"/>
+                      <a:round/>
+                      <a:headEnd type="none" w="med" len="med"/>
+                      <a:tailEnd type="none" w="med" len="med"/>
+                    </a:lnL>
+                    <a:lnR w="19050" cap="flat" cmpd="sng" algn="ctr">
+                      <a:solidFill>
+                        <a:srgbClr val="002060"/>
+                      </a:solidFill>
+                      <a:prstDash val="solid"/>
+                      <a:round/>
+                      <a:headEnd type="none" w="med" len="med"/>
+                      <a:tailEnd type="none" w="med" len="med"/>
+                    </a:lnR>
+                    <a:lnT w="19050" cap="flat" cmpd="sng" algn="ctr">
+                      <a:solidFill>
+                        <a:srgbClr val="002060"/>
+                      </a:solidFill>
+                      <a:prstDash val="solid"/>
+                      <a:round/>
+                      <a:headEnd type="none" w="med" len="med"/>
+                      <a:tailEnd type="none" w="med" len="med"/>
+                    </a:lnT>
+                    <a:lnB w="19050" cap="flat" cmpd="sng" algn="ctr">
+                      <a:solidFill>
+                        <a:srgbClr val="002060"/>
+                      </a:solidFill>
+                      <a:prstDash val="solid"/>
+                      <a:round/>
+                      <a:headEnd type="none" w="med" len="med"/>
+                      <a:tailEnd type="none" w="med" len="med"/>
+                    </a:lnB>
+                    <a:solidFill>
+                      <a:schemeClr val="bg1">
+                        <a:lumMod val="75000"/>
+                      </a:schemeClr>
+                    </a:solidFill>
+                  </a:tcPr>
+                </a:tc>
+                <a:tc>
+                  <a:txBody>
+                    <a:bodyPr/>
+                    <a:lstStyle/>
+                    <a:p>
+                      <a:pPr algn="l" fontAlgn="t"/>
+                      <a:r>
+                        <a:rPr lang="en-US" sz="1200" b="0" i="0" u="none" strike="noStrike" smtClean="0">
+                          <a:solidFill>
+                            <a:srgbClr val="002060"/>
+                          </a:solidFill>
+                          <a:effectLst/>
+                          <a:latin typeface="Intel Clear" panose="020B0604020203020204" pitchFamily="34" charset="0"/>
+                          <a:ea typeface="Intel Clear" panose="020B0604020203020204" pitchFamily="34" charset="0"/>
+                          <a:cs typeface="Intel Clear" panose="020B0604020203020204" pitchFamily="34" charset="0"/>
+                        </a:rPr>
+                        <a:t> </a:t>
+                      </a:r>
+                      <a:endParaRPr lang="en-US" sz="1200" b="0" i="0" u="none" strike="noStrike" dirty="0">
+                        <a:solidFill>
+                          <a:srgbClr val="002060"/>
+                        </a:solidFill>
+                        <a:effectLst/>
+                        <a:latin typeface="Intel Clear" panose="020B0604020203020204" pitchFamily="34" charset="0"/>
+                        <a:ea typeface="Intel Clear" panose="020B0604020203020204" pitchFamily="34" charset="0"/>
+                        <a:cs typeface="Intel Clear" panose="020B0604020203020204" pitchFamily="34" charset="0"/>
+                      </a:endParaRPr>
+                    </a:p>
+                  </a:txBody>
+                  <a:tcPr marL="45720" marR="45720" marT="27432" marB="27432" anchor="ctr">
+                    <a:lnL w="19050" cap="flat" cmpd="sng" algn="ctr">
+                      <a:solidFill>
+                        <a:srgbClr val="002060"/>
+                      </a:solidFill>
+                      <a:prstDash val="solid"/>
+                      <a:round/>
+                      <a:headEnd type="none" w="med" len="med"/>
+                      <a:tailEnd type="none" w="med" len="med"/>
+                    </a:lnL>
+                    <a:lnR w="19050" cap="flat" cmpd="sng" algn="ctr">
+                      <a:solidFill>
+                        <a:srgbClr val="002060"/>
+                      </a:solidFill>
+                      <a:prstDash val="solid"/>
+                      <a:round/>
+                      <a:headEnd type="none" w="med" len="med"/>
+                      <a:tailEnd type="none" w="med" len="med"/>
+                    </a:lnR>
+                    <a:lnT w="19050" cap="flat" cmpd="sng" algn="ctr">
+                      <a:solidFill>
+                        <a:srgbClr val="002060"/>
+                      </a:solidFill>
+                      <a:prstDash val="solid"/>
+                      <a:round/>
+                      <a:headEnd type="none" w="med" len="med"/>
+                      <a:tailEnd type="none" w="med" len="med"/>
+                    </a:lnT>
+                    <a:lnB w="19050" cap="flat" cmpd="sng" algn="ctr">
+                      <a:solidFill>
+                        <a:srgbClr val="002060"/>
+                      </a:solidFill>
+                      <a:prstDash val="solid"/>
+                      <a:round/>
+                      <a:headEnd type="none" w="med" len="med"/>
+                      <a:tailEnd type="none" w="med" len="med"/>
+                    </a:lnB>
+                    <a:solidFill>
+                      <a:schemeClr val="bg1">
+                        <a:lumMod val="75000"/>
+                      </a:schemeClr>
+                    </a:solidFill>
+                  </a:tcPr>
+                </a:tc>
                 <a:extLst>
                   <a:ext uri="{0D108BD9-81ED-4DB2-BD59-A6C34878D82A}">
                     <a16:rowId xmlns:a16="http://schemas.microsoft.com/office/drawing/2014/main" val="2090210283"/>
@@ -4912,6 +6424,225 @@
                     </a:lnB>
                     <a:solidFill>
                       <a:srgbClr val="BFBFBF"/>
+                    </a:solidFill>
+                  </a:tcPr>
+                </a:tc>
+                <a:tc>
+                  <a:txBody>
+                    <a:bodyPr/>
+                    <a:lstStyle/>
+                    <a:p>
+                      <a:pPr algn="l" fontAlgn="t"/>
+                      <a:r>
+                        <a:rPr lang="en-US" sz="1200" b="0" i="0" u="none" strike="noStrike" smtClean="0">
+                          <a:solidFill>
+                            <a:srgbClr val="002060"/>
+                          </a:solidFill>
+                          <a:effectLst/>
+                          <a:latin typeface="Intel Clear" panose="020B0604020203020204" pitchFamily="34" charset="0"/>
+                          <a:ea typeface="Intel Clear" panose="020B0604020203020204" pitchFamily="34" charset="0"/>
+                          <a:cs typeface="Intel Clear" panose="020B0604020203020204" pitchFamily="34" charset="0"/>
+                        </a:rPr>
+                        <a:t> </a:t>
+                      </a:r>
+                      <a:endParaRPr lang="en-US" sz="1200" b="0" i="0" u="none" strike="noStrike" dirty="0">
+                        <a:solidFill>
+                          <a:srgbClr val="002060"/>
+                        </a:solidFill>
+                        <a:effectLst/>
+                        <a:latin typeface="Intel Clear" panose="020B0604020203020204" pitchFamily="34" charset="0"/>
+                        <a:ea typeface="Intel Clear" panose="020B0604020203020204" pitchFamily="34" charset="0"/>
+                        <a:cs typeface="Intel Clear" panose="020B0604020203020204" pitchFamily="34" charset="0"/>
+                      </a:endParaRPr>
+                    </a:p>
+                  </a:txBody>
+                  <a:tcPr marL="45720" marR="45720" marT="27432" marB="27432" anchor="ctr">
+                    <a:lnL w="19050" cap="flat" cmpd="sng" algn="ctr">
+                      <a:solidFill>
+                        <a:srgbClr val="002060"/>
+                      </a:solidFill>
+                      <a:prstDash val="solid"/>
+                      <a:round/>
+                      <a:headEnd type="none" w="med" len="med"/>
+                      <a:tailEnd type="none" w="med" len="med"/>
+                    </a:lnL>
+                    <a:lnR w="19050" cap="flat" cmpd="sng" algn="ctr">
+                      <a:solidFill>
+                        <a:srgbClr val="002060"/>
+                      </a:solidFill>
+                      <a:prstDash val="solid"/>
+                      <a:round/>
+                      <a:headEnd type="none" w="med" len="med"/>
+                      <a:tailEnd type="none" w="med" len="med"/>
+                    </a:lnR>
+                    <a:lnT w="19050" cap="flat" cmpd="sng" algn="ctr">
+                      <a:solidFill>
+                        <a:srgbClr val="002060"/>
+                      </a:solidFill>
+                      <a:prstDash val="solid"/>
+                      <a:round/>
+                      <a:headEnd type="none" w="med" len="med"/>
+                      <a:tailEnd type="none" w="med" len="med"/>
+                    </a:lnT>
+                    <a:lnB w="19050" cap="flat" cmpd="sng" algn="ctr">
+                      <a:solidFill>
+                        <a:srgbClr val="002060"/>
+                      </a:solidFill>
+                      <a:prstDash val="solid"/>
+                      <a:round/>
+                      <a:headEnd type="none" w="med" len="med"/>
+                      <a:tailEnd type="none" w="med" len="med"/>
+                    </a:lnB>
+                    <a:solidFill>
+                      <a:schemeClr val="bg1">
+                        <a:lumMod val="75000"/>
+                      </a:schemeClr>
+                    </a:solidFill>
+                  </a:tcPr>
+                </a:tc>
+                <a:tc>
+                  <a:txBody>
+                    <a:bodyPr/>
+                    <a:lstStyle/>
+                    <a:p>
+                      <a:pPr algn="l" fontAlgn="t"/>
+                      <a:r>
+                        <a:rPr lang="en-US" sz="1200" b="0" i="0" u="none" strike="noStrike" smtClean="0">
+                          <a:solidFill>
+                            <a:srgbClr val="002060"/>
+                          </a:solidFill>
+                          <a:effectLst/>
+                          <a:latin typeface="Intel Clear" panose="020B0604020203020204" pitchFamily="34" charset="0"/>
+                          <a:ea typeface="Intel Clear" panose="020B0604020203020204" pitchFamily="34" charset="0"/>
+                          <a:cs typeface="Intel Clear" panose="020B0604020203020204" pitchFamily="34" charset="0"/>
+                        </a:rPr>
+                        <a:t> </a:t>
+                      </a:r>
+                      <a:endParaRPr lang="en-US" sz="1200" b="0" i="0" u="none" strike="noStrike" dirty="0">
+                        <a:solidFill>
+                          <a:srgbClr val="002060"/>
+                        </a:solidFill>
+                        <a:effectLst/>
+                        <a:latin typeface="Intel Clear" panose="020B0604020203020204" pitchFamily="34" charset="0"/>
+                        <a:ea typeface="Intel Clear" panose="020B0604020203020204" pitchFamily="34" charset="0"/>
+                        <a:cs typeface="Intel Clear" panose="020B0604020203020204" pitchFamily="34" charset="0"/>
+                      </a:endParaRPr>
+                    </a:p>
+                  </a:txBody>
+                  <a:tcPr marL="45720" marR="45720" marT="27432" marB="27432" anchor="ctr">
+                    <a:lnL w="19050" cap="flat" cmpd="sng" algn="ctr">
+                      <a:solidFill>
+                        <a:srgbClr val="002060"/>
+                      </a:solidFill>
+                      <a:prstDash val="solid"/>
+                      <a:round/>
+                      <a:headEnd type="none" w="med" len="med"/>
+                      <a:tailEnd type="none" w="med" len="med"/>
+                    </a:lnL>
+                    <a:lnR w="19050" cap="flat" cmpd="sng" algn="ctr">
+                      <a:solidFill>
+                        <a:srgbClr val="002060"/>
+                      </a:solidFill>
+                      <a:prstDash val="solid"/>
+                      <a:round/>
+                      <a:headEnd type="none" w="med" len="med"/>
+                      <a:tailEnd type="none" w="med" len="med"/>
+                    </a:lnR>
+                    <a:lnT w="19050" cap="flat" cmpd="sng" algn="ctr">
+                      <a:solidFill>
+                        <a:srgbClr val="002060"/>
+                      </a:solidFill>
+                      <a:prstDash val="solid"/>
+                      <a:round/>
+                      <a:headEnd type="none" w="med" len="med"/>
+                      <a:tailEnd type="none" w="med" len="med"/>
+                    </a:lnT>
+                    <a:lnB w="19050" cap="flat" cmpd="sng" algn="ctr">
+                      <a:solidFill>
+                        <a:srgbClr val="002060"/>
+                      </a:solidFill>
+                      <a:prstDash val="solid"/>
+                      <a:round/>
+                      <a:headEnd type="none" w="med" len="med"/>
+                      <a:tailEnd type="none" w="med" len="med"/>
+                    </a:lnB>
+                    <a:solidFill>
+                      <a:schemeClr val="bg1">
+                        <a:lumMod val="75000"/>
+                      </a:schemeClr>
+                    </a:solidFill>
+                  </a:tcPr>
+                </a:tc>
+                <a:tc>
+                  <a:txBody>
+                    <a:bodyPr/>
+                    <a:lstStyle/>
+                    <a:p>
+                      <a:pPr algn="l" fontAlgn="t"/>
+                      <a:r>
+                        <a:rPr lang="en-US" sz="1200" b="0" i="0" u="none" strike="noStrike" smtClean="0">
+                          <a:solidFill>
+                            <a:srgbClr val="002060"/>
+                          </a:solidFill>
+                          <a:effectLst/>
+                          <a:latin typeface="Intel Clear" panose="020B0604020203020204" pitchFamily="34" charset="0"/>
+                          <a:ea typeface="Intel Clear" panose="020B0604020203020204" pitchFamily="34" charset="0"/>
+                          <a:cs typeface="Intel Clear" panose="020B0604020203020204" pitchFamily="34" charset="0"/>
+                        </a:rPr>
+                        <a:t> </a:t>
+                      </a:r>
+                      <a:endParaRPr lang="en-US" sz="1200" b="0" i="0" u="none" strike="noStrike" dirty="0">
+                        <a:solidFill>
+                          <a:srgbClr val="002060"/>
+                        </a:solidFill>
+                        <a:effectLst/>
+                        <a:latin typeface="Intel Clear" panose="020B0604020203020204" pitchFamily="34" charset="0"/>
+                        <a:ea typeface="Intel Clear" panose="020B0604020203020204" pitchFamily="34" charset="0"/>
+                        <a:cs typeface="Intel Clear" panose="020B0604020203020204" pitchFamily="34" charset="0"/>
+                      </a:endParaRPr>
+                    </a:p>
+                  </a:txBody>
+                  <a:tcPr marL="45720" marR="45720" marT="27432" marB="27432" anchor="ctr">
+                    <a:lnL w="19050" cap="flat" cmpd="sng" algn="ctr">
+                      <a:solidFill>
+                        <a:srgbClr val="002060"/>
+                      </a:solidFill>
+                      <a:prstDash val="solid"/>
+                      <a:round/>
+                      <a:headEnd type="none" w="med" len="med"/>
+                      <a:tailEnd type="none" w="med" len="med"/>
+                    </a:lnL>
+                    <a:lnR w="19050" cap="flat" cmpd="sng" algn="ctr">
+                      <a:solidFill>
+                        <a:srgbClr val="002060"/>
+                      </a:solidFill>
+                      <a:prstDash val="solid"/>
+                      <a:round/>
+                      <a:headEnd type="none" w="med" len="med"/>
+                      <a:tailEnd type="none" w="med" len="med"/>
+                    </a:lnR>
+                    <a:lnT w="19050" cap="flat" cmpd="sng" algn="ctr">
+                      <a:solidFill>
+                        <a:srgbClr val="002060"/>
+                      </a:solidFill>
+                      <a:prstDash val="solid"/>
+                      <a:round/>
+                      <a:headEnd type="none" w="med" len="med"/>
+                      <a:tailEnd type="none" w="med" len="med"/>
+                    </a:lnT>
+                    <a:lnB w="19050" cap="flat" cmpd="sng" algn="ctr">
+                      <a:solidFill>
+                        <a:srgbClr val="002060"/>
+                      </a:solidFill>
+                      <a:prstDash val="solid"/>
+                      <a:round/>
+                      <a:headEnd type="none" w="med" len="med"/>
+                      <a:tailEnd type="none" w="med" len="med"/>
+                    </a:lnB>
+                    <a:solidFill>
+                      <a:schemeClr val="bg1">
+                        <a:lumMod val="75000"/>
+                      </a:schemeClr>
                     </a:solidFill>
                   </a:tcPr>
                 </a:tc>
@@ -5139,6 +6870,225 @@
                     </a:solidFill>
                   </a:tcPr>
                 </a:tc>
+                <a:tc>
+                  <a:txBody>
+                    <a:bodyPr/>
+                    <a:lstStyle/>
+                    <a:p>
+                      <a:pPr algn="l" fontAlgn="t"/>
+                      <a:r>
+                        <a:rPr lang="en-US" sz="1200" b="0" i="0" u="none" strike="noStrike" smtClean="0">
+                          <a:solidFill>
+                            <a:srgbClr val="002060"/>
+                          </a:solidFill>
+                          <a:effectLst/>
+                          <a:latin typeface="Intel Clear" panose="020B0604020203020204" pitchFamily="34" charset="0"/>
+                          <a:ea typeface="Intel Clear" panose="020B0604020203020204" pitchFamily="34" charset="0"/>
+                          <a:cs typeface="Intel Clear" panose="020B0604020203020204" pitchFamily="34" charset="0"/>
+                        </a:rPr>
+                        <a:t> </a:t>
+                      </a:r>
+                      <a:endParaRPr lang="en-US" sz="1200" b="0" i="0" u="none" strike="noStrike" dirty="0">
+                        <a:solidFill>
+                          <a:srgbClr val="002060"/>
+                        </a:solidFill>
+                        <a:effectLst/>
+                        <a:latin typeface="Intel Clear" panose="020B0604020203020204" pitchFamily="34" charset="0"/>
+                        <a:ea typeface="Intel Clear" panose="020B0604020203020204" pitchFamily="34" charset="0"/>
+                        <a:cs typeface="Intel Clear" panose="020B0604020203020204" pitchFamily="34" charset="0"/>
+                      </a:endParaRPr>
+                    </a:p>
+                  </a:txBody>
+                  <a:tcPr marL="45720" marR="45720" marT="27432" marB="27432" anchor="ctr">
+                    <a:lnL w="19050" cap="flat" cmpd="sng" algn="ctr">
+                      <a:solidFill>
+                        <a:srgbClr val="002060"/>
+                      </a:solidFill>
+                      <a:prstDash val="solid"/>
+                      <a:round/>
+                      <a:headEnd type="none" w="med" len="med"/>
+                      <a:tailEnd type="none" w="med" len="med"/>
+                    </a:lnL>
+                    <a:lnR w="19050" cap="flat" cmpd="sng" algn="ctr">
+                      <a:solidFill>
+                        <a:srgbClr val="002060"/>
+                      </a:solidFill>
+                      <a:prstDash val="solid"/>
+                      <a:round/>
+                      <a:headEnd type="none" w="med" len="med"/>
+                      <a:tailEnd type="none" w="med" len="med"/>
+                    </a:lnR>
+                    <a:lnT w="19050" cap="flat" cmpd="sng" algn="ctr">
+                      <a:solidFill>
+                        <a:srgbClr val="002060"/>
+                      </a:solidFill>
+                      <a:prstDash val="solid"/>
+                      <a:round/>
+                      <a:headEnd type="none" w="med" len="med"/>
+                      <a:tailEnd type="none" w="med" len="med"/>
+                    </a:lnT>
+                    <a:lnB w="19050" cap="flat" cmpd="sng" algn="ctr">
+                      <a:solidFill>
+                        <a:srgbClr val="002060"/>
+                      </a:solidFill>
+                      <a:prstDash val="solid"/>
+                      <a:round/>
+                      <a:headEnd type="none" w="med" len="med"/>
+                      <a:tailEnd type="none" w="med" len="med"/>
+                    </a:lnB>
+                    <a:solidFill>
+                      <a:schemeClr val="bg1">
+                        <a:lumMod val="75000"/>
+                      </a:schemeClr>
+                    </a:solidFill>
+                  </a:tcPr>
+                </a:tc>
+                <a:tc>
+                  <a:txBody>
+                    <a:bodyPr/>
+                    <a:lstStyle/>
+                    <a:p>
+                      <a:pPr algn="l" fontAlgn="t"/>
+                      <a:r>
+                        <a:rPr lang="en-US" sz="1200" b="0" i="0" u="none" strike="noStrike" smtClean="0">
+                          <a:solidFill>
+                            <a:srgbClr val="002060"/>
+                          </a:solidFill>
+                          <a:effectLst/>
+                          <a:latin typeface="Intel Clear" panose="020B0604020203020204" pitchFamily="34" charset="0"/>
+                          <a:ea typeface="Intel Clear" panose="020B0604020203020204" pitchFamily="34" charset="0"/>
+                          <a:cs typeface="Intel Clear" panose="020B0604020203020204" pitchFamily="34" charset="0"/>
+                        </a:rPr>
+                        <a:t> </a:t>
+                      </a:r>
+                      <a:endParaRPr lang="en-US" sz="1200" b="0" i="0" u="none" strike="noStrike" dirty="0">
+                        <a:solidFill>
+                          <a:srgbClr val="002060"/>
+                        </a:solidFill>
+                        <a:effectLst/>
+                        <a:latin typeface="Intel Clear" panose="020B0604020203020204" pitchFamily="34" charset="0"/>
+                        <a:ea typeface="Intel Clear" panose="020B0604020203020204" pitchFamily="34" charset="0"/>
+                        <a:cs typeface="Intel Clear" panose="020B0604020203020204" pitchFamily="34" charset="0"/>
+                      </a:endParaRPr>
+                    </a:p>
+                  </a:txBody>
+                  <a:tcPr marL="45720" marR="45720" marT="27432" marB="27432" anchor="ctr">
+                    <a:lnL w="19050" cap="flat" cmpd="sng" algn="ctr">
+                      <a:solidFill>
+                        <a:srgbClr val="002060"/>
+                      </a:solidFill>
+                      <a:prstDash val="solid"/>
+                      <a:round/>
+                      <a:headEnd type="none" w="med" len="med"/>
+                      <a:tailEnd type="none" w="med" len="med"/>
+                    </a:lnL>
+                    <a:lnR w="19050" cap="flat" cmpd="sng" algn="ctr">
+                      <a:solidFill>
+                        <a:srgbClr val="002060"/>
+                      </a:solidFill>
+                      <a:prstDash val="solid"/>
+                      <a:round/>
+                      <a:headEnd type="none" w="med" len="med"/>
+                      <a:tailEnd type="none" w="med" len="med"/>
+                    </a:lnR>
+                    <a:lnT w="19050" cap="flat" cmpd="sng" algn="ctr">
+                      <a:solidFill>
+                        <a:srgbClr val="002060"/>
+                      </a:solidFill>
+                      <a:prstDash val="solid"/>
+                      <a:round/>
+                      <a:headEnd type="none" w="med" len="med"/>
+                      <a:tailEnd type="none" w="med" len="med"/>
+                    </a:lnT>
+                    <a:lnB w="19050" cap="flat" cmpd="sng" algn="ctr">
+                      <a:solidFill>
+                        <a:srgbClr val="002060"/>
+                      </a:solidFill>
+                      <a:prstDash val="solid"/>
+                      <a:round/>
+                      <a:headEnd type="none" w="med" len="med"/>
+                      <a:tailEnd type="none" w="med" len="med"/>
+                    </a:lnB>
+                    <a:solidFill>
+                      <a:schemeClr val="bg1">
+                        <a:lumMod val="75000"/>
+                      </a:schemeClr>
+                    </a:solidFill>
+                  </a:tcPr>
+                </a:tc>
+                <a:tc>
+                  <a:txBody>
+                    <a:bodyPr/>
+                    <a:lstStyle/>
+                    <a:p>
+                      <a:pPr algn="l" fontAlgn="t"/>
+                      <a:r>
+                        <a:rPr lang="en-US" sz="1200" b="0" i="0" u="none" strike="noStrike" smtClean="0">
+                          <a:solidFill>
+                            <a:srgbClr val="002060"/>
+                          </a:solidFill>
+                          <a:effectLst/>
+                          <a:latin typeface="Intel Clear" panose="020B0604020203020204" pitchFamily="34" charset="0"/>
+                          <a:ea typeface="Intel Clear" panose="020B0604020203020204" pitchFamily="34" charset="0"/>
+                          <a:cs typeface="Intel Clear" panose="020B0604020203020204" pitchFamily="34" charset="0"/>
+                        </a:rPr>
+                        <a:t> </a:t>
+                      </a:r>
+                      <a:endParaRPr lang="en-US" sz="1200" b="0" i="0" u="none" strike="noStrike" dirty="0">
+                        <a:solidFill>
+                          <a:srgbClr val="002060"/>
+                        </a:solidFill>
+                        <a:effectLst/>
+                        <a:latin typeface="Intel Clear" panose="020B0604020203020204" pitchFamily="34" charset="0"/>
+                        <a:ea typeface="Intel Clear" panose="020B0604020203020204" pitchFamily="34" charset="0"/>
+                        <a:cs typeface="Intel Clear" panose="020B0604020203020204" pitchFamily="34" charset="0"/>
+                      </a:endParaRPr>
+                    </a:p>
+                  </a:txBody>
+                  <a:tcPr marL="45720" marR="45720" marT="27432" marB="27432" anchor="ctr">
+                    <a:lnL w="19050" cap="flat" cmpd="sng" algn="ctr">
+                      <a:solidFill>
+                        <a:srgbClr val="002060"/>
+                      </a:solidFill>
+                      <a:prstDash val="solid"/>
+                      <a:round/>
+                      <a:headEnd type="none" w="med" len="med"/>
+                      <a:tailEnd type="none" w="med" len="med"/>
+                    </a:lnL>
+                    <a:lnR w="19050" cap="flat" cmpd="sng" algn="ctr">
+                      <a:solidFill>
+                        <a:srgbClr val="002060"/>
+                      </a:solidFill>
+                      <a:prstDash val="solid"/>
+                      <a:round/>
+                      <a:headEnd type="none" w="med" len="med"/>
+                      <a:tailEnd type="none" w="med" len="med"/>
+                    </a:lnR>
+                    <a:lnT w="19050" cap="flat" cmpd="sng" algn="ctr">
+                      <a:solidFill>
+                        <a:srgbClr val="002060"/>
+                      </a:solidFill>
+                      <a:prstDash val="solid"/>
+                      <a:round/>
+                      <a:headEnd type="none" w="med" len="med"/>
+                      <a:tailEnd type="none" w="med" len="med"/>
+                    </a:lnT>
+                    <a:lnB w="19050" cap="flat" cmpd="sng" algn="ctr">
+                      <a:solidFill>
+                        <a:srgbClr val="002060"/>
+                      </a:solidFill>
+                      <a:prstDash val="solid"/>
+                      <a:round/>
+                      <a:headEnd type="none" w="med" len="med"/>
+                      <a:tailEnd type="none" w="med" len="med"/>
+                    </a:lnB>
+                    <a:solidFill>
+                      <a:schemeClr val="bg1">
+                        <a:lumMod val="75000"/>
+                      </a:schemeClr>
+                    </a:solidFill>
+                  </a:tcPr>
+                </a:tc>
                 <a:extLst>
                   <a:ext uri="{0D108BD9-81ED-4DB2-BD59-A6C34878D82A}">
                     <a16:rowId xmlns:a16="http://schemas.microsoft.com/office/drawing/2014/main" val="1065222353"/>
@@ -5214,6 +7164,225 @@
                     </a:lnB>
                     <a:solidFill>
                       <a:srgbClr val="BFBFBF"/>
+                    </a:solidFill>
+                  </a:tcPr>
+                </a:tc>
+                <a:tc>
+                  <a:txBody>
+                    <a:bodyPr/>
+                    <a:lstStyle/>
+                    <a:p>
+                      <a:pPr algn="l" fontAlgn="t"/>
+                      <a:r>
+                        <a:rPr lang="en-US" sz="1200" b="0" i="0" u="none" strike="noStrike" smtClean="0">
+                          <a:solidFill>
+                            <a:srgbClr val="002060"/>
+                          </a:solidFill>
+                          <a:effectLst/>
+                          <a:latin typeface="Intel Clear" panose="020B0604020203020204" pitchFamily="34" charset="0"/>
+                          <a:ea typeface="Intel Clear" panose="020B0604020203020204" pitchFamily="34" charset="0"/>
+                          <a:cs typeface="Intel Clear" panose="020B0604020203020204" pitchFamily="34" charset="0"/>
+                        </a:rPr>
+                        <a:t> </a:t>
+                      </a:r>
+                      <a:endParaRPr lang="en-US" sz="1200" b="0" i="0" u="none" strike="noStrike" dirty="0">
+                        <a:solidFill>
+                          <a:srgbClr val="002060"/>
+                        </a:solidFill>
+                        <a:effectLst/>
+                        <a:latin typeface="Intel Clear" panose="020B0604020203020204" pitchFamily="34" charset="0"/>
+                        <a:ea typeface="Intel Clear" panose="020B0604020203020204" pitchFamily="34" charset="0"/>
+                        <a:cs typeface="Intel Clear" panose="020B0604020203020204" pitchFamily="34" charset="0"/>
+                      </a:endParaRPr>
+                    </a:p>
+                  </a:txBody>
+                  <a:tcPr marL="45720" marR="45720" marT="27432" marB="27432" anchor="ctr">
+                    <a:lnL w="19050" cap="flat" cmpd="sng" algn="ctr">
+                      <a:solidFill>
+                        <a:srgbClr val="002060"/>
+                      </a:solidFill>
+                      <a:prstDash val="solid"/>
+                      <a:round/>
+                      <a:headEnd type="none" w="med" len="med"/>
+                      <a:tailEnd type="none" w="med" len="med"/>
+                    </a:lnL>
+                    <a:lnR w="19050" cap="flat" cmpd="sng" algn="ctr">
+                      <a:solidFill>
+                        <a:srgbClr val="002060"/>
+                      </a:solidFill>
+                      <a:prstDash val="solid"/>
+                      <a:round/>
+                      <a:headEnd type="none" w="med" len="med"/>
+                      <a:tailEnd type="none" w="med" len="med"/>
+                    </a:lnR>
+                    <a:lnT w="19050" cap="flat" cmpd="sng" algn="ctr">
+                      <a:solidFill>
+                        <a:srgbClr val="002060"/>
+                      </a:solidFill>
+                      <a:prstDash val="solid"/>
+                      <a:round/>
+                      <a:headEnd type="none" w="med" len="med"/>
+                      <a:tailEnd type="none" w="med" len="med"/>
+                    </a:lnT>
+                    <a:lnB w="19050" cap="flat" cmpd="sng" algn="ctr">
+                      <a:solidFill>
+                        <a:srgbClr val="002060"/>
+                      </a:solidFill>
+                      <a:prstDash val="solid"/>
+                      <a:round/>
+                      <a:headEnd type="none" w="med" len="med"/>
+                      <a:tailEnd type="none" w="med" len="med"/>
+                    </a:lnB>
+                    <a:solidFill>
+                      <a:schemeClr val="bg1">
+                        <a:lumMod val="75000"/>
+                      </a:schemeClr>
+                    </a:solidFill>
+                  </a:tcPr>
+                </a:tc>
+                <a:tc>
+                  <a:txBody>
+                    <a:bodyPr/>
+                    <a:lstStyle/>
+                    <a:p>
+                      <a:pPr algn="l" fontAlgn="t"/>
+                      <a:r>
+                        <a:rPr lang="en-US" sz="1200" b="0" i="0" u="none" strike="noStrike" smtClean="0">
+                          <a:solidFill>
+                            <a:srgbClr val="002060"/>
+                          </a:solidFill>
+                          <a:effectLst/>
+                          <a:latin typeface="Intel Clear" panose="020B0604020203020204" pitchFamily="34" charset="0"/>
+                          <a:ea typeface="Intel Clear" panose="020B0604020203020204" pitchFamily="34" charset="0"/>
+                          <a:cs typeface="Intel Clear" panose="020B0604020203020204" pitchFamily="34" charset="0"/>
+                        </a:rPr>
+                        <a:t> </a:t>
+                      </a:r>
+                      <a:endParaRPr lang="en-US" sz="1200" b="0" i="0" u="none" strike="noStrike" dirty="0">
+                        <a:solidFill>
+                          <a:srgbClr val="002060"/>
+                        </a:solidFill>
+                        <a:effectLst/>
+                        <a:latin typeface="Intel Clear" panose="020B0604020203020204" pitchFamily="34" charset="0"/>
+                        <a:ea typeface="Intel Clear" panose="020B0604020203020204" pitchFamily="34" charset="0"/>
+                        <a:cs typeface="Intel Clear" panose="020B0604020203020204" pitchFamily="34" charset="0"/>
+                      </a:endParaRPr>
+                    </a:p>
+                  </a:txBody>
+                  <a:tcPr marL="45720" marR="45720" marT="27432" marB="27432" anchor="ctr">
+                    <a:lnL w="19050" cap="flat" cmpd="sng" algn="ctr">
+                      <a:solidFill>
+                        <a:srgbClr val="002060"/>
+                      </a:solidFill>
+                      <a:prstDash val="solid"/>
+                      <a:round/>
+                      <a:headEnd type="none" w="med" len="med"/>
+                      <a:tailEnd type="none" w="med" len="med"/>
+                    </a:lnL>
+                    <a:lnR w="19050" cap="flat" cmpd="sng" algn="ctr">
+                      <a:solidFill>
+                        <a:srgbClr val="002060"/>
+                      </a:solidFill>
+                      <a:prstDash val="solid"/>
+                      <a:round/>
+                      <a:headEnd type="none" w="med" len="med"/>
+                      <a:tailEnd type="none" w="med" len="med"/>
+                    </a:lnR>
+                    <a:lnT w="19050" cap="flat" cmpd="sng" algn="ctr">
+                      <a:solidFill>
+                        <a:srgbClr val="002060"/>
+                      </a:solidFill>
+                      <a:prstDash val="solid"/>
+                      <a:round/>
+                      <a:headEnd type="none" w="med" len="med"/>
+                      <a:tailEnd type="none" w="med" len="med"/>
+                    </a:lnT>
+                    <a:lnB w="19050" cap="flat" cmpd="sng" algn="ctr">
+                      <a:solidFill>
+                        <a:srgbClr val="002060"/>
+                      </a:solidFill>
+                      <a:prstDash val="solid"/>
+                      <a:round/>
+                      <a:headEnd type="none" w="med" len="med"/>
+                      <a:tailEnd type="none" w="med" len="med"/>
+                    </a:lnB>
+                    <a:solidFill>
+                      <a:schemeClr val="bg1">
+                        <a:lumMod val="75000"/>
+                      </a:schemeClr>
+                    </a:solidFill>
+                  </a:tcPr>
+                </a:tc>
+                <a:tc>
+                  <a:txBody>
+                    <a:bodyPr/>
+                    <a:lstStyle/>
+                    <a:p>
+                      <a:pPr algn="l" fontAlgn="t"/>
+                      <a:r>
+                        <a:rPr lang="en-US" sz="1200" b="0" i="0" u="none" strike="noStrike" smtClean="0">
+                          <a:solidFill>
+                            <a:srgbClr val="002060"/>
+                          </a:solidFill>
+                          <a:effectLst/>
+                          <a:latin typeface="Intel Clear" panose="020B0604020203020204" pitchFamily="34" charset="0"/>
+                          <a:ea typeface="Intel Clear" panose="020B0604020203020204" pitchFamily="34" charset="0"/>
+                          <a:cs typeface="Intel Clear" panose="020B0604020203020204" pitchFamily="34" charset="0"/>
+                        </a:rPr>
+                        <a:t> </a:t>
+                      </a:r>
+                      <a:endParaRPr lang="en-US" sz="1200" b="0" i="0" u="none" strike="noStrike" dirty="0">
+                        <a:solidFill>
+                          <a:srgbClr val="002060"/>
+                        </a:solidFill>
+                        <a:effectLst/>
+                        <a:latin typeface="Intel Clear" panose="020B0604020203020204" pitchFamily="34" charset="0"/>
+                        <a:ea typeface="Intel Clear" panose="020B0604020203020204" pitchFamily="34" charset="0"/>
+                        <a:cs typeface="Intel Clear" panose="020B0604020203020204" pitchFamily="34" charset="0"/>
+                      </a:endParaRPr>
+                    </a:p>
+                  </a:txBody>
+                  <a:tcPr marL="45720" marR="45720" marT="27432" marB="27432" anchor="ctr">
+                    <a:lnL w="19050" cap="flat" cmpd="sng" algn="ctr">
+                      <a:solidFill>
+                        <a:srgbClr val="002060"/>
+                      </a:solidFill>
+                      <a:prstDash val="solid"/>
+                      <a:round/>
+                      <a:headEnd type="none" w="med" len="med"/>
+                      <a:tailEnd type="none" w="med" len="med"/>
+                    </a:lnL>
+                    <a:lnR w="19050" cap="flat" cmpd="sng" algn="ctr">
+                      <a:solidFill>
+                        <a:srgbClr val="002060"/>
+                      </a:solidFill>
+                      <a:prstDash val="solid"/>
+                      <a:round/>
+                      <a:headEnd type="none" w="med" len="med"/>
+                      <a:tailEnd type="none" w="med" len="med"/>
+                    </a:lnR>
+                    <a:lnT w="19050" cap="flat" cmpd="sng" algn="ctr">
+                      <a:solidFill>
+                        <a:srgbClr val="002060"/>
+                      </a:solidFill>
+                      <a:prstDash val="solid"/>
+                      <a:round/>
+                      <a:headEnd type="none" w="med" len="med"/>
+                      <a:tailEnd type="none" w="med" len="med"/>
+                    </a:lnT>
+                    <a:lnB w="19050" cap="flat" cmpd="sng" algn="ctr">
+                      <a:solidFill>
+                        <a:srgbClr val="002060"/>
+                      </a:solidFill>
+                      <a:prstDash val="solid"/>
+                      <a:round/>
+                      <a:headEnd type="none" w="med" len="med"/>
+                      <a:tailEnd type="none" w="med" len="med"/>
+                    </a:lnB>
+                    <a:solidFill>
+                      <a:schemeClr val="bg1">
+                        <a:lumMod val="75000"/>
+                      </a:schemeClr>
                     </a:solidFill>
                   </a:tcPr>
                 </a:tc>
@@ -5441,6 +7610,225 @@
                     </a:solidFill>
                   </a:tcPr>
                 </a:tc>
+                <a:tc>
+                  <a:txBody>
+                    <a:bodyPr/>
+                    <a:lstStyle/>
+                    <a:p>
+                      <a:pPr algn="l" fontAlgn="t"/>
+                      <a:r>
+                        <a:rPr lang="en-US" sz="1200" b="0" i="0" u="none" strike="noStrike" smtClean="0">
+                          <a:solidFill>
+                            <a:srgbClr val="002060"/>
+                          </a:solidFill>
+                          <a:effectLst/>
+                          <a:latin typeface="Intel Clear" panose="020B0604020203020204" pitchFamily="34" charset="0"/>
+                          <a:ea typeface="Intel Clear" panose="020B0604020203020204" pitchFamily="34" charset="0"/>
+                          <a:cs typeface="Intel Clear" panose="020B0604020203020204" pitchFamily="34" charset="0"/>
+                        </a:rPr>
+                        <a:t> </a:t>
+                      </a:r>
+                      <a:endParaRPr lang="en-US" sz="1200" b="0" i="0" u="none" strike="noStrike" dirty="0">
+                        <a:solidFill>
+                          <a:srgbClr val="002060"/>
+                        </a:solidFill>
+                        <a:effectLst/>
+                        <a:latin typeface="Intel Clear" panose="020B0604020203020204" pitchFamily="34" charset="0"/>
+                        <a:ea typeface="Intel Clear" panose="020B0604020203020204" pitchFamily="34" charset="0"/>
+                        <a:cs typeface="Intel Clear" panose="020B0604020203020204" pitchFamily="34" charset="0"/>
+                      </a:endParaRPr>
+                    </a:p>
+                  </a:txBody>
+                  <a:tcPr marL="45720" marR="45720" marT="27432" marB="27432" anchor="ctr">
+                    <a:lnL w="19050" cap="flat" cmpd="sng" algn="ctr">
+                      <a:solidFill>
+                        <a:srgbClr val="002060"/>
+                      </a:solidFill>
+                      <a:prstDash val="solid"/>
+                      <a:round/>
+                      <a:headEnd type="none" w="med" len="med"/>
+                      <a:tailEnd type="none" w="med" len="med"/>
+                    </a:lnL>
+                    <a:lnR w="19050" cap="flat" cmpd="sng" algn="ctr">
+                      <a:solidFill>
+                        <a:srgbClr val="002060"/>
+                      </a:solidFill>
+                      <a:prstDash val="solid"/>
+                      <a:round/>
+                      <a:headEnd type="none" w="med" len="med"/>
+                      <a:tailEnd type="none" w="med" len="med"/>
+                    </a:lnR>
+                    <a:lnT w="19050" cap="flat" cmpd="sng" algn="ctr">
+                      <a:solidFill>
+                        <a:srgbClr val="002060"/>
+                      </a:solidFill>
+                      <a:prstDash val="solid"/>
+                      <a:round/>
+                      <a:headEnd type="none" w="med" len="med"/>
+                      <a:tailEnd type="none" w="med" len="med"/>
+                    </a:lnT>
+                    <a:lnB w="19050" cap="flat" cmpd="sng" algn="ctr">
+                      <a:solidFill>
+                        <a:srgbClr val="002060"/>
+                      </a:solidFill>
+                      <a:prstDash val="solid"/>
+                      <a:round/>
+                      <a:headEnd type="none" w="med" len="med"/>
+                      <a:tailEnd type="none" w="med" len="med"/>
+                    </a:lnB>
+                    <a:solidFill>
+                      <a:schemeClr val="bg1">
+                        <a:lumMod val="75000"/>
+                      </a:schemeClr>
+                    </a:solidFill>
+                  </a:tcPr>
+                </a:tc>
+                <a:tc>
+                  <a:txBody>
+                    <a:bodyPr/>
+                    <a:lstStyle/>
+                    <a:p>
+                      <a:pPr algn="l" fontAlgn="t"/>
+                      <a:r>
+                        <a:rPr lang="en-US" sz="1200" b="0" i="0" u="none" strike="noStrike" smtClean="0">
+                          <a:solidFill>
+                            <a:srgbClr val="002060"/>
+                          </a:solidFill>
+                          <a:effectLst/>
+                          <a:latin typeface="Intel Clear" panose="020B0604020203020204" pitchFamily="34" charset="0"/>
+                          <a:ea typeface="Intel Clear" panose="020B0604020203020204" pitchFamily="34" charset="0"/>
+                          <a:cs typeface="Intel Clear" panose="020B0604020203020204" pitchFamily="34" charset="0"/>
+                        </a:rPr>
+                        <a:t> </a:t>
+                      </a:r>
+                      <a:endParaRPr lang="en-US" sz="1200" b="0" i="0" u="none" strike="noStrike" dirty="0">
+                        <a:solidFill>
+                          <a:srgbClr val="002060"/>
+                        </a:solidFill>
+                        <a:effectLst/>
+                        <a:latin typeface="Intel Clear" panose="020B0604020203020204" pitchFamily="34" charset="0"/>
+                        <a:ea typeface="Intel Clear" panose="020B0604020203020204" pitchFamily="34" charset="0"/>
+                        <a:cs typeface="Intel Clear" panose="020B0604020203020204" pitchFamily="34" charset="0"/>
+                      </a:endParaRPr>
+                    </a:p>
+                  </a:txBody>
+                  <a:tcPr marL="45720" marR="45720" marT="27432" marB="27432" anchor="ctr">
+                    <a:lnL w="19050" cap="flat" cmpd="sng" algn="ctr">
+                      <a:solidFill>
+                        <a:srgbClr val="002060"/>
+                      </a:solidFill>
+                      <a:prstDash val="solid"/>
+                      <a:round/>
+                      <a:headEnd type="none" w="med" len="med"/>
+                      <a:tailEnd type="none" w="med" len="med"/>
+                    </a:lnL>
+                    <a:lnR w="19050" cap="flat" cmpd="sng" algn="ctr">
+                      <a:solidFill>
+                        <a:srgbClr val="002060"/>
+                      </a:solidFill>
+                      <a:prstDash val="solid"/>
+                      <a:round/>
+                      <a:headEnd type="none" w="med" len="med"/>
+                      <a:tailEnd type="none" w="med" len="med"/>
+                    </a:lnR>
+                    <a:lnT w="19050" cap="flat" cmpd="sng" algn="ctr">
+                      <a:solidFill>
+                        <a:srgbClr val="002060"/>
+                      </a:solidFill>
+                      <a:prstDash val="solid"/>
+                      <a:round/>
+                      <a:headEnd type="none" w="med" len="med"/>
+                      <a:tailEnd type="none" w="med" len="med"/>
+                    </a:lnT>
+                    <a:lnB w="19050" cap="flat" cmpd="sng" algn="ctr">
+                      <a:solidFill>
+                        <a:srgbClr val="002060"/>
+                      </a:solidFill>
+                      <a:prstDash val="solid"/>
+                      <a:round/>
+                      <a:headEnd type="none" w="med" len="med"/>
+                      <a:tailEnd type="none" w="med" len="med"/>
+                    </a:lnB>
+                    <a:solidFill>
+                      <a:schemeClr val="bg1">
+                        <a:lumMod val="75000"/>
+                      </a:schemeClr>
+                    </a:solidFill>
+                  </a:tcPr>
+                </a:tc>
+                <a:tc>
+                  <a:txBody>
+                    <a:bodyPr/>
+                    <a:lstStyle/>
+                    <a:p>
+                      <a:pPr algn="l" fontAlgn="t"/>
+                      <a:r>
+                        <a:rPr lang="en-US" sz="1200" b="0" i="0" u="none" strike="noStrike" smtClean="0">
+                          <a:solidFill>
+                            <a:srgbClr val="002060"/>
+                          </a:solidFill>
+                          <a:effectLst/>
+                          <a:latin typeface="Intel Clear" panose="020B0604020203020204" pitchFamily="34" charset="0"/>
+                          <a:ea typeface="Intel Clear" panose="020B0604020203020204" pitchFamily="34" charset="0"/>
+                          <a:cs typeface="Intel Clear" panose="020B0604020203020204" pitchFamily="34" charset="0"/>
+                        </a:rPr>
+                        <a:t> </a:t>
+                      </a:r>
+                      <a:endParaRPr lang="en-US" sz="1200" b="0" i="0" u="none" strike="noStrike" dirty="0">
+                        <a:solidFill>
+                          <a:srgbClr val="002060"/>
+                        </a:solidFill>
+                        <a:effectLst/>
+                        <a:latin typeface="Intel Clear" panose="020B0604020203020204" pitchFamily="34" charset="0"/>
+                        <a:ea typeface="Intel Clear" panose="020B0604020203020204" pitchFamily="34" charset="0"/>
+                        <a:cs typeface="Intel Clear" panose="020B0604020203020204" pitchFamily="34" charset="0"/>
+                      </a:endParaRPr>
+                    </a:p>
+                  </a:txBody>
+                  <a:tcPr marL="45720" marR="45720" marT="27432" marB="27432" anchor="ctr">
+                    <a:lnL w="19050" cap="flat" cmpd="sng" algn="ctr">
+                      <a:solidFill>
+                        <a:srgbClr val="002060"/>
+                      </a:solidFill>
+                      <a:prstDash val="solid"/>
+                      <a:round/>
+                      <a:headEnd type="none" w="med" len="med"/>
+                      <a:tailEnd type="none" w="med" len="med"/>
+                    </a:lnL>
+                    <a:lnR w="19050" cap="flat" cmpd="sng" algn="ctr">
+                      <a:solidFill>
+                        <a:srgbClr val="002060"/>
+                      </a:solidFill>
+                      <a:prstDash val="solid"/>
+                      <a:round/>
+                      <a:headEnd type="none" w="med" len="med"/>
+                      <a:tailEnd type="none" w="med" len="med"/>
+                    </a:lnR>
+                    <a:lnT w="19050" cap="flat" cmpd="sng" algn="ctr">
+                      <a:solidFill>
+                        <a:srgbClr val="002060"/>
+                      </a:solidFill>
+                      <a:prstDash val="solid"/>
+                      <a:round/>
+                      <a:headEnd type="none" w="med" len="med"/>
+                      <a:tailEnd type="none" w="med" len="med"/>
+                    </a:lnT>
+                    <a:lnB w="19050" cap="flat" cmpd="sng" algn="ctr">
+                      <a:solidFill>
+                        <a:srgbClr val="002060"/>
+                      </a:solidFill>
+                      <a:prstDash val="solid"/>
+                      <a:round/>
+                      <a:headEnd type="none" w="med" len="med"/>
+                      <a:tailEnd type="none" w="med" len="med"/>
+                    </a:lnB>
+                    <a:solidFill>
+                      <a:schemeClr val="bg1">
+                        <a:lumMod val="75000"/>
+                      </a:schemeClr>
+                    </a:solidFill>
+                  </a:tcPr>
+                </a:tc>
                 <a:extLst>
                   <a:ext uri="{0D108BD9-81ED-4DB2-BD59-A6C34878D82A}">
                     <a16:rowId xmlns:a16="http://schemas.microsoft.com/office/drawing/2014/main" val="3510482637"/>
@@ -5516,6 +7904,225 @@
                     </a:lnB>
                     <a:solidFill>
                       <a:srgbClr val="BFBFBF"/>
+                    </a:solidFill>
+                  </a:tcPr>
+                </a:tc>
+                <a:tc>
+                  <a:txBody>
+                    <a:bodyPr/>
+                    <a:lstStyle/>
+                    <a:p>
+                      <a:pPr algn="l" fontAlgn="t"/>
+                      <a:r>
+                        <a:rPr lang="en-US" sz="1200" b="0" i="0" u="none" strike="noStrike" smtClean="0">
+                          <a:solidFill>
+                            <a:srgbClr val="002060"/>
+                          </a:solidFill>
+                          <a:effectLst/>
+                          <a:latin typeface="Intel Clear" panose="020B0604020203020204" pitchFamily="34" charset="0"/>
+                          <a:ea typeface="Intel Clear" panose="020B0604020203020204" pitchFamily="34" charset="0"/>
+                          <a:cs typeface="Intel Clear" panose="020B0604020203020204" pitchFamily="34" charset="0"/>
+                        </a:rPr>
+                        <a:t> </a:t>
+                      </a:r>
+                      <a:endParaRPr lang="en-US" sz="1200" b="0" i="0" u="none" strike="noStrike" dirty="0">
+                        <a:solidFill>
+                          <a:srgbClr val="002060"/>
+                        </a:solidFill>
+                        <a:effectLst/>
+                        <a:latin typeface="Intel Clear" panose="020B0604020203020204" pitchFamily="34" charset="0"/>
+                        <a:ea typeface="Intel Clear" panose="020B0604020203020204" pitchFamily="34" charset="0"/>
+                        <a:cs typeface="Intel Clear" panose="020B0604020203020204" pitchFamily="34" charset="0"/>
+                      </a:endParaRPr>
+                    </a:p>
+                  </a:txBody>
+                  <a:tcPr marL="45720" marR="45720" marT="27432" marB="27432" anchor="ctr">
+                    <a:lnL w="19050" cap="flat" cmpd="sng" algn="ctr">
+                      <a:solidFill>
+                        <a:srgbClr val="002060"/>
+                      </a:solidFill>
+                      <a:prstDash val="solid"/>
+                      <a:round/>
+                      <a:headEnd type="none" w="med" len="med"/>
+                      <a:tailEnd type="none" w="med" len="med"/>
+                    </a:lnL>
+                    <a:lnR w="19050" cap="flat" cmpd="sng" algn="ctr">
+                      <a:solidFill>
+                        <a:srgbClr val="002060"/>
+                      </a:solidFill>
+                      <a:prstDash val="solid"/>
+                      <a:round/>
+                      <a:headEnd type="none" w="med" len="med"/>
+                      <a:tailEnd type="none" w="med" len="med"/>
+                    </a:lnR>
+                    <a:lnT w="19050" cap="flat" cmpd="sng" algn="ctr">
+                      <a:solidFill>
+                        <a:srgbClr val="002060"/>
+                      </a:solidFill>
+                      <a:prstDash val="solid"/>
+                      <a:round/>
+                      <a:headEnd type="none" w="med" len="med"/>
+                      <a:tailEnd type="none" w="med" len="med"/>
+                    </a:lnT>
+                    <a:lnB w="19050" cap="flat" cmpd="sng" algn="ctr">
+                      <a:solidFill>
+                        <a:srgbClr val="002060"/>
+                      </a:solidFill>
+                      <a:prstDash val="solid"/>
+                      <a:round/>
+                      <a:headEnd type="none" w="med" len="med"/>
+                      <a:tailEnd type="none" w="med" len="med"/>
+                    </a:lnB>
+                    <a:solidFill>
+                      <a:schemeClr val="bg1">
+                        <a:lumMod val="75000"/>
+                      </a:schemeClr>
+                    </a:solidFill>
+                  </a:tcPr>
+                </a:tc>
+                <a:tc>
+                  <a:txBody>
+                    <a:bodyPr/>
+                    <a:lstStyle/>
+                    <a:p>
+                      <a:pPr algn="l" fontAlgn="t"/>
+                      <a:r>
+                        <a:rPr lang="en-US" sz="1200" b="0" i="0" u="none" strike="noStrike" smtClean="0">
+                          <a:solidFill>
+                            <a:srgbClr val="002060"/>
+                          </a:solidFill>
+                          <a:effectLst/>
+                          <a:latin typeface="Intel Clear" panose="020B0604020203020204" pitchFamily="34" charset="0"/>
+                          <a:ea typeface="Intel Clear" panose="020B0604020203020204" pitchFamily="34" charset="0"/>
+                          <a:cs typeface="Intel Clear" panose="020B0604020203020204" pitchFamily="34" charset="0"/>
+                        </a:rPr>
+                        <a:t> </a:t>
+                      </a:r>
+                      <a:endParaRPr lang="en-US" sz="1200" b="0" i="0" u="none" strike="noStrike" dirty="0">
+                        <a:solidFill>
+                          <a:srgbClr val="002060"/>
+                        </a:solidFill>
+                        <a:effectLst/>
+                        <a:latin typeface="Intel Clear" panose="020B0604020203020204" pitchFamily="34" charset="0"/>
+                        <a:ea typeface="Intel Clear" panose="020B0604020203020204" pitchFamily="34" charset="0"/>
+                        <a:cs typeface="Intel Clear" panose="020B0604020203020204" pitchFamily="34" charset="0"/>
+                      </a:endParaRPr>
+                    </a:p>
+                  </a:txBody>
+                  <a:tcPr marL="45720" marR="45720" marT="27432" marB="27432" anchor="ctr">
+                    <a:lnL w="19050" cap="flat" cmpd="sng" algn="ctr">
+                      <a:solidFill>
+                        <a:srgbClr val="002060"/>
+                      </a:solidFill>
+                      <a:prstDash val="solid"/>
+                      <a:round/>
+                      <a:headEnd type="none" w="med" len="med"/>
+                      <a:tailEnd type="none" w="med" len="med"/>
+                    </a:lnL>
+                    <a:lnR w="19050" cap="flat" cmpd="sng" algn="ctr">
+                      <a:solidFill>
+                        <a:srgbClr val="002060"/>
+                      </a:solidFill>
+                      <a:prstDash val="solid"/>
+                      <a:round/>
+                      <a:headEnd type="none" w="med" len="med"/>
+                      <a:tailEnd type="none" w="med" len="med"/>
+                    </a:lnR>
+                    <a:lnT w="19050" cap="flat" cmpd="sng" algn="ctr">
+                      <a:solidFill>
+                        <a:srgbClr val="002060"/>
+                      </a:solidFill>
+                      <a:prstDash val="solid"/>
+                      <a:round/>
+                      <a:headEnd type="none" w="med" len="med"/>
+                      <a:tailEnd type="none" w="med" len="med"/>
+                    </a:lnT>
+                    <a:lnB w="19050" cap="flat" cmpd="sng" algn="ctr">
+                      <a:solidFill>
+                        <a:srgbClr val="002060"/>
+                      </a:solidFill>
+                      <a:prstDash val="solid"/>
+                      <a:round/>
+                      <a:headEnd type="none" w="med" len="med"/>
+                      <a:tailEnd type="none" w="med" len="med"/>
+                    </a:lnB>
+                    <a:solidFill>
+                      <a:schemeClr val="bg1">
+                        <a:lumMod val="75000"/>
+                      </a:schemeClr>
+                    </a:solidFill>
+                  </a:tcPr>
+                </a:tc>
+                <a:tc>
+                  <a:txBody>
+                    <a:bodyPr/>
+                    <a:lstStyle/>
+                    <a:p>
+                      <a:pPr algn="l" fontAlgn="t"/>
+                      <a:r>
+                        <a:rPr lang="en-US" sz="1200" b="0" i="0" u="none" strike="noStrike" smtClean="0">
+                          <a:solidFill>
+                            <a:srgbClr val="002060"/>
+                          </a:solidFill>
+                          <a:effectLst/>
+                          <a:latin typeface="Intel Clear" panose="020B0604020203020204" pitchFamily="34" charset="0"/>
+                          <a:ea typeface="Intel Clear" panose="020B0604020203020204" pitchFamily="34" charset="0"/>
+                          <a:cs typeface="Intel Clear" panose="020B0604020203020204" pitchFamily="34" charset="0"/>
+                        </a:rPr>
+                        <a:t> </a:t>
+                      </a:r>
+                      <a:endParaRPr lang="en-US" sz="1200" b="0" i="0" u="none" strike="noStrike" dirty="0">
+                        <a:solidFill>
+                          <a:srgbClr val="002060"/>
+                        </a:solidFill>
+                        <a:effectLst/>
+                        <a:latin typeface="Intel Clear" panose="020B0604020203020204" pitchFamily="34" charset="0"/>
+                        <a:ea typeface="Intel Clear" panose="020B0604020203020204" pitchFamily="34" charset="0"/>
+                        <a:cs typeface="Intel Clear" panose="020B0604020203020204" pitchFamily="34" charset="0"/>
+                      </a:endParaRPr>
+                    </a:p>
+                  </a:txBody>
+                  <a:tcPr marL="45720" marR="45720" marT="27432" marB="27432" anchor="ctr">
+                    <a:lnL w="19050" cap="flat" cmpd="sng" algn="ctr">
+                      <a:solidFill>
+                        <a:srgbClr val="002060"/>
+                      </a:solidFill>
+                      <a:prstDash val="solid"/>
+                      <a:round/>
+                      <a:headEnd type="none" w="med" len="med"/>
+                      <a:tailEnd type="none" w="med" len="med"/>
+                    </a:lnL>
+                    <a:lnR w="19050" cap="flat" cmpd="sng" algn="ctr">
+                      <a:solidFill>
+                        <a:srgbClr val="002060"/>
+                      </a:solidFill>
+                      <a:prstDash val="solid"/>
+                      <a:round/>
+                      <a:headEnd type="none" w="med" len="med"/>
+                      <a:tailEnd type="none" w="med" len="med"/>
+                    </a:lnR>
+                    <a:lnT w="19050" cap="flat" cmpd="sng" algn="ctr">
+                      <a:solidFill>
+                        <a:srgbClr val="002060"/>
+                      </a:solidFill>
+                      <a:prstDash val="solid"/>
+                      <a:round/>
+                      <a:headEnd type="none" w="med" len="med"/>
+                      <a:tailEnd type="none" w="med" len="med"/>
+                    </a:lnT>
+                    <a:lnB w="19050" cap="flat" cmpd="sng" algn="ctr">
+                      <a:solidFill>
+                        <a:srgbClr val="002060"/>
+                      </a:solidFill>
+                      <a:prstDash val="solid"/>
+                      <a:round/>
+                      <a:headEnd type="none" w="med" len="med"/>
+                      <a:tailEnd type="none" w="med" len="med"/>
+                    </a:lnB>
+                    <a:solidFill>
+                      <a:schemeClr val="bg1">
+                        <a:lumMod val="75000"/>
+                      </a:schemeClr>
                     </a:solidFill>
                   </a:tcPr>
                 </a:tc>
@@ -5743,6 +8350,225 @@
                     </a:solidFill>
                   </a:tcPr>
                 </a:tc>
+                <a:tc>
+                  <a:txBody>
+                    <a:bodyPr/>
+                    <a:lstStyle/>
+                    <a:p>
+                      <a:pPr algn="l" fontAlgn="t"/>
+                      <a:r>
+                        <a:rPr lang="en-US" sz="1200" b="0" i="0" u="none" strike="noStrike" smtClean="0">
+                          <a:solidFill>
+                            <a:srgbClr val="002060"/>
+                          </a:solidFill>
+                          <a:effectLst/>
+                          <a:latin typeface="Intel Clear" panose="020B0604020203020204" pitchFamily="34" charset="0"/>
+                          <a:ea typeface="Intel Clear" panose="020B0604020203020204" pitchFamily="34" charset="0"/>
+                          <a:cs typeface="Intel Clear" panose="020B0604020203020204" pitchFamily="34" charset="0"/>
+                        </a:rPr>
+                        <a:t> </a:t>
+                      </a:r>
+                      <a:endParaRPr lang="en-US" sz="1200" b="0" i="0" u="none" strike="noStrike" dirty="0">
+                        <a:solidFill>
+                          <a:srgbClr val="002060"/>
+                        </a:solidFill>
+                        <a:effectLst/>
+                        <a:latin typeface="Intel Clear" panose="020B0604020203020204" pitchFamily="34" charset="0"/>
+                        <a:ea typeface="Intel Clear" panose="020B0604020203020204" pitchFamily="34" charset="0"/>
+                        <a:cs typeface="Intel Clear" panose="020B0604020203020204" pitchFamily="34" charset="0"/>
+                      </a:endParaRPr>
+                    </a:p>
+                  </a:txBody>
+                  <a:tcPr marL="45720" marR="45720" marT="27432" marB="27432" anchor="ctr">
+                    <a:lnL w="19050" cap="flat" cmpd="sng" algn="ctr">
+                      <a:solidFill>
+                        <a:srgbClr val="002060"/>
+                      </a:solidFill>
+                      <a:prstDash val="solid"/>
+                      <a:round/>
+                      <a:headEnd type="none" w="med" len="med"/>
+                      <a:tailEnd type="none" w="med" len="med"/>
+                    </a:lnL>
+                    <a:lnR w="19050" cap="flat" cmpd="sng" algn="ctr">
+                      <a:solidFill>
+                        <a:srgbClr val="002060"/>
+                      </a:solidFill>
+                      <a:prstDash val="solid"/>
+                      <a:round/>
+                      <a:headEnd type="none" w="med" len="med"/>
+                      <a:tailEnd type="none" w="med" len="med"/>
+                    </a:lnR>
+                    <a:lnT w="19050" cap="flat" cmpd="sng" algn="ctr">
+                      <a:solidFill>
+                        <a:srgbClr val="002060"/>
+                      </a:solidFill>
+                      <a:prstDash val="solid"/>
+                      <a:round/>
+                      <a:headEnd type="none" w="med" len="med"/>
+                      <a:tailEnd type="none" w="med" len="med"/>
+                    </a:lnT>
+                    <a:lnB w="19050" cap="flat" cmpd="sng" algn="ctr">
+                      <a:solidFill>
+                        <a:srgbClr val="002060"/>
+                      </a:solidFill>
+                      <a:prstDash val="solid"/>
+                      <a:round/>
+                      <a:headEnd type="none" w="med" len="med"/>
+                      <a:tailEnd type="none" w="med" len="med"/>
+                    </a:lnB>
+                    <a:solidFill>
+                      <a:schemeClr val="bg1">
+                        <a:lumMod val="75000"/>
+                      </a:schemeClr>
+                    </a:solidFill>
+                  </a:tcPr>
+                </a:tc>
+                <a:tc>
+                  <a:txBody>
+                    <a:bodyPr/>
+                    <a:lstStyle/>
+                    <a:p>
+                      <a:pPr algn="l" fontAlgn="t"/>
+                      <a:r>
+                        <a:rPr lang="en-US" sz="1200" b="0" i="0" u="none" strike="noStrike" smtClean="0">
+                          <a:solidFill>
+                            <a:srgbClr val="002060"/>
+                          </a:solidFill>
+                          <a:effectLst/>
+                          <a:latin typeface="Intel Clear" panose="020B0604020203020204" pitchFamily="34" charset="0"/>
+                          <a:ea typeface="Intel Clear" panose="020B0604020203020204" pitchFamily="34" charset="0"/>
+                          <a:cs typeface="Intel Clear" panose="020B0604020203020204" pitchFamily="34" charset="0"/>
+                        </a:rPr>
+                        <a:t> </a:t>
+                      </a:r>
+                      <a:endParaRPr lang="en-US" sz="1200" b="0" i="0" u="none" strike="noStrike" dirty="0">
+                        <a:solidFill>
+                          <a:srgbClr val="002060"/>
+                        </a:solidFill>
+                        <a:effectLst/>
+                        <a:latin typeface="Intel Clear" panose="020B0604020203020204" pitchFamily="34" charset="0"/>
+                        <a:ea typeface="Intel Clear" panose="020B0604020203020204" pitchFamily="34" charset="0"/>
+                        <a:cs typeface="Intel Clear" panose="020B0604020203020204" pitchFamily="34" charset="0"/>
+                      </a:endParaRPr>
+                    </a:p>
+                  </a:txBody>
+                  <a:tcPr marL="45720" marR="45720" marT="27432" marB="27432" anchor="ctr">
+                    <a:lnL w="19050" cap="flat" cmpd="sng" algn="ctr">
+                      <a:solidFill>
+                        <a:srgbClr val="002060"/>
+                      </a:solidFill>
+                      <a:prstDash val="solid"/>
+                      <a:round/>
+                      <a:headEnd type="none" w="med" len="med"/>
+                      <a:tailEnd type="none" w="med" len="med"/>
+                    </a:lnL>
+                    <a:lnR w="19050" cap="flat" cmpd="sng" algn="ctr">
+                      <a:solidFill>
+                        <a:srgbClr val="002060"/>
+                      </a:solidFill>
+                      <a:prstDash val="solid"/>
+                      <a:round/>
+                      <a:headEnd type="none" w="med" len="med"/>
+                      <a:tailEnd type="none" w="med" len="med"/>
+                    </a:lnR>
+                    <a:lnT w="19050" cap="flat" cmpd="sng" algn="ctr">
+                      <a:solidFill>
+                        <a:srgbClr val="002060"/>
+                      </a:solidFill>
+                      <a:prstDash val="solid"/>
+                      <a:round/>
+                      <a:headEnd type="none" w="med" len="med"/>
+                      <a:tailEnd type="none" w="med" len="med"/>
+                    </a:lnT>
+                    <a:lnB w="19050" cap="flat" cmpd="sng" algn="ctr">
+                      <a:solidFill>
+                        <a:srgbClr val="002060"/>
+                      </a:solidFill>
+                      <a:prstDash val="solid"/>
+                      <a:round/>
+                      <a:headEnd type="none" w="med" len="med"/>
+                      <a:tailEnd type="none" w="med" len="med"/>
+                    </a:lnB>
+                    <a:solidFill>
+                      <a:schemeClr val="bg1">
+                        <a:lumMod val="75000"/>
+                      </a:schemeClr>
+                    </a:solidFill>
+                  </a:tcPr>
+                </a:tc>
+                <a:tc>
+                  <a:txBody>
+                    <a:bodyPr/>
+                    <a:lstStyle/>
+                    <a:p>
+                      <a:pPr algn="l" fontAlgn="t"/>
+                      <a:r>
+                        <a:rPr lang="en-US" sz="1200" b="0" i="0" u="none" strike="noStrike" smtClean="0">
+                          <a:solidFill>
+                            <a:srgbClr val="002060"/>
+                          </a:solidFill>
+                          <a:effectLst/>
+                          <a:latin typeface="Intel Clear" panose="020B0604020203020204" pitchFamily="34" charset="0"/>
+                          <a:ea typeface="Intel Clear" panose="020B0604020203020204" pitchFamily="34" charset="0"/>
+                          <a:cs typeface="Intel Clear" panose="020B0604020203020204" pitchFamily="34" charset="0"/>
+                        </a:rPr>
+                        <a:t> </a:t>
+                      </a:r>
+                      <a:endParaRPr lang="en-US" sz="1200" b="0" i="0" u="none" strike="noStrike" dirty="0">
+                        <a:solidFill>
+                          <a:srgbClr val="002060"/>
+                        </a:solidFill>
+                        <a:effectLst/>
+                        <a:latin typeface="Intel Clear" panose="020B0604020203020204" pitchFamily="34" charset="0"/>
+                        <a:ea typeface="Intel Clear" panose="020B0604020203020204" pitchFamily="34" charset="0"/>
+                        <a:cs typeface="Intel Clear" panose="020B0604020203020204" pitchFamily="34" charset="0"/>
+                      </a:endParaRPr>
+                    </a:p>
+                  </a:txBody>
+                  <a:tcPr marL="45720" marR="45720" marT="27432" marB="27432" anchor="ctr">
+                    <a:lnL w="19050" cap="flat" cmpd="sng" algn="ctr">
+                      <a:solidFill>
+                        <a:srgbClr val="002060"/>
+                      </a:solidFill>
+                      <a:prstDash val="solid"/>
+                      <a:round/>
+                      <a:headEnd type="none" w="med" len="med"/>
+                      <a:tailEnd type="none" w="med" len="med"/>
+                    </a:lnL>
+                    <a:lnR w="19050" cap="flat" cmpd="sng" algn="ctr">
+                      <a:solidFill>
+                        <a:srgbClr val="002060"/>
+                      </a:solidFill>
+                      <a:prstDash val="solid"/>
+                      <a:round/>
+                      <a:headEnd type="none" w="med" len="med"/>
+                      <a:tailEnd type="none" w="med" len="med"/>
+                    </a:lnR>
+                    <a:lnT w="19050" cap="flat" cmpd="sng" algn="ctr">
+                      <a:solidFill>
+                        <a:srgbClr val="002060"/>
+                      </a:solidFill>
+                      <a:prstDash val="solid"/>
+                      <a:round/>
+                      <a:headEnd type="none" w="med" len="med"/>
+                      <a:tailEnd type="none" w="med" len="med"/>
+                    </a:lnT>
+                    <a:lnB w="19050" cap="flat" cmpd="sng" algn="ctr">
+                      <a:solidFill>
+                        <a:srgbClr val="002060"/>
+                      </a:solidFill>
+                      <a:prstDash val="solid"/>
+                      <a:round/>
+                      <a:headEnd type="none" w="med" len="med"/>
+                      <a:tailEnd type="none" w="med" len="med"/>
+                    </a:lnB>
+                    <a:solidFill>
+                      <a:schemeClr val="bg1">
+                        <a:lumMod val="75000"/>
+                      </a:schemeClr>
+                    </a:solidFill>
+                  </a:tcPr>
+                </a:tc>
                 <a:extLst>
                   <a:ext uri="{0D108BD9-81ED-4DB2-BD59-A6C34878D82A}">
                     <a16:rowId xmlns:a16="http://schemas.microsoft.com/office/drawing/2014/main" val="4096294230"/>
@@ -5818,6 +8644,225 @@
                     </a:lnB>
                     <a:solidFill>
                       <a:srgbClr val="BFBFBF"/>
+                    </a:solidFill>
+                  </a:tcPr>
+                </a:tc>
+                <a:tc>
+                  <a:txBody>
+                    <a:bodyPr/>
+                    <a:lstStyle/>
+                    <a:p>
+                      <a:pPr algn="l" fontAlgn="t"/>
+                      <a:r>
+                        <a:rPr lang="en-US" sz="1200" b="0" i="0" u="none" strike="noStrike" smtClean="0">
+                          <a:solidFill>
+                            <a:srgbClr val="002060"/>
+                          </a:solidFill>
+                          <a:effectLst/>
+                          <a:latin typeface="Intel Clear" panose="020B0604020203020204" pitchFamily="34" charset="0"/>
+                          <a:ea typeface="Intel Clear" panose="020B0604020203020204" pitchFamily="34" charset="0"/>
+                          <a:cs typeface="Intel Clear" panose="020B0604020203020204" pitchFamily="34" charset="0"/>
+                        </a:rPr>
+                        <a:t> </a:t>
+                      </a:r>
+                      <a:endParaRPr lang="en-US" sz="1200" b="0" i="0" u="none" strike="noStrike" dirty="0">
+                        <a:solidFill>
+                          <a:srgbClr val="002060"/>
+                        </a:solidFill>
+                        <a:effectLst/>
+                        <a:latin typeface="Intel Clear" panose="020B0604020203020204" pitchFamily="34" charset="0"/>
+                        <a:ea typeface="Intel Clear" panose="020B0604020203020204" pitchFamily="34" charset="0"/>
+                        <a:cs typeface="Intel Clear" panose="020B0604020203020204" pitchFamily="34" charset="0"/>
+                      </a:endParaRPr>
+                    </a:p>
+                  </a:txBody>
+                  <a:tcPr marL="45720" marR="45720" marT="27432" marB="27432" anchor="ctr">
+                    <a:lnL w="19050" cap="flat" cmpd="sng" algn="ctr">
+                      <a:solidFill>
+                        <a:srgbClr val="002060"/>
+                      </a:solidFill>
+                      <a:prstDash val="solid"/>
+                      <a:round/>
+                      <a:headEnd type="none" w="med" len="med"/>
+                      <a:tailEnd type="none" w="med" len="med"/>
+                    </a:lnL>
+                    <a:lnR w="19050" cap="flat" cmpd="sng" algn="ctr">
+                      <a:solidFill>
+                        <a:srgbClr val="002060"/>
+                      </a:solidFill>
+                      <a:prstDash val="solid"/>
+                      <a:round/>
+                      <a:headEnd type="none" w="med" len="med"/>
+                      <a:tailEnd type="none" w="med" len="med"/>
+                    </a:lnR>
+                    <a:lnT w="19050" cap="flat" cmpd="sng" algn="ctr">
+                      <a:solidFill>
+                        <a:srgbClr val="002060"/>
+                      </a:solidFill>
+                      <a:prstDash val="solid"/>
+                      <a:round/>
+                      <a:headEnd type="none" w="med" len="med"/>
+                      <a:tailEnd type="none" w="med" len="med"/>
+                    </a:lnT>
+                    <a:lnB w="19050" cap="flat" cmpd="sng" algn="ctr">
+                      <a:solidFill>
+                        <a:srgbClr val="002060"/>
+                      </a:solidFill>
+                      <a:prstDash val="solid"/>
+                      <a:round/>
+                      <a:headEnd type="none" w="med" len="med"/>
+                      <a:tailEnd type="none" w="med" len="med"/>
+                    </a:lnB>
+                    <a:solidFill>
+                      <a:schemeClr val="bg1">
+                        <a:lumMod val="75000"/>
+                      </a:schemeClr>
+                    </a:solidFill>
+                  </a:tcPr>
+                </a:tc>
+                <a:tc>
+                  <a:txBody>
+                    <a:bodyPr/>
+                    <a:lstStyle/>
+                    <a:p>
+                      <a:pPr algn="l" fontAlgn="t"/>
+                      <a:r>
+                        <a:rPr lang="en-US" sz="1200" b="0" i="0" u="none" strike="noStrike" smtClean="0">
+                          <a:solidFill>
+                            <a:srgbClr val="002060"/>
+                          </a:solidFill>
+                          <a:effectLst/>
+                          <a:latin typeface="Intel Clear" panose="020B0604020203020204" pitchFamily="34" charset="0"/>
+                          <a:ea typeface="Intel Clear" panose="020B0604020203020204" pitchFamily="34" charset="0"/>
+                          <a:cs typeface="Intel Clear" panose="020B0604020203020204" pitchFamily="34" charset="0"/>
+                        </a:rPr>
+                        <a:t> </a:t>
+                      </a:r>
+                      <a:endParaRPr lang="en-US" sz="1200" b="0" i="0" u="none" strike="noStrike" dirty="0">
+                        <a:solidFill>
+                          <a:srgbClr val="002060"/>
+                        </a:solidFill>
+                        <a:effectLst/>
+                        <a:latin typeface="Intel Clear" panose="020B0604020203020204" pitchFamily="34" charset="0"/>
+                        <a:ea typeface="Intel Clear" panose="020B0604020203020204" pitchFamily="34" charset="0"/>
+                        <a:cs typeface="Intel Clear" panose="020B0604020203020204" pitchFamily="34" charset="0"/>
+                      </a:endParaRPr>
+                    </a:p>
+                  </a:txBody>
+                  <a:tcPr marL="45720" marR="45720" marT="27432" marB="27432" anchor="ctr">
+                    <a:lnL w="19050" cap="flat" cmpd="sng" algn="ctr">
+                      <a:solidFill>
+                        <a:srgbClr val="002060"/>
+                      </a:solidFill>
+                      <a:prstDash val="solid"/>
+                      <a:round/>
+                      <a:headEnd type="none" w="med" len="med"/>
+                      <a:tailEnd type="none" w="med" len="med"/>
+                    </a:lnL>
+                    <a:lnR w="19050" cap="flat" cmpd="sng" algn="ctr">
+                      <a:solidFill>
+                        <a:srgbClr val="002060"/>
+                      </a:solidFill>
+                      <a:prstDash val="solid"/>
+                      <a:round/>
+                      <a:headEnd type="none" w="med" len="med"/>
+                      <a:tailEnd type="none" w="med" len="med"/>
+                    </a:lnR>
+                    <a:lnT w="19050" cap="flat" cmpd="sng" algn="ctr">
+                      <a:solidFill>
+                        <a:srgbClr val="002060"/>
+                      </a:solidFill>
+                      <a:prstDash val="solid"/>
+                      <a:round/>
+                      <a:headEnd type="none" w="med" len="med"/>
+                      <a:tailEnd type="none" w="med" len="med"/>
+                    </a:lnT>
+                    <a:lnB w="19050" cap="flat" cmpd="sng" algn="ctr">
+                      <a:solidFill>
+                        <a:srgbClr val="002060"/>
+                      </a:solidFill>
+                      <a:prstDash val="solid"/>
+                      <a:round/>
+                      <a:headEnd type="none" w="med" len="med"/>
+                      <a:tailEnd type="none" w="med" len="med"/>
+                    </a:lnB>
+                    <a:solidFill>
+                      <a:schemeClr val="bg1">
+                        <a:lumMod val="75000"/>
+                      </a:schemeClr>
+                    </a:solidFill>
+                  </a:tcPr>
+                </a:tc>
+                <a:tc>
+                  <a:txBody>
+                    <a:bodyPr/>
+                    <a:lstStyle/>
+                    <a:p>
+                      <a:pPr algn="l" fontAlgn="t"/>
+                      <a:r>
+                        <a:rPr lang="en-US" sz="1200" b="0" i="0" u="none" strike="noStrike" smtClean="0">
+                          <a:solidFill>
+                            <a:srgbClr val="002060"/>
+                          </a:solidFill>
+                          <a:effectLst/>
+                          <a:latin typeface="Intel Clear" panose="020B0604020203020204" pitchFamily="34" charset="0"/>
+                          <a:ea typeface="Intel Clear" panose="020B0604020203020204" pitchFamily="34" charset="0"/>
+                          <a:cs typeface="Intel Clear" panose="020B0604020203020204" pitchFamily="34" charset="0"/>
+                        </a:rPr>
+                        <a:t> </a:t>
+                      </a:r>
+                      <a:endParaRPr lang="en-US" sz="1200" b="0" i="0" u="none" strike="noStrike" dirty="0">
+                        <a:solidFill>
+                          <a:srgbClr val="002060"/>
+                        </a:solidFill>
+                        <a:effectLst/>
+                        <a:latin typeface="Intel Clear" panose="020B0604020203020204" pitchFamily="34" charset="0"/>
+                        <a:ea typeface="Intel Clear" panose="020B0604020203020204" pitchFamily="34" charset="0"/>
+                        <a:cs typeface="Intel Clear" panose="020B0604020203020204" pitchFamily="34" charset="0"/>
+                      </a:endParaRPr>
+                    </a:p>
+                  </a:txBody>
+                  <a:tcPr marL="45720" marR="45720" marT="27432" marB="27432" anchor="ctr">
+                    <a:lnL w="19050" cap="flat" cmpd="sng" algn="ctr">
+                      <a:solidFill>
+                        <a:srgbClr val="002060"/>
+                      </a:solidFill>
+                      <a:prstDash val="solid"/>
+                      <a:round/>
+                      <a:headEnd type="none" w="med" len="med"/>
+                      <a:tailEnd type="none" w="med" len="med"/>
+                    </a:lnL>
+                    <a:lnR w="19050" cap="flat" cmpd="sng" algn="ctr">
+                      <a:solidFill>
+                        <a:srgbClr val="002060"/>
+                      </a:solidFill>
+                      <a:prstDash val="solid"/>
+                      <a:round/>
+                      <a:headEnd type="none" w="med" len="med"/>
+                      <a:tailEnd type="none" w="med" len="med"/>
+                    </a:lnR>
+                    <a:lnT w="19050" cap="flat" cmpd="sng" algn="ctr">
+                      <a:solidFill>
+                        <a:srgbClr val="002060"/>
+                      </a:solidFill>
+                      <a:prstDash val="solid"/>
+                      <a:round/>
+                      <a:headEnd type="none" w="med" len="med"/>
+                      <a:tailEnd type="none" w="med" len="med"/>
+                    </a:lnT>
+                    <a:lnB w="19050" cap="flat" cmpd="sng" algn="ctr">
+                      <a:solidFill>
+                        <a:srgbClr val="002060"/>
+                      </a:solidFill>
+                      <a:prstDash val="solid"/>
+                      <a:round/>
+                      <a:headEnd type="none" w="med" len="med"/>
+                      <a:tailEnd type="none" w="med" len="med"/>
+                    </a:lnB>
+                    <a:solidFill>
+                      <a:schemeClr val="bg1">
+                        <a:lumMod val="75000"/>
+                      </a:schemeClr>
                     </a:solidFill>
                   </a:tcPr>
                 </a:tc>
@@ -6045,6 +9090,225 @@
                     </a:solidFill>
                   </a:tcPr>
                 </a:tc>
+                <a:tc>
+                  <a:txBody>
+                    <a:bodyPr/>
+                    <a:lstStyle/>
+                    <a:p>
+                      <a:pPr algn="l" fontAlgn="t"/>
+                      <a:r>
+                        <a:rPr lang="en-US" sz="1200" b="0" i="0" u="none" strike="noStrike" smtClean="0">
+                          <a:solidFill>
+                            <a:srgbClr val="002060"/>
+                          </a:solidFill>
+                          <a:effectLst/>
+                          <a:latin typeface="Intel Clear" panose="020B0604020203020204" pitchFamily="34" charset="0"/>
+                          <a:ea typeface="Intel Clear" panose="020B0604020203020204" pitchFamily="34" charset="0"/>
+                          <a:cs typeface="Intel Clear" panose="020B0604020203020204" pitchFamily="34" charset="0"/>
+                        </a:rPr>
+                        <a:t> </a:t>
+                      </a:r>
+                      <a:endParaRPr lang="en-US" sz="1200" b="0" i="0" u="none" strike="noStrike" dirty="0">
+                        <a:solidFill>
+                          <a:srgbClr val="002060"/>
+                        </a:solidFill>
+                        <a:effectLst/>
+                        <a:latin typeface="Intel Clear" panose="020B0604020203020204" pitchFamily="34" charset="0"/>
+                        <a:ea typeface="Intel Clear" panose="020B0604020203020204" pitchFamily="34" charset="0"/>
+                        <a:cs typeface="Intel Clear" panose="020B0604020203020204" pitchFamily="34" charset="0"/>
+                      </a:endParaRPr>
+                    </a:p>
+                  </a:txBody>
+                  <a:tcPr marL="45720" marR="45720" marT="27432" marB="27432" anchor="ctr">
+                    <a:lnL w="19050" cap="flat" cmpd="sng" algn="ctr">
+                      <a:solidFill>
+                        <a:srgbClr val="002060"/>
+                      </a:solidFill>
+                      <a:prstDash val="solid"/>
+                      <a:round/>
+                      <a:headEnd type="none" w="med" len="med"/>
+                      <a:tailEnd type="none" w="med" len="med"/>
+                    </a:lnL>
+                    <a:lnR w="19050" cap="flat" cmpd="sng" algn="ctr">
+                      <a:solidFill>
+                        <a:srgbClr val="002060"/>
+                      </a:solidFill>
+                      <a:prstDash val="solid"/>
+                      <a:round/>
+                      <a:headEnd type="none" w="med" len="med"/>
+                      <a:tailEnd type="none" w="med" len="med"/>
+                    </a:lnR>
+                    <a:lnT w="19050" cap="flat" cmpd="sng" algn="ctr">
+                      <a:solidFill>
+                        <a:srgbClr val="002060"/>
+                      </a:solidFill>
+                      <a:prstDash val="solid"/>
+                      <a:round/>
+                      <a:headEnd type="none" w="med" len="med"/>
+                      <a:tailEnd type="none" w="med" len="med"/>
+                    </a:lnT>
+                    <a:lnB w="19050" cap="flat" cmpd="sng" algn="ctr">
+                      <a:solidFill>
+                        <a:srgbClr val="002060"/>
+                      </a:solidFill>
+                      <a:prstDash val="solid"/>
+                      <a:round/>
+                      <a:headEnd type="none" w="med" len="med"/>
+                      <a:tailEnd type="none" w="med" len="med"/>
+                    </a:lnB>
+                    <a:solidFill>
+                      <a:schemeClr val="bg1">
+                        <a:lumMod val="75000"/>
+                      </a:schemeClr>
+                    </a:solidFill>
+                  </a:tcPr>
+                </a:tc>
+                <a:tc>
+                  <a:txBody>
+                    <a:bodyPr/>
+                    <a:lstStyle/>
+                    <a:p>
+                      <a:pPr algn="l" fontAlgn="t"/>
+                      <a:r>
+                        <a:rPr lang="en-US" sz="1200" b="0" i="0" u="none" strike="noStrike" smtClean="0">
+                          <a:solidFill>
+                            <a:srgbClr val="002060"/>
+                          </a:solidFill>
+                          <a:effectLst/>
+                          <a:latin typeface="Intel Clear" panose="020B0604020203020204" pitchFamily="34" charset="0"/>
+                          <a:ea typeface="Intel Clear" panose="020B0604020203020204" pitchFamily="34" charset="0"/>
+                          <a:cs typeface="Intel Clear" panose="020B0604020203020204" pitchFamily="34" charset="0"/>
+                        </a:rPr>
+                        <a:t> </a:t>
+                      </a:r>
+                      <a:endParaRPr lang="en-US" sz="1200" b="0" i="0" u="none" strike="noStrike" dirty="0">
+                        <a:solidFill>
+                          <a:srgbClr val="002060"/>
+                        </a:solidFill>
+                        <a:effectLst/>
+                        <a:latin typeface="Intel Clear" panose="020B0604020203020204" pitchFamily="34" charset="0"/>
+                        <a:ea typeface="Intel Clear" panose="020B0604020203020204" pitchFamily="34" charset="0"/>
+                        <a:cs typeface="Intel Clear" panose="020B0604020203020204" pitchFamily="34" charset="0"/>
+                      </a:endParaRPr>
+                    </a:p>
+                  </a:txBody>
+                  <a:tcPr marL="45720" marR="45720" marT="27432" marB="27432" anchor="ctr">
+                    <a:lnL w="19050" cap="flat" cmpd="sng" algn="ctr">
+                      <a:solidFill>
+                        <a:srgbClr val="002060"/>
+                      </a:solidFill>
+                      <a:prstDash val="solid"/>
+                      <a:round/>
+                      <a:headEnd type="none" w="med" len="med"/>
+                      <a:tailEnd type="none" w="med" len="med"/>
+                    </a:lnL>
+                    <a:lnR w="19050" cap="flat" cmpd="sng" algn="ctr">
+                      <a:solidFill>
+                        <a:srgbClr val="002060"/>
+                      </a:solidFill>
+                      <a:prstDash val="solid"/>
+                      <a:round/>
+                      <a:headEnd type="none" w="med" len="med"/>
+                      <a:tailEnd type="none" w="med" len="med"/>
+                    </a:lnR>
+                    <a:lnT w="19050" cap="flat" cmpd="sng" algn="ctr">
+                      <a:solidFill>
+                        <a:srgbClr val="002060"/>
+                      </a:solidFill>
+                      <a:prstDash val="solid"/>
+                      <a:round/>
+                      <a:headEnd type="none" w="med" len="med"/>
+                      <a:tailEnd type="none" w="med" len="med"/>
+                    </a:lnT>
+                    <a:lnB w="19050" cap="flat" cmpd="sng" algn="ctr">
+                      <a:solidFill>
+                        <a:srgbClr val="002060"/>
+                      </a:solidFill>
+                      <a:prstDash val="solid"/>
+                      <a:round/>
+                      <a:headEnd type="none" w="med" len="med"/>
+                      <a:tailEnd type="none" w="med" len="med"/>
+                    </a:lnB>
+                    <a:solidFill>
+                      <a:schemeClr val="bg1">
+                        <a:lumMod val="75000"/>
+                      </a:schemeClr>
+                    </a:solidFill>
+                  </a:tcPr>
+                </a:tc>
+                <a:tc>
+                  <a:txBody>
+                    <a:bodyPr/>
+                    <a:lstStyle/>
+                    <a:p>
+                      <a:pPr algn="l" fontAlgn="t"/>
+                      <a:r>
+                        <a:rPr lang="en-US" sz="1200" b="0" i="0" u="none" strike="noStrike" smtClean="0">
+                          <a:solidFill>
+                            <a:srgbClr val="002060"/>
+                          </a:solidFill>
+                          <a:effectLst/>
+                          <a:latin typeface="Intel Clear" panose="020B0604020203020204" pitchFamily="34" charset="0"/>
+                          <a:ea typeface="Intel Clear" panose="020B0604020203020204" pitchFamily="34" charset="0"/>
+                          <a:cs typeface="Intel Clear" panose="020B0604020203020204" pitchFamily="34" charset="0"/>
+                        </a:rPr>
+                        <a:t> </a:t>
+                      </a:r>
+                      <a:endParaRPr lang="en-US" sz="1200" b="0" i="0" u="none" strike="noStrike" dirty="0">
+                        <a:solidFill>
+                          <a:srgbClr val="002060"/>
+                        </a:solidFill>
+                        <a:effectLst/>
+                        <a:latin typeface="Intel Clear" panose="020B0604020203020204" pitchFamily="34" charset="0"/>
+                        <a:ea typeface="Intel Clear" panose="020B0604020203020204" pitchFamily="34" charset="0"/>
+                        <a:cs typeface="Intel Clear" panose="020B0604020203020204" pitchFamily="34" charset="0"/>
+                      </a:endParaRPr>
+                    </a:p>
+                  </a:txBody>
+                  <a:tcPr marL="45720" marR="45720" marT="27432" marB="27432" anchor="ctr">
+                    <a:lnL w="19050" cap="flat" cmpd="sng" algn="ctr">
+                      <a:solidFill>
+                        <a:srgbClr val="002060"/>
+                      </a:solidFill>
+                      <a:prstDash val="solid"/>
+                      <a:round/>
+                      <a:headEnd type="none" w="med" len="med"/>
+                      <a:tailEnd type="none" w="med" len="med"/>
+                    </a:lnL>
+                    <a:lnR w="19050" cap="flat" cmpd="sng" algn="ctr">
+                      <a:solidFill>
+                        <a:srgbClr val="002060"/>
+                      </a:solidFill>
+                      <a:prstDash val="solid"/>
+                      <a:round/>
+                      <a:headEnd type="none" w="med" len="med"/>
+                      <a:tailEnd type="none" w="med" len="med"/>
+                    </a:lnR>
+                    <a:lnT w="19050" cap="flat" cmpd="sng" algn="ctr">
+                      <a:solidFill>
+                        <a:srgbClr val="002060"/>
+                      </a:solidFill>
+                      <a:prstDash val="solid"/>
+                      <a:round/>
+                      <a:headEnd type="none" w="med" len="med"/>
+                      <a:tailEnd type="none" w="med" len="med"/>
+                    </a:lnT>
+                    <a:lnB w="19050" cap="flat" cmpd="sng" algn="ctr">
+                      <a:solidFill>
+                        <a:srgbClr val="002060"/>
+                      </a:solidFill>
+                      <a:prstDash val="solid"/>
+                      <a:round/>
+                      <a:headEnd type="none" w="med" len="med"/>
+                      <a:tailEnd type="none" w="med" len="med"/>
+                    </a:lnB>
+                    <a:solidFill>
+                      <a:schemeClr val="bg1">
+                        <a:lumMod val="75000"/>
+                      </a:schemeClr>
+                    </a:solidFill>
+                  </a:tcPr>
+                </a:tc>
                 <a:extLst>
                   <a:ext uri="{0D108BD9-81ED-4DB2-BD59-A6C34878D82A}">
                     <a16:rowId xmlns:a16="http://schemas.microsoft.com/office/drawing/2014/main" val="3232045996"/>
@@ -6120,6 +9384,225 @@
                     </a:lnB>
                     <a:solidFill>
                       <a:srgbClr val="BFBFBF"/>
+                    </a:solidFill>
+                  </a:tcPr>
+                </a:tc>
+                <a:tc>
+                  <a:txBody>
+                    <a:bodyPr/>
+                    <a:lstStyle/>
+                    <a:p>
+                      <a:pPr algn="l" fontAlgn="t"/>
+                      <a:r>
+                        <a:rPr lang="en-US" sz="1200" b="0" i="0" u="none" strike="noStrike" smtClean="0">
+                          <a:solidFill>
+                            <a:srgbClr val="002060"/>
+                          </a:solidFill>
+                          <a:effectLst/>
+                          <a:latin typeface="Intel Clear" panose="020B0604020203020204" pitchFamily="34" charset="0"/>
+                          <a:ea typeface="Intel Clear" panose="020B0604020203020204" pitchFamily="34" charset="0"/>
+                          <a:cs typeface="Intel Clear" panose="020B0604020203020204" pitchFamily="34" charset="0"/>
+                        </a:rPr>
+                        <a:t> </a:t>
+                      </a:r>
+                      <a:endParaRPr lang="en-US" sz="1200" b="0" i="0" u="none" strike="noStrike" dirty="0">
+                        <a:solidFill>
+                          <a:srgbClr val="002060"/>
+                        </a:solidFill>
+                        <a:effectLst/>
+                        <a:latin typeface="Intel Clear" panose="020B0604020203020204" pitchFamily="34" charset="0"/>
+                        <a:ea typeface="Intel Clear" panose="020B0604020203020204" pitchFamily="34" charset="0"/>
+                        <a:cs typeface="Intel Clear" panose="020B0604020203020204" pitchFamily="34" charset="0"/>
+                      </a:endParaRPr>
+                    </a:p>
+                  </a:txBody>
+                  <a:tcPr marL="45720" marR="45720" marT="27432" marB="27432" anchor="ctr">
+                    <a:lnL w="19050" cap="flat" cmpd="sng" algn="ctr">
+                      <a:solidFill>
+                        <a:srgbClr val="002060"/>
+                      </a:solidFill>
+                      <a:prstDash val="solid"/>
+                      <a:round/>
+                      <a:headEnd type="none" w="med" len="med"/>
+                      <a:tailEnd type="none" w="med" len="med"/>
+                    </a:lnL>
+                    <a:lnR w="19050" cap="flat" cmpd="sng" algn="ctr">
+                      <a:solidFill>
+                        <a:srgbClr val="002060"/>
+                      </a:solidFill>
+                      <a:prstDash val="solid"/>
+                      <a:round/>
+                      <a:headEnd type="none" w="med" len="med"/>
+                      <a:tailEnd type="none" w="med" len="med"/>
+                    </a:lnR>
+                    <a:lnT w="19050" cap="flat" cmpd="sng" algn="ctr">
+                      <a:solidFill>
+                        <a:srgbClr val="002060"/>
+                      </a:solidFill>
+                      <a:prstDash val="solid"/>
+                      <a:round/>
+                      <a:headEnd type="none" w="med" len="med"/>
+                      <a:tailEnd type="none" w="med" len="med"/>
+                    </a:lnT>
+                    <a:lnB w="19050" cap="flat" cmpd="sng" algn="ctr">
+                      <a:solidFill>
+                        <a:srgbClr val="002060"/>
+                      </a:solidFill>
+                      <a:prstDash val="solid"/>
+                      <a:round/>
+                      <a:headEnd type="none" w="med" len="med"/>
+                      <a:tailEnd type="none" w="med" len="med"/>
+                    </a:lnB>
+                    <a:solidFill>
+                      <a:schemeClr val="bg1">
+                        <a:lumMod val="75000"/>
+                      </a:schemeClr>
+                    </a:solidFill>
+                  </a:tcPr>
+                </a:tc>
+                <a:tc>
+                  <a:txBody>
+                    <a:bodyPr/>
+                    <a:lstStyle/>
+                    <a:p>
+                      <a:pPr algn="l" fontAlgn="t"/>
+                      <a:r>
+                        <a:rPr lang="en-US" sz="1200" b="0" i="0" u="none" strike="noStrike" smtClean="0">
+                          <a:solidFill>
+                            <a:srgbClr val="002060"/>
+                          </a:solidFill>
+                          <a:effectLst/>
+                          <a:latin typeface="Intel Clear" panose="020B0604020203020204" pitchFamily="34" charset="0"/>
+                          <a:ea typeface="Intel Clear" panose="020B0604020203020204" pitchFamily="34" charset="0"/>
+                          <a:cs typeface="Intel Clear" panose="020B0604020203020204" pitchFamily="34" charset="0"/>
+                        </a:rPr>
+                        <a:t> </a:t>
+                      </a:r>
+                      <a:endParaRPr lang="en-US" sz="1200" b="0" i="0" u="none" strike="noStrike" dirty="0">
+                        <a:solidFill>
+                          <a:srgbClr val="002060"/>
+                        </a:solidFill>
+                        <a:effectLst/>
+                        <a:latin typeface="Intel Clear" panose="020B0604020203020204" pitchFamily="34" charset="0"/>
+                        <a:ea typeface="Intel Clear" panose="020B0604020203020204" pitchFamily="34" charset="0"/>
+                        <a:cs typeface="Intel Clear" panose="020B0604020203020204" pitchFamily="34" charset="0"/>
+                      </a:endParaRPr>
+                    </a:p>
+                  </a:txBody>
+                  <a:tcPr marL="45720" marR="45720" marT="27432" marB="27432" anchor="ctr">
+                    <a:lnL w="19050" cap="flat" cmpd="sng" algn="ctr">
+                      <a:solidFill>
+                        <a:srgbClr val="002060"/>
+                      </a:solidFill>
+                      <a:prstDash val="solid"/>
+                      <a:round/>
+                      <a:headEnd type="none" w="med" len="med"/>
+                      <a:tailEnd type="none" w="med" len="med"/>
+                    </a:lnL>
+                    <a:lnR w="19050" cap="flat" cmpd="sng" algn="ctr">
+                      <a:solidFill>
+                        <a:srgbClr val="002060"/>
+                      </a:solidFill>
+                      <a:prstDash val="solid"/>
+                      <a:round/>
+                      <a:headEnd type="none" w="med" len="med"/>
+                      <a:tailEnd type="none" w="med" len="med"/>
+                    </a:lnR>
+                    <a:lnT w="19050" cap="flat" cmpd="sng" algn="ctr">
+                      <a:solidFill>
+                        <a:srgbClr val="002060"/>
+                      </a:solidFill>
+                      <a:prstDash val="solid"/>
+                      <a:round/>
+                      <a:headEnd type="none" w="med" len="med"/>
+                      <a:tailEnd type="none" w="med" len="med"/>
+                    </a:lnT>
+                    <a:lnB w="19050" cap="flat" cmpd="sng" algn="ctr">
+                      <a:solidFill>
+                        <a:srgbClr val="002060"/>
+                      </a:solidFill>
+                      <a:prstDash val="solid"/>
+                      <a:round/>
+                      <a:headEnd type="none" w="med" len="med"/>
+                      <a:tailEnd type="none" w="med" len="med"/>
+                    </a:lnB>
+                    <a:solidFill>
+                      <a:schemeClr val="bg1">
+                        <a:lumMod val="75000"/>
+                      </a:schemeClr>
+                    </a:solidFill>
+                  </a:tcPr>
+                </a:tc>
+                <a:tc>
+                  <a:txBody>
+                    <a:bodyPr/>
+                    <a:lstStyle/>
+                    <a:p>
+                      <a:pPr algn="l" fontAlgn="t"/>
+                      <a:r>
+                        <a:rPr lang="en-US" sz="1200" b="0" i="0" u="none" strike="noStrike" smtClean="0">
+                          <a:solidFill>
+                            <a:srgbClr val="002060"/>
+                          </a:solidFill>
+                          <a:effectLst/>
+                          <a:latin typeface="Intel Clear" panose="020B0604020203020204" pitchFamily="34" charset="0"/>
+                          <a:ea typeface="Intel Clear" panose="020B0604020203020204" pitchFamily="34" charset="0"/>
+                          <a:cs typeface="Intel Clear" panose="020B0604020203020204" pitchFamily="34" charset="0"/>
+                        </a:rPr>
+                        <a:t> </a:t>
+                      </a:r>
+                      <a:endParaRPr lang="en-US" sz="1200" b="0" i="0" u="none" strike="noStrike" dirty="0">
+                        <a:solidFill>
+                          <a:srgbClr val="002060"/>
+                        </a:solidFill>
+                        <a:effectLst/>
+                        <a:latin typeface="Intel Clear" panose="020B0604020203020204" pitchFamily="34" charset="0"/>
+                        <a:ea typeface="Intel Clear" panose="020B0604020203020204" pitchFamily="34" charset="0"/>
+                        <a:cs typeface="Intel Clear" panose="020B0604020203020204" pitchFamily="34" charset="0"/>
+                      </a:endParaRPr>
+                    </a:p>
+                  </a:txBody>
+                  <a:tcPr marL="45720" marR="45720" marT="27432" marB="27432" anchor="ctr">
+                    <a:lnL w="19050" cap="flat" cmpd="sng" algn="ctr">
+                      <a:solidFill>
+                        <a:srgbClr val="002060"/>
+                      </a:solidFill>
+                      <a:prstDash val="solid"/>
+                      <a:round/>
+                      <a:headEnd type="none" w="med" len="med"/>
+                      <a:tailEnd type="none" w="med" len="med"/>
+                    </a:lnL>
+                    <a:lnR w="19050" cap="flat" cmpd="sng" algn="ctr">
+                      <a:solidFill>
+                        <a:srgbClr val="002060"/>
+                      </a:solidFill>
+                      <a:prstDash val="solid"/>
+                      <a:round/>
+                      <a:headEnd type="none" w="med" len="med"/>
+                      <a:tailEnd type="none" w="med" len="med"/>
+                    </a:lnR>
+                    <a:lnT w="19050" cap="flat" cmpd="sng" algn="ctr">
+                      <a:solidFill>
+                        <a:srgbClr val="002060"/>
+                      </a:solidFill>
+                      <a:prstDash val="solid"/>
+                      <a:round/>
+                      <a:headEnd type="none" w="med" len="med"/>
+                      <a:tailEnd type="none" w="med" len="med"/>
+                    </a:lnT>
+                    <a:lnB w="19050" cap="flat" cmpd="sng" algn="ctr">
+                      <a:solidFill>
+                        <a:srgbClr val="002060"/>
+                      </a:solidFill>
+                      <a:prstDash val="solid"/>
+                      <a:round/>
+                      <a:headEnd type="none" w="med" len="med"/>
+                      <a:tailEnd type="none" w="med" len="med"/>
+                    </a:lnB>
+                    <a:solidFill>
+                      <a:schemeClr val="bg1">
+                        <a:lumMod val="75000"/>
+                      </a:schemeClr>
                     </a:solidFill>
                   </a:tcPr>
                 </a:tc>
@@ -6347,6 +9830,225 @@
                     </a:solidFill>
                   </a:tcPr>
                 </a:tc>
+                <a:tc>
+                  <a:txBody>
+                    <a:bodyPr/>
+                    <a:lstStyle/>
+                    <a:p>
+                      <a:pPr algn="l" fontAlgn="t"/>
+                      <a:r>
+                        <a:rPr lang="en-US" sz="1200" b="0" i="0" u="none" strike="noStrike" smtClean="0">
+                          <a:solidFill>
+                            <a:srgbClr val="002060"/>
+                          </a:solidFill>
+                          <a:effectLst/>
+                          <a:latin typeface="Intel Clear" panose="020B0604020203020204" pitchFamily="34" charset="0"/>
+                          <a:ea typeface="Intel Clear" panose="020B0604020203020204" pitchFamily="34" charset="0"/>
+                          <a:cs typeface="Intel Clear" panose="020B0604020203020204" pitchFamily="34" charset="0"/>
+                        </a:rPr>
+                        <a:t> </a:t>
+                      </a:r>
+                      <a:endParaRPr lang="en-US" sz="1200" b="0" i="0" u="none" strike="noStrike" dirty="0">
+                        <a:solidFill>
+                          <a:srgbClr val="002060"/>
+                        </a:solidFill>
+                        <a:effectLst/>
+                        <a:latin typeface="Intel Clear" panose="020B0604020203020204" pitchFamily="34" charset="0"/>
+                        <a:ea typeface="Intel Clear" panose="020B0604020203020204" pitchFamily="34" charset="0"/>
+                        <a:cs typeface="Intel Clear" panose="020B0604020203020204" pitchFamily="34" charset="0"/>
+                      </a:endParaRPr>
+                    </a:p>
+                  </a:txBody>
+                  <a:tcPr marL="45720" marR="45720" marT="27432" marB="27432" anchor="ctr">
+                    <a:lnL w="19050" cap="flat" cmpd="sng" algn="ctr">
+                      <a:solidFill>
+                        <a:srgbClr val="002060"/>
+                      </a:solidFill>
+                      <a:prstDash val="solid"/>
+                      <a:round/>
+                      <a:headEnd type="none" w="med" len="med"/>
+                      <a:tailEnd type="none" w="med" len="med"/>
+                    </a:lnL>
+                    <a:lnR w="19050" cap="flat" cmpd="sng" algn="ctr">
+                      <a:solidFill>
+                        <a:srgbClr val="002060"/>
+                      </a:solidFill>
+                      <a:prstDash val="solid"/>
+                      <a:round/>
+                      <a:headEnd type="none" w="med" len="med"/>
+                      <a:tailEnd type="none" w="med" len="med"/>
+                    </a:lnR>
+                    <a:lnT w="19050" cap="flat" cmpd="sng" algn="ctr">
+                      <a:solidFill>
+                        <a:srgbClr val="002060"/>
+                      </a:solidFill>
+                      <a:prstDash val="solid"/>
+                      <a:round/>
+                      <a:headEnd type="none" w="med" len="med"/>
+                      <a:tailEnd type="none" w="med" len="med"/>
+                    </a:lnT>
+                    <a:lnB w="19050" cap="flat" cmpd="sng" algn="ctr">
+                      <a:solidFill>
+                        <a:srgbClr val="002060"/>
+                      </a:solidFill>
+                      <a:prstDash val="solid"/>
+                      <a:round/>
+                      <a:headEnd type="none" w="med" len="med"/>
+                      <a:tailEnd type="none" w="med" len="med"/>
+                    </a:lnB>
+                    <a:solidFill>
+                      <a:schemeClr val="bg1">
+                        <a:lumMod val="75000"/>
+                      </a:schemeClr>
+                    </a:solidFill>
+                  </a:tcPr>
+                </a:tc>
+                <a:tc>
+                  <a:txBody>
+                    <a:bodyPr/>
+                    <a:lstStyle/>
+                    <a:p>
+                      <a:pPr algn="l" fontAlgn="t"/>
+                      <a:r>
+                        <a:rPr lang="en-US" sz="1200" b="0" i="0" u="none" strike="noStrike" smtClean="0">
+                          <a:solidFill>
+                            <a:srgbClr val="002060"/>
+                          </a:solidFill>
+                          <a:effectLst/>
+                          <a:latin typeface="Intel Clear" panose="020B0604020203020204" pitchFamily="34" charset="0"/>
+                          <a:ea typeface="Intel Clear" panose="020B0604020203020204" pitchFamily="34" charset="0"/>
+                          <a:cs typeface="Intel Clear" panose="020B0604020203020204" pitchFamily="34" charset="0"/>
+                        </a:rPr>
+                        <a:t> </a:t>
+                      </a:r>
+                      <a:endParaRPr lang="en-US" sz="1200" b="0" i="0" u="none" strike="noStrike" dirty="0">
+                        <a:solidFill>
+                          <a:srgbClr val="002060"/>
+                        </a:solidFill>
+                        <a:effectLst/>
+                        <a:latin typeface="Intel Clear" panose="020B0604020203020204" pitchFamily="34" charset="0"/>
+                        <a:ea typeface="Intel Clear" panose="020B0604020203020204" pitchFamily="34" charset="0"/>
+                        <a:cs typeface="Intel Clear" panose="020B0604020203020204" pitchFamily="34" charset="0"/>
+                      </a:endParaRPr>
+                    </a:p>
+                  </a:txBody>
+                  <a:tcPr marL="45720" marR="45720" marT="27432" marB="27432" anchor="ctr">
+                    <a:lnL w="19050" cap="flat" cmpd="sng" algn="ctr">
+                      <a:solidFill>
+                        <a:srgbClr val="002060"/>
+                      </a:solidFill>
+                      <a:prstDash val="solid"/>
+                      <a:round/>
+                      <a:headEnd type="none" w="med" len="med"/>
+                      <a:tailEnd type="none" w="med" len="med"/>
+                    </a:lnL>
+                    <a:lnR w="19050" cap="flat" cmpd="sng" algn="ctr">
+                      <a:solidFill>
+                        <a:srgbClr val="002060"/>
+                      </a:solidFill>
+                      <a:prstDash val="solid"/>
+                      <a:round/>
+                      <a:headEnd type="none" w="med" len="med"/>
+                      <a:tailEnd type="none" w="med" len="med"/>
+                    </a:lnR>
+                    <a:lnT w="19050" cap="flat" cmpd="sng" algn="ctr">
+                      <a:solidFill>
+                        <a:srgbClr val="002060"/>
+                      </a:solidFill>
+                      <a:prstDash val="solid"/>
+                      <a:round/>
+                      <a:headEnd type="none" w="med" len="med"/>
+                      <a:tailEnd type="none" w="med" len="med"/>
+                    </a:lnT>
+                    <a:lnB w="19050" cap="flat" cmpd="sng" algn="ctr">
+                      <a:solidFill>
+                        <a:srgbClr val="002060"/>
+                      </a:solidFill>
+                      <a:prstDash val="solid"/>
+                      <a:round/>
+                      <a:headEnd type="none" w="med" len="med"/>
+                      <a:tailEnd type="none" w="med" len="med"/>
+                    </a:lnB>
+                    <a:solidFill>
+                      <a:schemeClr val="bg1">
+                        <a:lumMod val="75000"/>
+                      </a:schemeClr>
+                    </a:solidFill>
+                  </a:tcPr>
+                </a:tc>
+                <a:tc>
+                  <a:txBody>
+                    <a:bodyPr/>
+                    <a:lstStyle/>
+                    <a:p>
+                      <a:pPr algn="l" fontAlgn="t"/>
+                      <a:r>
+                        <a:rPr lang="en-US" sz="1200" b="0" i="0" u="none" strike="noStrike" smtClean="0">
+                          <a:solidFill>
+                            <a:srgbClr val="002060"/>
+                          </a:solidFill>
+                          <a:effectLst/>
+                          <a:latin typeface="Intel Clear" panose="020B0604020203020204" pitchFamily="34" charset="0"/>
+                          <a:ea typeface="Intel Clear" panose="020B0604020203020204" pitchFamily="34" charset="0"/>
+                          <a:cs typeface="Intel Clear" panose="020B0604020203020204" pitchFamily="34" charset="0"/>
+                        </a:rPr>
+                        <a:t> </a:t>
+                      </a:r>
+                      <a:endParaRPr lang="en-US" sz="1200" b="0" i="0" u="none" strike="noStrike" dirty="0">
+                        <a:solidFill>
+                          <a:srgbClr val="002060"/>
+                        </a:solidFill>
+                        <a:effectLst/>
+                        <a:latin typeface="Intel Clear" panose="020B0604020203020204" pitchFamily="34" charset="0"/>
+                        <a:ea typeface="Intel Clear" panose="020B0604020203020204" pitchFamily="34" charset="0"/>
+                        <a:cs typeface="Intel Clear" panose="020B0604020203020204" pitchFamily="34" charset="0"/>
+                      </a:endParaRPr>
+                    </a:p>
+                  </a:txBody>
+                  <a:tcPr marL="45720" marR="45720" marT="27432" marB="27432" anchor="ctr">
+                    <a:lnL w="19050" cap="flat" cmpd="sng" algn="ctr">
+                      <a:solidFill>
+                        <a:srgbClr val="002060"/>
+                      </a:solidFill>
+                      <a:prstDash val="solid"/>
+                      <a:round/>
+                      <a:headEnd type="none" w="med" len="med"/>
+                      <a:tailEnd type="none" w="med" len="med"/>
+                    </a:lnL>
+                    <a:lnR w="19050" cap="flat" cmpd="sng" algn="ctr">
+                      <a:solidFill>
+                        <a:srgbClr val="002060"/>
+                      </a:solidFill>
+                      <a:prstDash val="solid"/>
+                      <a:round/>
+                      <a:headEnd type="none" w="med" len="med"/>
+                      <a:tailEnd type="none" w="med" len="med"/>
+                    </a:lnR>
+                    <a:lnT w="19050" cap="flat" cmpd="sng" algn="ctr">
+                      <a:solidFill>
+                        <a:srgbClr val="002060"/>
+                      </a:solidFill>
+                      <a:prstDash val="solid"/>
+                      <a:round/>
+                      <a:headEnd type="none" w="med" len="med"/>
+                      <a:tailEnd type="none" w="med" len="med"/>
+                    </a:lnT>
+                    <a:lnB w="19050" cap="flat" cmpd="sng" algn="ctr">
+                      <a:solidFill>
+                        <a:srgbClr val="002060"/>
+                      </a:solidFill>
+                      <a:prstDash val="solid"/>
+                      <a:round/>
+                      <a:headEnd type="none" w="med" len="med"/>
+                      <a:tailEnd type="none" w="med" len="med"/>
+                    </a:lnB>
+                    <a:solidFill>
+                      <a:schemeClr val="bg1">
+                        <a:lumMod val="75000"/>
+                      </a:schemeClr>
+                    </a:solidFill>
+                  </a:tcPr>
+                </a:tc>
                 <a:extLst>
                   <a:ext uri="{0D108BD9-81ED-4DB2-BD59-A6C34878D82A}">
                     <a16:rowId xmlns:a16="http://schemas.microsoft.com/office/drawing/2014/main" val="2238057213"/>
@@ -6498,6 +10200,225 @@
                     </a:solidFill>
                   </a:tcPr>
                 </a:tc>
+                <a:tc>
+                  <a:txBody>
+                    <a:bodyPr/>
+                    <a:lstStyle/>
+                    <a:p>
+                      <a:pPr algn="l" fontAlgn="t"/>
+                      <a:r>
+                        <a:rPr lang="en-US" sz="1200" b="0" i="0" u="none" strike="noStrike" smtClean="0">
+                          <a:solidFill>
+                            <a:srgbClr val="002060"/>
+                          </a:solidFill>
+                          <a:effectLst/>
+                          <a:latin typeface="Intel Clear" panose="020B0604020203020204" pitchFamily="34" charset="0"/>
+                          <a:ea typeface="Intel Clear" panose="020B0604020203020204" pitchFamily="34" charset="0"/>
+                          <a:cs typeface="Intel Clear" panose="020B0604020203020204" pitchFamily="34" charset="0"/>
+                        </a:rPr>
+                        <a:t> </a:t>
+                      </a:r>
+                      <a:endParaRPr lang="en-US" sz="1200" b="0" i="0" u="none" strike="noStrike" dirty="0">
+                        <a:solidFill>
+                          <a:srgbClr val="002060"/>
+                        </a:solidFill>
+                        <a:effectLst/>
+                        <a:latin typeface="Intel Clear" panose="020B0604020203020204" pitchFamily="34" charset="0"/>
+                        <a:ea typeface="Intel Clear" panose="020B0604020203020204" pitchFamily="34" charset="0"/>
+                        <a:cs typeface="Intel Clear" panose="020B0604020203020204" pitchFamily="34" charset="0"/>
+                      </a:endParaRPr>
+                    </a:p>
+                  </a:txBody>
+                  <a:tcPr marL="45720" marR="45720" marT="27432" marB="27432" anchor="ctr">
+                    <a:lnL w="19050" cap="flat" cmpd="sng" algn="ctr">
+                      <a:solidFill>
+                        <a:srgbClr val="002060"/>
+                      </a:solidFill>
+                      <a:prstDash val="solid"/>
+                      <a:round/>
+                      <a:headEnd type="none" w="med" len="med"/>
+                      <a:tailEnd type="none" w="med" len="med"/>
+                    </a:lnL>
+                    <a:lnR w="19050" cap="flat" cmpd="sng" algn="ctr">
+                      <a:solidFill>
+                        <a:srgbClr val="002060"/>
+                      </a:solidFill>
+                      <a:prstDash val="solid"/>
+                      <a:round/>
+                      <a:headEnd type="none" w="med" len="med"/>
+                      <a:tailEnd type="none" w="med" len="med"/>
+                    </a:lnR>
+                    <a:lnT w="19050" cap="flat" cmpd="sng" algn="ctr">
+                      <a:solidFill>
+                        <a:srgbClr val="002060"/>
+                      </a:solidFill>
+                      <a:prstDash val="solid"/>
+                      <a:round/>
+                      <a:headEnd type="none" w="med" len="med"/>
+                      <a:tailEnd type="none" w="med" len="med"/>
+                    </a:lnT>
+                    <a:lnB w="19050" cap="flat" cmpd="sng" algn="ctr">
+                      <a:solidFill>
+                        <a:srgbClr val="002060"/>
+                      </a:solidFill>
+                      <a:prstDash val="solid"/>
+                      <a:round/>
+                      <a:headEnd type="none" w="med" len="med"/>
+                      <a:tailEnd type="none" w="med" len="med"/>
+                    </a:lnB>
+                    <a:solidFill>
+                      <a:schemeClr val="bg1">
+                        <a:lumMod val="75000"/>
+                      </a:schemeClr>
+                    </a:solidFill>
+                  </a:tcPr>
+                </a:tc>
+                <a:tc>
+                  <a:txBody>
+                    <a:bodyPr/>
+                    <a:lstStyle/>
+                    <a:p>
+                      <a:pPr algn="l" fontAlgn="t"/>
+                      <a:r>
+                        <a:rPr lang="en-US" sz="1200" b="0" i="0" u="none" strike="noStrike" smtClean="0">
+                          <a:solidFill>
+                            <a:srgbClr val="002060"/>
+                          </a:solidFill>
+                          <a:effectLst/>
+                          <a:latin typeface="Intel Clear" panose="020B0604020203020204" pitchFamily="34" charset="0"/>
+                          <a:ea typeface="Intel Clear" panose="020B0604020203020204" pitchFamily="34" charset="0"/>
+                          <a:cs typeface="Intel Clear" panose="020B0604020203020204" pitchFamily="34" charset="0"/>
+                        </a:rPr>
+                        <a:t> </a:t>
+                      </a:r>
+                      <a:endParaRPr lang="en-US" sz="1200" b="0" i="0" u="none" strike="noStrike" dirty="0">
+                        <a:solidFill>
+                          <a:srgbClr val="002060"/>
+                        </a:solidFill>
+                        <a:effectLst/>
+                        <a:latin typeface="Intel Clear" panose="020B0604020203020204" pitchFamily="34" charset="0"/>
+                        <a:ea typeface="Intel Clear" panose="020B0604020203020204" pitchFamily="34" charset="0"/>
+                        <a:cs typeface="Intel Clear" panose="020B0604020203020204" pitchFamily="34" charset="0"/>
+                      </a:endParaRPr>
+                    </a:p>
+                  </a:txBody>
+                  <a:tcPr marL="45720" marR="45720" marT="27432" marB="27432" anchor="ctr">
+                    <a:lnL w="19050" cap="flat" cmpd="sng" algn="ctr">
+                      <a:solidFill>
+                        <a:srgbClr val="002060"/>
+                      </a:solidFill>
+                      <a:prstDash val="solid"/>
+                      <a:round/>
+                      <a:headEnd type="none" w="med" len="med"/>
+                      <a:tailEnd type="none" w="med" len="med"/>
+                    </a:lnL>
+                    <a:lnR w="19050" cap="flat" cmpd="sng" algn="ctr">
+                      <a:solidFill>
+                        <a:srgbClr val="002060"/>
+                      </a:solidFill>
+                      <a:prstDash val="solid"/>
+                      <a:round/>
+                      <a:headEnd type="none" w="med" len="med"/>
+                      <a:tailEnd type="none" w="med" len="med"/>
+                    </a:lnR>
+                    <a:lnT w="19050" cap="flat" cmpd="sng" algn="ctr">
+                      <a:solidFill>
+                        <a:srgbClr val="002060"/>
+                      </a:solidFill>
+                      <a:prstDash val="solid"/>
+                      <a:round/>
+                      <a:headEnd type="none" w="med" len="med"/>
+                      <a:tailEnd type="none" w="med" len="med"/>
+                    </a:lnT>
+                    <a:lnB w="19050" cap="flat" cmpd="sng" algn="ctr">
+                      <a:solidFill>
+                        <a:srgbClr val="002060"/>
+                      </a:solidFill>
+                      <a:prstDash val="solid"/>
+                      <a:round/>
+                      <a:headEnd type="none" w="med" len="med"/>
+                      <a:tailEnd type="none" w="med" len="med"/>
+                    </a:lnB>
+                    <a:solidFill>
+                      <a:schemeClr val="bg1">
+                        <a:lumMod val="75000"/>
+                      </a:schemeClr>
+                    </a:solidFill>
+                  </a:tcPr>
+                </a:tc>
+                <a:tc>
+                  <a:txBody>
+                    <a:bodyPr/>
+                    <a:lstStyle/>
+                    <a:p>
+                      <a:pPr algn="l" fontAlgn="t"/>
+                      <a:r>
+                        <a:rPr lang="en-US" sz="1200" b="0" i="0" u="none" strike="noStrike" smtClean="0">
+                          <a:solidFill>
+                            <a:srgbClr val="002060"/>
+                          </a:solidFill>
+                          <a:effectLst/>
+                          <a:latin typeface="Intel Clear" panose="020B0604020203020204" pitchFamily="34" charset="0"/>
+                          <a:ea typeface="Intel Clear" panose="020B0604020203020204" pitchFamily="34" charset="0"/>
+                          <a:cs typeface="Intel Clear" panose="020B0604020203020204" pitchFamily="34" charset="0"/>
+                        </a:rPr>
+                        <a:t> </a:t>
+                      </a:r>
+                      <a:endParaRPr lang="en-US" sz="1200" b="0" i="0" u="none" strike="noStrike" dirty="0">
+                        <a:solidFill>
+                          <a:srgbClr val="002060"/>
+                        </a:solidFill>
+                        <a:effectLst/>
+                        <a:latin typeface="Intel Clear" panose="020B0604020203020204" pitchFamily="34" charset="0"/>
+                        <a:ea typeface="Intel Clear" panose="020B0604020203020204" pitchFamily="34" charset="0"/>
+                        <a:cs typeface="Intel Clear" panose="020B0604020203020204" pitchFamily="34" charset="0"/>
+                      </a:endParaRPr>
+                    </a:p>
+                  </a:txBody>
+                  <a:tcPr marL="45720" marR="45720" marT="27432" marB="27432" anchor="ctr">
+                    <a:lnL w="19050" cap="flat" cmpd="sng" algn="ctr">
+                      <a:solidFill>
+                        <a:srgbClr val="002060"/>
+                      </a:solidFill>
+                      <a:prstDash val="solid"/>
+                      <a:round/>
+                      <a:headEnd type="none" w="med" len="med"/>
+                      <a:tailEnd type="none" w="med" len="med"/>
+                    </a:lnL>
+                    <a:lnR w="19050" cap="flat" cmpd="sng" algn="ctr">
+                      <a:solidFill>
+                        <a:srgbClr val="002060"/>
+                      </a:solidFill>
+                      <a:prstDash val="solid"/>
+                      <a:round/>
+                      <a:headEnd type="none" w="med" len="med"/>
+                      <a:tailEnd type="none" w="med" len="med"/>
+                    </a:lnR>
+                    <a:lnT w="19050" cap="flat" cmpd="sng" algn="ctr">
+                      <a:solidFill>
+                        <a:srgbClr val="002060"/>
+                      </a:solidFill>
+                      <a:prstDash val="solid"/>
+                      <a:round/>
+                      <a:headEnd type="none" w="med" len="med"/>
+                      <a:tailEnd type="none" w="med" len="med"/>
+                    </a:lnT>
+                    <a:lnB w="19050" cap="flat" cmpd="sng" algn="ctr">
+                      <a:solidFill>
+                        <a:srgbClr val="002060"/>
+                      </a:solidFill>
+                      <a:prstDash val="solid"/>
+                      <a:round/>
+                      <a:headEnd type="none" w="med" len="med"/>
+                      <a:tailEnd type="none" w="med" len="med"/>
+                    </a:lnB>
+                    <a:solidFill>
+                      <a:schemeClr val="bg1">
+                        <a:lumMod val="75000"/>
+                      </a:schemeClr>
+                    </a:solidFill>
+                  </a:tcPr>
+                </a:tc>
                 <a:extLst>
                   <a:ext uri="{0D108BD9-81ED-4DB2-BD59-A6C34878D82A}">
                     <a16:rowId xmlns:a16="http://schemas.microsoft.com/office/drawing/2014/main" val="2994593847"/>
@@ -6523,7 +10444,7 @@
           <p:nvPr>
             <p:extLst>
               <p:ext uri="{D42A27DB-BD31-4B8C-83A1-F6EECF244321}">
-                <p14:modId xmlns:p14="http://schemas.microsoft.com/office/powerpoint/2010/main" val="925133538"/>
+                <p14:modId xmlns:p14="http://schemas.microsoft.com/office/powerpoint/2010/main" val="2520323313"/>
               </p:ext>
             </p:extLst>
           </p:nvPr>
@@ -7784,7 +11705,7 @@
           <p:nvPr>
             <p:extLst>
               <p:ext uri="{D42A27DB-BD31-4B8C-83A1-F6EECF244321}">
-                <p14:modId xmlns:p14="http://schemas.microsoft.com/office/powerpoint/2010/main" val="1489574468"/>
+                <p14:modId xmlns:p14="http://schemas.microsoft.com/office/powerpoint/2010/main" val="1314582568"/>
               </p:ext>
             </p:extLst>
           </p:nvPr>

</xml_diff>

<commit_message>
Remove 2 columns from the Milestones table
</commit_message>
<xml_diff>
--- a/src/main/resources/Template.pptx
+++ b/src/main/resources/Template.pptx
@@ -197,7 +197,7 @@
           <a:p>
             <a:fld id="{159A8166-34DF-470E-9DE3-188AFC0E57D2}" type="datetimeFigureOut">
               <a:rPr lang="en-US" smtClean="0"/>
-              <a:t>17/09/2021</a:t>
+              <a:t>27/09/2021</a:t>
             </a:fld>
             <a:endParaRPr lang="en-US"/>
           </a:p>
@@ -698,7 +698,7 @@
           <a:p>
             <a:fld id="{7B9D1350-BBC3-4784-B299-7C5541BF58C1}" type="datetimeFigureOut">
               <a:rPr lang="en-US" smtClean="0"/>
-              <a:t>17/09/2021</a:t>
+              <a:t>27/09/2021</a:t>
             </a:fld>
             <a:endParaRPr lang="en-US"/>
           </a:p>
@@ -896,7 +896,7 @@
           <a:p>
             <a:fld id="{7B9D1350-BBC3-4784-B299-7C5541BF58C1}" type="datetimeFigureOut">
               <a:rPr lang="en-US" smtClean="0"/>
-              <a:t>17/09/2021</a:t>
+              <a:t>27/09/2021</a:t>
             </a:fld>
             <a:endParaRPr lang="en-US"/>
           </a:p>
@@ -1104,7 +1104,7 @@
           <a:p>
             <a:fld id="{7B9D1350-BBC3-4784-B299-7C5541BF58C1}" type="datetimeFigureOut">
               <a:rPr lang="en-US" smtClean="0"/>
-              <a:t>17/09/2021</a:t>
+              <a:t>27/09/2021</a:t>
             </a:fld>
             <a:endParaRPr lang="en-US"/>
           </a:p>
@@ -1302,7 +1302,7 @@
           <a:p>
             <a:fld id="{7B9D1350-BBC3-4784-B299-7C5541BF58C1}" type="datetimeFigureOut">
               <a:rPr lang="en-US" smtClean="0"/>
-              <a:t>17/09/2021</a:t>
+              <a:t>27/09/2021</a:t>
             </a:fld>
             <a:endParaRPr lang="en-US"/>
           </a:p>
@@ -1577,7 +1577,7 @@
           <a:p>
             <a:fld id="{7B9D1350-BBC3-4784-B299-7C5541BF58C1}" type="datetimeFigureOut">
               <a:rPr lang="en-US" smtClean="0"/>
-              <a:t>17/09/2021</a:t>
+              <a:t>27/09/2021</a:t>
             </a:fld>
             <a:endParaRPr lang="en-US"/>
           </a:p>
@@ -1842,7 +1842,7 @@
           <a:p>
             <a:fld id="{7B9D1350-BBC3-4784-B299-7C5541BF58C1}" type="datetimeFigureOut">
               <a:rPr lang="en-US" smtClean="0"/>
-              <a:t>17/09/2021</a:t>
+              <a:t>27/09/2021</a:t>
             </a:fld>
             <a:endParaRPr lang="en-US"/>
           </a:p>
@@ -2254,7 +2254,7 @@
           <a:p>
             <a:fld id="{7B9D1350-BBC3-4784-B299-7C5541BF58C1}" type="datetimeFigureOut">
               <a:rPr lang="en-US" smtClean="0"/>
-              <a:t>17/09/2021</a:t>
+              <a:t>27/09/2021</a:t>
             </a:fld>
             <a:endParaRPr lang="en-US"/>
           </a:p>
@@ -2395,7 +2395,7 @@
           <a:p>
             <a:fld id="{7B9D1350-BBC3-4784-B299-7C5541BF58C1}" type="datetimeFigureOut">
               <a:rPr lang="en-US" smtClean="0"/>
-              <a:t>17/09/2021</a:t>
+              <a:t>27/09/2021</a:t>
             </a:fld>
             <a:endParaRPr lang="en-US"/>
           </a:p>
@@ -2508,7 +2508,7 @@
           <a:p>
             <a:fld id="{7B9D1350-BBC3-4784-B299-7C5541BF58C1}" type="datetimeFigureOut">
               <a:rPr lang="en-US" smtClean="0"/>
-              <a:t>17/09/2021</a:t>
+              <a:t>27/09/2021</a:t>
             </a:fld>
             <a:endParaRPr lang="en-US"/>
           </a:p>
@@ -2819,7 +2819,7 @@
           <a:p>
             <a:fld id="{7B9D1350-BBC3-4784-B299-7C5541BF58C1}" type="datetimeFigureOut">
               <a:rPr lang="en-US" smtClean="0"/>
-              <a:t>17/09/2021</a:t>
+              <a:t>27/09/2021</a:t>
             </a:fld>
             <a:endParaRPr lang="en-US"/>
           </a:p>
@@ -3107,7 +3107,7 @@
           <a:p>
             <a:fld id="{7B9D1350-BBC3-4784-B299-7C5541BF58C1}" type="datetimeFigureOut">
               <a:rPr lang="en-US" smtClean="0"/>
-              <a:t>17/09/2021</a:t>
+              <a:t>27/09/2021</a:t>
             </a:fld>
             <a:endParaRPr lang="en-US"/>
           </a:p>
@@ -3348,7 +3348,7 @@
           <a:p>
             <a:fld id="{7B9D1350-BBC3-4784-B299-7C5541BF58C1}" type="datetimeFigureOut">
               <a:rPr lang="en-US" smtClean="0"/>
-              <a:t>17/09/2021</a:t>
+              <a:t>27/09/2021</a:t>
             </a:fld>
             <a:endParaRPr lang="en-US"/>
           </a:p>
@@ -3780,58 +3780,44 @@
           <p:nvPr>
             <p:extLst>
               <p:ext uri="{D42A27DB-BD31-4B8C-83A1-F6EECF244321}">
-                <p14:modId xmlns:p14="http://schemas.microsoft.com/office/powerpoint/2010/main" val="2922337344"/>
+                <p14:modId xmlns:p14="http://schemas.microsoft.com/office/powerpoint/2010/main" val="2211458596"/>
               </p:ext>
             </p:extLst>
           </p:nvPr>
         </p:nvGraphicFramePr>
         <p:xfrm>
           <a:off x="6939915" y="956637"/>
-          <a:ext cx="5147315" cy="5653165"/>
+          <a:ext cx="5152555" cy="5653165"/>
         </p:xfrm>
         <a:graphic>
           <a:graphicData uri="http://schemas.openxmlformats.org/drawingml/2006/table">
             <a:tbl>
               <a:tblPr/>
               <a:tblGrid>
-                <a:gridCol w="1029463">
+                <a:gridCol w="936858">
                   <a:extLst>
                     <a:ext uri="{9D8B030D-6E8A-4147-A177-3AD203B41FA5}">
                       <a16:colId xmlns:a16="http://schemas.microsoft.com/office/drawing/2014/main" val="731854768"/>
                     </a:ext>
                   </a:extLst>
                 </a:gridCol>
-                <a:gridCol w="1029463">
+                <a:gridCol w="812023">
                   <a:extLst>
                     <a:ext uri="{9D8B030D-6E8A-4147-A177-3AD203B41FA5}">
                       <a16:colId xmlns:a16="http://schemas.microsoft.com/office/drawing/2014/main" val="134440545"/>
                     </a:ext>
                   </a:extLst>
                 </a:gridCol>
-                <a:gridCol w="1029463">
+                <a:gridCol w="3403674">
                   <a:extLst>
                     <a:ext uri="{9D8B030D-6E8A-4147-A177-3AD203B41FA5}">
                       <a16:colId xmlns:a16="http://schemas.microsoft.com/office/drawing/2014/main" val="2933571810"/>
                     </a:ext>
                   </a:extLst>
                 </a:gridCol>
-                <a:gridCol w="1029463">
-                  <a:extLst>
-                    <a:ext uri="{9D8B030D-6E8A-4147-A177-3AD203B41FA5}">
-                      <a16:colId xmlns:a16="http://schemas.microsoft.com/office/drawing/2014/main" val="1046102139"/>
-                    </a:ext>
-                  </a:extLst>
-                </a:gridCol>
-                <a:gridCol w="1029463">
-                  <a:extLst>
-                    <a:ext uri="{9D8B030D-6E8A-4147-A177-3AD203B41FA5}">
-                      <a16:colId xmlns:a16="http://schemas.microsoft.com/office/drawing/2014/main" val="2073939756"/>
-                    </a:ext>
-                  </a:extLst>
-                </a:gridCol>
               </a:tblGrid>
               <a:tr h="282440">
-                <a:tc gridSpan="5">
+                <a:tc gridSpan="3">
                   <a:txBody>
                     <a:bodyPr/>
                     <a:lstStyle/>
@@ -4011,124 +3997,6 @@
                     </a:solidFill>
                   </a:tcPr>
                 </a:tc>
-                <a:tc hMerge="1">
-                  <a:txBody>
-                    <a:bodyPr/>
-                    <a:lstStyle/>
-                    <a:p>
-                      <a:pPr marL="0" algn="l" defTabSz="606541" rtl="0" eaLnBrk="1" fontAlgn="b" latinLnBrk="0" hangingPunct="1"/>
-                      <a:endParaRPr lang="en-US" sz="1200" b="1" u="none" strike="noStrike" kern="1200" dirty="0">
-                        <a:solidFill>
-                          <a:schemeClr val="bg1"/>
-                        </a:solidFill>
-                        <a:effectLst/>
-                        <a:latin typeface="+mn-lt"/>
-                        <a:ea typeface="+mn-ea"/>
-                        <a:cs typeface="+mn-cs"/>
-                      </a:endParaRPr>
-                    </a:p>
-                  </a:txBody>
-                  <a:tcPr marL="6717" marR="6717" marT="6717" marB="0" anchor="ctr">
-                    <a:lnL w="19050" cap="flat" cmpd="sng" algn="ctr">
-                      <a:solidFill>
-                        <a:srgbClr val="002060"/>
-                      </a:solidFill>
-                      <a:prstDash val="solid"/>
-                      <a:round/>
-                      <a:headEnd type="none" w="med" len="med"/>
-                      <a:tailEnd type="none" w="med" len="med"/>
-                    </a:lnL>
-                    <a:lnR w="19050" cap="flat" cmpd="sng" algn="ctr">
-                      <a:solidFill>
-                        <a:srgbClr val="002060"/>
-                      </a:solidFill>
-                      <a:prstDash val="solid"/>
-                      <a:round/>
-                      <a:headEnd type="none" w="med" len="med"/>
-                      <a:tailEnd type="none" w="med" len="med"/>
-                    </a:lnR>
-                    <a:lnT w="19050" cap="flat" cmpd="sng" algn="ctr">
-                      <a:solidFill>
-                        <a:srgbClr val="002060"/>
-                      </a:solidFill>
-                      <a:prstDash val="solid"/>
-                      <a:round/>
-                      <a:headEnd type="none" w="med" len="med"/>
-                      <a:tailEnd type="none" w="med" len="med"/>
-                    </a:lnT>
-                    <a:lnB w="19050" cap="flat" cmpd="sng" algn="ctr">
-                      <a:solidFill>
-                        <a:srgbClr val="002060"/>
-                      </a:solidFill>
-                      <a:prstDash val="solid"/>
-                      <a:round/>
-                      <a:headEnd type="none" w="med" len="med"/>
-                      <a:tailEnd type="none" w="med" len="med"/>
-                    </a:lnB>
-                    <a:solidFill>
-                      <a:srgbClr val="3B5989"/>
-                    </a:solidFill>
-                  </a:tcPr>
-                </a:tc>
-                <a:tc hMerge="1">
-                  <a:txBody>
-                    <a:bodyPr/>
-                    <a:lstStyle/>
-                    <a:p>
-                      <a:pPr marL="0" algn="l" defTabSz="606541" rtl="0" eaLnBrk="1" fontAlgn="b" latinLnBrk="0" hangingPunct="1"/>
-                      <a:endParaRPr lang="en-US" sz="1200" b="1" u="none" strike="noStrike" kern="1200" dirty="0">
-                        <a:solidFill>
-                          <a:schemeClr val="bg1"/>
-                        </a:solidFill>
-                        <a:effectLst/>
-                        <a:latin typeface="+mn-lt"/>
-                        <a:ea typeface="+mn-ea"/>
-                        <a:cs typeface="+mn-cs"/>
-                      </a:endParaRPr>
-                    </a:p>
-                  </a:txBody>
-                  <a:tcPr marL="6717" marR="6717" marT="6717" marB="0" anchor="ctr">
-                    <a:lnL w="19050" cap="flat" cmpd="sng" algn="ctr">
-                      <a:solidFill>
-                        <a:srgbClr val="002060"/>
-                      </a:solidFill>
-                      <a:prstDash val="solid"/>
-                      <a:round/>
-                      <a:headEnd type="none" w="med" len="med"/>
-                      <a:tailEnd type="none" w="med" len="med"/>
-                    </a:lnL>
-                    <a:lnR w="19050" cap="flat" cmpd="sng" algn="ctr">
-                      <a:solidFill>
-                        <a:srgbClr val="002060"/>
-                      </a:solidFill>
-                      <a:prstDash val="solid"/>
-                      <a:round/>
-                      <a:headEnd type="none" w="med" len="med"/>
-                      <a:tailEnd type="none" w="med" len="med"/>
-                    </a:lnR>
-                    <a:lnT w="19050" cap="flat" cmpd="sng" algn="ctr">
-                      <a:solidFill>
-                        <a:srgbClr val="002060"/>
-                      </a:solidFill>
-                      <a:prstDash val="solid"/>
-                      <a:round/>
-                      <a:headEnd type="none" w="med" len="med"/>
-                      <a:tailEnd type="none" w="med" len="med"/>
-                    </a:lnT>
-                    <a:lnB w="19050" cap="flat" cmpd="sng" algn="ctr">
-                      <a:solidFill>
-                        <a:srgbClr val="002060"/>
-                      </a:solidFill>
-                      <a:prstDash val="solid"/>
-                      <a:round/>
-                      <a:headEnd type="none" w="med" len="med"/>
-                      <a:tailEnd type="none" w="med" len="med"/>
-                    </a:lnB>
-                    <a:solidFill>
-                      <a:srgbClr val="3B5989"/>
-                    </a:solidFill>
-                  </a:tcPr>
-                </a:tc>
                 <a:extLst>
                   <a:ext uri="{0D108BD9-81ED-4DB2-BD59-A6C34878D82A}">
                     <a16:rowId xmlns:a16="http://schemas.microsoft.com/office/drawing/2014/main" val="1787595644"/>
@@ -4143,7 +4011,7 @@
                     <a:p>
                       <a:pPr algn="ctr" fontAlgn="t"/>
                       <a:r>
-                        <a:rPr lang="en-US" sz="1200" b="0" i="0" u="none" strike="noStrike" smtClean="0">
+                        <a:rPr lang="en-US" sz="1050" b="0" i="0" u="none" strike="noStrike" smtClean="0">
                           <a:solidFill>
                             <a:srgbClr val="002060"/>
                           </a:solidFill>
@@ -4154,7 +4022,7 @@
                         </a:rPr>
                         <a:t> </a:t>
                       </a:r>
-                      <a:endParaRPr lang="en-US" sz="1200" b="0" i="0" u="none" strike="noStrike" dirty="0">
+                      <a:endParaRPr lang="en-US" sz="1050" b="0" i="0" u="none" strike="noStrike" dirty="0">
                         <a:solidFill>
                           <a:srgbClr val="002060"/>
                         </a:solidFill>
@@ -4214,7 +4082,7 @@
                     <a:p>
                       <a:pPr algn="l" fontAlgn="t"/>
                       <a:r>
-                        <a:rPr lang="en-US" sz="1200" b="0" i="0" u="none" strike="noStrike" smtClean="0">
+                        <a:rPr lang="en-US" sz="1050" b="0" i="0" u="none" strike="noStrike" smtClean="0">
                           <a:solidFill>
                             <a:srgbClr val="002060"/>
                           </a:solidFill>
@@ -4225,7 +4093,7 @@
                         </a:rPr>
                         <a:t> </a:t>
                       </a:r>
-                      <a:endParaRPr lang="en-US" sz="1200" b="0" i="0" u="none" strike="noStrike" dirty="0">
+                      <a:endParaRPr lang="en-US" sz="1050" b="0" i="0" u="none" strike="noStrike" dirty="0">
                         <a:solidFill>
                           <a:srgbClr val="002060"/>
                         </a:solidFill>
@@ -4287,7 +4155,7 @@
                     <a:p>
                       <a:pPr algn="l" fontAlgn="t"/>
                       <a:r>
-                        <a:rPr lang="en-US" sz="1200" b="0" i="0" u="none" strike="noStrike" smtClean="0">
+                        <a:rPr lang="en-US" sz="1050" b="0" i="0" u="none" strike="noStrike" smtClean="0">
                           <a:solidFill>
                             <a:srgbClr val="002060"/>
                           </a:solidFill>
@@ -4298,153 +4166,7 @@
                         </a:rPr>
                         <a:t> </a:t>
                       </a:r>
-                      <a:endParaRPr lang="en-US" sz="1200" b="0" i="0" u="none" strike="noStrike" dirty="0">
-                        <a:solidFill>
-                          <a:srgbClr val="002060"/>
-                        </a:solidFill>
-                        <a:effectLst/>
-                        <a:latin typeface="Intel Clear" panose="020B0604020203020204" pitchFamily="34" charset="0"/>
-                        <a:ea typeface="Intel Clear" panose="020B0604020203020204" pitchFamily="34" charset="0"/>
-                        <a:cs typeface="Intel Clear" panose="020B0604020203020204" pitchFamily="34" charset="0"/>
-                      </a:endParaRPr>
-                    </a:p>
-                  </a:txBody>
-                  <a:tcPr marL="45720" marR="45720" marT="27432" marB="27432" anchor="ctr">
-                    <a:lnL w="19050" cap="flat" cmpd="sng" algn="ctr">
-                      <a:solidFill>
-                        <a:srgbClr val="002060"/>
-                      </a:solidFill>
-                      <a:prstDash val="solid"/>
-                      <a:round/>
-                      <a:headEnd type="none" w="med" len="med"/>
-                      <a:tailEnd type="none" w="med" len="med"/>
-                    </a:lnL>
-                    <a:lnR w="19050" cap="flat" cmpd="sng" algn="ctr">
-                      <a:solidFill>
-                        <a:srgbClr val="002060"/>
-                      </a:solidFill>
-                      <a:prstDash val="solid"/>
-                      <a:round/>
-                      <a:headEnd type="none" w="med" len="med"/>
-                      <a:tailEnd type="none" w="med" len="med"/>
-                    </a:lnR>
-                    <a:lnT w="19050" cap="flat" cmpd="sng" algn="ctr">
-                      <a:solidFill>
-                        <a:srgbClr val="002060"/>
-                      </a:solidFill>
-                      <a:prstDash val="solid"/>
-                      <a:round/>
-                      <a:headEnd type="none" w="med" len="med"/>
-                      <a:tailEnd type="none" w="med" len="med"/>
-                    </a:lnT>
-                    <a:lnB w="19050" cap="flat" cmpd="sng" algn="ctr">
-                      <a:solidFill>
-                        <a:srgbClr val="002060"/>
-                      </a:solidFill>
-                      <a:prstDash val="solid"/>
-                      <a:round/>
-                      <a:headEnd type="none" w="med" len="med"/>
-                      <a:tailEnd type="none" w="med" len="med"/>
-                    </a:lnB>
-                    <a:solidFill>
-                      <a:schemeClr val="bg1">
-                        <a:lumMod val="75000"/>
-                      </a:schemeClr>
-                    </a:solidFill>
-                  </a:tcPr>
-                </a:tc>
-                <a:tc>
-                  <a:txBody>
-                    <a:bodyPr/>
-                    <a:lstStyle/>
-                    <a:p>
-                      <a:pPr algn="l" fontAlgn="t"/>
-                      <a:r>
-                        <a:rPr lang="en-US" sz="1200" b="0" i="0" u="none" strike="noStrike" smtClean="0">
-                          <a:solidFill>
-                            <a:srgbClr val="002060"/>
-                          </a:solidFill>
-                          <a:effectLst/>
-                          <a:latin typeface="Intel Clear" panose="020B0604020203020204" pitchFamily="34" charset="0"/>
-                          <a:ea typeface="Intel Clear" panose="020B0604020203020204" pitchFamily="34" charset="0"/>
-                          <a:cs typeface="Intel Clear" panose="020B0604020203020204" pitchFamily="34" charset="0"/>
-                        </a:rPr>
-                        <a:t> </a:t>
-                      </a:r>
-                      <a:endParaRPr lang="en-US" sz="1200" b="0" i="0" u="none" strike="noStrike" dirty="0">
-                        <a:solidFill>
-                          <a:srgbClr val="002060"/>
-                        </a:solidFill>
-                        <a:effectLst/>
-                        <a:latin typeface="Intel Clear" panose="020B0604020203020204" pitchFamily="34" charset="0"/>
-                        <a:ea typeface="Intel Clear" panose="020B0604020203020204" pitchFamily="34" charset="0"/>
-                        <a:cs typeface="Intel Clear" panose="020B0604020203020204" pitchFamily="34" charset="0"/>
-                      </a:endParaRPr>
-                    </a:p>
-                  </a:txBody>
-                  <a:tcPr marL="45720" marR="45720" marT="27432" marB="27432" anchor="ctr">
-                    <a:lnL w="19050" cap="flat" cmpd="sng" algn="ctr">
-                      <a:solidFill>
-                        <a:srgbClr val="002060"/>
-                      </a:solidFill>
-                      <a:prstDash val="solid"/>
-                      <a:round/>
-                      <a:headEnd type="none" w="med" len="med"/>
-                      <a:tailEnd type="none" w="med" len="med"/>
-                    </a:lnL>
-                    <a:lnR w="19050" cap="flat" cmpd="sng" algn="ctr">
-                      <a:solidFill>
-                        <a:srgbClr val="002060"/>
-                      </a:solidFill>
-                      <a:prstDash val="solid"/>
-                      <a:round/>
-                      <a:headEnd type="none" w="med" len="med"/>
-                      <a:tailEnd type="none" w="med" len="med"/>
-                    </a:lnR>
-                    <a:lnT w="19050" cap="flat" cmpd="sng" algn="ctr">
-                      <a:solidFill>
-                        <a:srgbClr val="002060"/>
-                      </a:solidFill>
-                      <a:prstDash val="solid"/>
-                      <a:round/>
-                      <a:headEnd type="none" w="med" len="med"/>
-                      <a:tailEnd type="none" w="med" len="med"/>
-                    </a:lnT>
-                    <a:lnB w="19050" cap="flat" cmpd="sng" algn="ctr">
-                      <a:solidFill>
-                        <a:srgbClr val="002060"/>
-                      </a:solidFill>
-                      <a:prstDash val="solid"/>
-                      <a:round/>
-                      <a:headEnd type="none" w="med" len="med"/>
-                      <a:tailEnd type="none" w="med" len="med"/>
-                    </a:lnB>
-                    <a:solidFill>
-                      <a:schemeClr val="bg1">
-                        <a:lumMod val="75000"/>
-                      </a:schemeClr>
-                    </a:solidFill>
-                  </a:tcPr>
-                </a:tc>
-                <a:tc>
-                  <a:txBody>
-                    <a:bodyPr/>
-                    <a:lstStyle/>
-                    <a:p>
-                      <a:pPr algn="l" fontAlgn="t"/>
-                      <a:r>
-                        <a:rPr lang="en-US" sz="1200" b="0" i="0" u="none" strike="noStrike" smtClean="0">
-                          <a:solidFill>
-                            <a:srgbClr val="002060"/>
-                          </a:solidFill>
-                          <a:effectLst/>
-                          <a:latin typeface="Intel Clear" panose="020B0604020203020204" pitchFamily="34" charset="0"/>
-                          <a:ea typeface="Intel Clear" panose="020B0604020203020204" pitchFamily="34" charset="0"/>
-                          <a:cs typeface="Intel Clear" panose="020B0604020203020204" pitchFamily="34" charset="0"/>
-                        </a:rPr>
-                        <a:t> </a:t>
-                      </a:r>
-                      <a:endParaRPr lang="en-US" sz="1200" b="0" i="0" u="none" strike="noStrike" dirty="0">
+                      <a:endParaRPr lang="en-US" sz="1050" b="0" i="0" u="none" strike="noStrike" dirty="0">
                         <a:solidFill>
                           <a:srgbClr val="002060"/>
                         </a:solidFill>
@@ -4513,7 +4235,7 @@
                     <a:p>
                       <a:pPr algn="ctr" fontAlgn="t"/>
                       <a:r>
-                        <a:rPr lang="en-US" sz="1200" b="0" i="0" u="none" strike="noStrike" smtClean="0">
+                        <a:rPr lang="en-US" sz="1050" b="0" i="0" u="none" strike="noStrike" smtClean="0">
                           <a:solidFill>
                             <a:srgbClr val="002060"/>
                           </a:solidFill>
@@ -4524,7 +4246,7 @@
                         </a:rPr>
                         <a:t> </a:t>
                       </a:r>
-                      <a:endParaRPr lang="en-US" sz="1200" b="0" i="0" u="none" strike="noStrike" dirty="0">
+                      <a:endParaRPr lang="en-US" sz="1050" b="0" i="0" u="none" strike="noStrike" dirty="0">
                         <a:solidFill>
                           <a:srgbClr val="002060"/>
                         </a:solidFill>
@@ -4584,7 +4306,7 @@
                     <a:p>
                       <a:pPr algn="l" fontAlgn="t"/>
                       <a:r>
-                        <a:rPr lang="en-US" sz="1200" b="0" i="0" u="none" strike="noStrike" smtClean="0">
+                        <a:rPr lang="en-US" sz="1050" b="0" i="0" u="none" strike="noStrike" smtClean="0">
                           <a:solidFill>
                             <a:srgbClr val="002060"/>
                           </a:solidFill>
@@ -4595,7 +4317,7 @@
                         </a:rPr>
                         <a:t> </a:t>
                       </a:r>
-                      <a:endParaRPr lang="en-US" sz="1200" b="0" i="0" u="none" strike="noStrike" dirty="0">
+                      <a:endParaRPr lang="en-US" sz="1050" b="0" i="0" u="none" strike="noStrike" dirty="0">
                         <a:solidFill>
                           <a:srgbClr val="002060"/>
                         </a:solidFill>
@@ -4657,7 +4379,7 @@
                     <a:p>
                       <a:pPr algn="l" fontAlgn="t"/>
                       <a:r>
-                        <a:rPr lang="en-US" sz="1200" b="0" i="0" u="none" strike="noStrike" smtClean="0">
+                        <a:rPr lang="en-US" sz="1050" b="0" i="0" u="none" strike="noStrike" smtClean="0">
                           <a:solidFill>
                             <a:srgbClr val="002060"/>
                           </a:solidFill>
@@ -4668,153 +4390,7 @@
                         </a:rPr>
                         <a:t> </a:t>
                       </a:r>
-                      <a:endParaRPr lang="en-US" sz="1200" b="0" i="0" u="none" strike="noStrike" dirty="0">
-                        <a:solidFill>
-                          <a:srgbClr val="002060"/>
-                        </a:solidFill>
-                        <a:effectLst/>
-                        <a:latin typeface="Intel Clear" panose="020B0604020203020204" pitchFamily="34" charset="0"/>
-                        <a:ea typeface="Intel Clear" panose="020B0604020203020204" pitchFamily="34" charset="0"/>
-                        <a:cs typeface="Intel Clear" panose="020B0604020203020204" pitchFamily="34" charset="0"/>
-                      </a:endParaRPr>
-                    </a:p>
-                  </a:txBody>
-                  <a:tcPr marL="45720" marR="45720" marT="27432" marB="27432" anchor="ctr">
-                    <a:lnL w="19050" cap="flat" cmpd="sng" algn="ctr">
-                      <a:solidFill>
-                        <a:srgbClr val="002060"/>
-                      </a:solidFill>
-                      <a:prstDash val="solid"/>
-                      <a:round/>
-                      <a:headEnd type="none" w="med" len="med"/>
-                      <a:tailEnd type="none" w="med" len="med"/>
-                    </a:lnL>
-                    <a:lnR w="19050" cap="flat" cmpd="sng" algn="ctr">
-                      <a:solidFill>
-                        <a:srgbClr val="002060"/>
-                      </a:solidFill>
-                      <a:prstDash val="solid"/>
-                      <a:round/>
-                      <a:headEnd type="none" w="med" len="med"/>
-                      <a:tailEnd type="none" w="med" len="med"/>
-                    </a:lnR>
-                    <a:lnT w="19050" cap="flat" cmpd="sng" algn="ctr">
-                      <a:solidFill>
-                        <a:srgbClr val="002060"/>
-                      </a:solidFill>
-                      <a:prstDash val="solid"/>
-                      <a:round/>
-                      <a:headEnd type="none" w="med" len="med"/>
-                      <a:tailEnd type="none" w="med" len="med"/>
-                    </a:lnT>
-                    <a:lnB w="19050" cap="flat" cmpd="sng" algn="ctr">
-                      <a:solidFill>
-                        <a:srgbClr val="002060"/>
-                      </a:solidFill>
-                      <a:prstDash val="solid"/>
-                      <a:round/>
-                      <a:headEnd type="none" w="med" len="med"/>
-                      <a:tailEnd type="none" w="med" len="med"/>
-                    </a:lnB>
-                    <a:solidFill>
-                      <a:schemeClr val="bg1">
-                        <a:lumMod val="75000"/>
-                      </a:schemeClr>
-                    </a:solidFill>
-                  </a:tcPr>
-                </a:tc>
-                <a:tc>
-                  <a:txBody>
-                    <a:bodyPr/>
-                    <a:lstStyle/>
-                    <a:p>
-                      <a:pPr algn="l" fontAlgn="t"/>
-                      <a:r>
-                        <a:rPr lang="en-US" sz="1200" b="0" i="0" u="none" strike="noStrike" smtClean="0">
-                          <a:solidFill>
-                            <a:srgbClr val="002060"/>
-                          </a:solidFill>
-                          <a:effectLst/>
-                          <a:latin typeface="Intel Clear" panose="020B0604020203020204" pitchFamily="34" charset="0"/>
-                          <a:ea typeface="Intel Clear" panose="020B0604020203020204" pitchFamily="34" charset="0"/>
-                          <a:cs typeface="Intel Clear" panose="020B0604020203020204" pitchFamily="34" charset="0"/>
-                        </a:rPr>
-                        <a:t> </a:t>
-                      </a:r>
-                      <a:endParaRPr lang="en-US" sz="1200" b="0" i="0" u="none" strike="noStrike" dirty="0">
-                        <a:solidFill>
-                          <a:srgbClr val="002060"/>
-                        </a:solidFill>
-                        <a:effectLst/>
-                        <a:latin typeface="Intel Clear" panose="020B0604020203020204" pitchFamily="34" charset="0"/>
-                        <a:ea typeface="Intel Clear" panose="020B0604020203020204" pitchFamily="34" charset="0"/>
-                        <a:cs typeface="Intel Clear" panose="020B0604020203020204" pitchFamily="34" charset="0"/>
-                      </a:endParaRPr>
-                    </a:p>
-                  </a:txBody>
-                  <a:tcPr marL="45720" marR="45720" marT="27432" marB="27432" anchor="ctr">
-                    <a:lnL w="19050" cap="flat" cmpd="sng" algn="ctr">
-                      <a:solidFill>
-                        <a:srgbClr val="002060"/>
-                      </a:solidFill>
-                      <a:prstDash val="solid"/>
-                      <a:round/>
-                      <a:headEnd type="none" w="med" len="med"/>
-                      <a:tailEnd type="none" w="med" len="med"/>
-                    </a:lnL>
-                    <a:lnR w="19050" cap="flat" cmpd="sng" algn="ctr">
-                      <a:solidFill>
-                        <a:srgbClr val="002060"/>
-                      </a:solidFill>
-                      <a:prstDash val="solid"/>
-                      <a:round/>
-                      <a:headEnd type="none" w="med" len="med"/>
-                      <a:tailEnd type="none" w="med" len="med"/>
-                    </a:lnR>
-                    <a:lnT w="19050" cap="flat" cmpd="sng" algn="ctr">
-                      <a:solidFill>
-                        <a:srgbClr val="002060"/>
-                      </a:solidFill>
-                      <a:prstDash val="solid"/>
-                      <a:round/>
-                      <a:headEnd type="none" w="med" len="med"/>
-                      <a:tailEnd type="none" w="med" len="med"/>
-                    </a:lnT>
-                    <a:lnB w="19050" cap="flat" cmpd="sng" algn="ctr">
-                      <a:solidFill>
-                        <a:srgbClr val="002060"/>
-                      </a:solidFill>
-                      <a:prstDash val="solid"/>
-                      <a:round/>
-                      <a:headEnd type="none" w="med" len="med"/>
-                      <a:tailEnd type="none" w="med" len="med"/>
-                    </a:lnB>
-                    <a:solidFill>
-                      <a:schemeClr val="bg1">
-                        <a:lumMod val="75000"/>
-                      </a:schemeClr>
-                    </a:solidFill>
-                  </a:tcPr>
-                </a:tc>
-                <a:tc>
-                  <a:txBody>
-                    <a:bodyPr/>
-                    <a:lstStyle/>
-                    <a:p>
-                      <a:pPr algn="l" fontAlgn="t"/>
-                      <a:r>
-                        <a:rPr lang="en-US" sz="1200" b="0" i="0" u="none" strike="noStrike" smtClean="0">
-                          <a:solidFill>
-                            <a:srgbClr val="002060"/>
-                          </a:solidFill>
-                          <a:effectLst/>
-                          <a:latin typeface="Intel Clear" panose="020B0604020203020204" pitchFamily="34" charset="0"/>
-                          <a:ea typeface="Intel Clear" panose="020B0604020203020204" pitchFamily="34" charset="0"/>
-                          <a:cs typeface="Intel Clear" panose="020B0604020203020204" pitchFamily="34" charset="0"/>
-                        </a:rPr>
-                        <a:t> </a:t>
-                      </a:r>
-                      <a:endParaRPr lang="en-US" sz="1200" b="0" i="0" u="none" strike="noStrike" dirty="0">
+                      <a:endParaRPr lang="en-US" sz="1050" b="0" i="0" u="none" strike="noStrike" dirty="0">
                         <a:solidFill>
                           <a:srgbClr val="002060"/>
                         </a:solidFill>
@@ -4883,7 +4459,7 @@
                     <a:p>
                       <a:pPr algn="ctr" fontAlgn="t"/>
                       <a:r>
-                        <a:rPr lang="en-US" sz="1200" b="0" i="0" u="none" strike="noStrike" smtClean="0">
+                        <a:rPr lang="en-US" sz="1050" b="0" i="0" u="none" strike="noStrike" smtClean="0">
                           <a:solidFill>
                             <a:srgbClr val="002060"/>
                           </a:solidFill>
@@ -4894,7 +4470,7 @@
                         </a:rPr>
                         <a:t> </a:t>
                       </a:r>
-                      <a:endParaRPr lang="en-US" sz="1200" b="0" i="0" u="none" strike="noStrike" dirty="0">
+                      <a:endParaRPr lang="en-US" sz="1050" b="0" i="0" u="none" strike="noStrike" dirty="0">
                         <a:solidFill>
                           <a:srgbClr val="002060"/>
                         </a:solidFill>
@@ -4954,7 +4530,7 @@
                     <a:p>
                       <a:pPr algn="l" fontAlgn="t"/>
                       <a:r>
-                        <a:rPr lang="en-US" sz="1200" b="0" i="0" u="none" strike="noStrike" smtClean="0">
+                        <a:rPr lang="en-US" sz="1050" b="0" i="0" u="none" strike="noStrike" smtClean="0">
                           <a:solidFill>
                             <a:srgbClr val="002060"/>
                           </a:solidFill>
@@ -4965,7 +4541,7 @@
                         </a:rPr>
                         <a:t> </a:t>
                       </a:r>
-                      <a:endParaRPr lang="en-US" sz="1200" b="0" i="0" u="none" strike="noStrike" dirty="0">
+                      <a:endParaRPr lang="en-US" sz="1050" b="0" i="0" u="none" strike="noStrike" dirty="0">
                         <a:solidFill>
                           <a:srgbClr val="002060"/>
                         </a:solidFill>
@@ -5027,7 +4603,7 @@
                     <a:p>
                       <a:pPr algn="l" fontAlgn="t"/>
                       <a:r>
-                        <a:rPr lang="en-US" sz="1200" b="0" i="0" u="none" strike="noStrike" smtClean="0">
+                        <a:rPr lang="en-US" sz="1050" b="0" i="0" u="none" strike="noStrike" smtClean="0">
                           <a:solidFill>
                             <a:srgbClr val="002060"/>
                           </a:solidFill>
@@ -5038,153 +4614,7 @@
                         </a:rPr>
                         <a:t> </a:t>
                       </a:r>
-                      <a:endParaRPr lang="en-US" sz="1200" b="0" i="0" u="none" strike="noStrike" dirty="0">
-                        <a:solidFill>
-                          <a:srgbClr val="002060"/>
-                        </a:solidFill>
-                        <a:effectLst/>
-                        <a:latin typeface="Intel Clear" panose="020B0604020203020204" pitchFamily="34" charset="0"/>
-                        <a:ea typeface="Intel Clear" panose="020B0604020203020204" pitchFamily="34" charset="0"/>
-                        <a:cs typeface="Intel Clear" panose="020B0604020203020204" pitchFamily="34" charset="0"/>
-                      </a:endParaRPr>
-                    </a:p>
-                  </a:txBody>
-                  <a:tcPr marL="45720" marR="45720" marT="27432" marB="27432" anchor="ctr">
-                    <a:lnL w="19050" cap="flat" cmpd="sng" algn="ctr">
-                      <a:solidFill>
-                        <a:srgbClr val="002060"/>
-                      </a:solidFill>
-                      <a:prstDash val="solid"/>
-                      <a:round/>
-                      <a:headEnd type="none" w="med" len="med"/>
-                      <a:tailEnd type="none" w="med" len="med"/>
-                    </a:lnL>
-                    <a:lnR w="19050" cap="flat" cmpd="sng" algn="ctr">
-                      <a:solidFill>
-                        <a:srgbClr val="002060"/>
-                      </a:solidFill>
-                      <a:prstDash val="solid"/>
-                      <a:round/>
-                      <a:headEnd type="none" w="med" len="med"/>
-                      <a:tailEnd type="none" w="med" len="med"/>
-                    </a:lnR>
-                    <a:lnT w="19050" cap="flat" cmpd="sng" algn="ctr">
-                      <a:solidFill>
-                        <a:srgbClr val="002060"/>
-                      </a:solidFill>
-                      <a:prstDash val="solid"/>
-                      <a:round/>
-                      <a:headEnd type="none" w="med" len="med"/>
-                      <a:tailEnd type="none" w="med" len="med"/>
-                    </a:lnT>
-                    <a:lnB w="19050" cap="flat" cmpd="sng" algn="ctr">
-                      <a:solidFill>
-                        <a:srgbClr val="002060"/>
-                      </a:solidFill>
-                      <a:prstDash val="solid"/>
-                      <a:round/>
-                      <a:headEnd type="none" w="med" len="med"/>
-                      <a:tailEnd type="none" w="med" len="med"/>
-                    </a:lnB>
-                    <a:solidFill>
-                      <a:schemeClr val="bg1">
-                        <a:lumMod val="75000"/>
-                      </a:schemeClr>
-                    </a:solidFill>
-                  </a:tcPr>
-                </a:tc>
-                <a:tc>
-                  <a:txBody>
-                    <a:bodyPr/>
-                    <a:lstStyle/>
-                    <a:p>
-                      <a:pPr algn="l" fontAlgn="t"/>
-                      <a:r>
-                        <a:rPr lang="en-US" sz="1200" b="0" i="0" u="none" strike="noStrike" smtClean="0">
-                          <a:solidFill>
-                            <a:srgbClr val="002060"/>
-                          </a:solidFill>
-                          <a:effectLst/>
-                          <a:latin typeface="Intel Clear" panose="020B0604020203020204" pitchFamily="34" charset="0"/>
-                          <a:ea typeface="Intel Clear" panose="020B0604020203020204" pitchFamily="34" charset="0"/>
-                          <a:cs typeface="Intel Clear" panose="020B0604020203020204" pitchFamily="34" charset="0"/>
-                        </a:rPr>
-                        <a:t> </a:t>
-                      </a:r>
-                      <a:endParaRPr lang="en-US" sz="1200" b="0" i="0" u="none" strike="noStrike" dirty="0">
-                        <a:solidFill>
-                          <a:srgbClr val="002060"/>
-                        </a:solidFill>
-                        <a:effectLst/>
-                        <a:latin typeface="Intel Clear" panose="020B0604020203020204" pitchFamily="34" charset="0"/>
-                        <a:ea typeface="Intel Clear" panose="020B0604020203020204" pitchFamily="34" charset="0"/>
-                        <a:cs typeface="Intel Clear" panose="020B0604020203020204" pitchFamily="34" charset="0"/>
-                      </a:endParaRPr>
-                    </a:p>
-                  </a:txBody>
-                  <a:tcPr marL="45720" marR="45720" marT="27432" marB="27432" anchor="ctr">
-                    <a:lnL w="19050" cap="flat" cmpd="sng" algn="ctr">
-                      <a:solidFill>
-                        <a:srgbClr val="002060"/>
-                      </a:solidFill>
-                      <a:prstDash val="solid"/>
-                      <a:round/>
-                      <a:headEnd type="none" w="med" len="med"/>
-                      <a:tailEnd type="none" w="med" len="med"/>
-                    </a:lnL>
-                    <a:lnR w="19050" cap="flat" cmpd="sng" algn="ctr">
-                      <a:solidFill>
-                        <a:srgbClr val="002060"/>
-                      </a:solidFill>
-                      <a:prstDash val="solid"/>
-                      <a:round/>
-                      <a:headEnd type="none" w="med" len="med"/>
-                      <a:tailEnd type="none" w="med" len="med"/>
-                    </a:lnR>
-                    <a:lnT w="19050" cap="flat" cmpd="sng" algn="ctr">
-                      <a:solidFill>
-                        <a:srgbClr val="002060"/>
-                      </a:solidFill>
-                      <a:prstDash val="solid"/>
-                      <a:round/>
-                      <a:headEnd type="none" w="med" len="med"/>
-                      <a:tailEnd type="none" w="med" len="med"/>
-                    </a:lnT>
-                    <a:lnB w="19050" cap="flat" cmpd="sng" algn="ctr">
-                      <a:solidFill>
-                        <a:srgbClr val="002060"/>
-                      </a:solidFill>
-                      <a:prstDash val="solid"/>
-                      <a:round/>
-                      <a:headEnd type="none" w="med" len="med"/>
-                      <a:tailEnd type="none" w="med" len="med"/>
-                    </a:lnB>
-                    <a:solidFill>
-                      <a:schemeClr val="bg1">
-                        <a:lumMod val="75000"/>
-                      </a:schemeClr>
-                    </a:solidFill>
-                  </a:tcPr>
-                </a:tc>
-                <a:tc>
-                  <a:txBody>
-                    <a:bodyPr/>
-                    <a:lstStyle/>
-                    <a:p>
-                      <a:pPr algn="l" fontAlgn="t"/>
-                      <a:r>
-                        <a:rPr lang="en-US" sz="1200" b="0" i="0" u="none" strike="noStrike" smtClean="0">
-                          <a:solidFill>
-                            <a:srgbClr val="002060"/>
-                          </a:solidFill>
-                          <a:effectLst/>
-                          <a:latin typeface="Intel Clear" panose="020B0604020203020204" pitchFamily="34" charset="0"/>
-                          <a:ea typeface="Intel Clear" panose="020B0604020203020204" pitchFamily="34" charset="0"/>
-                          <a:cs typeface="Intel Clear" panose="020B0604020203020204" pitchFamily="34" charset="0"/>
-                        </a:rPr>
-                        <a:t> </a:t>
-                      </a:r>
-                      <a:endParaRPr lang="en-US" sz="1200" b="0" i="0" u="none" strike="noStrike" dirty="0">
+                      <a:endParaRPr lang="en-US" sz="1050" b="0" i="0" u="none" strike="noStrike" dirty="0">
                         <a:solidFill>
                           <a:srgbClr val="002060"/>
                         </a:solidFill>
@@ -5253,7 +4683,7 @@
                     <a:p>
                       <a:pPr algn="ctr" fontAlgn="t"/>
                       <a:r>
-                        <a:rPr lang="en-US" sz="1200" b="0" i="0" u="none" strike="noStrike" baseline="0" smtClean="0">
+                        <a:rPr lang="en-US" sz="1050" b="0" i="0" u="none" strike="noStrike" baseline="0" smtClean="0">
                           <a:solidFill>
                             <a:srgbClr val="002060"/>
                           </a:solidFill>
@@ -5264,7 +4694,7 @@
                         </a:rPr>
                         <a:t> </a:t>
                       </a:r>
-                      <a:endParaRPr lang="en-US" sz="1200" b="0" i="0" u="none" strike="noStrike" dirty="0">
+                      <a:endParaRPr lang="en-US" sz="1050" b="0" i="0" u="none" strike="noStrike" dirty="0">
                         <a:solidFill>
                           <a:srgbClr val="002060"/>
                         </a:solidFill>
@@ -5324,7 +4754,7 @@
                     <a:p>
                       <a:pPr algn="l" fontAlgn="t"/>
                       <a:r>
-                        <a:rPr lang="en-US" sz="1200" b="0" i="0" u="none" strike="noStrike" smtClean="0">
+                        <a:rPr lang="en-US" sz="1050" b="0" i="0" u="none" strike="noStrike" smtClean="0">
                           <a:solidFill>
                             <a:srgbClr val="002060"/>
                           </a:solidFill>
@@ -5335,7 +4765,7 @@
                         </a:rPr>
                         <a:t> </a:t>
                       </a:r>
-                      <a:endParaRPr lang="en-US" sz="1200" b="0" i="0" u="none" strike="noStrike" dirty="0">
+                      <a:endParaRPr lang="en-US" sz="1050" b="0" i="0" u="none" strike="noStrike" dirty="0">
                         <a:solidFill>
                           <a:srgbClr val="002060"/>
                         </a:solidFill>
@@ -5397,7 +4827,7 @@
                     <a:p>
                       <a:pPr algn="l" fontAlgn="t"/>
                       <a:r>
-                        <a:rPr lang="en-US" sz="1200" b="0" i="0" u="none" strike="noStrike" smtClean="0">
+                        <a:rPr lang="en-US" sz="1050" b="0" i="0" u="none" strike="noStrike" smtClean="0">
                           <a:solidFill>
                             <a:srgbClr val="002060"/>
                           </a:solidFill>
@@ -5408,153 +4838,7 @@
                         </a:rPr>
                         <a:t> </a:t>
                       </a:r>
-                      <a:endParaRPr lang="en-US" sz="1200" b="0" i="0" u="none" strike="noStrike" dirty="0">
-                        <a:solidFill>
-                          <a:srgbClr val="002060"/>
-                        </a:solidFill>
-                        <a:effectLst/>
-                        <a:latin typeface="Intel Clear" panose="020B0604020203020204" pitchFamily="34" charset="0"/>
-                        <a:ea typeface="Intel Clear" panose="020B0604020203020204" pitchFamily="34" charset="0"/>
-                        <a:cs typeface="Intel Clear" panose="020B0604020203020204" pitchFamily="34" charset="0"/>
-                      </a:endParaRPr>
-                    </a:p>
-                  </a:txBody>
-                  <a:tcPr marL="45720" marR="45720" marT="27432" marB="27432" anchor="ctr">
-                    <a:lnL w="19050" cap="flat" cmpd="sng" algn="ctr">
-                      <a:solidFill>
-                        <a:srgbClr val="002060"/>
-                      </a:solidFill>
-                      <a:prstDash val="solid"/>
-                      <a:round/>
-                      <a:headEnd type="none" w="med" len="med"/>
-                      <a:tailEnd type="none" w="med" len="med"/>
-                    </a:lnL>
-                    <a:lnR w="19050" cap="flat" cmpd="sng" algn="ctr">
-                      <a:solidFill>
-                        <a:srgbClr val="002060"/>
-                      </a:solidFill>
-                      <a:prstDash val="solid"/>
-                      <a:round/>
-                      <a:headEnd type="none" w="med" len="med"/>
-                      <a:tailEnd type="none" w="med" len="med"/>
-                    </a:lnR>
-                    <a:lnT w="19050" cap="flat" cmpd="sng" algn="ctr">
-                      <a:solidFill>
-                        <a:srgbClr val="002060"/>
-                      </a:solidFill>
-                      <a:prstDash val="solid"/>
-                      <a:round/>
-                      <a:headEnd type="none" w="med" len="med"/>
-                      <a:tailEnd type="none" w="med" len="med"/>
-                    </a:lnT>
-                    <a:lnB w="19050" cap="flat" cmpd="sng" algn="ctr">
-                      <a:solidFill>
-                        <a:srgbClr val="002060"/>
-                      </a:solidFill>
-                      <a:prstDash val="solid"/>
-                      <a:round/>
-                      <a:headEnd type="none" w="med" len="med"/>
-                      <a:tailEnd type="none" w="med" len="med"/>
-                    </a:lnB>
-                    <a:solidFill>
-                      <a:schemeClr val="bg1">
-                        <a:lumMod val="75000"/>
-                      </a:schemeClr>
-                    </a:solidFill>
-                  </a:tcPr>
-                </a:tc>
-                <a:tc>
-                  <a:txBody>
-                    <a:bodyPr/>
-                    <a:lstStyle/>
-                    <a:p>
-                      <a:pPr algn="l" fontAlgn="t"/>
-                      <a:r>
-                        <a:rPr lang="en-US" sz="1200" b="0" i="0" u="none" strike="noStrike" smtClean="0">
-                          <a:solidFill>
-                            <a:srgbClr val="002060"/>
-                          </a:solidFill>
-                          <a:effectLst/>
-                          <a:latin typeface="Intel Clear" panose="020B0604020203020204" pitchFamily="34" charset="0"/>
-                          <a:ea typeface="Intel Clear" panose="020B0604020203020204" pitchFamily="34" charset="0"/>
-                          <a:cs typeface="Intel Clear" panose="020B0604020203020204" pitchFamily="34" charset="0"/>
-                        </a:rPr>
-                        <a:t> </a:t>
-                      </a:r>
-                      <a:endParaRPr lang="en-US" sz="1200" b="0" i="0" u="none" strike="noStrike" dirty="0">
-                        <a:solidFill>
-                          <a:srgbClr val="002060"/>
-                        </a:solidFill>
-                        <a:effectLst/>
-                        <a:latin typeface="Intel Clear" panose="020B0604020203020204" pitchFamily="34" charset="0"/>
-                        <a:ea typeface="Intel Clear" panose="020B0604020203020204" pitchFamily="34" charset="0"/>
-                        <a:cs typeface="Intel Clear" panose="020B0604020203020204" pitchFamily="34" charset="0"/>
-                      </a:endParaRPr>
-                    </a:p>
-                  </a:txBody>
-                  <a:tcPr marL="45720" marR="45720" marT="27432" marB="27432" anchor="ctr">
-                    <a:lnL w="19050" cap="flat" cmpd="sng" algn="ctr">
-                      <a:solidFill>
-                        <a:srgbClr val="002060"/>
-                      </a:solidFill>
-                      <a:prstDash val="solid"/>
-                      <a:round/>
-                      <a:headEnd type="none" w="med" len="med"/>
-                      <a:tailEnd type="none" w="med" len="med"/>
-                    </a:lnL>
-                    <a:lnR w="19050" cap="flat" cmpd="sng" algn="ctr">
-                      <a:solidFill>
-                        <a:srgbClr val="002060"/>
-                      </a:solidFill>
-                      <a:prstDash val="solid"/>
-                      <a:round/>
-                      <a:headEnd type="none" w="med" len="med"/>
-                      <a:tailEnd type="none" w="med" len="med"/>
-                    </a:lnR>
-                    <a:lnT w="19050" cap="flat" cmpd="sng" algn="ctr">
-                      <a:solidFill>
-                        <a:srgbClr val="002060"/>
-                      </a:solidFill>
-                      <a:prstDash val="solid"/>
-                      <a:round/>
-                      <a:headEnd type="none" w="med" len="med"/>
-                      <a:tailEnd type="none" w="med" len="med"/>
-                    </a:lnT>
-                    <a:lnB w="19050" cap="flat" cmpd="sng" algn="ctr">
-                      <a:solidFill>
-                        <a:srgbClr val="002060"/>
-                      </a:solidFill>
-                      <a:prstDash val="solid"/>
-                      <a:round/>
-                      <a:headEnd type="none" w="med" len="med"/>
-                      <a:tailEnd type="none" w="med" len="med"/>
-                    </a:lnB>
-                    <a:solidFill>
-                      <a:schemeClr val="bg1">
-                        <a:lumMod val="75000"/>
-                      </a:schemeClr>
-                    </a:solidFill>
-                  </a:tcPr>
-                </a:tc>
-                <a:tc>
-                  <a:txBody>
-                    <a:bodyPr/>
-                    <a:lstStyle/>
-                    <a:p>
-                      <a:pPr algn="l" fontAlgn="t"/>
-                      <a:r>
-                        <a:rPr lang="en-US" sz="1200" b="0" i="0" u="none" strike="noStrike" smtClean="0">
-                          <a:solidFill>
-                            <a:srgbClr val="002060"/>
-                          </a:solidFill>
-                          <a:effectLst/>
-                          <a:latin typeface="Intel Clear" panose="020B0604020203020204" pitchFamily="34" charset="0"/>
-                          <a:ea typeface="Intel Clear" panose="020B0604020203020204" pitchFamily="34" charset="0"/>
-                          <a:cs typeface="Intel Clear" panose="020B0604020203020204" pitchFamily="34" charset="0"/>
-                        </a:rPr>
-                        <a:t> </a:t>
-                      </a:r>
-                      <a:endParaRPr lang="en-US" sz="1200" b="0" i="0" u="none" strike="noStrike" dirty="0">
+                      <a:endParaRPr lang="en-US" sz="1050" b="0" i="0" u="none" strike="noStrike" dirty="0">
                         <a:solidFill>
                           <a:srgbClr val="002060"/>
                         </a:solidFill>
@@ -5623,7 +4907,7 @@
                     <a:p>
                       <a:pPr algn="ctr" fontAlgn="t"/>
                       <a:r>
-                        <a:rPr lang="en-US" sz="1200" b="0" i="0" u="none" strike="noStrike" smtClean="0">
+                        <a:rPr lang="en-US" sz="1050" b="0" i="0" u="none" strike="noStrike" smtClean="0">
                           <a:solidFill>
                             <a:srgbClr val="002060"/>
                           </a:solidFill>
@@ -5634,7 +4918,7 @@
                         </a:rPr>
                         <a:t> </a:t>
                       </a:r>
-                      <a:endParaRPr lang="en-US" sz="1200" b="0" i="0" u="none" strike="noStrike" dirty="0">
+                      <a:endParaRPr lang="en-US" sz="1050" b="0" i="0" u="none" strike="noStrike" dirty="0">
                         <a:solidFill>
                           <a:srgbClr val="002060"/>
                         </a:solidFill>
@@ -5694,7 +4978,7 @@
                     <a:p>
                       <a:pPr algn="l" fontAlgn="t"/>
                       <a:r>
-                        <a:rPr lang="en-US" sz="1200" b="0" i="0" u="none" strike="noStrike" smtClean="0">
+                        <a:rPr lang="en-US" sz="1050" b="0" i="0" u="none" strike="noStrike" smtClean="0">
                           <a:solidFill>
                             <a:srgbClr val="002060"/>
                           </a:solidFill>
@@ -5705,7 +4989,7 @@
                         </a:rPr>
                         <a:t> </a:t>
                       </a:r>
-                      <a:endParaRPr lang="en-US" sz="1200" b="0" i="0" u="none" strike="noStrike" dirty="0">
+                      <a:endParaRPr lang="en-US" sz="1050" b="0" i="0" u="none" strike="noStrike" dirty="0">
                         <a:solidFill>
                           <a:srgbClr val="002060"/>
                         </a:solidFill>
@@ -5767,7 +5051,7 @@
                     <a:p>
                       <a:pPr algn="l" fontAlgn="t"/>
                       <a:r>
-                        <a:rPr lang="en-US" sz="1200" b="0" i="0" u="none" strike="noStrike" smtClean="0">
+                        <a:rPr lang="en-US" sz="1050" b="0" i="0" u="none" strike="noStrike" smtClean="0">
                           <a:solidFill>
                             <a:srgbClr val="002060"/>
                           </a:solidFill>
@@ -5778,153 +5062,7 @@
                         </a:rPr>
                         <a:t> </a:t>
                       </a:r>
-                      <a:endParaRPr lang="en-US" sz="1200" b="0" i="0" u="none" strike="noStrike" dirty="0">
-                        <a:solidFill>
-                          <a:srgbClr val="002060"/>
-                        </a:solidFill>
-                        <a:effectLst/>
-                        <a:latin typeface="Intel Clear" panose="020B0604020203020204" pitchFamily="34" charset="0"/>
-                        <a:ea typeface="Intel Clear" panose="020B0604020203020204" pitchFamily="34" charset="0"/>
-                        <a:cs typeface="Intel Clear" panose="020B0604020203020204" pitchFamily="34" charset="0"/>
-                      </a:endParaRPr>
-                    </a:p>
-                  </a:txBody>
-                  <a:tcPr marL="45720" marR="45720" marT="27432" marB="27432" anchor="ctr">
-                    <a:lnL w="19050" cap="flat" cmpd="sng" algn="ctr">
-                      <a:solidFill>
-                        <a:srgbClr val="002060"/>
-                      </a:solidFill>
-                      <a:prstDash val="solid"/>
-                      <a:round/>
-                      <a:headEnd type="none" w="med" len="med"/>
-                      <a:tailEnd type="none" w="med" len="med"/>
-                    </a:lnL>
-                    <a:lnR w="19050" cap="flat" cmpd="sng" algn="ctr">
-                      <a:solidFill>
-                        <a:srgbClr val="002060"/>
-                      </a:solidFill>
-                      <a:prstDash val="solid"/>
-                      <a:round/>
-                      <a:headEnd type="none" w="med" len="med"/>
-                      <a:tailEnd type="none" w="med" len="med"/>
-                    </a:lnR>
-                    <a:lnT w="19050" cap="flat" cmpd="sng" algn="ctr">
-                      <a:solidFill>
-                        <a:srgbClr val="002060"/>
-                      </a:solidFill>
-                      <a:prstDash val="solid"/>
-                      <a:round/>
-                      <a:headEnd type="none" w="med" len="med"/>
-                      <a:tailEnd type="none" w="med" len="med"/>
-                    </a:lnT>
-                    <a:lnB w="19050" cap="flat" cmpd="sng" algn="ctr">
-                      <a:solidFill>
-                        <a:srgbClr val="002060"/>
-                      </a:solidFill>
-                      <a:prstDash val="solid"/>
-                      <a:round/>
-                      <a:headEnd type="none" w="med" len="med"/>
-                      <a:tailEnd type="none" w="med" len="med"/>
-                    </a:lnB>
-                    <a:solidFill>
-                      <a:schemeClr val="bg1">
-                        <a:lumMod val="75000"/>
-                      </a:schemeClr>
-                    </a:solidFill>
-                  </a:tcPr>
-                </a:tc>
-                <a:tc>
-                  <a:txBody>
-                    <a:bodyPr/>
-                    <a:lstStyle/>
-                    <a:p>
-                      <a:pPr algn="l" fontAlgn="t"/>
-                      <a:r>
-                        <a:rPr lang="en-US" sz="1200" b="0" i="0" u="none" strike="noStrike" smtClean="0">
-                          <a:solidFill>
-                            <a:srgbClr val="002060"/>
-                          </a:solidFill>
-                          <a:effectLst/>
-                          <a:latin typeface="Intel Clear" panose="020B0604020203020204" pitchFamily="34" charset="0"/>
-                          <a:ea typeface="Intel Clear" panose="020B0604020203020204" pitchFamily="34" charset="0"/>
-                          <a:cs typeface="Intel Clear" panose="020B0604020203020204" pitchFamily="34" charset="0"/>
-                        </a:rPr>
-                        <a:t> </a:t>
-                      </a:r>
-                      <a:endParaRPr lang="en-US" sz="1200" b="0" i="0" u="none" strike="noStrike" dirty="0">
-                        <a:solidFill>
-                          <a:srgbClr val="002060"/>
-                        </a:solidFill>
-                        <a:effectLst/>
-                        <a:latin typeface="Intel Clear" panose="020B0604020203020204" pitchFamily="34" charset="0"/>
-                        <a:ea typeface="Intel Clear" panose="020B0604020203020204" pitchFamily="34" charset="0"/>
-                        <a:cs typeface="Intel Clear" panose="020B0604020203020204" pitchFamily="34" charset="0"/>
-                      </a:endParaRPr>
-                    </a:p>
-                  </a:txBody>
-                  <a:tcPr marL="45720" marR="45720" marT="27432" marB="27432" anchor="ctr">
-                    <a:lnL w="19050" cap="flat" cmpd="sng" algn="ctr">
-                      <a:solidFill>
-                        <a:srgbClr val="002060"/>
-                      </a:solidFill>
-                      <a:prstDash val="solid"/>
-                      <a:round/>
-                      <a:headEnd type="none" w="med" len="med"/>
-                      <a:tailEnd type="none" w="med" len="med"/>
-                    </a:lnL>
-                    <a:lnR w="19050" cap="flat" cmpd="sng" algn="ctr">
-                      <a:solidFill>
-                        <a:srgbClr val="002060"/>
-                      </a:solidFill>
-                      <a:prstDash val="solid"/>
-                      <a:round/>
-                      <a:headEnd type="none" w="med" len="med"/>
-                      <a:tailEnd type="none" w="med" len="med"/>
-                    </a:lnR>
-                    <a:lnT w="19050" cap="flat" cmpd="sng" algn="ctr">
-                      <a:solidFill>
-                        <a:srgbClr val="002060"/>
-                      </a:solidFill>
-                      <a:prstDash val="solid"/>
-                      <a:round/>
-                      <a:headEnd type="none" w="med" len="med"/>
-                      <a:tailEnd type="none" w="med" len="med"/>
-                    </a:lnT>
-                    <a:lnB w="19050" cap="flat" cmpd="sng" algn="ctr">
-                      <a:solidFill>
-                        <a:srgbClr val="002060"/>
-                      </a:solidFill>
-                      <a:prstDash val="solid"/>
-                      <a:round/>
-                      <a:headEnd type="none" w="med" len="med"/>
-                      <a:tailEnd type="none" w="med" len="med"/>
-                    </a:lnB>
-                    <a:solidFill>
-                      <a:schemeClr val="bg1">
-                        <a:lumMod val="75000"/>
-                      </a:schemeClr>
-                    </a:solidFill>
-                  </a:tcPr>
-                </a:tc>
-                <a:tc>
-                  <a:txBody>
-                    <a:bodyPr/>
-                    <a:lstStyle/>
-                    <a:p>
-                      <a:pPr algn="l" fontAlgn="t"/>
-                      <a:r>
-                        <a:rPr lang="en-US" sz="1200" b="0" i="0" u="none" strike="noStrike" smtClean="0">
-                          <a:solidFill>
-                            <a:srgbClr val="002060"/>
-                          </a:solidFill>
-                          <a:effectLst/>
-                          <a:latin typeface="Intel Clear" panose="020B0604020203020204" pitchFamily="34" charset="0"/>
-                          <a:ea typeface="Intel Clear" panose="020B0604020203020204" pitchFamily="34" charset="0"/>
-                          <a:cs typeface="Intel Clear" panose="020B0604020203020204" pitchFamily="34" charset="0"/>
-                        </a:rPr>
-                        <a:t> </a:t>
-                      </a:r>
-                      <a:endParaRPr lang="en-US" sz="1200" b="0" i="0" u="none" strike="noStrike" dirty="0">
+                      <a:endParaRPr lang="en-US" sz="1050" b="0" i="0" u="none" strike="noStrike" dirty="0">
                         <a:solidFill>
                           <a:srgbClr val="002060"/>
                         </a:solidFill>
@@ -5993,7 +5131,7 @@
                     <a:p>
                       <a:pPr algn="ctr" fontAlgn="t"/>
                       <a:r>
-                        <a:rPr lang="en-US" sz="1200" b="0" i="0" u="none" strike="noStrike" smtClean="0">
+                        <a:rPr lang="en-US" sz="1050" b="0" i="0" u="none" strike="noStrike" smtClean="0">
                           <a:solidFill>
                             <a:srgbClr val="002060"/>
                           </a:solidFill>
@@ -6004,7 +5142,7 @@
                         </a:rPr>
                         <a:t> </a:t>
                       </a:r>
-                      <a:endParaRPr lang="en-US" sz="1200" b="0" i="0" u="none" strike="noStrike" dirty="0">
+                      <a:endParaRPr lang="en-US" sz="1050" b="0" i="0" u="none" strike="noStrike" dirty="0">
                         <a:solidFill>
                           <a:srgbClr val="002060"/>
                         </a:solidFill>
@@ -6064,7 +5202,7 @@
                     <a:p>
                       <a:pPr algn="l" fontAlgn="t"/>
                       <a:r>
-                        <a:rPr lang="en-US" sz="1200" b="0" i="0" u="none" strike="noStrike" smtClean="0">
+                        <a:rPr lang="en-US" sz="1050" b="0" i="0" u="none" strike="noStrike" smtClean="0">
                           <a:solidFill>
                             <a:srgbClr val="002060"/>
                           </a:solidFill>
@@ -6075,7 +5213,7 @@
                         </a:rPr>
                         <a:t> </a:t>
                       </a:r>
-                      <a:endParaRPr lang="en-US" sz="1200" b="0" i="0" u="none" strike="noStrike" dirty="0">
+                      <a:endParaRPr lang="en-US" sz="1050" b="0" i="0" u="none" strike="noStrike" dirty="0">
                         <a:solidFill>
                           <a:srgbClr val="002060"/>
                         </a:solidFill>
@@ -6137,7 +5275,7 @@
                     <a:p>
                       <a:pPr algn="l" fontAlgn="t"/>
                       <a:r>
-                        <a:rPr lang="en-US" sz="1200" b="0" i="0" u="none" strike="noStrike" smtClean="0">
+                        <a:rPr lang="en-US" sz="1050" b="0" i="0" u="none" strike="noStrike" smtClean="0">
                           <a:solidFill>
                             <a:srgbClr val="002060"/>
                           </a:solidFill>
@@ -6148,153 +5286,7 @@
                         </a:rPr>
                         <a:t> </a:t>
                       </a:r>
-                      <a:endParaRPr lang="en-US" sz="1200" b="0" i="0" u="none" strike="noStrike" dirty="0">
-                        <a:solidFill>
-                          <a:srgbClr val="002060"/>
-                        </a:solidFill>
-                        <a:effectLst/>
-                        <a:latin typeface="Intel Clear" panose="020B0604020203020204" pitchFamily="34" charset="0"/>
-                        <a:ea typeface="Intel Clear" panose="020B0604020203020204" pitchFamily="34" charset="0"/>
-                        <a:cs typeface="Intel Clear" panose="020B0604020203020204" pitchFamily="34" charset="0"/>
-                      </a:endParaRPr>
-                    </a:p>
-                  </a:txBody>
-                  <a:tcPr marL="45720" marR="45720" marT="27432" marB="27432" anchor="ctr">
-                    <a:lnL w="19050" cap="flat" cmpd="sng" algn="ctr">
-                      <a:solidFill>
-                        <a:srgbClr val="002060"/>
-                      </a:solidFill>
-                      <a:prstDash val="solid"/>
-                      <a:round/>
-                      <a:headEnd type="none" w="med" len="med"/>
-                      <a:tailEnd type="none" w="med" len="med"/>
-                    </a:lnL>
-                    <a:lnR w="19050" cap="flat" cmpd="sng" algn="ctr">
-                      <a:solidFill>
-                        <a:srgbClr val="002060"/>
-                      </a:solidFill>
-                      <a:prstDash val="solid"/>
-                      <a:round/>
-                      <a:headEnd type="none" w="med" len="med"/>
-                      <a:tailEnd type="none" w="med" len="med"/>
-                    </a:lnR>
-                    <a:lnT w="19050" cap="flat" cmpd="sng" algn="ctr">
-                      <a:solidFill>
-                        <a:srgbClr val="002060"/>
-                      </a:solidFill>
-                      <a:prstDash val="solid"/>
-                      <a:round/>
-                      <a:headEnd type="none" w="med" len="med"/>
-                      <a:tailEnd type="none" w="med" len="med"/>
-                    </a:lnT>
-                    <a:lnB w="19050" cap="flat" cmpd="sng" algn="ctr">
-                      <a:solidFill>
-                        <a:srgbClr val="002060"/>
-                      </a:solidFill>
-                      <a:prstDash val="solid"/>
-                      <a:round/>
-                      <a:headEnd type="none" w="med" len="med"/>
-                      <a:tailEnd type="none" w="med" len="med"/>
-                    </a:lnB>
-                    <a:solidFill>
-                      <a:schemeClr val="bg1">
-                        <a:lumMod val="75000"/>
-                      </a:schemeClr>
-                    </a:solidFill>
-                  </a:tcPr>
-                </a:tc>
-                <a:tc>
-                  <a:txBody>
-                    <a:bodyPr/>
-                    <a:lstStyle/>
-                    <a:p>
-                      <a:pPr algn="l" fontAlgn="t"/>
-                      <a:r>
-                        <a:rPr lang="en-US" sz="1200" b="0" i="0" u="none" strike="noStrike" smtClean="0">
-                          <a:solidFill>
-                            <a:srgbClr val="002060"/>
-                          </a:solidFill>
-                          <a:effectLst/>
-                          <a:latin typeface="Intel Clear" panose="020B0604020203020204" pitchFamily="34" charset="0"/>
-                          <a:ea typeface="Intel Clear" panose="020B0604020203020204" pitchFamily="34" charset="0"/>
-                          <a:cs typeface="Intel Clear" panose="020B0604020203020204" pitchFamily="34" charset="0"/>
-                        </a:rPr>
-                        <a:t> </a:t>
-                      </a:r>
-                      <a:endParaRPr lang="en-US" sz="1200" b="0" i="0" u="none" strike="noStrike" dirty="0">
-                        <a:solidFill>
-                          <a:srgbClr val="002060"/>
-                        </a:solidFill>
-                        <a:effectLst/>
-                        <a:latin typeface="Intel Clear" panose="020B0604020203020204" pitchFamily="34" charset="0"/>
-                        <a:ea typeface="Intel Clear" panose="020B0604020203020204" pitchFamily="34" charset="0"/>
-                        <a:cs typeface="Intel Clear" panose="020B0604020203020204" pitchFamily="34" charset="0"/>
-                      </a:endParaRPr>
-                    </a:p>
-                  </a:txBody>
-                  <a:tcPr marL="45720" marR="45720" marT="27432" marB="27432" anchor="ctr">
-                    <a:lnL w="19050" cap="flat" cmpd="sng" algn="ctr">
-                      <a:solidFill>
-                        <a:srgbClr val="002060"/>
-                      </a:solidFill>
-                      <a:prstDash val="solid"/>
-                      <a:round/>
-                      <a:headEnd type="none" w="med" len="med"/>
-                      <a:tailEnd type="none" w="med" len="med"/>
-                    </a:lnL>
-                    <a:lnR w="19050" cap="flat" cmpd="sng" algn="ctr">
-                      <a:solidFill>
-                        <a:srgbClr val="002060"/>
-                      </a:solidFill>
-                      <a:prstDash val="solid"/>
-                      <a:round/>
-                      <a:headEnd type="none" w="med" len="med"/>
-                      <a:tailEnd type="none" w="med" len="med"/>
-                    </a:lnR>
-                    <a:lnT w="19050" cap="flat" cmpd="sng" algn="ctr">
-                      <a:solidFill>
-                        <a:srgbClr val="002060"/>
-                      </a:solidFill>
-                      <a:prstDash val="solid"/>
-                      <a:round/>
-                      <a:headEnd type="none" w="med" len="med"/>
-                      <a:tailEnd type="none" w="med" len="med"/>
-                    </a:lnT>
-                    <a:lnB w="19050" cap="flat" cmpd="sng" algn="ctr">
-                      <a:solidFill>
-                        <a:srgbClr val="002060"/>
-                      </a:solidFill>
-                      <a:prstDash val="solid"/>
-                      <a:round/>
-                      <a:headEnd type="none" w="med" len="med"/>
-                      <a:tailEnd type="none" w="med" len="med"/>
-                    </a:lnB>
-                    <a:solidFill>
-                      <a:schemeClr val="bg1">
-                        <a:lumMod val="75000"/>
-                      </a:schemeClr>
-                    </a:solidFill>
-                  </a:tcPr>
-                </a:tc>
-                <a:tc>
-                  <a:txBody>
-                    <a:bodyPr/>
-                    <a:lstStyle/>
-                    <a:p>
-                      <a:pPr algn="l" fontAlgn="t"/>
-                      <a:r>
-                        <a:rPr lang="en-US" sz="1200" b="0" i="0" u="none" strike="noStrike" smtClean="0">
-                          <a:solidFill>
-                            <a:srgbClr val="002060"/>
-                          </a:solidFill>
-                          <a:effectLst/>
-                          <a:latin typeface="Intel Clear" panose="020B0604020203020204" pitchFamily="34" charset="0"/>
-                          <a:ea typeface="Intel Clear" panose="020B0604020203020204" pitchFamily="34" charset="0"/>
-                          <a:cs typeface="Intel Clear" panose="020B0604020203020204" pitchFamily="34" charset="0"/>
-                        </a:rPr>
-                        <a:t> </a:t>
-                      </a:r>
-                      <a:endParaRPr lang="en-US" sz="1200" b="0" i="0" u="none" strike="noStrike" dirty="0">
+                      <a:endParaRPr lang="en-US" sz="1050" b="0" i="0" u="none" strike="noStrike" dirty="0">
                         <a:solidFill>
                           <a:srgbClr val="002060"/>
                         </a:solidFill>
@@ -6363,7 +5355,7 @@
                     <a:p>
                       <a:pPr algn="ctr" fontAlgn="t"/>
                       <a:r>
-                        <a:rPr lang="en-US" sz="1200" b="0" i="0" u="none" strike="noStrike" smtClean="0">
+                        <a:rPr lang="en-US" sz="1050" b="0" i="0" u="none" strike="noStrike" smtClean="0">
                           <a:solidFill>
                             <a:srgbClr val="002060"/>
                           </a:solidFill>
@@ -6374,7 +5366,7 @@
                         </a:rPr>
                         <a:t> </a:t>
                       </a:r>
-                      <a:endParaRPr lang="en-US" sz="1200" b="0" i="0" u="none" strike="noStrike" dirty="0">
+                      <a:endParaRPr lang="en-US" sz="1050" b="0" i="0" u="none" strike="noStrike" dirty="0">
                         <a:solidFill>
                           <a:srgbClr val="002060"/>
                         </a:solidFill>
@@ -6434,7 +5426,7 @@
                     <a:p>
                       <a:pPr algn="l" fontAlgn="t"/>
                       <a:r>
-                        <a:rPr lang="en-US" sz="1200" b="0" i="0" u="none" strike="noStrike" smtClean="0">
+                        <a:rPr lang="en-US" sz="1050" b="0" i="0" u="none" strike="noStrike" smtClean="0">
                           <a:solidFill>
                             <a:srgbClr val="002060"/>
                           </a:solidFill>
@@ -6445,7 +5437,7 @@
                         </a:rPr>
                         <a:t> </a:t>
                       </a:r>
-                      <a:endParaRPr lang="en-US" sz="1200" b="0" i="0" u="none" strike="noStrike" dirty="0">
+                      <a:endParaRPr lang="en-US" sz="1050" b="0" i="0" u="none" strike="noStrike" dirty="0">
                         <a:solidFill>
                           <a:srgbClr val="002060"/>
                         </a:solidFill>
@@ -6507,7 +5499,7 @@
                     <a:p>
                       <a:pPr algn="l" fontAlgn="t"/>
                       <a:r>
-                        <a:rPr lang="en-US" sz="1200" b="0" i="0" u="none" strike="noStrike" smtClean="0">
+                        <a:rPr lang="en-US" sz="1050" b="0" i="0" u="none" strike="noStrike" smtClean="0">
                           <a:solidFill>
                             <a:srgbClr val="002060"/>
                           </a:solidFill>
@@ -6518,153 +5510,7 @@
                         </a:rPr>
                         <a:t> </a:t>
                       </a:r>
-                      <a:endParaRPr lang="en-US" sz="1200" b="0" i="0" u="none" strike="noStrike" dirty="0">
-                        <a:solidFill>
-                          <a:srgbClr val="002060"/>
-                        </a:solidFill>
-                        <a:effectLst/>
-                        <a:latin typeface="Intel Clear" panose="020B0604020203020204" pitchFamily="34" charset="0"/>
-                        <a:ea typeface="Intel Clear" panose="020B0604020203020204" pitchFamily="34" charset="0"/>
-                        <a:cs typeface="Intel Clear" panose="020B0604020203020204" pitchFamily="34" charset="0"/>
-                      </a:endParaRPr>
-                    </a:p>
-                  </a:txBody>
-                  <a:tcPr marL="45720" marR="45720" marT="27432" marB="27432" anchor="ctr">
-                    <a:lnL w="19050" cap="flat" cmpd="sng" algn="ctr">
-                      <a:solidFill>
-                        <a:srgbClr val="002060"/>
-                      </a:solidFill>
-                      <a:prstDash val="solid"/>
-                      <a:round/>
-                      <a:headEnd type="none" w="med" len="med"/>
-                      <a:tailEnd type="none" w="med" len="med"/>
-                    </a:lnL>
-                    <a:lnR w="19050" cap="flat" cmpd="sng" algn="ctr">
-                      <a:solidFill>
-                        <a:srgbClr val="002060"/>
-                      </a:solidFill>
-                      <a:prstDash val="solid"/>
-                      <a:round/>
-                      <a:headEnd type="none" w="med" len="med"/>
-                      <a:tailEnd type="none" w="med" len="med"/>
-                    </a:lnR>
-                    <a:lnT w="19050" cap="flat" cmpd="sng" algn="ctr">
-                      <a:solidFill>
-                        <a:srgbClr val="002060"/>
-                      </a:solidFill>
-                      <a:prstDash val="solid"/>
-                      <a:round/>
-                      <a:headEnd type="none" w="med" len="med"/>
-                      <a:tailEnd type="none" w="med" len="med"/>
-                    </a:lnT>
-                    <a:lnB w="19050" cap="flat" cmpd="sng" algn="ctr">
-                      <a:solidFill>
-                        <a:srgbClr val="002060"/>
-                      </a:solidFill>
-                      <a:prstDash val="solid"/>
-                      <a:round/>
-                      <a:headEnd type="none" w="med" len="med"/>
-                      <a:tailEnd type="none" w="med" len="med"/>
-                    </a:lnB>
-                    <a:solidFill>
-                      <a:schemeClr val="bg1">
-                        <a:lumMod val="75000"/>
-                      </a:schemeClr>
-                    </a:solidFill>
-                  </a:tcPr>
-                </a:tc>
-                <a:tc>
-                  <a:txBody>
-                    <a:bodyPr/>
-                    <a:lstStyle/>
-                    <a:p>
-                      <a:pPr algn="l" fontAlgn="t"/>
-                      <a:r>
-                        <a:rPr lang="en-US" sz="1200" b="0" i="0" u="none" strike="noStrike" smtClean="0">
-                          <a:solidFill>
-                            <a:srgbClr val="002060"/>
-                          </a:solidFill>
-                          <a:effectLst/>
-                          <a:latin typeface="Intel Clear" panose="020B0604020203020204" pitchFamily="34" charset="0"/>
-                          <a:ea typeface="Intel Clear" panose="020B0604020203020204" pitchFamily="34" charset="0"/>
-                          <a:cs typeface="Intel Clear" panose="020B0604020203020204" pitchFamily="34" charset="0"/>
-                        </a:rPr>
-                        <a:t> </a:t>
-                      </a:r>
-                      <a:endParaRPr lang="en-US" sz="1200" b="0" i="0" u="none" strike="noStrike" dirty="0">
-                        <a:solidFill>
-                          <a:srgbClr val="002060"/>
-                        </a:solidFill>
-                        <a:effectLst/>
-                        <a:latin typeface="Intel Clear" panose="020B0604020203020204" pitchFamily="34" charset="0"/>
-                        <a:ea typeface="Intel Clear" panose="020B0604020203020204" pitchFamily="34" charset="0"/>
-                        <a:cs typeface="Intel Clear" panose="020B0604020203020204" pitchFamily="34" charset="0"/>
-                      </a:endParaRPr>
-                    </a:p>
-                  </a:txBody>
-                  <a:tcPr marL="45720" marR="45720" marT="27432" marB="27432" anchor="ctr">
-                    <a:lnL w="19050" cap="flat" cmpd="sng" algn="ctr">
-                      <a:solidFill>
-                        <a:srgbClr val="002060"/>
-                      </a:solidFill>
-                      <a:prstDash val="solid"/>
-                      <a:round/>
-                      <a:headEnd type="none" w="med" len="med"/>
-                      <a:tailEnd type="none" w="med" len="med"/>
-                    </a:lnL>
-                    <a:lnR w="19050" cap="flat" cmpd="sng" algn="ctr">
-                      <a:solidFill>
-                        <a:srgbClr val="002060"/>
-                      </a:solidFill>
-                      <a:prstDash val="solid"/>
-                      <a:round/>
-                      <a:headEnd type="none" w="med" len="med"/>
-                      <a:tailEnd type="none" w="med" len="med"/>
-                    </a:lnR>
-                    <a:lnT w="19050" cap="flat" cmpd="sng" algn="ctr">
-                      <a:solidFill>
-                        <a:srgbClr val="002060"/>
-                      </a:solidFill>
-                      <a:prstDash val="solid"/>
-                      <a:round/>
-                      <a:headEnd type="none" w="med" len="med"/>
-                      <a:tailEnd type="none" w="med" len="med"/>
-                    </a:lnT>
-                    <a:lnB w="19050" cap="flat" cmpd="sng" algn="ctr">
-                      <a:solidFill>
-                        <a:srgbClr val="002060"/>
-                      </a:solidFill>
-                      <a:prstDash val="solid"/>
-                      <a:round/>
-                      <a:headEnd type="none" w="med" len="med"/>
-                      <a:tailEnd type="none" w="med" len="med"/>
-                    </a:lnB>
-                    <a:solidFill>
-                      <a:schemeClr val="bg1">
-                        <a:lumMod val="75000"/>
-                      </a:schemeClr>
-                    </a:solidFill>
-                  </a:tcPr>
-                </a:tc>
-                <a:tc>
-                  <a:txBody>
-                    <a:bodyPr/>
-                    <a:lstStyle/>
-                    <a:p>
-                      <a:pPr algn="l" fontAlgn="t"/>
-                      <a:r>
-                        <a:rPr lang="en-US" sz="1200" b="0" i="0" u="none" strike="noStrike" smtClean="0">
-                          <a:solidFill>
-                            <a:srgbClr val="002060"/>
-                          </a:solidFill>
-                          <a:effectLst/>
-                          <a:latin typeface="Intel Clear" panose="020B0604020203020204" pitchFamily="34" charset="0"/>
-                          <a:ea typeface="Intel Clear" panose="020B0604020203020204" pitchFamily="34" charset="0"/>
-                          <a:cs typeface="Intel Clear" panose="020B0604020203020204" pitchFamily="34" charset="0"/>
-                        </a:rPr>
-                        <a:t> </a:t>
-                      </a:r>
-                      <a:endParaRPr lang="en-US" sz="1200" b="0" i="0" u="none" strike="noStrike" dirty="0">
+                      <a:endParaRPr lang="en-US" sz="1050" b="0" i="0" u="none" strike="noStrike" dirty="0">
                         <a:solidFill>
                           <a:srgbClr val="002060"/>
                         </a:solidFill>
@@ -6733,7 +5579,7 @@
                     <a:p>
                       <a:pPr algn="ctr" fontAlgn="t"/>
                       <a:r>
-                        <a:rPr lang="en-US" sz="1200" b="0" i="0" u="none" strike="noStrike" smtClean="0">
+                        <a:rPr lang="en-US" sz="1050" b="0" i="0" u="none" strike="noStrike" smtClean="0">
                           <a:solidFill>
                             <a:srgbClr val="002060"/>
                           </a:solidFill>
@@ -6744,7 +5590,7 @@
                         </a:rPr>
                         <a:t> </a:t>
                       </a:r>
-                      <a:endParaRPr lang="en-US" sz="1200" b="0" i="0" u="none" strike="noStrike" dirty="0">
+                      <a:endParaRPr lang="en-US" sz="1050" b="0" i="0" u="none" strike="noStrike" dirty="0">
                         <a:solidFill>
                           <a:srgbClr val="002060"/>
                         </a:solidFill>
@@ -6804,7 +5650,7 @@
                     <a:p>
                       <a:pPr algn="l" fontAlgn="t"/>
                       <a:r>
-                        <a:rPr lang="en-US" sz="1200" b="0" i="0" u="none" strike="noStrike" smtClean="0">
+                        <a:rPr lang="en-US" sz="1050" b="0" i="0" u="none" strike="noStrike" smtClean="0">
                           <a:solidFill>
                             <a:srgbClr val="002060"/>
                           </a:solidFill>
@@ -6815,7 +5661,7 @@
                         </a:rPr>
                         <a:t> </a:t>
                       </a:r>
-                      <a:endParaRPr lang="en-US" sz="1200" b="0" i="0" u="none" strike="noStrike" dirty="0">
+                      <a:endParaRPr lang="en-US" sz="1050" b="0" i="0" u="none" strike="noStrike" dirty="0">
                         <a:solidFill>
                           <a:srgbClr val="002060"/>
                         </a:solidFill>
@@ -6877,7 +5723,7 @@
                     <a:p>
                       <a:pPr algn="l" fontAlgn="t"/>
                       <a:r>
-                        <a:rPr lang="en-US" sz="1200" b="0" i="0" u="none" strike="noStrike" smtClean="0">
+                        <a:rPr lang="en-US" sz="1050" b="0" i="0" u="none" strike="noStrike" smtClean="0">
                           <a:solidFill>
                             <a:srgbClr val="002060"/>
                           </a:solidFill>
@@ -6888,153 +5734,7 @@
                         </a:rPr>
                         <a:t> </a:t>
                       </a:r>
-                      <a:endParaRPr lang="en-US" sz="1200" b="0" i="0" u="none" strike="noStrike" dirty="0">
-                        <a:solidFill>
-                          <a:srgbClr val="002060"/>
-                        </a:solidFill>
-                        <a:effectLst/>
-                        <a:latin typeface="Intel Clear" panose="020B0604020203020204" pitchFamily="34" charset="0"/>
-                        <a:ea typeface="Intel Clear" panose="020B0604020203020204" pitchFamily="34" charset="0"/>
-                        <a:cs typeface="Intel Clear" panose="020B0604020203020204" pitchFamily="34" charset="0"/>
-                      </a:endParaRPr>
-                    </a:p>
-                  </a:txBody>
-                  <a:tcPr marL="45720" marR="45720" marT="27432" marB="27432" anchor="ctr">
-                    <a:lnL w="19050" cap="flat" cmpd="sng" algn="ctr">
-                      <a:solidFill>
-                        <a:srgbClr val="002060"/>
-                      </a:solidFill>
-                      <a:prstDash val="solid"/>
-                      <a:round/>
-                      <a:headEnd type="none" w="med" len="med"/>
-                      <a:tailEnd type="none" w="med" len="med"/>
-                    </a:lnL>
-                    <a:lnR w="19050" cap="flat" cmpd="sng" algn="ctr">
-                      <a:solidFill>
-                        <a:srgbClr val="002060"/>
-                      </a:solidFill>
-                      <a:prstDash val="solid"/>
-                      <a:round/>
-                      <a:headEnd type="none" w="med" len="med"/>
-                      <a:tailEnd type="none" w="med" len="med"/>
-                    </a:lnR>
-                    <a:lnT w="19050" cap="flat" cmpd="sng" algn="ctr">
-                      <a:solidFill>
-                        <a:srgbClr val="002060"/>
-                      </a:solidFill>
-                      <a:prstDash val="solid"/>
-                      <a:round/>
-                      <a:headEnd type="none" w="med" len="med"/>
-                      <a:tailEnd type="none" w="med" len="med"/>
-                    </a:lnT>
-                    <a:lnB w="19050" cap="flat" cmpd="sng" algn="ctr">
-                      <a:solidFill>
-                        <a:srgbClr val="002060"/>
-                      </a:solidFill>
-                      <a:prstDash val="solid"/>
-                      <a:round/>
-                      <a:headEnd type="none" w="med" len="med"/>
-                      <a:tailEnd type="none" w="med" len="med"/>
-                    </a:lnB>
-                    <a:solidFill>
-                      <a:schemeClr val="bg1">
-                        <a:lumMod val="75000"/>
-                      </a:schemeClr>
-                    </a:solidFill>
-                  </a:tcPr>
-                </a:tc>
-                <a:tc>
-                  <a:txBody>
-                    <a:bodyPr/>
-                    <a:lstStyle/>
-                    <a:p>
-                      <a:pPr algn="l" fontAlgn="t"/>
-                      <a:r>
-                        <a:rPr lang="en-US" sz="1200" b="0" i="0" u="none" strike="noStrike" smtClean="0">
-                          <a:solidFill>
-                            <a:srgbClr val="002060"/>
-                          </a:solidFill>
-                          <a:effectLst/>
-                          <a:latin typeface="Intel Clear" panose="020B0604020203020204" pitchFamily="34" charset="0"/>
-                          <a:ea typeface="Intel Clear" panose="020B0604020203020204" pitchFamily="34" charset="0"/>
-                          <a:cs typeface="Intel Clear" panose="020B0604020203020204" pitchFamily="34" charset="0"/>
-                        </a:rPr>
-                        <a:t> </a:t>
-                      </a:r>
-                      <a:endParaRPr lang="en-US" sz="1200" b="0" i="0" u="none" strike="noStrike" dirty="0">
-                        <a:solidFill>
-                          <a:srgbClr val="002060"/>
-                        </a:solidFill>
-                        <a:effectLst/>
-                        <a:latin typeface="Intel Clear" panose="020B0604020203020204" pitchFamily="34" charset="0"/>
-                        <a:ea typeface="Intel Clear" panose="020B0604020203020204" pitchFamily="34" charset="0"/>
-                        <a:cs typeface="Intel Clear" panose="020B0604020203020204" pitchFamily="34" charset="0"/>
-                      </a:endParaRPr>
-                    </a:p>
-                  </a:txBody>
-                  <a:tcPr marL="45720" marR="45720" marT="27432" marB="27432" anchor="ctr">
-                    <a:lnL w="19050" cap="flat" cmpd="sng" algn="ctr">
-                      <a:solidFill>
-                        <a:srgbClr val="002060"/>
-                      </a:solidFill>
-                      <a:prstDash val="solid"/>
-                      <a:round/>
-                      <a:headEnd type="none" w="med" len="med"/>
-                      <a:tailEnd type="none" w="med" len="med"/>
-                    </a:lnL>
-                    <a:lnR w="19050" cap="flat" cmpd="sng" algn="ctr">
-                      <a:solidFill>
-                        <a:srgbClr val="002060"/>
-                      </a:solidFill>
-                      <a:prstDash val="solid"/>
-                      <a:round/>
-                      <a:headEnd type="none" w="med" len="med"/>
-                      <a:tailEnd type="none" w="med" len="med"/>
-                    </a:lnR>
-                    <a:lnT w="19050" cap="flat" cmpd="sng" algn="ctr">
-                      <a:solidFill>
-                        <a:srgbClr val="002060"/>
-                      </a:solidFill>
-                      <a:prstDash val="solid"/>
-                      <a:round/>
-                      <a:headEnd type="none" w="med" len="med"/>
-                      <a:tailEnd type="none" w="med" len="med"/>
-                    </a:lnT>
-                    <a:lnB w="19050" cap="flat" cmpd="sng" algn="ctr">
-                      <a:solidFill>
-                        <a:srgbClr val="002060"/>
-                      </a:solidFill>
-                      <a:prstDash val="solid"/>
-                      <a:round/>
-                      <a:headEnd type="none" w="med" len="med"/>
-                      <a:tailEnd type="none" w="med" len="med"/>
-                    </a:lnB>
-                    <a:solidFill>
-                      <a:schemeClr val="bg1">
-                        <a:lumMod val="75000"/>
-                      </a:schemeClr>
-                    </a:solidFill>
-                  </a:tcPr>
-                </a:tc>
-                <a:tc>
-                  <a:txBody>
-                    <a:bodyPr/>
-                    <a:lstStyle/>
-                    <a:p>
-                      <a:pPr algn="l" fontAlgn="t"/>
-                      <a:r>
-                        <a:rPr lang="en-US" sz="1200" b="0" i="0" u="none" strike="noStrike" smtClean="0">
-                          <a:solidFill>
-                            <a:srgbClr val="002060"/>
-                          </a:solidFill>
-                          <a:effectLst/>
-                          <a:latin typeface="Intel Clear" panose="020B0604020203020204" pitchFamily="34" charset="0"/>
-                          <a:ea typeface="Intel Clear" panose="020B0604020203020204" pitchFamily="34" charset="0"/>
-                          <a:cs typeface="Intel Clear" panose="020B0604020203020204" pitchFamily="34" charset="0"/>
-                        </a:rPr>
-                        <a:t> </a:t>
-                      </a:r>
-                      <a:endParaRPr lang="en-US" sz="1200" b="0" i="0" u="none" strike="noStrike" dirty="0">
+                      <a:endParaRPr lang="en-US" sz="1050" b="0" i="0" u="none" strike="noStrike" dirty="0">
                         <a:solidFill>
                           <a:srgbClr val="002060"/>
                         </a:solidFill>
@@ -7103,7 +5803,7 @@
                     <a:p>
                       <a:pPr algn="ctr" fontAlgn="t"/>
                       <a:r>
-                        <a:rPr lang="en-US" sz="1200" b="0" i="0" u="none" strike="noStrike" smtClean="0">
+                        <a:rPr lang="en-US" sz="1050" b="0" i="0" u="none" strike="noStrike" smtClean="0">
                           <a:solidFill>
                             <a:srgbClr val="002060"/>
                           </a:solidFill>
@@ -7114,7 +5814,7 @@
                         </a:rPr>
                         <a:t> </a:t>
                       </a:r>
-                      <a:endParaRPr lang="en-US" sz="1200" b="0" i="0" u="none" strike="noStrike" dirty="0">
+                      <a:endParaRPr lang="en-US" sz="1050" b="0" i="0" u="none" strike="noStrike" dirty="0">
                         <a:solidFill>
                           <a:srgbClr val="002060"/>
                         </a:solidFill>
@@ -7174,7 +5874,7 @@
                     <a:p>
                       <a:pPr algn="l" fontAlgn="t"/>
                       <a:r>
-                        <a:rPr lang="en-US" sz="1200" b="0" i="0" u="none" strike="noStrike" smtClean="0">
+                        <a:rPr lang="en-US" sz="1050" b="0" i="0" u="none" strike="noStrike" smtClean="0">
                           <a:solidFill>
                             <a:srgbClr val="002060"/>
                           </a:solidFill>
@@ -7185,7 +5885,7 @@
                         </a:rPr>
                         <a:t> </a:t>
                       </a:r>
-                      <a:endParaRPr lang="en-US" sz="1200" b="0" i="0" u="none" strike="noStrike" dirty="0">
+                      <a:endParaRPr lang="en-US" sz="1050" b="0" i="0" u="none" strike="noStrike" dirty="0">
                         <a:solidFill>
                           <a:srgbClr val="002060"/>
                         </a:solidFill>
@@ -7247,7 +5947,7 @@
                     <a:p>
                       <a:pPr algn="l" fontAlgn="t"/>
                       <a:r>
-                        <a:rPr lang="en-US" sz="1200" b="0" i="0" u="none" strike="noStrike" smtClean="0">
+                        <a:rPr lang="en-US" sz="1050" b="0" i="0" u="none" strike="noStrike" smtClean="0">
                           <a:solidFill>
                             <a:srgbClr val="002060"/>
                           </a:solidFill>
@@ -7258,153 +5958,7 @@
                         </a:rPr>
                         <a:t> </a:t>
                       </a:r>
-                      <a:endParaRPr lang="en-US" sz="1200" b="0" i="0" u="none" strike="noStrike" dirty="0">
-                        <a:solidFill>
-                          <a:srgbClr val="002060"/>
-                        </a:solidFill>
-                        <a:effectLst/>
-                        <a:latin typeface="Intel Clear" panose="020B0604020203020204" pitchFamily="34" charset="0"/>
-                        <a:ea typeface="Intel Clear" panose="020B0604020203020204" pitchFamily="34" charset="0"/>
-                        <a:cs typeface="Intel Clear" panose="020B0604020203020204" pitchFamily="34" charset="0"/>
-                      </a:endParaRPr>
-                    </a:p>
-                  </a:txBody>
-                  <a:tcPr marL="45720" marR="45720" marT="27432" marB="27432" anchor="ctr">
-                    <a:lnL w="19050" cap="flat" cmpd="sng" algn="ctr">
-                      <a:solidFill>
-                        <a:srgbClr val="002060"/>
-                      </a:solidFill>
-                      <a:prstDash val="solid"/>
-                      <a:round/>
-                      <a:headEnd type="none" w="med" len="med"/>
-                      <a:tailEnd type="none" w="med" len="med"/>
-                    </a:lnL>
-                    <a:lnR w="19050" cap="flat" cmpd="sng" algn="ctr">
-                      <a:solidFill>
-                        <a:srgbClr val="002060"/>
-                      </a:solidFill>
-                      <a:prstDash val="solid"/>
-                      <a:round/>
-                      <a:headEnd type="none" w="med" len="med"/>
-                      <a:tailEnd type="none" w="med" len="med"/>
-                    </a:lnR>
-                    <a:lnT w="19050" cap="flat" cmpd="sng" algn="ctr">
-                      <a:solidFill>
-                        <a:srgbClr val="002060"/>
-                      </a:solidFill>
-                      <a:prstDash val="solid"/>
-                      <a:round/>
-                      <a:headEnd type="none" w="med" len="med"/>
-                      <a:tailEnd type="none" w="med" len="med"/>
-                    </a:lnT>
-                    <a:lnB w="19050" cap="flat" cmpd="sng" algn="ctr">
-                      <a:solidFill>
-                        <a:srgbClr val="002060"/>
-                      </a:solidFill>
-                      <a:prstDash val="solid"/>
-                      <a:round/>
-                      <a:headEnd type="none" w="med" len="med"/>
-                      <a:tailEnd type="none" w="med" len="med"/>
-                    </a:lnB>
-                    <a:solidFill>
-                      <a:schemeClr val="bg1">
-                        <a:lumMod val="75000"/>
-                      </a:schemeClr>
-                    </a:solidFill>
-                  </a:tcPr>
-                </a:tc>
-                <a:tc>
-                  <a:txBody>
-                    <a:bodyPr/>
-                    <a:lstStyle/>
-                    <a:p>
-                      <a:pPr algn="l" fontAlgn="t"/>
-                      <a:r>
-                        <a:rPr lang="en-US" sz="1200" b="0" i="0" u="none" strike="noStrike" smtClean="0">
-                          <a:solidFill>
-                            <a:srgbClr val="002060"/>
-                          </a:solidFill>
-                          <a:effectLst/>
-                          <a:latin typeface="Intel Clear" panose="020B0604020203020204" pitchFamily="34" charset="0"/>
-                          <a:ea typeface="Intel Clear" panose="020B0604020203020204" pitchFamily="34" charset="0"/>
-                          <a:cs typeface="Intel Clear" panose="020B0604020203020204" pitchFamily="34" charset="0"/>
-                        </a:rPr>
-                        <a:t> </a:t>
-                      </a:r>
-                      <a:endParaRPr lang="en-US" sz="1200" b="0" i="0" u="none" strike="noStrike" dirty="0">
-                        <a:solidFill>
-                          <a:srgbClr val="002060"/>
-                        </a:solidFill>
-                        <a:effectLst/>
-                        <a:latin typeface="Intel Clear" panose="020B0604020203020204" pitchFamily="34" charset="0"/>
-                        <a:ea typeface="Intel Clear" panose="020B0604020203020204" pitchFamily="34" charset="0"/>
-                        <a:cs typeface="Intel Clear" panose="020B0604020203020204" pitchFamily="34" charset="0"/>
-                      </a:endParaRPr>
-                    </a:p>
-                  </a:txBody>
-                  <a:tcPr marL="45720" marR="45720" marT="27432" marB="27432" anchor="ctr">
-                    <a:lnL w="19050" cap="flat" cmpd="sng" algn="ctr">
-                      <a:solidFill>
-                        <a:srgbClr val="002060"/>
-                      </a:solidFill>
-                      <a:prstDash val="solid"/>
-                      <a:round/>
-                      <a:headEnd type="none" w="med" len="med"/>
-                      <a:tailEnd type="none" w="med" len="med"/>
-                    </a:lnL>
-                    <a:lnR w="19050" cap="flat" cmpd="sng" algn="ctr">
-                      <a:solidFill>
-                        <a:srgbClr val="002060"/>
-                      </a:solidFill>
-                      <a:prstDash val="solid"/>
-                      <a:round/>
-                      <a:headEnd type="none" w="med" len="med"/>
-                      <a:tailEnd type="none" w="med" len="med"/>
-                    </a:lnR>
-                    <a:lnT w="19050" cap="flat" cmpd="sng" algn="ctr">
-                      <a:solidFill>
-                        <a:srgbClr val="002060"/>
-                      </a:solidFill>
-                      <a:prstDash val="solid"/>
-                      <a:round/>
-                      <a:headEnd type="none" w="med" len="med"/>
-                      <a:tailEnd type="none" w="med" len="med"/>
-                    </a:lnT>
-                    <a:lnB w="19050" cap="flat" cmpd="sng" algn="ctr">
-                      <a:solidFill>
-                        <a:srgbClr val="002060"/>
-                      </a:solidFill>
-                      <a:prstDash val="solid"/>
-                      <a:round/>
-                      <a:headEnd type="none" w="med" len="med"/>
-                      <a:tailEnd type="none" w="med" len="med"/>
-                    </a:lnB>
-                    <a:solidFill>
-                      <a:schemeClr val="bg1">
-                        <a:lumMod val="75000"/>
-                      </a:schemeClr>
-                    </a:solidFill>
-                  </a:tcPr>
-                </a:tc>
-                <a:tc>
-                  <a:txBody>
-                    <a:bodyPr/>
-                    <a:lstStyle/>
-                    <a:p>
-                      <a:pPr algn="l" fontAlgn="t"/>
-                      <a:r>
-                        <a:rPr lang="en-US" sz="1200" b="0" i="0" u="none" strike="noStrike" smtClean="0">
-                          <a:solidFill>
-                            <a:srgbClr val="002060"/>
-                          </a:solidFill>
-                          <a:effectLst/>
-                          <a:latin typeface="Intel Clear" panose="020B0604020203020204" pitchFamily="34" charset="0"/>
-                          <a:ea typeface="Intel Clear" panose="020B0604020203020204" pitchFamily="34" charset="0"/>
-                          <a:cs typeface="Intel Clear" panose="020B0604020203020204" pitchFamily="34" charset="0"/>
-                        </a:rPr>
-                        <a:t> </a:t>
-                      </a:r>
-                      <a:endParaRPr lang="en-US" sz="1200" b="0" i="0" u="none" strike="noStrike" dirty="0">
+                      <a:endParaRPr lang="en-US" sz="1050" b="0" i="0" u="none" strike="noStrike" dirty="0">
                         <a:solidFill>
                           <a:srgbClr val="002060"/>
                         </a:solidFill>
@@ -7473,7 +6027,7 @@
                     <a:p>
                       <a:pPr algn="ctr" fontAlgn="t"/>
                       <a:r>
-                        <a:rPr lang="en-US" sz="1200" b="0" i="0" u="none" strike="noStrike" smtClean="0">
+                        <a:rPr lang="en-US" sz="1050" b="0" i="0" u="none" strike="noStrike" smtClean="0">
                           <a:solidFill>
                             <a:srgbClr val="002060"/>
                           </a:solidFill>
@@ -7484,7 +6038,7 @@
                         </a:rPr>
                         <a:t> </a:t>
                       </a:r>
-                      <a:endParaRPr lang="en-US" sz="1200" b="0" i="0" u="none" strike="noStrike" dirty="0">
+                      <a:endParaRPr lang="en-US" sz="1050" b="0" i="0" u="none" strike="noStrike" dirty="0">
                         <a:solidFill>
                           <a:srgbClr val="002060"/>
                         </a:solidFill>
@@ -7544,7 +6098,7 @@
                     <a:p>
                       <a:pPr algn="l" fontAlgn="t"/>
                       <a:r>
-                        <a:rPr lang="en-US" sz="1200" b="0" i="0" u="none" strike="noStrike" smtClean="0">
+                        <a:rPr lang="en-US" sz="1050" b="0" i="0" u="none" strike="noStrike" smtClean="0">
                           <a:solidFill>
                             <a:srgbClr val="002060"/>
                           </a:solidFill>
@@ -7555,7 +6109,7 @@
                         </a:rPr>
                         <a:t> </a:t>
                       </a:r>
-                      <a:endParaRPr lang="en-US" sz="1200" b="0" i="0" u="none" strike="noStrike" dirty="0">
+                      <a:endParaRPr lang="en-US" sz="1050" b="0" i="0" u="none" strike="noStrike" dirty="0">
                         <a:solidFill>
                           <a:srgbClr val="002060"/>
                         </a:solidFill>
@@ -7617,7 +6171,7 @@
                     <a:p>
                       <a:pPr algn="l" fontAlgn="t"/>
                       <a:r>
-                        <a:rPr lang="en-US" sz="1200" b="0" i="0" u="none" strike="noStrike" smtClean="0">
+                        <a:rPr lang="en-US" sz="1050" b="0" i="0" u="none" strike="noStrike" smtClean="0">
                           <a:solidFill>
                             <a:srgbClr val="002060"/>
                           </a:solidFill>
@@ -7628,153 +6182,7 @@
                         </a:rPr>
                         <a:t> </a:t>
                       </a:r>
-                      <a:endParaRPr lang="en-US" sz="1200" b="0" i="0" u="none" strike="noStrike" dirty="0">
-                        <a:solidFill>
-                          <a:srgbClr val="002060"/>
-                        </a:solidFill>
-                        <a:effectLst/>
-                        <a:latin typeface="Intel Clear" panose="020B0604020203020204" pitchFamily="34" charset="0"/>
-                        <a:ea typeface="Intel Clear" panose="020B0604020203020204" pitchFamily="34" charset="0"/>
-                        <a:cs typeface="Intel Clear" panose="020B0604020203020204" pitchFamily="34" charset="0"/>
-                      </a:endParaRPr>
-                    </a:p>
-                  </a:txBody>
-                  <a:tcPr marL="45720" marR="45720" marT="27432" marB="27432" anchor="ctr">
-                    <a:lnL w="19050" cap="flat" cmpd="sng" algn="ctr">
-                      <a:solidFill>
-                        <a:srgbClr val="002060"/>
-                      </a:solidFill>
-                      <a:prstDash val="solid"/>
-                      <a:round/>
-                      <a:headEnd type="none" w="med" len="med"/>
-                      <a:tailEnd type="none" w="med" len="med"/>
-                    </a:lnL>
-                    <a:lnR w="19050" cap="flat" cmpd="sng" algn="ctr">
-                      <a:solidFill>
-                        <a:srgbClr val="002060"/>
-                      </a:solidFill>
-                      <a:prstDash val="solid"/>
-                      <a:round/>
-                      <a:headEnd type="none" w="med" len="med"/>
-                      <a:tailEnd type="none" w="med" len="med"/>
-                    </a:lnR>
-                    <a:lnT w="19050" cap="flat" cmpd="sng" algn="ctr">
-                      <a:solidFill>
-                        <a:srgbClr val="002060"/>
-                      </a:solidFill>
-                      <a:prstDash val="solid"/>
-                      <a:round/>
-                      <a:headEnd type="none" w="med" len="med"/>
-                      <a:tailEnd type="none" w="med" len="med"/>
-                    </a:lnT>
-                    <a:lnB w="19050" cap="flat" cmpd="sng" algn="ctr">
-                      <a:solidFill>
-                        <a:srgbClr val="002060"/>
-                      </a:solidFill>
-                      <a:prstDash val="solid"/>
-                      <a:round/>
-                      <a:headEnd type="none" w="med" len="med"/>
-                      <a:tailEnd type="none" w="med" len="med"/>
-                    </a:lnB>
-                    <a:solidFill>
-                      <a:schemeClr val="bg1">
-                        <a:lumMod val="75000"/>
-                      </a:schemeClr>
-                    </a:solidFill>
-                  </a:tcPr>
-                </a:tc>
-                <a:tc>
-                  <a:txBody>
-                    <a:bodyPr/>
-                    <a:lstStyle/>
-                    <a:p>
-                      <a:pPr algn="l" fontAlgn="t"/>
-                      <a:r>
-                        <a:rPr lang="en-US" sz="1200" b="0" i="0" u="none" strike="noStrike" smtClean="0">
-                          <a:solidFill>
-                            <a:srgbClr val="002060"/>
-                          </a:solidFill>
-                          <a:effectLst/>
-                          <a:latin typeface="Intel Clear" panose="020B0604020203020204" pitchFamily="34" charset="0"/>
-                          <a:ea typeface="Intel Clear" panose="020B0604020203020204" pitchFamily="34" charset="0"/>
-                          <a:cs typeface="Intel Clear" panose="020B0604020203020204" pitchFamily="34" charset="0"/>
-                        </a:rPr>
-                        <a:t> </a:t>
-                      </a:r>
-                      <a:endParaRPr lang="en-US" sz="1200" b="0" i="0" u="none" strike="noStrike" dirty="0">
-                        <a:solidFill>
-                          <a:srgbClr val="002060"/>
-                        </a:solidFill>
-                        <a:effectLst/>
-                        <a:latin typeface="Intel Clear" panose="020B0604020203020204" pitchFamily="34" charset="0"/>
-                        <a:ea typeface="Intel Clear" panose="020B0604020203020204" pitchFamily="34" charset="0"/>
-                        <a:cs typeface="Intel Clear" panose="020B0604020203020204" pitchFamily="34" charset="0"/>
-                      </a:endParaRPr>
-                    </a:p>
-                  </a:txBody>
-                  <a:tcPr marL="45720" marR="45720" marT="27432" marB="27432" anchor="ctr">
-                    <a:lnL w="19050" cap="flat" cmpd="sng" algn="ctr">
-                      <a:solidFill>
-                        <a:srgbClr val="002060"/>
-                      </a:solidFill>
-                      <a:prstDash val="solid"/>
-                      <a:round/>
-                      <a:headEnd type="none" w="med" len="med"/>
-                      <a:tailEnd type="none" w="med" len="med"/>
-                    </a:lnL>
-                    <a:lnR w="19050" cap="flat" cmpd="sng" algn="ctr">
-                      <a:solidFill>
-                        <a:srgbClr val="002060"/>
-                      </a:solidFill>
-                      <a:prstDash val="solid"/>
-                      <a:round/>
-                      <a:headEnd type="none" w="med" len="med"/>
-                      <a:tailEnd type="none" w="med" len="med"/>
-                    </a:lnR>
-                    <a:lnT w="19050" cap="flat" cmpd="sng" algn="ctr">
-                      <a:solidFill>
-                        <a:srgbClr val="002060"/>
-                      </a:solidFill>
-                      <a:prstDash val="solid"/>
-                      <a:round/>
-                      <a:headEnd type="none" w="med" len="med"/>
-                      <a:tailEnd type="none" w="med" len="med"/>
-                    </a:lnT>
-                    <a:lnB w="19050" cap="flat" cmpd="sng" algn="ctr">
-                      <a:solidFill>
-                        <a:srgbClr val="002060"/>
-                      </a:solidFill>
-                      <a:prstDash val="solid"/>
-                      <a:round/>
-                      <a:headEnd type="none" w="med" len="med"/>
-                      <a:tailEnd type="none" w="med" len="med"/>
-                    </a:lnB>
-                    <a:solidFill>
-                      <a:schemeClr val="bg1">
-                        <a:lumMod val="75000"/>
-                      </a:schemeClr>
-                    </a:solidFill>
-                  </a:tcPr>
-                </a:tc>
-                <a:tc>
-                  <a:txBody>
-                    <a:bodyPr/>
-                    <a:lstStyle/>
-                    <a:p>
-                      <a:pPr algn="l" fontAlgn="t"/>
-                      <a:r>
-                        <a:rPr lang="en-US" sz="1200" b="0" i="0" u="none" strike="noStrike" smtClean="0">
-                          <a:solidFill>
-                            <a:srgbClr val="002060"/>
-                          </a:solidFill>
-                          <a:effectLst/>
-                          <a:latin typeface="Intel Clear" panose="020B0604020203020204" pitchFamily="34" charset="0"/>
-                          <a:ea typeface="Intel Clear" panose="020B0604020203020204" pitchFamily="34" charset="0"/>
-                          <a:cs typeface="Intel Clear" panose="020B0604020203020204" pitchFamily="34" charset="0"/>
-                        </a:rPr>
-                        <a:t> </a:t>
-                      </a:r>
-                      <a:endParaRPr lang="en-US" sz="1200" b="0" i="0" u="none" strike="noStrike" dirty="0">
+                      <a:endParaRPr lang="en-US" sz="1050" b="0" i="0" u="none" strike="noStrike" dirty="0">
                         <a:solidFill>
                           <a:srgbClr val="002060"/>
                         </a:solidFill>
@@ -7843,7 +6251,7 @@
                     <a:p>
                       <a:pPr algn="ctr" fontAlgn="t"/>
                       <a:r>
-                        <a:rPr lang="en-US" sz="1200" b="0" i="0" u="none" strike="noStrike" smtClean="0">
+                        <a:rPr lang="en-US" sz="1050" b="0" i="0" u="none" strike="noStrike" smtClean="0">
                           <a:solidFill>
                             <a:srgbClr val="002060"/>
                           </a:solidFill>
@@ -7854,7 +6262,7 @@
                         </a:rPr>
                         <a:t> </a:t>
                       </a:r>
-                      <a:endParaRPr lang="en-US" sz="1200" b="0" i="0" u="none" strike="noStrike" dirty="0">
+                      <a:endParaRPr lang="en-US" sz="1050" b="0" i="0" u="none" strike="noStrike" dirty="0">
                         <a:solidFill>
                           <a:srgbClr val="002060"/>
                         </a:solidFill>
@@ -7914,7 +6322,7 @@
                     <a:p>
                       <a:pPr algn="l" fontAlgn="t"/>
                       <a:r>
-                        <a:rPr lang="en-US" sz="1200" b="0" i="0" u="none" strike="noStrike" smtClean="0">
+                        <a:rPr lang="en-US" sz="1050" b="0" i="0" u="none" strike="noStrike" smtClean="0">
                           <a:solidFill>
                             <a:srgbClr val="002060"/>
                           </a:solidFill>
@@ -7925,7 +6333,7 @@
                         </a:rPr>
                         <a:t> </a:t>
                       </a:r>
-                      <a:endParaRPr lang="en-US" sz="1200" b="0" i="0" u="none" strike="noStrike" dirty="0">
+                      <a:endParaRPr lang="en-US" sz="1050" b="0" i="0" u="none" strike="noStrike" dirty="0">
                         <a:solidFill>
                           <a:srgbClr val="002060"/>
                         </a:solidFill>
@@ -7987,7 +6395,7 @@
                     <a:p>
                       <a:pPr algn="l" fontAlgn="t"/>
                       <a:r>
-                        <a:rPr lang="en-US" sz="1200" b="0" i="0" u="none" strike="noStrike" smtClean="0">
+                        <a:rPr lang="en-US" sz="1050" b="0" i="0" u="none" strike="noStrike" smtClean="0">
                           <a:solidFill>
                             <a:srgbClr val="002060"/>
                           </a:solidFill>
@@ -7998,153 +6406,7 @@
                         </a:rPr>
                         <a:t> </a:t>
                       </a:r>
-                      <a:endParaRPr lang="en-US" sz="1200" b="0" i="0" u="none" strike="noStrike" dirty="0">
-                        <a:solidFill>
-                          <a:srgbClr val="002060"/>
-                        </a:solidFill>
-                        <a:effectLst/>
-                        <a:latin typeface="Intel Clear" panose="020B0604020203020204" pitchFamily="34" charset="0"/>
-                        <a:ea typeface="Intel Clear" panose="020B0604020203020204" pitchFamily="34" charset="0"/>
-                        <a:cs typeface="Intel Clear" panose="020B0604020203020204" pitchFamily="34" charset="0"/>
-                      </a:endParaRPr>
-                    </a:p>
-                  </a:txBody>
-                  <a:tcPr marL="45720" marR="45720" marT="27432" marB="27432" anchor="ctr">
-                    <a:lnL w="19050" cap="flat" cmpd="sng" algn="ctr">
-                      <a:solidFill>
-                        <a:srgbClr val="002060"/>
-                      </a:solidFill>
-                      <a:prstDash val="solid"/>
-                      <a:round/>
-                      <a:headEnd type="none" w="med" len="med"/>
-                      <a:tailEnd type="none" w="med" len="med"/>
-                    </a:lnL>
-                    <a:lnR w="19050" cap="flat" cmpd="sng" algn="ctr">
-                      <a:solidFill>
-                        <a:srgbClr val="002060"/>
-                      </a:solidFill>
-                      <a:prstDash val="solid"/>
-                      <a:round/>
-                      <a:headEnd type="none" w="med" len="med"/>
-                      <a:tailEnd type="none" w="med" len="med"/>
-                    </a:lnR>
-                    <a:lnT w="19050" cap="flat" cmpd="sng" algn="ctr">
-                      <a:solidFill>
-                        <a:srgbClr val="002060"/>
-                      </a:solidFill>
-                      <a:prstDash val="solid"/>
-                      <a:round/>
-                      <a:headEnd type="none" w="med" len="med"/>
-                      <a:tailEnd type="none" w="med" len="med"/>
-                    </a:lnT>
-                    <a:lnB w="19050" cap="flat" cmpd="sng" algn="ctr">
-                      <a:solidFill>
-                        <a:srgbClr val="002060"/>
-                      </a:solidFill>
-                      <a:prstDash val="solid"/>
-                      <a:round/>
-                      <a:headEnd type="none" w="med" len="med"/>
-                      <a:tailEnd type="none" w="med" len="med"/>
-                    </a:lnB>
-                    <a:solidFill>
-                      <a:schemeClr val="bg1">
-                        <a:lumMod val="75000"/>
-                      </a:schemeClr>
-                    </a:solidFill>
-                  </a:tcPr>
-                </a:tc>
-                <a:tc>
-                  <a:txBody>
-                    <a:bodyPr/>
-                    <a:lstStyle/>
-                    <a:p>
-                      <a:pPr algn="l" fontAlgn="t"/>
-                      <a:r>
-                        <a:rPr lang="en-US" sz="1200" b="0" i="0" u="none" strike="noStrike" smtClean="0">
-                          <a:solidFill>
-                            <a:srgbClr val="002060"/>
-                          </a:solidFill>
-                          <a:effectLst/>
-                          <a:latin typeface="Intel Clear" panose="020B0604020203020204" pitchFamily="34" charset="0"/>
-                          <a:ea typeface="Intel Clear" panose="020B0604020203020204" pitchFamily="34" charset="0"/>
-                          <a:cs typeface="Intel Clear" panose="020B0604020203020204" pitchFamily="34" charset="0"/>
-                        </a:rPr>
-                        <a:t> </a:t>
-                      </a:r>
-                      <a:endParaRPr lang="en-US" sz="1200" b="0" i="0" u="none" strike="noStrike" dirty="0">
-                        <a:solidFill>
-                          <a:srgbClr val="002060"/>
-                        </a:solidFill>
-                        <a:effectLst/>
-                        <a:latin typeface="Intel Clear" panose="020B0604020203020204" pitchFamily="34" charset="0"/>
-                        <a:ea typeface="Intel Clear" panose="020B0604020203020204" pitchFamily="34" charset="0"/>
-                        <a:cs typeface="Intel Clear" panose="020B0604020203020204" pitchFamily="34" charset="0"/>
-                      </a:endParaRPr>
-                    </a:p>
-                  </a:txBody>
-                  <a:tcPr marL="45720" marR="45720" marT="27432" marB="27432" anchor="ctr">
-                    <a:lnL w="19050" cap="flat" cmpd="sng" algn="ctr">
-                      <a:solidFill>
-                        <a:srgbClr val="002060"/>
-                      </a:solidFill>
-                      <a:prstDash val="solid"/>
-                      <a:round/>
-                      <a:headEnd type="none" w="med" len="med"/>
-                      <a:tailEnd type="none" w="med" len="med"/>
-                    </a:lnL>
-                    <a:lnR w="19050" cap="flat" cmpd="sng" algn="ctr">
-                      <a:solidFill>
-                        <a:srgbClr val="002060"/>
-                      </a:solidFill>
-                      <a:prstDash val="solid"/>
-                      <a:round/>
-                      <a:headEnd type="none" w="med" len="med"/>
-                      <a:tailEnd type="none" w="med" len="med"/>
-                    </a:lnR>
-                    <a:lnT w="19050" cap="flat" cmpd="sng" algn="ctr">
-                      <a:solidFill>
-                        <a:srgbClr val="002060"/>
-                      </a:solidFill>
-                      <a:prstDash val="solid"/>
-                      <a:round/>
-                      <a:headEnd type="none" w="med" len="med"/>
-                      <a:tailEnd type="none" w="med" len="med"/>
-                    </a:lnT>
-                    <a:lnB w="19050" cap="flat" cmpd="sng" algn="ctr">
-                      <a:solidFill>
-                        <a:srgbClr val="002060"/>
-                      </a:solidFill>
-                      <a:prstDash val="solid"/>
-                      <a:round/>
-                      <a:headEnd type="none" w="med" len="med"/>
-                      <a:tailEnd type="none" w="med" len="med"/>
-                    </a:lnB>
-                    <a:solidFill>
-                      <a:schemeClr val="bg1">
-                        <a:lumMod val="75000"/>
-                      </a:schemeClr>
-                    </a:solidFill>
-                  </a:tcPr>
-                </a:tc>
-                <a:tc>
-                  <a:txBody>
-                    <a:bodyPr/>
-                    <a:lstStyle/>
-                    <a:p>
-                      <a:pPr algn="l" fontAlgn="t"/>
-                      <a:r>
-                        <a:rPr lang="en-US" sz="1200" b="0" i="0" u="none" strike="noStrike" smtClean="0">
-                          <a:solidFill>
-                            <a:srgbClr val="002060"/>
-                          </a:solidFill>
-                          <a:effectLst/>
-                          <a:latin typeface="Intel Clear" panose="020B0604020203020204" pitchFamily="34" charset="0"/>
-                          <a:ea typeface="Intel Clear" panose="020B0604020203020204" pitchFamily="34" charset="0"/>
-                          <a:cs typeface="Intel Clear" panose="020B0604020203020204" pitchFamily="34" charset="0"/>
-                        </a:rPr>
-                        <a:t> </a:t>
-                      </a:r>
-                      <a:endParaRPr lang="en-US" sz="1200" b="0" i="0" u="none" strike="noStrike" dirty="0">
+                      <a:endParaRPr lang="en-US" sz="1050" b="0" i="0" u="none" strike="noStrike" dirty="0">
                         <a:solidFill>
                           <a:srgbClr val="002060"/>
                         </a:solidFill>
@@ -8213,7 +6475,7 @@
                     <a:p>
                       <a:pPr algn="ctr" fontAlgn="t"/>
                       <a:r>
-                        <a:rPr lang="en-US" sz="1200" b="0" i="0" u="none" strike="noStrike" smtClean="0">
+                        <a:rPr lang="en-US" sz="1050" b="0" i="0" u="none" strike="noStrike" smtClean="0">
                           <a:solidFill>
                             <a:srgbClr val="002060"/>
                           </a:solidFill>
@@ -8224,7 +6486,7 @@
                         </a:rPr>
                         <a:t> </a:t>
                       </a:r>
-                      <a:endParaRPr lang="en-US" sz="1200" b="0" i="0" u="none" strike="noStrike" dirty="0">
+                      <a:endParaRPr lang="en-US" sz="1050" b="0" i="0" u="none" strike="noStrike" dirty="0">
                         <a:solidFill>
                           <a:srgbClr val="002060"/>
                         </a:solidFill>
@@ -8284,7 +6546,7 @@
                     <a:p>
                       <a:pPr algn="l" fontAlgn="t"/>
                       <a:r>
-                        <a:rPr lang="en-US" sz="1200" b="0" i="0" u="none" strike="noStrike" smtClean="0">
+                        <a:rPr lang="en-US" sz="1050" b="0" i="0" u="none" strike="noStrike" smtClean="0">
                           <a:solidFill>
                             <a:srgbClr val="002060"/>
                           </a:solidFill>
@@ -8295,7 +6557,7 @@
                         </a:rPr>
                         <a:t> </a:t>
                       </a:r>
-                      <a:endParaRPr lang="en-US" sz="1200" b="0" i="0" u="none" strike="noStrike" dirty="0">
+                      <a:endParaRPr lang="en-US" sz="1050" b="0" i="0" u="none" strike="noStrike" dirty="0">
                         <a:solidFill>
                           <a:srgbClr val="002060"/>
                         </a:solidFill>
@@ -8357,7 +6619,7 @@
                     <a:p>
                       <a:pPr algn="l" fontAlgn="t"/>
                       <a:r>
-                        <a:rPr lang="en-US" sz="1200" b="0" i="0" u="none" strike="noStrike" smtClean="0">
+                        <a:rPr lang="en-US" sz="1050" b="0" i="0" u="none" strike="noStrike" smtClean="0">
                           <a:solidFill>
                             <a:srgbClr val="002060"/>
                           </a:solidFill>
@@ -8368,153 +6630,7 @@
                         </a:rPr>
                         <a:t> </a:t>
                       </a:r>
-                      <a:endParaRPr lang="en-US" sz="1200" b="0" i="0" u="none" strike="noStrike" dirty="0">
-                        <a:solidFill>
-                          <a:srgbClr val="002060"/>
-                        </a:solidFill>
-                        <a:effectLst/>
-                        <a:latin typeface="Intel Clear" panose="020B0604020203020204" pitchFamily="34" charset="0"/>
-                        <a:ea typeface="Intel Clear" panose="020B0604020203020204" pitchFamily="34" charset="0"/>
-                        <a:cs typeface="Intel Clear" panose="020B0604020203020204" pitchFamily="34" charset="0"/>
-                      </a:endParaRPr>
-                    </a:p>
-                  </a:txBody>
-                  <a:tcPr marL="45720" marR="45720" marT="27432" marB="27432" anchor="ctr">
-                    <a:lnL w="19050" cap="flat" cmpd="sng" algn="ctr">
-                      <a:solidFill>
-                        <a:srgbClr val="002060"/>
-                      </a:solidFill>
-                      <a:prstDash val="solid"/>
-                      <a:round/>
-                      <a:headEnd type="none" w="med" len="med"/>
-                      <a:tailEnd type="none" w="med" len="med"/>
-                    </a:lnL>
-                    <a:lnR w="19050" cap="flat" cmpd="sng" algn="ctr">
-                      <a:solidFill>
-                        <a:srgbClr val="002060"/>
-                      </a:solidFill>
-                      <a:prstDash val="solid"/>
-                      <a:round/>
-                      <a:headEnd type="none" w="med" len="med"/>
-                      <a:tailEnd type="none" w="med" len="med"/>
-                    </a:lnR>
-                    <a:lnT w="19050" cap="flat" cmpd="sng" algn="ctr">
-                      <a:solidFill>
-                        <a:srgbClr val="002060"/>
-                      </a:solidFill>
-                      <a:prstDash val="solid"/>
-                      <a:round/>
-                      <a:headEnd type="none" w="med" len="med"/>
-                      <a:tailEnd type="none" w="med" len="med"/>
-                    </a:lnT>
-                    <a:lnB w="19050" cap="flat" cmpd="sng" algn="ctr">
-                      <a:solidFill>
-                        <a:srgbClr val="002060"/>
-                      </a:solidFill>
-                      <a:prstDash val="solid"/>
-                      <a:round/>
-                      <a:headEnd type="none" w="med" len="med"/>
-                      <a:tailEnd type="none" w="med" len="med"/>
-                    </a:lnB>
-                    <a:solidFill>
-                      <a:schemeClr val="bg1">
-                        <a:lumMod val="75000"/>
-                      </a:schemeClr>
-                    </a:solidFill>
-                  </a:tcPr>
-                </a:tc>
-                <a:tc>
-                  <a:txBody>
-                    <a:bodyPr/>
-                    <a:lstStyle/>
-                    <a:p>
-                      <a:pPr algn="l" fontAlgn="t"/>
-                      <a:r>
-                        <a:rPr lang="en-US" sz="1200" b="0" i="0" u="none" strike="noStrike" smtClean="0">
-                          <a:solidFill>
-                            <a:srgbClr val="002060"/>
-                          </a:solidFill>
-                          <a:effectLst/>
-                          <a:latin typeface="Intel Clear" panose="020B0604020203020204" pitchFamily="34" charset="0"/>
-                          <a:ea typeface="Intel Clear" panose="020B0604020203020204" pitchFamily="34" charset="0"/>
-                          <a:cs typeface="Intel Clear" panose="020B0604020203020204" pitchFamily="34" charset="0"/>
-                        </a:rPr>
-                        <a:t> </a:t>
-                      </a:r>
-                      <a:endParaRPr lang="en-US" sz="1200" b="0" i="0" u="none" strike="noStrike" dirty="0">
-                        <a:solidFill>
-                          <a:srgbClr val="002060"/>
-                        </a:solidFill>
-                        <a:effectLst/>
-                        <a:latin typeface="Intel Clear" panose="020B0604020203020204" pitchFamily="34" charset="0"/>
-                        <a:ea typeface="Intel Clear" panose="020B0604020203020204" pitchFamily="34" charset="0"/>
-                        <a:cs typeface="Intel Clear" panose="020B0604020203020204" pitchFamily="34" charset="0"/>
-                      </a:endParaRPr>
-                    </a:p>
-                  </a:txBody>
-                  <a:tcPr marL="45720" marR="45720" marT="27432" marB="27432" anchor="ctr">
-                    <a:lnL w="19050" cap="flat" cmpd="sng" algn="ctr">
-                      <a:solidFill>
-                        <a:srgbClr val="002060"/>
-                      </a:solidFill>
-                      <a:prstDash val="solid"/>
-                      <a:round/>
-                      <a:headEnd type="none" w="med" len="med"/>
-                      <a:tailEnd type="none" w="med" len="med"/>
-                    </a:lnL>
-                    <a:lnR w="19050" cap="flat" cmpd="sng" algn="ctr">
-                      <a:solidFill>
-                        <a:srgbClr val="002060"/>
-                      </a:solidFill>
-                      <a:prstDash val="solid"/>
-                      <a:round/>
-                      <a:headEnd type="none" w="med" len="med"/>
-                      <a:tailEnd type="none" w="med" len="med"/>
-                    </a:lnR>
-                    <a:lnT w="19050" cap="flat" cmpd="sng" algn="ctr">
-                      <a:solidFill>
-                        <a:srgbClr val="002060"/>
-                      </a:solidFill>
-                      <a:prstDash val="solid"/>
-                      <a:round/>
-                      <a:headEnd type="none" w="med" len="med"/>
-                      <a:tailEnd type="none" w="med" len="med"/>
-                    </a:lnT>
-                    <a:lnB w="19050" cap="flat" cmpd="sng" algn="ctr">
-                      <a:solidFill>
-                        <a:srgbClr val="002060"/>
-                      </a:solidFill>
-                      <a:prstDash val="solid"/>
-                      <a:round/>
-                      <a:headEnd type="none" w="med" len="med"/>
-                      <a:tailEnd type="none" w="med" len="med"/>
-                    </a:lnB>
-                    <a:solidFill>
-                      <a:schemeClr val="bg1">
-                        <a:lumMod val="75000"/>
-                      </a:schemeClr>
-                    </a:solidFill>
-                  </a:tcPr>
-                </a:tc>
-                <a:tc>
-                  <a:txBody>
-                    <a:bodyPr/>
-                    <a:lstStyle/>
-                    <a:p>
-                      <a:pPr algn="l" fontAlgn="t"/>
-                      <a:r>
-                        <a:rPr lang="en-US" sz="1200" b="0" i="0" u="none" strike="noStrike" smtClean="0">
-                          <a:solidFill>
-                            <a:srgbClr val="002060"/>
-                          </a:solidFill>
-                          <a:effectLst/>
-                          <a:latin typeface="Intel Clear" panose="020B0604020203020204" pitchFamily="34" charset="0"/>
-                          <a:ea typeface="Intel Clear" panose="020B0604020203020204" pitchFamily="34" charset="0"/>
-                          <a:cs typeface="Intel Clear" panose="020B0604020203020204" pitchFamily="34" charset="0"/>
-                        </a:rPr>
-                        <a:t> </a:t>
-                      </a:r>
-                      <a:endParaRPr lang="en-US" sz="1200" b="0" i="0" u="none" strike="noStrike" dirty="0">
+                      <a:endParaRPr lang="en-US" sz="1050" b="0" i="0" u="none" strike="noStrike" dirty="0">
                         <a:solidFill>
                           <a:srgbClr val="002060"/>
                         </a:solidFill>
@@ -8583,7 +6699,7 @@
                     <a:p>
                       <a:pPr algn="ctr" fontAlgn="t"/>
                       <a:r>
-                        <a:rPr lang="en-US" sz="1200" b="0" i="0" u="none" strike="noStrike" smtClean="0">
+                        <a:rPr lang="en-US" sz="1050" b="0" i="0" u="none" strike="noStrike" smtClean="0">
                           <a:solidFill>
                             <a:srgbClr val="002060"/>
                           </a:solidFill>
@@ -8594,7 +6710,7 @@
                         </a:rPr>
                         <a:t> </a:t>
                       </a:r>
-                      <a:endParaRPr lang="en-US" sz="1200" b="0" i="0" u="none" strike="noStrike" dirty="0">
+                      <a:endParaRPr lang="en-US" sz="1050" b="0" i="0" u="none" strike="noStrike" dirty="0">
                         <a:solidFill>
                           <a:srgbClr val="002060"/>
                         </a:solidFill>
@@ -8654,7 +6770,7 @@
                     <a:p>
                       <a:pPr algn="l" fontAlgn="t"/>
                       <a:r>
-                        <a:rPr lang="en-US" sz="1200" b="0" i="0" u="none" strike="noStrike" smtClean="0">
+                        <a:rPr lang="en-US" sz="1050" b="0" i="0" u="none" strike="noStrike" smtClean="0">
                           <a:solidFill>
                             <a:srgbClr val="002060"/>
                           </a:solidFill>
@@ -8665,7 +6781,7 @@
                         </a:rPr>
                         <a:t> </a:t>
                       </a:r>
-                      <a:endParaRPr lang="en-US" sz="1200" b="0" i="0" u="none" strike="noStrike" dirty="0">
+                      <a:endParaRPr lang="en-US" sz="1050" b="0" i="0" u="none" strike="noStrike" dirty="0">
                         <a:solidFill>
                           <a:srgbClr val="002060"/>
                         </a:solidFill>
@@ -8727,7 +6843,7 @@
                     <a:p>
                       <a:pPr algn="l" fontAlgn="t"/>
                       <a:r>
-                        <a:rPr lang="en-US" sz="1200" b="0" i="0" u="none" strike="noStrike" smtClean="0">
+                        <a:rPr lang="en-US" sz="1050" b="0" i="0" u="none" strike="noStrike" smtClean="0">
                           <a:solidFill>
                             <a:srgbClr val="002060"/>
                           </a:solidFill>
@@ -8738,153 +6854,7 @@
                         </a:rPr>
                         <a:t> </a:t>
                       </a:r>
-                      <a:endParaRPr lang="en-US" sz="1200" b="0" i="0" u="none" strike="noStrike" dirty="0">
-                        <a:solidFill>
-                          <a:srgbClr val="002060"/>
-                        </a:solidFill>
-                        <a:effectLst/>
-                        <a:latin typeface="Intel Clear" panose="020B0604020203020204" pitchFamily="34" charset="0"/>
-                        <a:ea typeface="Intel Clear" panose="020B0604020203020204" pitchFamily="34" charset="0"/>
-                        <a:cs typeface="Intel Clear" panose="020B0604020203020204" pitchFamily="34" charset="0"/>
-                      </a:endParaRPr>
-                    </a:p>
-                  </a:txBody>
-                  <a:tcPr marL="45720" marR="45720" marT="27432" marB="27432" anchor="ctr">
-                    <a:lnL w="19050" cap="flat" cmpd="sng" algn="ctr">
-                      <a:solidFill>
-                        <a:srgbClr val="002060"/>
-                      </a:solidFill>
-                      <a:prstDash val="solid"/>
-                      <a:round/>
-                      <a:headEnd type="none" w="med" len="med"/>
-                      <a:tailEnd type="none" w="med" len="med"/>
-                    </a:lnL>
-                    <a:lnR w="19050" cap="flat" cmpd="sng" algn="ctr">
-                      <a:solidFill>
-                        <a:srgbClr val="002060"/>
-                      </a:solidFill>
-                      <a:prstDash val="solid"/>
-                      <a:round/>
-                      <a:headEnd type="none" w="med" len="med"/>
-                      <a:tailEnd type="none" w="med" len="med"/>
-                    </a:lnR>
-                    <a:lnT w="19050" cap="flat" cmpd="sng" algn="ctr">
-                      <a:solidFill>
-                        <a:srgbClr val="002060"/>
-                      </a:solidFill>
-                      <a:prstDash val="solid"/>
-                      <a:round/>
-                      <a:headEnd type="none" w="med" len="med"/>
-                      <a:tailEnd type="none" w="med" len="med"/>
-                    </a:lnT>
-                    <a:lnB w="19050" cap="flat" cmpd="sng" algn="ctr">
-                      <a:solidFill>
-                        <a:srgbClr val="002060"/>
-                      </a:solidFill>
-                      <a:prstDash val="solid"/>
-                      <a:round/>
-                      <a:headEnd type="none" w="med" len="med"/>
-                      <a:tailEnd type="none" w="med" len="med"/>
-                    </a:lnB>
-                    <a:solidFill>
-                      <a:schemeClr val="bg1">
-                        <a:lumMod val="75000"/>
-                      </a:schemeClr>
-                    </a:solidFill>
-                  </a:tcPr>
-                </a:tc>
-                <a:tc>
-                  <a:txBody>
-                    <a:bodyPr/>
-                    <a:lstStyle/>
-                    <a:p>
-                      <a:pPr algn="l" fontAlgn="t"/>
-                      <a:r>
-                        <a:rPr lang="en-US" sz="1200" b="0" i="0" u="none" strike="noStrike" smtClean="0">
-                          <a:solidFill>
-                            <a:srgbClr val="002060"/>
-                          </a:solidFill>
-                          <a:effectLst/>
-                          <a:latin typeface="Intel Clear" panose="020B0604020203020204" pitchFamily="34" charset="0"/>
-                          <a:ea typeface="Intel Clear" panose="020B0604020203020204" pitchFamily="34" charset="0"/>
-                          <a:cs typeface="Intel Clear" panose="020B0604020203020204" pitchFamily="34" charset="0"/>
-                        </a:rPr>
-                        <a:t> </a:t>
-                      </a:r>
-                      <a:endParaRPr lang="en-US" sz="1200" b="0" i="0" u="none" strike="noStrike" dirty="0">
-                        <a:solidFill>
-                          <a:srgbClr val="002060"/>
-                        </a:solidFill>
-                        <a:effectLst/>
-                        <a:latin typeface="Intel Clear" panose="020B0604020203020204" pitchFamily="34" charset="0"/>
-                        <a:ea typeface="Intel Clear" panose="020B0604020203020204" pitchFamily="34" charset="0"/>
-                        <a:cs typeface="Intel Clear" panose="020B0604020203020204" pitchFamily="34" charset="0"/>
-                      </a:endParaRPr>
-                    </a:p>
-                  </a:txBody>
-                  <a:tcPr marL="45720" marR="45720" marT="27432" marB="27432" anchor="ctr">
-                    <a:lnL w="19050" cap="flat" cmpd="sng" algn="ctr">
-                      <a:solidFill>
-                        <a:srgbClr val="002060"/>
-                      </a:solidFill>
-                      <a:prstDash val="solid"/>
-                      <a:round/>
-                      <a:headEnd type="none" w="med" len="med"/>
-                      <a:tailEnd type="none" w="med" len="med"/>
-                    </a:lnL>
-                    <a:lnR w="19050" cap="flat" cmpd="sng" algn="ctr">
-                      <a:solidFill>
-                        <a:srgbClr val="002060"/>
-                      </a:solidFill>
-                      <a:prstDash val="solid"/>
-                      <a:round/>
-                      <a:headEnd type="none" w="med" len="med"/>
-                      <a:tailEnd type="none" w="med" len="med"/>
-                    </a:lnR>
-                    <a:lnT w="19050" cap="flat" cmpd="sng" algn="ctr">
-                      <a:solidFill>
-                        <a:srgbClr val="002060"/>
-                      </a:solidFill>
-                      <a:prstDash val="solid"/>
-                      <a:round/>
-                      <a:headEnd type="none" w="med" len="med"/>
-                      <a:tailEnd type="none" w="med" len="med"/>
-                    </a:lnT>
-                    <a:lnB w="19050" cap="flat" cmpd="sng" algn="ctr">
-                      <a:solidFill>
-                        <a:srgbClr val="002060"/>
-                      </a:solidFill>
-                      <a:prstDash val="solid"/>
-                      <a:round/>
-                      <a:headEnd type="none" w="med" len="med"/>
-                      <a:tailEnd type="none" w="med" len="med"/>
-                    </a:lnB>
-                    <a:solidFill>
-                      <a:schemeClr val="bg1">
-                        <a:lumMod val="75000"/>
-                      </a:schemeClr>
-                    </a:solidFill>
-                  </a:tcPr>
-                </a:tc>
-                <a:tc>
-                  <a:txBody>
-                    <a:bodyPr/>
-                    <a:lstStyle/>
-                    <a:p>
-                      <a:pPr algn="l" fontAlgn="t"/>
-                      <a:r>
-                        <a:rPr lang="en-US" sz="1200" b="0" i="0" u="none" strike="noStrike" smtClean="0">
-                          <a:solidFill>
-                            <a:srgbClr val="002060"/>
-                          </a:solidFill>
-                          <a:effectLst/>
-                          <a:latin typeface="Intel Clear" panose="020B0604020203020204" pitchFamily="34" charset="0"/>
-                          <a:ea typeface="Intel Clear" panose="020B0604020203020204" pitchFamily="34" charset="0"/>
-                          <a:cs typeface="Intel Clear" panose="020B0604020203020204" pitchFamily="34" charset="0"/>
-                        </a:rPr>
-                        <a:t> </a:t>
-                      </a:r>
-                      <a:endParaRPr lang="en-US" sz="1200" b="0" i="0" u="none" strike="noStrike" dirty="0">
+                      <a:endParaRPr lang="en-US" sz="1050" b="0" i="0" u="none" strike="noStrike" dirty="0">
                         <a:solidFill>
                           <a:srgbClr val="002060"/>
                         </a:solidFill>
@@ -8953,7 +6923,7 @@
                     <a:p>
                       <a:pPr algn="ctr" fontAlgn="t"/>
                       <a:r>
-                        <a:rPr lang="en-US" sz="1200" b="0" i="0" u="none" strike="noStrike" smtClean="0">
+                        <a:rPr lang="en-US" sz="1050" b="0" i="0" u="none" strike="noStrike" smtClean="0">
                           <a:solidFill>
                             <a:srgbClr val="002060"/>
                           </a:solidFill>
@@ -8964,7 +6934,7 @@
                         </a:rPr>
                         <a:t> </a:t>
                       </a:r>
-                      <a:endParaRPr lang="en-US" sz="1200" b="0" i="0" u="none" strike="noStrike" dirty="0">
+                      <a:endParaRPr lang="en-US" sz="1050" b="0" i="0" u="none" strike="noStrike" dirty="0">
                         <a:solidFill>
                           <a:srgbClr val="002060"/>
                         </a:solidFill>
@@ -9024,7 +6994,7 @@
                     <a:p>
                       <a:pPr algn="l" fontAlgn="t"/>
                       <a:r>
-                        <a:rPr lang="en-US" sz="1200" b="0" i="0" u="none" strike="noStrike" smtClean="0">
+                        <a:rPr lang="en-US" sz="1050" b="0" i="0" u="none" strike="noStrike" smtClean="0">
                           <a:solidFill>
                             <a:srgbClr val="002060"/>
                           </a:solidFill>
@@ -9035,7 +7005,7 @@
                         </a:rPr>
                         <a:t> </a:t>
                       </a:r>
-                      <a:endParaRPr lang="en-US" sz="1200" b="0" i="0" u="none" strike="noStrike" dirty="0">
+                      <a:endParaRPr lang="en-US" sz="1050" b="0" i="0" u="none" strike="noStrike" dirty="0">
                         <a:solidFill>
                           <a:srgbClr val="002060"/>
                         </a:solidFill>
@@ -9097,7 +7067,7 @@
                     <a:p>
                       <a:pPr algn="l" fontAlgn="t"/>
                       <a:r>
-                        <a:rPr lang="en-US" sz="1200" b="0" i="0" u="none" strike="noStrike" smtClean="0">
+                        <a:rPr lang="en-US" sz="1050" b="0" i="0" u="none" strike="noStrike" smtClean="0">
                           <a:solidFill>
                             <a:srgbClr val="002060"/>
                           </a:solidFill>
@@ -9108,153 +7078,7 @@
                         </a:rPr>
                         <a:t> </a:t>
                       </a:r>
-                      <a:endParaRPr lang="en-US" sz="1200" b="0" i="0" u="none" strike="noStrike" dirty="0">
-                        <a:solidFill>
-                          <a:srgbClr val="002060"/>
-                        </a:solidFill>
-                        <a:effectLst/>
-                        <a:latin typeface="Intel Clear" panose="020B0604020203020204" pitchFamily="34" charset="0"/>
-                        <a:ea typeface="Intel Clear" panose="020B0604020203020204" pitchFamily="34" charset="0"/>
-                        <a:cs typeface="Intel Clear" panose="020B0604020203020204" pitchFamily="34" charset="0"/>
-                      </a:endParaRPr>
-                    </a:p>
-                  </a:txBody>
-                  <a:tcPr marL="45720" marR="45720" marT="27432" marB="27432" anchor="ctr">
-                    <a:lnL w="19050" cap="flat" cmpd="sng" algn="ctr">
-                      <a:solidFill>
-                        <a:srgbClr val="002060"/>
-                      </a:solidFill>
-                      <a:prstDash val="solid"/>
-                      <a:round/>
-                      <a:headEnd type="none" w="med" len="med"/>
-                      <a:tailEnd type="none" w="med" len="med"/>
-                    </a:lnL>
-                    <a:lnR w="19050" cap="flat" cmpd="sng" algn="ctr">
-                      <a:solidFill>
-                        <a:srgbClr val="002060"/>
-                      </a:solidFill>
-                      <a:prstDash val="solid"/>
-                      <a:round/>
-                      <a:headEnd type="none" w="med" len="med"/>
-                      <a:tailEnd type="none" w="med" len="med"/>
-                    </a:lnR>
-                    <a:lnT w="19050" cap="flat" cmpd="sng" algn="ctr">
-                      <a:solidFill>
-                        <a:srgbClr val="002060"/>
-                      </a:solidFill>
-                      <a:prstDash val="solid"/>
-                      <a:round/>
-                      <a:headEnd type="none" w="med" len="med"/>
-                      <a:tailEnd type="none" w="med" len="med"/>
-                    </a:lnT>
-                    <a:lnB w="19050" cap="flat" cmpd="sng" algn="ctr">
-                      <a:solidFill>
-                        <a:srgbClr val="002060"/>
-                      </a:solidFill>
-                      <a:prstDash val="solid"/>
-                      <a:round/>
-                      <a:headEnd type="none" w="med" len="med"/>
-                      <a:tailEnd type="none" w="med" len="med"/>
-                    </a:lnB>
-                    <a:solidFill>
-                      <a:schemeClr val="bg1">
-                        <a:lumMod val="75000"/>
-                      </a:schemeClr>
-                    </a:solidFill>
-                  </a:tcPr>
-                </a:tc>
-                <a:tc>
-                  <a:txBody>
-                    <a:bodyPr/>
-                    <a:lstStyle/>
-                    <a:p>
-                      <a:pPr algn="l" fontAlgn="t"/>
-                      <a:r>
-                        <a:rPr lang="en-US" sz="1200" b="0" i="0" u="none" strike="noStrike" smtClean="0">
-                          <a:solidFill>
-                            <a:srgbClr val="002060"/>
-                          </a:solidFill>
-                          <a:effectLst/>
-                          <a:latin typeface="Intel Clear" panose="020B0604020203020204" pitchFamily="34" charset="0"/>
-                          <a:ea typeface="Intel Clear" panose="020B0604020203020204" pitchFamily="34" charset="0"/>
-                          <a:cs typeface="Intel Clear" panose="020B0604020203020204" pitchFamily="34" charset="0"/>
-                        </a:rPr>
-                        <a:t> </a:t>
-                      </a:r>
-                      <a:endParaRPr lang="en-US" sz="1200" b="0" i="0" u="none" strike="noStrike" dirty="0">
-                        <a:solidFill>
-                          <a:srgbClr val="002060"/>
-                        </a:solidFill>
-                        <a:effectLst/>
-                        <a:latin typeface="Intel Clear" panose="020B0604020203020204" pitchFamily="34" charset="0"/>
-                        <a:ea typeface="Intel Clear" panose="020B0604020203020204" pitchFamily="34" charset="0"/>
-                        <a:cs typeface="Intel Clear" panose="020B0604020203020204" pitchFamily="34" charset="0"/>
-                      </a:endParaRPr>
-                    </a:p>
-                  </a:txBody>
-                  <a:tcPr marL="45720" marR="45720" marT="27432" marB="27432" anchor="ctr">
-                    <a:lnL w="19050" cap="flat" cmpd="sng" algn="ctr">
-                      <a:solidFill>
-                        <a:srgbClr val="002060"/>
-                      </a:solidFill>
-                      <a:prstDash val="solid"/>
-                      <a:round/>
-                      <a:headEnd type="none" w="med" len="med"/>
-                      <a:tailEnd type="none" w="med" len="med"/>
-                    </a:lnL>
-                    <a:lnR w="19050" cap="flat" cmpd="sng" algn="ctr">
-                      <a:solidFill>
-                        <a:srgbClr val="002060"/>
-                      </a:solidFill>
-                      <a:prstDash val="solid"/>
-                      <a:round/>
-                      <a:headEnd type="none" w="med" len="med"/>
-                      <a:tailEnd type="none" w="med" len="med"/>
-                    </a:lnR>
-                    <a:lnT w="19050" cap="flat" cmpd="sng" algn="ctr">
-                      <a:solidFill>
-                        <a:srgbClr val="002060"/>
-                      </a:solidFill>
-                      <a:prstDash val="solid"/>
-                      <a:round/>
-                      <a:headEnd type="none" w="med" len="med"/>
-                      <a:tailEnd type="none" w="med" len="med"/>
-                    </a:lnT>
-                    <a:lnB w="19050" cap="flat" cmpd="sng" algn="ctr">
-                      <a:solidFill>
-                        <a:srgbClr val="002060"/>
-                      </a:solidFill>
-                      <a:prstDash val="solid"/>
-                      <a:round/>
-                      <a:headEnd type="none" w="med" len="med"/>
-                      <a:tailEnd type="none" w="med" len="med"/>
-                    </a:lnB>
-                    <a:solidFill>
-                      <a:schemeClr val="bg1">
-                        <a:lumMod val="75000"/>
-                      </a:schemeClr>
-                    </a:solidFill>
-                  </a:tcPr>
-                </a:tc>
-                <a:tc>
-                  <a:txBody>
-                    <a:bodyPr/>
-                    <a:lstStyle/>
-                    <a:p>
-                      <a:pPr algn="l" fontAlgn="t"/>
-                      <a:r>
-                        <a:rPr lang="en-US" sz="1200" b="0" i="0" u="none" strike="noStrike" smtClean="0">
-                          <a:solidFill>
-                            <a:srgbClr val="002060"/>
-                          </a:solidFill>
-                          <a:effectLst/>
-                          <a:latin typeface="Intel Clear" panose="020B0604020203020204" pitchFamily="34" charset="0"/>
-                          <a:ea typeface="Intel Clear" panose="020B0604020203020204" pitchFamily="34" charset="0"/>
-                          <a:cs typeface="Intel Clear" panose="020B0604020203020204" pitchFamily="34" charset="0"/>
-                        </a:rPr>
-                        <a:t> </a:t>
-                      </a:r>
-                      <a:endParaRPr lang="en-US" sz="1200" b="0" i="0" u="none" strike="noStrike" dirty="0">
+                      <a:endParaRPr lang="en-US" sz="1050" b="0" i="0" u="none" strike="noStrike" dirty="0">
                         <a:solidFill>
                           <a:srgbClr val="002060"/>
                         </a:solidFill>
@@ -9323,7 +7147,7 @@
                     <a:p>
                       <a:pPr algn="ctr" fontAlgn="t"/>
                       <a:r>
-                        <a:rPr lang="en-US" sz="1200" b="0" i="0" u="none" strike="noStrike" smtClean="0">
+                        <a:rPr lang="en-US" sz="1050" b="0" i="0" u="none" strike="noStrike" smtClean="0">
                           <a:solidFill>
                             <a:srgbClr val="002060"/>
                           </a:solidFill>
@@ -9334,7 +7158,7 @@
                         </a:rPr>
                         <a:t> </a:t>
                       </a:r>
-                      <a:endParaRPr lang="en-US" sz="1200" b="0" i="0" u="none" strike="noStrike" dirty="0">
+                      <a:endParaRPr lang="en-US" sz="1050" b="0" i="0" u="none" strike="noStrike" dirty="0">
                         <a:solidFill>
                           <a:srgbClr val="002060"/>
                         </a:solidFill>
@@ -9394,7 +7218,7 @@
                     <a:p>
                       <a:pPr algn="l" fontAlgn="t"/>
                       <a:r>
-                        <a:rPr lang="en-US" sz="1200" b="0" i="0" u="none" strike="noStrike" smtClean="0">
+                        <a:rPr lang="en-US" sz="1050" b="0" i="0" u="none" strike="noStrike" smtClean="0">
                           <a:solidFill>
                             <a:srgbClr val="002060"/>
                           </a:solidFill>
@@ -9405,7 +7229,7 @@
                         </a:rPr>
                         <a:t> </a:t>
                       </a:r>
-                      <a:endParaRPr lang="en-US" sz="1200" b="0" i="0" u="none" strike="noStrike" dirty="0">
+                      <a:endParaRPr lang="en-US" sz="1050" b="0" i="0" u="none" strike="noStrike" dirty="0">
                         <a:solidFill>
                           <a:srgbClr val="002060"/>
                         </a:solidFill>
@@ -9467,7 +7291,7 @@
                     <a:p>
                       <a:pPr algn="l" fontAlgn="t"/>
                       <a:r>
-                        <a:rPr lang="en-US" sz="1200" b="0" i="0" u="none" strike="noStrike" smtClean="0">
+                        <a:rPr lang="en-US" sz="1050" b="0" i="0" u="none" strike="noStrike" smtClean="0">
                           <a:solidFill>
                             <a:srgbClr val="002060"/>
                           </a:solidFill>
@@ -9478,153 +7302,7 @@
                         </a:rPr>
                         <a:t> </a:t>
                       </a:r>
-                      <a:endParaRPr lang="en-US" sz="1200" b="0" i="0" u="none" strike="noStrike" dirty="0">
-                        <a:solidFill>
-                          <a:srgbClr val="002060"/>
-                        </a:solidFill>
-                        <a:effectLst/>
-                        <a:latin typeface="Intel Clear" panose="020B0604020203020204" pitchFamily="34" charset="0"/>
-                        <a:ea typeface="Intel Clear" panose="020B0604020203020204" pitchFamily="34" charset="0"/>
-                        <a:cs typeface="Intel Clear" panose="020B0604020203020204" pitchFamily="34" charset="0"/>
-                      </a:endParaRPr>
-                    </a:p>
-                  </a:txBody>
-                  <a:tcPr marL="45720" marR="45720" marT="27432" marB="27432" anchor="ctr">
-                    <a:lnL w="19050" cap="flat" cmpd="sng" algn="ctr">
-                      <a:solidFill>
-                        <a:srgbClr val="002060"/>
-                      </a:solidFill>
-                      <a:prstDash val="solid"/>
-                      <a:round/>
-                      <a:headEnd type="none" w="med" len="med"/>
-                      <a:tailEnd type="none" w="med" len="med"/>
-                    </a:lnL>
-                    <a:lnR w="19050" cap="flat" cmpd="sng" algn="ctr">
-                      <a:solidFill>
-                        <a:srgbClr val="002060"/>
-                      </a:solidFill>
-                      <a:prstDash val="solid"/>
-                      <a:round/>
-                      <a:headEnd type="none" w="med" len="med"/>
-                      <a:tailEnd type="none" w="med" len="med"/>
-                    </a:lnR>
-                    <a:lnT w="19050" cap="flat" cmpd="sng" algn="ctr">
-                      <a:solidFill>
-                        <a:srgbClr val="002060"/>
-                      </a:solidFill>
-                      <a:prstDash val="solid"/>
-                      <a:round/>
-                      <a:headEnd type="none" w="med" len="med"/>
-                      <a:tailEnd type="none" w="med" len="med"/>
-                    </a:lnT>
-                    <a:lnB w="19050" cap="flat" cmpd="sng" algn="ctr">
-                      <a:solidFill>
-                        <a:srgbClr val="002060"/>
-                      </a:solidFill>
-                      <a:prstDash val="solid"/>
-                      <a:round/>
-                      <a:headEnd type="none" w="med" len="med"/>
-                      <a:tailEnd type="none" w="med" len="med"/>
-                    </a:lnB>
-                    <a:solidFill>
-                      <a:schemeClr val="bg1">
-                        <a:lumMod val="75000"/>
-                      </a:schemeClr>
-                    </a:solidFill>
-                  </a:tcPr>
-                </a:tc>
-                <a:tc>
-                  <a:txBody>
-                    <a:bodyPr/>
-                    <a:lstStyle/>
-                    <a:p>
-                      <a:pPr algn="l" fontAlgn="t"/>
-                      <a:r>
-                        <a:rPr lang="en-US" sz="1200" b="0" i="0" u="none" strike="noStrike" smtClean="0">
-                          <a:solidFill>
-                            <a:srgbClr val="002060"/>
-                          </a:solidFill>
-                          <a:effectLst/>
-                          <a:latin typeface="Intel Clear" panose="020B0604020203020204" pitchFamily="34" charset="0"/>
-                          <a:ea typeface="Intel Clear" panose="020B0604020203020204" pitchFamily="34" charset="0"/>
-                          <a:cs typeface="Intel Clear" panose="020B0604020203020204" pitchFamily="34" charset="0"/>
-                        </a:rPr>
-                        <a:t> </a:t>
-                      </a:r>
-                      <a:endParaRPr lang="en-US" sz="1200" b="0" i="0" u="none" strike="noStrike" dirty="0">
-                        <a:solidFill>
-                          <a:srgbClr val="002060"/>
-                        </a:solidFill>
-                        <a:effectLst/>
-                        <a:latin typeface="Intel Clear" panose="020B0604020203020204" pitchFamily="34" charset="0"/>
-                        <a:ea typeface="Intel Clear" panose="020B0604020203020204" pitchFamily="34" charset="0"/>
-                        <a:cs typeface="Intel Clear" panose="020B0604020203020204" pitchFamily="34" charset="0"/>
-                      </a:endParaRPr>
-                    </a:p>
-                  </a:txBody>
-                  <a:tcPr marL="45720" marR="45720" marT="27432" marB="27432" anchor="ctr">
-                    <a:lnL w="19050" cap="flat" cmpd="sng" algn="ctr">
-                      <a:solidFill>
-                        <a:srgbClr val="002060"/>
-                      </a:solidFill>
-                      <a:prstDash val="solid"/>
-                      <a:round/>
-                      <a:headEnd type="none" w="med" len="med"/>
-                      <a:tailEnd type="none" w="med" len="med"/>
-                    </a:lnL>
-                    <a:lnR w="19050" cap="flat" cmpd="sng" algn="ctr">
-                      <a:solidFill>
-                        <a:srgbClr val="002060"/>
-                      </a:solidFill>
-                      <a:prstDash val="solid"/>
-                      <a:round/>
-                      <a:headEnd type="none" w="med" len="med"/>
-                      <a:tailEnd type="none" w="med" len="med"/>
-                    </a:lnR>
-                    <a:lnT w="19050" cap="flat" cmpd="sng" algn="ctr">
-                      <a:solidFill>
-                        <a:srgbClr val="002060"/>
-                      </a:solidFill>
-                      <a:prstDash val="solid"/>
-                      <a:round/>
-                      <a:headEnd type="none" w="med" len="med"/>
-                      <a:tailEnd type="none" w="med" len="med"/>
-                    </a:lnT>
-                    <a:lnB w="19050" cap="flat" cmpd="sng" algn="ctr">
-                      <a:solidFill>
-                        <a:srgbClr val="002060"/>
-                      </a:solidFill>
-                      <a:prstDash val="solid"/>
-                      <a:round/>
-                      <a:headEnd type="none" w="med" len="med"/>
-                      <a:tailEnd type="none" w="med" len="med"/>
-                    </a:lnB>
-                    <a:solidFill>
-                      <a:schemeClr val="bg1">
-                        <a:lumMod val="75000"/>
-                      </a:schemeClr>
-                    </a:solidFill>
-                  </a:tcPr>
-                </a:tc>
-                <a:tc>
-                  <a:txBody>
-                    <a:bodyPr/>
-                    <a:lstStyle/>
-                    <a:p>
-                      <a:pPr algn="l" fontAlgn="t"/>
-                      <a:r>
-                        <a:rPr lang="en-US" sz="1200" b="0" i="0" u="none" strike="noStrike" smtClean="0">
-                          <a:solidFill>
-                            <a:srgbClr val="002060"/>
-                          </a:solidFill>
-                          <a:effectLst/>
-                          <a:latin typeface="Intel Clear" panose="020B0604020203020204" pitchFamily="34" charset="0"/>
-                          <a:ea typeface="Intel Clear" panose="020B0604020203020204" pitchFamily="34" charset="0"/>
-                          <a:cs typeface="Intel Clear" panose="020B0604020203020204" pitchFamily="34" charset="0"/>
-                        </a:rPr>
-                        <a:t> </a:t>
-                      </a:r>
-                      <a:endParaRPr lang="en-US" sz="1200" b="0" i="0" u="none" strike="noStrike" dirty="0">
+                      <a:endParaRPr lang="en-US" sz="1050" b="0" i="0" u="none" strike="noStrike" dirty="0">
                         <a:solidFill>
                           <a:srgbClr val="002060"/>
                         </a:solidFill>
@@ -9693,7 +7371,7 @@
                     <a:p>
                       <a:pPr algn="ctr" fontAlgn="t"/>
                       <a:r>
-                        <a:rPr lang="en-US" sz="1200" b="0" i="0" u="none" strike="noStrike" smtClean="0">
+                        <a:rPr lang="en-US" sz="1050" b="0" i="0" u="none" strike="noStrike" smtClean="0">
                           <a:solidFill>
                             <a:srgbClr val="002060"/>
                           </a:solidFill>
@@ -9704,7 +7382,7 @@
                         </a:rPr>
                         <a:t> </a:t>
                       </a:r>
-                      <a:endParaRPr lang="en-US" sz="1200" b="0" i="0" u="none" strike="noStrike" dirty="0">
+                      <a:endParaRPr lang="en-US" sz="1050" b="0" i="0" u="none" strike="noStrike" dirty="0">
                         <a:solidFill>
                           <a:srgbClr val="002060"/>
                         </a:solidFill>
@@ -9764,7 +7442,7 @@
                     <a:p>
                       <a:pPr algn="l" fontAlgn="t"/>
                       <a:r>
-                        <a:rPr lang="en-US" sz="1200" b="0" i="0" u="none" strike="noStrike" smtClean="0">
+                        <a:rPr lang="en-US" sz="1050" b="0" i="0" u="none" strike="noStrike" smtClean="0">
                           <a:solidFill>
                             <a:srgbClr val="002060"/>
                           </a:solidFill>
@@ -9775,7 +7453,7 @@
                         </a:rPr>
                         <a:t> </a:t>
                       </a:r>
-                      <a:endParaRPr lang="en-US" sz="1200" b="0" i="0" u="none" strike="noStrike" dirty="0">
+                      <a:endParaRPr lang="en-US" sz="1050" b="0" i="0" u="none" strike="noStrike" dirty="0">
                         <a:solidFill>
                           <a:srgbClr val="002060"/>
                         </a:solidFill>
@@ -9837,7 +7515,7 @@
                     <a:p>
                       <a:pPr algn="l" fontAlgn="t"/>
                       <a:r>
-                        <a:rPr lang="en-US" sz="1200" b="0" i="0" u="none" strike="noStrike" smtClean="0">
+                        <a:rPr lang="en-US" sz="1050" b="0" i="0" u="none" strike="noStrike" smtClean="0">
                           <a:solidFill>
                             <a:srgbClr val="002060"/>
                           </a:solidFill>
@@ -9848,153 +7526,7 @@
                         </a:rPr>
                         <a:t> </a:t>
                       </a:r>
-                      <a:endParaRPr lang="en-US" sz="1200" b="0" i="0" u="none" strike="noStrike" dirty="0">
-                        <a:solidFill>
-                          <a:srgbClr val="002060"/>
-                        </a:solidFill>
-                        <a:effectLst/>
-                        <a:latin typeface="Intel Clear" panose="020B0604020203020204" pitchFamily="34" charset="0"/>
-                        <a:ea typeface="Intel Clear" panose="020B0604020203020204" pitchFamily="34" charset="0"/>
-                        <a:cs typeface="Intel Clear" panose="020B0604020203020204" pitchFamily="34" charset="0"/>
-                      </a:endParaRPr>
-                    </a:p>
-                  </a:txBody>
-                  <a:tcPr marL="45720" marR="45720" marT="27432" marB="27432" anchor="ctr">
-                    <a:lnL w="19050" cap="flat" cmpd="sng" algn="ctr">
-                      <a:solidFill>
-                        <a:srgbClr val="002060"/>
-                      </a:solidFill>
-                      <a:prstDash val="solid"/>
-                      <a:round/>
-                      <a:headEnd type="none" w="med" len="med"/>
-                      <a:tailEnd type="none" w="med" len="med"/>
-                    </a:lnL>
-                    <a:lnR w="19050" cap="flat" cmpd="sng" algn="ctr">
-                      <a:solidFill>
-                        <a:srgbClr val="002060"/>
-                      </a:solidFill>
-                      <a:prstDash val="solid"/>
-                      <a:round/>
-                      <a:headEnd type="none" w="med" len="med"/>
-                      <a:tailEnd type="none" w="med" len="med"/>
-                    </a:lnR>
-                    <a:lnT w="19050" cap="flat" cmpd="sng" algn="ctr">
-                      <a:solidFill>
-                        <a:srgbClr val="002060"/>
-                      </a:solidFill>
-                      <a:prstDash val="solid"/>
-                      <a:round/>
-                      <a:headEnd type="none" w="med" len="med"/>
-                      <a:tailEnd type="none" w="med" len="med"/>
-                    </a:lnT>
-                    <a:lnB w="19050" cap="flat" cmpd="sng" algn="ctr">
-                      <a:solidFill>
-                        <a:srgbClr val="002060"/>
-                      </a:solidFill>
-                      <a:prstDash val="solid"/>
-                      <a:round/>
-                      <a:headEnd type="none" w="med" len="med"/>
-                      <a:tailEnd type="none" w="med" len="med"/>
-                    </a:lnB>
-                    <a:solidFill>
-                      <a:schemeClr val="bg1">
-                        <a:lumMod val="75000"/>
-                      </a:schemeClr>
-                    </a:solidFill>
-                  </a:tcPr>
-                </a:tc>
-                <a:tc>
-                  <a:txBody>
-                    <a:bodyPr/>
-                    <a:lstStyle/>
-                    <a:p>
-                      <a:pPr algn="l" fontAlgn="t"/>
-                      <a:r>
-                        <a:rPr lang="en-US" sz="1200" b="0" i="0" u="none" strike="noStrike" smtClean="0">
-                          <a:solidFill>
-                            <a:srgbClr val="002060"/>
-                          </a:solidFill>
-                          <a:effectLst/>
-                          <a:latin typeface="Intel Clear" panose="020B0604020203020204" pitchFamily="34" charset="0"/>
-                          <a:ea typeface="Intel Clear" panose="020B0604020203020204" pitchFamily="34" charset="0"/>
-                          <a:cs typeface="Intel Clear" panose="020B0604020203020204" pitchFamily="34" charset="0"/>
-                        </a:rPr>
-                        <a:t> </a:t>
-                      </a:r>
-                      <a:endParaRPr lang="en-US" sz="1200" b="0" i="0" u="none" strike="noStrike" dirty="0">
-                        <a:solidFill>
-                          <a:srgbClr val="002060"/>
-                        </a:solidFill>
-                        <a:effectLst/>
-                        <a:latin typeface="Intel Clear" panose="020B0604020203020204" pitchFamily="34" charset="0"/>
-                        <a:ea typeface="Intel Clear" panose="020B0604020203020204" pitchFamily="34" charset="0"/>
-                        <a:cs typeface="Intel Clear" panose="020B0604020203020204" pitchFamily="34" charset="0"/>
-                      </a:endParaRPr>
-                    </a:p>
-                  </a:txBody>
-                  <a:tcPr marL="45720" marR="45720" marT="27432" marB="27432" anchor="ctr">
-                    <a:lnL w="19050" cap="flat" cmpd="sng" algn="ctr">
-                      <a:solidFill>
-                        <a:srgbClr val="002060"/>
-                      </a:solidFill>
-                      <a:prstDash val="solid"/>
-                      <a:round/>
-                      <a:headEnd type="none" w="med" len="med"/>
-                      <a:tailEnd type="none" w="med" len="med"/>
-                    </a:lnL>
-                    <a:lnR w="19050" cap="flat" cmpd="sng" algn="ctr">
-                      <a:solidFill>
-                        <a:srgbClr val="002060"/>
-                      </a:solidFill>
-                      <a:prstDash val="solid"/>
-                      <a:round/>
-                      <a:headEnd type="none" w="med" len="med"/>
-                      <a:tailEnd type="none" w="med" len="med"/>
-                    </a:lnR>
-                    <a:lnT w="19050" cap="flat" cmpd="sng" algn="ctr">
-                      <a:solidFill>
-                        <a:srgbClr val="002060"/>
-                      </a:solidFill>
-                      <a:prstDash val="solid"/>
-                      <a:round/>
-                      <a:headEnd type="none" w="med" len="med"/>
-                      <a:tailEnd type="none" w="med" len="med"/>
-                    </a:lnT>
-                    <a:lnB w="19050" cap="flat" cmpd="sng" algn="ctr">
-                      <a:solidFill>
-                        <a:srgbClr val="002060"/>
-                      </a:solidFill>
-                      <a:prstDash val="solid"/>
-                      <a:round/>
-                      <a:headEnd type="none" w="med" len="med"/>
-                      <a:tailEnd type="none" w="med" len="med"/>
-                    </a:lnB>
-                    <a:solidFill>
-                      <a:schemeClr val="bg1">
-                        <a:lumMod val="75000"/>
-                      </a:schemeClr>
-                    </a:solidFill>
-                  </a:tcPr>
-                </a:tc>
-                <a:tc>
-                  <a:txBody>
-                    <a:bodyPr/>
-                    <a:lstStyle/>
-                    <a:p>
-                      <a:pPr algn="l" fontAlgn="t"/>
-                      <a:r>
-                        <a:rPr lang="en-US" sz="1200" b="0" i="0" u="none" strike="noStrike" smtClean="0">
-                          <a:solidFill>
-                            <a:srgbClr val="002060"/>
-                          </a:solidFill>
-                          <a:effectLst/>
-                          <a:latin typeface="Intel Clear" panose="020B0604020203020204" pitchFamily="34" charset="0"/>
-                          <a:ea typeface="Intel Clear" panose="020B0604020203020204" pitchFamily="34" charset="0"/>
-                          <a:cs typeface="Intel Clear" panose="020B0604020203020204" pitchFamily="34" charset="0"/>
-                        </a:rPr>
-                        <a:t> </a:t>
-                      </a:r>
-                      <a:endParaRPr lang="en-US" sz="1200" b="0" i="0" u="none" strike="noStrike" dirty="0">
+                      <a:endParaRPr lang="en-US" sz="1050" b="0" i="0" u="none" strike="noStrike" dirty="0">
                         <a:solidFill>
                           <a:srgbClr val="002060"/>
                         </a:solidFill>
@@ -10063,7 +7595,7 @@
                     <a:p>
                       <a:pPr algn="ctr" fontAlgn="t"/>
                       <a:r>
-                        <a:rPr lang="en-US" sz="1200" b="0" i="0" u="none" strike="noStrike" smtClean="0">
+                        <a:rPr lang="en-US" sz="1050" b="0" i="0" u="none" strike="noStrike" smtClean="0">
                           <a:solidFill>
                             <a:srgbClr val="002060"/>
                           </a:solidFill>
@@ -10074,7 +7606,7 @@
                         </a:rPr>
                         <a:t> </a:t>
                       </a:r>
-                      <a:endParaRPr lang="en-US" sz="1200" b="0" i="0" u="none" strike="noStrike" dirty="0">
+                      <a:endParaRPr lang="en-US" sz="1050" b="0" i="0" u="none" strike="noStrike" dirty="0">
                         <a:solidFill>
                           <a:srgbClr val="002060"/>
                         </a:solidFill>
@@ -10134,7 +7666,7 @@
                     <a:p>
                       <a:pPr algn="l" fontAlgn="t"/>
                       <a:r>
-                        <a:rPr lang="en-US" sz="1200" b="0" i="0" u="none" strike="noStrike" smtClean="0">
+                        <a:rPr lang="en-US" sz="1050" b="0" i="0" u="none" strike="noStrike" smtClean="0">
                           <a:solidFill>
                             <a:srgbClr val="002060"/>
                           </a:solidFill>
@@ -10145,7 +7677,7 @@
                         </a:rPr>
                         <a:t> </a:t>
                       </a:r>
-                      <a:endParaRPr lang="en-US" sz="1200" b="0" i="0" u="none" strike="noStrike" dirty="0">
+                      <a:endParaRPr lang="en-US" sz="1050" b="0" i="0" u="none" strike="noStrike" dirty="0">
                         <a:solidFill>
                           <a:srgbClr val="002060"/>
                         </a:solidFill>
@@ -10207,7 +7739,7 @@
                     <a:p>
                       <a:pPr algn="l" fontAlgn="t"/>
                       <a:r>
-                        <a:rPr lang="en-US" sz="1200" b="0" i="0" u="none" strike="noStrike" smtClean="0">
+                        <a:rPr lang="en-US" sz="1050" b="0" i="0" u="none" strike="noStrike" smtClean="0">
                           <a:solidFill>
                             <a:srgbClr val="002060"/>
                           </a:solidFill>
@@ -10218,153 +7750,7 @@
                         </a:rPr>
                         <a:t> </a:t>
                       </a:r>
-                      <a:endParaRPr lang="en-US" sz="1200" b="0" i="0" u="none" strike="noStrike" dirty="0">
-                        <a:solidFill>
-                          <a:srgbClr val="002060"/>
-                        </a:solidFill>
-                        <a:effectLst/>
-                        <a:latin typeface="Intel Clear" panose="020B0604020203020204" pitchFamily="34" charset="0"/>
-                        <a:ea typeface="Intel Clear" panose="020B0604020203020204" pitchFamily="34" charset="0"/>
-                        <a:cs typeface="Intel Clear" panose="020B0604020203020204" pitchFamily="34" charset="0"/>
-                      </a:endParaRPr>
-                    </a:p>
-                  </a:txBody>
-                  <a:tcPr marL="45720" marR="45720" marT="27432" marB="27432" anchor="ctr">
-                    <a:lnL w="19050" cap="flat" cmpd="sng" algn="ctr">
-                      <a:solidFill>
-                        <a:srgbClr val="002060"/>
-                      </a:solidFill>
-                      <a:prstDash val="solid"/>
-                      <a:round/>
-                      <a:headEnd type="none" w="med" len="med"/>
-                      <a:tailEnd type="none" w="med" len="med"/>
-                    </a:lnL>
-                    <a:lnR w="19050" cap="flat" cmpd="sng" algn="ctr">
-                      <a:solidFill>
-                        <a:srgbClr val="002060"/>
-                      </a:solidFill>
-                      <a:prstDash val="solid"/>
-                      <a:round/>
-                      <a:headEnd type="none" w="med" len="med"/>
-                      <a:tailEnd type="none" w="med" len="med"/>
-                    </a:lnR>
-                    <a:lnT w="19050" cap="flat" cmpd="sng" algn="ctr">
-                      <a:solidFill>
-                        <a:srgbClr val="002060"/>
-                      </a:solidFill>
-                      <a:prstDash val="solid"/>
-                      <a:round/>
-                      <a:headEnd type="none" w="med" len="med"/>
-                      <a:tailEnd type="none" w="med" len="med"/>
-                    </a:lnT>
-                    <a:lnB w="19050" cap="flat" cmpd="sng" algn="ctr">
-                      <a:solidFill>
-                        <a:srgbClr val="002060"/>
-                      </a:solidFill>
-                      <a:prstDash val="solid"/>
-                      <a:round/>
-                      <a:headEnd type="none" w="med" len="med"/>
-                      <a:tailEnd type="none" w="med" len="med"/>
-                    </a:lnB>
-                    <a:solidFill>
-                      <a:schemeClr val="bg1">
-                        <a:lumMod val="75000"/>
-                      </a:schemeClr>
-                    </a:solidFill>
-                  </a:tcPr>
-                </a:tc>
-                <a:tc>
-                  <a:txBody>
-                    <a:bodyPr/>
-                    <a:lstStyle/>
-                    <a:p>
-                      <a:pPr algn="l" fontAlgn="t"/>
-                      <a:r>
-                        <a:rPr lang="en-US" sz="1200" b="0" i="0" u="none" strike="noStrike" smtClean="0">
-                          <a:solidFill>
-                            <a:srgbClr val="002060"/>
-                          </a:solidFill>
-                          <a:effectLst/>
-                          <a:latin typeface="Intel Clear" panose="020B0604020203020204" pitchFamily="34" charset="0"/>
-                          <a:ea typeface="Intel Clear" panose="020B0604020203020204" pitchFamily="34" charset="0"/>
-                          <a:cs typeface="Intel Clear" panose="020B0604020203020204" pitchFamily="34" charset="0"/>
-                        </a:rPr>
-                        <a:t> </a:t>
-                      </a:r>
-                      <a:endParaRPr lang="en-US" sz="1200" b="0" i="0" u="none" strike="noStrike" dirty="0">
-                        <a:solidFill>
-                          <a:srgbClr val="002060"/>
-                        </a:solidFill>
-                        <a:effectLst/>
-                        <a:latin typeface="Intel Clear" panose="020B0604020203020204" pitchFamily="34" charset="0"/>
-                        <a:ea typeface="Intel Clear" panose="020B0604020203020204" pitchFamily="34" charset="0"/>
-                        <a:cs typeface="Intel Clear" panose="020B0604020203020204" pitchFamily="34" charset="0"/>
-                      </a:endParaRPr>
-                    </a:p>
-                  </a:txBody>
-                  <a:tcPr marL="45720" marR="45720" marT="27432" marB="27432" anchor="ctr">
-                    <a:lnL w="19050" cap="flat" cmpd="sng" algn="ctr">
-                      <a:solidFill>
-                        <a:srgbClr val="002060"/>
-                      </a:solidFill>
-                      <a:prstDash val="solid"/>
-                      <a:round/>
-                      <a:headEnd type="none" w="med" len="med"/>
-                      <a:tailEnd type="none" w="med" len="med"/>
-                    </a:lnL>
-                    <a:lnR w="19050" cap="flat" cmpd="sng" algn="ctr">
-                      <a:solidFill>
-                        <a:srgbClr val="002060"/>
-                      </a:solidFill>
-                      <a:prstDash val="solid"/>
-                      <a:round/>
-                      <a:headEnd type="none" w="med" len="med"/>
-                      <a:tailEnd type="none" w="med" len="med"/>
-                    </a:lnR>
-                    <a:lnT w="19050" cap="flat" cmpd="sng" algn="ctr">
-                      <a:solidFill>
-                        <a:srgbClr val="002060"/>
-                      </a:solidFill>
-                      <a:prstDash val="solid"/>
-                      <a:round/>
-                      <a:headEnd type="none" w="med" len="med"/>
-                      <a:tailEnd type="none" w="med" len="med"/>
-                    </a:lnT>
-                    <a:lnB w="19050" cap="flat" cmpd="sng" algn="ctr">
-                      <a:solidFill>
-                        <a:srgbClr val="002060"/>
-                      </a:solidFill>
-                      <a:prstDash val="solid"/>
-                      <a:round/>
-                      <a:headEnd type="none" w="med" len="med"/>
-                      <a:tailEnd type="none" w="med" len="med"/>
-                    </a:lnB>
-                    <a:solidFill>
-                      <a:schemeClr val="bg1">
-                        <a:lumMod val="75000"/>
-                      </a:schemeClr>
-                    </a:solidFill>
-                  </a:tcPr>
-                </a:tc>
-                <a:tc>
-                  <a:txBody>
-                    <a:bodyPr/>
-                    <a:lstStyle/>
-                    <a:p>
-                      <a:pPr algn="l" fontAlgn="t"/>
-                      <a:r>
-                        <a:rPr lang="en-US" sz="1200" b="0" i="0" u="none" strike="noStrike" smtClean="0">
-                          <a:solidFill>
-                            <a:srgbClr val="002060"/>
-                          </a:solidFill>
-                          <a:effectLst/>
-                          <a:latin typeface="Intel Clear" panose="020B0604020203020204" pitchFamily="34" charset="0"/>
-                          <a:ea typeface="Intel Clear" panose="020B0604020203020204" pitchFamily="34" charset="0"/>
-                          <a:cs typeface="Intel Clear" panose="020B0604020203020204" pitchFamily="34" charset="0"/>
-                        </a:rPr>
-                        <a:t> </a:t>
-                      </a:r>
-                      <a:endParaRPr lang="en-US" sz="1200" b="0" i="0" u="none" strike="noStrike" dirty="0">
+                      <a:endParaRPr lang="en-US" sz="1050" b="0" i="0" u="none" strike="noStrike" dirty="0">
                         <a:solidFill>
                           <a:srgbClr val="002060"/>
                         </a:solidFill>

</xml_diff>

<commit_message>
template field updated but gives appending issues
</commit_message>
<xml_diff>
--- a/src/main/resources/Template.pptx
+++ b/src/main/resources/Template.pptx
@@ -197,7 +197,7 @@
           <a:p>
             <a:fld id="{159A8166-34DF-470E-9DE3-188AFC0E57D2}" type="datetimeFigureOut">
               <a:rPr lang="en-US" smtClean="0"/>
-              <a:t>27/09/2021</a:t>
+              <a:t>10/4/2021</a:t>
             </a:fld>
             <a:endParaRPr lang="en-US"/>
           </a:p>
@@ -698,7 +698,7 @@
           <a:p>
             <a:fld id="{7B9D1350-BBC3-4784-B299-7C5541BF58C1}" type="datetimeFigureOut">
               <a:rPr lang="en-US" smtClean="0"/>
-              <a:t>27/09/2021</a:t>
+              <a:t>10/4/2021</a:t>
             </a:fld>
             <a:endParaRPr lang="en-US"/>
           </a:p>
@@ -896,7 +896,7 @@
           <a:p>
             <a:fld id="{7B9D1350-BBC3-4784-B299-7C5541BF58C1}" type="datetimeFigureOut">
               <a:rPr lang="en-US" smtClean="0"/>
-              <a:t>27/09/2021</a:t>
+              <a:t>10/4/2021</a:t>
             </a:fld>
             <a:endParaRPr lang="en-US"/>
           </a:p>
@@ -1104,7 +1104,7 @@
           <a:p>
             <a:fld id="{7B9D1350-BBC3-4784-B299-7C5541BF58C1}" type="datetimeFigureOut">
               <a:rPr lang="en-US" smtClean="0"/>
-              <a:t>27/09/2021</a:t>
+              <a:t>10/4/2021</a:t>
             </a:fld>
             <a:endParaRPr lang="en-US"/>
           </a:p>
@@ -1302,7 +1302,7 @@
           <a:p>
             <a:fld id="{7B9D1350-BBC3-4784-B299-7C5541BF58C1}" type="datetimeFigureOut">
               <a:rPr lang="en-US" smtClean="0"/>
-              <a:t>27/09/2021</a:t>
+              <a:t>10/4/2021</a:t>
             </a:fld>
             <a:endParaRPr lang="en-US"/>
           </a:p>
@@ -1577,7 +1577,7 @@
           <a:p>
             <a:fld id="{7B9D1350-BBC3-4784-B299-7C5541BF58C1}" type="datetimeFigureOut">
               <a:rPr lang="en-US" smtClean="0"/>
-              <a:t>27/09/2021</a:t>
+              <a:t>10/4/2021</a:t>
             </a:fld>
             <a:endParaRPr lang="en-US"/>
           </a:p>
@@ -1842,7 +1842,7 @@
           <a:p>
             <a:fld id="{7B9D1350-BBC3-4784-B299-7C5541BF58C1}" type="datetimeFigureOut">
               <a:rPr lang="en-US" smtClean="0"/>
-              <a:t>27/09/2021</a:t>
+              <a:t>10/4/2021</a:t>
             </a:fld>
             <a:endParaRPr lang="en-US"/>
           </a:p>
@@ -2254,7 +2254,7 @@
           <a:p>
             <a:fld id="{7B9D1350-BBC3-4784-B299-7C5541BF58C1}" type="datetimeFigureOut">
               <a:rPr lang="en-US" smtClean="0"/>
-              <a:t>27/09/2021</a:t>
+              <a:t>10/4/2021</a:t>
             </a:fld>
             <a:endParaRPr lang="en-US"/>
           </a:p>
@@ -2395,7 +2395,7 @@
           <a:p>
             <a:fld id="{7B9D1350-BBC3-4784-B299-7C5541BF58C1}" type="datetimeFigureOut">
               <a:rPr lang="en-US" smtClean="0"/>
-              <a:t>27/09/2021</a:t>
+              <a:t>10/4/2021</a:t>
             </a:fld>
             <a:endParaRPr lang="en-US"/>
           </a:p>
@@ -2508,7 +2508,7 @@
           <a:p>
             <a:fld id="{7B9D1350-BBC3-4784-B299-7C5541BF58C1}" type="datetimeFigureOut">
               <a:rPr lang="en-US" smtClean="0"/>
-              <a:t>27/09/2021</a:t>
+              <a:t>10/4/2021</a:t>
             </a:fld>
             <a:endParaRPr lang="en-US"/>
           </a:p>
@@ -2819,7 +2819,7 @@
           <a:p>
             <a:fld id="{7B9D1350-BBC3-4784-B299-7C5541BF58C1}" type="datetimeFigureOut">
               <a:rPr lang="en-US" smtClean="0"/>
-              <a:t>27/09/2021</a:t>
+              <a:t>10/4/2021</a:t>
             </a:fld>
             <a:endParaRPr lang="en-US"/>
           </a:p>
@@ -3107,7 +3107,7 @@
           <a:p>
             <a:fld id="{7B9D1350-BBC3-4784-B299-7C5541BF58C1}" type="datetimeFigureOut">
               <a:rPr lang="en-US" smtClean="0"/>
-              <a:t>27/09/2021</a:t>
+              <a:t>10/4/2021</a:t>
             </a:fld>
             <a:endParaRPr lang="en-US"/>
           </a:p>
@@ -3348,7 +3348,7 @@
           <a:p>
             <a:fld id="{7B9D1350-BBC3-4784-B299-7C5541BF58C1}" type="datetimeFigureOut">
               <a:rPr lang="en-US" smtClean="0"/>
-              <a:t>27/09/2021</a:t>
+              <a:t>10/4/2021</a:t>
             </a:fld>
             <a:endParaRPr lang="en-US"/>
           </a:p>
@@ -3780,14 +3780,14 @@
           <p:nvPr>
             <p:extLst>
               <p:ext uri="{D42A27DB-BD31-4B8C-83A1-F6EECF244321}">
-                <p14:modId xmlns:p14="http://schemas.microsoft.com/office/powerpoint/2010/main" val="2211458596"/>
+                <p14:modId xmlns:p14="http://schemas.microsoft.com/office/powerpoint/2010/main" val="46059303"/>
               </p:ext>
             </p:extLst>
           </p:nvPr>
         </p:nvGraphicFramePr>
         <p:xfrm>
-          <a:off x="6939915" y="956637"/>
-          <a:ext cx="5152555" cy="5653165"/>
+          <a:off x="6939915" y="1105593"/>
+          <a:ext cx="5152555" cy="5504215"/>
         </p:xfrm>
         <a:graphic>
           <a:graphicData uri="http://schemas.openxmlformats.org/drawingml/2006/table">
@@ -3816,7 +3816,7 @@
                   </a:extLst>
                 </a:gridCol>
               </a:tblGrid>
-              <a:tr h="282440">
+              <a:tr h="274998">
                 <a:tc gridSpan="3">
                   <a:txBody>
                     <a:bodyPr/>
@@ -4003,7 +4003,7 @@
                   </a:ext>
                 </a:extLst>
               </a:tr>
-              <a:tr h="315925">
+              <a:tr h="307601">
                 <a:tc>
                   <a:txBody>
                     <a:bodyPr/>
@@ -4011,7 +4011,7 @@
                     <a:p>
                       <a:pPr algn="ctr" fontAlgn="t"/>
                       <a:r>
-                        <a:rPr lang="en-US" sz="1050" b="0" i="0" u="none" strike="noStrike" smtClean="0">
+                        <a:rPr lang="en-US" sz="1050" b="0" i="0" u="none" strike="noStrike">
                           <a:solidFill>
                             <a:srgbClr val="002060"/>
                           </a:solidFill>
@@ -4082,7 +4082,7 @@
                     <a:p>
                       <a:pPr algn="l" fontAlgn="t"/>
                       <a:r>
-                        <a:rPr lang="en-US" sz="1050" b="0" i="0" u="none" strike="noStrike" smtClean="0">
+                        <a:rPr lang="en-US" sz="1050" b="0" i="0" u="none" strike="noStrike">
                           <a:solidFill>
                             <a:srgbClr val="002060"/>
                           </a:solidFill>
@@ -4155,7 +4155,78 @@
                     <a:p>
                       <a:pPr algn="l" fontAlgn="t"/>
                       <a:r>
-                        <a:rPr lang="en-US" sz="1050" b="0" i="0" u="none" strike="noStrike" smtClean="0">
+                        <a:rPr lang="en-US" sz="1050" b="0" i="0" u="none" strike="noStrike" dirty="0">
+                          <a:solidFill>
+                            <a:srgbClr val="002060"/>
+                          </a:solidFill>
+                          <a:effectLst/>
+                          <a:latin typeface="Intel Clear" panose="020B0604020203020204" pitchFamily="34" charset="0"/>
+                          <a:ea typeface="Intel Clear" panose="020B0604020203020204" pitchFamily="34" charset="0"/>
+                          <a:cs typeface="Intel Clear" panose="020B0604020203020204" pitchFamily="34" charset="0"/>
+                        </a:rPr>
+                        <a:t> </a:t>
+                      </a:r>
+                    </a:p>
+                  </a:txBody>
+                  <a:tcPr marL="45720" marR="45720" marT="27432" marB="27432" anchor="ctr">
+                    <a:lnL w="19050" cap="flat" cmpd="sng" algn="ctr">
+                      <a:solidFill>
+                        <a:srgbClr val="002060"/>
+                      </a:solidFill>
+                      <a:prstDash val="solid"/>
+                      <a:round/>
+                      <a:headEnd type="none" w="med" len="med"/>
+                      <a:tailEnd type="none" w="med" len="med"/>
+                    </a:lnL>
+                    <a:lnR w="19050" cap="flat" cmpd="sng" algn="ctr">
+                      <a:solidFill>
+                        <a:srgbClr val="002060"/>
+                      </a:solidFill>
+                      <a:prstDash val="solid"/>
+                      <a:round/>
+                      <a:headEnd type="none" w="med" len="med"/>
+                      <a:tailEnd type="none" w="med" len="med"/>
+                    </a:lnR>
+                    <a:lnT w="19050" cap="flat" cmpd="sng" algn="ctr">
+                      <a:solidFill>
+                        <a:srgbClr val="002060"/>
+                      </a:solidFill>
+                      <a:prstDash val="solid"/>
+                      <a:round/>
+                      <a:headEnd type="none" w="med" len="med"/>
+                      <a:tailEnd type="none" w="med" len="med"/>
+                    </a:lnT>
+                    <a:lnB w="19050" cap="flat" cmpd="sng" algn="ctr">
+                      <a:solidFill>
+                        <a:srgbClr val="002060"/>
+                      </a:solidFill>
+                      <a:prstDash val="solid"/>
+                      <a:round/>
+                      <a:headEnd type="none" w="med" len="med"/>
+                      <a:tailEnd type="none" w="med" len="med"/>
+                    </a:lnB>
+                    <a:solidFill>
+                      <a:schemeClr val="bg1">
+                        <a:lumMod val="75000"/>
+                      </a:schemeClr>
+                    </a:solidFill>
+                  </a:tcPr>
+                </a:tc>
+                <a:extLst>
+                  <a:ext uri="{0D108BD9-81ED-4DB2-BD59-A6C34878D82A}">
+                    <a16:rowId xmlns:a16="http://schemas.microsoft.com/office/drawing/2014/main" val="3712375731"/>
+                  </a:ext>
+                </a:extLst>
+              </a:tr>
+              <a:tr h="307601">
+                <a:tc>
+                  <a:txBody>
+                    <a:bodyPr/>
+                    <a:lstStyle/>
+                    <a:p>
+                      <a:pPr algn="ctr" fontAlgn="t"/>
+                      <a:r>
+                        <a:rPr lang="en-US" sz="1050" b="0" i="0" u="none" strike="noStrike">
                           <a:solidFill>
                             <a:srgbClr val="002060"/>
                           </a:solidFill>
@@ -4215,27 +4286,18 @@
                       <a:tailEnd type="none" w="med" len="med"/>
                     </a:lnB>
                     <a:solidFill>
-                      <a:schemeClr val="bg1">
-                        <a:lumMod val="75000"/>
-                      </a:schemeClr>
+                      <a:srgbClr val="BFBFBF"/>
                     </a:solidFill>
                   </a:tcPr>
                 </a:tc>
-                <a:extLst>
-                  <a:ext uri="{0D108BD9-81ED-4DB2-BD59-A6C34878D82A}">
-                    <a16:rowId xmlns:a16="http://schemas.microsoft.com/office/drawing/2014/main" val="3712375731"/>
-                  </a:ext>
-                </a:extLst>
-              </a:tr>
-              <a:tr h="315925">
                 <a:tc>
                   <a:txBody>
                     <a:bodyPr/>
                     <a:lstStyle/>
                     <a:p>
-                      <a:pPr algn="ctr" fontAlgn="t"/>
+                      <a:pPr algn="l" fontAlgn="t"/>
                       <a:r>
-                        <a:rPr lang="en-US" sz="1050" b="0" i="0" u="none" strike="noStrike" smtClean="0">
+                        <a:rPr lang="en-US" sz="1050" b="0" i="0" u="none" strike="noStrike">
                           <a:solidFill>
                             <a:srgbClr val="002060"/>
                           </a:solidFill>
@@ -4295,7 +4357,9 @@
                       <a:tailEnd type="none" w="med" len="med"/>
                     </a:lnB>
                     <a:solidFill>
-                      <a:srgbClr val="BFBFBF"/>
+                      <a:schemeClr val="bg1">
+                        <a:lumMod val="75000"/>
+                      </a:schemeClr>
                     </a:solidFill>
                   </a:tcPr>
                 </a:tc>
@@ -4306,7 +4370,7 @@
                     <a:p>
                       <a:pPr algn="l" fontAlgn="t"/>
                       <a:r>
-                        <a:rPr lang="en-US" sz="1050" b="0" i="0" u="none" strike="noStrike" smtClean="0">
+                        <a:rPr lang="en-US" sz="1050" b="0" i="0" u="none" strike="noStrike">
                           <a:solidFill>
                             <a:srgbClr val="002060"/>
                           </a:solidFill>
@@ -4372,14 +4436,21 @@
                     </a:solidFill>
                   </a:tcPr>
                 </a:tc>
+                <a:extLst>
+                  <a:ext uri="{0D108BD9-81ED-4DB2-BD59-A6C34878D82A}">
+                    <a16:rowId xmlns:a16="http://schemas.microsoft.com/office/drawing/2014/main" val="26492286"/>
+                  </a:ext>
+                </a:extLst>
+              </a:tr>
+              <a:tr h="307601">
                 <a:tc>
                   <a:txBody>
                     <a:bodyPr/>
                     <a:lstStyle/>
                     <a:p>
-                      <a:pPr algn="l" fontAlgn="t"/>
+                      <a:pPr algn="ctr" fontAlgn="t"/>
                       <a:r>
-                        <a:rPr lang="en-US" sz="1050" b="0" i="0" u="none" strike="noStrike" smtClean="0">
+                        <a:rPr lang="en-US" sz="1050" b="0" i="0" u="none" strike="noStrike">
                           <a:solidFill>
                             <a:srgbClr val="002060"/>
                           </a:solidFill>
@@ -4439,27 +4510,18 @@
                       <a:tailEnd type="none" w="med" len="med"/>
                     </a:lnB>
                     <a:solidFill>
-                      <a:schemeClr val="bg1">
-                        <a:lumMod val="75000"/>
-                      </a:schemeClr>
+                      <a:srgbClr val="BFBFBF"/>
                     </a:solidFill>
                   </a:tcPr>
                 </a:tc>
-                <a:extLst>
-                  <a:ext uri="{0D108BD9-81ED-4DB2-BD59-A6C34878D82A}">
-                    <a16:rowId xmlns:a16="http://schemas.microsoft.com/office/drawing/2014/main" val="26492286"/>
-                  </a:ext>
-                </a:extLst>
-              </a:tr>
-              <a:tr h="315925">
                 <a:tc>
                   <a:txBody>
                     <a:bodyPr/>
                     <a:lstStyle/>
                     <a:p>
-                      <a:pPr algn="ctr" fontAlgn="t"/>
+                      <a:pPr algn="l" fontAlgn="t"/>
                       <a:r>
-                        <a:rPr lang="en-US" sz="1050" b="0" i="0" u="none" strike="noStrike" smtClean="0">
+                        <a:rPr lang="en-US" sz="1050" b="0" i="0" u="none" strike="noStrike">
                           <a:solidFill>
                             <a:srgbClr val="002060"/>
                           </a:solidFill>
@@ -4519,7 +4581,9 @@
                       <a:tailEnd type="none" w="med" len="med"/>
                     </a:lnB>
                     <a:solidFill>
-                      <a:srgbClr val="BFBFBF"/>
+                      <a:schemeClr val="bg1">
+                        <a:lumMod val="75000"/>
+                      </a:schemeClr>
                     </a:solidFill>
                   </a:tcPr>
                 </a:tc>
@@ -4530,7 +4594,7 @@
                     <a:p>
                       <a:pPr algn="l" fontAlgn="t"/>
                       <a:r>
-                        <a:rPr lang="en-US" sz="1050" b="0" i="0" u="none" strike="noStrike" smtClean="0">
+                        <a:rPr lang="en-US" sz="1050" b="0" i="0" u="none" strike="noStrike">
                           <a:solidFill>
                             <a:srgbClr val="002060"/>
                           </a:solidFill>
@@ -4596,14 +4660,21 @@
                     </a:solidFill>
                   </a:tcPr>
                 </a:tc>
+                <a:extLst>
+                  <a:ext uri="{0D108BD9-81ED-4DB2-BD59-A6C34878D82A}">
+                    <a16:rowId xmlns:a16="http://schemas.microsoft.com/office/drawing/2014/main" val="2775169456"/>
+                  </a:ext>
+                </a:extLst>
+              </a:tr>
+              <a:tr h="307601">
                 <a:tc>
                   <a:txBody>
                     <a:bodyPr/>
                     <a:lstStyle/>
                     <a:p>
-                      <a:pPr algn="l" fontAlgn="t"/>
+                      <a:pPr algn="ctr" fontAlgn="t"/>
                       <a:r>
-                        <a:rPr lang="en-US" sz="1050" b="0" i="0" u="none" strike="noStrike" smtClean="0">
+                        <a:rPr lang="en-US" sz="1050" b="0" i="0" u="none" strike="noStrike" baseline="0">
                           <a:solidFill>
                             <a:srgbClr val="002060"/>
                           </a:solidFill>
@@ -4663,27 +4734,18 @@
                       <a:tailEnd type="none" w="med" len="med"/>
                     </a:lnB>
                     <a:solidFill>
-                      <a:schemeClr val="bg1">
-                        <a:lumMod val="75000"/>
-                      </a:schemeClr>
+                      <a:srgbClr val="BFBFBF"/>
                     </a:solidFill>
                   </a:tcPr>
                 </a:tc>
-                <a:extLst>
-                  <a:ext uri="{0D108BD9-81ED-4DB2-BD59-A6C34878D82A}">
-                    <a16:rowId xmlns:a16="http://schemas.microsoft.com/office/drawing/2014/main" val="2775169456"/>
-                  </a:ext>
-                </a:extLst>
-              </a:tr>
-              <a:tr h="315925">
                 <a:tc>
                   <a:txBody>
                     <a:bodyPr/>
                     <a:lstStyle/>
                     <a:p>
-                      <a:pPr algn="ctr" fontAlgn="t"/>
+                      <a:pPr algn="l" fontAlgn="t"/>
                       <a:r>
-                        <a:rPr lang="en-US" sz="1050" b="0" i="0" u="none" strike="noStrike" baseline="0" smtClean="0">
+                        <a:rPr lang="en-US" sz="1050" b="0" i="0" u="none" strike="noStrike">
                           <a:solidFill>
                             <a:srgbClr val="002060"/>
                           </a:solidFill>
@@ -4743,7 +4805,9 @@
                       <a:tailEnd type="none" w="med" len="med"/>
                     </a:lnB>
                     <a:solidFill>
-                      <a:srgbClr val="BFBFBF"/>
+                      <a:schemeClr val="bg1">
+                        <a:lumMod val="75000"/>
+                      </a:schemeClr>
                     </a:solidFill>
                   </a:tcPr>
                 </a:tc>
@@ -4754,7 +4818,7 @@
                     <a:p>
                       <a:pPr algn="l" fontAlgn="t"/>
                       <a:r>
-                        <a:rPr lang="en-US" sz="1050" b="0" i="0" u="none" strike="noStrike" smtClean="0">
+                        <a:rPr lang="en-US" sz="1050" b="0" i="0" u="none" strike="noStrike">
                           <a:solidFill>
                             <a:srgbClr val="002060"/>
                           </a:solidFill>
@@ -4820,14 +4884,21 @@
                     </a:solidFill>
                   </a:tcPr>
                 </a:tc>
+                <a:extLst>
+                  <a:ext uri="{0D108BD9-81ED-4DB2-BD59-A6C34878D82A}">
+                    <a16:rowId xmlns:a16="http://schemas.microsoft.com/office/drawing/2014/main" val="1902056831"/>
+                  </a:ext>
+                </a:extLst>
+              </a:tr>
+              <a:tr h="307601">
                 <a:tc>
                   <a:txBody>
                     <a:bodyPr/>
                     <a:lstStyle/>
                     <a:p>
-                      <a:pPr algn="l" fontAlgn="t"/>
+                      <a:pPr algn="ctr" fontAlgn="t"/>
                       <a:r>
-                        <a:rPr lang="en-US" sz="1050" b="0" i="0" u="none" strike="noStrike" smtClean="0">
+                        <a:rPr lang="en-US" sz="1050" b="0" i="0" u="none" strike="noStrike">
                           <a:solidFill>
                             <a:srgbClr val="002060"/>
                           </a:solidFill>
@@ -4887,27 +4958,18 @@
                       <a:tailEnd type="none" w="med" len="med"/>
                     </a:lnB>
                     <a:solidFill>
-                      <a:schemeClr val="bg1">
-                        <a:lumMod val="75000"/>
-                      </a:schemeClr>
+                      <a:srgbClr val="BFBFBF"/>
                     </a:solidFill>
                   </a:tcPr>
                 </a:tc>
-                <a:extLst>
-                  <a:ext uri="{0D108BD9-81ED-4DB2-BD59-A6C34878D82A}">
-                    <a16:rowId xmlns:a16="http://schemas.microsoft.com/office/drawing/2014/main" val="1902056831"/>
-                  </a:ext>
-                </a:extLst>
-              </a:tr>
-              <a:tr h="315925">
                 <a:tc>
                   <a:txBody>
                     <a:bodyPr/>
                     <a:lstStyle/>
                     <a:p>
-                      <a:pPr algn="ctr" fontAlgn="t"/>
+                      <a:pPr algn="l" fontAlgn="t"/>
                       <a:r>
-                        <a:rPr lang="en-US" sz="1050" b="0" i="0" u="none" strike="noStrike" smtClean="0">
+                        <a:rPr lang="en-US" sz="1050" b="0" i="0" u="none" strike="noStrike">
                           <a:solidFill>
                             <a:srgbClr val="002060"/>
                           </a:solidFill>
@@ -4967,7 +5029,9 @@
                       <a:tailEnd type="none" w="med" len="med"/>
                     </a:lnB>
                     <a:solidFill>
-                      <a:srgbClr val="BFBFBF"/>
+                      <a:schemeClr val="bg1">
+                        <a:lumMod val="75000"/>
+                      </a:schemeClr>
                     </a:solidFill>
                   </a:tcPr>
                 </a:tc>
@@ -4978,7 +5042,7 @@
                     <a:p>
                       <a:pPr algn="l" fontAlgn="t"/>
                       <a:r>
-                        <a:rPr lang="en-US" sz="1050" b="0" i="0" u="none" strike="noStrike" smtClean="0">
+                        <a:rPr lang="en-US" sz="1050" b="0" i="0" u="none" strike="noStrike">
                           <a:solidFill>
                             <a:srgbClr val="002060"/>
                           </a:solidFill>
@@ -5044,14 +5108,21 @@
                     </a:solidFill>
                   </a:tcPr>
                 </a:tc>
+                <a:extLst>
+                  <a:ext uri="{0D108BD9-81ED-4DB2-BD59-A6C34878D82A}">
+                    <a16:rowId xmlns:a16="http://schemas.microsoft.com/office/drawing/2014/main" val="762802707"/>
+                  </a:ext>
+                </a:extLst>
+              </a:tr>
+              <a:tr h="307601">
                 <a:tc>
                   <a:txBody>
                     <a:bodyPr/>
                     <a:lstStyle/>
                     <a:p>
-                      <a:pPr algn="l" fontAlgn="t"/>
+                      <a:pPr algn="ctr" fontAlgn="t"/>
                       <a:r>
-                        <a:rPr lang="en-US" sz="1050" b="0" i="0" u="none" strike="noStrike" smtClean="0">
+                        <a:rPr lang="en-US" sz="1050" b="0" i="0" u="none" strike="noStrike">
                           <a:solidFill>
                             <a:srgbClr val="002060"/>
                           </a:solidFill>
@@ -5111,27 +5182,18 @@
                       <a:tailEnd type="none" w="med" len="med"/>
                     </a:lnB>
                     <a:solidFill>
-                      <a:schemeClr val="bg1">
-                        <a:lumMod val="75000"/>
-                      </a:schemeClr>
+                      <a:srgbClr val="BFBFBF"/>
                     </a:solidFill>
                   </a:tcPr>
                 </a:tc>
-                <a:extLst>
-                  <a:ext uri="{0D108BD9-81ED-4DB2-BD59-A6C34878D82A}">
-                    <a16:rowId xmlns:a16="http://schemas.microsoft.com/office/drawing/2014/main" val="762802707"/>
-                  </a:ext>
-                </a:extLst>
-              </a:tr>
-              <a:tr h="315925">
                 <a:tc>
                   <a:txBody>
                     <a:bodyPr/>
                     <a:lstStyle/>
                     <a:p>
-                      <a:pPr algn="ctr" fontAlgn="t"/>
+                      <a:pPr algn="l" fontAlgn="t"/>
                       <a:r>
-                        <a:rPr lang="en-US" sz="1050" b="0" i="0" u="none" strike="noStrike" smtClean="0">
+                        <a:rPr lang="en-US" sz="1050" b="0" i="0" u="none" strike="noStrike">
                           <a:solidFill>
                             <a:srgbClr val="002060"/>
                           </a:solidFill>
@@ -5191,7 +5253,9 @@
                       <a:tailEnd type="none" w="med" len="med"/>
                     </a:lnB>
                     <a:solidFill>
-                      <a:srgbClr val="BFBFBF"/>
+                      <a:schemeClr val="bg1">
+                        <a:lumMod val="75000"/>
+                      </a:schemeClr>
                     </a:solidFill>
                   </a:tcPr>
                 </a:tc>
@@ -5202,7 +5266,7 @@
                     <a:p>
                       <a:pPr algn="l" fontAlgn="t"/>
                       <a:r>
-                        <a:rPr lang="en-US" sz="1050" b="0" i="0" u="none" strike="noStrike" smtClean="0">
+                        <a:rPr lang="en-US" sz="1050" b="0" i="0" u="none" strike="noStrike">
                           <a:solidFill>
                             <a:srgbClr val="002060"/>
                           </a:solidFill>
@@ -5268,14 +5332,21 @@
                     </a:solidFill>
                   </a:tcPr>
                 </a:tc>
+                <a:extLst>
+                  <a:ext uri="{0D108BD9-81ED-4DB2-BD59-A6C34878D82A}">
+                    <a16:rowId xmlns:a16="http://schemas.microsoft.com/office/drawing/2014/main" val="2090210283"/>
+                  </a:ext>
+                </a:extLst>
+              </a:tr>
+              <a:tr h="307601">
                 <a:tc>
                   <a:txBody>
                     <a:bodyPr/>
                     <a:lstStyle/>
                     <a:p>
-                      <a:pPr algn="l" fontAlgn="t"/>
+                      <a:pPr algn="ctr" fontAlgn="t"/>
                       <a:r>
-                        <a:rPr lang="en-US" sz="1050" b="0" i="0" u="none" strike="noStrike" smtClean="0">
+                        <a:rPr lang="en-US" sz="1050" b="0" i="0" u="none" strike="noStrike">
                           <a:solidFill>
                             <a:srgbClr val="002060"/>
                           </a:solidFill>
@@ -5335,27 +5406,18 @@
                       <a:tailEnd type="none" w="med" len="med"/>
                     </a:lnB>
                     <a:solidFill>
-                      <a:schemeClr val="bg1">
-                        <a:lumMod val="75000"/>
-                      </a:schemeClr>
+                      <a:srgbClr val="BFBFBF"/>
                     </a:solidFill>
                   </a:tcPr>
                 </a:tc>
-                <a:extLst>
-                  <a:ext uri="{0D108BD9-81ED-4DB2-BD59-A6C34878D82A}">
-                    <a16:rowId xmlns:a16="http://schemas.microsoft.com/office/drawing/2014/main" val="2090210283"/>
-                  </a:ext>
-                </a:extLst>
-              </a:tr>
-              <a:tr h="315925">
                 <a:tc>
                   <a:txBody>
                     <a:bodyPr/>
                     <a:lstStyle/>
                     <a:p>
-                      <a:pPr algn="ctr" fontAlgn="t"/>
+                      <a:pPr algn="l" fontAlgn="t"/>
                       <a:r>
-                        <a:rPr lang="en-US" sz="1050" b="0" i="0" u="none" strike="noStrike" smtClean="0">
+                        <a:rPr lang="en-US" sz="1050" b="0" i="0" u="none" strike="noStrike">
                           <a:solidFill>
                             <a:srgbClr val="002060"/>
                           </a:solidFill>
@@ -5415,7 +5477,9 @@
                       <a:tailEnd type="none" w="med" len="med"/>
                     </a:lnB>
                     <a:solidFill>
-                      <a:srgbClr val="BFBFBF"/>
+                      <a:schemeClr val="bg1">
+                        <a:lumMod val="75000"/>
+                      </a:schemeClr>
                     </a:solidFill>
                   </a:tcPr>
                 </a:tc>
@@ -5426,7 +5490,7 @@
                     <a:p>
                       <a:pPr algn="l" fontAlgn="t"/>
                       <a:r>
-                        <a:rPr lang="en-US" sz="1050" b="0" i="0" u="none" strike="noStrike" smtClean="0">
+                        <a:rPr lang="en-US" sz="1050" b="0" i="0" u="none" strike="noStrike">
                           <a:solidFill>
                             <a:srgbClr val="002060"/>
                           </a:solidFill>
@@ -5492,14 +5556,21 @@
                     </a:solidFill>
                   </a:tcPr>
                 </a:tc>
+                <a:extLst>
+                  <a:ext uri="{0D108BD9-81ED-4DB2-BD59-A6C34878D82A}">
+                    <a16:rowId xmlns:a16="http://schemas.microsoft.com/office/drawing/2014/main" val="1611437538"/>
+                  </a:ext>
+                </a:extLst>
+              </a:tr>
+              <a:tr h="307601">
                 <a:tc>
                   <a:txBody>
                     <a:bodyPr/>
                     <a:lstStyle/>
                     <a:p>
-                      <a:pPr algn="l" fontAlgn="t"/>
+                      <a:pPr algn="ctr" fontAlgn="t"/>
                       <a:r>
-                        <a:rPr lang="en-US" sz="1050" b="0" i="0" u="none" strike="noStrike" smtClean="0">
+                        <a:rPr lang="en-US" sz="1050" b="0" i="0" u="none" strike="noStrike">
                           <a:solidFill>
                             <a:srgbClr val="002060"/>
                           </a:solidFill>
@@ -5559,27 +5630,18 @@
                       <a:tailEnd type="none" w="med" len="med"/>
                     </a:lnB>
                     <a:solidFill>
-                      <a:schemeClr val="bg1">
-                        <a:lumMod val="75000"/>
-                      </a:schemeClr>
+                      <a:srgbClr val="BFBFBF"/>
                     </a:solidFill>
                   </a:tcPr>
                 </a:tc>
-                <a:extLst>
-                  <a:ext uri="{0D108BD9-81ED-4DB2-BD59-A6C34878D82A}">
-                    <a16:rowId xmlns:a16="http://schemas.microsoft.com/office/drawing/2014/main" val="1611437538"/>
-                  </a:ext>
-                </a:extLst>
-              </a:tr>
-              <a:tr h="315925">
                 <a:tc>
                   <a:txBody>
                     <a:bodyPr/>
                     <a:lstStyle/>
                     <a:p>
-                      <a:pPr algn="ctr" fontAlgn="t"/>
+                      <a:pPr algn="l" fontAlgn="t"/>
                       <a:r>
-                        <a:rPr lang="en-US" sz="1050" b="0" i="0" u="none" strike="noStrike" smtClean="0">
+                        <a:rPr lang="en-US" sz="1050" b="0" i="0" u="none" strike="noStrike">
                           <a:solidFill>
                             <a:srgbClr val="002060"/>
                           </a:solidFill>
@@ -5639,7 +5701,9 @@
                       <a:tailEnd type="none" w="med" len="med"/>
                     </a:lnB>
                     <a:solidFill>
-                      <a:srgbClr val="BFBFBF"/>
+                      <a:schemeClr val="bg1">
+                        <a:lumMod val="75000"/>
+                      </a:schemeClr>
                     </a:solidFill>
                   </a:tcPr>
                 </a:tc>
@@ -5650,7 +5714,7 @@
                     <a:p>
                       <a:pPr algn="l" fontAlgn="t"/>
                       <a:r>
-                        <a:rPr lang="en-US" sz="1050" b="0" i="0" u="none" strike="noStrike" smtClean="0">
+                        <a:rPr lang="en-US" sz="1050" b="0" i="0" u="none" strike="noStrike">
                           <a:solidFill>
                             <a:srgbClr val="002060"/>
                           </a:solidFill>
@@ -5716,14 +5780,21 @@
                     </a:solidFill>
                   </a:tcPr>
                 </a:tc>
+                <a:extLst>
+                  <a:ext uri="{0D108BD9-81ED-4DB2-BD59-A6C34878D82A}">
+                    <a16:rowId xmlns:a16="http://schemas.microsoft.com/office/drawing/2014/main" val="1065222353"/>
+                  </a:ext>
+                </a:extLst>
+              </a:tr>
+              <a:tr h="307601">
                 <a:tc>
                   <a:txBody>
                     <a:bodyPr/>
                     <a:lstStyle/>
                     <a:p>
-                      <a:pPr algn="l" fontAlgn="t"/>
+                      <a:pPr algn="ctr" fontAlgn="t"/>
                       <a:r>
-                        <a:rPr lang="en-US" sz="1050" b="0" i="0" u="none" strike="noStrike" smtClean="0">
+                        <a:rPr lang="en-US" sz="1050" b="0" i="0" u="none" strike="noStrike">
                           <a:solidFill>
                             <a:srgbClr val="002060"/>
                           </a:solidFill>
@@ -5783,27 +5854,18 @@
                       <a:tailEnd type="none" w="med" len="med"/>
                     </a:lnB>
                     <a:solidFill>
-                      <a:schemeClr val="bg1">
-                        <a:lumMod val="75000"/>
-                      </a:schemeClr>
+                      <a:srgbClr val="BFBFBF"/>
                     </a:solidFill>
                   </a:tcPr>
                 </a:tc>
-                <a:extLst>
-                  <a:ext uri="{0D108BD9-81ED-4DB2-BD59-A6C34878D82A}">
-                    <a16:rowId xmlns:a16="http://schemas.microsoft.com/office/drawing/2014/main" val="1065222353"/>
-                  </a:ext>
-                </a:extLst>
-              </a:tr>
-              <a:tr h="315925">
                 <a:tc>
                   <a:txBody>
                     <a:bodyPr/>
                     <a:lstStyle/>
                     <a:p>
-                      <a:pPr algn="ctr" fontAlgn="t"/>
+                      <a:pPr algn="l" fontAlgn="t"/>
                       <a:r>
-                        <a:rPr lang="en-US" sz="1050" b="0" i="0" u="none" strike="noStrike" smtClean="0">
+                        <a:rPr lang="en-US" sz="1050" b="0" i="0" u="none" strike="noStrike">
                           <a:solidFill>
                             <a:srgbClr val="002060"/>
                           </a:solidFill>
@@ -5863,7 +5925,9 @@
                       <a:tailEnd type="none" w="med" len="med"/>
                     </a:lnB>
                     <a:solidFill>
-                      <a:srgbClr val="BFBFBF"/>
+                      <a:schemeClr val="bg1">
+                        <a:lumMod val="75000"/>
+                      </a:schemeClr>
                     </a:solidFill>
                   </a:tcPr>
                 </a:tc>
@@ -5874,7 +5938,7 @@
                     <a:p>
                       <a:pPr algn="l" fontAlgn="t"/>
                       <a:r>
-                        <a:rPr lang="en-US" sz="1050" b="0" i="0" u="none" strike="noStrike" smtClean="0">
+                        <a:rPr lang="en-US" sz="1050" b="0" i="0" u="none" strike="noStrike">
                           <a:solidFill>
                             <a:srgbClr val="002060"/>
                           </a:solidFill>
@@ -5940,14 +6004,21 @@
                     </a:solidFill>
                   </a:tcPr>
                 </a:tc>
+                <a:extLst>
+                  <a:ext uri="{0D108BD9-81ED-4DB2-BD59-A6C34878D82A}">
+                    <a16:rowId xmlns:a16="http://schemas.microsoft.com/office/drawing/2014/main" val="1330056730"/>
+                  </a:ext>
+                </a:extLst>
+              </a:tr>
+              <a:tr h="307601">
                 <a:tc>
                   <a:txBody>
                     <a:bodyPr/>
                     <a:lstStyle/>
                     <a:p>
-                      <a:pPr algn="l" fontAlgn="t"/>
+                      <a:pPr algn="ctr" fontAlgn="t"/>
                       <a:r>
-                        <a:rPr lang="en-US" sz="1050" b="0" i="0" u="none" strike="noStrike" smtClean="0">
+                        <a:rPr lang="en-US" sz="1050" b="0" i="0" u="none" strike="noStrike">
                           <a:solidFill>
                             <a:srgbClr val="002060"/>
                           </a:solidFill>
@@ -6007,27 +6078,18 @@
                       <a:tailEnd type="none" w="med" len="med"/>
                     </a:lnB>
                     <a:solidFill>
-                      <a:schemeClr val="bg1">
-                        <a:lumMod val="75000"/>
-                      </a:schemeClr>
+                      <a:srgbClr val="BFBFBF"/>
                     </a:solidFill>
                   </a:tcPr>
                 </a:tc>
-                <a:extLst>
-                  <a:ext uri="{0D108BD9-81ED-4DB2-BD59-A6C34878D82A}">
-                    <a16:rowId xmlns:a16="http://schemas.microsoft.com/office/drawing/2014/main" val="1330056730"/>
-                  </a:ext>
-                </a:extLst>
-              </a:tr>
-              <a:tr h="315925">
                 <a:tc>
                   <a:txBody>
                     <a:bodyPr/>
                     <a:lstStyle/>
                     <a:p>
-                      <a:pPr algn="ctr" fontAlgn="t"/>
+                      <a:pPr algn="l" fontAlgn="t"/>
                       <a:r>
-                        <a:rPr lang="en-US" sz="1050" b="0" i="0" u="none" strike="noStrike" smtClean="0">
+                        <a:rPr lang="en-US" sz="1050" b="0" i="0" u="none" strike="noStrike">
                           <a:solidFill>
                             <a:srgbClr val="002060"/>
                           </a:solidFill>
@@ -6087,7 +6149,9 @@
                       <a:tailEnd type="none" w="med" len="med"/>
                     </a:lnB>
                     <a:solidFill>
-                      <a:srgbClr val="BFBFBF"/>
+                      <a:schemeClr val="bg1">
+                        <a:lumMod val="75000"/>
+                      </a:schemeClr>
                     </a:solidFill>
                   </a:tcPr>
                 </a:tc>
@@ -6098,7 +6162,7 @@
                     <a:p>
                       <a:pPr algn="l" fontAlgn="t"/>
                       <a:r>
-                        <a:rPr lang="en-US" sz="1050" b="0" i="0" u="none" strike="noStrike" smtClean="0">
+                        <a:rPr lang="en-US" sz="1050" b="0" i="0" u="none" strike="noStrike">
                           <a:solidFill>
                             <a:srgbClr val="002060"/>
                           </a:solidFill>
@@ -6164,14 +6228,21 @@
                     </a:solidFill>
                   </a:tcPr>
                 </a:tc>
+                <a:extLst>
+                  <a:ext uri="{0D108BD9-81ED-4DB2-BD59-A6C34878D82A}">
+                    <a16:rowId xmlns:a16="http://schemas.microsoft.com/office/drawing/2014/main" val="3510482637"/>
+                  </a:ext>
+                </a:extLst>
+              </a:tr>
+              <a:tr h="307601">
                 <a:tc>
                   <a:txBody>
                     <a:bodyPr/>
                     <a:lstStyle/>
                     <a:p>
-                      <a:pPr algn="l" fontAlgn="t"/>
+                      <a:pPr algn="ctr" fontAlgn="t"/>
                       <a:r>
-                        <a:rPr lang="en-US" sz="1050" b="0" i="0" u="none" strike="noStrike" smtClean="0">
+                        <a:rPr lang="en-US" sz="1050" b="0" i="0" u="none" strike="noStrike">
                           <a:solidFill>
                             <a:srgbClr val="002060"/>
                           </a:solidFill>
@@ -6231,27 +6302,18 @@
                       <a:tailEnd type="none" w="med" len="med"/>
                     </a:lnB>
                     <a:solidFill>
-                      <a:schemeClr val="bg1">
-                        <a:lumMod val="75000"/>
-                      </a:schemeClr>
+                      <a:srgbClr val="BFBFBF"/>
                     </a:solidFill>
                   </a:tcPr>
                 </a:tc>
-                <a:extLst>
-                  <a:ext uri="{0D108BD9-81ED-4DB2-BD59-A6C34878D82A}">
-                    <a16:rowId xmlns:a16="http://schemas.microsoft.com/office/drawing/2014/main" val="3510482637"/>
-                  </a:ext>
-                </a:extLst>
-              </a:tr>
-              <a:tr h="315925">
                 <a:tc>
                   <a:txBody>
                     <a:bodyPr/>
                     <a:lstStyle/>
                     <a:p>
-                      <a:pPr algn="ctr" fontAlgn="t"/>
+                      <a:pPr algn="l" fontAlgn="t"/>
                       <a:r>
-                        <a:rPr lang="en-US" sz="1050" b="0" i="0" u="none" strike="noStrike" smtClean="0">
+                        <a:rPr lang="en-US" sz="1050" b="0" i="0" u="none" strike="noStrike">
                           <a:solidFill>
                             <a:srgbClr val="002060"/>
                           </a:solidFill>
@@ -6311,7 +6373,9 @@
                       <a:tailEnd type="none" w="med" len="med"/>
                     </a:lnB>
                     <a:solidFill>
-                      <a:srgbClr val="BFBFBF"/>
+                      <a:schemeClr val="bg1">
+                        <a:lumMod val="75000"/>
+                      </a:schemeClr>
                     </a:solidFill>
                   </a:tcPr>
                 </a:tc>
@@ -6322,7 +6386,7 @@
                     <a:p>
                       <a:pPr algn="l" fontAlgn="t"/>
                       <a:r>
-                        <a:rPr lang="en-US" sz="1050" b="0" i="0" u="none" strike="noStrike" smtClean="0">
+                        <a:rPr lang="en-US" sz="1050" b="0" i="0" u="none" strike="noStrike">
                           <a:solidFill>
                             <a:srgbClr val="002060"/>
                           </a:solidFill>
@@ -6388,14 +6452,21 @@
                     </a:solidFill>
                   </a:tcPr>
                 </a:tc>
+                <a:extLst>
+                  <a:ext uri="{0D108BD9-81ED-4DB2-BD59-A6C34878D82A}">
+                    <a16:rowId xmlns:a16="http://schemas.microsoft.com/office/drawing/2014/main" val="566103554"/>
+                  </a:ext>
+                </a:extLst>
+              </a:tr>
+              <a:tr h="307601">
                 <a:tc>
                   <a:txBody>
                     <a:bodyPr/>
                     <a:lstStyle/>
                     <a:p>
-                      <a:pPr algn="l" fontAlgn="t"/>
+                      <a:pPr algn="ctr" fontAlgn="t"/>
                       <a:r>
-                        <a:rPr lang="en-US" sz="1050" b="0" i="0" u="none" strike="noStrike" smtClean="0">
+                        <a:rPr lang="en-US" sz="1050" b="0" i="0" u="none" strike="noStrike">
                           <a:solidFill>
                             <a:srgbClr val="002060"/>
                           </a:solidFill>
@@ -6455,27 +6526,18 @@
                       <a:tailEnd type="none" w="med" len="med"/>
                     </a:lnB>
                     <a:solidFill>
-                      <a:schemeClr val="bg1">
-                        <a:lumMod val="75000"/>
-                      </a:schemeClr>
+                      <a:srgbClr val="BFBFBF"/>
                     </a:solidFill>
                   </a:tcPr>
                 </a:tc>
-                <a:extLst>
-                  <a:ext uri="{0D108BD9-81ED-4DB2-BD59-A6C34878D82A}">
-                    <a16:rowId xmlns:a16="http://schemas.microsoft.com/office/drawing/2014/main" val="566103554"/>
-                  </a:ext>
-                </a:extLst>
-              </a:tr>
-              <a:tr h="315925">
                 <a:tc>
                   <a:txBody>
                     <a:bodyPr/>
                     <a:lstStyle/>
                     <a:p>
-                      <a:pPr algn="ctr" fontAlgn="t"/>
+                      <a:pPr algn="l" fontAlgn="t"/>
                       <a:r>
-                        <a:rPr lang="en-US" sz="1050" b="0" i="0" u="none" strike="noStrike" smtClean="0">
+                        <a:rPr lang="en-US" sz="1050" b="0" i="0" u="none" strike="noStrike">
                           <a:solidFill>
                             <a:srgbClr val="002060"/>
                           </a:solidFill>
@@ -6535,7 +6597,9 @@
                       <a:tailEnd type="none" w="med" len="med"/>
                     </a:lnB>
                     <a:solidFill>
-                      <a:srgbClr val="BFBFBF"/>
+                      <a:schemeClr val="bg1">
+                        <a:lumMod val="75000"/>
+                      </a:schemeClr>
                     </a:solidFill>
                   </a:tcPr>
                 </a:tc>
@@ -6546,7 +6610,7 @@
                     <a:p>
                       <a:pPr algn="l" fontAlgn="t"/>
                       <a:r>
-                        <a:rPr lang="en-US" sz="1050" b="0" i="0" u="none" strike="noStrike" smtClean="0">
+                        <a:rPr lang="en-US" sz="1050" b="0" i="0" u="none" strike="noStrike">
                           <a:solidFill>
                             <a:srgbClr val="002060"/>
                           </a:solidFill>
@@ -6612,14 +6676,21 @@
                     </a:solidFill>
                   </a:tcPr>
                 </a:tc>
+                <a:extLst>
+                  <a:ext uri="{0D108BD9-81ED-4DB2-BD59-A6C34878D82A}">
+                    <a16:rowId xmlns:a16="http://schemas.microsoft.com/office/drawing/2014/main" val="4096294230"/>
+                  </a:ext>
+                </a:extLst>
+              </a:tr>
+              <a:tr h="307601">
                 <a:tc>
                   <a:txBody>
                     <a:bodyPr/>
                     <a:lstStyle/>
                     <a:p>
-                      <a:pPr algn="l" fontAlgn="t"/>
+                      <a:pPr algn="ctr" fontAlgn="t"/>
                       <a:r>
-                        <a:rPr lang="en-US" sz="1050" b="0" i="0" u="none" strike="noStrike" smtClean="0">
+                        <a:rPr lang="en-US" sz="1050" b="0" i="0" u="none" strike="noStrike">
                           <a:solidFill>
                             <a:srgbClr val="002060"/>
                           </a:solidFill>
@@ -6679,27 +6750,18 @@
                       <a:tailEnd type="none" w="med" len="med"/>
                     </a:lnB>
                     <a:solidFill>
-                      <a:schemeClr val="bg1">
-                        <a:lumMod val="75000"/>
-                      </a:schemeClr>
+                      <a:srgbClr val="BFBFBF"/>
                     </a:solidFill>
                   </a:tcPr>
                 </a:tc>
-                <a:extLst>
-                  <a:ext uri="{0D108BD9-81ED-4DB2-BD59-A6C34878D82A}">
-                    <a16:rowId xmlns:a16="http://schemas.microsoft.com/office/drawing/2014/main" val="4096294230"/>
-                  </a:ext>
-                </a:extLst>
-              </a:tr>
-              <a:tr h="315925">
                 <a:tc>
                   <a:txBody>
                     <a:bodyPr/>
                     <a:lstStyle/>
                     <a:p>
-                      <a:pPr algn="ctr" fontAlgn="t"/>
+                      <a:pPr algn="l" fontAlgn="t"/>
                       <a:r>
-                        <a:rPr lang="en-US" sz="1050" b="0" i="0" u="none" strike="noStrike" smtClean="0">
+                        <a:rPr lang="en-US" sz="1050" b="0" i="0" u="none" strike="noStrike">
                           <a:solidFill>
                             <a:srgbClr val="002060"/>
                           </a:solidFill>
@@ -6759,7 +6821,9 @@
                       <a:tailEnd type="none" w="med" len="med"/>
                     </a:lnB>
                     <a:solidFill>
-                      <a:srgbClr val="BFBFBF"/>
+                      <a:schemeClr val="bg1">
+                        <a:lumMod val="75000"/>
+                      </a:schemeClr>
                     </a:solidFill>
                   </a:tcPr>
                 </a:tc>
@@ -6770,7 +6834,7 @@
                     <a:p>
                       <a:pPr algn="l" fontAlgn="t"/>
                       <a:r>
-                        <a:rPr lang="en-US" sz="1050" b="0" i="0" u="none" strike="noStrike" smtClean="0">
+                        <a:rPr lang="en-US" sz="1050" b="0" i="0" u="none" strike="noStrike">
                           <a:solidFill>
                             <a:srgbClr val="002060"/>
                           </a:solidFill>
@@ -6836,14 +6900,21 @@
                     </a:solidFill>
                   </a:tcPr>
                 </a:tc>
+                <a:extLst>
+                  <a:ext uri="{0D108BD9-81ED-4DB2-BD59-A6C34878D82A}">
+                    <a16:rowId xmlns:a16="http://schemas.microsoft.com/office/drawing/2014/main" val="1898297411"/>
+                  </a:ext>
+                </a:extLst>
+              </a:tr>
+              <a:tr h="307601">
                 <a:tc>
                   <a:txBody>
                     <a:bodyPr/>
                     <a:lstStyle/>
                     <a:p>
-                      <a:pPr algn="l" fontAlgn="t"/>
+                      <a:pPr algn="ctr" fontAlgn="t"/>
                       <a:r>
-                        <a:rPr lang="en-US" sz="1050" b="0" i="0" u="none" strike="noStrike" smtClean="0">
+                        <a:rPr lang="en-US" sz="1050" b="0" i="0" u="none" strike="noStrike">
                           <a:solidFill>
                             <a:srgbClr val="002060"/>
                           </a:solidFill>
@@ -6903,27 +6974,18 @@
                       <a:tailEnd type="none" w="med" len="med"/>
                     </a:lnB>
                     <a:solidFill>
-                      <a:schemeClr val="bg1">
-                        <a:lumMod val="75000"/>
-                      </a:schemeClr>
+                      <a:srgbClr val="BFBFBF"/>
                     </a:solidFill>
                   </a:tcPr>
                 </a:tc>
-                <a:extLst>
-                  <a:ext uri="{0D108BD9-81ED-4DB2-BD59-A6C34878D82A}">
-                    <a16:rowId xmlns:a16="http://schemas.microsoft.com/office/drawing/2014/main" val="1898297411"/>
-                  </a:ext>
-                </a:extLst>
-              </a:tr>
-              <a:tr h="315925">
                 <a:tc>
                   <a:txBody>
                     <a:bodyPr/>
                     <a:lstStyle/>
                     <a:p>
-                      <a:pPr algn="ctr" fontAlgn="t"/>
+                      <a:pPr algn="l" fontAlgn="t"/>
                       <a:r>
-                        <a:rPr lang="en-US" sz="1050" b="0" i="0" u="none" strike="noStrike" smtClean="0">
+                        <a:rPr lang="en-US" sz="1050" b="0" i="0" u="none" strike="noStrike">
                           <a:solidFill>
                             <a:srgbClr val="002060"/>
                           </a:solidFill>
@@ -6983,7 +7045,9 @@
                       <a:tailEnd type="none" w="med" len="med"/>
                     </a:lnB>
                     <a:solidFill>
-                      <a:srgbClr val="BFBFBF"/>
+                      <a:schemeClr val="bg1">
+                        <a:lumMod val="75000"/>
+                      </a:schemeClr>
                     </a:solidFill>
                   </a:tcPr>
                 </a:tc>
@@ -6994,7 +7058,7 @@
                     <a:p>
                       <a:pPr algn="l" fontAlgn="t"/>
                       <a:r>
-                        <a:rPr lang="en-US" sz="1050" b="0" i="0" u="none" strike="noStrike" smtClean="0">
+                        <a:rPr lang="en-US" sz="1050" b="0" i="0" u="none" strike="noStrike">
                           <a:solidFill>
                             <a:srgbClr val="002060"/>
                           </a:solidFill>
@@ -7060,14 +7124,21 @@
                     </a:solidFill>
                   </a:tcPr>
                 </a:tc>
+                <a:extLst>
+                  <a:ext uri="{0D108BD9-81ED-4DB2-BD59-A6C34878D82A}">
+                    <a16:rowId xmlns:a16="http://schemas.microsoft.com/office/drawing/2014/main" val="3232045996"/>
+                  </a:ext>
+                </a:extLst>
+              </a:tr>
+              <a:tr h="307601">
                 <a:tc>
                   <a:txBody>
                     <a:bodyPr/>
                     <a:lstStyle/>
                     <a:p>
-                      <a:pPr algn="l" fontAlgn="t"/>
+                      <a:pPr algn="ctr" fontAlgn="t"/>
                       <a:r>
-                        <a:rPr lang="en-US" sz="1050" b="0" i="0" u="none" strike="noStrike" smtClean="0">
+                        <a:rPr lang="en-US" sz="1050" b="0" i="0" u="none" strike="noStrike">
                           <a:solidFill>
                             <a:srgbClr val="002060"/>
                           </a:solidFill>
@@ -7127,27 +7198,18 @@
                       <a:tailEnd type="none" w="med" len="med"/>
                     </a:lnB>
                     <a:solidFill>
-                      <a:schemeClr val="bg1">
-                        <a:lumMod val="75000"/>
-                      </a:schemeClr>
+                      <a:srgbClr val="BFBFBF"/>
                     </a:solidFill>
                   </a:tcPr>
                 </a:tc>
-                <a:extLst>
-                  <a:ext uri="{0D108BD9-81ED-4DB2-BD59-A6C34878D82A}">
-                    <a16:rowId xmlns:a16="http://schemas.microsoft.com/office/drawing/2014/main" val="3232045996"/>
-                  </a:ext>
-                </a:extLst>
-              </a:tr>
-              <a:tr h="315925">
                 <a:tc>
                   <a:txBody>
                     <a:bodyPr/>
                     <a:lstStyle/>
                     <a:p>
-                      <a:pPr algn="ctr" fontAlgn="t"/>
+                      <a:pPr algn="l" fontAlgn="t"/>
                       <a:r>
-                        <a:rPr lang="en-US" sz="1050" b="0" i="0" u="none" strike="noStrike" smtClean="0">
+                        <a:rPr lang="en-US" sz="1050" b="0" i="0" u="none" strike="noStrike">
                           <a:solidFill>
                             <a:srgbClr val="002060"/>
                           </a:solidFill>
@@ -7207,7 +7269,9 @@
                       <a:tailEnd type="none" w="med" len="med"/>
                     </a:lnB>
                     <a:solidFill>
-                      <a:srgbClr val="BFBFBF"/>
+                      <a:schemeClr val="bg1">
+                        <a:lumMod val="75000"/>
+                      </a:schemeClr>
                     </a:solidFill>
                   </a:tcPr>
                 </a:tc>
@@ -7218,7 +7282,7 @@
                     <a:p>
                       <a:pPr algn="l" fontAlgn="t"/>
                       <a:r>
-                        <a:rPr lang="en-US" sz="1050" b="0" i="0" u="none" strike="noStrike" smtClean="0">
+                        <a:rPr lang="en-US" sz="1050" b="0" i="0" u="none" strike="noStrike">
                           <a:solidFill>
                             <a:srgbClr val="002060"/>
                           </a:solidFill>
@@ -7284,14 +7348,21 @@
                     </a:solidFill>
                   </a:tcPr>
                 </a:tc>
+                <a:extLst>
+                  <a:ext uri="{0D108BD9-81ED-4DB2-BD59-A6C34878D82A}">
+                    <a16:rowId xmlns:a16="http://schemas.microsoft.com/office/drawing/2014/main" val="1465442826"/>
+                  </a:ext>
+                </a:extLst>
+              </a:tr>
+              <a:tr h="307601">
                 <a:tc>
                   <a:txBody>
                     <a:bodyPr/>
                     <a:lstStyle/>
                     <a:p>
-                      <a:pPr algn="l" fontAlgn="t"/>
+                      <a:pPr algn="ctr" fontAlgn="t"/>
                       <a:r>
-                        <a:rPr lang="en-US" sz="1050" b="0" i="0" u="none" strike="noStrike" smtClean="0">
+                        <a:rPr lang="en-US" sz="1050" b="0" i="0" u="none" strike="noStrike">
                           <a:solidFill>
                             <a:srgbClr val="002060"/>
                           </a:solidFill>
@@ -7351,27 +7422,18 @@
                       <a:tailEnd type="none" w="med" len="med"/>
                     </a:lnB>
                     <a:solidFill>
-                      <a:schemeClr val="bg1">
-                        <a:lumMod val="75000"/>
-                      </a:schemeClr>
+                      <a:srgbClr val="BFBFBF"/>
                     </a:solidFill>
                   </a:tcPr>
                 </a:tc>
-                <a:extLst>
-                  <a:ext uri="{0D108BD9-81ED-4DB2-BD59-A6C34878D82A}">
-                    <a16:rowId xmlns:a16="http://schemas.microsoft.com/office/drawing/2014/main" val="1465442826"/>
-                  </a:ext>
-                </a:extLst>
-              </a:tr>
-              <a:tr h="315925">
                 <a:tc>
                   <a:txBody>
                     <a:bodyPr/>
                     <a:lstStyle/>
                     <a:p>
-                      <a:pPr algn="ctr" fontAlgn="t"/>
+                      <a:pPr algn="l" fontAlgn="t"/>
                       <a:r>
-                        <a:rPr lang="en-US" sz="1050" b="0" i="0" u="none" strike="noStrike" smtClean="0">
+                        <a:rPr lang="en-US" sz="1050" b="0" i="0" u="none" strike="noStrike">
                           <a:solidFill>
                             <a:srgbClr val="002060"/>
                           </a:solidFill>
@@ -7431,7 +7493,9 @@
                       <a:tailEnd type="none" w="med" len="med"/>
                     </a:lnB>
                     <a:solidFill>
-                      <a:srgbClr val="BFBFBF"/>
+                      <a:schemeClr val="bg1">
+                        <a:lumMod val="75000"/>
+                      </a:schemeClr>
                     </a:solidFill>
                   </a:tcPr>
                 </a:tc>
@@ -7442,7 +7506,7 @@
                     <a:p>
                       <a:pPr algn="l" fontAlgn="t"/>
                       <a:r>
-                        <a:rPr lang="en-US" sz="1050" b="0" i="0" u="none" strike="noStrike" smtClean="0">
+                        <a:rPr lang="en-US" sz="1050" b="0" i="0" u="none" strike="noStrike">
                           <a:solidFill>
                             <a:srgbClr val="002060"/>
                           </a:solidFill>
@@ -7508,14 +7572,21 @@
                     </a:solidFill>
                   </a:tcPr>
                 </a:tc>
+                <a:extLst>
+                  <a:ext uri="{0D108BD9-81ED-4DB2-BD59-A6C34878D82A}">
+                    <a16:rowId xmlns:a16="http://schemas.microsoft.com/office/drawing/2014/main" val="2238057213"/>
+                  </a:ext>
+                </a:extLst>
+              </a:tr>
+              <a:tr h="307601">
                 <a:tc>
                   <a:txBody>
                     <a:bodyPr/>
                     <a:lstStyle/>
                     <a:p>
-                      <a:pPr algn="l" fontAlgn="t"/>
+                      <a:pPr algn="ctr" fontAlgn="t"/>
                       <a:r>
-                        <a:rPr lang="en-US" sz="1050" b="0" i="0" u="none" strike="noStrike" smtClean="0">
+                        <a:rPr lang="en-US" sz="1050" b="0" i="0" u="none" strike="noStrike">
                           <a:solidFill>
                             <a:srgbClr val="002060"/>
                           </a:solidFill>
@@ -7575,27 +7646,18 @@
                       <a:tailEnd type="none" w="med" len="med"/>
                     </a:lnB>
                     <a:solidFill>
-                      <a:schemeClr val="bg1">
-                        <a:lumMod val="75000"/>
-                      </a:schemeClr>
+                      <a:srgbClr val="BFBFBF"/>
                     </a:solidFill>
                   </a:tcPr>
                 </a:tc>
-                <a:extLst>
-                  <a:ext uri="{0D108BD9-81ED-4DB2-BD59-A6C34878D82A}">
-                    <a16:rowId xmlns:a16="http://schemas.microsoft.com/office/drawing/2014/main" val="2238057213"/>
-                  </a:ext>
-                </a:extLst>
-              </a:tr>
-              <a:tr h="315925">
                 <a:tc>
                   <a:txBody>
                     <a:bodyPr/>
                     <a:lstStyle/>
                     <a:p>
-                      <a:pPr algn="ctr" fontAlgn="t"/>
+                      <a:pPr algn="l" fontAlgn="t"/>
                       <a:r>
-                        <a:rPr lang="en-US" sz="1050" b="0" i="0" u="none" strike="noStrike" smtClean="0">
+                        <a:rPr lang="en-US" sz="1050" b="0" i="0" u="none" strike="noStrike">
                           <a:solidFill>
                             <a:srgbClr val="002060"/>
                           </a:solidFill>
@@ -7655,77 +7717,6 @@
                       <a:tailEnd type="none" w="med" len="med"/>
                     </a:lnB>
                     <a:solidFill>
-                      <a:srgbClr val="BFBFBF"/>
-                    </a:solidFill>
-                  </a:tcPr>
-                </a:tc>
-                <a:tc>
-                  <a:txBody>
-                    <a:bodyPr/>
-                    <a:lstStyle/>
-                    <a:p>
-                      <a:pPr algn="l" fontAlgn="t"/>
-                      <a:r>
-                        <a:rPr lang="en-US" sz="1050" b="0" i="0" u="none" strike="noStrike" smtClean="0">
-                          <a:solidFill>
-                            <a:srgbClr val="002060"/>
-                          </a:solidFill>
-                          <a:effectLst/>
-                          <a:latin typeface="Intel Clear" panose="020B0604020203020204" pitchFamily="34" charset="0"/>
-                          <a:ea typeface="Intel Clear" panose="020B0604020203020204" pitchFamily="34" charset="0"/>
-                          <a:cs typeface="Intel Clear" panose="020B0604020203020204" pitchFamily="34" charset="0"/>
-                        </a:rPr>
-                        <a:t> </a:t>
-                      </a:r>
-                      <a:endParaRPr lang="en-US" sz="1050" b="0" i="0" u="none" strike="noStrike" dirty="0">
-                        <a:solidFill>
-                          <a:srgbClr val="002060"/>
-                        </a:solidFill>
-                        <a:effectLst/>
-                        <a:latin typeface="Intel Clear" panose="020B0604020203020204" pitchFamily="34" charset="0"/>
-                        <a:ea typeface="Intel Clear" panose="020B0604020203020204" pitchFamily="34" charset="0"/>
-                        <a:cs typeface="Intel Clear" panose="020B0604020203020204" pitchFamily="34" charset="0"/>
-                      </a:endParaRPr>
-                    </a:p>
-                  </a:txBody>
-                  <a:tcPr marL="45720" marR="45720" marT="27432" marB="27432" anchor="ctr">
-                    <a:lnL w="19050" cap="flat" cmpd="sng" algn="ctr">
-                      <a:solidFill>
-                        <a:srgbClr val="002060"/>
-                      </a:solidFill>
-                      <a:prstDash val="solid"/>
-                      <a:round/>
-                      <a:headEnd type="none" w="med" len="med"/>
-                      <a:tailEnd type="none" w="med" len="med"/>
-                    </a:lnL>
-                    <a:lnR w="19050" cap="flat" cmpd="sng" algn="ctr">
-                      <a:solidFill>
-                        <a:srgbClr val="002060"/>
-                      </a:solidFill>
-                      <a:prstDash val="solid"/>
-                      <a:round/>
-                      <a:headEnd type="none" w="med" len="med"/>
-                      <a:tailEnd type="none" w="med" len="med"/>
-                    </a:lnR>
-                    <a:lnT w="19050" cap="flat" cmpd="sng" algn="ctr">
-                      <a:solidFill>
-                        <a:srgbClr val="002060"/>
-                      </a:solidFill>
-                      <a:prstDash val="solid"/>
-                      <a:round/>
-                      <a:headEnd type="none" w="med" len="med"/>
-                      <a:tailEnd type="none" w="med" len="med"/>
-                    </a:lnT>
-                    <a:lnB w="19050" cap="flat" cmpd="sng" algn="ctr">
-                      <a:solidFill>
-                        <a:srgbClr val="002060"/>
-                      </a:solidFill>
-                      <a:prstDash val="solid"/>
-                      <a:round/>
-                      <a:headEnd type="none" w="med" len="med"/>
-                      <a:tailEnd type="none" w="med" len="med"/>
-                    </a:lnB>
-                    <a:solidFill>
                       <a:schemeClr val="bg1">
                         <a:lumMod val="75000"/>
                       </a:schemeClr>
@@ -7739,7 +7730,7 @@
                     <a:p>
                       <a:pPr algn="l" fontAlgn="t"/>
                       <a:r>
-                        <a:rPr lang="en-US" sz="1050" b="0" i="0" u="none" strike="noStrike" smtClean="0">
+                        <a:rPr lang="en-US" sz="1050" b="0" i="0" u="none" strike="noStrike" dirty="0">
                           <a:solidFill>
                             <a:srgbClr val="002060"/>
                           </a:solidFill>
@@ -7750,15 +7741,6 @@
                         </a:rPr>
                         <a:t> </a:t>
                       </a:r>
-                      <a:endParaRPr lang="en-US" sz="1050" b="0" i="0" u="none" strike="noStrike" dirty="0">
-                        <a:solidFill>
-                          <a:srgbClr val="002060"/>
-                        </a:solidFill>
-                        <a:effectLst/>
-                        <a:latin typeface="Intel Clear" panose="020B0604020203020204" pitchFamily="34" charset="0"/>
-                        <a:ea typeface="Intel Clear" panose="020B0604020203020204" pitchFamily="34" charset="0"/>
-                        <a:cs typeface="Intel Clear" panose="020B0604020203020204" pitchFamily="34" charset="0"/>
-                      </a:endParaRPr>
                     </a:p>
                   </a:txBody>
                   <a:tcPr marL="45720" marR="45720" marT="27432" marB="27432" anchor="ctr">
@@ -7830,14 +7812,14 @@
           <p:nvPr>
             <p:extLst>
               <p:ext uri="{D42A27DB-BD31-4B8C-83A1-F6EECF244321}">
-                <p14:modId xmlns:p14="http://schemas.microsoft.com/office/powerpoint/2010/main" val="2520323313"/>
+                <p14:modId xmlns:p14="http://schemas.microsoft.com/office/powerpoint/2010/main" val="1518661632"/>
               </p:ext>
             </p:extLst>
           </p:nvPr>
         </p:nvGraphicFramePr>
         <p:xfrm>
-          <a:off x="146686" y="956636"/>
-          <a:ext cx="6688320" cy="5653170"/>
+          <a:off x="146686" y="1105590"/>
+          <a:ext cx="6688320" cy="5504216"/>
         </p:xfrm>
         <a:graphic>
           <a:graphicData uri="http://schemas.openxmlformats.org/drawingml/2006/table">
@@ -7861,7 +7843,7 @@
                   </a:extLst>
                 </a:gridCol>
               </a:tblGrid>
-              <a:tr h="266351">
+              <a:tr h="259333">
                 <a:tc gridSpan="2">
                   <a:txBody>
                     <a:bodyPr/>
@@ -7913,7 +7895,7 @@
                   </a:ext>
                 </a:extLst>
               </a:tr>
-              <a:tr h="919232">
+              <a:tr h="895011">
                 <a:tc gridSpan="2">
                   <a:txBody>
                     <a:bodyPr/>
@@ -7937,7 +7919,7 @@
                         <a:defRPr/>
                       </a:pPr>
                       <a:r>
-                        <a:rPr lang="en-US" sz="1100" u="none" strike="noStrike" kern="1200" smtClean="0">
+                        <a:rPr lang="en-US" sz="1100" u="none" strike="noStrike" kern="1200" dirty="0">
                           <a:solidFill>
                             <a:srgbClr val="002060"/>
                           </a:solidFill>
@@ -7946,7 +7928,67 @@
                           <a:ea typeface="+mn-ea"/>
                           <a:cs typeface="+mn-cs"/>
                         </a:rPr>
-                        <a:t>At vero eos et accusamus</a:t>
+                        <a:t>At </a:t>
+                      </a:r>
+                      <a:r>
+                        <a:rPr lang="en-US" sz="1100" u="none" strike="noStrike" kern="1200" dirty="0" err="1">
+                          <a:solidFill>
+                            <a:srgbClr val="002060"/>
+                          </a:solidFill>
+                          <a:effectLst/>
+                          <a:latin typeface="+mn-lt"/>
+                          <a:ea typeface="+mn-ea"/>
+                          <a:cs typeface="+mn-cs"/>
+                        </a:rPr>
+                        <a:t>vero</a:t>
+                      </a:r>
+                      <a:r>
+                        <a:rPr lang="en-US" sz="1100" u="none" strike="noStrike" kern="1200" dirty="0">
+                          <a:solidFill>
+                            <a:srgbClr val="002060"/>
+                          </a:solidFill>
+                          <a:effectLst/>
+                          <a:latin typeface="+mn-lt"/>
+                          <a:ea typeface="+mn-ea"/>
+                          <a:cs typeface="+mn-cs"/>
+                        </a:rPr>
+                        <a:t> </a:t>
+                      </a:r>
+                      <a:r>
+                        <a:rPr lang="en-US" sz="1100" u="none" strike="noStrike" kern="1200" dirty="0" err="1">
+                          <a:solidFill>
+                            <a:srgbClr val="002060"/>
+                          </a:solidFill>
+                          <a:effectLst/>
+                          <a:latin typeface="+mn-lt"/>
+                          <a:ea typeface="+mn-ea"/>
+                          <a:cs typeface="+mn-cs"/>
+                        </a:rPr>
+                        <a:t>eos</a:t>
+                      </a:r>
+                      <a:r>
+                        <a:rPr lang="en-US" sz="1100" u="none" strike="noStrike" kern="1200" dirty="0">
+                          <a:solidFill>
+                            <a:srgbClr val="002060"/>
+                          </a:solidFill>
+                          <a:effectLst/>
+                          <a:latin typeface="+mn-lt"/>
+                          <a:ea typeface="+mn-ea"/>
+                          <a:cs typeface="+mn-cs"/>
+                        </a:rPr>
+                        <a:t> et </a:t>
+                      </a:r>
+                      <a:r>
+                        <a:rPr lang="en-US" sz="1100" u="none" strike="noStrike" kern="1200" dirty="0" err="1">
+                          <a:solidFill>
+                            <a:srgbClr val="002060"/>
+                          </a:solidFill>
+                          <a:effectLst/>
+                          <a:latin typeface="+mn-lt"/>
+                          <a:ea typeface="+mn-ea"/>
+                          <a:cs typeface="+mn-cs"/>
+                        </a:rPr>
+                        <a:t>accusamus</a:t>
                       </a:r>
                       <a:endParaRPr lang="en-US" sz="1100" u="none" strike="noStrike" kern="1200" dirty="0">
                         <a:solidFill>
@@ -8019,7 +8061,7 @@
                   </a:ext>
                 </a:extLst>
               </a:tr>
-              <a:tr h="255848">
+              <a:tr h="249107">
                 <a:tc gridSpan="2">
                   <a:txBody>
                     <a:bodyPr/>
@@ -8114,7 +8156,7 @@
                   </a:ext>
                 </a:extLst>
               </a:tr>
-              <a:tr h="354376">
+              <a:tr h="345039">
                 <a:tc gridSpan="2">
                   <a:txBody>
                     <a:bodyPr/>
@@ -8138,7 +8180,7 @@
                         <a:defRPr/>
                       </a:pPr>
                       <a:r>
-                        <a:rPr lang="en-US" sz="1100" u="none" strike="noStrike" kern="1200" smtClean="0">
+                        <a:rPr lang="en-US" sz="1100" u="none" strike="noStrike" kern="1200">
                           <a:solidFill>
                             <a:srgbClr val="002060"/>
                           </a:solidFill>
@@ -8220,7 +8262,7 @@
                   </a:ext>
                 </a:extLst>
               </a:tr>
-              <a:tr h="229806">
+              <a:tr h="223751">
                 <a:tc gridSpan="2">
                   <a:txBody>
                     <a:bodyPr/>
@@ -8308,7 +8350,7 @@
                   </a:ext>
                 </a:extLst>
               </a:tr>
-              <a:tr h="706805">
+              <a:tr h="688182">
                 <a:tc gridSpan="2">
                   <a:txBody>
                     <a:bodyPr/>
@@ -8332,7 +8374,7 @@
                         <a:defRPr/>
                       </a:pPr>
                       <a:r>
-                        <a:rPr lang="en-US" sz="1100" u="none" strike="noStrike" kern="1200" smtClean="0">
+                        <a:rPr lang="en-US" sz="1100" u="none" strike="noStrike" kern="1200">
                           <a:solidFill>
                             <a:srgbClr val="002060"/>
                           </a:solidFill>
@@ -8414,7 +8456,7 @@
                   </a:ext>
                 </a:extLst>
               </a:tr>
-              <a:tr h="246688">
+              <a:tr h="240188">
                 <a:tc gridSpan="2">
                   <a:txBody>
                     <a:bodyPr/>
@@ -8493,7 +8535,7 @@
                   </a:ext>
                 </a:extLst>
               </a:tr>
-              <a:tr h="816605">
+              <a:tr h="795088">
                 <a:tc gridSpan="2">
                   <a:txBody>
                     <a:bodyPr/>
@@ -8504,7 +8546,7 @@
                         <a:buChar char="§"/>
                       </a:pPr>
                       <a:r>
-                        <a:rPr lang="en-US" sz="1100" u="none" strike="noStrike" kern="1200" smtClean="0">
+                        <a:rPr lang="en-US" sz="1100" u="none" strike="noStrike" kern="1200">
                           <a:solidFill>
                             <a:srgbClr val="002060"/>
                           </a:solidFill>
@@ -8586,7 +8628,7 @@
                   </a:ext>
                 </a:extLst>
               </a:tr>
-              <a:tr h="242637">
+              <a:tr h="236244">
                 <a:tc>
                   <a:txBody>
                     <a:bodyPr/>
@@ -8603,7 +8645,7 @@
                           <a:ea typeface="+mn-ea"/>
                           <a:cs typeface="+mn-cs"/>
                         </a:rPr>
-                        <a:t>External Owner</a:t>
+                        <a:t>First Owner</a:t>
                       </a:r>
                     </a:p>
                   </a:txBody>
@@ -8656,6 +8698,18 @@
                     <a:p>
                       <a:pPr algn="l" fontAlgn="b"/>
                       <a:r>
+                        <a:rPr lang="en-US" sz="1050" b="1" u="none" strike="noStrike" kern="1200">
+                          <a:solidFill>
+                            <a:schemeClr val="bg1"/>
+                          </a:solidFill>
+                          <a:effectLst/>
+                          <a:latin typeface="+mn-lt"/>
+                          <a:ea typeface="+mn-ea"/>
+                          <a:cs typeface="+mn-cs"/>
+                        </a:rPr>
+                        <a:t>Second </a:t>
+                      </a:r>
+                      <a:r>
                         <a:rPr lang="en-US" sz="1050" b="1" u="none" strike="noStrike" kern="1200" dirty="0">
                           <a:solidFill>
                             <a:schemeClr val="bg1"/>
@@ -8665,7 +8719,7 @@
                           <a:ea typeface="+mn-ea"/>
                           <a:cs typeface="+mn-cs"/>
                         </a:rPr>
-                        <a:t>Internal  Owners</a:t>
+                        <a:t>Owners</a:t>
                       </a:r>
                     </a:p>
                   </a:txBody>
@@ -8717,7 +8771,7 @@
                   </a:ext>
                 </a:extLst>
               </a:tr>
-              <a:tr h="281950">
+              <a:tr h="274521">
                 <a:tc>
                   <a:txBody>
                     <a:bodyPr/>
@@ -8725,7 +8779,7 @@
                     <a:p>
                       <a:pPr algn="l" fontAlgn="t"/>
                       <a:r>
-                        <a:rPr lang="en-US" sz="1100" b="0" i="0" u="none" strike="noStrike" smtClean="0">
+                        <a:rPr lang="en-US" sz="1100" b="0" i="0" u="none" strike="noStrike">
                           <a:solidFill>
                             <a:srgbClr val="002060"/>
                           </a:solidFill>
@@ -8792,7 +8846,7 @@
                     <a:p>
                       <a:pPr algn="l" fontAlgn="t"/>
                       <a:r>
-                        <a:rPr lang="en-US" sz="1050" b="0" i="0" u="none" strike="noStrike" kern="1200" smtClean="0">
+                        <a:rPr lang="en-US" sz="1050" b="0" i="0" u="none" strike="noStrike" kern="1200">
                           <a:solidFill>
                             <a:srgbClr val="002060"/>
                           </a:solidFill>
@@ -8862,7 +8916,7 @@
                   </a:ext>
                 </a:extLst>
               </a:tr>
-              <a:tr h="249492">
+              <a:tr h="242918">
                 <a:tc gridSpan="2">
                   <a:txBody>
                     <a:bodyPr/>
@@ -8966,7 +9020,7 @@
                   </a:ext>
                 </a:extLst>
               </a:tr>
-              <a:tr h="1083380">
+              <a:tr h="1054834">
                 <a:tc gridSpan="2">
                   <a:txBody>
                     <a:bodyPr/>
@@ -8990,7 +9044,7 @@
                         <a:defRPr/>
                       </a:pPr>
                       <a:r>
-                        <a:rPr lang="en-US" sz="1050" u="none" strike="noStrike" kern="1200" smtClean="0">
+                        <a:rPr lang="en-US" sz="1050" u="none" strike="noStrike" kern="1200" dirty="0">
                           <a:solidFill>
                             <a:srgbClr val="002060"/>
                           </a:solidFill>
@@ -8999,7 +9053,67 @@
                           <a:ea typeface="+mn-ea"/>
                           <a:cs typeface="+mn-cs"/>
                         </a:rPr>
-                        <a:t>At vero eos et accusamus</a:t>
+                        <a:t>At </a:t>
+                      </a:r>
+                      <a:r>
+                        <a:rPr lang="en-US" sz="1050" u="none" strike="noStrike" kern="1200" dirty="0" err="1">
+                          <a:solidFill>
+                            <a:srgbClr val="002060"/>
+                          </a:solidFill>
+                          <a:effectLst/>
+                          <a:latin typeface="+mn-lt"/>
+                          <a:ea typeface="+mn-ea"/>
+                          <a:cs typeface="+mn-cs"/>
+                        </a:rPr>
+                        <a:t>vero</a:t>
+                      </a:r>
+                      <a:r>
+                        <a:rPr lang="en-US" sz="1050" u="none" strike="noStrike" kern="1200" dirty="0">
+                          <a:solidFill>
+                            <a:srgbClr val="002060"/>
+                          </a:solidFill>
+                          <a:effectLst/>
+                          <a:latin typeface="+mn-lt"/>
+                          <a:ea typeface="+mn-ea"/>
+                          <a:cs typeface="+mn-cs"/>
+                        </a:rPr>
+                        <a:t> </a:t>
+                      </a:r>
+                      <a:r>
+                        <a:rPr lang="en-US" sz="1050" u="none" strike="noStrike" kern="1200" dirty="0" err="1">
+                          <a:solidFill>
+                            <a:srgbClr val="002060"/>
+                          </a:solidFill>
+                          <a:effectLst/>
+                          <a:latin typeface="+mn-lt"/>
+                          <a:ea typeface="+mn-ea"/>
+                          <a:cs typeface="+mn-cs"/>
+                        </a:rPr>
+                        <a:t>eos</a:t>
+                      </a:r>
+                      <a:r>
+                        <a:rPr lang="en-US" sz="1050" u="none" strike="noStrike" kern="1200" dirty="0">
+                          <a:solidFill>
+                            <a:srgbClr val="002060"/>
+                          </a:solidFill>
+                          <a:effectLst/>
+                          <a:latin typeface="+mn-lt"/>
+                          <a:ea typeface="+mn-ea"/>
+                          <a:cs typeface="+mn-cs"/>
+                        </a:rPr>
+                        <a:t> et </a:t>
+                      </a:r>
+                      <a:r>
+                        <a:rPr lang="en-US" sz="1050" u="none" strike="noStrike" kern="1200" dirty="0" err="1">
+                          <a:solidFill>
+                            <a:srgbClr val="002060"/>
+                          </a:solidFill>
+                          <a:effectLst/>
+                          <a:latin typeface="+mn-lt"/>
+                          <a:ea typeface="+mn-ea"/>
+                          <a:cs typeface="+mn-cs"/>
+                        </a:rPr>
+                        <a:t>accusamus</a:t>
                       </a:r>
                       <a:endParaRPr lang="en-US" sz="1050" u="none" strike="noStrike" kern="1200" dirty="0">
                         <a:solidFill>
@@ -9091,13 +9205,13 @@
           <p:nvPr>
             <p:extLst>
               <p:ext uri="{D42A27DB-BD31-4B8C-83A1-F6EECF244321}">
-                <p14:modId xmlns:p14="http://schemas.microsoft.com/office/powerpoint/2010/main" val="1314582568"/>
+                <p14:modId xmlns:p14="http://schemas.microsoft.com/office/powerpoint/2010/main" val="1567820339"/>
               </p:ext>
             </p:extLst>
           </p:nvPr>
         </p:nvGraphicFramePr>
         <p:xfrm>
-          <a:off x="146686" y="60928"/>
+          <a:off x="146686" y="69241"/>
           <a:ext cx="11945784" cy="792480"/>
         </p:xfrm>
         <a:graphic>
@@ -9534,7 +9648,7 @@
                     <a:p>
                       <a:pPr algn="ctr"/>
                       <a:r>
-                        <a:rPr lang="en-US" sz="1600" b="1">
+                        <a:rPr lang="en-US" sz="1600" b="1" dirty="0">
                           <a:solidFill>
                             <a:schemeClr val="bg1"/>
                           </a:solidFill>
@@ -9675,13 +9789,6 @@
       </p:transition>
     </mc:Fallback>
   </mc:AlternateContent>
-  <p:timing>
-    <p:tnLst>
-      <p:par>
-        <p:cTn id="1" dur="indefinite" restart="never" nodeType="tmRoot"/>
-      </p:par>
-    </p:tnLst>
-  </p:timing>
 </p:sld>
 </file>
 

</xml_diff>

<commit_message>
Edit the Template.pptx file to correct the placeholder text run
</commit_message>
<xml_diff>
--- a/src/main/resources/Template.pptx
+++ b/src/main/resources/Template.pptx
@@ -197,7 +197,7 @@
           <a:p>
             <a:fld id="{159A8166-34DF-470E-9DE3-188AFC0E57D2}" type="datetimeFigureOut">
               <a:rPr lang="en-US" smtClean="0"/>
-              <a:t>10/4/2021</a:t>
+              <a:t>06/10/2021</a:t>
             </a:fld>
             <a:endParaRPr lang="en-US"/>
           </a:p>
@@ -698,7 +698,7 @@
           <a:p>
             <a:fld id="{7B9D1350-BBC3-4784-B299-7C5541BF58C1}" type="datetimeFigureOut">
               <a:rPr lang="en-US" smtClean="0"/>
-              <a:t>10/4/2021</a:t>
+              <a:t>06/10/2021</a:t>
             </a:fld>
             <a:endParaRPr lang="en-US"/>
           </a:p>
@@ -896,7 +896,7 @@
           <a:p>
             <a:fld id="{7B9D1350-BBC3-4784-B299-7C5541BF58C1}" type="datetimeFigureOut">
               <a:rPr lang="en-US" smtClean="0"/>
-              <a:t>10/4/2021</a:t>
+              <a:t>06/10/2021</a:t>
             </a:fld>
             <a:endParaRPr lang="en-US"/>
           </a:p>
@@ -1104,7 +1104,7 @@
           <a:p>
             <a:fld id="{7B9D1350-BBC3-4784-B299-7C5541BF58C1}" type="datetimeFigureOut">
               <a:rPr lang="en-US" smtClean="0"/>
-              <a:t>10/4/2021</a:t>
+              <a:t>06/10/2021</a:t>
             </a:fld>
             <a:endParaRPr lang="en-US"/>
           </a:p>
@@ -1302,7 +1302,7 @@
           <a:p>
             <a:fld id="{7B9D1350-BBC3-4784-B299-7C5541BF58C1}" type="datetimeFigureOut">
               <a:rPr lang="en-US" smtClean="0"/>
-              <a:t>10/4/2021</a:t>
+              <a:t>06/10/2021</a:t>
             </a:fld>
             <a:endParaRPr lang="en-US"/>
           </a:p>
@@ -1577,7 +1577,7 @@
           <a:p>
             <a:fld id="{7B9D1350-BBC3-4784-B299-7C5541BF58C1}" type="datetimeFigureOut">
               <a:rPr lang="en-US" smtClean="0"/>
-              <a:t>10/4/2021</a:t>
+              <a:t>06/10/2021</a:t>
             </a:fld>
             <a:endParaRPr lang="en-US"/>
           </a:p>
@@ -1842,7 +1842,7 @@
           <a:p>
             <a:fld id="{7B9D1350-BBC3-4784-B299-7C5541BF58C1}" type="datetimeFigureOut">
               <a:rPr lang="en-US" smtClean="0"/>
-              <a:t>10/4/2021</a:t>
+              <a:t>06/10/2021</a:t>
             </a:fld>
             <a:endParaRPr lang="en-US"/>
           </a:p>
@@ -2254,7 +2254,7 @@
           <a:p>
             <a:fld id="{7B9D1350-BBC3-4784-B299-7C5541BF58C1}" type="datetimeFigureOut">
               <a:rPr lang="en-US" smtClean="0"/>
-              <a:t>10/4/2021</a:t>
+              <a:t>06/10/2021</a:t>
             </a:fld>
             <a:endParaRPr lang="en-US"/>
           </a:p>
@@ -2395,7 +2395,7 @@
           <a:p>
             <a:fld id="{7B9D1350-BBC3-4784-B299-7C5541BF58C1}" type="datetimeFigureOut">
               <a:rPr lang="en-US" smtClean="0"/>
-              <a:t>10/4/2021</a:t>
+              <a:t>06/10/2021</a:t>
             </a:fld>
             <a:endParaRPr lang="en-US"/>
           </a:p>
@@ -2508,7 +2508,7 @@
           <a:p>
             <a:fld id="{7B9D1350-BBC3-4784-B299-7C5541BF58C1}" type="datetimeFigureOut">
               <a:rPr lang="en-US" smtClean="0"/>
-              <a:t>10/4/2021</a:t>
+              <a:t>06/10/2021</a:t>
             </a:fld>
             <a:endParaRPr lang="en-US"/>
           </a:p>
@@ -2819,7 +2819,7 @@
           <a:p>
             <a:fld id="{7B9D1350-BBC3-4784-B299-7C5541BF58C1}" type="datetimeFigureOut">
               <a:rPr lang="en-US" smtClean="0"/>
-              <a:t>10/4/2021</a:t>
+              <a:t>06/10/2021</a:t>
             </a:fld>
             <a:endParaRPr lang="en-US"/>
           </a:p>
@@ -3107,7 +3107,7 @@
           <a:p>
             <a:fld id="{7B9D1350-BBC3-4784-B299-7C5541BF58C1}" type="datetimeFigureOut">
               <a:rPr lang="en-US" smtClean="0"/>
-              <a:t>10/4/2021</a:t>
+              <a:t>06/10/2021</a:t>
             </a:fld>
             <a:endParaRPr lang="en-US"/>
           </a:p>
@@ -3348,7 +3348,7 @@
           <a:p>
             <a:fld id="{7B9D1350-BBC3-4784-B299-7C5541BF58C1}" type="datetimeFigureOut">
               <a:rPr lang="en-US" smtClean="0"/>
-              <a:t>10/4/2021</a:t>
+              <a:t>06/10/2021</a:t>
             </a:fld>
             <a:endParaRPr lang="en-US"/>
           </a:p>
@@ -7812,7 +7812,7 @@
           <p:nvPr>
             <p:extLst>
               <p:ext uri="{D42A27DB-BD31-4B8C-83A1-F6EECF244321}">
-                <p14:modId xmlns:p14="http://schemas.microsoft.com/office/powerpoint/2010/main" val="1518661632"/>
+                <p14:modId xmlns:p14="http://schemas.microsoft.com/office/powerpoint/2010/main" val="330369664"/>
               </p:ext>
             </p:extLst>
           </p:nvPr>
@@ -7919,7 +7919,7 @@
                         <a:defRPr/>
                       </a:pPr>
                       <a:r>
-                        <a:rPr lang="en-US" sz="1100" u="none" strike="noStrike" kern="1200" dirty="0">
+                        <a:rPr lang="en-US" sz="1100" u="none" strike="noStrike" kern="1200" smtClean="0">
                           <a:solidFill>
                             <a:srgbClr val="002060"/>
                           </a:solidFill>
@@ -7928,77 +7928,8 @@
                           <a:ea typeface="+mn-ea"/>
                           <a:cs typeface="+mn-cs"/>
                         </a:rPr>
-                        <a:t>At </a:t>
+                        <a:t>[THIS IS THE PLACEHOLDER TEXT]</a:t>
                       </a:r>
-                      <a:r>
-                        <a:rPr lang="en-US" sz="1100" u="none" strike="noStrike" kern="1200" dirty="0" err="1">
-                          <a:solidFill>
-                            <a:srgbClr val="002060"/>
-                          </a:solidFill>
-                          <a:effectLst/>
-                          <a:latin typeface="+mn-lt"/>
-                          <a:ea typeface="+mn-ea"/>
-                          <a:cs typeface="+mn-cs"/>
-                        </a:rPr>
-                        <a:t>vero</a:t>
-                      </a:r>
-                      <a:r>
-                        <a:rPr lang="en-US" sz="1100" u="none" strike="noStrike" kern="1200" dirty="0">
-                          <a:solidFill>
-                            <a:srgbClr val="002060"/>
-                          </a:solidFill>
-                          <a:effectLst/>
-                          <a:latin typeface="+mn-lt"/>
-                          <a:ea typeface="+mn-ea"/>
-                          <a:cs typeface="+mn-cs"/>
-                        </a:rPr>
-                        <a:t> </a:t>
-                      </a:r>
-                      <a:r>
-                        <a:rPr lang="en-US" sz="1100" u="none" strike="noStrike" kern="1200" dirty="0" err="1">
-                          <a:solidFill>
-                            <a:srgbClr val="002060"/>
-                          </a:solidFill>
-                          <a:effectLst/>
-                          <a:latin typeface="+mn-lt"/>
-                          <a:ea typeface="+mn-ea"/>
-                          <a:cs typeface="+mn-cs"/>
-                        </a:rPr>
-                        <a:t>eos</a:t>
-                      </a:r>
-                      <a:r>
-                        <a:rPr lang="en-US" sz="1100" u="none" strike="noStrike" kern="1200" dirty="0">
-                          <a:solidFill>
-                            <a:srgbClr val="002060"/>
-                          </a:solidFill>
-                          <a:effectLst/>
-                          <a:latin typeface="+mn-lt"/>
-                          <a:ea typeface="+mn-ea"/>
-                          <a:cs typeface="+mn-cs"/>
-                        </a:rPr>
-                        <a:t> et </a:t>
-                      </a:r>
-                      <a:r>
-                        <a:rPr lang="en-US" sz="1100" u="none" strike="noStrike" kern="1200" dirty="0" err="1">
-                          <a:solidFill>
-                            <a:srgbClr val="002060"/>
-                          </a:solidFill>
-                          <a:effectLst/>
-                          <a:latin typeface="+mn-lt"/>
-                          <a:ea typeface="+mn-ea"/>
-                          <a:cs typeface="+mn-cs"/>
-                        </a:rPr>
-                        <a:t>accusamus</a:t>
-                      </a:r>
-                      <a:endParaRPr lang="en-US" sz="1100" u="none" strike="noStrike" kern="1200" dirty="0">
-                        <a:solidFill>
-                          <a:srgbClr val="002060"/>
-                        </a:solidFill>
-                        <a:effectLst/>
-                        <a:latin typeface="+mn-lt"/>
-                        <a:ea typeface="+mn-ea"/>
-                        <a:cs typeface="+mn-cs"/>
-                      </a:endParaRPr>
                     </a:p>
                   </a:txBody>
                   <a:tcPr marL="45720" marR="45720" marT="27432" marB="27432">
@@ -8180,7 +8111,7 @@
                         <a:defRPr/>
                       </a:pPr>
                       <a:r>
-                        <a:rPr lang="en-US" sz="1100" u="none" strike="noStrike" kern="1200">
+                        <a:rPr lang="en-US" sz="1100" u="none" strike="noStrike" kern="1200" smtClean="0">
                           <a:solidFill>
                             <a:srgbClr val="002060"/>
                           </a:solidFill>
@@ -8189,7 +8120,7 @@
                           <a:ea typeface="+mn-ea"/>
                           <a:cs typeface="+mn-cs"/>
                         </a:rPr>
-                        <a:t>At vero eos et accusamus</a:t>
+                        <a:t>[THIS IS THE PLACEHOLDER TEXT]</a:t>
                       </a:r>
                       <a:endParaRPr lang="en-US" sz="1100" u="none" strike="noStrike" kern="1200" dirty="0">
                         <a:solidFill>
@@ -8374,7 +8305,7 @@
                         <a:defRPr/>
                       </a:pPr>
                       <a:r>
-                        <a:rPr lang="en-US" sz="1100" u="none" strike="noStrike" kern="1200">
+                        <a:rPr lang="en-US" sz="1100" u="none" strike="noStrike" kern="1200" smtClean="0">
                           <a:solidFill>
                             <a:srgbClr val="002060"/>
                           </a:solidFill>
@@ -8383,7 +8314,7 @@
                           <a:ea typeface="+mn-ea"/>
                           <a:cs typeface="+mn-cs"/>
                         </a:rPr>
-                        <a:t>At vero eos et accusamus</a:t>
+                        <a:t>[THIS IS THE PLACEHOLDER TEXT]</a:t>
                       </a:r>
                       <a:endParaRPr lang="en-US" sz="1100" u="none" strike="noStrike" kern="1200" dirty="0">
                         <a:solidFill>
@@ -8546,7 +8477,7 @@
                         <a:buChar char="§"/>
                       </a:pPr>
                       <a:r>
-                        <a:rPr lang="en-US" sz="1100" u="none" strike="noStrike" kern="1200">
+                        <a:rPr lang="en-US" sz="1100" u="none" strike="noStrike" kern="1200" smtClean="0">
                           <a:solidFill>
                             <a:srgbClr val="002060"/>
                           </a:solidFill>
@@ -8555,7 +8486,7 @@
                           <a:ea typeface="+mn-ea"/>
                           <a:cs typeface="+mn-cs"/>
                         </a:rPr>
-                        <a:t>At vero eos et accusamus</a:t>
+                        <a:t>[THIS IS THE PLACEHOLDER TEXT]</a:t>
                       </a:r>
                       <a:endParaRPr lang="en-US" sz="1100" u="none" strike="noStrike" kern="1200" dirty="0">
                         <a:solidFill>
@@ -8779,14 +8710,14 @@
                     <a:p>
                       <a:pPr algn="l" fontAlgn="t"/>
                       <a:r>
-                        <a:rPr lang="en-US" sz="1100" b="0" i="0" u="none" strike="noStrike">
+                        <a:rPr lang="en-US" sz="1100" b="0" i="0" u="none" strike="noStrike" smtClean="0">
                           <a:solidFill>
                             <a:srgbClr val="002060"/>
                           </a:solidFill>
                           <a:effectLst/>
                           <a:latin typeface="+mn-lt"/>
                         </a:rPr>
-                        <a:t>Veronicles</a:t>
+                        <a:t>[THIS IS THE PLACEHOLDER TEXT]</a:t>
                       </a:r>
                       <a:endParaRPr lang="en-US" sz="1100" b="0" i="0" u="none" strike="noStrike" dirty="0">
                         <a:solidFill>
@@ -8846,7 +8777,7 @@
                     <a:p>
                       <a:pPr algn="l" fontAlgn="t"/>
                       <a:r>
-                        <a:rPr lang="en-US" sz="1050" b="0" i="0" u="none" strike="noStrike" kern="1200">
+                        <a:rPr lang="en-US" sz="1100" u="none" strike="noStrike" kern="1200" smtClean="0">
                           <a:solidFill>
                             <a:srgbClr val="002060"/>
                           </a:solidFill>
@@ -8855,7 +8786,7 @@
                           <a:ea typeface="+mn-ea"/>
                           <a:cs typeface="+mn-cs"/>
                         </a:rPr>
-                        <a:t>Atcitasorl</a:t>
+                        <a:t>[THIS IS THE PLACEHOLDER TEXT]</a:t>
                       </a:r>
                       <a:endParaRPr lang="en-US" sz="1100" u="none" strike="noStrike" kern="1200" dirty="0">
                         <a:solidFill>
@@ -9044,7 +8975,7 @@
                         <a:defRPr/>
                       </a:pPr>
                       <a:r>
-                        <a:rPr lang="en-US" sz="1050" u="none" strike="noStrike" kern="1200" dirty="0">
+                        <a:rPr lang="en-US" sz="1050" u="none" strike="noStrike" kern="1200" smtClean="0">
                           <a:solidFill>
                             <a:srgbClr val="002060"/>
                           </a:solidFill>
@@ -9053,67 +8984,7 @@
                           <a:ea typeface="+mn-ea"/>
                           <a:cs typeface="+mn-cs"/>
                         </a:rPr>
-                        <a:t>At </a:t>
-                      </a:r>
-                      <a:r>
-                        <a:rPr lang="en-US" sz="1050" u="none" strike="noStrike" kern="1200" dirty="0" err="1">
-                          <a:solidFill>
-                            <a:srgbClr val="002060"/>
-                          </a:solidFill>
-                          <a:effectLst/>
-                          <a:latin typeface="+mn-lt"/>
-                          <a:ea typeface="+mn-ea"/>
-                          <a:cs typeface="+mn-cs"/>
-                        </a:rPr>
-                        <a:t>vero</a:t>
-                      </a:r>
-                      <a:r>
-                        <a:rPr lang="en-US" sz="1050" u="none" strike="noStrike" kern="1200" dirty="0">
-                          <a:solidFill>
-                            <a:srgbClr val="002060"/>
-                          </a:solidFill>
-                          <a:effectLst/>
-                          <a:latin typeface="+mn-lt"/>
-                          <a:ea typeface="+mn-ea"/>
-                          <a:cs typeface="+mn-cs"/>
-                        </a:rPr>
-                        <a:t> </a:t>
-                      </a:r>
-                      <a:r>
-                        <a:rPr lang="en-US" sz="1050" u="none" strike="noStrike" kern="1200" dirty="0" err="1">
-                          <a:solidFill>
-                            <a:srgbClr val="002060"/>
-                          </a:solidFill>
-                          <a:effectLst/>
-                          <a:latin typeface="+mn-lt"/>
-                          <a:ea typeface="+mn-ea"/>
-                          <a:cs typeface="+mn-cs"/>
-                        </a:rPr>
-                        <a:t>eos</a:t>
-                      </a:r>
-                      <a:r>
-                        <a:rPr lang="en-US" sz="1050" u="none" strike="noStrike" kern="1200" dirty="0">
-                          <a:solidFill>
-                            <a:srgbClr val="002060"/>
-                          </a:solidFill>
-                          <a:effectLst/>
-                          <a:latin typeface="+mn-lt"/>
-                          <a:ea typeface="+mn-ea"/>
-                          <a:cs typeface="+mn-cs"/>
-                        </a:rPr>
-                        <a:t> et </a:t>
-                      </a:r>
-                      <a:r>
-                        <a:rPr lang="en-US" sz="1050" u="none" strike="noStrike" kern="1200" dirty="0" err="1">
-                          <a:solidFill>
-                            <a:srgbClr val="002060"/>
-                          </a:solidFill>
-                          <a:effectLst/>
-                          <a:latin typeface="+mn-lt"/>
-                          <a:ea typeface="+mn-ea"/>
-                          <a:cs typeface="+mn-cs"/>
-                        </a:rPr>
-                        <a:t>accusamus</a:t>
+                        <a:t>[THIS IS THE PLACEHOLDER TEXT]</a:t>
                       </a:r>
                       <a:endParaRPr lang="en-US" sz="1050" u="none" strike="noStrike" kern="1200" dirty="0">
                         <a:solidFill>

</xml_diff>